<commit_message>
Finish ETL slides and Spark presentation slides
</commit_message>
<xml_diff>
--- a/presentation.pptx
+++ b/presentation.pptx
@@ -5,10 +5,10 @@
     <p:sldMasterId id="2147483648" r:id="rId1"/>
   </p:sldMasterIdLst>
   <p:notesMasterIdLst>
-    <p:notesMasterId r:id="rId11"/>
+    <p:notesMasterId r:id="rId13"/>
   </p:notesMasterIdLst>
   <p:handoutMasterIdLst>
-    <p:handoutMasterId r:id="rId12"/>
+    <p:handoutMasterId r:id="rId14"/>
   </p:handoutMasterIdLst>
   <p:sldIdLst>
     <p:sldId id="256" r:id="rId2"/>
@@ -17,14 +17,16 @@
     <p:sldId id="293" r:id="rId5"/>
     <p:sldId id="294" r:id="rId6"/>
     <p:sldId id="301" r:id="rId7"/>
-    <p:sldId id="302" r:id="rId8"/>
-    <p:sldId id="303" r:id="rId9"/>
-    <p:sldId id="269" r:id="rId10"/>
+    <p:sldId id="304" r:id="rId8"/>
+    <p:sldId id="302" r:id="rId9"/>
+    <p:sldId id="303" r:id="rId10"/>
+    <p:sldId id="305" r:id="rId11"/>
+    <p:sldId id="269" r:id="rId12"/>
   </p:sldIdLst>
   <p:sldSz cx="12198350" cy="6858000"/>
   <p:notesSz cx="9872663" cy="6742113"/>
   <p:custDataLst>
-    <p:tags r:id="rId13"/>
+    <p:tags r:id="rId15"/>
   </p:custDataLst>
   <p:defaultTextStyle>
     <a:defPPr>
@@ -314,7 +316,7 @@
           <a:p>
             <a:fld id="{8AF345F5-224F-42F7-8104-3FF77BEE4CD0}" type="slidenum">
               <a:rPr lang="nl-NL" smtClean="0"/>
-              <a:t>‹#›</a:t>
+              <a:t>‹N°›</a:t>
             </a:fld>
             <a:endParaRPr lang="nl-NL"/>
           </a:p>
@@ -571,7 +573,7 @@
           <a:p>
             <a:fld id="{812ECD43-08E5-4945-BC4F-4857758E978F}" type="slidenum">
               <a:rPr lang="nl-NL" smtClean="0"/>
-              <a:t>‹#›</a:t>
+              <a:t>‹N°›</a:t>
             </a:fld>
             <a:endParaRPr lang="nl-NL"/>
           </a:p>
@@ -1039,7 +1041,6 @@
             <a:noFill/>
           </a:ln>
           <a:effectLst/>
-          <a:extLst/>
         </p:spPr>
         <p:txBody>
           <a:bodyPr vert="horz" wrap="square" lIns="91440" tIns="45720" rIns="91440" bIns="45720" numCol="1" rtlCol="0" anchor="t" anchorCtr="0" compatLnSpc="1">
@@ -1115,7 +1116,6 @@
               <a:noFill/>
             </a:ln>
             <a:effectLst/>
-            <a:extLst/>
           </p:spPr>
           <p:txBody>
             <a:bodyPr vert="horz" wrap="square" lIns="91440" tIns="45720" rIns="91440" bIns="45720" numCol="1" rtlCol="0" anchor="t" anchorCtr="0" compatLnSpc="1">
@@ -1177,7 +1177,6 @@
               <a:noFill/>
             </a:ln>
             <a:effectLst/>
-            <a:extLst/>
           </p:spPr>
           <p:txBody>
             <a:bodyPr vert="horz" wrap="square" lIns="91440" tIns="45720" rIns="91440" bIns="45720" numCol="1" rtlCol="0" anchor="t" anchorCtr="0" compatLnSpc="1">
@@ -1239,7 +1238,6 @@
               <a:noFill/>
             </a:ln>
             <a:effectLst/>
-            <a:extLst/>
           </p:spPr>
           <p:txBody>
             <a:bodyPr vert="horz" wrap="square" lIns="91440" tIns="45720" rIns="91440" bIns="45720" numCol="1" rtlCol="0" anchor="t" anchorCtr="0" compatLnSpc="1">
@@ -1301,7 +1299,6 @@
               <a:noFill/>
             </a:ln>
             <a:effectLst/>
-            <a:extLst/>
           </p:spPr>
           <p:txBody>
             <a:bodyPr vert="horz" wrap="square" lIns="91440" tIns="45720" rIns="91440" bIns="45720" numCol="1" rtlCol="0" anchor="t" anchorCtr="0" compatLnSpc="1">
@@ -1363,7 +1360,6 @@
               <a:noFill/>
             </a:ln>
             <a:effectLst/>
-            <a:extLst/>
           </p:spPr>
           <p:txBody>
             <a:bodyPr vert="horz" wrap="square" lIns="91440" tIns="45720" rIns="91440" bIns="45720" numCol="1" rtlCol="0" anchor="t" anchorCtr="0" compatLnSpc="1">
@@ -1424,7 +1420,6 @@
             <a:noFill/>
           </a:ln>
           <a:effectLst/>
-          <a:extLst/>
         </p:spPr>
         <p:txBody>
           <a:bodyPr vert="horz" wrap="square" lIns="91440" tIns="45720" rIns="91440" bIns="45720" numCol="1" rtlCol="0" anchor="t" anchorCtr="0" compatLnSpc="1">
@@ -1497,7 +1492,7 @@
             <a:fld id="{5EE7099E-8998-4851-915A-4F4831808297}" type="slidenum">
               <a:rPr lang="nl-NL" smtClean="0"/>
               <a:pPr/>
-              <a:t>‹#›</a:t>
+              <a:t>‹N°›</a:t>
             </a:fld>
             <a:endParaRPr lang="nl-NL"/>
           </a:p>
@@ -2633,7 +2628,6 @@
               <a:noFill/>
             </a:ln>
             <a:effectLst/>
-            <a:extLst/>
           </p:spPr>
           <p:txBody>
             <a:bodyPr vert="horz" wrap="square" lIns="91440" tIns="45720" rIns="91440" bIns="45720" numCol="1" rtlCol="0" anchor="t" anchorCtr="0" compatLnSpc="1">
@@ -2695,7 +2689,6 @@
               <a:noFill/>
             </a:ln>
             <a:effectLst/>
-            <a:extLst/>
           </p:spPr>
           <p:txBody>
             <a:bodyPr vert="horz" wrap="square" lIns="91440" tIns="45720" rIns="91440" bIns="45720" numCol="1" rtlCol="0" anchor="t" anchorCtr="0" compatLnSpc="1">
@@ -2757,7 +2750,6 @@
               <a:noFill/>
             </a:ln>
             <a:effectLst/>
-            <a:extLst/>
           </p:spPr>
           <p:txBody>
             <a:bodyPr vert="horz" wrap="square" lIns="91440" tIns="45720" rIns="91440" bIns="45720" numCol="1" rtlCol="0" anchor="t" anchorCtr="0" compatLnSpc="1">
@@ -2819,7 +2811,6 @@
               <a:noFill/>
             </a:ln>
             <a:effectLst/>
-            <a:extLst/>
           </p:spPr>
           <p:txBody>
             <a:bodyPr vert="horz" wrap="square" lIns="91440" tIns="45720" rIns="91440" bIns="45720" numCol="1" rtlCol="0" anchor="t" anchorCtr="0" compatLnSpc="1">
@@ -2881,7 +2872,6 @@
               <a:noFill/>
             </a:ln>
             <a:effectLst/>
-            <a:extLst/>
           </p:spPr>
           <p:txBody>
             <a:bodyPr vert="horz" wrap="square" lIns="91440" tIns="45720" rIns="91440" bIns="45720" numCol="1" rtlCol="0" anchor="t" anchorCtr="0" compatLnSpc="1">
@@ -3001,7 +2991,7 @@
             <a:fld id="{5EE7099E-8998-4851-915A-4F4831808297}" type="slidenum">
               <a:rPr lang="nl-NL" smtClean="0"/>
               <a:pPr/>
-              <a:t>‹#›</a:t>
+              <a:t>‹N°›</a:t>
             </a:fld>
             <a:endParaRPr lang="nl-NL"/>
           </a:p>
@@ -3103,7 +3093,6 @@
               <a:noFill/>
             </a:ln>
             <a:effectLst/>
-            <a:extLst/>
           </p:spPr>
           <p:txBody>
             <a:bodyPr vert="horz" wrap="square" lIns="91440" tIns="45720" rIns="91440" bIns="45720" numCol="1" rtlCol="0" anchor="t" anchorCtr="0" compatLnSpc="1">
@@ -3165,7 +3154,6 @@
               <a:noFill/>
             </a:ln>
             <a:effectLst/>
-            <a:extLst/>
           </p:spPr>
           <p:txBody>
             <a:bodyPr vert="horz" wrap="square" lIns="91440" tIns="45720" rIns="91440" bIns="45720" numCol="1" rtlCol="0" anchor="t" anchorCtr="0" compatLnSpc="1">
@@ -3227,7 +3215,6 @@
               <a:noFill/>
             </a:ln>
             <a:effectLst/>
-            <a:extLst/>
           </p:spPr>
           <p:txBody>
             <a:bodyPr vert="horz" wrap="square" lIns="91440" tIns="45720" rIns="91440" bIns="45720" numCol="1" rtlCol="0" anchor="t" anchorCtr="0" compatLnSpc="1">
@@ -3289,7 +3276,6 @@
               <a:noFill/>
             </a:ln>
             <a:effectLst/>
-            <a:extLst/>
           </p:spPr>
           <p:txBody>
             <a:bodyPr vert="horz" wrap="square" lIns="91440" tIns="45720" rIns="91440" bIns="45720" numCol="1" rtlCol="0" anchor="t" anchorCtr="0" compatLnSpc="1">
@@ -3351,7 +3337,6 @@
               <a:noFill/>
             </a:ln>
             <a:effectLst/>
-            <a:extLst/>
           </p:spPr>
           <p:txBody>
             <a:bodyPr vert="horz" wrap="square" lIns="91440" tIns="45720" rIns="91440" bIns="45720" numCol="1" rtlCol="0" anchor="t" anchorCtr="0" compatLnSpc="1">
@@ -3471,7 +3456,7 @@
             <a:fld id="{5EE7099E-8998-4851-915A-4F4831808297}" type="slidenum">
               <a:rPr lang="nl-NL" smtClean="0"/>
               <a:pPr/>
-              <a:t>‹#›</a:t>
+              <a:t>‹N°›</a:t>
             </a:fld>
             <a:endParaRPr lang="nl-NL"/>
           </a:p>
@@ -3664,7 +3649,6 @@
               <a:noFill/>
             </a:ln>
             <a:effectLst/>
-            <a:extLst/>
           </p:spPr>
           <p:txBody>
             <a:bodyPr vert="horz" wrap="square" lIns="91440" tIns="45720" rIns="91440" bIns="45720" numCol="1" rtlCol="0" anchor="t" anchorCtr="0" compatLnSpc="1">
@@ -3726,7 +3710,6 @@
               <a:noFill/>
             </a:ln>
             <a:effectLst/>
-            <a:extLst/>
           </p:spPr>
           <p:txBody>
             <a:bodyPr vert="horz" wrap="square" lIns="91440" tIns="45720" rIns="91440" bIns="45720" numCol="1" rtlCol="0" anchor="t" anchorCtr="0" compatLnSpc="1">
@@ -3788,7 +3771,6 @@
               <a:noFill/>
             </a:ln>
             <a:effectLst/>
-            <a:extLst/>
           </p:spPr>
           <p:txBody>
             <a:bodyPr vert="horz" wrap="square" lIns="91440" tIns="45720" rIns="91440" bIns="45720" numCol="1" rtlCol="0" anchor="t" anchorCtr="0" compatLnSpc="1">
@@ -3850,7 +3832,6 @@
               <a:noFill/>
             </a:ln>
             <a:effectLst/>
-            <a:extLst/>
           </p:spPr>
           <p:txBody>
             <a:bodyPr vert="horz" wrap="square" lIns="91440" tIns="45720" rIns="91440" bIns="45720" numCol="1" rtlCol="0" anchor="t" anchorCtr="0" compatLnSpc="1">
@@ -3912,7 +3893,6 @@
               <a:noFill/>
             </a:ln>
             <a:effectLst/>
-            <a:extLst/>
           </p:spPr>
           <p:txBody>
             <a:bodyPr vert="horz" wrap="square" lIns="91440" tIns="45720" rIns="91440" bIns="45720" numCol="1" rtlCol="0" anchor="t" anchorCtr="0" compatLnSpc="1">
@@ -3973,7 +3953,6 @@
             <a:noFill/>
           </a:ln>
           <a:effectLst/>
-          <a:extLst/>
         </p:spPr>
         <p:txBody>
           <a:bodyPr vert="horz" wrap="square" lIns="91440" tIns="45720" rIns="91440" bIns="45720" numCol="1" rtlCol="0" anchor="t" anchorCtr="0" compatLnSpc="1">
@@ -4033,7 +4012,6 @@
             <a:noFill/>
           </a:ln>
           <a:effectLst/>
-          <a:extLst/>
         </p:spPr>
         <p:txBody>
           <a:bodyPr vert="horz" wrap="square" lIns="91440" tIns="45720" rIns="91440" bIns="45720" numCol="1" rtlCol="0" anchor="t" anchorCtr="0" compatLnSpc="1">
@@ -4106,7 +4084,7 @@
             <a:fld id="{5EE7099E-8998-4851-915A-4F4831808297}" type="slidenum">
               <a:rPr lang="nl-NL" smtClean="0"/>
               <a:pPr/>
-              <a:t>‹#›</a:t>
+              <a:t>‹N°›</a:t>
             </a:fld>
             <a:endParaRPr lang="nl-NL"/>
           </a:p>
@@ -5030,7 +5008,6 @@
               <a:noFill/>
             </a:ln>
             <a:effectLst/>
-            <a:extLst/>
           </p:spPr>
           <p:txBody>
             <a:bodyPr vert="horz" wrap="square" lIns="91440" tIns="45720" rIns="91440" bIns="45720" numCol="1" rtlCol="0" anchor="t" anchorCtr="0" compatLnSpc="1">
@@ -5092,7 +5069,6 @@
               <a:noFill/>
             </a:ln>
             <a:effectLst/>
-            <a:extLst/>
           </p:spPr>
           <p:txBody>
             <a:bodyPr vert="horz" wrap="square" lIns="91440" tIns="45720" rIns="91440" bIns="45720" numCol="1" rtlCol="0" anchor="t" anchorCtr="0" compatLnSpc="1">
@@ -5154,7 +5130,6 @@
               <a:noFill/>
             </a:ln>
             <a:effectLst/>
-            <a:extLst/>
           </p:spPr>
           <p:txBody>
             <a:bodyPr vert="horz" wrap="square" lIns="91440" tIns="45720" rIns="91440" bIns="45720" numCol="1" rtlCol="0" anchor="t" anchorCtr="0" compatLnSpc="1">
@@ -5216,7 +5191,6 @@
               <a:noFill/>
             </a:ln>
             <a:effectLst/>
-            <a:extLst/>
           </p:spPr>
           <p:txBody>
             <a:bodyPr vert="horz" wrap="square" lIns="91440" tIns="45720" rIns="91440" bIns="45720" numCol="1" rtlCol="0" anchor="t" anchorCtr="0" compatLnSpc="1">
@@ -5278,7 +5252,6 @@
               <a:noFill/>
             </a:ln>
             <a:effectLst/>
-            <a:extLst/>
           </p:spPr>
           <p:txBody>
             <a:bodyPr vert="horz" wrap="square" lIns="91440" tIns="45720" rIns="91440" bIns="45720" numCol="1" rtlCol="0" anchor="t" anchorCtr="0" compatLnSpc="1">
@@ -5340,7 +5313,6 @@
               <a:noFill/>
             </a:ln>
             <a:effectLst/>
-            <a:extLst/>
           </p:spPr>
           <p:txBody>
             <a:bodyPr vert="horz" wrap="square" lIns="91440" tIns="45720" rIns="91440" bIns="45720" numCol="1" rtlCol="0" anchor="t" anchorCtr="0" compatLnSpc="1">
@@ -5414,7 +5386,7 @@
             <a:fld id="{5EE7099E-8998-4851-915A-4F4831808297}" type="slidenum">
               <a:rPr lang="nl-NL" smtClean="0"/>
               <a:pPr/>
-              <a:t>‹#›</a:t>
+              <a:t>‹N°›</a:t>
             </a:fld>
             <a:endParaRPr lang="nl-NL"/>
           </a:p>
@@ -5592,7 +5564,7 @@
             <a:fld id="{5EE7099E-8998-4851-915A-4F4831808297}" type="slidenum">
               <a:rPr lang="nl-NL" smtClean="0"/>
               <a:pPr/>
-              <a:t>‹#›</a:t>
+              <a:t>‹N°›</a:t>
             </a:fld>
             <a:endParaRPr lang="nl-NL"/>
           </a:p>
@@ -5778,7 +5750,6 @@
               <a:noFill/>
             </a:ln>
             <a:effectLst/>
-            <a:extLst/>
           </p:spPr>
           <p:txBody>
             <a:bodyPr vert="horz" wrap="square" lIns="91440" tIns="45720" rIns="91440" bIns="45720" numCol="1" rtlCol="0" anchor="t" anchorCtr="0" compatLnSpc="1">
@@ -5840,7 +5811,6 @@
               <a:noFill/>
             </a:ln>
             <a:effectLst/>
-            <a:extLst/>
           </p:spPr>
           <p:txBody>
             <a:bodyPr vert="horz" wrap="square" lIns="91440" tIns="45720" rIns="91440" bIns="45720" numCol="1" rtlCol="0" anchor="t" anchorCtr="0" compatLnSpc="1">
@@ -5902,7 +5872,6 @@
               <a:noFill/>
             </a:ln>
             <a:effectLst/>
-            <a:extLst/>
           </p:spPr>
           <p:txBody>
             <a:bodyPr vert="horz" wrap="square" lIns="91440" tIns="45720" rIns="91440" bIns="45720" numCol="1" rtlCol="0" anchor="t" anchorCtr="0" compatLnSpc="1">
@@ -5964,7 +5933,6 @@
               <a:noFill/>
             </a:ln>
             <a:effectLst/>
-            <a:extLst/>
           </p:spPr>
           <p:txBody>
             <a:bodyPr vert="horz" wrap="square" lIns="91440" tIns="45720" rIns="91440" bIns="45720" numCol="1" rtlCol="0" anchor="t" anchorCtr="0" compatLnSpc="1">
@@ -6026,7 +5994,6 @@
               <a:noFill/>
             </a:ln>
             <a:effectLst/>
-            <a:extLst/>
           </p:spPr>
           <p:txBody>
             <a:bodyPr vert="horz" wrap="square" lIns="91440" tIns="45720" rIns="91440" bIns="45720" numCol="1" rtlCol="0" anchor="t" anchorCtr="0" compatLnSpc="1">
@@ -6088,7 +6055,6 @@
               <a:noFill/>
             </a:ln>
             <a:effectLst/>
-            <a:extLst/>
           </p:spPr>
           <p:txBody>
             <a:bodyPr vert="horz" wrap="square" lIns="91440" tIns="45720" rIns="91440" bIns="45720" numCol="1" rtlCol="0" anchor="t" anchorCtr="0" compatLnSpc="1">
@@ -6212,7 +6178,7 @@
             <a:fld id="{5EE7099E-8998-4851-915A-4F4831808297}" type="slidenum">
               <a:rPr lang="nl-NL" smtClean="0"/>
               <a:pPr/>
-              <a:t>‹#›</a:t>
+              <a:t>‹N°›</a:t>
             </a:fld>
             <a:endParaRPr lang="nl-NL"/>
           </a:p>
@@ -6398,7 +6364,6 @@
               <a:noFill/>
             </a:ln>
             <a:effectLst/>
-            <a:extLst/>
           </p:spPr>
           <p:txBody>
             <a:bodyPr vert="horz" wrap="square" lIns="91440" tIns="45720" rIns="91440" bIns="45720" numCol="1" rtlCol="0" anchor="t" anchorCtr="0" compatLnSpc="1">
@@ -6460,7 +6425,6 @@
               <a:noFill/>
             </a:ln>
             <a:effectLst/>
-            <a:extLst/>
           </p:spPr>
           <p:txBody>
             <a:bodyPr vert="horz" wrap="square" lIns="91440" tIns="45720" rIns="91440" bIns="45720" numCol="1" rtlCol="0" anchor="t" anchorCtr="0" compatLnSpc="1">
@@ -6522,7 +6486,6 @@
               <a:noFill/>
             </a:ln>
             <a:effectLst/>
-            <a:extLst/>
           </p:spPr>
           <p:txBody>
             <a:bodyPr vert="horz" wrap="square" lIns="91440" tIns="45720" rIns="91440" bIns="45720" numCol="1" rtlCol="0" anchor="t" anchorCtr="0" compatLnSpc="1">
@@ -6584,7 +6547,6 @@
               <a:noFill/>
             </a:ln>
             <a:effectLst/>
-            <a:extLst/>
           </p:spPr>
           <p:txBody>
             <a:bodyPr vert="horz" wrap="square" lIns="91440" tIns="45720" rIns="91440" bIns="45720" numCol="1" rtlCol="0" anchor="t" anchorCtr="0" compatLnSpc="1">
@@ -6646,7 +6608,6 @@
               <a:noFill/>
             </a:ln>
             <a:effectLst/>
-            <a:extLst/>
           </p:spPr>
           <p:txBody>
             <a:bodyPr vert="horz" wrap="square" lIns="91440" tIns="45720" rIns="91440" bIns="45720" numCol="1" rtlCol="0" anchor="t" anchorCtr="0" compatLnSpc="1">
@@ -6708,7 +6669,6 @@
               <a:noFill/>
             </a:ln>
             <a:effectLst/>
-            <a:extLst/>
           </p:spPr>
           <p:txBody>
             <a:bodyPr vert="horz" wrap="square" lIns="91440" tIns="45720" rIns="91440" bIns="45720" numCol="1" rtlCol="0" anchor="t" anchorCtr="0" compatLnSpc="1">
@@ -6832,7 +6792,7 @@
             <a:fld id="{5EE7099E-8998-4851-915A-4F4831808297}" type="slidenum">
               <a:rPr lang="nl-NL" smtClean="0"/>
               <a:pPr/>
-              <a:t>‹#›</a:t>
+              <a:t>‹N°›</a:t>
             </a:fld>
             <a:endParaRPr lang="nl-NL"/>
           </a:p>
@@ -7018,7 +6978,6 @@
               <a:noFill/>
             </a:ln>
             <a:effectLst/>
-            <a:extLst/>
           </p:spPr>
           <p:txBody>
             <a:bodyPr vert="horz" wrap="square" lIns="91440" tIns="45720" rIns="91440" bIns="45720" numCol="1" rtlCol="0" anchor="t" anchorCtr="0" compatLnSpc="1">
@@ -7080,7 +7039,6 @@
               <a:noFill/>
             </a:ln>
             <a:effectLst/>
-            <a:extLst/>
           </p:spPr>
           <p:txBody>
             <a:bodyPr vert="horz" wrap="square" lIns="91440" tIns="45720" rIns="91440" bIns="45720" numCol="1" rtlCol="0" anchor="t" anchorCtr="0" compatLnSpc="1">
@@ -7142,7 +7100,6 @@
               <a:noFill/>
             </a:ln>
             <a:effectLst/>
-            <a:extLst/>
           </p:spPr>
           <p:txBody>
             <a:bodyPr vert="horz" wrap="square" lIns="91440" tIns="45720" rIns="91440" bIns="45720" numCol="1" rtlCol="0" anchor="t" anchorCtr="0" compatLnSpc="1">
@@ -7204,7 +7161,6 @@
               <a:noFill/>
             </a:ln>
             <a:effectLst/>
-            <a:extLst/>
           </p:spPr>
           <p:txBody>
             <a:bodyPr vert="horz" wrap="square" lIns="91440" tIns="45720" rIns="91440" bIns="45720" numCol="1" rtlCol="0" anchor="t" anchorCtr="0" compatLnSpc="1">
@@ -7266,7 +7222,6 @@
               <a:noFill/>
             </a:ln>
             <a:effectLst/>
-            <a:extLst/>
           </p:spPr>
           <p:txBody>
             <a:bodyPr vert="horz" wrap="square" lIns="91440" tIns="45720" rIns="91440" bIns="45720" numCol="1" rtlCol="0" anchor="t" anchorCtr="0" compatLnSpc="1">
@@ -7328,7 +7283,6 @@
               <a:noFill/>
             </a:ln>
             <a:effectLst/>
-            <a:extLst/>
           </p:spPr>
           <p:txBody>
             <a:bodyPr vert="horz" wrap="square" lIns="91440" tIns="45720" rIns="91440" bIns="45720" numCol="1" rtlCol="0" anchor="t" anchorCtr="0" compatLnSpc="1">
@@ -7452,7 +7406,7 @@
             <a:fld id="{5EE7099E-8998-4851-915A-4F4831808297}" type="slidenum">
               <a:rPr lang="nl-NL" smtClean="0"/>
               <a:pPr/>
-              <a:t>‹#›</a:t>
+              <a:t>‹N°›</a:t>
             </a:fld>
             <a:endParaRPr lang="nl-NL"/>
           </a:p>
@@ -7554,7 +7508,6 @@
               <a:noFill/>
             </a:ln>
             <a:effectLst/>
-            <a:extLst/>
           </p:spPr>
           <p:txBody>
             <a:bodyPr vert="horz" wrap="square" lIns="91440" tIns="45720" rIns="91440" bIns="45720" numCol="1" rtlCol="0" anchor="t" anchorCtr="0" compatLnSpc="1">
@@ -7616,7 +7569,6 @@
               <a:noFill/>
             </a:ln>
             <a:effectLst/>
-            <a:extLst/>
           </p:spPr>
           <p:txBody>
             <a:bodyPr vert="horz" wrap="square" lIns="91440" tIns="45720" rIns="91440" bIns="45720" numCol="1" rtlCol="0" anchor="t" anchorCtr="0" compatLnSpc="1">
@@ -7678,7 +7630,6 @@
               <a:noFill/>
             </a:ln>
             <a:effectLst/>
-            <a:extLst/>
           </p:spPr>
           <p:txBody>
             <a:bodyPr vert="horz" wrap="square" lIns="91440" tIns="45720" rIns="91440" bIns="45720" numCol="1" rtlCol="0" anchor="t" anchorCtr="0" compatLnSpc="1">
@@ -7740,7 +7691,6 @@
               <a:noFill/>
             </a:ln>
             <a:effectLst/>
-            <a:extLst/>
           </p:spPr>
           <p:txBody>
             <a:bodyPr vert="horz" wrap="square" lIns="91440" tIns="45720" rIns="91440" bIns="45720" numCol="1" rtlCol="0" anchor="t" anchorCtr="0" compatLnSpc="1">
@@ -7802,7 +7752,6 @@
               <a:noFill/>
             </a:ln>
             <a:effectLst/>
-            <a:extLst/>
           </p:spPr>
           <p:txBody>
             <a:bodyPr vert="horz" wrap="square" lIns="91440" tIns="45720" rIns="91440" bIns="45720" numCol="1" rtlCol="0" anchor="t" anchorCtr="0" compatLnSpc="1">
@@ -7926,7 +7875,7 @@
             <a:fld id="{5EE7099E-8998-4851-915A-4F4831808297}" type="slidenum">
               <a:rPr lang="nl-NL" smtClean="0"/>
               <a:pPr/>
-              <a:t>‹#›</a:t>
+              <a:t>‹N°›</a:t>
             </a:fld>
             <a:endParaRPr lang="nl-NL"/>
           </a:p>
@@ -8112,7 +8061,6 @@
               <a:noFill/>
             </a:ln>
             <a:effectLst/>
-            <a:extLst/>
           </p:spPr>
           <p:txBody>
             <a:bodyPr vert="horz" wrap="square" lIns="91440" tIns="45720" rIns="91440" bIns="45720" numCol="1" rtlCol="0" anchor="t" anchorCtr="0" compatLnSpc="1">
@@ -8174,7 +8122,6 @@
               <a:noFill/>
             </a:ln>
             <a:effectLst/>
-            <a:extLst/>
           </p:spPr>
           <p:txBody>
             <a:bodyPr vert="horz" wrap="square" lIns="91440" tIns="45720" rIns="91440" bIns="45720" numCol="1" rtlCol="0" anchor="t" anchorCtr="0" compatLnSpc="1">
@@ -8236,7 +8183,6 @@
               <a:noFill/>
             </a:ln>
             <a:effectLst/>
-            <a:extLst/>
           </p:spPr>
           <p:txBody>
             <a:bodyPr vert="horz" wrap="square" lIns="91440" tIns="45720" rIns="91440" bIns="45720" numCol="1" rtlCol="0" anchor="t" anchorCtr="0" compatLnSpc="1">
@@ -8298,7 +8244,6 @@
               <a:noFill/>
             </a:ln>
             <a:effectLst/>
-            <a:extLst/>
           </p:spPr>
           <p:txBody>
             <a:bodyPr vert="horz" wrap="square" lIns="91440" tIns="45720" rIns="91440" bIns="45720" numCol="1" rtlCol="0" anchor="t" anchorCtr="0" compatLnSpc="1">
@@ -8360,7 +8305,6 @@
               <a:noFill/>
             </a:ln>
             <a:effectLst/>
-            <a:extLst/>
           </p:spPr>
           <p:txBody>
             <a:bodyPr vert="horz" wrap="square" lIns="91440" tIns="45720" rIns="91440" bIns="45720" numCol="1" rtlCol="0" anchor="t" anchorCtr="0" compatLnSpc="1">
@@ -8422,7 +8366,6 @@
               <a:noFill/>
             </a:ln>
             <a:effectLst/>
-            <a:extLst/>
           </p:spPr>
           <p:txBody>
             <a:bodyPr vert="horz" wrap="square" lIns="91440" tIns="45720" rIns="91440" bIns="45720" numCol="1" rtlCol="0" anchor="t" anchorCtr="0" compatLnSpc="1">
@@ -8484,7 +8427,6 @@
               <a:noFill/>
             </a:ln>
             <a:effectLst/>
-            <a:extLst/>
           </p:spPr>
           <p:txBody>
             <a:bodyPr vert="horz" wrap="square" lIns="91440" tIns="45720" rIns="91440" bIns="45720" numCol="1" rtlCol="0" anchor="t" anchorCtr="0" compatLnSpc="1">
@@ -8546,7 +8488,6 @@
               <a:noFill/>
             </a:ln>
             <a:effectLst/>
-            <a:extLst/>
           </p:spPr>
           <p:txBody>
             <a:bodyPr vert="horz" wrap="square" lIns="91440" tIns="45720" rIns="91440" bIns="45720" numCol="1" rtlCol="0" anchor="t" anchorCtr="0" compatLnSpc="1">
@@ -8820,7 +8761,7 @@
             <a:fld id="{5EE7099E-8998-4851-915A-4F4831808297}" type="slidenum">
               <a:rPr lang="nl-NL" smtClean="0"/>
               <a:pPr/>
-              <a:t>‹#›</a:t>
+              <a:t>‹N°›</a:t>
             </a:fld>
             <a:endParaRPr lang="nl-NL"/>
           </a:p>
@@ -9006,7 +8947,6 @@
               <a:noFill/>
             </a:ln>
             <a:effectLst/>
-            <a:extLst/>
           </p:spPr>
           <p:txBody>
             <a:bodyPr vert="horz" wrap="square" lIns="91440" tIns="45720" rIns="91440" bIns="45720" numCol="1" rtlCol="0" anchor="t" anchorCtr="0" compatLnSpc="1">
@@ -9068,7 +9008,6 @@
               <a:noFill/>
             </a:ln>
             <a:effectLst/>
-            <a:extLst/>
           </p:spPr>
           <p:txBody>
             <a:bodyPr vert="horz" wrap="square" lIns="91440" tIns="45720" rIns="91440" bIns="45720" numCol="1" rtlCol="0" anchor="t" anchorCtr="0" compatLnSpc="1">
@@ -9130,7 +9069,6 @@
               <a:noFill/>
             </a:ln>
             <a:effectLst/>
-            <a:extLst/>
           </p:spPr>
           <p:txBody>
             <a:bodyPr vert="horz" wrap="square" lIns="91440" tIns="45720" rIns="91440" bIns="45720" numCol="1" rtlCol="0" anchor="t" anchorCtr="0" compatLnSpc="1">
@@ -9192,7 +9130,6 @@
               <a:noFill/>
             </a:ln>
             <a:effectLst/>
-            <a:extLst/>
           </p:spPr>
           <p:txBody>
             <a:bodyPr vert="horz" wrap="square" lIns="91440" tIns="45720" rIns="91440" bIns="45720" numCol="1" rtlCol="0" anchor="t" anchorCtr="0" compatLnSpc="1">
@@ -9254,7 +9191,6 @@
               <a:noFill/>
             </a:ln>
             <a:effectLst/>
-            <a:extLst/>
           </p:spPr>
           <p:txBody>
             <a:bodyPr vert="horz" wrap="square" lIns="91440" tIns="45720" rIns="91440" bIns="45720" numCol="1" rtlCol="0" anchor="t" anchorCtr="0" compatLnSpc="1">
@@ -9316,7 +9252,6 @@
               <a:noFill/>
             </a:ln>
             <a:effectLst/>
-            <a:extLst/>
           </p:spPr>
           <p:txBody>
             <a:bodyPr vert="horz" wrap="square" lIns="91440" tIns="45720" rIns="91440" bIns="45720" numCol="1" rtlCol="0" anchor="t" anchorCtr="0" compatLnSpc="1">
@@ -9378,7 +9313,6 @@
               <a:noFill/>
             </a:ln>
             <a:effectLst/>
-            <a:extLst/>
           </p:spPr>
           <p:txBody>
             <a:bodyPr vert="horz" wrap="square" lIns="91440" tIns="45720" rIns="91440" bIns="45720" numCol="1" rtlCol="0" anchor="t" anchorCtr="0" compatLnSpc="1">
@@ -9552,7 +9486,7 @@
             <a:fld id="{5EE7099E-8998-4851-915A-4F4831808297}" type="slidenum">
               <a:rPr lang="nl-NL" smtClean="0"/>
               <a:pPr/>
-              <a:t>‹#›</a:t>
+              <a:t>‹N°›</a:t>
             </a:fld>
             <a:endParaRPr lang="nl-NL"/>
           </a:p>
@@ -9754,7 +9688,6 @@
               <a:noFill/>
             </a:ln>
             <a:effectLst/>
-            <a:extLst/>
           </p:spPr>
           <p:txBody>
             <a:bodyPr vert="horz" wrap="square" lIns="91440" tIns="45720" rIns="91440" bIns="45720" numCol="1" rtlCol="0" anchor="t" anchorCtr="0" compatLnSpc="1">
@@ -9816,7 +9749,6 @@
               <a:noFill/>
             </a:ln>
             <a:effectLst/>
-            <a:extLst/>
           </p:spPr>
           <p:txBody>
             <a:bodyPr vert="horz" wrap="square" lIns="91440" tIns="45720" rIns="91440" bIns="45720" numCol="1" rtlCol="0" anchor="t" anchorCtr="0" compatLnSpc="1">
@@ -9878,7 +9810,6 @@
               <a:noFill/>
             </a:ln>
             <a:effectLst/>
-            <a:extLst/>
           </p:spPr>
           <p:txBody>
             <a:bodyPr vert="horz" wrap="square" lIns="91440" tIns="45720" rIns="91440" bIns="45720" numCol="1" rtlCol="0" anchor="t" anchorCtr="0" compatLnSpc="1">
@@ -9940,7 +9871,6 @@
               <a:noFill/>
             </a:ln>
             <a:effectLst/>
-            <a:extLst/>
           </p:spPr>
           <p:txBody>
             <a:bodyPr vert="horz" wrap="square" lIns="91440" tIns="45720" rIns="91440" bIns="45720" numCol="1" rtlCol="0" anchor="t" anchorCtr="0" compatLnSpc="1">
@@ -10002,7 +9932,6 @@
               <a:noFill/>
             </a:ln>
             <a:effectLst/>
-            <a:extLst/>
           </p:spPr>
           <p:txBody>
             <a:bodyPr vert="horz" wrap="square" lIns="91440" tIns="45720" rIns="91440" bIns="45720" numCol="1" rtlCol="0" anchor="t" anchorCtr="0" compatLnSpc="1">
@@ -10063,7 +9992,6 @@
             <a:noFill/>
           </a:ln>
           <a:effectLst/>
-          <a:extLst/>
         </p:spPr>
         <p:txBody>
           <a:bodyPr vert="horz" wrap="square" lIns="91440" tIns="45720" rIns="91440" bIns="45720" numCol="1" rtlCol="0" anchor="t" anchorCtr="0" compatLnSpc="1">
@@ -10136,7 +10064,7 @@
             <a:fld id="{5EE7099E-8998-4851-915A-4F4831808297}" type="slidenum">
               <a:rPr lang="nl-NL" smtClean="0"/>
               <a:pPr/>
-              <a:t>‹#›</a:t>
+              <a:t>‹N°›</a:t>
             </a:fld>
             <a:endParaRPr lang="nl-NL"/>
           </a:p>
@@ -11230,6 +11158,792 @@
 </p:sld>
 </file>
 
+<file path=ppt/slides/slide10.xml><?xml version="1.0" encoding="utf-8"?>
+<p:sld xmlns:a="http://schemas.openxmlformats.org/drawingml/2006/main" xmlns:r="http://schemas.openxmlformats.org/officeDocument/2006/relationships" xmlns:p="http://schemas.openxmlformats.org/presentationml/2006/main">
+  <p:cSld>
+    <p:spTree>
+      <p:nvGrpSpPr>
+        <p:cNvPr id="1" name=""/>
+        <p:cNvGrpSpPr/>
+        <p:nvPr/>
+      </p:nvGrpSpPr>
+      <p:grpSpPr>
+        <a:xfrm>
+          <a:off x="0" y="0"/>
+          <a:ext cx="0" cy="0"/>
+          <a:chOff x="0" y="0"/>
+          <a:chExt cx="0" cy="0"/>
+        </a:xfrm>
+      </p:grpSpPr>
+      <p:pic>
+        <p:nvPicPr>
+          <p:cNvPr id="3" name="Image 2" descr="Une image contenant texte, capture d’écran, Police, nombre&#10;&#10;Description générée automatiquement">
+            <a:extLst>
+              <a:ext uri="{FF2B5EF4-FFF2-40B4-BE49-F238E27FC236}">
+                <a16:creationId xmlns:a16="http://schemas.microsoft.com/office/drawing/2014/main" id="{9A9FB4E0-A0B2-AABC-7831-AEBCD9D35B5A}"/>
+              </a:ext>
+            </a:extLst>
+          </p:cNvPr>
+          <p:cNvPicPr>
+            <a:picLocks noChangeAspect="1"/>
+          </p:cNvPicPr>
+          <p:nvPr/>
+        </p:nvPicPr>
+        <p:blipFill>
+          <a:blip r:embed="rId2">
+            <a:extLst>
+              <a:ext uri="{28A0092B-C50C-407E-A947-70E740481C1C}">
+                <a14:useLocalDpi xmlns:a14="http://schemas.microsoft.com/office/drawing/2010/main" val="0"/>
+              </a:ext>
+            </a:extLst>
+          </a:blip>
+          <a:stretch>
+            <a:fillRect/>
+          </a:stretch>
+        </p:blipFill>
+        <p:spPr>
+          <a:xfrm>
+            <a:off x="404662" y="1028516"/>
+            <a:ext cx="6078349" cy="4692312"/>
+          </a:xfrm>
+          <a:prstGeom prst="rect">
+            <a:avLst/>
+          </a:prstGeom>
+        </p:spPr>
+      </p:pic>
+      <p:sp>
+        <p:nvSpPr>
+          <p:cNvPr id="2" name="Title 1">
+            <a:extLst>
+              <a:ext uri="{FF2B5EF4-FFF2-40B4-BE49-F238E27FC236}">
+                <a16:creationId xmlns:a16="http://schemas.microsoft.com/office/drawing/2014/main" id="{04C5DF06-5F42-4296-B27B-4F79E0DB836B}"/>
+              </a:ext>
+            </a:extLst>
+          </p:cNvPr>
+          <p:cNvSpPr>
+            <a:spLocks noGrp="1"/>
+          </p:cNvSpPr>
+          <p:nvPr>
+            <p:ph type="title"/>
+          </p:nvPr>
+        </p:nvSpPr>
+        <p:spPr/>
+        <p:txBody>
+          <a:bodyPr/>
+          <a:lstStyle/>
+          <a:p>
+            <a:r>
+              <a:rPr lang="en-US" dirty="0"/>
+              <a:t>Faire de </a:t>
+            </a:r>
+            <a:r>
+              <a:rPr lang="en-US" dirty="0" err="1"/>
+              <a:t>l’ELT</a:t>
+            </a:r>
+            <a:r>
+              <a:rPr lang="en-US" dirty="0"/>
+              <a:t> avec Spark</a:t>
+            </a:r>
+          </a:p>
+        </p:txBody>
+      </p:sp>
+      <p:sp>
+        <p:nvSpPr>
+          <p:cNvPr id="6" name="Vertical Text Placeholder 5">
+            <a:extLst>
+              <a:ext uri="{FF2B5EF4-FFF2-40B4-BE49-F238E27FC236}">
+                <a16:creationId xmlns:a16="http://schemas.microsoft.com/office/drawing/2014/main" id="{827D6B6A-9A18-473A-8D5D-4ED00F4E77C2}"/>
+              </a:ext>
+            </a:extLst>
+          </p:cNvPr>
+          <p:cNvSpPr>
+            <a:spLocks noGrp="1"/>
+          </p:cNvSpPr>
+          <p:nvPr>
+            <p:ph type="body" orient="vert" idx="1"/>
+          </p:nvPr>
+        </p:nvSpPr>
+        <p:spPr>
+          <a:xfrm>
+            <a:off x="6986512" y="1371600"/>
+            <a:ext cx="5310674" cy="4795836"/>
+          </a:xfrm>
+        </p:spPr>
+        <p:txBody>
+          <a:bodyPr/>
+          <a:lstStyle/>
+          <a:p>
+            <a:pPr lvl="1"/>
+            <a:endParaRPr lang="en-US" dirty="0"/>
+          </a:p>
+          <a:p>
+            <a:pPr marL="180975" lvl="1" indent="0">
+              <a:buNone/>
+            </a:pPr>
+            <a:r>
+              <a:rPr lang="en-US" sz="4400" dirty="0">
+                <a:solidFill>
+                  <a:srgbClr val="FF0000"/>
+                </a:solidFill>
+              </a:rPr>
+              <a:t>Extract</a:t>
+            </a:r>
+          </a:p>
+          <a:p>
+            <a:pPr lvl="1"/>
+            <a:endParaRPr lang="en-US" sz="4400" dirty="0"/>
+          </a:p>
+          <a:p>
+            <a:pPr marL="180975" lvl="1" indent="0">
+              <a:buNone/>
+            </a:pPr>
+            <a:r>
+              <a:rPr lang="en-US" sz="4400" dirty="0">
+                <a:solidFill>
+                  <a:srgbClr val="FFC000"/>
+                </a:solidFill>
+              </a:rPr>
+              <a:t>Load</a:t>
+            </a:r>
+          </a:p>
+          <a:p>
+            <a:pPr lvl="1"/>
+            <a:endParaRPr lang="en-US" sz="4400" dirty="0"/>
+          </a:p>
+          <a:p>
+            <a:pPr marL="180975" lvl="1" indent="0">
+              <a:buNone/>
+            </a:pPr>
+            <a:r>
+              <a:rPr lang="en-US" sz="4400" dirty="0">
+                <a:solidFill>
+                  <a:srgbClr val="00B050"/>
+                </a:solidFill>
+              </a:rPr>
+              <a:t>Transform</a:t>
+            </a:r>
+          </a:p>
+          <a:p>
+            <a:pPr lvl="1"/>
+            <a:endParaRPr lang="en-US" dirty="0"/>
+          </a:p>
+          <a:p>
+            <a:endParaRPr lang="en-US" b="1" dirty="0"/>
+          </a:p>
+          <a:p>
+            <a:endParaRPr lang="en-US" dirty="0"/>
+          </a:p>
+        </p:txBody>
+      </p:sp>
+      <p:sp>
+        <p:nvSpPr>
+          <p:cNvPr id="5" name="Slide Number Placeholder 4">
+            <a:extLst>
+              <a:ext uri="{FF2B5EF4-FFF2-40B4-BE49-F238E27FC236}">
+                <a16:creationId xmlns:a16="http://schemas.microsoft.com/office/drawing/2014/main" id="{B756D4B6-3814-4E02-AB98-08D3B49675BF}"/>
+              </a:ext>
+            </a:extLst>
+          </p:cNvPr>
+          <p:cNvSpPr>
+            <a:spLocks noGrp="1"/>
+          </p:cNvSpPr>
+          <p:nvPr>
+            <p:ph type="sldNum" sz="quarter" idx="4"/>
+          </p:nvPr>
+        </p:nvSpPr>
+        <p:spPr/>
+        <p:txBody>
+          <a:bodyPr/>
+          <a:lstStyle/>
+          <a:p>
+            <a:fld id="{5EE7099E-8998-4851-915A-4F4831808297}" type="slidenum">
+              <a:rPr lang="nl-NL" smtClean="0"/>
+              <a:pPr/>
+              <a:t>10</a:t>
+            </a:fld>
+            <a:endParaRPr lang="nl-NL"/>
+          </a:p>
+        </p:txBody>
+      </p:sp>
+      <p:sp>
+        <p:nvSpPr>
+          <p:cNvPr id="4" name="Ellipse 3">
+            <a:extLst>
+              <a:ext uri="{FF2B5EF4-FFF2-40B4-BE49-F238E27FC236}">
+                <a16:creationId xmlns:a16="http://schemas.microsoft.com/office/drawing/2014/main" id="{63FD80D9-753B-C6A3-C922-23C1697EAE6E}"/>
+              </a:ext>
+            </a:extLst>
+          </p:cNvPr>
+          <p:cNvSpPr/>
+          <p:nvPr/>
+        </p:nvSpPr>
+        <p:spPr>
+          <a:xfrm>
+            <a:off x="4832263" y="2590800"/>
+            <a:ext cx="1524000" cy="1430208"/>
+          </a:xfrm>
+          <a:prstGeom prst="ellipse">
+            <a:avLst/>
+          </a:prstGeom>
+          <a:noFill/>
+          <a:ln>
+            <a:solidFill>
+              <a:srgbClr val="00B050"/>
+            </a:solidFill>
+          </a:ln>
+        </p:spPr>
+        <p:style>
+          <a:lnRef idx="2">
+            <a:schemeClr val="accent1">
+              <a:shade val="50000"/>
+            </a:schemeClr>
+          </a:lnRef>
+          <a:fillRef idx="1">
+            <a:schemeClr val="accent1"/>
+          </a:fillRef>
+          <a:effectRef idx="0">
+            <a:schemeClr val="accent1"/>
+          </a:effectRef>
+          <a:fontRef idx="minor">
+            <a:schemeClr val="lt1"/>
+          </a:fontRef>
+        </p:style>
+        <p:txBody>
+          <a:bodyPr rtlCol="0" anchor="ctr"/>
+          <a:lstStyle/>
+          <a:p>
+            <a:pPr algn="ctr"/>
+            <a:endParaRPr lang="fr-FR"/>
+          </a:p>
+        </p:txBody>
+      </p:sp>
+      <p:sp>
+        <p:nvSpPr>
+          <p:cNvPr id="10" name="Ellipse 9">
+            <a:extLst>
+              <a:ext uri="{FF2B5EF4-FFF2-40B4-BE49-F238E27FC236}">
+                <a16:creationId xmlns:a16="http://schemas.microsoft.com/office/drawing/2014/main" id="{B9633B82-85BB-893B-8BDD-6CBB309C8060}"/>
+              </a:ext>
+            </a:extLst>
+          </p:cNvPr>
+          <p:cNvSpPr/>
+          <p:nvPr/>
+        </p:nvSpPr>
+        <p:spPr>
+          <a:xfrm>
+            <a:off x="3376250" y="2659568"/>
+            <a:ext cx="1524000" cy="1430208"/>
+          </a:xfrm>
+          <a:prstGeom prst="ellipse">
+            <a:avLst/>
+          </a:prstGeom>
+          <a:noFill/>
+          <a:ln>
+            <a:solidFill>
+              <a:srgbClr val="00B050"/>
+            </a:solidFill>
+          </a:ln>
+        </p:spPr>
+        <p:style>
+          <a:lnRef idx="2">
+            <a:schemeClr val="accent1">
+              <a:shade val="50000"/>
+            </a:schemeClr>
+          </a:lnRef>
+          <a:fillRef idx="1">
+            <a:schemeClr val="accent1"/>
+          </a:fillRef>
+          <a:effectRef idx="0">
+            <a:schemeClr val="accent1"/>
+          </a:effectRef>
+          <a:fontRef idx="minor">
+            <a:schemeClr val="lt1"/>
+          </a:fontRef>
+        </p:style>
+        <p:txBody>
+          <a:bodyPr rtlCol="0" anchor="ctr"/>
+          <a:lstStyle/>
+          <a:p>
+            <a:pPr algn="ctr"/>
+            <a:endParaRPr lang="fr-FR"/>
+          </a:p>
+        </p:txBody>
+      </p:sp>
+      <p:sp>
+        <p:nvSpPr>
+          <p:cNvPr id="11" name="Ellipse 10">
+            <a:extLst>
+              <a:ext uri="{FF2B5EF4-FFF2-40B4-BE49-F238E27FC236}">
+                <a16:creationId xmlns:a16="http://schemas.microsoft.com/office/drawing/2014/main" id="{7682957F-6F73-962E-CE8F-E94F6DE04BFD}"/>
+              </a:ext>
+            </a:extLst>
+          </p:cNvPr>
+          <p:cNvSpPr/>
+          <p:nvPr/>
+        </p:nvSpPr>
+        <p:spPr>
+          <a:xfrm>
+            <a:off x="1890456" y="2659568"/>
+            <a:ext cx="1524000" cy="1430208"/>
+          </a:xfrm>
+          <a:prstGeom prst="ellipse">
+            <a:avLst/>
+          </a:prstGeom>
+          <a:noFill/>
+          <a:ln>
+            <a:solidFill>
+              <a:srgbClr val="00B050"/>
+            </a:solidFill>
+          </a:ln>
+        </p:spPr>
+        <p:style>
+          <a:lnRef idx="2">
+            <a:schemeClr val="accent1">
+              <a:shade val="50000"/>
+            </a:schemeClr>
+          </a:lnRef>
+          <a:fillRef idx="1">
+            <a:schemeClr val="accent1"/>
+          </a:fillRef>
+          <a:effectRef idx="0">
+            <a:schemeClr val="accent1"/>
+          </a:effectRef>
+          <a:fontRef idx="minor">
+            <a:schemeClr val="lt1"/>
+          </a:fontRef>
+        </p:style>
+        <p:txBody>
+          <a:bodyPr rtlCol="0" anchor="ctr"/>
+          <a:lstStyle/>
+          <a:p>
+            <a:pPr algn="ctr"/>
+            <a:endParaRPr lang="fr-FR"/>
+          </a:p>
+        </p:txBody>
+      </p:sp>
+      <p:sp>
+        <p:nvSpPr>
+          <p:cNvPr id="12" name="Ellipse 11">
+            <a:extLst>
+              <a:ext uri="{FF2B5EF4-FFF2-40B4-BE49-F238E27FC236}">
+                <a16:creationId xmlns:a16="http://schemas.microsoft.com/office/drawing/2014/main" id="{437435D1-476F-2BA6-DF51-7D889C5EB440}"/>
+              </a:ext>
+            </a:extLst>
+          </p:cNvPr>
+          <p:cNvSpPr/>
+          <p:nvPr/>
+        </p:nvSpPr>
+        <p:spPr>
+          <a:xfrm>
+            <a:off x="384172" y="2659568"/>
+            <a:ext cx="1524000" cy="1430208"/>
+          </a:xfrm>
+          <a:prstGeom prst="ellipse">
+            <a:avLst/>
+          </a:prstGeom>
+          <a:noFill/>
+          <a:ln>
+            <a:solidFill>
+              <a:srgbClr val="FFC000"/>
+            </a:solidFill>
+          </a:ln>
+        </p:spPr>
+        <p:style>
+          <a:lnRef idx="2">
+            <a:schemeClr val="accent1">
+              <a:shade val="50000"/>
+            </a:schemeClr>
+          </a:lnRef>
+          <a:fillRef idx="1">
+            <a:schemeClr val="accent1"/>
+          </a:fillRef>
+          <a:effectRef idx="0">
+            <a:schemeClr val="accent1"/>
+          </a:effectRef>
+          <a:fontRef idx="minor">
+            <a:schemeClr val="lt1"/>
+          </a:fontRef>
+        </p:style>
+        <p:txBody>
+          <a:bodyPr rtlCol="0" anchor="ctr"/>
+          <a:lstStyle/>
+          <a:p>
+            <a:pPr algn="ctr"/>
+            <a:endParaRPr lang="fr-FR"/>
+          </a:p>
+        </p:txBody>
+      </p:sp>
+      <p:sp>
+        <p:nvSpPr>
+          <p:cNvPr id="13" name="Ellipse 12">
+            <a:extLst>
+              <a:ext uri="{FF2B5EF4-FFF2-40B4-BE49-F238E27FC236}">
+                <a16:creationId xmlns:a16="http://schemas.microsoft.com/office/drawing/2014/main" id="{85B6FC3D-E9D0-451C-FD46-0F03E6D270F9}"/>
+              </a:ext>
+            </a:extLst>
+          </p:cNvPr>
+          <p:cNvSpPr/>
+          <p:nvPr/>
+        </p:nvSpPr>
+        <p:spPr>
+          <a:xfrm>
+            <a:off x="2719690" y="4163624"/>
+            <a:ext cx="1313119" cy="576052"/>
+          </a:xfrm>
+          <a:prstGeom prst="ellipse">
+            <a:avLst/>
+          </a:prstGeom>
+          <a:noFill/>
+          <a:ln>
+            <a:solidFill>
+              <a:srgbClr val="FF0000"/>
+            </a:solidFill>
+          </a:ln>
+        </p:spPr>
+        <p:style>
+          <a:lnRef idx="2">
+            <a:schemeClr val="accent1">
+              <a:shade val="50000"/>
+            </a:schemeClr>
+          </a:lnRef>
+          <a:fillRef idx="1">
+            <a:schemeClr val="accent1"/>
+          </a:fillRef>
+          <a:effectRef idx="0">
+            <a:schemeClr val="accent1"/>
+          </a:effectRef>
+          <a:fontRef idx="minor">
+            <a:schemeClr val="lt1"/>
+          </a:fontRef>
+        </p:style>
+        <p:txBody>
+          <a:bodyPr rtlCol="0" anchor="ctr"/>
+          <a:lstStyle/>
+          <a:p>
+            <a:pPr algn="ctr"/>
+            <a:endParaRPr lang="fr-FR"/>
+          </a:p>
+        </p:txBody>
+      </p:sp>
+    </p:spTree>
+    <p:extLst>
+      <p:ext uri="{BB962C8B-B14F-4D97-AF65-F5344CB8AC3E}">
+        <p14:creationId xmlns:p14="http://schemas.microsoft.com/office/powerpoint/2010/main" val="2942295185"/>
+      </p:ext>
+    </p:extLst>
+  </p:cSld>
+  <p:clrMapOvr>
+    <a:masterClrMapping/>
+  </p:clrMapOvr>
+  <p:transition spd="slow">
+    <p:wipe dir="r"/>
+  </p:transition>
+</p:sld>
+</file>
+
+<file path=ppt/slides/slide11.xml><?xml version="1.0" encoding="utf-8"?>
+<p:sld xmlns:a="http://schemas.openxmlformats.org/drawingml/2006/main" xmlns:r="http://schemas.openxmlformats.org/officeDocument/2006/relationships" xmlns:p="http://schemas.openxmlformats.org/presentationml/2006/main">
+  <p:cSld>
+    <p:spTree>
+      <p:nvGrpSpPr>
+        <p:cNvPr id="1" name=""/>
+        <p:cNvGrpSpPr/>
+        <p:nvPr/>
+      </p:nvGrpSpPr>
+      <p:grpSpPr>
+        <a:xfrm>
+          <a:off x="0" y="0"/>
+          <a:ext cx="0" cy="0"/>
+          <a:chOff x="0" y="0"/>
+          <a:chExt cx="0" cy="0"/>
+        </a:xfrm>
+      </p:grpSpPr>
+      <p:sp>
+        <p:nvSpPr>
+          <p:cNvPr id="6" name="Tijdelijke aanduiding voor tekst 5"/>
+          <p:cNvSpPr>
+            <a:spLocks noGrp="1"/>
+          </p:cNvSpPr>
+          <p:nvPr>
+            <p:ph type="body" sz="quarter" idx="12"/>
+          </p:nvPr>
+        </p:nvSpPr>
+        <p:spPr/>
+        <p:txBody>
+          <a:bodyPr/>
+          <a:lstStyle/>
+          <a:p>
+            <a:endParaRPr lang="nl-NL" dirty="0"/>
+          </a:p>
+        </p:txBody>
+      </p:sp>
+      <p:sp>
+        <p:nvSpPr>
+          <p:cNvPr id="4" name="Titel 3"/>
+          <p:cNvSpPr>
+            <a:spLocks noGrp="1"/>
+          </p:cNvSpPr>
+          <p:nvPr>
+            <p:ph type="title"/>
+          </p:nvPr>
+        </p:nvSpPr>
+        <p:spPr/>
+        <p:txBody>
+          <a:bodyPr/>
+          <a:lstStyle/>
+          <a:p>
+            <a:r>
+              <a:rPr lang="nl-NL" dirty="0"/>
+              <a:t>Merci de </a:t>
+            </a:r>
+            <a:r>
+              <a:rPr lang="nl-NL" dirty="0" err="1"/>
+              <a:t>votre</a:t>
+            </a:r>
+            <a:r>
+              <a:rPr lang="nl-NL" dirty="0"/>
+              <a:t> attention !</a:t>
+            </a:r>
+          </a:p>
+        </p:txBody>
+      </p:sp>
+      <p:sp>
+        <p:nvSpPr>
+          <p:cNvPr id="2" name="Tijdelijke aanduiding voor dianummer 1"/>
+          <p:cNvSpPr>
+            <a:spLocks noGrp="1"/>
+          </p:cNvSpPr>
+          <p:nvPr>
+            <p:ph type="sldNum" sz="quarter" idx="4"/>
+          </p:nvPr>
+        </p:nvSpPr>
+        <p:spPr/>
+        <p:txBody>
+          <a:bodyPr/>
+          <a:lstStyle/>
+          <a:p>
+            <a:fld id="{5EE7099E-8998-4851-915A-4F4831808297}" type="slidenum">
+              <a:rPr lang="nl-NL" smtClean="0"/>
+              <a:pPr/>
+              <a:t>11</a:t>
+            </a:fld>
+            <a:endParaRPr lang="nl-NL"/>
+          </a:p>
+        </p:txBody>
+      </p:sp>
+      <p:sp>
+        <p:nvSpPr>
+          <p:cNvPr id="5" name="Tijdelijke aanduiding voor tekst 19">
+            <a:extLst>
+              <a:ext uri="{FF2B5EF4-FFF2-40B4-BE49-F238E27FC236}">
+                <a16:creationId xmlns:a16="http://schemas.microsoft.com/office/drawing/2014/main" id="{2A74D798-416D-40D6-8906-E31EC4F18491}"/>
+              </a:ext>
+            </a:extLst>
+          </p:cNvPr>
+          <p:cNvSpPr>
+            <a:spLocks noGrp="1"/>
+          </p:cNvSpPr>
+          <p:nvPr>
+            <p:ph type="body" sz="quarter" idx="15" hasCustomPrompt="1"/>
+          </p:nvPr>
+        </p:nvSpPr>
+        <p:spPr>
+          <a:xfrm>
+            <a:off x="549002" y="6444530"/>
+            <a:ext cx="6918325" cy="393700"/>
+          </a:xfrm>
+        </p:spPr>
+        <p:txBody>
+          <a:bodyPr anchor="ctr">
+            <a:normAutofit/>
+          </a:bodyPr>
+          <a:lstStyle>
+            <a:lvl1pPr marL="0" indent="0">
+              <a:buNone/>
+              <a:defRPr sz="1800" baseline="0">
+                <a:solidFill>
+                  <a:schemeClr val="bg1"/>
+                </a:solidFill>
+              </a:defRPr>
+            </a:lvl1pPr>
+          </a:lstStyle>
+          <a:p>
+            <a:pPr lvl="0"/>
+            <a:r>
+              <a:rPr lang="en-GB" noProof="0" dirty="0"/>
+              <a:t>CY Tech – Charles-</a:t>
+            </a:r>
+            <a:r>
+              <a:rPr lang="en-GB" noProof="0" dirty="0" err="1"/>
+              <a:t>Meldhine</a:t>
+            </a:r>
+            <a:r>
+              <a:rPr lang="en-GB" noProof="0" dirty="0"/>
+              <a:t> Madi </a:t>
+            </a:r>
+            <a:r>
+              <a:rPr lang="en-GB" noProof="0" dirty="0" err="1"/>
+              <a:t>Mnemoi</a:t>
+            </a:r>
+            <a:endParaRPr lang="en-GB" noProof="0" dirty="0"/>
+          </a:p>
+        </p:txBody>
+      </p:sp>
+    </p:spTree>
+    <p:extLst>
+      <p:ext uri="{BB962C8B-B14F-4D97-AF65-F5344CB8AC3E}">
+        <p14:creationId xmlns:p14="http://schemas.microsoft.com/office/powerpoint/2010/main" val="2746029914"/>
+      </p:ext>
+    </p:extLst>
+  </p:cSld>
+  <p:clrMapOvr>
+    <a:masterClrMapping/>
+  </p:clrMapOvr>
+  <p:transition spd="slow">
+    <p:wipe dir="r"/>
+  </p:transition>
+  <p:timing>
+    <p:tnLst>
+      <p:par>
+        <p:cTn id="1" dur="indefinite" restart="never" nodeType="tmRoot">
+          <p:childTnLst>
+            <p:seq concurrent="1" nextAc="seek">
+              <p:cTn id="2" dur="indefinite" nodeType="mainSeq">
+                <p:childTnLst>
+                  <p:par>
+                    <p:cTn id="3" fill="hold">
+                      <p:stCondLst>
+                        <p:cond delay="indefinite"/>
+                        <p:cond evt="onBegin" delay="0">
+                          <p:tn val="2"/>
+                        </p:cond>
+                      </p:stCondLst>
+                      <p:childTnLst>
+                        <p:par>
+                          <p:cTn id="4" fill="hold">
+                            <p:stCondLst>
+                              <p:cond delay="0"/>
+                            </p:stCondLst>
+                            <p:childTnLst>
+                              <p:par>
+                                <p:cTn id="5" presetID="10" presetClass="entr" presetSubtype="0" fill="hold" grpId="0" nodeType="withEffect">
+                                  <p:stCondLst>
+                                    <p:cond delay="1000"/>
+                                  </p:stCondLst>
+                                  <p:childTnLst>
+                                    <p:set>
+                                      <p:cBhvr>
+                                        <p:cTn id="6" dur="1" fill="hold">
+                                          <p:stCondLst>
+                                            <p:cond delay="0"/>
+                                          </p:stCondLst>
+                                        </p:cTn>
+                                        <p:tgtEl>
+                                          <p:spTgt spid="5">
+                                            <p:txEl>
+                                              <p:pRg st="0" end="0"/>
+                                            </p:txEl>
+                                          </p:spTgt>
+                                        </p:tgtEl>
+                                        <p:attrNameLst>
+                                          <p:attrName>style.visibility</p:attrName>
+                                        </p:attrNameLst>
+                                      </p:cBhvr>
+                                      <p:to>
+                                        <p:strVal val="visible"/>
+                                      </p:to>
+                                    </p:set>
+                                    <p:animEffect transition="in" filter="fade">
+                                      <p:cBhvr>
+                                        <p:cTn id="7" dur="750"/>
+                                        <p:tgtEl>
+                                          <p:spTgt spid="5">
+                                            <p:txEl>
+                                              <p:pRg st="0" end="0"/>
+                                            </p:txEl>
+                                          </p:spTgt>
+                                        </p:tgtEl>
+                                      </p:cBhvr>
+                                    </p:animEffect>
+                                  </p:childTnLst>
+                                </p:cTn>
+                              </p:par>
+                            </p:childTnLst>
+                          </p:cTn>
+                        </p:par>
+                      </p:childTnLst>
+                    </p:cTn>
+                  </p:par>
+                </p:childTnLst>
+              </p:cTn>
+              <p:prevCondLst>
+                <p:cond evt="onPrev" delay="0">
+                  <p:tgtEl>
+                    <p:sldTgt/>
+                  </p:tgtEl>
+                </p:cond>
+              </p:prevCondLst>
+              <p:nextCondLst>
+                <p:cond evt="onNext" delay="0">
+                  <p:tgtEl>
+                    <p:sldTgt/>
+                  </p:tgtEl>
+                </p:cond>
+              </p:nextCondLst>
+            </p:seq>
+          </p:childTnLst>
+        </p:cTn>
+      </p:par>
+    </p:tnLst>
+    <p:bldLst>
+      <p:bldP spid="5" grpId="0" build="p">
+        <p:tmplLst>
+          <p:tmpl lvl="1">
+            <p:tnLst>
+              <p:par>
+                <p:cTn presetID="10" presetClass="entr" presetSubtype="0" fill="hold" nodeType="withEffect">
+                  <p:stCondLst>
+                    <p:cond delay="1000"/>
+                  </p:stCondLst>
+                  <p:childTnLst>
+                    <p:set>
+                      <p:cBhvr>
+                        <p:cTn dur="1" fill="hold">
+                          <p:stCondLst>
+                            <p:cond delay="0"/>
+                          </p:stCondLst>
+                        </p:cTn>
+                        <p:tgtEl>
+                          <p:spTgt spid="5"/>
+                        </p:tgtEl>
+                        <p:attrNameLst>
+                          <p:attrName>style.visibility</p:attrName>
+                        </p:attrNameLst>
+                      </p:cBhvr>
+                      <p:to>
+                        <p:strVal val="visible"/>
+                      </p:to>
+                    </p:set>
+                    <p:animEffect transition="in" filter="fade">
+                      <p:cBhvr>
+                        <p:cTn dur="750"/>
+                        <p:tgtEl>
+                          <p:spTgt spid="5"/>
+                        </p:tgtEl>
+                      </p:cBhvr>
+                    </p:animEffect>
+                  </p:childTnLst>
+                </p:cTn>
+              </p:par>
+            </p:tnLst>
+          </p:tmpl>
+        </p:tmplLst>
+      </p:bldP>
+    </p:bldLst>
+  </p:timing>
+</p:sld>
+</file>
+
 <file path=ppt/slides/slide2.xml><?xml version="1.0" encoding="utf-8"?>
 <p:sld xmlns:a="http://schemas.openxmlformats.org/drawingml/2006/main" xmlns:r="http://schemas.openxmlformats.org/officeDocument/2006/relationships" xmlns:p="http://schemas.openxmlformats.org/presentationml/2006/main">
   <p:cSld>
@@ -12144,7 +12858,15 @@
             </a:r>
             <a:r>
               <a:rPr lang="en-US" dirty="0"/>
-              <a:t>, streaming…</a:t>
+              <a:t>, streaming </a:t>
+            </a:r>
+            <a:r>
+              <a:rPr lang="en-US" dirty="0" err="1"/>
+              <a:t>fiables</a:t>
+            </a:r>
+            <a:r>
+              <a:rPr lang="en-US" dirty="0"/>
+              <a:t>…</a:t>
             </a:r>
           </a:p>
           <a:p>
@@ -12777,10 +13499,250 @@
             </a:r>
             <a:r>
               <a:rPr lang="en-US" dirty="0"/>
-              <a:t> de “Big Data”</a:t>
-            </a:r>
-          </a:p>
-          <a:p>
+              <a:t> de </a:t>
+            </a:r>
+            <a:r>
+              <a:rPr lang="en-US" dirty="0" err="1"/>
+              <a:t>données</a:t>
+            </a:r>
+            <a:r>
+              <a:rPr lang="en-US" dirty="0"/>
+              <a:t> </a:t>
+            </a:r>
+            <a:r>
+              <a:rPr lang="en-US" b="1" dirty="0" err="1"/>
+              <a:t>adapté</a:t>
+            </a:r>
+            <a:r>
+              <a:rPr lang="en-US" b="1" dirty="0"/>
+              <a:t> aux 3V du “Big Data”</a:t>
+            </a:r>
+          </a:p>
+          <a:p>
+            <a:r>
+              <a:rPr lang="en-US" b="1" dirty="0"/>
+              <a:t>Volume</a:t>
+            </a:r>
+            <a:r>
+              <a:rPr lang="en-US" dirty="0"/>
+              <a:t> :</a:t>
+            </a:r>
+          </a:p>
+          <a:p>
+            <a:pPr lvl="1"/>
+            <a:r>
+              <a:rPr lang="en-US" dirty="0" err="1"/>
+              <a:t>Traitements</a:t>
+            </a:r>
+            <a:r>
+              <a:rPr lang="en-US" dirty="0"/>
+              <a:t> </a:t>
+            </a:r>
+            <a:r>
+              <a:rPr lang="en-US" dirty="0" err="1"/>
+              <a:t>parallèles</a:t>
+            </a:r>
+            <a:r>
+              <a:rPr lang="en-US" dirty="0"/>
+              <a:t> sur un cluster avec les RDD</a:t>
+            </a:r>
+          </a:p>
+          <a:p>
+            <a:pPr marL="180975" lvl="1" indent="0">
+              <a:buNone/>
+            </a:pPr>
+            <a:r>
+              <a:rPr lang="en-US" dirty="0"/>
+              <a:t>- </a:t>
+            </a:r>
+            <a:r>
+              <a:rPr lang="en-US" dirty="0" err="1"/>
+              <a:t>Intégration</a:t>
+            </a:r>
+            <a:r>
+              <a:rPr lang="en-US" dirty="0"/>
+              <a:t> facile avec des </a:t>
+            </a:r>
+            <a:r>
+              <a:rPr lang="en-US" dirty="0" err="1"/>
+              <a:t>systèmes</a:t>
+            </a:r>
+            <a:r>
+              <a:rPr lang="en-US" dirty="0"/>
+              <a:t> de bases de </a:t>
+            </a:r>
+            <a:r>
+              <a:rPr lang="en-US" dirty="0" err="1"/>
+              <a:t>données</a:t>
+            </a:r>
+            <a:r>
+              <a:rPr lang="en-US" dirty="0"/>
+              <a:t> </a:t>
+            </a:r>
+            <a:r>
+              <a:rPr lang="en-US" dirty="0" err="1"/>
+              <a:t>massives</a:t>
+            </a:r>
+            <a:r>
+              <a:rPr lang="en-US" dirty="0"/>
+              <a:t> </a:t>
+            </a:r>
+            <a:r>
+              <a:rPr lang="en-US" dirty="0" err="1"/>
+              <a:t>comme</a:t>
+            </a:r>
+            <a:r>
+              <a:rPr lang="en-US" dirty="0"/>
+              <a:t> Hadoop</a:t>
+            </a:r>
+          </a:p>
+          <a:p>
+            <a:pPr marL="180975" lvl="1" indent="0">
+              <a:buNone/>
+            </a:pPr>
+            <a:endParaRPr lang="en-US" dirty="0"/>
+          </a:p>
+          <a:p>
+            <a:r>
+              <a:rPr lang="en-US" b="1" dirty="0" err="1"/>
+              <a:t>Vélocité</a:t>
+            </a:r>
+            <a:r>
+              <a:rPr lang="en-US" b="1" dirty="0"/>
+              <a:t> </a:t>
+            </a:r>
+            <a:r>
+              <a:rPr lang="en-US" dirty="0"/>
+              <a:t>: </a:t>
+            </a:r>
+          </a:p>
+          <a:p>
+            <a:pPr lvl="1"/>
+            <a:r>
+              <a:rPr lang="en-US" dirty="0" err="1"/>
+              <a:t>Traitements</a:t>
+            </a:r>
+            <a:r>
+              <a:rPr lang="en-US" dirty="0"/>
+              <a:t> </a:t>
+            </a:r>
+            <a:r>
+              <a:rPr lang="en-US" dirty="0" err="1"/>
+              <a:t>en</a:t>
+            </a:r>
+            <a:r>
+              <a:rPr lang="en-US" dirty="0"/>
+              <a:t> (quasi-)temps reel avec Spark Streaming</a:t>
+            </a:r>
+          </a:p>
+          <a:p>
+            <a:pPr lvl="1"/>
+            <a:r>
+              <a:rPr lang="en-US" dirty="0" err="1"/>
+              <a:t>Calculs</a:t>
+            </a:r>
+            <a:r>
+              <a:rPr lang="en-US" dirty="0"/>
+              <a:t> in-memory </a:t>
+            </a:r>
+            <a:r>
+              <a:rPr lang="en-US" dirty="0" err="1"/>
+              <a:t>privilégiés</a:t>
+            </a:r>
+            <a:r>
+              <a:rPr lang="en-US" dirty="0"/>
+              <a:t> et </a:t>
+            </a:r>
+            <a:r>
+              <a:rPr lang="en-US" dirty="0" err="1"/>
+              <a:t>systèmes</a:t>
+            </a:r>
+            <a:r>
+              <a:rPr lang="en-US" dirty="0"/>
+              <a:t> de cache</a:t>
+            </a:r>
+          </a:p>
+          <a:p>
+            <a:endParaRPr lang="en-US" dirty="0"/>
+          </a:p>
+          <a:p>
+            <a:r>
+              <a:rPr lang="en-US" b="1" dirty="0" err="1"/>
+              <a:t>Variété</a:t>
+            </a:r>
+            <a:r>
+              <a:rPr lang="en-US" b="1" dirty="0"/>
+              <a:t> :</a:t>
+            </a:r>
+          </a:p>
+          <a:p>
+            <a:pPr lvl="1"/>
+            <a:r>
+              <a:rPr lang="en-US" dirty="0"/>
+              <a:t>Manipulation de sources de </a:t>
+            </a:r>
+            <a:r>
+              <a:rPr lang="en-US" dirty="0" err="1"/>
+              <a:t>données</a:t>
+            </a:r>
+            <a:r>
+              <a:rPr lang="en-US" dirty="0"/>
+              <a:t> </a:t>
+            </a:r>
+            <a:r>
+              <a:rPr lang="en-US" dirty="0" err="1"/>
+              <a:t>variées</a:t>
+            </a:r>
+            <a:endParaRPr lang="en-US" dirty="0"/>
+          </a:p>
+          <a:p>
+            <a:pPr lvl="1"/>
+            <a:r>
+              <a:rPr lang="en-US" dirty="0" err="1"/>
+              <a:t>Structurées</a:t>
+            </a:r>
+            <a:r>
+              <a:rPr lang="en-US" dirty="0"/>
+              <a:t> avec Spark SQL, </a:t>
+            </a:r>
+            <a:r>
+              <a:rPr lang="en-US" dirty="0" err="1"/>
+              <a:t>graphes</a:t>
+            </a:r>
+            <a:r>
+              <a:rPr lang="en-US" dirty="0"/>
+              <a:t> avec </a:t>
+            </a:r>
+            <a:r>
+              <a:rPr lang="en-US" dirty="0" err="1"/>
+              <a:t>GraphX</a:t>
+            </a:r>
+            <a:endParaRPr lang="en-US" dirty="0"/>
+          </a:p>
+          <a:p>
+            <a:pPr marL="180975" lvl="1" indent="0">
+              <a:buNone/>
+            </a:pPr>
+            <a:endParaRPr lang="en-US" dirty="0"/>
+          </a:p>
+          <a:p>
+            <a:pPr lvl="1"/>
+            <a:endParaRPr lang="en-US" dirty="0"/>
+          </a:p>
+          <a:p>
+            <a:endParaRPr lang="en-US" dirty="0"/>
+          </a:p>
+          <a:p>
+            <a:endParaRPr lang="en-US" dirty="0"/>
+          </a:p>
+          <a:p>
+            <a:endParaRPr lang="en-US" dirty="0"/>
+          </a:p>
+          <a:p>
+            <a:endParaRPr lang="en-US" dirty="0"/>
+          </a:p>
+          <a:p>
+            <a:pPr lvl="1"/>
             <a:endParaRPr lang="en-US" dirty="0"/>
           </a:p>
           <a:p>
@@ -12868,6 +13830,221 @@
       </p:grpSpPr>
       <p:sp>
         <p:nvSpPr>
+          <p:cNvPr id="2" name="Title 1">
+            <a:extLst>
+              <a:ext uri="{FF2B5EF4-FFF2-40B4-BE49-F238E27FC236}">
+                <a16:creationId xmlns:a16="http://schemas.microsoft.com/office/drawing/2014/main" id="{04C5DF06-5F42-4296-B27B-4F79E0DB836B}"/>
+              </a:ext>
+            </a:extLst>
+          </p:cNvPr>
+          <p:cNvSpPr>
+            <a:spLocks noGrp="1"/>
+          </p:cNvSpPr>
+          <p:nvPr>
+            <p:ph type="title"/>
+          </p:nvPr>
+        </p:nvSpPr>
+        <p:spPr/>
+        <p:txBody>
+          <a:bodyPr/>
+          <a:lstStyle/>
+          <a:p>
+            <a:r>
+              <a:rPr lang="en-US" dirty="0" err="1"/>
+              <a:t>Composants</a:t>
+            </a:r>
+            <a:r>
+              <a:rPr lang="en-US" dirty="0"/>
+              <a:t> de Apache Spark</a:t>
+            </a:r>
+          </a:p>
+        </p:txBody>
+      </p:sp>
+      <p:sp>
+        <p:nvSpPr>
+          <p:cNvPr id="6" name="Vertical Text Placeholder 5">
+            <a:extLst>
+              <a:ext uri="{FF2B5EF4-FFF2-40B4-BE49-F238E27FC236}">
+                <a16:creationId xmlns:a16="http://schemas.microsoft.com/office/drawing/2014/main" id="{827D6B6A-9A18-473A-8D5D-4ED00F4E77C2}"/>
+              </a:ext>
+            </a:extLst>
+          </p:cNvPr>
+          <p:cNvSpPr>
+            <a:spLocks noGrp="1"/>
+          </p:cNvSpPr>
+          <p:nvPr>
+            <p:ph type="body" orient="vert" idx="1"/>
+          </p:nvPr>
+        </p:nvSpPr>
+        <p:spPr>
+          <a:xfrm>
+            <a:off x="404662" y="1252836"/>
+            <a:ext cx="11389023" cy="4795836"/>
+          </a:xfrm>
+        </p:spPr>
+        <p:txBody>
+          <a:bodyPr/>
+          <a:lstStyle/>
+          <a:p>
+            <a:endParaRPr lang="en-US" dirty="0"/>
+          </a:p>
+          <a:p>
+            <a:pPr lvl="1"/>
+            <a:endParaRPr lang="en-US" dirty="0"/>
+          </a:p>
+          <a:p>
+            <a:pPr lvl="1"/>
+            <a:endParaRPr lang="en-US" dirty="0"/>
+          </a:p>
+          <a:p>
+            <a:pPr lvl="1"/>
+            <a:endParaRPr lang="en-US" dirty="0"/>
+          </a:p>
+          <a:p>
+            <a:endParaRPr lang="en-US" b="1" dirty="0"/>
+          </a:p>
+          <a:p>
+            <a:endParaRPr lang="en-US" dirty="0"/>
+          </a:p>
+        </p:txBody>
+      </p:sp>
+      <p:sp>
+        <p:nvSpPr>
+          <p:cNvPr id="5" name="Slide Number Placeholder 4">
+            <a:extLst>
+              <a:ext uri="{FF2B5EF4-FFF2-40B4-BE49-F238E27FC236}">
+                <a16:creationId xmlns:a16="http://schemas.microsoft.com/office/drawing/2014/main" id="{B756D4B6-3814-4E02-AB98-08D3B49675BF}"/>
+              </a:ext>
+            </a:extLst>
+          </p:cNvPr>
+          <p:cNvSpPr>
+            <a:spLocks noGrp="1"/>
+          </p:cNvSpPr>
+          <p:nvPr>
+            <p:ph type="sldNum" sz="quarter" idx="4"/>
+          </p:nvPr>
+        </p:nvSpPr>
+        <p:spPr/>
+        <p:txBody>
+          <a:bodyPr/>
+          <a:lstStyle/>
+          <a:p>
+            <a:fld id="{5EE7099E-8998-4851-915A-4F4831808297}" type="slidenum">
+              <a:rPr lang="nl-NL" smtClean="0"/>
+              <a:pPr/>
+              <a:t>7</a:t>
+            </a:fld>
+            <a:endParaRPr lang="nl-NL"/>
+          </a:p>
+        </p:txBody>
+      </p:sp>
+      <p:sp>
+        <p:nvSpPr>
+          <p:cNvPr id="3" name="ZoneTexte 2">
+            <a:extLst>
+              <a:ext uri="{FF2B5EF4-FFF2-40B4-BE49-F238E27FC236}">
+                <a16:creationId xmlns:a16="http://schemas.microsoft.com/office/drawing/2014/main" id="{B5DAEDB1-498D-F260-CED4-8B03A9141B57}"/>
+              </a:ext>
+            </a:extLst>
+          </p:cNvPr>
+          <p:cNvSpPr txBox="1"/>
+          <p:nvPr/>
+        </p:nvSpPr>
+        <p:spPr>
+          <a:xfrm>
+            <a:off x="2312894" y="2433918"/>
+            <a:ext cx="0" cy="0"/>
+          </a:xfrm>
+          <a:prstGeom prst="rect">
+            <a:avLst/>
+          </a:prstGeom>
+          <a:noFill/>
+        </p:spPr>
+        <p:txBody>
+          <a:bodyPr wrap="none" lIns="108000" tIns="108000" rIns="108000" bIns="108000" rtlCol="0">
+            <a:noAutofit/>
+          </a:bodyPr>
+          <a:lstStyle/>
+          <a:p>
+            <a:endParaRPr lang="fr-FR" noProof="0" dirty="0" err="1">
+              <a:solidFill>
+                <a:schemeClr val="bg2"/>
+              </a:solidFill>
+            </a:endParaRPr>
+          </a:p>
+        </p:txBody>
+      </p:sp>
+      <p:pic>
+        <p:nvPicPr>
+          <p:cNvPr id="7" name="Image 6" descr="Une image contenant texte, capture d’écran, Police, nombre&#10;&#10;Description générée automatiquement">
+            <a:extLst>
+              <a:ext uri="{FF2B5EF4-FFF2-40B4-BE49-F238E27FC236}">
+                <a16:creationId xmlns:a16="http://schemas.microsoft.com/office/drawing/2014/main" id="{ED3B3F8C-D8B5-D9FE-99C3-6CFB14A99361}"/>
+              </a:ext>
+            </a:extLst>
+          </p:cNvPr>
+          <p:cNvPicPr>
+            <a:picLocks noChangeAspect="1"/>
+          </p:cNvPicPr>
+          <p:nvPr/>
+        </p:nvPicPr>
+        <p:blipFill>
+          <a:blip r:embed="rId2">
+            <a:extLst>
+              <a:ext uri="{28A0092B-C50C-407E-A947-70E740481C1C}">
+                <a14:useLocalDpi xmlns:a14="http://schemas.microsoft.com/office/drawing/2010/main" val="0"/>
+              </a:ext>
+            </a:extLst>
+          </a:blip>
+          <a:stretch>
+            <a:fillRect/>
+          </a:stretch>
+        </p:blipFill>
+        <p:spPr>
+          <a:xfrm>
+            <a:off x="2517775" y="1082844"/>
+            <a:ext cx="6078349" cy="4692312"/>
+          </a:xfrm>
+          <a:prstGeom prst="rect">
+            <a:avLst/>
+          </a:prstGeom>
+        </p:spPr>
+      </p:pic>
+    </p:spTree>
+    <p:extLst>
+      <p:ext uri="{BB962C8B-B14F-4D97-AF65-F5344CB8AC3E}">
+        <p14:creationId xmlns:p14="http://schemas.microsoft.com/office/powerpoint/2010/main" val="1306085487"/>
+      </p:ext>
+    </p:extLst>
+  </p:cSld>
+  <p:clrMapOvr>
+    <a:masterClrMapping/>
+  </p:clrMapOvr>
+  <p:transition spd="slow">
+    <p:wipe dir="r"/>
+  </p:transition>
+</p:sld>
+</file>
+
+<file path=ppt/slides/slide8.xml><?xml version="1.0" encoding="utf-8"?>
+<p:sld xmlns:a="http://schemas.openxmlformats.org/drawingml/2006/main" xmlns:r="http://schemas.openxmlformats.org/officeDocument/2006/relationships" xmlns:p="http://schemas.openxmlformats.org/presentationml/2006/main">
+  <p:cSld>
+    <p:spTree>
+      <p:nvGrpSpPr>
+        <p:cNvPr id="1" name=""/>
+        <p:cNvGrpSpPr/>
+        <p:nvPr/>
+      </p:nvGrpSpPr>
+      <p:grpSpPr>
+        <a:xfrm>
+          <a:off x="0" y="0"/>
+          <a:ext cx="0" cy="0"/>
+          <a:chOff x="0" y="0"/>
+          <a:chExt cx="0" cy="0"/>
+        </a:xfrm>
+      </p:grpSpPr>
+      <p:sp>
+        <p:nvSpPr>
           <p:cNvPr id="6" name="Tijdelijke aanduiding voor tekst 5"/>
           <p:cNvSpPr>
             <a:spLocks noGrp="1"/>
@@ -12959,7 +14136,7 @@
             <a:fld id="{5EE7099E-8998-4851-915A-4F4831808297}" type="slidenum">
               <a:rPr lang="nl-NL" smtClean="0"/>
               <a:pPr/>
-              <a:t>7</a:t>
+              <a:t>8</a:t>
             </a:fld>
             <a:endParaRPr lang="nl-NL"/>
           </a:p>
@@ -13170,7 +14347,7 @@
 </p:sld>
 </file>
 
-<file path=ppt/slides/slide8.xml><?xml version="1.0" encoding="utf-8"?>
+<file path=ppt/slides/slide9.xml><?xml version="1.0" encoding="utf-8"?>
 <p:sld xmlns:a="http://schemas.openxmlformats.org/drawingml/2006/main" xmlns:r="http://schemas.openxmlformats.org/officeDocument/2006/relationships" xmlns:p="http://schemas.openxmlformats.org/presentationml/2006/main">
   <p:cSld>
     <p:spTree>
@@ -13430,6 +14607,14 @@
               <a:rPr lang="en-US" b="1" dirty="0" err="1"/>
               <a:t>information</a:t>
             </a:r>
+            <a:r>
+              <a:rPr lang="en-US" b="1" dirty="0"/>
+              <a:t> / </a:t>
+            </a:r>
+            <a:r>
+              <a:rPr lang="en-US" b="1" dirty="0" err="1"/>
+              <a:t>valeur</a:t>
+            </a:r>
             <a:endParaRPr lang="en-US" b="1" dirty="0"/>
           </a:p>
           <a:p>
@@ -13479,12 +14664,76 @@
             <a:fld id="{5EE7099E-8998-4851-915A-4F4831808297}" type="slidenum">
               <a:rPr lang="nl-NL" smtClean="0"/>
               <a:pPr/>
-              <a:t>8</a:t>
+              <a:t>9</a:t>
             </a:fld>
             <a:endParaRPr lang="nl-NL"/>
           </a:p>
         </p:txBody>
       </p:sp>
+      <p:pic>
+        <p:nvPicPr>
+          <p:cNvPr id="1028" name="Picture 4" descr="ELT process, Explained">
+            <a:extLst>
+              <a:ext uri="{FF2B5EF4-FFF2-40B4-BE49-F238E27FC236}">
+                <a16:creationId xmlns:a16="http://schemas.microsoft.com/office/drawing/2014/main" id="{6D35B250-4040-35C6-A8C7-332B85552B8D}"/>
+              </a:ext>
+            </a:extLst>
+          </p:cNvPr>
+          <p:cNvPicPr>
+            <a:picLocks noChangeAspect="1" noChangeArrowheads="1"/>
+          </p:cNvPicPr>
+          <p:nvPr/>
+        </p:nvPicPr>
+        <p:blipFill>
+          <a:blip r:embed="rId2">
+            <a:extLst>
+              <a:ext uri="{BEBA8EAE-BF5A-486C-A8C5-ECC9F3942E4B}">
+                <a14:imgProps xmlns:a14="http://schemas.microsoft.com/office/drawing/2010/main">
+                  <a14:imgLayer r:embed="rId3">
+                    <a14:imgEffect>
+                      <a14:backgroundRemoval t="9879" b="89775" l="8976" r="91122">
+                        <a14:foregroundMark x1="8976" y1="22357" x2="8976" y2="22357"/>
+                        <a14:foregroundMark x1="60098" y1="24957" x2="60098" y2="24957"/>
+                        <a14:foregroundMark x1="58341" y1="24957" x2="58341" y2="24957"/>
+                        <a14:foregroundMark x1="58439" y1="26170" x2="56585" y2="23744"/>
+                        <a14:foregroundMark x1="61756" y1="30676" x2="59805" y2="30156"/>
+                        <a14:foregroundMark x1="91220" y1="24263" x2="91122" y2="52860"/>
+                        <a14:foregroundMark x1="91122" y1="52860" x2="91024" y2="53206"/>
+                      </a14:backgroundRemoval>
+                    </a14:imgEffect>
+                  </a14:imgLayer>
+                </a14:imgProps>
+              </a:ext>
+              <a:ext uri="{28A0092B-C50C-407E-A947-70E740481C1C}">
+                <a14:useLocalDpi xmlns:a14="http://schemas.microsoft.com/office/drawing/2010/main" val="0"/>
+              </a:ext>
+            </a:extLst>
+          </a:blip>
+          <a:srcRect/>
+          <a:stretch>
+            <a:fillRect/>
+          </a:stretch>
+        </p:blipFill>
+        <p:spPr bwMode="auto">
+          <a:xfrm>
+            <a:off x="2791272" y="3276600"/>
+            <a:ext cx="6615802" cy="3724298"/>
+          </a:xfrm>
+          <a:prstGeom prst="rect">
+            <a:avLst/>
+          </a:prstGeom>
+          <a:noFill/>
+          <a:extLst>
+            <a:ext uri="{909E8E84-426E-40DD-AFC4-6F175D3DCCD1}">
+              <a14:hiddenFill xmlns:a14="http://schemas.microsoft.com/office/drawing/2010/main">
+                <a:solidFill>
+                  <a:srgbClr val="FFFFFF"/>
+                </a:solidFill>
+              </a14:hiddenFill>
+            </a:ext>
+          </a:extLst>
+        </p:spPr>
+      </p:pic>
     </p:spTree>
     <p:extLst>
       <p:ext uri="{BB962C8B-B14F-4D97-AF65-F5344CB8AC3E}">
@@ -13498,309 +14747,6 @@
   <p:transition spd="slow">
     <p:wipe dir="r"/>
   </p:transition>
-</p:sld>
-</file>
-
-<file path=ppt/slides/slide9.xml><?xml version="1.0" encoding="utf-8"?>
-<p:sld xmlns:a="http://schemas.openxmlformats.org/drawingml/2006/main" xmlns:r="http://schemas.openxmlformats.org/officeDocument/2006/relationships" xmlns:p="http://schemas.openxmlformats.org/presentationml/2006/main">
-  <p:cSld>
-    <p:spTree>
-      <p:nvGrpSpPr>
-        <p:cNvPr id="1" name=""/>
-        <p:cNvGrpSpPr/>
-        <p:nvPr/>
-      </p:nvGrpSpPr>
-      <p:grpSpPr>
-        <a:xfrm>
-          <a:off x="0" y="0"/>
-          <a:ext cx="0" cy="0"/>
-          <a:chOff x="0" y="0"/>
-          <a:chExt cx="0" cy="0"/>
-        </a:xfrm>
-      </p:grpSpPr>
-      <p:sp>
-        <p:nvSpPr>
-          <p:cNvPr id="6" name="Tijdelijke aanduiding voor tekst 5"/>
-          <p:cNvSpPr>
-            <a:spLocks noGrp="1"/>
-          </p:cNvSpPr>
-          <p:nvPr>
-            <p:ph type="body" sz="quarter" idx="12"/>
-          </p:nvPr>
-        </p:nvSpPr>
-        <p:spPr/>
-        <p:txBody>
-          <a:bodyPr/>
-          <a:lstStyle/>
-          <a:p>
-            <a:endParaRPr lang="nl-NL" dirty="0"/>
-          </a:p>
-        </p:txBody>
-      </p:sp>
-      <p:sp>
-        <p:nvSpPr>
-          <p:cNvPr id="4" name="Titel 3"/>
-          <p:cNvSpPr>
-            <a:spLocks noGrp="1"/>
-          </p:cNvSpPr>
-          <p:nvPr>
-            <p:ph type="title"/>
-          </p:nvPr>
-        </p:nvSpPr>
-        <p:spPr/>
-        <p:txBody>
-          <a:bodyPr/>
-          <a:lstStyle/>
-          <a:p>
-            <a:r>
-              <a:rPr lang="nl-NL" dirty="0"/>
-              <a:t>Merci de </a:t>
-            </a:r>
-            <a:r>
-              <a:rPr lang="nl-NL" dirty="0" err="1"/>
-              <a:t>votre</a:t>
-            </a:r>
-            <a:r>
-              <a:rPr lang="nl-NL" dirty="0"/>
-              <a:t> attention !</a:t>
-            </a:r>
-          </a:p>
-        </p:txBody>
-      </p:sp>
-      <p:sp>
-        <p:nvSpPr>
-          <p:cNvPr id="2" name="Tijdelijke aanduiding voor dianummer 1"/>
-          <p:cNvSpPr>
-            <a:spLocks noGrp="1"/>
-          </p:cNvSpPr>
-          <p:nvPr>
-            <p:ph type="sldNum" sz="quarter" idx="4"/>
-          </p:nvPr>
-        </p:nvSpPr>
-        <p:spPr/>
-        <p:txBody>
-          <a:bodyPr/>
-          <a:lstStyle/>
-          <a:p>
-            <a:fld id="{5EE7099E-8998-4851-915A-4F4831808297}" type="slidenum">
-              <a:rPr lang="nl-NL" smtClean="0"/>
-              <a:pPr/>
-              <a:t>9</a:t>
-            </a:fld>
-            <a:endParaRPr lang="nl-NL"/>
-          </a:p>
-        </p:txBody>
-      </p:sp>
-      <p:sp>
-        <p:nvSpPr>
-          <p:cNvPr id="5" name="Tijdelijke aanduiding voor tekst 19">
-            <a:extLst>
-              <a:ext uri="{FF2B5EF4-FFF2-40B4-BE49-F238E27FC236}">
-                <a16:creationId xmlns:a16="http://schemas.microsoft.com/office/drawing/2014/main" id="{2A74D798-416D-40D6-8906-E31EC4F18491}"/>
-              </a:ext>
-            </a:extLst>
-          </p:cNvPr>
-          <p:cNvSpPr>
-            <a:spLocks noGrp="1"/>
-          </p:cNvSpPr>
-          <p:nvPr>
-            <p:ph type="body" sz="quarter" idx="15" hasCustomPrompt="1"/>
-          </p:nvPr>
-        </p:nvSpPr>
-        <p:spPr>
-          <a:xfrm>
-            <a:off x="549002" y="6444530"/>
-            <a:ext cx="6918325" cy="393700"/>
-          </a:xfrm>
-        </p:spPr>
-        <p:txBody>
-          <a:bodyPr anchor="ctr">
-            <a:normAutofit/>
-          </a:bodyPr>
-          <a:lstStyle>
-            <a:lvl1pPr marL="0" indent="0">
-              <a:buNone/>
-              <a:defRPr sz="1800" baseline="0">
-                <a:solidFill>
-                  <a:schemeClr val="bg1"/>
-                </a:solidFill>
-              </a:defRPr>
-            </a:lvl1pPr>
-          </a:lstStyle>
-          <a:p>
-            <a:pPr lvl="0"/>
-            <a:r>
-              <a:rPr lang="en-GB" noProof="0" dirty="0"/>
-              <a:t>CY Tech – Charles-</a:t>
-            </a:r>
-            <a:r>
-              <a:rPr lang="en-GB" noProof="0" dirty="0" err="1"/>
-              <a:t>Meldhine</a:t>
-            </a:r>
-            <a:r>
-              <a:rPr lang="en-GB" noProof="0" dirty="0"/>
-              <a:t> Madi </a:t>
-            </a:r>
-            <a:r>
-              <a:rPr lang="en-GB" noProof="0" dirty="0" err="1"/>
-              <a:t>Mnemoi</a:t>
-            </a:r>
-            <a:endParaRPr lang="en-GB" noProof="0" dirty="0"/>
-          </a:p>
-        </p:txBody>
-      </p:sp>
-    </p:spTree>
-    <p:extLst>
-      <p:ext uri="{BB962C8B-B14F-4D97-AF65-F5344CB8AC3E}">
-        <p14:creationId xmlns:p14="http://schemas.microsoft.com/office/powerpoint/2010/main" val="2746029914"/>
-      </p:ext>
-    </p:extLst>
-  </p:cSld>
-  <p:clrMapOvr>
-    <a:masterClrMapping/>
-  </p:clrMapOvr>
-  <p:transition spd="slow">
-    <p:wipe dir="r"/>
-  </p:transition>
-  <p:timing>
-    <p:tnLst>
-      <p:par>
-        <p:cTn id="1" dur="indefinite" restart="never" nodeType="tmRoot">
-          <p:childTnLst>
-            <p:seq concurrent="1" nextAc="seek">
-              <p:cTn id="2" dur="indefinite" nodeType="mainSeq">
-                <p:childTnLst>
-                  <p:par>
-                    <p:cTn id="3" fill="hold">
-                      <p:stCondLst>
-                        <p:cond delay="indefinite"/>
-                        <p:cond evt="onBegin" delay="0">
-                          <p:tn val="2"/>
-                        </p:cond>
-                      </p:stCondLst>
-                      <p:childTnLst>
-                        <p:par>
-                          <p:cTn id="4" fill="hold">
-                            <p:stCondLst>
-                              <p:cond delay="0"/>
-                            </p:stCondLst>
-                            <p:childTnLst>
-                              <p:par>
-                                <p:cTn id="5" presetID="10" presetClass="entr" presetSubtype="0" fill="hold" grpId="0" nodeType="withEffect">
-                                  <p:stCondLst>
-                                    <p:cond delay="1000"/>
-                                  </p:stCondLst>
-                                  <p:childTnLst>
-                                    <p:set>
-                                      <p:cBhvr>
-                                        <p:cTn id="6" dur="1" fill="hold">
-                                          <p:stCondLst>
-                                            <p:cond delay="0"/>
-                                          </p:stCondLst>
-                                        </p:cTn>
-                                        <p:tgtEl>
-                                          <p:spTgt spid="5">
-                                            <p:txEl>
-                                              <p:pRg st="0" end="0"/>
-                                            </p:txEl>
-                                          </p:spTgt>
-                                        </p:tgtEl>
-                                        <p:attrNameLst>
-                                          <p:attrName>style.visibility</p:attrName>
-                                        </p:attrNameLst>
-                                      </p:cBhvr>
-                                      <p:to>
-                                        <p:strVal val="visible"/>
-                                      </p:to>
-                                    </p:set>
-                                    <p:animEffect transition="in" filter="fade">
-                                      <p:cBhvr>
-                                        <p:cTn id="7" dur="750"/>
-                                        <p:tgtEl>
-                                          <p:spTgt spid="5">
-                                            <p:txEl>
-                                              <p:pRg st="0" end="0"/>
-                                            </p:txEl>
-                                          </p:spTgt>
-                                        </p:tgtEl>
-                                      </p:cBhvr>
-                                    </p:animEffect>
-                                  </p:childTnLst>
-                                </p:cTn>
-                              </p:par>
-                            </p:childTnLst>
-                          </p:cTn>
-                        </p:par>
-                      </p:childTnLst>
-                    </p:cTn>
-                  </p:par>
-                </p:childTnLst>
-              </p:cTn>
-              <p:prevCondLst>
-                <p:cond evt="onPrev" delay="0">
-                  <p:tgtEl>
-                    <p:sldTgt/>
-                  </p:tgtEl>
-                </p:cond>
-              </p:prevCondLst>
-              <p:nextCondLst>
-                <p:cond evt="onNext" delay="0">
-                  <p:tgtEl>
-                    <p:sldTgt/>
-                  </p:tgtEl>
-                </p:cond>
-              </p:nextCondLst>
-            </p:seq>
-          </p:childTnLst>
-        </p:cTn>
-      </p:par>
-    </p:tnLst>
-    <p:bldLst>
-      <p:bldP spid="5" grpId="0" build="p">
-        <p:tmplLst>
-          <p:tmpl lvl="1">
-            <p:tnLst>
-              <p:par>
-                <p:cTn presetID="10" presetClass="entr" presetSubtype="0" fill="hold" nodeType="withEffect">
-                  <p:stCondLst>
-                    <p:cond delay="1000"/>
-                  </p:stCondLst>
-                  <p:childTnLst>
-                    <p:set>
-                      <p:cBhvr>
-                        <p:cTn dur="1" fill="hold">
-                          <p:stCondLst>
-                            <p:cond delay="0"/>
-                          </p:stCondLst>
-                        </p:cTn>
-                        <p:tgtEl>
-                          <p:spTgt spid="5"/>
-                        </p:tgtEl>
-                        <p:attrNameLst>
-                          <p:attrName>style.visibility</p:attrName>
-                        </p:attrNameLst>
-                      </p:cBhvr>
-                      <p:to>
-                        <p:strVal val="visible"/>
-                      </p:to>
-                    </p:set>
-                    <p:animEffect transition="in" filter="fade">
-                      <p:cBhvr>
-                        <p:cTn dur="750"/>
-                        <p:tgtEl>
-                          <p:spTgt spid="5"/>
-                        </p:tgtEl>
-                      </p:cBhvr>
-                    </p:animEffect>
-                  </p:childTnLst>
-                </p:cTn>
-              </p:par>
-            </p:tnLst>
-          </p:tmpl>
-        </p:tmplLst>
-      </p:bldP>
-    </p:bldLst>
-  </p:timing>
 </p:sld>
 </file>
 

</xml_diff>

<commit_message>
Update presentation with slide on extract and load part
</commit_message>
<xml_diff>
--- a/presentation.pptx
+++ b/presentation.pptx
@@ -5,10 +5,10 @@
     <p:sldMasterId id="2147483648" r:id="rId1"/>
   </p:sldMasterIdLst>
   <p:notesMasterIdLst>
-    <p:notesMasterId r:id="rId13"/>
+    <p:notesMasterId r:id="rId17"/>
   </p:notesMasterIdLst>
   <p:handoutMasterIdLst>
-    <p:handoutMasterId r:id="rId14"/>
+    <p:handoutMasterId r:id="rId18"/>
   </p:handoutMasterIdLst>
   <p:sldIdLst>
     <p:sldId id="256" r:id="rId2"/>
@@ -21,12 +21,16 @@
     <p:sldId id="302" r:id="rId9"/>
     <p:sldId id="303" r:id="rId10"/>
     <p:sldId id="305" r:id="rId11"/>
-    <p:sldId id="269" r:id="rId12"/>
+    <p:sldId id="306" r:id="rId12"/>
+    <p:sldId id="307" r:id="rId13"/>
+    <p:sldId id="308" r:id="rId14"/>
+    <p:sldId id="309" r:id="rId15"/>
+    <p:sldId id="269" r:id="rId16"/>
   </p:sldIdLst>
   <p:sldSz cx="12198350" cy="6858000"/>
   <p:notesSz cx="9872663" cy="6742113"/>
   <p:custDataLst>
-    <p:tags r:id="rId15"/>
+    <p:tags r:id="rId19"/>
   </p:custDataLst>
   <p:defaultTextStyle>
     <a:defPPr>
@@ -250,7 +254,7 @@
           <a:p>
             <a:fld id="{4F068446-54CF-4267-A5BD-FA01909E96A2}" type="datetimeFigureOut">
               <a:rPr lang="nl-NL" smtClean="0"/>
-              <a:t>19-12-2023</a:t>
+              <a:t>21-12-2023</a:t>
             </a:fld>
             <a:endParaRPr lang="nl-NL"/>
           </a:p>
@@ -415,7 +419,7 @@
           <a:p>
             <a:fld id="{35698784-F1F2-4D71-B346-94F94D5EBAA2}" type="datetimeFigureOut">
               <a:rPr lang="nl-NL" smtClean="0"/>
-              <a:t>19-12-2023</a:t>
+              <a:t>21-12-2023</a:t>
             </a:fld>
             <a:endParaRPr lang="nl-NL"/>
           </a:p>
@@ -1014,7 +1018,7 @@
           <a:p>
             <a:fld id="{928F9493-D671-4F27-99EF-9D103FC79999}" type="datetime1">
               <a:rPr lang="nl-NL" noProof="0" smtClean="0"/>
-              <a:t>19-12-2023</a:t>
+              <a:t>21-12-2023</a:t>
             </a:fld>
             <a:endParaRPr lang="en-GB" noProof="0" dirty="0"/>
           </a:p>
@@ -11687,23 +11691,25 @@
             <p:ph type="title"/>
           </p:nvPr>
         </p:nvSpPr>
-        <p:spPr/>
+        <p:spPr>
+          <a:xfrm>
+            <a:off x="917575" y="990600"/>
+            <a:ext cx="10798224" cy="1718320"/>
+          </a:xfrm>
+        </p:spPr>
         <p:txBody>
           <a:bodyPr/>
           <a:lstStyle/>
           <a:p>
             <a:r>
               <a:rPr lang="nl-NL" dirty="0"/>
-              <a:t>Merci de </a:t>
+              <a:t>Cas </a:t>
             </a:r>
             <a:r>
               <a:rPr lang="nl-NL" dirty="0" err="1"/>
-              <a:t>votre</a:t>
-            </a:r>
-            <a:r>
-              <a:rPr lang="nl-NL" dirty="0"/>
-              <a:t> attention !</a:t>
-            </a:r>
+              <a:t>pratique</a:t>
+            </a:r>
+            <a:endParaRPr lang="nl-NL" dirty="0"/>
           </a:p>
         </p:txBody>
       </p:sp>
@@ -11726,6 +11732,2276 @@
               <a:rPr lang="nl-NL" smtClean="0"/>
               <a:pPr/>
               <a:t>11</a:t>
+            </a:fld>
+            <a:endParaRPr lang="nl-NL"/>
+          </a:p>
+        </p:txBody>
+      </p:sp>
+      <p:sp>
+        <p:nvSpPr>
+          <p:cNvPr id="5" name="Tijdelijke aanduiding voor tekst 19">
+            <a:extLst>
+              <a:ext uri="{FF2B5EF4-FFF2-40B4-BE49-F238E27FC236}">
+                <a16:creationId xmlns:a16="http://schemas.microsoft.com/office/drawing/2014/main" id="{2A74D798-416D-40D6-8906-E31EC4F18491}"/>
+              </a:ext>
+            </a:extLst>
+          </p:cNvPr>
+          <p:cNvSpPr>
+            <a:spLocks noGrp="1"/>
+          </p:cNvSpPr>
+          <p:nvPr>
+            <p:ph type="body" sz="quarter" idx="15" hasCustomPrompt="1"/>
+          </p:nvPr>
+        </p:nvSpPr>
+        <p:spPr>
+          <a:xfrm>
+            <a:off x="549002" y="6444530"/>
+            <a:ext cx="6918325" cy="393700"/>
+          </a:xfrm>
+        </p:spPr>
+        <p:txBody>
+          <a:bodyPr anchor="ctr">
+            <a:normAutofit/>
+          </a:bodyPr>
+          <a:lstStyle>
+            <a:lvl1pPr marL="0" indent="0">
+              <a:buNone/>
+              <a:defRPr sz="1800" baseline="0">
+                <a:solidFill>
+                  <a:schemeClr val="bg1"/>
+                </a:solidFill>
+              </a:defRPr>
+            </a:lvl1pPr>
+          </a:lstStyle>
+          <a:p>
+            <a:pPr lvl="0"/>
+            <a:r>
+              <a:rPr lang="en-GB" dirty="0"/>
+              <a:t>CY Tech – C. Madi Mnemoi, </a:t>
+            </a:r>
+            <a:r>
+              <a:rPr lang="en-GB" dirty="0" err="1"/>
+              <a:t>B.Kerdad</a:t>
+            </a:r>
+            <a:endParaRPr lang="en-GB" dirty="0"/>
+          </a:p>
+        </p:txBody>
+      </p:sp>
+    </p:spTree>
+    <p:extLst>
+      <p:ext uri="{BB962C8B-B14F-4D97-AF65-F5344CB8AC3E}">
+        <p14:creationId xmlns:p14="http://schemas.microsoft.com/office/powerpoint/2010/main" val="2419816402"/>
+      </p:ext>
+    </p:extLst>
+  </p:cSld>
+  <p:clrMapOvr>
+    <a:masterClrMapping/>
+  </p:clrMapOvr>
+  <p:transition spd="slow">
+    <p:wipe dir="r"/>
+  </p:transition>
+  <p:timing>
+    <p:tnLst>
+      <p:par>
+        <p:cTn id="1" dur="indefinite" restart="never" nodeType="tmRoot">
+          <p:childTnLst>
+            <p:seq concurrent="1" nextAc="seek">
+              <p:cTn id="2" dur="indefinite" nodeType="mainSeq">
+                <p:childTnLst>
+                  <p:par>
+                    <p:cTn id="3" fill="hold">
+                      <p:stCondLst>
+                        <p:cond delay="indefinite"/>
+                        <p:cond evt="onBegin" delay="0">
+                          <p:tn val="2"/>
+                        </p:cond>
+                      </p:stCondLst>
+                      <p:childTnLst>
+                        <p:par>
+                          <p:cTn id="4" fill="hold">
+                            <p:stCondLst>
+                              <p:cond delay="0"/>
+                            </p:stCondLst>
+                            <p:childTnLst>
+                              <p:par>
+                                <p:cTn id="5" presetID="10" presetClass="entr" presetSubtype="0" fill="hold" grpId="0" nodeType="withEffect">
+                                  <p:stCondLst>
+                                    <p:cond delay="1000"/>
+                                  </p:stCondLst>
+                                  <p:childTnLst>
+                                    <p:set>
+                                      <p:cBhvr>
+                                        <p:cTn id="6" dur="1" fill="hold">
+                                          <p:stCondLst>
+                                            <p:cond delay="0"/>
+                                          </p:stCondLst>
+                                        </p:cTn>
+                                        <p:tgtEl>
+                                          <p:spTgt spid="5">
+                                            <p:txEl>
+                                              <p:pRg st="0" end="0"/>
+                                            </p:txEl>
+                                          </p:spTgt>
+                                        </p:tgtEl>
+                                        <p:attrNameLst>
+                                          <p:attrName>style.visibility</p:attrName>
+                                        </p:attrNameLst>
+                                      </p:cBhvr>
+                                      <p:to>
+                                        <p:strVal val="visible"/>
+                                      </p:to>
+                                    </p:set>
+                                    <p:animEffect transition="in" filter="fade">
+                                      <p:cBhvr>
+                                        <p:cTn id="7" dur="750"/>
+                                        <p:tgtEl>
+                                          <p:spTgt spid="5">
+                                            <p:txEl>
+                                              <p:pRg st="0" end="0"/>
+                                            </p:txEl>
+                                          </p:spTgt>
+                                        </p:tgtEl>
+                                      </p:cBhvr>
+                                    </p:animEffect>
+                                  </p:childTnLst>
+                                </p:cTn>
+                              </p:par>
+                            </p:childTnLst>
+                          </p:cTn>
+                        </p:par>
+                      </p:childTnLst>
+                    </p:cTn>
+                  </p:par>
+                </p:childTnLst>
+              </p:cTn>
+              <p:prevCondLst>
+                <p:cond evt="onPrev" delay="0">
+                  <p:tgtEl>
+                    <p:sldTgt/>
+                  </p:tgtEl>
+                </p:cond>
+              </p:prevCondLst>
+              <p:nextCondLst>
+                <p:cond evt="onNext" delay="0">
+                  <p:tgtEl>
+                    <p:sldTgt/>
+                  </p:tgtEl>
+                </p:cond>
+              </p:nextCondLst>
+            </p:seq>
+          </p:childTnLst>
+        </p:cTn>
+      </p:par>
+    </p:tnLst>
+    <p:bldLst>
+      <p:bldP spid="5" grpId="0" build="p">
+        <p:tmplLst>
+          <p:tmpl lvl="1">
+            <p:tnLst>
+              <p:par>
+                <p:cTn presetID="10" presetClass="entr" presetSubtype="0" fill="hold" nodeType="withEffect">
+                  <p:stCondLst>
+                    <p:cond delay="1000"/>
+                  </p:stCondLst>
+                  <p:childTnLst>
+                    <p:set>
+                      <p:cBhvr>
+                        <p:cTn dur="1" fill="hold">
+                          <p:stCondLst>
+                            <p:cond delay="0"/>
+                          </p:stCondLst>
+                        </p:cTn>
+                        <p:tgtEl>
+                          <p:spTgt spid="5"/>
+                        </p:tgtEl>
+                        <p:attrNameLst>
+                          <p:attrName>style.visibility</p:attrName>
+                        </p:attrNameLst>
+                      </p:cBhvr>
+                      <p:to>
+                        <p:strVal val="visible"/>
+                      </p:to>
+                    </p:set>
+                    <p:animEffect transition="in" filter="fade">
+                      <p:cBhvr>
+                        <p:cTn dur="750"/>
+                        <p:tgtEl>
+                          <p:spTgt spid="5"/>
+                        </p:tgtEl>
+                      </p:cBhvr>
+                    </p:animEffect>
+                  </p:childTnLst>
+                </p:cTn>
+              </p:par>
+            </p:tnLst>
+          </p:tmpl>
+        </p:tmplLst>
+      </p:bldP>
+    </p:bldLst>
+  </p:timing>
+</p:sld>
+</file>
+
+<file path=ppt/slides/slide12.xml><?xml version="1.0" encoding="utf-8"?>
+<p:sld xmlns:a="http://schemas.openxmlformats.org/drawingml/2006/main" xmlns:r="http://schemas.openxmlformats.org/officeDocument/2006/relationships" xmlns:p="http://schemas.openxmlformats.org/presentationml/2006/main">
+  <p:cSld>
+    <p:spTree>
+      <p:nvGrpSpPr>
+        <p:cNvPr id="1" name=""/>
+        <p:cNvGrpSpPr/>
+        <p:nvPr/>
+      </p:nvGrpSpPr>
+      <p:grpSpPr>
+        <a:xfrm>
+          <a:off x="0" y="0"/>
+          <a:ext cx="0" cy="0"/>
+          <a:chOff x="0" y="0"/>
+          <a:chExt cx="0" cy="0"/>
+        </a:xfrm>
+      </p:grpSpPr>
+      <p:sp>
+        <p:nvSpPr>
+          <p:cNvPr id="2" name="Title 1">
+            <a:extLst>
+              <a:ext uri="{FF2B5EF4-FFF2-40B4-BE49-F238E27FC236}">
+                <a16:creationId xmlns:a16="http://schemas.microsoft.com/office/drawing/2014/main" id="{04C5DF06-5F42-4296-B27B-4F79E0DB836B}"/>
+              </a:ext>
+            </a:extLst>
+          </p:cNvPr>
+          <p:cNvSpPr>
+            <a:spLocks noGrp="1"/>
+          </p:cNvSpPr>
+          <p:nvPr>
+            <p:ph type="title"/>
+          </p:nvPr>
+        </p:nvSpPr>
+        <p:spPr/>
+        <p:txBody>
+          <a:bodyPr/>
+          <a:lstStyle/>
+          <a:p>
+            <a:r>
+              <a:rPr lang="en-US" dirty="0"/>
+              <a:t>Objectif</a:t>
+            </a:r>
+          </a:p>
+        </p:txBody>
+      </p:sp>
+      <p:sp>
+        <p:nvSpPr>
+          <p:cNvPr id="6" name="Vertical Text Placeholder 5">
+            <a:extLst>
+              <a:ext uri="{FF2B5EF4-FFF2-40B4-BE49-F238E27FC236}">
+                <a16:creationId xmlns:a16="http://schemas.microsoft.com/office/drawing/2014/main" id="{827D6B6A-9A18-473A-8D5D-4ED00F4E77C2}"/>
+              </a:ext>
+            </a:extLst>
+          </p:cNvPr>
+          <p:cNvSpPr>
+            <a:spLocks noGrp="1"/>
+          </p:cNvSpPr>
+          <p:nvPr>
+            <p:ph type="body" orient="vert" idx="1"/>
+          </p:nvPr>
+        </p:nvSpPr>
+        <p:spPr>
+          <a:xfrm>
+            <a:off x="404662" y="1252836"/>
+            <a:ext cx="11389023" cy="4795836"/>
+          </a:xfrm>
+        </p:spPr>
+        <p:txBody>
+          <a:bodyPr/>
+          <a:lstStyle/>
+          <a:p>
+            <a:pPr marL="0" indent="0">
+              <a:buNone/>
+            </a:pPr>
+            <a:endParaRPr lang="en-US" b="1" dirty="0"/>
+          </a:p>
+          <a:p>
+            <a:pPr lvl="1"/>
+            <a:endParaRPr lang="en-US" dirty="0"/>
+          </a:p>
+          <a:p>
+            <a:pPr lvl="1"/>
+            <a:endParaRPr lang="en-US" dirty="0"/>
+          </a:p>
+          <a:p>
+            <a:pPr lvl="1"/>
+            <a:endParaRPr lang="en-US" dirty="0"/>
+          </a:p>
+          <a:p>
+            <a:endParaRPr lang="en-US" b="1" dirty="0"/>
+          </a:p>
+          <a:p>
+            <a:endParaRPr lang="en-US" dirty="0"/>
+          </a:p>
+        </p:txBody>
+      </p:sp>
+      <p:sp>
+        <p:nvSpPr>
+          <p:cNvPr id="5" name="Slide Number Placeholder 4">
+            <a:extLst>
+              <a:ext uri="{FF2B5EF4-FFF2-40B4-BE49-F238E27FC236}">
+                <a16:creationId xmlns:a16="http://schemas.microsoft.com/office/drawing/2014/main" id="{B756D4B6-3814-4E02-AB98-08D3B49675BF}"/>
+              </a:ext>
+            </a:extLst>
+          </p:cNvPr>
+          <p:cNvSpPr>
+            <a:spLocks noGrp="1"/>
+          </p:cNvSpPr>
+          <p:nvPr>
+            <p:ph type="sldNum" sz="quarter" idx="4"/>
+          </p:nvPr>
+        </p:nvSpPr>
+        <p:spPr/>
+        <p:txBody>
+          <a:bodyPr/>
+          <a:lstStyle/>
+          <a:p>
+            <a:fld id="{5EE7099E-8998-4851-915A-4F4831808297}" type="slidenum">
+              <a:rPr lang="nl-NL" smtClean="0"/>
+              <a:pPr/>
+              <a:t>12</a:t>
+            </a:fld>
+            <a:endParaRPr lang="nl-NL"/>
+          </a:p>
+        </p:txBody>
+      </p:sp>
+      <p:sp>
+        <p:nvSpPr>
+          <p:cNvPr id="15" name="Rectangle 14">
+            <a:extLst>
+              <a:ext uri="{FF2B5EF4-FFF2-40B4-BE49-F238E27FC236}">
+                <a16:creationId xmlns:a16="http://schemas.microsoft.com/office/drawing/2014/main" id="{B6569E6E-9E60-9C86-D853-686D272BC089}"/>
+              </a:ext>
+            </a:extLst>
+          </p:cNvPr>
+          <p:cNvSpPr/>
+          <p:nvPr/>
+        </p:nvSpPr>
+        <p:spPr>
+          <a:xfrm>
+            <a:off x="6134199" y="133499"/>
+            <a:ext cx="1260375" cy="6294437"/>
+          </a:xfrm>
+          <a:prstGeom prst="rect">
+            <a:avLst/>
+          </a:prstGeom>
+          <a:noFill/>
+          <a:ln>
+            <a:solidFill>
+              <a:srgbClr val="FFC000"/>
+            </a:solidFill>
+          </a:ln>
+        </p:spPr>
+        <p:style>
+          <a:lnRef idx="2">
+            <a:schemeClr val="accent1">
+              <a:shade val="50000"/>
+            </a:schemeClr>
+          </a:lnRef>
+          <a:fillRef idx="1">
+            <a:schemeClr val="accent1"/>
+          </a:fillRef>
+          <a:effectRef idx="0">
+            <a:schemeClr val="accent1"/>
+          </a:effectRef>
+          <a:fontRef idx="minor">
+            <a:schemeClr val="lt1"/>
+          </a:fontRef>
+        </p:style>
+        <p:txBody>
+          <a:bodyPr rtlCol="0" anchor="ctr"/>
+          <a:lstStyle/>
+          <a:p>
+            <a:pPr algn="ctr"/>
+            <a:endParaRPr lang="fr-FR"/>
+          </a:p>
+        </p:txBody>
+      </p:sp>
+      <p:sp>
+        <p:nvSpPr>
+          <p:cNvPr id="16" name="Rectangle 15">
+            <a:extLst>
+              <a:ext uri="{FF2B5EF4-FFF2-40B4-BE49-F238E27FC236}">
+                <a16:creationId xmlns:a16="http://schemas.microsoft.com/office/drawing/2014/main" id="{327071ED-640C-444C-46ED-9EEE7A9FB9F4}"/>
+              </a:ext>
+            </a:extLst>
+          </p:cNvPr>
+          <p:cNvSpPr/>
+          <p:nvPr/>
+        </p:nvSpPr>
+        <p:spPr>
+          <a:xfrm>
+            <a:off x="4117973" y="133498"/>
+            <a:ext cx="1981200" cy="6320705"/>
+          </a:xfrm>
+          <a:prstGeom prst="rect">
+            <a:avLst/>
+          </a:prstGeom>
+          <a:noFill/>
+          <a:ln>
+            <a:solidFill>
+              <a:srgbClr val="FF0000"/>
+            </a:solidFill>
+          </a:ln>
+        </p:spPr>
+        <p:style>
+          <a:lnRef idx="2">
+            <a:schemeClr val="accent1">
+              <a:shade val="50000"/>
+            </a:schemeClr>
+          </a:lnRef>
+          <a:fillRef idx="1">
+            <a:schemeClr val="accent1"/>
+          </a:fillRef>
+          <a:effectRef idx="0">
+            <a:schemeClr val="accent1"/>
+          </a:effectRef>
+          <a:fontRef idx="minor">
+            <a:schemeClr val="lt1"/>
+          </a:fontRef>
+        </p:style>
+        <p:txBody>
+          <a:bodyPr rtlCol="0" anchor="ctr"/>
+          <a:lstStyle/>
+          <a:p>
+            <a:pPr algn="ctr"/>
+            <a:endParaRPr lang="fr-FR"/>
+          </a:p>
+        </p:txBody>
+      </p:sp>
+      <p:sp>
+        <p:nvSpPr>
+          <p:cNvPr id="17" name="Rectangle 16">
+            <a:extLst>
+              <a:ext uri="{FF2B5EF4-FFF2-40B4-BE49-F238E27FC236}">
+                <a16:creationId xmlns:a16="http://schemas.microsoft.com/office/drawing/2014/main" id="{23961C14-554E-2366-C8FF-49F075D29215}"/>
+              </a:ext>
+            </a:extLst>
+          </p:cNvPr>
+          <p:cNvSpPr/>
+          <p:nvPr/>
+        </p:nvSpPr>
+        <p:spPr>
+          <a:xfrm>
+            <a:off x="7423149" y="133498"/>
+            <a:ext cx="4162425" cy="6294437"/>
+          </a:xfrm>
+          <a:prstGeom prst="rect">
+            <a:avLst/>
+          </a:prstGeom>
+          <a:noFill/>
+          <a:ln>
+            <a:solidFill>
+              <a:srgbClr val="00B050"/>
+            </a:solidFill>
+          </a:ln>
+        </p:spPr>
+        <p:style>
+          <a:lnRef idx="2">
+            <a:schemeClr val="accent1">
+              <a:shade val="50000"/>
+            </a:schemeClr>
+          </a:lnRef>
+          <a:fillRef idx="1">
+            <a:schemeClr val="accent1"/>
+          </a:fillRef>
+          <a:effectRef idx="0">
+            <a:schemeClr val="accent1"/>
+          </a:effectRef>
+          <a:fontRef idx="minor">
+            <a:schemeClr val="lt1"/>
+          </a:fontRef>
+        </p:style>
+        <p:txBody>
+          <a:bodyPr rtlCol="0" anchor="ctr"/>
+          <a:lstStyle/>
+          <a:p>
+            <a:pPr algn="ctr"/>
+            <a:endParaRPr lang="fr-FR"/>
+          </a:p>
+        </p:txBody>
+      </p:sp>
+      <p:sp>
+        <p:nvSpPr>
+          <p:cNvPr id="18" name="Vertical Text Placeholder 5">
+            <a:extLst>
+              <a:ext uri="{FF2B5EF4-FFF2-40B4-BE49-F238E27FC236}">
+                <a16:creationId xmlns:a16="http://schemas.microsoft.com/office/drawing/2014/main" id="{45C3B00A-1CB6-DDA7-1122-C3C105459518}"/>
+              </a:ext>
+            </a:extLst>
+          </p:cNvPr>
+          <p:cNvSpPr txBox="1">
+            <a:spLocks/>
+          </p:cNvSpPr>
+          <p:nvPr/>
+        </p:nvSpPr>
+        <p:spPr>
+          <a:xfrm>
+            <a:off x="343001" y="1278236"/>
+            <a:ext cx="5310674" cy="4795836"/>
+          </a:xfrm>
+          <a:prstGeom prst="rect">
+            <a:avLst/>
+          </a:prstGeom>
+        </p:spPr>
+        <p:txBody>
+          <a:bodyPr vert="horz" lIns="0" tIns="0" rIns="0" bIns="0" rtlCol="0">
+            <a:normAutofit/>
+          </a:bodyPr>
+          <a:lstStyle>
+            <a:lvl1pPr marL="180975" indent="-180975" algn="l" defTabSz="914400" rtl="0" eaLnBrk="1" latinLnBrk="0" hangingPunct="1">
+              <a:lnSpc>
+                <a:spcPct val="90000"/>
+              </a:lnSpc>
+              <a:spcBef>
+                <a:spcPts val="600"/>
+              </a:spcBef>
+              <a:spcAft>
+                <a:spcPts val="600"/>
+              </a:spcAft>
+              <a:buClr>
+                <a:schemeClr val="bg2"/>
+              </a:buClr>
+              <a:buFont typeface="Arial" panose="020B0604020202020204" pitchFamily="34" charset="0"/>
+              <a:buChar char="•"/>
+              <a:defRPr sz="1800" kern="1200">
+                <a:solidFill>
+                  <a:schemeClr val="bg2"/>
+                </a:solidFill>
+                <a:latin typeface="+mn-lt"/>
+                <a:ea typeface="+mn-ea"/>
+                <a:cs typeface="+mn-cs"/>
+              </a:defRPr>
+            </a:lvl1pPr>
+            <a:lvl2pPr marL="361950" indent="-180975" algn="l" defTabSz="914400" rtl="0" eaLnBrk="1" latinLnBrk="0" hangingPunct="1">
+              <a:lnSpc>
+                <a:spcPct val="90000"/>
+              </a:lnSpc>
+              <a:spcBef>
+                <a:spcPts val="600"/>
+              </a:spcBef>
+              <a:spcAft>
+                <a:spcPts val="600"/>
+              </a:spcAft>
+              <a:buClr>
+                <a:schemeClr val="bg2"/>
+              </a:buClr>
+              <a:buFont typeface="Arial" panose="020B0604020202020204" pitchFamily="34" charset="0"/>
+              <a:buChar char="-"/>
+              <a:defRPr sz="1600" kern="1200">
+                <a:solidFill>
+                  <a:schemeClr val="bg2"/>
+                </a:solidFill>
+                <a:latin typeface="+mn-lt"/>
+                <a:ea typeface="+mn-ea"/>
+                <a:cs typeface="+mn-cs"/>
+              </a:defRPr>
+            </a:lvl2pPr>
+            <a:lvl3pPr marL="0" indent="0" algn="l" defTabSz="914400" rtl="0" eaLnBrk="1" latinLnBrk="0" hangingPunct="1">
+              <a:lnSpc>
+                <a:spcPct val="90000"/>
+              </a:lnSpc>
+              <a:spcBef>
+                <a:spcPts val="600"/>
+              </a:spcBef>
+              <a:spcAft>
+                <a:spcPts val="600"/>
+              </a:spcAft>
+              <a:buFont typeface="Arial" panose="020B0604020202020204" pitchFamily="34" charset="0"/>
+              <a:buNone/>
+              <a:defRPr sz="1800" kern="1200">
+                <a:solidFill>
+                  <a:schemeClr val="bg2"/>
+                </a:solidFill>
+                <a:latin typeface="+mn-lt"/>
+                <a:ea typeface="+mn-ea"/>
+                <a:cs typeface="+mn-cs"/>
+              </a:defRPr>
+            </a:lvl3pPr>
+            <a:lvl4pPr marL="0" indent="0" algn="l" defTabSz="914400" rtl="0" eaLnBrk="1" latinLnBrk="0" hangingPunct="1">
+              <a:lnSpc>
+                <a:spcPct val="90000"/>
+              </a:lnSpc>
+              <a:spcBef>
+                <a:spcPts val="600"/>
+              </a:spcBef>
+              <a:spcAft>
+                <a:spcPts val="600"/>
+              </a:spcAft>
+              <a:buFont typeface="Arial" panose="020B0604020202020204" pitchFamily="34" charset="0"/>
+              <a:buNone/>
+              <a:defRPr sz="1800" b="1" kern="1200">
+                <a:solidFill>
+                  <a:schemeClr val="bg2"/>
+                </a:solidFill>
+                <a:latin typeface="+mn-lt"/>
+                <a:ea typeface="+mn-ea"/>
+                <a:cs typeface="+mn-cs"/>
+              </a:defRPr>
+            </a:lvl4pPr>
+            <a:lvl5pPr marL="0" indent="0" algn="l" defTabSz="914400" rtl="0" eaLnBrk="1" latinLnBrk="0" hangingPunct="1">
+              <a:lnSpc>
+                <a:spcPct val="90000"/>
+              </a:lnSpc>
+              <a:spcBef>
+                <a:spcPts val="600"/>
+              </a:spcBef>
+              <a:spcAft>
+                <a:spcPts val="600"/>
+              </a:spcAft>
+              <a:buFont typeface="Arial" panose="020B0604020202020204" pitchFamily="34" charset="0"/>
+              <a:buNone/>
+              <a:defRPr sz="1800" b="1" kern="1200" baseline="0">
+                <a:solidFill>
+                  <a:schemeClr val="tx2"/>
+                </a:solidFill>
+                <a:latin typeface="+mn-lt"/>
+                <a:ea typeface="+mn-ea"/>
+                <a:cs typeface="+mn-cs"/>
+              </a:defRPr>
+            </a:lvl5pPr>
+            <a:lvl6pPr marL="180975" indent="-180975" algn="l" defTabSz="914400" rtl="0" eaLnBrk="1" latinLnBrk="0" hangingPunct="1">
+              <a:lnSpc>
+                <a:spcPct val="90000"/>
+              </a:lnSpc>
+              <a:spcBef>
+                <a:spcPts val="600"/>
+              </a:spcBef>
+              <a:spcAft>
+                <a:spcPts val="600"/>
+              </a:spcAft>
+              <a:buClr>
+                <a:schemeClr val="bg2"/>
+              </a:buClr>
+              <a:buFont typeface="Arial" panose="020B0604020202020204" pitchFamily="34" charset="0"/>
+              <a:buChar char="•"/>
+              <a:defRPr sz="1800" kern="1200">
+                <a:solidFill>
+                  <a:schemeClr val="bg2"/>
+                </a:solidFill>
+                <a:latin typeface="+mn-lt"/>
+                <a:ea typeface="+mn-ea"/>
+                <a:cs typeface="+mn-cs"/>
+              </a:defRPr>
+            </a:lvl6pPr>
+            <a:lvl7pPr marL="361950" indent="-180975" algn="l" defTabSz="914400" rtl="0" eaLnBrk="1" latinLnBrk="0" hangingPunct="1">
+              <a:lnSpc>
+                <a:spcPct val="90000"/>
+              </a:lnSpc>
+              <a:spcBef>
+                <a:spcPts val="600"/>
+              </a:spcBef>
+              <a:spcAft>
+                <a:spcPts val="600"/>
+              </a:spcAft>
+              <a:buClr>
+                <a:schemeClr val="bg2"/>
+              </a:buClr>
+              <a:buFont typeface="Arial" panose="020B0604020202020204" pitchFamily="34" charset="0"/>
+              <a:buChar char="-"/>
+              <a:defRPr sz="1600" kern="1200">
+                <a:solidFill>
+                  <a:schemeClr val="bg2"/>
+                </a:solidFill>
+                <a:latin typeface="+mn-lt"/>
+                <a:ea typeface="+mn-ea"/>
+                <a:cs typeface="+mn-cs"/>
+              </a:defRPr>
+            </a:lvl7pPr>
+            <a:lvl8pPr marL="0" indent="0" algn="l" defTabSz="914400" rtl="0" eaLnBrk="1" latinLnBrk="0" hangingPunct="1">
+              <a:lnSpc>
+                <a:spcPct val="90000"/>
+              </a:lnSpc>
+              <a:spcBef>
+                <a:spcPts val="600"/>
+              </a:spcBef>
+              <a:spcAft>
+                <a:spcPts val="600"/>
+              </a:spcAft>
+              <a:buFont typeface="Arial" panose="020B0604020202020204" pitchFamily="34" charset="0"/>
+              <a:buNone/>
+              <a:defRPr sz="1600" kern="1200">
+                <a:solidFill>
+                  <a:schemeClr val="bg2"/>
+                </a:solidFill>
+                <a:latin typeface="+mn-lt"/>
+                <a:ea typeface="+mn-ea"/>
+                <a:cs typeface="+mn-cs"/>
+              </a:defRPr>
+            </a:lvl8pPr>
+            <a:lvl9pPr marL="0" indent="0" algn="l" defTabSz="914400" rtl="0" eaLnBrk="1" latinLnBrk="0" hangingPunct="1">
+              <a:lnSpc>
+                <a:spcPct val="90000"/>
+              </a:lnSpc>
+              <a:spcBef>
+                <a:spcPts val="600"/>
+              </a:spcBef>
+              <a:spcAft>
+                <a:spcPts val="600"/>
+              </a:spcAft>
+              <a:buFont typeface="Arial" panose="020B0604020202020204" pitchFamily="34" charset="0"/>
+              <a:buNone/>
+              <a:defRPr sz="1800" b="1" kern="1200" baseline="0">
+                <a:solidFill>
+                  <a:schemeClr val="bg2"/>
+                </a:solidFill>
+                <a:latin typeface="+mn-lt"/>
+                <a:ea typeface="+mn-ea"/>
+                <a:cs typeface="+mn-cs"/>
+              </a:defRPr>
+            </a:lvl9pPr>
+          </a:lstStyle>
+          <a:p>
+            <a:pPr lvl="1"/>
+            <a:endParaRPr lang="en-US" dirty="0"/>
+          </a:p>
+          <a:p>
+            <a:pPr marL="180975" lvl="1" indent="0">
+              <a:buFont typeface="Arial" panose="020B0604020202020204" pitchFamily="34" charset="0"/>
+              <a:buNone/>
+            </a:pPr>
+            <a:r>
+              <a:rPr lang="en-US" sz="4400" dirty="0">
+                <a:solidFill>
+                  <a:srgbClr val="FF0000"/>
+                </a:solidFill>
+              </a:rPr>
+              <a:t>Extract</a:t>
+            </a:r>
+          </a:p>
+          <a:p>
+            <a:pPr lvl="1"/>
+            <a:endParaRPr lang="en-US" sz="4400" dirty="0"/>
+          </a:p>
+          <a:p>
+            <a:pPr marL="180975" lvl="1" indent="0">
+              <a:buFont typeface="Arial" panose="020B0604020202020204" pitchFamily="34" charset="0"/>
+              <a:buNone/>
+            </a:pPr>
+            <a:r>
+              <a:rPr lang="en-US" sz="4400" dirty="0">
+                <a:solidFill>
+                  <a:srgbClr val="FFC000"/>
+                </a:solidFill>
+              </a:rPr>
+              <a:t>Load</a:t>
+            </a:r>
+          </a:p>
+          <a:p>
+            <a:pPr lvl="1"/>
+            <a:endParaRPr lang="en-US" sz="4400" dirty="0"/>
+          </a:p>
+          <a:p>
+            <a:pPr marL="180975" lvl="1" indent="0">
+              <a:buFont typeface="Arial" panose="020B0604020202020204" pitchFamily="34" charset="0"/>
+              <a:buNone/>
+            </a:pPr>
+            <a:r>
+              <a:rPr lang="en-US" sz="4400" dirty="0">
+                <a:solidFill>
+                  <a:srgbClr val="00B050"/>
+                </a:solidFill>
+              </a:rPr>
+              <a:t>Transform</a:t>
+            </a:r>
+          </a:p>
+          <a:p>
+            <a:pPr lvl="1"/>
+            <a:endParaRPr lang="en-US" dirty="0"/>
+          </a:p>
+          <a:p>
+            <a:endParaRPr lang="en-US" b="1" dirty="0"/>
+          </a:p>
+          <a:p>
+            <a:endParaRPr lang="en-US" dirty="0"/>
+          </a:p>
+        </p:txBody>
+      </p:sp>
+      <p:pic>
+        <p:nvPicPr>
+          <p:cNvPr id="22" name="Image 21" descr="Une image contenant texte, capture d’écran, machine à sous&#10;&#10;Description générée automatiquement">
+            <a:extLst>
+              <a:ext uri="{FF2B5EF4-FFF2-40B4-BE49-F238E27FC236}">
+                <a16:creationId xmlns:a16="http://schemas.microsoft.com/office/drawing/2014/main" id="{155071A3-6DE4-2B87-ED30-A4FE8416838A}"/>
+              </a:ext>
+            </a:extLst>
+          </p:cNvPr>
+          <p:cNvPicPr>
+            <a:picLocks noChangeAspect="1"/>
+          </p:cNvPicPr>
+          <p:nvPr/>
+        </p:nvPicPr>
+        <p:blipFill>
+          <a:blip r:embed="rId2">
+            <a:extLst>
+              <a:ext uri="{28A0092B-C50C-407E-A947-70E740481C1C}">
+                <a14:useLocalDpi xmlns:a14="http://schemas.microsoft.com/office/drawing/2010/main" val="0"/>
+              </a:ext>
+            </a:extLst>
+          </a:blip>
+          <a:stretch>
+            <a:fillRect/>
+          </a:stretch>
+        </p:blipFill>
+        <p:spPr>
+          <a:xfrm>
+            <a:off x="4121148" y="283281"/>
+            <a:ext cx="7772400" cy="6157355"/>
+          </a:xfrm>
+          <a:prstGeom prst="rect">
+            <a:avLst/>
+          </a:prstGeom>
+        </p:spPr>
+      </p:pic>
+    </p:spTree>
+    <p:extLst>
+      <p:ext uri="{BB962C8B-B14F-4D97-AF65-F5344CB8AC3E}">
+        <p14:creationId xmlns:p14="http://schemas.microsoft.com/office/powerpoint/2010/main" val="3997362487"/>
+      </p:ext>
+    </p:extLst>
+  </p:cSld>
+  <p:clrMapOvr>
+    <a:masterClrMapping/>
+  </p:clrMapOvr>
+  <p:transition spd="slow">
+    <p:wipe dir="r"/>
+  </p:transition>
+</p:sld>
+</file>
+
+<file path=ppt/slides/slide13.xml><?xml version="1.0" encoding="utf-8"?>
+<p:sld xmlns:a="http://schemas.openxmlformats.org/drawingml/2006/main" xmlns:r="http://schemas.openxmlformats.org/officeDocument/2006/relationships" xmlns:p="http://schemas.openxmlformats.org/presentationml/2006/main">
+  <p:cSld>
+    <p:spTree>
+      <p:nvGrpSpPr>
+        <p:cNvPr id="1" name=""/>
+        <p:cNvGrpSpPr/>
+        <p:nvPr/>
+      </p:nvGrpSpPr>
+      <p:grpSpPr>
+        <a:xfrm>
+          <a:off x="0" y="0"/>
+          <a:ext cx="0" cy="0"/>
+          <a:chOff x="0" y="0"/>
+          <a:chExt cx="0" cy="0"/>
+        </a:xfrm>
+      </p:grpSpPr>
+      <p:sp>
+        <p:nvSpPr>
+          <p:cNvPr id="6" name="Tijdelijke aanduiding voor tekst 5"/>
+          <p:cNvSpPr>
+            <a:spLocks noGrp="1"/>
+          </p:cNvSpPr>
+          <p:nvPr>
+            <p:ph type="body" sz="quarter" idx="12"/>
+          </p:nvPr>
+        </p:nvSpPr>
+        <p:spPr/>
+        <p:txBody>
+          <a:bodyPr/>
+          <a:lstStyle/>
+          <a:p>
+            <a:endParaRPr lang="nl-NL" dirty="0"/>
+          </a:p>
+        </p:txBody>
+      </p:sp>
+      <p:sp>
+        <p:nvSpPr>
+          <p:cNvPr id="4" name="Titel 3"/>
+          <p:cNvSpPr>
+            <a:spLocks noGrp="1"/>
+          </p:cNvSpPr>
+          <p:nvPr>
+            <p:ph type="title"/>
+          </p:nvPr>
+        </p:nvSpPr>
+        <p:spPr>
+          <a:xfrm>
+            <a:off x="917575" y="990600"/>
+            <a:ext cx="10798224" cy="1718320"/>
+          </a:xfrm>
+        </p:spPr>
+        <p:txBody>
+          <a:bodyPr/>
+          <a:lstStyle/>
+          <a:p>
+            <a:r>
+              <a:rPr lang="nl-NL" dirty="0"/>
+              <a:t>Extract et Load </a:t>
+            </a:r>
+            <a:r>
+              <a:rPr lang="nl-NL" dirty="0" err="1"/>
+              <a:t>avec</a:t>
+            </a:r>
+            <a:r>
+              <a:rPr lang="nl-NL" dirty="0"/>
+              <a:t> les RDD</a:t>
+            </a:r>
+          </a:p>
+        </p:txBody>
+      </p:sp>
+      <p:sp>
+        <p:nvSpPr>
+          <p:cNvPr id="2" name="Tijdelijke aanduiding voor dianummer 1"/>
+          <p:cNvSpPr>
+            <a:spLocks noGrp="1"/>
+          </p:cNvSpPr>
+          <p:nvPr>
+            <p:ph type="sldNum" sz="quarter" idx="4"/>
+          </p:nvPr>
+        </p:nvSpPr>
+        <p:spPr/>
+        <p:txBody>
+          <a:bodyPr/>
+          <a:lstStyle/>
+          <a:p>
+            <a:fld id="{5EE7099E-8998-4851-915A-4F4831808297}" type="slidenum">
+              <a:rPr lang="nl-NL" smtClean="0"/>
+              <a:pPr/>
+              <a:t>13</a:t>
+            </a:fld>
+            <a:endParaRPr lang="nl-NL"/>
+          </a:p>
+        </p:txBody>
+      </p:sp>
+      <p:sp>
+        <p:nvSpPr>
+          <p:cNvPr id="5" name="Tijdelijke aanduiding voor tekst 19">
+            <a:extLst>
+              <a:ext uri="{FF2B5EF4-FFF2-40B4-BE49-F238E27FC236}">
+                <a16:creationId xmlns:a16="http://schemas.microsoft.com/office/drawing/2014/main" id="{2A74D798-416D-40D6-8906-E31EC4F18491}"/>
+              </a:ext>
+            </a:extLst>
+          </p:cNvPr>
+          <p:cNvSpPr>
+            <a:spLocks noGrp="1"/>
+          </p:cNvSpPr>
+          <p:nvPr>
+            <p:ph type="body" sz="quarter" idx="15" hasCustomPrompt="1"/>
+          </p:nvPr>
+        </p:nvSpPr>
+        <p:spPr>
+          <a:xfrm>
+            <a:off x="549002" y="6444530"/>
+            <a:ext cx="6918325" cy="393700"/>
+          </a:xfrm>
+        </p:spPr>
+        <p:txBody>
+          <a:bodyPr anchor="ctr">
+            <a:normAutofit/>
+          </a:bodyPr>
+          <a:lstStyle>
+            <a:lvl1pPr marL="0" indent="0">
+              <a:buNone/>
+              <a:defRPr sz="1800" baseline="0">
+                <a:solidFill>
+                  <a:schemeClr val="bg1"/>
+                </a:solidFill>
+              </a:defRPr>
+            </a:lvl1pPr>
+          </a:lstStyle>
+          <a:p>
+            <a:pPr lvl="0"/>
+            <a:r>
+              <a:rPr lang="en-GB" dirty="0"/>
+              <a:t>CY Tech – C. Madi Mnemoi, </a:t>
+            </a:r>
+            <a:r>
+              <a:rPr lang="en-GB" dirty="0" err="1"/>
+              <a:t>B.Kerdad</a:t>
+            </a:r>
+            <a:endParaRPr lang="en-GB" dirty="0"/>
+          </a:p>
+        </p:txBody>
+      </p:sp>
+    </p:spTree>
+    <p:extLst>
+      <p:ext uri="{BB962C8B-B14F-4D97-AF65-F5344CB8AC3E}">
+        <p14:creationId xmlns:p14="http://schemas.microsoft.com/office/powerpoint/2010/main" val="947051601"/>
+      </p:ext>
+    </p:extLst>
+  </p:cSld>
+  <p:clrMapOvr>
+    <a:masterClrMapping/>
+  </p:clrMapOvr>
+  <p:transition spd="slow">
+    <p:wipe dir="r"/>
+  </p:transition>
+  <p:timing>
+    <p:tnLst>
+      <p:par>
+        <p:cTn id="1" dur="indefinite" restart="never" nodeType="tmRoot">
+          <p:childTnLst>
+            <p:seq concurrent="1" nextAc="seek">
+              <p:cTn id="2" dur="indefinite" nodeType="mainSeq">
+                <p:childTnLst>
+                  <p:par>
+                    <p:cTn id="3" fill="hold">
+                      <p:stCondLst>
+                        <p:cond delay="indefinite"/>
+                        <p:cond evt="onBegin" delay="0">
+                          <p:tn val="2"/>
+                        </p:cond>
+                      </p:stCondLst>
+                      <p:childTnLst>
+                        <p:par>
+                          <p:cTn id="4" fill="hold">
+                            <p:stCondLst>
+                              <p:cond delay="0"/>
+                            </p:stCondLst>
+                            <p:childTnLst>
+                              <p:par>
+                                <p:cTn id="5" presetID="10" presetClass="entr" presetSubtype="0" fill="hold" grpId="0" nodeType="withEffect">
+                                  <p:stCondLst>
+                                    <p:cond delay="1000"/>
+                                  </p:stCondLst>
+                                  <p:childTnLst>
+                                    <p:set>
+                                      <p:cBhvr>
+                                        <p:cTn id="6" dur="1" fill="hold">
+                                          <p:stCondLst>
+                                            <p:cond delay="0"/>
+                                          </p:stCondLst>
+                                        </p:cTn>
+                                        <p:tgtEl>
+                                          <p:spTgt spid="5">
+                                            <p:txEl>
+                                              <p:pRg st="0" end="0"/>
+                                            </p:txEl>
+                                          </p:spTgt>
+                                        </p:tgtEl>
+                                        <p:attrNameLst>
+                                          <p:attrName>style.visibility</p:attrName>
+                                        </p:attrNameLst>
+                                      </p:cBhvr>
+                                      <p:to>
+                                        <p:strVal val="visible"/>
+                                      </p:to>
+                                    </p:set>
+                                    <p:animEffect transition="in" filter="fade">
+                                      <p:cBhvr>
+                                        <p:cTn id="7" dur="750"/>
+                                        <p:tgtEl>
+                                          <p:spTgt spid="5">
+                                            <p:txEl>
+                                              <p:pRg st="0" end="0"/>
+                                            </p:txEl>
+                                          </p:spTgt>
+                                        </p:tgtEl>
+                                      </p:cBhvr>
+                                    </p:animEffect>
+                                  </p:childTnLst>
+                                </p:cTn>
+                              </p:par>
+                            </p:childTnLst>
+                          </p:cTn>
+                        </p:par>
+                      </p:childTnLst>
+                    </p:cTn>
+                  </p:par>
+                </p:childTnLst>
+              </p:cTn>
+              <p:prevCondLst>
+                <p:cond evt="onPrev" delay="0">
+                  <p:tgtEl>
+                    <p:sldTgt/>
+                  </p:tgtEl>
+                </p:cond>
+              </p:prevCondLst>
+              <p:nextCondLst>
+                <p:cond evt="onNext" delay="0">
+                  <p:tgtEl>
+                    <p:sldTgt/>
+                  </p:tgtEl>
+                </p:cond>
+              </p:nextCondLst>
+            </p:seq>
+          </p:childTnLst>
+        </p:cTn>
+      </p:par>
+    </p:tnLst>
+    <p:bldLst>
+      <p:bldP spid="5" grpId="0" build="p">
+        <p:tmplLst>
+          <p:tmpl lvl="1">
+            <p:tnLst>
+              <p:par>
+                <p:cTn presetID="10" presetClass="entr" presetSubtype="0" fill="hold" nodeType="withEffect">
+                  <p:stCondLst>
+                    <p:cond delay="1000"/>
+                  </p:stCondLst>
+                  <p:childTnLst>
+                    <p:set>
+                      <p:cBhvr>
+                        <p:cTn dur="1" fill="hold">
+                          <p:stCondLst>
+                            <p:cond delay="0"/>
+                          </p:stCondLst>
+                        </p:cTn>
+                        <p:tgtEl>
+                          <p:spTgt spid="5"/>
+                        </p:tgtEl>
+                        <p:attrNameLst>
+                          <p:attrName>style.visibility</p:attrName>
+                        </p:attrNameLst>
+                      </p:cBhvr>
+                      <p:to>
+                        <p:strVal val="visible"/>
+                      </p:to>
+                    </p:set>
+                    <p:animEffect transition="in" filter="fade">
+                      <p:cBhvr>
+                        <p:cTn dur="750"/>
+                        <p:tgtEl>
+                          <p:spTgt spid="5"/>
+                        </p:tgtEl>
+                      </p:cBhvr>
+                    </p:animEffect>
+                  </p:childTnLst>
+                </p:cTn>
+              </p:par>
+            </p:tnLst>
+          </p:tmpl>
+        </p:tmplLst>
+      </p:bldP>
+    </p:bldLst>
+  </p:timing>
+</p:sld>
+</file>
+
+<file path=ppt/slides/slide14.xml><?xml version="1.0" encoding="utf-8"?>
+<p:sld xmlns:a="http://schemas.openxmlformats.org/drawingml/2006/main" xmlns:r="http://schemas.openxmlformats.org/officeDocument/2006/relationships" xmlns:p="http://schemas.openxmlformats.org/presentationml/2006/main">
+  <p:cSld>
+    <p:spTree>
+      <p:nvGrpSpPr>
+        <p:cNvPr id="1" name=""/>
+        <p:cNvGrpSpPr/>
+        <p:nvPr/>
+      </p:nvGrpSpPr>
+      <p:grpSpPr>
+        <a:xfrm>
+          <a:off x="0" y="0"/>
+          <a:ext cx="0" cy="0"/>
+          <a:chOff x="0" y="0"/>
+          <a:chExt cx="0" cy="0"/>
+        </a:xfrm>
+      </p:grpSpPr>
+      <p:sp>
+        <p:nvSpPr>
+          <p:cNvPr id="2" name="Title 1">
+            <a:extLst>
+              <a:ext uri="{FF2B5EF4-FFF2-40B4-BE49-F238E27FC236}">
+                <a16:creationId xmlns:a16="http://schemas.microsoft.com/office/drawing/2014/main" id="{04C5DF06-5F42-4296-B27B-4F79E0DB836B}"/>
+              </a:ext>
+            </a:extLst>
+          </p:cNvPr>
+          <p:cNvSpPr>
+            <a:spLocks noGrp="1"/>
+          </p:cNvSpPr>
+          <p:nvPr>
+            <p:ph type="title"/>
+          </p:nvPr>
+        </p:nvSpPr>
+        <p:spPr/>
+        <p:txBody>
+          <a:bodyPr/>
+          <a:lstStyle/>
+          <a:p>
+            <a:r>
+              <a:rPr lang="en-US" dirty="0"/>
+              <a:t>Extract et Load avec les RDD</a:t>
+            </a:r>
+          </a:p>
+        </p:txBody>
+      </p:sp>
+      <p:sp>
+        <p:nvSpPr>
+          <p:cNvPr id="5" name="Slide Number Placeholder 4">
+            <a:extLst>
+              <a:ext uri="{FF2B5EF4-FFF2-40B4-BE49-F238E27FC236}">
+                <a16:creationId xmlns:a16="http://schemas.microsoft.com/office/drawing/2014/main" id="{B756D4B6-3814-4E02-AB98-08D3B49675BF}"/>
+              </a:ext>
+            </a:extLst>
+          </p:cNvPr>
+          <p:cNvSpPr>
+            <a:spLocks noGrp="1"/>
+          </p:cNvSpPr>
+          <p:nvPr>
+            <p:ph type="sldNum" sz="quarter" idx="4"/>
+          </p:nvPr>
+        </p:nvSpPr>
+        <p:spPr/>
+        <p:txBody>
+          <a:bodyPr/>
+          <a:lstStyle/>
+          <a:p>
+            <a:fld id="{5EE7099E-8998-4851-915A-4F4831808297}" type="slidenum">
+              <a:rPr lang="nl-NL" smtClean="0"/>
+              <a:pPr/>
+              <a:t>14</a:t>
+            </a:fld>
+            <a:endParaRPr lang="nl-NL"/>
+          </a:p>
+        </p:txBody>
+      </p:sp>
+      <p:sp>
+        <p:nvSpPr>
+          <p:cNvPr id="3" name="ZoneTexte 2">
+            <a:extLst>
+              <a:ext uri="{FF2B5EF4-FFF2-40B4-BE49-F238E27FC236}">
+                <a16:creationId xmlns:a16="http://schemas.microsoft.com/office/drawing/2014/main" id="{0C248AA7-6FCB-3F89-E3DD-C837A2826405}"/>
+              </a:ext>
+            </a:extLst>
+          </p:cNvPr>
+          <p:cNvSpPr txBox="1"/>
+          <p:nvPr/>
+        </p:nvSpPr>
+        <p:spPr>
+          <a:xfrm>
+            <a:off x="3692106" y="1699404"/>
+            <a:ext cx="0" cy="0"/>
+          </a:xfrm>
+          <a:prstGeom prst="rect">
+            <a:avLst/>
+          </a:prstGeom>
+          <a:noFill/>
+        </p:spPr>
+        <p:txBody>
+          <a:bodyPr wrap="none" lIns="108000" tIns="108000" rIns="108000" bIns="108000" rtlCol="0">
+            <a:noAutofit/>
+          </a:bodyPr>
+          <a:lstStyle/>
+          <a:p>
+            <a:endParaRPr lang="fr-FR" noProof="0" dirty="0" err="1">
+              <a:solidFill>
+                <a:schemeClr val="bg2"/>
+              </a:solidFill>
+            </a:endParaRPr>
+          </a:p>
+        </p:txBody>
+      </p:sp>
+      <p:sp>
+        <p:nvSpPr>
+          <p:cNvPr id="4" name="ZoneTexte 3">
+            <a:extLst>
+              <a:ext uri="{FF2B5EF4-FFF2-40B4-BE49-F238E27FC236}">
+                <a16:creationId xmlns:a16="http://schemas.microsoft.com/office/drawing/2014/main" id="{5BF910A1-61B1-D0D5-B870-C1DDAE0DAA61}"/>
+              </a:ext>
+            </a:extLst>
+          </p:cNvPr>
+          <p:cNvSpPr txBox="1"/>
+          <p:nvPr/>
+        </p:nvSpPr>
+        <p:spPr>
+          <a:xfrm>
+            <a:off x="307975" y="1049116"/>
+            <a:ext cx="11389024" cy="5404220"/>
+          </a:xfrm>
+          <a:prstGeom prst="rect">
+            <a:avLst/>
+          </a:prstGeom>
+          <a:noFill/>
+        </p:spPr>
+        <p:txBody>
+          <a:bodyPr wrap="square" lIns="108000" tIns="108000" rIns="108000" bIns="108000" rtlCol="0">
+            <a:noAutofit/>
+          </a:bodyPr>
+          <a:lstStyle/>
+          <a:p>
+            <a:r>
+              <a:rPr lang="fr-FR" b="0" dirty="0" err="1">
+                <a:solidFill>
+                  <a:srgbClr val="0000FF"/>
+                </a:solidFill>
+                <a:effectLst/>
+                <a:latin typeface="Menlo" panose="020B0609030804020204" pitchFamily="49" charset="0"/>
+              </a:rPr>
+              <a:t>def</a:t>
+            </a:r>
+            <a:r>
+              <a:rPr lang="fr-FR" b="0" dirty="0">
+                <a:solidFill>
+                  <a:srgbClr val="000000"/>
+                </a:solidFill>
+                <a:effectLst/>
+                <a:latin typeface="Menlo" panose="020B0609030804020204" pitchFamily="49" charset="0"/>
+              </a:rPr>
+              <a:t> </a:t>
+            </a:r>
+            <a:r>
+              <a:rPr lang="fr-FR" b="0" dirty="0" err="1">
+                <a:solidFill>
+                  <a:srgbClr val="795E26"/>
+                </a:solidFill>
+                <a:effectLst/>
+                <a:latin typeface="Menlo" panose="020B0609030804020204" pitchFamily="49" charset="0"/>
+              </a:rPr>
+              <a:t>extract</a:t>
+            </a:r>
+            <a:r>
+              <a:rPr lang="fr-FR" b="0" dirty="0">
+                <a:solidFill>
+                  <a:srgbClr val="000000"/>
+                </a:solidFill>
+                <a:effectLst/>
+                <a:latin typeface="Menlo" panose="020B0609030804020204" pitchFamily="49" charset="0"/>
+              </a:rPr>
+              <a:t>(</a:t>
+            </a:r>
+            <a:r>
+              <a:rPr lang="fr-FR" b="0" dirty="0" err="1">
+                <a:solidFill>
+                  <a:srgbClr val="001080"/>
+                </a:solidFill>
+                <a:effectLst/>
+                <a:latin typeface="Menlo" panose="020B0609030804020204" pitchFamily="49" charset="0"/>
+              </a:rPr>
+              <a:t>spark</a:t>
+            </a:r>
+            <a:r>
+              <a:rPr lang="fr-FR" b="0" dirty="0">
+                <a:solidFill>
+                  <a:srgbClr val="000000"/>
+                </a:solidFill>
+                <a:effectLst/>
+                <a:latin typeface="Menlo" panose="020B0609030804020204" pitchFamily="49" charset="0"/>
+              </a:rPr>
+              <a:t>: </a:t>
+            </a:r>
+            <a:r>
+              <a:rPr lang="fr-FR" b="0" dirty="0" err="1">
+                <a:solidFill>
+                  <a:srgbClr val="267F99"/>
+                </a:solidFill>
+                <a:effectLst/>
+                <a:latin typeface="Menlo" panose="020B0609030804020204" pitchFamily="49" charset="0"/>
+              </a:rPr>
+              <a:t>SparkContext</a:t>
+            </a:r>
+            <a:r>
+              <a:rPr lang="fr-FR" b="0" dirty="0">
+                <a:solidFill>
+                  <a:srgbClr val="000000"/>
+                </a:solidFill>
+                <a:effectLst/>
+                <a:latin typeface="Menlo" panose="020B0609030804020204" pitchFamily="49" charset="0"/>
+              </a:rPr>
+              <a:t>): </a:t>
+            </a:r>
+            <a:r>
+              <a:rPr lang="fr-FR" b="0" dirty="0">
+                <a:solidFill>
+                  <a:srgbClr val="267F99"/>
+                </a:solidFill>
+                <a:effectLst/>
+                <a:latin typeface="Menlo" panose="020B0609030804020204" pitchFamily="49" charset="0"/>
+              </a:rPr>
+              <a:t>RDD</a:t>
+            </a:r>
+            <a:r>
+              <a:rPr lang="fr-FR" b="0" dirty="0">
+                <a:solidFill>
+                  <a:srgbClr val="000000"/>
+                </a:solidFill>
+                <a:effectLst/>
+                <a:latin typeface="Menlo" panose="020B0609030804020204" pitchFamily="49" charset="0"/>
+              </a:rPr>
+              <a:t>[</a:t>
+            </a:r>
+            <a:r>
+              <a:rPr lang="fr-FR" b="0" dirty="0">
+                <a:solidFill>
+                  <a:srgbClr val="267F99"/>
+                </a:solidFill>
+                <a:effectLst/>
+                <a:latin typeface="Menlo" panose="020B0609030804020204" pitchFamily="49" charset="0"/>
+              </a:rPr>
+              <a:t>String</a:t>
+            </a:r>
+            <a:r>
+              <a:rPr lang="fr-FR" b="0" dirty="0">
+                <a:solidFill>
+                  <a:srgbClr val="000000"/>
+                </a:solidFill>
+                <a:effectLst/>
+                <a:latin typeface="Menlo" panose="020B0609030804020204" pitchFamily="49" charset="0"/>
+              </a:rPr>
+              <a:t>] = {</a:t>
+            </a:r>
+          </a:p>
+          <a:p>
+            <a:pPr lvl="1"/>
+            <a:r>
+              <a:rPr lang="fr-FR" b="0" dirty="0">
+                <a:solidFill>
+                  <a:srgbClr val="008000"/>
+                </a:solidFill>
+                <a:effectLst/>
+                <a:latin typeface="Menlo" panose="020B0609030804020204" pitchFamily="49" charset="0"/>
+              </a:rPr>
+              <a:t>// </a:t>
+            </a:r>
+            <a:r>
+              <a:rPr lang="fr-FR" b="0" dirty="0" err="1">
+                <a:solidFill>
+                  <a:srgbClr val="008000"/>
+                </a:solidFill>
+                <a:effectLst/>
+                <a:latin typeface="Menlo" panose="020B0609030804020204" pitchFamily="49" charset="0"/>
+              </a:rPr>
+              <a:t>load</a:t>
+            </a:r>
+            <a:r>
+              <a:rPr lang="fr-FR" b="0" dirty="0">
+                <a:solidFill>
+                  <a:srgbClr val="008000"/>
+                </a:solidFill>
+                <a:effectLst/>
+                <a:latin typeface="Menlo" panose="020B0609030804020204" pitchFamily="49" charset="0"/>
+              </a:rPr>
+              <a:t> </a:t>
+            </a:r>
+            <a:r>
+              <a:rPr lang="fr-FR" b="0" dirty="0" err="1">
+                <a:solidFill>
+                  <a:srgbClr val="008000"/>
+                </a:solidFill>
+                <a:effectLst/>
+                <a:latin typeface="Menlo" panose="020B0609030804020204" pitchFamily="49" charset="0"/>
+              </a:rPr>
+              <a:t>titanic</a:t>
+            </a:r>
+            <a:r>
+              <a:rPr lang="fr-FR" b="0" dirty="0">
+                <a:solidFill>
+                  <a:srgbClr val="008000"/>
+                </a:solidFill>
+                <a:effectLst/>
+                <a:latin typeface="Menlo" panose="020B0609030804020204" pitchFamily="49" charset="0"/>
+              </a:rPr>
+              <a:t> files as </a:t>
+            </a:r>
+            <a:r>
+              <a:rPr lang="fr-FR" b="0" dirty="0" err="1">
+                <a:solidFill>
+                  <a:srgbClr val="008000"/>
+                </a:solidFill>
+                <a:effectLst/>
+                <a:latin typeface="Menlo" panose="020B0609030804020204" pitchFamily="49" charset="0"/>
+              </a:rPr>
+              <a:t>RDDs</a:t>
+            </a:r>
+            <a:endParaRPr lang="fr-FR" b="0" dirty="0">
+              <a:solidFill>
+                <a:srgbClr val="000000"/>
+              </a:solidFill>
+              <a:effectLst/>
+              <a:latin typeface="Menlo" panose="020B0609030804020204" pitchFamily="49" charset="0"/>
+            </a:endParaRPr>
+          </a:p>
+          <a:p>
+            <a:pPr lvl="1"/>
+            <a:r>
+              <a:rPr lang="fr-FR" b="0" dirty="0">
+                <a:solidFill>
+                  <a:srgbClr val="0000FF"/>
+                </a:solidFill>
+                <a:effectLst/>
+                <a:latin typeface="Menlo" panose="020B0609030804020204" pitchFamily="49" charset="0"/>
+              </a:rPr>
+              <a:t>val</a:t>
+            </a:r>
+            <a:r>
+              <a:rPr lang="fr-FR" b="0" dirty="0">
+                <a:solidFill>
+                  <a:srgbClr val="000000"/>
+                </a:solidFill>
+                <a:effectLst/>
+                <a:latin typeface="Menlo" panose="020B0609030804020204" pitchFamily="49" charset="0"/>
+              </a:rPr>
+              <a:t> </a:t>
+            </a:r>
+            <a:r>
+              <a:rPr lang="fr-FR" b="0" dirty="0">
+                <a:solidFill>
+                  <a:srgbClr val="001080"/>
+                </a:solidFill>
+                <a:effectLst/>
+                <a:latin typeface="Menlo" panose="020B0609030804020204" pitchFamily="49" charset="0"/>
+              </a:rPr>
+              <a:t>titanicPart1</a:t>
+            </a:r>
+            <a:r>
+              <a:rPr lang="fr-FR" b="0" dirty="0">
+                <a:solidFill>
+                  <a:srgbClr val="000000"/>
+                </a:solidFill>
+                <a:effectLst/>
+                <a:latin typeface="Menlo" panose="020B0609030804020204" pitchFamily="49" charset="0"/>
+              </a:rPr>
+              <a:t> = </a:t>
+            </a:r>
+            <a:r>
+              <a:rPr lang="fr-FR" b="0" dirty="0" err="1">
+                <a:solidFill>
+                  <a:srgbClr val="000000"/>
+                </a:solidFill>
+                <a:effectLst/>
+                <a:latin typeface="Menlo" panose="020B0609030804020204" pitchFamily="49" charset="0"/>
+              </a:rPr>
+              <a:t>spark.textFile</a:t>
+            </a:r>
+            <a:r>
+              <a:rPr lang="fr-FR" b="0" dirty="0">
+                <a:solidFill>
+                  <a:srgbClr val="000000"/>
+                </a:solidFill>
+                <a:effectLst/>
+                <a:latin typeface="Menlo" panose="020B0609030804020204" pitchFamily="49" charset="0"/>
+              </a:rPr>
+              <a:t>(</a:t>
+            </a:r>
+            <a:r>
+              <a:rPr lang="fr-FR" b="0" dirty="0">
+                <a:solidFill>
+                  <a:srgbClr val="A31515"/>
+                </a:solidFill>
+                <a:effectLst/>
+                <a:latin typeface="Menlo" panose="020B0609030804020204" pitchFamily="49" charset="0"/>
+              </a:rPr>
+              <a:t>"data/titanic_part_1.txt"</a:t>
+            </a:r>
+            <a:r>
+              <a:rPr lang="fr-FR" b="0" dirty="0">
+                <a:solidFill>
+                  <a:srgbClr val="000000"/>
+                </a:solidFill>
+                <a:effectLst/>
+                <a:latin typeface="Menlo" panose="020B0609030804020204" pitchFamily="49" charset="0"/>
+              </a:rPr>
+              <a:t>)</a:t>
+            </a:r>
+          </a:p>
+          <a:p>
+            <a:pPr lvl="1"/>
+            <a:r>
+              <a:rPr lang="fr-FR" b="0" dirty="0">
+                <a:solidFill>
+                  <a:srgbClr val="0000FF"/>
+                </a:solidFill>
+                <a:effectLst/>
+                <a:latin typeface="Menlo" panose="020B0609030804020204" pitchFamily="49" charset="0"/>
+              </a:rPr>
+              <a:t>val</a:t>
+            </a:r>
+            <a:r>
+              <a:rPr lang="fr-FR" b="0" dirty="0">
+                <a:solidFill>
+                  <a:srgbClr val="000000"/>
+                </a:solidFill>
+                <a:effectLst/>
+                <a:latin typeface="Menlo" panose="020B0609030804020204" pitchFamily="49" charset="0"/>
+              </a:rPr>
+              <a:t> </a:t>
+            </a:r>
+            <a:r>
+              <a:rPr lang="fr-FR" b="0" dirty="0">
+                <a:solidFill>
+                  <a:srgbClr val="001080"/>
+                </a:solidFill>
+                <a:effectLst/>
+                <a:latin typeface="Menlo" panose="020B0609030804020204" pitchFamily="49" charset="0"/>
+              </a:rPr>
+              <a:t>titanicPart2</a:t>
+            </a:r>
+            <a:r>
+              <a:rPr lang="fr-FR" b="0" dirty="0">
+                <a:solidFill>
+                  <a:srgbClr val="000000"/>
+                </a:solidFill>
+                <a:effectLst/>
+                <a:latin typeface="Menlo" panose="020B0609030804020204" pitchFamily="49" charset="0"/>
+              </a:rPr>
+              <a:t> = </a:t>
+            </a:r>
+            <a:r>
+              <a:rPr lang="fr-FR" b="0" dirty="0" err="1">
+                <a:solidFill>
+                  <a:srgbClr val="000000"/>
+                </a:solidFill>
+                <a:effectLst/>
+                <a:latin typeface="Menlo" panose="020B0609030804020204" pitchFamily="49" charset="0"/>
+              </a:rPr>
+              <a:t>spark.textFile</a:t>
+            </a:r>
+            <a:r>
+              <a:rPr lang="fr-FR" b="0" dirty="0">
+                <a:solidFill>
+                  <a:srgbClr val="000000"/>
+                </a:solidFill>
+                <a:effectLst/>
+                <a:latin typeface="Menlo" panose="020B0609030804020204" pitchFamily="49" charset="0"/>
+              </a:rPr>
+              <a:t>(</a:t>
+            </a:r>
+            <a:r>
+              <a:rPr lang="fr-FR" b="0" dirty="0">
+                <a:solidFill>
+                  <a:srgbClr val="A31515"/>
+                </a:solidFill>
+                <a:effectLst/>
+                <a:latin typeface="Menlo" panose="020B0609030804020204" pitchFamily="49" charset="0"/>
+              </a:rPr>
+              <a:t>"data/titanic_part_2.txt"</a:t>
+            </a:r>
+            <a:r>
+              <a:rPr lang="fr-FR" b="0" dirty="0">
+                <a:solidFill>
+                  <a:srgbClr val="000000"/>
+                </a:solidFill>
+                <a:effectLst/>
+                <a:latin typeface="Menlo" panose="020B0609030804020204" pitchFamily="49" charset="0"/>
+              </a:rPr>
+              <a:t>)</a:t>
+            </a:r>
+          </a:p>
+          <a:p>
+            <a:pPr lvl="1"/>
+            <a:r>
+              <a:rPr lang="fr-FR" b="0" dirty="0">
+                <a:solidFill>
+                  <a:srgbClr val="0000FF"/>
+                </a:solidFill>
+                <a:effectLst/>
+                <a:latin typeface="Menlo" panose="020B0609030804020204" pitchFamily="49" charset="0"/>
+              </a:rPr>
+              <a:t>val</a:t>
+            </a:r>
+            <a:r>
+              <a:rPr lang="fr-FR" b="0" dirty="0">
+                <a:solidFill>
+                  <a:srgbClr val="000000"/>
+                </a:solidFill>
+                <a:effectLst/>
+                <a:latin typeface="Menlo" panose="020B0609030804020204" pitchFamily="49" charset="0"/>
+              </a:rPr>
+              <a:t> </a:t>
+            </a:r>
+            <a:r>
+              <a:rPr lang="fr-FR" b="0" dirty="0">
+                <a:solidFill>
+                  <a:srgbClr val="001080"/>
+                </a:solidFill>
+                <a:effectLst/>
+                <a:latin typeface="Menlo" panose="020B0609030804020204" pitchFamily="49" charset="0"/>
+              </a:rPr>
+              <a:t>titanicPart3</a:t>
+            </a:r>
+            <a:r>
+              <a:rPr lang="fr-FR" b="0" dirty="0">
+                <a:solidFill>
+                  <a:srgbClr val="000000"/>
+                </a:solidFill>
+                <a:effectLst/>
+                <a:latin typeface="Menlo" panose="020B0609030804020204" pitchFamily="49" charset="0"/>
+              </a:rPr>
+              <a:t> = </a:t>
+            </a:r>
+            <a:r>
+              <a:rPr lang="fr-FR" b="0" dirty="0" err="1">
+                <a:solidFill>
+                  <a:srgbClr val="000000"/>
+                </a:solidFill>
+                <a:effectLst/>
+                <a:latin typeface="Menlo" panose="020B0609030804020204" pitchFamily="49" charset="0"/>
+              </a:rPr>
+              <a:t>spark.textFile</a:t>
+            </a:r>
+            <a:r>
+              <a:rPr lang="fr-FR" b="0" dirty="0">
+                <a:solidFill>
+                  <a:srgbClr val="000000"/>
+                </a:solidFill>
+                <a:effectLst/>
+                <a:latin typeface="Menlo" panose="020B0609030804020204" pitchFamily="49" charset="0"/>
+              </a:rPr>
+              <a:t>(</a:t>
+            </a:r>
+            <a:r>
+              <a:rPr lang="fr-FR" b="0" dirty="0">
+                <a:solidFill>
+                  <a:srgbClr val="A31515"/>
+                </a:solidFill>
+                <a:effectLst/>
+                <a:latin typeface="Menlo" panose="020B0609030804020204" pitchFamily="49" charset="0"/>
+              </a:rPr>
+              <a:t>"data/titanic_part_3.gz"</a:t>
+            </a:r>
+            <a:r>
+              <a:rPr lang="fr-FR" b="0" dirty="0">
+                <a:solidFill>
+                  <a:srgbClr val="000000"/>
+                </a:solidFill>
+                <a:effectLst/>
+                <a:latin typeface="Menlo" panose="020B0609030804020204" pitchFamily="49" charset="0"/>
+              </a:rPr>
+              <a:t>)</a:t>
+            </a:r>
+          </a:p>
+          <a:p>
+            <a:pPr lvl="1"/>
+            <a:br>
+              <a:rPr lang="fr-FR" b="0" dirty="0">
+                <a:solidFill>
+                  <a:srgbClr val="000000"/>
+                </a:solidFill>
+                <a:effectLst/>
+                <a:latin typeface="Menlo" panose="020B0609030804020204" pitchFamily="49" charset="0"/>
+              </a:rPr>
+            </a:br>
+            <a:r>
+              <a:rPr lang="fr-FR" b="0" dirty="0">
+                <a:solidFill>
+                  <a:srgbClr val="008000"/>
+                </a:solidFill>
+                <a:effectLst/>
+                <a:latin typeface="Menlo" panose="020B0609030804020204" pitchFamily="49" charset="0"/>
+              </a:rPr>
+              <a:t>// combine </a:t>
+            </a:r>
+            <a:r>
+              <a:rPr lang="fr-FR" b="0" dirty="0" err="1">
+                <a:solidFill>
+                  <a:srgbClr val="008000"/>
+                </a:solidFill>
+                <a:effectLst/>
+                <a:latin typeface="Menlo" panose="020B0609030804020204" pitchFamily="49" charset="0"/>
+              </a:rPr>
+              <a:t>RDDs</a:t>
+            </a:r>
+            <a:r>
+              <a:rPr lang="fr-FR" b="0" dirty="0">
+                <a:solidFill>
+                  <a:srgbClr val="008000"/>
+                </a:solidFill>
+                <a:effectLst/>
+                <a:latin typeface="Menlo" panose="020B0609030804020204" pitchFamily="49" charset="0"/>
+              </a:rPr>
+              <a:t> </a:t>
+            </a:r>
+            <a:r>
+              <a:rPr lang="fr-FR" b="0" dirty="0" err="1">
+                <a:solidFill>
+                  <a:srgbClr val="008000"/>
+                </a:solidFill>
+                <a:effectLst/>
+                <a:latin typeface="Menlo" panose="020B0609030804020204" pitchFamily="49" charset="0"/>
+              </a:rPr>
+              <a:t>into</a:t>
+            </a:r>
+            <a:r>
+              <a:rPr lang="fr-FR" b="0" dirty="0">
+                <a:solidFill>
+                  <a:srgbClr val="008000"/>
+                </a:solidFill>
+                <a:effectLst/>
+                <a:latin typeface="Menlo" panose="020B0609030804020204" pitchFamily="49" charset="0"/>
+              </a:rPr>
+              <a:t> one</a:t>
+            </a:r>
+            <a:endParaRPr lang="fr-FR" b="0" dirty="0">
+              <a:solidFill>
+                <a:srgbClr val="000000"/>
+              </a:solidFill>
+              <a:effectLst/>
+              <a:latin typeface="Menlo" panose="020B0609030804020204" pitchFamily="49" charset="0"/>
+            </a:endParaRPr>
+          </a:p>
+          <a:p>
+            <a:pPr lvl="1"/>
+            <a:r>
+              <a:rPr lang="fr-FR" b="0" dirty="0">
+                <a:solidFill>
+                  <a:srgbClr val="0000FF"/>
+                </a:solidFill>
+                <a:effectLst/>
+                <a:latin typeface="Menlo" panose="020B0609030804020204" pitchFamily="49" charset="0"/>
+              </a:rPr>
+              <a:t>val</a:t>
+            </a:r>
+            <a:r>
+              <a:rPr lang="fr-FR" b="0" dirty="0">
+                <a:solidFill>
+                  <a:srgbClr val="000000"/>
+                </a:solidFill>
+                <a:effectLst/>
+                <a:latin typeface="Menlo" panose="020B0609030804020204" pitchFamily="49" charset="0"/>
+              </a:rPr>
+              <a:t> </a:t>
+            </a:r>
+            <a:r>
+              <a:rPr lang="fr-FR" b="0" dirty="0" err="1">
+                <a:solidFill>
+                  <a:srgbClr val="001080"/>
+                </a:solidFill>
+                <a:effectLst/>
+                <a:latin typeface="Menlo" panose="020B0609030804020204" pitchFamily="49" charset="0"/>
+              </a:rPr>
+              <a:t>titanic</a:t>
+            </a:r>
+            <a:r>
+              <a:rPr lang="fr-FR" b="0" dirty="0">
+                <a:solidFill>
+                  <a:srgbClr val="000000"/>
+                </a:solidFill>
+                <a:effectLst/>
+                <a:latin typeface="Menlo" panose="020B0609030804020204" pitchFamily="49" charset="0"/>
+              </a:rPr>
+              <a:t> = titanicPart1.union(titanicPart2).union(titanicPart3)</a:t>
+            </a:r>
+          </a:p>
+          <a:p>
+            <a:pPr lvl="1"/>
+            <a:br>
+              <a:rPr lang="fr-FR" b="0" dirty="0">
+                <a:solidFill>
+                  <a:srgbClr val="000000"/>
+                </a:solidFill>
+                <a:effectLst/>
+                <a:latin typeface="Menlo" panose="020B0609030804020204" pitchFamily="49" charset="0"/>
+              </a:rPr>
+            </a:br>
+            <a:r>
+              <a:rPr lang="fr-FR" b="0" dirty="0" err="1">
+                <a:solidFill>
+                  <a:srgbClr val="000000"/>
+                </a:solidFill>
+                <a:effectLst/>
+                <a:latin typeface="Menlo" panose="020B0609030804020204" pitchFamily="49" charset="0"/>
+              </a:rPr>
+              <a:t>titanic</a:t>
+            </a:r>
+            <a:endParaRPr lang="fr-FR" b="0" dirty="0">
+              <a:solidFill>
+                <a:srgbClr val="000000"/>
+              </a:solidFill>
+              <a:effectLst/>
+              <a:latin typeface="Menlo" panose="020B0609030804020204" pitchFamily="49" charset="0"/>
+            </a:endParaRPr>
+          </a:p>
+          <a:p>
+            <a:r>
+              <a:rPr lang="fr-FR" b="0" dirty="0">
+                <a:solidFill>
+                  <a:srgbClr val="000000"/>
+                </a:solidFill>
+                <a:effectLst/>
+                <a:latin typeface="Menlo" panose="020B0609030804020204" pitchFamily="49" charset="0"/>
+              </a:rPr>
+              <a:t>}</a:t>
+            </a:r>
+          </a:p>
+          <a:p>
+            <a:br>
+              <a:rPr lang="fr-FR" b="0" dirty="0">
+                <a:solidFill>
+                  <a:srgbClr val="000000"/>
+                </a:solidFill>
+                <a:effectLst/>
+                <a:latin typeface="Menlo" panose="020B0609030804020204" pitchFamily="49" charset="0"/>
+              </a:rPr>
+            </a:br>
+            <a:r>
+              <a:rPr lang="fr-FR" b="0" dirty="0" err="1">
+                <a:solidFill>
+                  <a:srgbClr val="0000FF"/>
+                </a:solidFill>
+                <a:effectLst/>
+                <a:latin typeface="Menlo" panose="020B0609030804020204" pitchFamily="49" charset="0"/>
+              </a:rPr>
+              <a:t>def</a:t>
+            </a:r>
+            <a:r>
+              <a:rPr lang="fr-FR" b="0" dirty="0">
+                <a:solidFill>
+                  <a:srgbClr val="000000"/>
+                </a:solidFill>
+                <a:effectLst/>
+                <a:latin typeface="Menlo" panose="020B0609030804020204" pitchFamily="49" charset="0"/>
+              </a:rPr>
+              <a:t> </a:t>
+            </a:r>
+            <a:r>
+              <a:rPr lang="fr-FR" b="0" dirty="0" err="1">
+                <a:solidFill>
+                  <a:srgbClr val="795E26"/>
+                </a:solidFill>
+                <a:effectLst/>
+                <a:latin typeface="Menlo" panose="020B0609030804020204" pitchFamily="49" charset="0"/>
+              </a:rPr>
+              <a:t>load</a:t>
+            </a:r>
+            <a:r>
+              <a:rPr lang="fr-FR" b="0" dirty="0">
+                <a:solidFill>
+                  <a:srgbClr val="000000"/>
+                </a:solidFill>
+                <a:effectLst/>
+                <a:latin typeface="Menlo" panose="020B0609030804020204" pitchFamily="49" charset="0"/>
+              </a:rPr>
+              <a:t>(</a:t>
+            </a:r>
+            <a:r>
+              <a:rPr lang="fr-FR" b="0" dirty="0" err="1">
+                <a:solidFill>
+                  <a:srgbClr val="001080"/>
+                </a:solidFill>
+                <a:effectLst/>
+                <a:latin typeface="Menlo" panose="020B0609030804020204" pitchFamily="49" charset="0"/>
+              </a:rPr>
+              <a:t>titanic</a:t>
+            </a:r>
+            <a:r>
+              <a:rPr lang="fr-FR" b="0" dirty="0">
+                <a:solidFill>
+                  <a:srgbClr val="000000"/>
+                </a:solidFill>
+                <a:effectLst/>
+                <a:latin typeface="Menlo" panose="020B0609030804020204" pitchFamily="49" charset="0"/>
+              </a:rPr>
+              <a:t>: </a:t>
+            </a:r>
+            <a:r>
+              <a:rPr lang="fr-FR" b="0" dirty="0">
+                <a:solidFill>
+                  <a:srgbClr val="267F99"/>
+                </a:solidFill>
+                <a:effectLst/>
+                <a:latin typeface="Menlo" panose="020B0609030804020204" pitchFamily="49" charset="0"/>
+              </a:rPr>
+              <a:t>RDD</a:t>
+            </a:r>
+            <a:r>
+              <a:rPr lang="fr-FR" b="0" dirty="0">
+                <a:solidFill>
+                  <a:srgbClr val="000000"/>
+                </a:solidFill>
+                <a:effectLst/>
+                <a:latin typeface="Menlo" panose="020B0609030804020204" pitchFamily="49" charset="0"/>
+              </a:rPr>
+              <a:t>[</a:t>
+            </a:r>
+            <a:r>
+              <a:rPr lang="fr-FR" b="0" dirty="0">
+                <a:solidFill>
+                  <a:srgbClr val="267F99"/>
+                </a:solidFill>
+                <a:effectLst/>
+                <a:latin typeface="Menlo" panose="020B0609030804020204" pitchFamily="49" charset="0"/>
+              </a:rPr>
+              <a:t>String</a:t>
+            </a:r>
+            <a:r>
+              <a:rPr lang="fr-FR" b="0" dirty="0">
+                <a:solidFill>
+                  <a:srgbClr val="000000"/>
+                </a:solidFill>
+                <a:effectLst/>
+                <a:latin typeface="Menlo" panose="020B0609030804020204" pitchFamily="49" charset="0"/>
+              </a:rPr>
+              <a:t>]): </a:t>
+            </a:r>
+            <a:r>
+              <a:rPr lang="fr-FR" b="0" dirty="0">
+                <a:solidFill>
+                  <a:srgbClr val="267F99"/>
+                </a:solidFill>
+                <a:effectLst/>
+                <a:latin typeface="Menlo" panose="020B0609030804020204" pitchFamily="49" charset="0"/>
+              </a:rPr>
+              <a:t>RDD</a:t>
+            </a:r>
+            <a:r>
+              <a:rPr lang="fr-FR" b="0" dirty="0">
+                <a:solidFill>
+                  <a:srgbClr val="000000"/>
+                </a:solidFill>
+                <a:effectLst/>
+                <a:latin typeface="Menlo" panose="020B0609030804020204" pitchFamily="49" charset="0"/>
+              </a:rPr>
+              <a:t>[</a:t>
+            </a:r>
+            <a:r>
+              <a:rPr lang="fr-FR" b="0" dirty="0">
+                <a:solidFill>
+                  <a:srgbClr val="267F99"/>
+                </a:solidFill>
+                <a:effectLst/>
+                <a:latin typeface="Menlo" panose="020B0609030804020204" pitchFamily="49" charset="0"/>
+              </a:rPr>
+              <a:t>String</a:t>
+            </a:r>
+            <a:r>
+              <a:rPr lang="fr-FR" b="0" dirty="0">
+                <a:solidFill>
+                  <a:srgbClr val="000000"/>
+                </a:solidFill>
+                <a:effectLst/>
+                <a:latin typeface="Menlo" panose="020B0609030804020204" pitchFamily="49" charset="0"/>
+              </a:rPr>
+              <a:t>] = {</a:t>
+            </a:r>
+          </a:p>
+          <a:p>
+            <a:pPr lvl="1"/>
+            <a:r>
+              <a:rPr lang="fr-FR" b="0" dirty="0">
+                <a:solidFill>
+                  <a:srgbClr val="008000"/>
+                </a:solidFill>
+                <a:effectLst/>
+                <a:latin typeface="Menlo" panose="020B0609030804020204" pitchFamily="49" charset="0"/>
+              </a:rPr>
+              <a:t>// </a:t>
+            </a:r>
+            <a:r>
+              <a:rPr lang="fr-FR" b="0" dirty="0" err="1">
+                <a:solidFill>
+                  <a:srgbClr val="008000"/>
+                </a:solidFill>
+                <a:effectLst/>
+                <a:latin typeface="Menlo" panose="020B0609030804020204" pitchFamily="49" charset="0"/>
+              </a:rPr>
+              <a:t>write</a:t>
+            </a:r>
+            <a:r>
+              <a:rPr lang="fr-FR" b="0" dirty="0">
+                <a:solidFill>
+                  <a:srgbClr val="008000"/>
+                </a:solidFill>
+                <a:effectLst/>
+                <a:latin typeface="Menlo" panose="020B0609030804020204" pitchFamily="49" charset="0"/>
+              </a:rPr>
+              <a:t> RDD to file</a:t>
+            </a:r>
+            <a:endParaRPr lang="fr-FR" b="0" dirty="0">
+              <a:solidFill>
+                <a:srgbClr val="000000"/>
+              </a:solidFill>
+              <a:effectLst/>
+              <a:latin typeface="Menlo" panose="020B0609030804020204" pitchFamily="49" charset="0"/>
+            </a:endParaRPr>
+          </a:p>
+          <a:p>
+            <a:pPr lvl="1"/>
+            <a:r>
+              <a:rPr lang="fr-FR" b="0" dirty="0" err="1">
+                <a:solidFill>
+                  <a:srgbClr val="000000"/>
+                </a:solidFill>
+                <a:effectLst/>
+                <a:latin typeface="Menlo" panose="020B0609030804020204" pitchFamily="49" charset="0"/>
+              </a:rPr>
+              <a:t>titanic.saveAsTextFile</a:t>
+            </a:r>
+            <a:r>
+              <a:rPr lang="fr-FR" b="0" dirty="0">
+                <a:solidFill>
+                  <a:srgbClr val="000000"/>
+                </a:solidFill>
+                <a:effectLst/>
+                <a:latin typeface="Menlo" panose="020B0609030804020204" pitchFamily="49" charset="0"/>
+              </a:rPr>
+              <a:t>(</a:t>
+            </a:r>
+            <a:r>
+              <a:rPr lang="fr-FR" b="0" dirty="0">
+                <a:solidFill>
+                  <a:srgbClr val="A31515"/>
+                </a:solidFill>
+                <a:effectLst/>
+                <a:latin typeface="Menlo" panose="020B0609030804020204" pitchFamily="49" charset="0"/>
+              </a:rPr>
+              <a:t>"data/</a:t>
+            </a:r>
+            <a:r>
+              <a:rPr lang="fr-FR" b="0" dirty="0" err="1">
+                <a:solidFill>
+                  <a:srgbClr val="A31515"/>
+                </a:solidFill>
+                <a:effectLst/>
+                <a:latin typeface="Menlo" panose="020B0609030804020204" pitchFamily="49" charset="0"/>
+              </a:rPr>
+              <a:t>titanic.csv</a:t>
+            </a:r>
+            <a:r>
+              <a:rPr lang="fr-FR" b="0" dirty="0">
+                <a:solidFill>
+                  <a:srgbClr val="A31515"/>
+                </a:solidFill>
+                <a:effectLst/>
+                <a:latin typeface="Menlo" panose="020B0609030804020204" pitchFamily="49" charset="0"/>
+              </a:rPr>
+              <a:t>"</a:t>
+            </a:r>
+            <a:r>
+              <a:rPr lang="fr-FR" b="0" dirty="0">
+                <a:solidFill>
+                  <a:srgbClr val="000000"/>
+                </a:solidFill>
+                <a:effectLst/>
+                <a:latin typeface="Menlo" panose="020B0609030804020204" pitchFamily="49" charset="0"/>
+              </a:rPr>
+              <a:t>)</a:t>
+            </a:r>
+          </a:p>
+          <a:p>
+            <a:pPr lvl="1"/>
+            <a:br>
+              <a:rPr lang="fr-FR" b="0" dirty="0">
+                <a:solidFill>
+                  <a:srgbClr val="000000"/>
+                </a:solidFill>
+                <a:effectLst/>
+                <a:latin typeface="Menlo" panose="020B0609030804020204" pitchFamily="49" charset="0"/>
+              </a:rPr>
+            </a:br>
+            <a:r>
+              <a:rPr lang="fr-FR" b="0" dirty="0" err="1">
+                <a:solidFill>
+                  <a:srgbClr val="000000"/>
+                </a:solidFill>
+                <a:effectLst/>
+                <a:latin typeface="Menlo" panose="020B0609030804020204" pitchFamily="49" charset="0"/>
+              </a:rPr>
+              <a:t>titanic</a:t>
+            </a:r>
+            <a:endParaRPr lang="fr-FR" b="0" dirty="0">
+              <a:solidFill>
+                <a:srgbClr val="000000"/>
+              </a:solidFill>
+              <a:effectLst/>
+              <a:latin typeface="Menlo" panose="020B0609030804020204" pitchFamily="49" charset="0"/>
+            </a:endParaRPr>
+          </a:p>
+          <a:p>
+            <a:r>
+              <a:rPr lang="fr-FR" b="0" dirty="0">
+                <a:solidFill>
+                  <a:srgbClr val="000000"/>
+                </a:solidFill>
+                <a:effectLst/>
+                <a:latin typeface="Menlo" panose="020B0609030804020204" pitchFamily="49" charset="0"/>
+              </a:rPr>
+              <a:t>}</a:t>
+            </a:r>
+          </a:p>
+        </p:txBody>
+      </p:sp>
+    </p:spTree>
+    <p:extLst>
+      <p:ext uri="{BB962C8B-B14F-4D97-AF65-F5344CB8AC3E}">
+        <p14:creationId xmlns:p14="http://schemas.microsoft.com/office/powerpoint/2010/main" val="1650398516"/>
+      </p:ext>
+    </p:extLst>
+  </p:cSld>
+  <p:clrMapOvr>
+    <a:masterClrMapping/>
+  </p:clrMapOvr>
+  <p:transition spd="slow">
+    <p:wipe dir="r"/>
+  </p:transition>
+</p:sld>
+</file>
+
+<file path=ppt/slides/slide15.xml><?xml version="1.0" encoding="utf-8"?>
+<p:sld xmlns:a="http://schemas.openxmlformats.org/drawingml/2006/main" xmlns:r="http://schemas.openxmlformats.org/officeDocument/2006/relationships" xmlns:p="http://schemas.openxmlformats.org/presentationml/2006/main">
+  <p:cSld>
+    <p:spTree>
+      <p:nvGrpSpPr>
+        <p:cNvPr id="1" name=""/>
+        <p:cNvGrpSpPr/>
+        <p:nvPr/>
+      </p:nvGrpSpPr>
+      <p:grpSpPr>
+        <a:xfrm>
+          <a:off x="0" y="0"/>
+          <a:ext cx="0" cy="0"/>
+          <a:chOff x="0" y="0"/>
+          <a:chExt cx="0" cy="0"/>
+        </a:xfrm>
+      </p:grpSpPr>
+      <p:sp>
+        <p:nvSpPr>
+          <p:cNvPr id="6" name="Tijdelijke aanduiding voor tekst 5"/>
+          <p:cNvSpPr>
+            <a:spLocks noGrp="1"/>
+          </p:cNvSpPr>
+          <p:nvPr>
+            <p:ph type="body" sz="quarter" idx="12"/>
+          </p:nvPr>
+        </p:nvSpPr>
+        <p:spPr/>
+        <p:txBody>
+          <a:bodyPr/>
+          <a:lstStyle/>
+          <a:p>
+            <a:endParaRPr lang="nl-NL" dirty="0"/>
+          </a:p>
+        </p:txBody>
+      </p:sp>
+      <p:sp>
+        <p:nvSpPr>
+          <p:cNvPr id="4" name="Titel 3"/>
+          <p:cNvSpPr>
+            <a:spLocks noGrp="1"/>
+          </p:cNvSpPr>
+          <p:nvPr>
+            <p:ph type="title"/>
+          </p:nvPr>
+        </p:nvSpPr>
+        <p:spPr/>
+        <p:txBody>
+          <a:bodyPr/>
+          <a:lstStyle/>
+          <a:p>
+            <a:r>
+              <a:rPr lang="nl-NL" dirty="0"/>
+              <a:t>Merci de </a:t>
+            </a:r>
+            <a:r>
+              <a:rPr lang="nl-NL" dirty="0" err="1"/>
+              <a:t>votre</a:t>
+            </a:r>
+            <a:r>
+              <a:rPr lang="nl-NL" dirty="0"/>
+              <a:t> attention !</a:t>
+            </a:r>
+          </a:p>
+        </p:txBody>
+      </p:sp>
+      <p:sp>
+        <p:nvSpPr>
+          <p:cNvPr id="2" name="Tijdelijke aanduiding voor dianummer 1"/>
+          <p:cNvSpPr>
+            <a:spLocks noGrp="1"/>
+          </p:cNvSpPr>
+          <p:nvPr>
+            <p:ph type="sldNum" sz="quarter" idx="4"/>
+          </p:nvPr>
+        </p:nvSpPr>
+        <p:spPr/>
+        <p:txBody>
+          <a:bodyPr/>
+          <a:lstStyle/>
+          <a:p>
+            <a:fld id="{5EE7099E-8998-4851-915A-4F4831808297}" type="slidenum">
+              <a:rPr lang="nl-NL" smtClean="0"/>
+              <a:pPr/>
+              <a:t>15</a:t>
             </a:fld>
             <a:endParaRPr lang="nl-NL"/>
           </a:p>

</xml_diff>

<commit_message>
Update presentation with typing and translation jobs of Transform step
</commit_message>
<xml_diff>
--- a/presentation.pptx
+++ b/presentation.pptx
@@ -5,10 +5,10 @@
     <p:sldMasterId id="2147483648" r:id="rId1"/>
   </p:sldMasterIdLst>
   <p:notesMasterIdLst>
-    <p:notesMasterId r:id="rId21"/>
+    <p:notesMasterId r:id="rId23"/>
   </p:notesMasterIdLst>
   <p:handoutMasterIdLst>
-    <p:handoutMasterId r:id="rId22"/>
+    <p:handoutMasterId r:id="rId24"/>
   </p:handoutMasterIdLst>
   <p:sldIdLst>
     <p:sldId id="256" r:id="rId2"/>
@@ -28,13 +28,15 @@
     <p:sldId id="309" r:id="rId16"/>
     <p:sldId id="310" r:id="rId17"/>
     <p:sldId id="311" r:id="rId18"/>
-    <p:sldId id="313" r:id="rId19"/>
-    <p:sldId id="269" r:id="rId20"/>
+    <p:sldId id="316" r:id="rId19"/>
+    <p:sldId id="315" r:id="rId20"/>
+    <p:sldId id="314" r:id="rId21"/>
+    <p:sldId id="269" r:id="rId22"/>
   </p:sldIdLst>
   <p:sldSz cx="12198350" cy="6858000"/>
   <p:notesSz cx="9872663" cy="6742113"/>
   <p:custDataLst>
-    <p:tags r:id="rId23"/>
+    <p:tags r:id="rId25"/>
   </p:custDataLst>
   <p:defaultTextStyle>
     <a:defPPr>
@@ -258,7 +260,7 @@
           <a:p>
             <a:fld id="{4F068446-54CF-4267-A5BD-FA01909E96A2}" type="datetimeFigureOut">
               <a:rPr lang="nl-NL" smtClean="0"/>
-              <a:t>21-12-2023</a:t>
+              <a:t>22-12-2023</a:t>
             </a:fld>
             <a:endParaRPr lang="nl-NL"/>
           </a:p>
@@ -423,7 +425,7 @@
           <a:p>
             <a:fld id="{35698784-F1F2-4D71-B346-94F94D5EBAA2}" type="datetimeFigureOut">
               <a:rPr lang="nl-NL" smtClean="0"/>
-              <a:t>21-12-2023</a:t>
+              <a:t>22-12-2023</a:t>
             </a:fld>
             <a:endParaRPr lang="nl-NL"/>
           </a:p>
@@ -1022,7 +1024,7 @@
           <a:p>
             <a:fld id="{928F9493-D671-4F27-99EF-9D103FC79999}" type="datetime1">
               <a:rPr lang="nl-NL" noProof="0" smtClean="0"/>
-              <a:t>21-12-2023</a:t>
+              <a:t>22-12-2023</a:t>
             </a:fld>
             <a:endParaRPr lang="en-GB" noProof="0" dirty="0"/>
           </a:p>
@@ -14584,10 +14586,9 @@
           <a:lstStyle/>
           <a:p>
             <a:r>
-              <a:rPr lang="en-US" dirty="0" err="1"/>
-              <a:t>Objectifs</a:t>
-            </a:r>
-            <a:endParaRPr lang="en-US" dirty="0"/>
+              <a:rPr lang="en-US" dirty="0"/>
+              <a:t>Objectif</a:t>
+            </a:r>
           </a:p>
         </p:txBody>
       </p:sp>
@@ -14683,6 +14684,9 @@
           <a:bodyPr/>
           <a:lstStyle/>
           <a:p>
+            <a:pPr marL="0" indent="0">
+              <a:buNone/>
+            </a:pPr>
             <a:r>
               <a:rPr lang="en-US" sz="2400" dirty="0" err="1"/>
               <a:t>Typer</a:t>
@@ -14717,107 +14721,9 @@
             </a:r>
           </a:p>
           <a:p>
-            <a:endParaRPr lang="en-US" sz="2400" dirty="0"/>
-          </a:p>
-          <a:p>
-            <a:endParaRPr lang="en-US" sz="2400" dirty="0"/>
-          </a:p>
-          <a:p>
-            <a:r>
-              <a:rPr lang="en-US" sz="2400" dirty="0" err="1"/>
-              <a:t>Corriger</a:t>
-            </a:r>
-            <a:r>
-              <a:rPr lang="en-US" sz="2400" dirty="0"/>
-              <a:t> les </a:t>
-            </a:r>
-            <a:r>
-              <a:rPr lang="en-US" sz="2400" dirty="0" err="1"/>
-              <a:t>erreurs</a:t>
-            </a:r>
-            <a:r>
-              <a:rPr lang="en-US" sz="2400" dirty="0"/>
-              <a:t> de </a:t>
-            </a:r>
-            <a:r>
-              <a:rPr lang="en-US" sz="2400" dirty="0" err="1"/>
-              <a:t>traductions</a:t>
-            </a:r>
-            <a:r>
-              <a:rPr lang="en-US" sz="2400" dirty="0"/>
-              <a:t> (”homme” </a:t>
-            </a:r>
-            <a:r>
-              <a:rPr lang="en-US" sz="2400" dirty="0" err="1"/>
-              <a:t>en</a:t>
-            </a:r>
-            <a:r>
-              <a:rPr lang="en-US" sz="2400" dirty="0"/>
-              <a:t> ”male”, “Monsieur” </a:t>
-            </a:r>
-            <a:r>
-              <a:rPr lang="en-US" sz="2400" dirty="0" err="1"/>
-              <a:t>en</a:t>
-            </a:r>
-            <a:r>
-              <a:rPr lang="en-US" sz="2400" dirty="0"/>
-              <a:t> “</a:t>
-            </a:r>
-            <a:r>
-              <a:rPr lang="en-US" sz="2400" dirty="0" err="1"/>
-              <a:t>Mr</a:t>
-            </a:r>
-            <a:r>
-              <a:rPr lang="en-US" sz="2400" dirty="0"/>
-              <a:t>”...)</a:t>
-            </a:r>
-          </a:p>
-          <a:p>
-            <a:endParaRPr lang="en-US" sz="2400" dirty="0"/>
-          </a:p>
-          <a:p>
-            <a:endParaRPr lang="en-US" sz="2400" dirty="0"/>
-          </a:p>
-          <a:p>
-            <a:r>
-              <a:rPr lang="en-US" sz="2400" dirty="0" err="1"/>
-              <a:t>Ajouter</a:t>
-            </a:r>
-            <a:r>
-              <a:rPr lang="en-US" sz="2400" dirty="0"/>
-              <a:t> de </a:t>
-            </a:r>
-            <a:r>
-              <a:rPr lang="en-US" sz="2400" dirty="0" err="1"/>
-              <a:t>nouvelles</a:t>
-            </a:r>
-            <a:r>
-              <a:rPr lang="en-US" sz="2400" dirty="0"/>
-              <a:t> variables pour </a:t>
-            </a:r>
-            <a:r>
-              <a:rPr lang="en-US" sz="2400" dirty="0" err="1"/>
-              <a:t>enrichir</a:t>
-            </a:r>
-            <a:r>
-              <a:rPr lang="en-US" sz="2400" dirty="0"/>
-              <a:t> </a:t>
-            </a:r>
-            <a:r>
-              <a:rPr lang="en-US" sz="2400" dirty="0" err="1"/>
-              <a:t>notre</a:t>
-            </a:r>
-            <a:r>
-              <a:rPr lang="en-US" sz="2400" dirty="0"/>
-              <a:t> jeu de </a:t>
-            </a:r>
-            <a:r>
-              <a:rPr lang="en-US" sz="2400" dirty="0" err="1"/>
-              <a:t>données</a:t>
-            </a:r>
-            <a:endParaRPr lang="en-US" sz="2400" dirty="0"/>
-          </a:p>
-          <a:p>
+            <a:pPr marL="0" indent="0">
+              <a:buNone/>
+            </a:pPr>
             <a:endParaRPr lang="en-US" dirty="0"/>
           </a:p>
           <a:p>
@@ -14866,6 +14772,264 @@
           </a:p>
           <a:p>
             <a:endParaRPr lang="en-US" dirty="0"/>
+          </a:p>
+        </p:txBody>
+      </p:sp>
+      <p:pic>
+        <p:nvPicPr>
+          <p:cNvPr id="4" name="Image 3">
+            <a:extLst>
+              <a:ext uri="{FF2B5EF4-FFF2-40B4-BE49-F238E27FC236}">
+                <a16:creationId xmlns:a16="http://schemas.microsoft.com/office/drawing/2014/main" id="{0C02A5FA-2150-B94A-C85D-58B9DE9E3C29}"/>
+              </a:ext>
+            </a:extLst>
+          </p:cNvPr>
+          <p:cNvPicPr>
+            <a:picLocks noChangeAspect="1"/>
+          </p:cNvPicPr>
+          <p:nvPr/>
+        </p:nvPicPr>
+        <p:blipFill>
+          <a:blip r:embed="rId2"/>
+          <a:stretch>
+            <a:fillRect/>
+          </a:stretch>
+        </p:blipFill>
+        <p:spPr>
+          <a:xfrm>
+            <a:off x="612775" y="1676400"/>
+            <a:ext cx="4051300" cy="4140200"/>
+          </a:xfrm>
+          <a:prstGeom prst="rect">
+            <a:avLst/>
+          </a:prstGeom>
+        </p:spPr>
+      </p:pic>
+      <p:pic>
+        <p:nvPicPr>
+          <p:cNvPr id="7" name="Image 6">
+            <a:extLst>
+              <a:ext uri="{FF2B5EF4-FFF2-40B4-BE49-F238E27FC236}">
+                <a16:creationId xmlns:a16="http://schemas.microsoft.com/office/drawing/2014/main" id="{95383509-2308-C5AA-E299-DA70FF596F17}"/>
+              </a:ext>
+            </a:extLst>
+          </p:cNvPr>
+          <p:cNvPicPr>
+            <a:picLocks noChangeAspect="1"/>
+          </p:cNvPicPr>
+          <p:nvPr/>
+        </p:nvPicPr>
+        <p:blipFill>
+          <a:blip r:embed="rId3"/>
+          <a:stretch>
+            <a:fillRect/>
+          </a:stretch>
+        </p:blipFill>
+        <p:spPr>
+          <a:xfrm>
+            <a:off x="7107134" y="1676400"/>
+            <a:ext cx="4051300" cy="4140200"/>
+          </a:xfrm>
+          <a:prstGeom prst="rect">
+            <a:avLst/>
+          </a:prstGeom>
+        </p:spPr>
+      </p:pic>
+      <p:cxnSp>
+        <p:nvCxnSpPr>
+          <p:cNvPr id="9" name="Connecteur droit avec flèche 8">
+            <a:extLst>
+              <a:ext uri="{FF2B5EF4-FFF2-40B4-BE49-F238E27FC236}">
+                <a16:creationId xmlns:a16="http://schemas.microsoft.com/office/drawing/2014/main" id="{456CCC81-8DA5-7278-6258-5B5EC99F2315}"/>
+              </a:ext>
+            </a:extLst>
+          </p:cNvPr>
+          <p:cNvCxnSpPr/>
+          <p:nvPr/>
+        </p:nvCxnSpPr>
+        <p:spPr>
+          <a:xfrm>
+            <a:off x="4879975" y="3810000"/>
+            <a:ext cx="1905000" cy="0"/>
+          </a:xfrm>
+          <a:prstGeom prst="straightConnector1">
+            <a:avLst/>
+          </a:prstGeom>
+          <a:ln w="12700">
+            <a:solidFill>
+              <a:schemeClr val="bg2"/>
+            </a:solidFill>
+            <a:tailEnd type="triangle"/>
+          </a:ln>
+        </p:spPr>
+        <p:style>
+          <a:lnRef idx="1">
+            <a:schemeClr val="accent1"/>
+          </a:lnRef>
+          <a:fillRef idx="0">
+            <a:schemeClr val="accent1"/>
+          </a:fillRef>
+          <a:effectRef idx="0">
+            <a:schemeClr val="accent1"/>
+          </a:effectRef>
+          <a:fontRef idx="minor">
+            <a:schemeClr val="tx1"/>
+          </a:fontRef>
+        </p:style>
+      </p:cxnSp>
+      <p:sp>
+        <p:nvSpPr>
+          <p:cNvPr id="10" name="Rectangle 9">
+            <a:extLst>
+              <a:ext uri="{FF2B5EF4-FFF2-40B4-BE49-F238E27FC236}">
+                <a16:creationId xmlns:a16="http://schemas.microsoft.com/office/drawing/2014/main" id="{DB9815FA-B4EA-8639-BC6E-E84EAE4779AB}"/>
+              </a:ext>
+            </a:extLst>
+          </p:cNvPr>
+          <p:cNvSpPr/>
+          <p:nvPr/>
+        </p:nvSpPr>
+        <p:spPr>
+          <a:xfrm>
+            <a:off x="8842375" y="2819399"/>
+            <a:ext cx="685800" cy="164837"/>
+          </a:xfrm>
+          <a:prstGeom prst="rect">
+            <a:avLst/>
+          </a:prstGeom>
+          <a:noFill/>
+          <a:ln>
+            <a:solidFill>
+              <a:srgbClr val="FF0000"/>
+            </a:solidFill>
+          </a:ln>
+        </p:spPr>
+        <p:style>
+          <a:lnRef idx="2">
+            <a:schemeClr val="accent1">
+              <a:shade val="50000"/>
+            </a:schemeClr>
+          </a:lnRef>
+          <a:fillRef idx="1">
+            <a:schemeClr val="accent1"/>
+          </a:fillRef>
+          <a:effectRef idx="0">
+            <a:schemeClr val="accent1"/>
+          </a:effectRef>
+          <a:fontRef idx="minor">
+            <a:schemeClr val="lt1"/>
+          </a:fontRef>
+        </p:style>
+        <p:txBody>
+          <a:bodyPr rtlCol="0" anchor="ctr"/>
+          <a:lstStyle/>
+          <a:p>
+            <a:pPr algn="ctr"/>
+            <a:endParaRPr lang="fr-FR"/>
+          </a:p>
+        </p:txBody>
+      </p:sp>
+      <p:sp>
+        <p:nvSpPr>
+          <p:cNvPr id="11" name="Rectangle 10">
+            <a:extLst>
+              <a:ext uri="{FF2B5EF4-FFF2-40B4-BE49-F238E27FC236}">
+                <a16:creationId xmlns:a16="http://schemas.microsoft.com/office/drawing/2014/main" id="{79DB7523-736A-5ED2-9BBC-0DD22A5EEFA6}"/>
+              </a:ext>
+            </a:extLst>
+          </p:cNvPr>
+          <p:cNvSpPr/>
+          <p:nvPr/>
+        </p:nvSpPr>
+        <p:spPr>
+          <a:xfrm>
+            <a:off x="8156575" y="3518506"/>
+            <a:ext cx="685800" cy="152400"/>
+          </a:xfrm>
+          <a:prstGeom prst="rect">
+            <a:avLst/>
+          </a:prstGeom>
+          <a:noFill/>
+          <a:ln>
+            <a:solidFill>
+              <a:srgbClr val="00B050"/>
+            </a:solidFill>
+          </a:ln>
+        </p:spPr>
+        <p:style>
+          <a:lnRef idx="2">
+            <a:schemeClr val="accent1">
+              <a:shade val="50000"/>
+            </a:schemeClr>
+          </a:lnRef>
+          <a:fillRef idx="1">
+            <a:schemeClr val="accent1"/>
+          </a:fillRef>
+          <a:effectRef idx="0">
+            <a:schemeClr val="accent1"/>
+          </a:effectRef>
+          <a:fontRef idx="minor">
+            <a:schemeClr val="lt1"/>
+          </a:fontRef>
+        </p:style>
+        <p:txBody>
+          <a:bodyPr rtlCol="0" anchor="ctr"/>
+          <a:lstStyle/>
+          <a:p>
+            <a:pPr algn="ctr"/>
+            <a:endParaRPr lang="fr-FR"/>
+          </a:p>
+        </p:txBody>
+      </p:sp>
+      <p:sp>
+        <p:nvSpPr>
+          <p:cNvPr id="12" name="Rectangle 11">
+            <a:extLst>
+              <a:ext uri="{FF2B5EF4-FFF2-40B4-BE49-F238E27FC236}">
+                <a16:creationId xmlns:a16="http://schemas.microsoft.com/office/drawing/2014/main" id="{7ACFC66D-ECF0-087C-87DE-CB4CC41101AD}"/>
+              </a:ext>
+            </a:extLst>
+          </p:cNvPr>
+          <p:cNvSpPr/>
+          <p:nvPr/>
+        </p:nvSpPr>
+        <p:spPr>
+          <a:xfrm>
+            <a:off x="8156575" y="4838852"/>
+            <a:ext cx="685800" cy="266548"/>
+          </a:xfrm>
+          <a:prstGeom prst="rect">
+            <a:avLst/>
+          </a:prstGeom>
+          <a:noFill/>
+          <a:ln>
+            <a:solidFill>
+              <a:srgbClr val="0070C0"/>
+            </a:solidFill>
+          </a:ln>
+        </p:spPr>
+        <p:style>
+          <a:lnRef idx="2">
+            <a:schemeClr val="accent1">
+              <a:shade val="50000"/>
+            </a:schemeClr>
+          </a:lnRef>
+          <a:fillRef idx="1">
+            <a:schemeClr val="accent1"/>
+          </a:fillRef>
+          <a:effectRef idx="0">
+            <a:schemeClr val="accent1"/>
+          </a:effectRef>
+          <a:fontRef idx="minor">
+            <a:schemeClr val="lt1"/>
+          </a:fontRef>
+        </p:style>
+        <p:txBody>
+          <a:bodyPr rtlCol="0" anchor="ctr"/>
+          <a:lstStyle/>
+          <a:p>
+            <a:pPr algn="ctr"/>
+            <a:endParaRPr lang="fr-FR"/>
           </a:p>
         </p:txBody>
       </p:sp>
@@ -14998,220 +15162,926 @@
       </p:sp>
       <p:sp>
         <p:nvSpPr>
-          <p:cNvPr id="6" name="Vertical Text Placeholder 5">
+          <p:cNvPr id="4" name="ZoneTexte 3">
             <a:extLst>
               <a:ext uri="{FF2B5EF4-FFF2-40B4-BE49-F238E27FC236}">
-                <a16:creationId xmlns:a16="http://schemas.microsoft.com/office/drawing/2014/main" id="{F8170739-5212-AEC7-557E-2E086A29A496}"/>
+                <a16:creationId xmlns:a16="http://schemas.microsoft.com/office/drawing/2014/main" id="{5BF910A1-61B1-D0D5-B870-C1DDAE0DAA61}"/>
               </a:ext>
             </a:extLst>
           </p:cNvPr>
-          <p:cNvSpPr>
-            <a:spLocks noGrp="1"/>
-          </p:cNvSpPr>
-          <p:nvPr>
-            <p:ph type="body" orient="vert" idx="1"/>
-          </p:nvPr>
+          <p:cNvSpPr txBox="1"/>
+          <p:nvPr/>
         </p:nvSpPr>
         <p:spPr>
           <a:xfrm>
-            <a:off x="404662" y="1143000"/>
-            <a:ext cx="11389023" cy="4795836"/>
+            <a:off x="307974" y="1049116"/>
+            <a:ext cx="11734801" cy="5046884"/>
           </a:xfrm>
+          <a:prstGeom prst="rect">
+            <a:avLst/>
+          </a:prstGeom>
+          <a:noFill/>
         </p:spPr>
         <p:txBody>
-          <a:bodyPr/>
+          <a:bodyPr wrap="square" lIns="108000" tIns="108000" rIns="108000" bIns="108000" rtlCol="0">
+            <a:noAutofit/>
+          </a:bodyPr>
           <a:lstStyle/>
           <a:p>
             <a:r>
-              <a:rPr lang="en-US" sz="2400" dirty="0" err="1"/>
-              <a:t>Typer</a:t>
-            </a:r>
-            <a:r>
-              <a:rPr lang="en-US" sz="2400" dirty="0"/>
-              <a:t> les variables du jeu de </a:t>
-            </a:r>
-            <a:r>
-              <a:rPr lang="en-US" sz="2400" dirty="0" err="1"/>
-              <a:t>données</a:t>
-            </a:r>
-            <a:r>
-              <a:rPr lang="en-US" sz="2400" dirty="0"/>
-              <a:t> (</a:t>
-            </a:r>
-            <a:r>
-              <a:rPr lang="en-US" sz="2400" dirty="0" err="1"/>
-              <a:t>numériques</a:t>
-            </a:r>
-            <a:r>
-              <a:rPr lang="en-US" sz="2400" dirty="0"/>
-              <a:t> et </a:t>
-            </a:r>
-            <a:r>
-              <a:rPr lang="en-US" sz="2400" dirty="0" err="1"/>
-              <a:t>catégorielles</a:t>
-            </a:r>
-            <a:r>
-              <a:rPr lang="en-US" sz="2400" dirty="0"/>
+              <a:rPr lang="fr-FR" b="0" dirty="0" err="1">
+                <a:solidFill>
+                  <a:srgbClr val="0000FF"/>
+                </a:solidFill>
+                <a:effectLst/>
+                <a:latin typeface="Menlo" panose="020B0609030804020204" pitchFamily="49" charset="0"/>
+              </a:rPr>
+              <a:t>def</a:t>
+            </a:r>
+            <a:r>
+              <a:rPr lang="fr-FR" b="0" dirty="0">
+                <a:solidFill>
+                  <a:srgbClr val="000000"/>
+                </a:solidFill>
+                <a:effectLst/>
+                <a:latin typeface="Menlo" panose="020B0609030804020204" pitchFamily="49" charset="0"/>
+              </a:rPr>
+              <a:t> </a:t>
+            </a:r>
+            <a:r>
+              <a:rPr lang="fr-FR" b="0" dirty="0" err="1">
+                <a:solidFill>
+                  <a:srgbClr val="795E26"/>
+                </a:solidFill>
+                <a:effectLst/>
+                <a:latin typeface="Menlo" panose="020B0609030804020204" pitchFamily="49" charset="0"/>
+              </a:rPr>
+              <a:t>typeVariables</a:t>
+            </a:r>
+            <a:r>
+              <a:rPr lang="fr-FR" b="0" dirty="0">
+                <a:solidFill>
+                  <a:srgbClr val="000000"/>
+                </a:solidFill>
+                <a:effectLst/>
+                <a:latin typeface="Menlo" panose="020B0609030804020204" pitchFamily="49" charset="0"/>
+              </a:rPr>
+              <a:t>(</a:t>
+            </a:r>
+            <a:r>
+              <a:rPr lang="fr-FR" b="0" dirty="0" err="1">
+                <a:solidFill>
+                  <a:srgbClr val="001080"/>
+                </a:solidFill>
+                <a:effectLst/>
+                <a:latin typeface="Menlo" panose="020B0609030804020204" pitchFamily="49" charset="0"/>
+              </a:rPr>
+              <a:t>titanic</a:t>
+            </a:r>
+            <a:r>
+              <a:rPr lang="fr-FR" b="0" dirty="0">
+                <a:solidFill>
+                  <a:srgbClr val="000000"/>
+                </a:solidFill>
+                <a:effectLst/>
+                <a:latin typeface="Menlo" panose="020B0609030804020204" pitchFamily="49" charset="0"/>
+              </a:rPr>
+              <a:t>: </a:t>
+            </a:r>
+            <a:r>
+              <a:rPr lang="fr-FR" b="0" dirty="0" err="1">
+                <a:solidFill>
+                  <a:srgbClr val="267F99"/>
+                </a:solidFill>
+                <a:effectLst/>
+                <a:latin typeface="Menlo" panose="020B0609030804020204" pitchFamily="49" charset="0"/>
+              </a:rPr>
+              <a:t>DataFrame</a:t>
+            </a:r>
+            <a:r>
+              <a:rPr lang="fr-FR" b="0" dirty="0">
+                <a:solidFill>
+                  <a:srgbClr val="000000"/>
+                </a:solidFill>
+                <a:effectLst/>
+                <a:latin typeface="Menlo" panose="020B0609030804020204" pitchFamily="49" charset="0"/>
+              </a:rPr>
+              <a:t>): </a:t>
+            </a:r>
+            <a:r>
+              <a:rPr lang="fr-FR" b="0" dirty="0" err="1">
+                <a:solidFill>
+                  <a:srgbClr val="267F99"/>
+                </a:solidFill>
+                <a:effectLst/>
+                <a:latin typeface="Menlo" panose="020B0609030804020204" pitchFamily="49" charset="0"/>
+              </a:rPr>
+              <a:t>DataFrame</a:t>
+            </a:r>
+            <a:r>
+              <a:rPr lang="fr-FR" b="0" dirty="0">
+                <a:solidFill>
+                  <a:srgbClr val="000000"/>
+                </a:solidFill>
+                <a:effectLst/>
+                <a:latin typeface="Menlo" panose="020B0609030804020204" pitchFamily="49" charset="0"/>
+              </a:rPr>
+              <a:t> = {</a:t>
+            </a:r>
+          </a:p>
+          <a:p>
+            <a:pPr lvl="1"/>
+            <a:endParaRPr lang="fr-FR" b="0" dirty="0">
+              <a:solidFill>
+                <a:srgbClr val="000000"/>
+              </a:solidFill>
+              <a:effectLst/>
+              <a:latin typeface="Menlo" panose="020B0609030804020204" pitchFamily="49" charset="0"/>
+            </a:endParaRPr>
+          </a:p>
+          <a:p>
+            <a:pPr lvl="1"/>
+            <a:r>
+              <a:rPr lang="fr-FR" b="0" dirty="0" err="1">
+                <a:solidFill>
+                  <a:srgbClr val="000000"/>
+                </a:solidFill>
+                <a:effectLst/>
+                <a:latin typeface="Menlo" panose="020B0609030804020204" pitchFamily="49" charset="0"/>
+              </a:rPr>
+              <a:t>titanic.select</a:t>
+            </a:r>
+            <a:r>
+              <a:rPr lang="fr-FR" b="0" dirty="0">
+                <a:solidFill>
+                  <a:srgbClr val="000000"/>
+                </a:solidFill>
+                <a:effectLst/>
+                <a:latin typeface="Menlo" panose="020B0609030804020204" pitchFamily="49" charset="0"/>
+              </a:rPr>
+              <a:t>(</a:t>
+            </a:r>
+            <a:r>
+              <a:rPr lang="fr-FR" b="0" dirty="0" err="1">
+                <a:solidFill>
+                  <a:srgbClr val="000000"/>
+                </a:solidFill>
+                <a:effectLst/>
+                <a:latin typeface="Menlo" panose="020B0609030804020204" pitchFamily="49" charset="0"/>
+              </a:rPr>
+              <a:t>titanic.columns.map</a:t>
+            </a:r>
+            <a:r>
+              <a:rPr lang="fr-FR" b="0" dirty="0">
+                <a:solidFill>
+                  <a:srgbClr val="000000"/>
+                </a:solidFill>
+                <a:effectLst/>
+                <a:latin typeface="Menlo" panose="020B0609030804020204" pitchFamily="49" charset="0"/>
+              </a:rPr>
+              <a:t> {</a:t>
+            </a:r>
+          </a:p>
+          <a:p>
+            <a:pPr lvl="2"/>
+            <a:r>
+              <a:rPr lang="fr-FR" b="0" dirty="0">
+                <a:solidFill>
+                  <a:srgbClr val="AF00DB"/>
+                </a:solidFill>
+                <a:effectLst/>
+                <a:latin typeface="Menlo" panose="020B0609030804020204" pitchFamily="49" charset="0"/>
+              </a:rPr>
+              <a:t>case</a:t>
+            </a:r>
+            <a:r>
+              <a:rPr lang="fr-FR" b="0" dirty="0">
+                <a:solidFill>
+                  <a:srgbClr val="000000"/>
+                </a:solidFill>
+                <a:effectLst/>
+                <a:latin typeface="Menlo" panose="020B0609030804020204" pitchFamily="49" charset="0"/>
+              </a:rPr>
+              <a:t> </a:t>
+            </a:r>
+            <a:r>
+              <a:rPr lang="fr-FR" b="0" dirty="0" err="1">
+                <a:solidFill>
+                  <a:srgbClr val="000000"/>
+                </a:solidFill>
+                <a:effectLst/>
+                <a:latin typeface="Menlo" panose="020B0609030804020204" pitchFamily="49" charset="0"/>
+              </a:rPr>
+              <a:t>column</a:t>
+            </a:r>
+            <a:r>
+              <a:rPr lang="fr-FR" b="0" dirty="0">
+                <a:solidFill>
+                  <a:srgbClr val="000000"/>
+                </a:solidFill>
+                <a:effectLst/>
+                <a:latin typeface="Menlo" panose="020B0609030804020204" pitchFamily="49" charset="0"/>
+              </a:rPr>
+              <a:t>@(</a:t>
+            </a:r>
+            <a:r>
+              <a:rPr lang="fr-FR" b="0" dirty="0">
+                <a:solidFill>
+                  <a:srgbClr val="A31515"/>
+                </a:solidFill>
+                <a:effectLst/>
+                <a:latin typeface="Menlo" panose="020B0609030804020204" pitchFamily="49" charset="0"/>
+              </a:rPr>
+              <a:t>"</a:t>
+            </a:r>
+            <a:r>
+              <a:rPr lang="fr-FR" b="0" dirty="0" err="1">
+                <a:solidFill>
+                  <a:srgbClr val="A31515"/>
+                </a:solidFill>
+                <a:effectLst/>
+                <a:latin typeface="Menlo" panose="020B0609030804020204" pitchFamily="49" charset="0"/>
+              </a:rPr>
+              <a:t>PassengerId</a:t>
+            </a:r>
+            <a:r>
+              <a:rPr lang="fr-FR" b="0" dirty="0">
+                <a:solidFill>
+                  <a:srgbClr val="A31515"/>
+                </a:solidFill>
+                <a:effectLst/>
+                <a:latin typeface="Menlo" panose="020B0609030804020204" pitchFamily="49" charset="0"/>
+              </a:rPr>
+              <a:t>"</a:t>
+            </a:r>
+            <a:r>
+              <a:rPr lang="fr-FR" b="0" dirty="0">
+                <a:solidFill>
+                  <a:srgbClr val="000000"/>
+                </a:solidFill>
+                <a:effectLst/>
+                <a:latin typeface="Menlo" panose="020B0609030804020204" pitchFamily="49" charset="0"/>
+              </a:rPr>
+              <a:t> | </a:t>
+            </a:r>
+            <a:r>
+              <a:rPr lang="fr-FR" b="0" dirty="0">
+                <a:solidFill>
+                  <a:srgbClr val="A31515"/>
+                </a:solidFill>
+                <a:effectLst/>
+                <a:latin typeface="Menlo" panose="020B0609030804020204" pitchFamily="49" charset="0"/>
+              </a:rPr>
+              <a:t>"</a:t>
+            </a:r>
+            <a:r>
+              <a:rPr lang="fr-FR" b="0" dirty="0" err="1">
+                <a:solidFill>
+                  <a:srgbClr val="A31515"/>
+                </a:solidFill>
+                <a:effectLst/>
+                <a:latin typeface="Menlo" panose="020B0609030804020204" pitchFamily="49" charset="0"/>
+              </a:rPr>
+              <a:t>Survived</a:t>
+            </a:r>
+            <a:r>
+              <a:rPr lang="fr-FR" b="0" dirty="0">
+                <a:solidFill>
+                  <a:srgbClr val="A31515"/>
+                </a:solidFill>
+                <a:effectLst/>
+                <a:latin typeface="Menlo" panose="020B0609030804020204" pitchFamily="49" charset="0"/>
+              </a:rPr>
+              <a:t>"</a:t>
+            </a:r>
+            <a:r>
+              <a:rPr lang="fr-FR" b="0" dirty="0">
+                <a:solidFill>
+                  <a:srgbClr val="000000"/>
+                </a:solidFill>
+                <a:effectLst/>
+                <a:latin typeface="Menlo" panose="020B0609030804020204" pitchFamily="49" charset="0"/>
+              </a:rPr>
+              <a:t> | </a:t>
+            </a:r>
+            <a:r>
+              <a:rPr lang="fr-FR" b="0" dirty="0">
+                <a:solidFill>
+                  <a:srgbClr val="A31515"/>
+                </a:solidFill>
+                <a:effectLst/>
+                <a:latin typeface="Menlo" panose="020B0609030804020204" pitchFamily="49" charset="0"/>
+              </a:rPr>
+              <a:t>"</a:t>
+            </a:r>
+            <a:r>
+              <a:rPr lang="fr-FR" b="0" dirty="0" err="1">
+                <a:solidFill>
+                  <a:srgbClr val="A31515"/>
+                </a:solidFill>
+                <a:effectLst/>
+                <a:latin typeface="Menlo" panose="020B0609030804020204" pitchFamily="49" charset="0"/>
+              </a:rPr>
+              <a:t>Pclass</a:t>
+            </a:r>
+            <a:r>
+              <a:rPr lang="fr-FR" b="0" dirty="0">
+                <a:solidFill>
+                  <a:srgbClr val="A31515"/>
+                </a:solidFill>
+                <a:effectLst/>
+                <a:latin typeface="Menlo" panose="020B0609030804020204" pitchFamily="49" charset="0"/>
+              </a:rPr>
+              <a:t>"</a:t>
+            </a:r>
+            <a:r>
+              <a:rPr lang="fr-FR" b="0" dirty="0">
+                <a:solidFill>
+                  <a:srgbClr val="000000"/>
+                </a:solidFill>
+                <a:effectLst/>
+                <a:latin typeface="Menlo" panose="020B0609030804020204" pitchFamily="49" charset="0"/>
+              </a:rPr>
+              <a:t> | </a:t>
+            </a:r>
+            <a:r>
+              <a:rPr lang="fr-FR" b="0" dirty="0">
+                <a:solidFill>
+                  <a:srgbClr val="A31515"/>
+                </a:solidFill>
+                <a:effectLst/>
+                <a:latin typeface="Menlo" panose="020B0609030804020204" pitchFamily="49" charset="0"/>
+              </a:rPr>
+              <a:t>"</a:t>
+            </a:r>
+            <a:r>
+              <a:rPr lang="fr-FR" b="0" dirty="0" err="1">
+                <a:solidFill>
+                  <a:srgbClr val="A31515"/>
+                </a:solidFill>
+                <a:effectLst/>
+                <a:latin typeface="Menlo" panose="020B0609030804020204" pitchFamily="49" charset="0"/>
+              </a:rPr>
+              <a:t>SibSp</a:t>
+            </a:r>
+            <a:r>
+              <a:rPr lang="fr-FR" b="0" dirty="0">
+                <a:solidFill>
+                  <a:srgbClr val="A31515"/>
+                </a:solidFill>
+                <a:effectLst/>
+                <a:latin typeface="Menlo" panose="020B0609030804020204" pitchFamily="49" charset="0"/>
+              </a:rPr>
+              <a:t>"</a:t>
+            </a:r>
+            <a:r>
+              <a:rPr lang="fr-FR" b="0" dirty="0">
+                <a:solidFill>
+                  <a:srgbClr val="000000"/>
+                </a:solidFill>
+                <a:effectLst/>
+                <a:latin typeface="Menlo" panose="020B0609030804020204" pitchFamily="49" charset="0"/>
+              </a:rPr>
+              <a:t> | </a:t>
+            </a:r>
+            <a:r>
+              <a:rPr lang="fr-FR" b="0" dirty="0">
+                <a:solidFill>
+                  <a:srgbClr val="A31515"/>
+                </a:solidFill>
+                <a:effectLst/>
+                <a:latin typeface="Menlo" panose="020B0609030804020204" pitchFamily="49" charset="0"/>
+              </a:rPr>
+              <a:t>"</a:t>
+            </a:r>
+            <a:r>
+              <a:rPr lang="fr-FR" b="0" dirty="0" err="1">
+                <a:solidFill>
+                  <a:srgbClr val="A31515"/>
+                </a:solidFill>
+                <a:effectLst/>
+                <a:latin typeface="Menlo" panose="020B0609030804020204" pitchFamily="49" charset="0"/>
+              </a:rPr>
+              <a:t>Parch</a:t>
+            </a:r>
+            <a:r>
+              <a:rPr lang="fr-FR" b="0" dirty="0">
+                <a:solidFill>
+                  <a:srgbClr val="A31515"/>
+                </a:solidFill>
+                <a:effectLst/>
+                <a:latin typeface="Menlo" panose="020B0609030804020204" pitchFamily="49" charset="0"/>
+              </a:rPr>
+              <a:t>"</a:t>
+            </a:r>
+            <a:r>
+              <a:rPr lang="fr-FR" b="0" dirty="0">
+                <a:solidFill>
+                  <a:srgbClr val="000000"/>
+                </a:solidFill>
+                <a:effectLst/>
+                <a:latin typeface="Menlo" panose="020B0609030804020204" pitchFamily="49" charset="0"/>
+              </a:rPr>
+              <a:t>) =&gt; </a:t>
+            </a:r>
+            <a:r>
+              <a:rPr lang="fr-FR" b="0" dirty="0" err="1">
+                <a:solidFill>
+                  <a:srgbClr val="000000"/>
+                </a:solidFill>
+                <a:effectLst/>
+                <a:latin typeface="Menlo" panose="020B0609030804020204" pitchFamily="49" charset="0"/>
+              </a:rPr>
+              <a:t>titanic</a:t>
+            </a:r>
+            <a:r>
+              <a:rPr lang="fr-FR" b="0" dirty="0">
+                <a:solidFill>
+                  <a:srgbClr val="000000"/>
+                </a:solidFill>
+                <a:effectLst/>
+                <a:latin typeface="Menlo" panose="020B0609030804020204" pitchFamily="49" charset="0"/>
+              </a:rPr>
+              <a:t>(</a:t>
+            </a:r>
+            <a:r>
+              <a:rPr lang="fr-FR" b="0" dirty="0" err="1">
+                <a:solidFill>
+                  <a:srgbClr val="000000"/>
+                </a:solidFill>
+                <a:effectLst/>
+                <a:latin typeface="Menlo" panose="020B0609030804020204" pitchFamily="49" charset="0"/>
+              </a:rPr>
+              <a:t>column</a:t>
+            </a:r>
+            <a:r>
+              <a:rPr lang="fr-FR" b="0" dirty="0">
+                <a:solidFill>
+                  <a:srgbClr val="000000"/>
+                </a:solidFill>
+                <a:effectLst/>
+                <a:latin typeface="Menlo" panose="020B0609030804020204" pitchFamily="49" charset="0"/>
+              </a:rPr>
+              <a:t>).</a:t>
+            </a:r>
+            <a:r>
+              <a:rPr lang="fr-FR" b="0" dirty="0" err="1">
+                <a:solidFill>
+                  <a:srgbClr val="000000"/>
+                </a:solidFill>
+                <a:effectLst/>
+                <a:latin typeface="Menlo" panose="020B0609030804020204" pitchFamily="49" charset="0"/>
+              </a:rPr>
+              <a:t>cast</a:t>
+            </a:r>
+            <a:r>
+              <a:rPr lang="fr-FR" b="0" dirty="0">
+                <a:solidFill>
+                  <a:srgbClr val="000000"/>
+                </a:solidFill>
+                <a:effectLst/>
+                <a:latin typeface="Menlo" panose="020B0609030804020204" pitchFamily="49" charset="0"/>
+              </a:rPr>
+              <a:t>(</a:t>
+            </a:r>
+            <a:r>
+              <a:rPr lang="fr-FR" b="0" dirty="0">
+                <a:solidFill>
+                  <a:srgbClr val="A31515"/>
+                </a:solidFill>
+                <a:effectLst/>
+                <a:latin typeface="Menlo" panose="020B0609030804020204" pitchFamily="49" charset="0"/>
+              </a:rPr>
+              <a:t>"</a:t>
+            </a:r>
+            <a:r>
+              <a:rPr lang="fr-FR" b="0" dirty="0" err="1">
+                <a:solidFill>
+                  <a:srgbClr val="A31515"/>
+                </a:solidFill>
+                <a:effectLst/>
+                <a:latin typeface="Menlo" panose="020B0609030804020204" pitchFamily="49" charset="0"/>
+              </a:rPr>
+              <a:t>int</a:t>
+            </a:r>
+            <a:r>
+              <a:rPr lang="fr-FR" b="0" dirty="0">
+                <a:solidFill>
+                  <a:srgbClr val="A31515"/>
+                </a:solidFill>
+                <a:effectLst/>
+                <a:latin typeface="Menlo" panose="020B0609030804020204" pitchFamily="49" charset="0"/>
+              </a:rPr>
+              <a:t>"</a:t>
+            </a:r>
+            <a:r>
+              <a:rPr lang="fr-FR" b="0" dirty="0">
+                <a:solidFill>
+                  <a:srgbClr val="000000"/>
+                </a:solidFill>
+                <a:effectLst/>
+                <a:latin typeface="Menlo" panose="020B0609030804020204" pitchFamily="49" charset="0"/>
+              </a:rPr>
+              <a:t>).as(</a:t>
+            </a:r>
+            <a:r>
+              <a:rPr lang="fr-FR" b="0" dirty="0" err="1">
+                <a:solidFill>
+                  <a:srgbClr val="000000"/>
+                </a:solidFill>
+                <a:effectLst/>
+                <a:latin typeface="Menlo" panose="020B0609030804020204" pitchFamily="49" charset="0"/>
+              </a:rPr>
+              <a:t>column</a:t>
+            </a:r>
+            <a:r>
+              <a:rPr lang="fr-FR" b="0" dirty="0">
+                <a:solidFill>
+                  <a:srgbClr val="000000"/>
+                </a:solidFill>
+                <a:effectLst/>
+                <a:latin typeface="Menlo" panose="020B0609030804020204" pitchFamily="49" charset="0"/>
+              </a:rPr>
               <a:t>)</a:t>
             </a:r>
           </a:p>
           <a:p>
-            <a:endParaRPr lang="en-US" sz="2400" dirty="0"/>
-          </a:p>
-          <a:p>
-            <a:endParaRPr lang="en-US" sz="2400" dirty="0"/>
-          </a:p>
-          <a:p>
-            <a:r>
-              <a:rPr lang="en-US" sz="2400" dirty="0" err="1"/>
-              <a:t>Corriger</a:t>
-            </a:r>
-            <a:r>
-              <a:rPr lang="en-US" sz="2400" dirty="0"/>
-              <a:t> les </a:t>
-            </a:r>
-            <a:r>
-              <a:rPr lang="en-US" sz="2400" dirty="0" err="1"/>
-              <a:t>erreurs</a:t>
-            </a:r>
-            <a:r>
-              <a:rPr lang="en-US" sz="2400" dirty="0"/>
-              <a:t> de </a:t>
-            </a:r>
-            <a:r>
-              <a:rPr lang="en-US" sz="2400" dirty="0" err="1"/>
-              <a:t>traductions</a:t>
-            </a:r>
-            <a:r>
-              <a:rPr lang="en-US" sz="2400" dirty="0"/>
-              <a:t> (”homme” </a:t>
-            </a:r>
-            <a:r>
-              <a:rPr lang="en-US" sz="2400" dirty="0" err="1"/>
-              <a:t>en</a:t>
-            </a:r>
-            <a:r>
-              <a:rPr lang="en-US" sz="2400" dirty="0"/>
-              <a:t> ”male”, “Monsieur” </a:t>
-            </a:r>
-            <a:r>
-              <a:rPr lang="en-US" sz="2400" dirty="0" err="1"/>
-              <a:t>en</a:t>
-            </a:r>
-            <a:r>
-              <a:rPr lang="en-US" sz="2400" dirty="0"/>
-              <a:t> “</a:t>
-            </a:r>
-            <a:r>
-              <a:rPr lang="en-US" sz="2400" dirty="0" err="1"/>
-              <a:t>Mr</a:t>
-            </a:r>
-            <a:r>
-              <a:rPr lang="en-US" sz="2400" dirty="0"/>
-              <a:t>”...)</a:t>
-            </a:r>
-          </a:p>
-          <a:p>
-            <a:endParaRPr lang="en-US" sz="2400" dirty="0"/>
-          </a:p>
-          <a:p>
-            <a:endParaRPr lang="en-US" sz="2400" dirty="0"/>
-          </a:p>
-          <a:p>
-            <a:r>
-              <a:rPr lang="en-US" sz="2400" dirty="0" err="1"/>
-              <a:t>Ajouter</a:t>
-            </a:r>
-            <a:r>
-              <a:rPr lang="en-US" sz="2400" dirty="0"/>
-              <a:t> de </a:t>
-            </a:r>
-            <a:r>
-              <a:rPr lang="en-US" sz="2400" dirty="0" err="1"/>
-              <a:t>nouvelles</a:t>
-            </a:r>
-            <a:r>
-              <a:rPr lang="en-US" sz="2400" dirty="0"/>
-              <a:t> variables pour </a:t>
-            </a:r>
-            <a:r>
-              <a:rPr lang="en-US" sz="2400" dirty="0" err="1"/>
-              <a:t>enrichir</a:t>
-            </a:r>
-            <a:r>
-              <a:rPr lang="en-US" sz="2400" dirty="0"/>
+            <a:pPr lvl="2"/>
+            <a:endParaRPr lang="fr-FR" b="0" dirty="0">
+              <a:solidFill>
+                <a:srgbClr val="AF00DB"/>
+              </a:solidFill>
+              <a:effectLst/>
+              <a:latin typeface="Menlo" panose="020B0609030804020204" pitchFamily="49" charset="0"/>
+            </a:endParaRPr>
+          </a:p>
+          <a:p>
+            <a:pPr lvl="2"/>
+            <a:r>
+              <a:rPr lang="fr-FR" b="0" dirty="0">
+                <a:solidFill>
+                  <a:srgbClr val="AF00DB"/>
+                </a:solidFill>
+                <a:effectLst/>
+                <a:latin typeface="Menlo" panose="020B0609030804020204" pitchFamily="49" charset="0"/>
+              </a:rPr>
+              <a:t>case</a:t>
+            </a:r>
+            <a:r>
+              <a:rPr lang="fr-FR" b="0" dirty="0">
+                <a:solidFill>
+                  <a:srgbClr val="000000"/>
+                </a:solidFill>
+                <a:effectLst/>
+                <a:latin typeface="Menlo" panose="020B0609030804020204" pitchFamily="49" charset="0"/>
+              </a:rPr>
               <a:t> </a:t>
             </a:r>
             <a:r>
-              <a:rPr lang="en-US" sz="2400" dirty="0" err="1"/>
-              <a:t>notre</a:t>
-            </a:r>
-            <a:r>
-              <a:rPr lang="en-US" sz="2400" dirty="0"/>
-              <a:t> jeu de </a:t>
-            </a:r>
-            <a:r>
-              <a:rPr lang="en-US" sz="2400" dirty="0" err="1"/>
-              <a:t>données</a:t>
-            </a:r>
-            <a:endParaRPr lang="en-US" sz="2400" dirty="0"/>
-          </a:p>
-          <a:p>
-            <a:endParaRPr lang="en-US" dirty="0"/>
-          </a:p>
-          <a:p>
-            <a:endParaRPr lang="en-US" dirty="0"/>
-          </a:p>
-          <a:p>
-            <a:pPr marL="180975" lvl="1" indent="0">
-              <a:buNone/>
-            </a:pPr>
-            <a:endParaRPr lang="en-US" dirty="0"/>
+              <a:rPr lang="fr-FR" b="0" dirty="0" err="1">
+                <a:solidFill>
+                  <a:srgbClr val="000000"/>
+                </a:solidFill>
+                <a:effectLst/>
+                <a:latin typeface="Menlo" panose="020B0609030804020204" pitchFamily="49" charset="0"/>
+              </a:rPr>
+              <a:t>column</a:t>
+            </a:r>
+            <a:r>
+              <a:rPr lang="fr-FR" b="0" dirty="0">
+                <a:solidFill>
+                  <a:srgbClr val="000000"/>
+                </a:solidFill>
+                <a:effectLst/>
+                <a:latin typeface="Menlo" panose="020B0609030804020204" pitchFamily="49" charset="0"/>
+              </a:rPr>
+              <a:t>@(</a:t>
+            </a:r>
+            <a:r>
+              <a:rPr lang="fr-FR" b="0" dirty="0">
+                <a:solidFill>
+                  <a:srgbClr val="A31515"/>
+                </a:solidFill>
+                <a:effectLst/>
+                <a:latin typeface="Menlo" panose="020B0609030804020204" pitchFamily="49" charset="0"/>
+              </a:rPr>
+              <a:t>"Age"</a:t>
+            </a:r>
+            <a:r>
+              <a:rPr lang="fr-FR" b="0" dirty="0">
+                <a:solidFill>
+                  <a:srgbClr val="000000"/>
+                </a:solidFill>
+                <a:effectLst/>
+                <a:latin typeface="Menlo" panose="020B0609030804020204" pitchFamily="49" charset="0"/>
+              </a:rPr>
+              <a:t> | </a:t>
+            </a:r>
+            <a:r>
+              <a:rPr lang="fr-FR" b="0" dirty="0">
+                <a:solidFill>
+                  <a:srgbClr val="A31515"/>
+                </a:solidFill>
+                <a:effectLst/>
+                <a:latin typeface="Menlo" panose="020B0609030804020204" pitchFamily="49" charset="0"/>
+              </a:rPr>
+              <a:t>"Fare"</a:t>
+            </a:r>
+            <a:r>
+              <a:rPr lang="fr-FR" b="0" dirty="0">
+                <a:solidFill>
+                  <a:srgbClr val="000000"/>
+                </a:solidFill>
+                <a:effectLst/>
+                <a:latin typeface="Menlo" panose="020B0609030804020204" pitchFamily="49" charset="0"/>
+              </a:rPr>
+              <a:t>) =&gt; </a:t>
+            </a:r>
+            <a:r>
+              <a:rPr lang="fr-FR" b="0" dirty="0" err="1">
+                <a:solidFill>
+                  <a:srgbClr val="000000"/>
+                </a:solidFill>
+                <a:effectLst/>
+                <a:latin typeface="Menlo" panose="020B0609030804020204" pitchFamily="49" charset="0"/>
+              </a:rPr>
+              <a:t>titanic</a:t>
+            </a:r>
+            <a:r>
+              <a:rPr lang="fr-FR" b="0" dirty="0">
+                <a:solidFill>
+                  <a:srgbClr val="000000"/>
+                </a:solidFill>
+                <a:effectLst/>
+                <a:latin typeface="Menlo" panose="020B0609030804020204" pitchFamily="49" charset="0"/>
+              </a:rPr>
+              <a:t>(</a:t>
+            </a:r>
+            <a:r>
+              <a:rPr lang="fr-FR" b="0" dirty="0" err="1">
+                <a:solidFill>
+                  <a:srgbClr val="000000"/>
+                </a:solidFill>
+                <a:effectLst/>
+                <a:latin typeface="Menlo" panose="020B0609030804020204" pitchFamily="49" charset="0"/>
+              </a:rPr>
+              <a:t>column</a:t>
+            </a:r>
+            <a:r>
+              <a:rPr lang="fr-FR" b="0" dirty="0">
+                <a:solidFill>
+                  <a:srgbClr val="000000"/>
+                </a:solidFill>
+                <a:effectLst/>
+                <a:latin typeface="Menlo" panose="020B0609030804020204" pitchFamily="49" charset="0"/>
+              </a:rPr>
+              <a:t>).</a:t>
+            </a:r>
+            <a:r>
+              <a:rPr lang="fr-FR" b="0" dirty="0" err="1">
+                <a:solidFill>
+                  <a:srgbClr val="000000"/>
+                </a:solidFill>
+                <a:effectLst/>
+                <a:latin typeface="Menlo" panose="020B0609030804020204" pitchFamily="49" charset="0"/>
+              </a:rPr>
+              <a:t>cast</a:t>
+            </a:r>
+            <a:r>
+              <a:rPr lang="fr-FR" b="0" dirty="0">
+                <a:solidFill>
+                  <a:srgbClr val="000000"/>
+                </a:solidFill>
+                <a:effectLst/>
+                <a:latin typeface="Menlo" panose="020B0609030804020204" pitchFamily="49" charset="0"/>
+              </a:rPr>
+              <a:t>(</a:t>
+            </a:r>
+            <a:r>
+              <a:rPr lang="fr-FR" b="0" dirty="0">
+                <a:solidFill>
+                  <a:srgbClr val="A31515"/>
+                </a:solidFill>
+                <a:effectLst/>
+                <a:latin typeface="Menlo" panose="020B0609030804020204" pitchFamily="49" charset="0"/>
+              </a:rPr>
+              <a:t>"double"</a:t>
+            </a:r>
+            <a:r>
+              <a:rPr lang="fr-FR" b="0" dirty="0">
+                <a:solidFill>
+                  <a:srgbClr val="000000"/>
+                </a:solidFill>
+                <a:effectLst/>
+                <a:latin typeface="Menlo" panose="020B0609030804020204" pitchFamily="49" charset="0"/>
+              </a:rPr>
+              <a:t>).as(</a:t>
+            </a:r>
+            <a:r>
+              <a:rPr lang="fr-FR" b="0" dirty="0" err="1">
+                <a:solidFill>
+                  <a:srgbClr val="000000"/>
+                </a:solidFill>
+                <a:effectLst/>
+                <a:latin typeface="Menlo" panose="020B0609030804020204" pitchFamily="49" charset="0"/>
+              </a:rPr>
+              <a:t>column</a:t>
+            </a:r>
+            <a:r>
+              <a:rPr lang="fr-FR" b="0" dirty="0">
+                <a:solidFill>
+                  <a:srgbClr val="000000"/>
+                </a:solidFill>
+                <a:effectLst/>
+                <a:latin typeface="Menlo" panose="020B0609030804020204" pitchFamily="49" charset="0"/>
+              </a:rPr>
+              <a:t>)</a:t>
+            </a:r>
+          </a:p>
+          <a:p>
+            <a:pPr lvl="2"/>
+            <a:endParaRPr lang="fr-FR" b="0" dirty="0">
+              <a:solidFill>
+                <a:srgbClr val="AF00DB"/>
+              </a:solidFill>
+              <a:effectLst/>
+              <a:latin typeface="Menlo" panose="020B0609030804020204" pitchFamily="49" charset="0"/>
+            </a:endParaRPr>
+          </a:p>
+          <a:p>
+            <a:pPr lvl="2"/>
+            <a:r>
+              <a:rPr lang="fr-FR" b="0" dirty="0">
+                <a:solidFill>
+                  <a:srgbClr val="AF00DB"/>
+                </a:solidFill>
+                <a:effectLst/>
+                <a:latin typeface="Menlo" panose="020B0609030804020204" pitchFamily="49" charset="0"/>
+              </a:rPr>
+              <a:t>case</a:t>
+            </a:r>
+            <a:r>
+              <a:rPr lang="fr-FR" b="0" dirty="0">
+                <a:solidFill>
+                  <a:srgbClr val="000000"/>
+                </a:solidFill>
+                <a:effectLst/>
+                <a:latin typeface="Menlo" panose="020B0609030804020204" pitchFamily="49" charset="0"/>
+              </a:rPr>
+              <a:t> </a:t>
+            </a:r>
+            <a:r>
+              <a:rPr lang="fr-FR" b="0" dirty="0" err="1">
+                <a:solidFill>
+                  <a:srgbClr val="000000"/>
+                </a:solidFill>
+                <a:effectLst/>
+                <a:latin typeface="Menlo" panose="020B0609030804020204" pitchFamily="49" charset="0"/>
+              </a:rPr>
+              <a:t>column</a:t>
+            </a:r>
+            <a:r>
+              <a:rPr lang="fr-FR" b="0" dirty="0">
+                <a:solidFill>
+                  <a:srgbClr val="000000"/>
+                </a:solidFill>
+                <a:effectLst/>
+                <a:latin typeface="Menlo" panose="020B0609030804020204" pitchFamily="49" charset="0"/>
+              </a:rPr>
+              <a:t> =&gt; </a:t>
+            </a:r>
+            <a:r>
+              <a:rPr lang="fr-FR" b="0" dirty="0" err="1">
+                <a:solidFill>
+                  <a:srgbClr val="000000"/>
+                </a:solidFill>
+                <a:effectLst/>
+                <a:latin typeface="Menlo" panose="020B0609030804020204" pitchFamily="49" charset="0"/>
+              </a:rPr>
+              <a:t>titanic</a:t>
+            </a:r>
+            <a:r>
+              <a:rPr lang="fr-FR" b="0" dirty="0">
+                <a:solidFill>
+                  <a:srgbClr val="000000"/>
+                </a:solidFill>
+                <a:effectLst/>
+                <a:latin typeface="Menlo" panose="020B0609030804020204" pitchFamily="49" charset="0"/>
+              </a:rPr>
+              <a:t>(</a:t>
+            </a:r>
+            <a:r>
+              <a:rPr lang="fr-FR" b="0" dirty="0" err="1">
+                <a:solidFill>
+                  <a:srgbClr val="000000"/>
+                </a:solidFill>
+                <a:effectLst/>
+                <a:latin typeface="Menlo" panose="020B0609030804020204" pitchFamily="49" charset="0"/>
+              </a:rPr>
+              <a:t>column</a:t>
+            </a:r>
+            <a:r>
+              <a:rPr lang="fr-FR" b="0" dirty="0">
+                <a:solidFill>
+                  <a:srgbClr val="000000"/>
+                </a:solidFill>
+                <a:effectLst/>
+                <a:latin typeface="Menlo" panose="020B0609030804020204" pitchFamily="49" charset="0"/>
+              </a:rPr>
+              <a:t>).</a:t>
+            </a:r>
+            <a:r>
+              <a:rPr lang="fr-FR" b="0" dirty="0" err="1">
+                <a:solidFill>
+                  <a:srgbClr val="000000"/>
+                </a:solidFill>
+                <a:effectLst/>
+                <a:latin typeface="Menlo" panose="020B0609030804020204" pitchFamily="49" charset="0"/>
+              </a:rPr>
+              <a:t>cast</a:t>
+            </a:r>
+            <a:r>
+              <a:rPr lang="fr-FR" b="0" dirty="0">
+                <a:solidFill>
+                  <a:srgbClr val="000000"/>
+                </a:solidFill>
+                <a:effectLst/>
+                <a:latin typeface="Menlo" panose="020B0609030804020204" pitchFamily="49" charset="0"/>
+              </a:rPr>
+              <a:t>(</a:t>
+            </a:r>
+            <a:r>
+              <a:rPr lang="fr-FR" b="0" dirty="0">
+                <a:solidFill>
+                  <a:srgbClr val="A31515"/>
+                </a:solidFill>
+                <a:effectLst/>
+                <a:latin typeface="Menlo" panose="020B0609030804020204" pitchFamily="49" charset="0"/>
+              </a:rPr>
+              <a:t>"string"</a:t>
+            </a:r>
+            <a:r>
+              <a:rPr lang="fr-FR" b="0" dirty="0">
+                <a:solidFill>
+                  <a:srgbClr val="000000"/>
+                </a:solidFill>
+                <a:effectLst/>
+                <a:latin typeface="Menlo" panose="020B0609030804020204" pitchFamily="49" charset="0"/>
+              </a:rPr>
+              <a:t>).as(</a:t>
+            </a:r>
+            <a:r>
+              <a:rPr lang="fr-FR" b="0" dirty="0" err="1">
+                <a:solidFill>
+                  <a:srgbClr val="000000"/>
+                </a:solidFill>
+                <a:effectLst/>
+                <a:latin typeface="Menlo" panose="020B0609030804020204" pitchFamily="49" charset="0"/>
+              </a:rPr>
+              <a:t>column</a:t>
+            </a:r>
+            <a:r>
+              <a:rPr lang="fr-FR" b="0" dirty="0">
+                <a:solidFill>
+                  <a:srgbClr val="000000"/>
+                </a:solidFill>
+                <a:effectLst/>
+                <a:latin typeface="Menlo" panose="020B0609030804020204" pitchFamily="49" charset="0"/>
+              </a:rPr>
+              <a:t>)</a:t>
+            </a:r>
           </a:p>
           <a:p>
             <a:pPr lvl="1"/>
-            <a:endParaRPr lang="en-US" dirty="0"/>
-          </a:p>
-          <a:p>
-            <a:endParaRPr lang="en-US" dirty="0"/>
-          </a:p>
-          <a:p>
-            <a:endParaRPr lang="en-US" dirty="0"/>
-          </a:p>
-          <a:p>
-            <a:endParaRPr lang="en-US" dirty="0"/>
-          </a:p>
-          <a:p>
-            <a:endParaRPr lang="en-US" dirty="0"/>
-          </a:p>
-          <a:p>
-            <a:pPr lvl="1"/>
-            <a:endParaRPr lang="en-US" dirty="0"/>
-          </a:p>
-          <a:p>
-            <a:pPr lvl="1"/>
-            <a:endParaRPr lang="en-US" dirty="0"/>
-          </a:p>
-          <a:p>
-            <a:pPr lvl="1"/>
-            <a:endParaRPr lang="en-US" dirty="0"/>
-          </a:p>
-          <a:p>
-            <a:pPr lvl="1"/>
-            <a:endParaRPr lang="en-US" dirty="0"/>
-          </a:p>
-          <a:p>
-            <a:endParaRPr lang="en-US" b="1" dirty="0"/>
-          </a:p>
-          <a:p>
-            <a:endParaRPr lang="en-US" dirty="0"/>
+            <a:r>
+              <a:rPr lang="fr-FR" b="0" dirty="0">
+                <a:solidFill>
+                  <a:srgbClr val="000000"/>
+                </a:solidFill>
+                <a:effectLst/>
+                <a:latin typeface="Menlo" panose="020B0609030804020204" pitchFamily="49" charset="0"/>
+              </a:rPr>
+              <a:t>}:_*)</a:t>
+            </a:r>
+          </a:p>
+          <a:p>
+            <a:r>
+              <a:rPr lang="fr-FR" b="0" dirty="0">
+                <a:solidFill>
+                  <a:srgbClr val="000000"/>
+                </a:solidFill>
+                <a:effectLst/>
+                <a:latin typeface="Menlo" panose="020B0609030804020204" pitchFamily="49" charset="0"/>
+              </a:rPr>
+              <a:t>}</a:t>
+            </a:r>
           </a:p>
         </p:txBody>
       </p:sp>
     </p:spTree>
     <p:extLst>
       <p:ext uri="{BB962C8B-B14F-4D97-AF65-F5344CB8AC3E}">
-        <p14:creationId xmlns:p14="http://schemas.microsoft.com/office/powerpoint/2010/main" val="3545527254"/>
+        <p14:creationId xmlns:p14="http://schemas.microsoft.com/office/powerpoint/2010/main" val="2108614503"/>
       </p:ext>
     </p:extLst>
   </p:cSld>
@@ -15243,6 +16113,1817 @@
       </p:grpSpPr>
       <p:sp>
         <p:nvSpPr>
+          <p:cNvPr id="2" name="Title 1">
+            <a:extLst>
+              <a:ext uri="{FF2B5EF4-FFF2-40B4-BE49-F238E27FC236}">
+                <a16:creationId xmlns:a16="http://schemas.microsoft.com/office/drawing/2014/main" id="{04C5DF06-5F42-4296-B27B-4F79E0DB836B}"/>
+              </a:ext>
+            </a:extLst>
+          </p:cNvPr>
+          <p:cNvSpPr>
+            <a:spLocks noGrp="1"/>
+          </p:cNvSpPr>
+          <p:nvPr>
+            <p:ph type="title"/>
+          </p:nvPr>
+        </p:nvSpPr>
+        <p:spPr/>
+        <p:txBody>
+          <a:bodyPr/>
+          <a:lstStyle/>
+          <a:p>
+            <a:r>
+              <a:rPr lang="en-US" dirty="0"/>
+              <a:t>Objectif</a:t>
+            </a:r>
+          </a:p>
+        </p:txBody>
+      </p:sp>
+      <p:sp>
+        <p:nvSpPr>
+          <p:cNvPr id="5" name="Slide Number Placeholder 4">
+            <a:extLst>
+              <a:ext uri="{FF2B5EF4-FFF2-40B4-BE49-F238E27FC236}">
+                <a16:creationId xmlns:a16="http://schemas.microsoft.com/office/drawing/2014/main" id="{B756D4B6-3814-4E02-AB98-08D3B49675BF}"/>
+              </a:ext>
+            </a:extLst>
+          </p:cNvPr>
+          <p:cNvSpPr>
+            <a:spLocks noGrp="1"/>
+          </p:cNvSpPr>
+          <p:nvPr>
+            <p:ph type="sldNum" sz="quarter" idx="4"/>
+          </p:nvPr>
+        </p:nvSpPr>
+        <p:spPr/>
+        <p:txBody>
+          <a:bodyPr/>
+          <a:lstStyle/>
+          <a:p>
+            <a:fld id="{5EE7099E-8998-4851-915A-4F4831808297}" type="slidenum">
+              <a:rPr lang="nl-NL" smtClean="0"/>
+              <a:pPr/>
+              <a:t>19</a:t>
+            </a:fld>
+            <a:endParaRPr lang="nl-NL"/>
+          </a:p>
+        </p:txBody>
+      </p:sp>
+      <p:sp>
+        <p:nvSpPr>
+          <p:cNvPr id="3" name="ZoneTexte 2">
+            <a:extLst>
+              <a:ext uri="{FF2B5EF4-FFF2-40B4-BE49-F238E27FC236}">
+                <a16:creationId xmlns:a16="http://schemas.microsoft.com/office/drawing/2014/main" id="{0C248AA7-6FCB-3F89-E3DD-C837A2826405}"/>
+              </a:ext>
+            </a:extLst>
+          </p:cNvPr>
+          <p:cNvSpPr txBox="1"/>
+          <p:nvPr/>
+        </p:nvSpPr>
+        <p:spPr>
+          <a:xfrm>
+            <a:off x="3692106" y="1699404"/>
+            <a:ext cx="0" cy="0"/>
+          </a:xfrm>
+          <a:prstGeom prst="rect">
+            <a:avLst/>
+          </a:prstGeom>
+          <a:noFill/>
+        </p:spPr>
+        <p:txBody>
+          <a:bodyPr wrap="none" lIns="108000" tIns="108000" rIns="108000" bIns="108000" rtlCol="0">
+            <a:noAutofit/>
+          </a:bodyPr>
+          <a:lstStyle/>
+          <a:p>
+            <a:endParaRPr lang="fr-FR" noProof="0" dirty="0" err="1">
+              <a:solidFill>
+                <a:schemeClr val="bg2"/>
+              </a:solidFill>
+            </a:endParaRPr>
+          </a:p>
+        </p:txBody>
+      </p:sp>
+      <p:sp>
+        <p:nvSpPr>
+          <p:cNvPr id="6" name="Vertical Text Placeholder 5">
+            <a:extLst>
+              <a:ext uri="{FF2B5EF4-FFF2-40B4-BE49-F238E27FC236}">
+                <a16:creationId xmlns:a16="http://schemas.microsoft.com/office/drawing/2014/main" id="{F8170739-5212-AEC7-557E-2E086A29A496}"/>
+              </a:ext>
+            </a:extLst>
+          </p:cNvPr>
+          <p:cNvSpPr>
+            <a:spLocks noGrp="1"/>
+          </p:cNvSpPr>
+          <p:nvPr>
+            <p:ph type="body" orient="vert" idx="1"/>
+          </p:nvPr>
+        </p:nvSpPr>
+        <p:spPr>
+          <a:xfrm>
+            <a:off x="404662" y="1143000"/>
+            <a:ext cx="11389023" cy="4795836"/>
+          </a:xfrm>
+        </p:spPr>
+        <p:txBody>
+          <a:bodyPr/>
+          <a:lstStyle/>
+          <a:p>
+            <a:pPr marL="0" indent="0">
+              <a:buNone/>
+            </a:pPr>
+            <a:r>
+              <a:rPr lang="en-US" sz="2400" dirty="0" err="1"/>
+              <a:t>Harmoniser</a:t>
+            </a:r>
+            <a:r>
+              <a:rPr lang="en-US" sz="2400" dirty="0"/>
+              <a:t> la </a:t>
+            </a:r>
+            <a:r>
+              <a:rPr lang="en-US" sz="2400" dirty="0" err="1"/>
+              <a:t>traduction</a:t>
+            </a:r>
+            <a:r>
+              <a:rPr lang="en-US" sz="2400" dirty="0"/>
+              <a:t> dans le jeu de </a:t>
+            </a:r>
+            <a:r>
+              <a:rPr lang="en-US" sz="2400" dirty="0" err="1"/>
+              <a:t>données</a:t>
+            </a:r>
+            <a:endParaRPr lang="en-US" sz="2400" dirty="0"/>
+          </a:p>
+          <a:p>
+            <a:pPr marL="0" indent="0">
+              <a:buNone/>
+            </a:pPr>
+            <a:endParaRPr lang="en-US" dirty="0"/>
+          </a:p>
+          <a:p>
+            <a:endParaRPr lang="en-US" dirty="0"/>
+          </a:p>
+          <a:p>
+            <a:pPr marL="180975" lvl="1" indent="0">
+              <a:buNone/>
+            </a:pPr>
+            <a:endParaRPr lang="en-US" dirty="0"/>
+          </a:p>
+          <a:p>
+            <a:pPr lvl="1"/>
+            <a:endParaRPr lang="en-US" dirty="0"/>
+          </a:p>
+          <a:p>
+            <a:endParaRPr lang="en-US" dirty="0"/>
+          </a:p>
+          <a:p>
+            <a:endParaRPr lang="en-US" dirty="0"/>
+          </a:p>
+          <a:p>
+            <a:endParaRPr lang="en-US" dirty="0"/>
+          </a:p>
+          <a:p>
+            <a:endParaRPr lang="en-US" dirty="0"/>
+          </a:p>
+          <a:p>
+            <a:pPr lvl="1"/>
+            <a:endParaRPr lang="en-US" dirty="0"/>
+          </a:p>
+          <a:p>
+            <a:pPr lvl="1"/>
+            <a:endParaRPr lang="en-US" dirty="0"/>
+          </a:p>
+          <a:p>
+            <a:pPr lvl="1"/>
+            <a:endParaRPr lang="en-US" dirty="0"/>
+          </a:p>
+          <a:p>
+            <a:pPr lvl="1"/>
+            <a:endParaRPr lang="en-US" dirty="0"/>
+          </a:p>
+          <a:p>
+            <a:endParaRPr lang="en-US" b="1" dirty="0"/>
+          </a:p>
+          <a:p>
+            <a:endParaRPr lang="en-US" dirty="0"/>
+          </a:p>
+        </p:txBody>
+      </p:sp>
+      <p:pic>
+        <p:nvPicPr>
+          <p:cNvPr id="1026" name="Picture 2">
+            <a:extLst>
+              <a:ext uri="{FF2B5EF4-FFF2-40B4-BE49-F238E27FC236}">
+                <a16:creationId xmlns:a16="http://schemas.microsoft.com/office/drawing/2014/main" id="{D23B0387-174D-7BC1-8284-AE0FB2D7AA64}"/>
+              </a:ext>
+            </a:extLst>
+          </p:cNvPr>
+          <p:cNvPicPr>
+            <a:picLocks noChangeAspect="1" noChangeArrowheads="1"/>
+          </p:cNvPicPr>
+          <p:nvPr/>
+        </p:nvPicPr>
+        <p:blipFill>
+          <a:blip r:embed="rId2">
+            <a:extLst>
+              <a:ext uri="{28A0092B-C50C-407E-A947-70E740481C1C}">
+                <a14:useLocalDpi xmlns:a14="http://schemas.microsoft.com/office/drawing/2010/main" val="0"/>
+              </a:ext>
+            </a:extLst>
+          </a:blip>
+          <a:srcRect/>
+          <a:stretch>
+            <a:fillRect/>
+          </a:stretch>
+        </p:blipFill>
+        <p:spPr bwMode="auto">
+          <a:xfrm>
+            <a:off x="917575" y="2194408"/>
+            <a:ext cx="8509000" cy="2921000"/>
+          </a:xfrm>
+          <a:prstGeom prst="rect">
+            <a:avLst/>
+          </a:prstGeom>
+          <a:noFill/>
+          <a:extLst>
+            <a:ext uri="{909E8E84-426E-40DD-AFC4-6F175D3DCCD1}">
+              <a14:hiddenFill xmlns:a14="http://schemas.microsoft.com/office/drawing/2010/main">
+                <a:solidFill>
+                  <a:srgbClr val="FFFFFF"/>
+                </a:solidFill>
+              </a14:hiddenFill>
+            </a:ext>
+          </a:extLst>
+        </p:spPr>
+      </p:pic>
+      <p:sp>
+        <p:nvSpPr>
+          <p:cNvPr id="12" name="Rectangle 11">
+            <a:extLst>
+              <a:ext uri="{FF2B5EF4-FFF2-40B4-BE49-F238E27FC236}">
+                <a16:creationId xmlns:a16="http://schemas.microsoft.com/office/drawing/2014/main" id="{7ACFC66D-ECF0-087C-87DE-CB4CC41101AD}"/>
+              </a:ext>
+            </a:extLst>
+          </p:cNvPr>
+          <p:cNvSpPr/>
+          <p:nvPr/>
+        </p:nvSpPr>
+        <p:spPr>
+          <a:xfrm>
+            <a:off x="5565775" y="4267200"/>
+            <a:ext cx="762000" cy="266548"/>
+          </a:xfrm>
+          <a:prstGeom prst="rect">
+            <a:avLst/>
+          </a:prstGeom>
+          <a:noFill/>
+          <a:ln>
+            <a:solidFill>
+              <a:srgbClr val="0070C0"/>
+            </a:solidFill>
+          </a:ln>
+        </p:spPr>
+        <p:style>
+          <a:lnRef idx="2">
+            <a:schemeClr val="accent1">
+              <a:shade val="50000"/>
+            </a:schemeClr>
+          </a:lnRef>
+          <a:fillRef idx="1">
+            <a:schemeClr val="accent1"/>
+          </a:fillRef>
+          <a:effectRef idx="0">
+            <a:schemeClr val="accent1"/>
+          </a:effectRef>
+          <a:fontRef idx="minor">
+            <a:schemeClr val="lt1"/>
+          </a:fontRef>
+        </p:style>
+        <p:txBody>
+          <a:bodyPr rtlCol="0" anchor="ctr"/>
+          <a:lstStyle/>
+          <a:p>
+            <a:pPr algn="ctr"/>
+            <a:endParaRPr lang="fr-FR"/>
+          </a:p>
+        </p:txBody>
+      </p:sp>
+      <p:sp>
+        <p:nvSpPr>
+          <p:cNvPr id="11" name="Rectangle 10">
+            <a:extLst>
+              <a:ext uri="{FF2B5EF4-FFF2-40B4-BE49-F238E27FC236}">
+                <a16:creationId xmlns:a16="http://schemas.microsoft.com/office/drawing/2014/main" id="{79DB7523-736A-5ED2-9BBC-0DD22A5EEFA6}"/>
+              </a:ext>
+            </a:extLst>
+          </p:cNvPr>
+          <p:cNvSpPr/>
+          <p:nvPr/>
+        </p:nvSpPr>
+        <p:spPr>
+          <a:xfrm>
+            <a:off x="8232775" y="4267200"/>
+            <a:ext cx="533400" cy="266548"/>
+          </a:xfrm>
+          <a:prstGeom prst="rect">
+            <a:avLst/>
+          </a:prstGeom>
+          <a:noFill/>
+          <a:ln>
+            <a:solidFill>
+              <a:srgbClr val="00B050"/>
+            </a:solidFill>
+          </a:ln>
+        </p:spPr>
+        <p:style>
+          <a:lnRef idx="2">
+            <a:schemeClr val="accent1">
+              <a:shade val="50000"/>
+            </a:schemeClr>
+          </a:lnRef>
+          <a:fillRef idx="1">
+            <a:schemeClr val="accent1"/>
+          </a:fillRef>
+          <a:effectRef idx="0">
+            <a:schemeClr val="accent1"/>
+          </a:effectRef>
+          <a:fontRef idx="minor">
+            <a:schemeClr val="lt1"/>
+          </a:fontRef>
+        </p:style>
+        <p:txBody>
+          <a:bodyPr rtlCol="0" anchor="ctr"/>
+          <a:lstStyle/>
+          <a:p>
+            <a:pPr algn="ctr"/>
+            <a:endParaRPr lang="fr-FR"/>
+          </a:p>
+        </p:txBody>
+      </p:sp>
+      <p:sp>
+        <p:nvSpPr>
+          <p:cNvPr id="14" name="Rectangle 13">
+            <a:extLst>
+              <a:ext uri="{FF2B5EF4-FFF2-40B4-BE49-F238E27FC236}">
+                <a16:creationId xmlns:a16="http://schemas.microsoft.com/office/drawing/2014/main" id="{C428FB62-BC17-B741-1DD8-B6215074BC8D}"/>
+              </a:ext>
+            </a:extLst>
+          </p:cNvPr>
+          <p:cNvSpPr/>
+          <p:nvPr/>
+        </p:nvSpPr>
+        <p:spPr>
+          <a:xfrm>
+            <a:off x="8232775" y="4848860"/>
+            <a:ext cx="685800" cy="266548"/>
+          </a:xfrm>
+          <a:prstGeom prst="rect">
+            <a:avLst/>
+          </a:prstGeom>
+          <a:noFill/>
+          <a:ln>
+            <a:solidFill>
+              <a:srgbClr val="00B050"/>
+            </a:solidFill>
+          </a:ln>
+        </p:spPr>
+        <p:style>
+          <a:lnRef idx="2">
+            <a:schemeClr val="accent1">
+              <a:shade val="50000"/>
+            </a:schemeClr>
+          </a:lnRef>
+          <a:fillRef idx="1">
+            <a:schemeClr val="accent1"/>
+          </a:fillRef>
+          <a:effectRef idx="0">
+            <a:schemeClr val="accent1"/>
+          </a:effectRef>
+          <a:fontRef idx="minor">
+            <a:schemeClr val="lt1"/>
+          </a:fontRef>
+        </p:style>
+        <p:txBody>
+          <a:bodyPr rtlCol="0" anchor="ctr"/>
+          <a:lstStyle/>
+          <a:p>
+            <a:pPr algn="ctr"/>
+            <a:endParaRPr lang="fr-FR"/>
+          </a:p>
+        </p:txBody>
+      </p:sp>
+      <p:sp>
+        <p:nvSpPr>
+          <p:cNvPr id="15" name="Rectangle 14">
+            <a:extLst>
+              <a:ext uri="{FF2B5EF4-FFF2-40B4-BE49-F238E27FC236}">
+                <a16:creationId xmlns:a16="http://schemas.microsoft.com/office/drawing/2014/main" id="{42844DC4-6D80-2680-3924-CC8334D64F9E}"/>
+              </a:ext>
+            </a:extLst>
+          </p:cNvPr>
+          <p:cNvSpPr/>
+          <p:nvPr/>
+        </p:nvSpPr>
+        <p:spPr>
+          <a:xfrm>
+            <a:off x="5260975" y="2830982"/>
+            <a:ext cx="228600" cy="217018"/>
+          </a:xfrm>
+          <a:prstGeom prst="rect">
+            <a:avLst/>
+          </a:prstGeom>
+          <a:noFill/>
+          <a:ln>
+            <a:solidFill>
+              <a:srgbClr val="0070C0"/>
+            </a:solidFill>
+          </a:ln>
+        </p:spPr>
+        <p:style>
+          <a:lnRef idx="2">
+            <a:schemeClr val="accent1">
+              <a:shade val="50000"/>
+            </a:schemeClr>
+          </a:lnRef>
+          <a:fillRef idx="1">
+            <a:schemeClr val="accent1"/>
+          </a:fillRef>
+          <a:effectRef idx="0">
+            <a:schemeClr val="accent1"/>
+          </a:effectRef>
+          <a:fontRef idx="minor">
+            <a:schemeClr val="lt1"/>
+          </a:fontRef>
+        </p:style>
+        <p:txBody>
+          <a:bodyPr rtlCol="0" anchor="ctr"/>
+          <a:lstStyle/>
+          <a:p>
+            <a:pPr algn="ctr"/>
+            <a:endParaRPr lang="fr-FR"/>
+          </a:p>
+        </p:txBody>
+      </p:sp>
+    </p:spTree>
+    <p:extLst>
+      <p:ext uri="{BB962C8B-B14F-4D97-AF65-F5344CB8AC3E}">
+        <p14:creationId xmlns:p14="http://schemas.microsoft.com/office/powerpoint/2010/main" val="315580705"/>
+      </p:ext>
+    </p:extLst>
+  </p:cSld>
+  <p:clrMapOvr>
+    <a:masterClrMapping/>
+  </p:clrMapOvr>
+  <p:transition spd="slow">
+    <p:wipe dir="r"/>
+  </p:transition>
+</p:sld>
+</file>
+
+<file path=ppt/slides/slide2.xml><?xml version="1.0" encoding="utf-8"?>
+<p:sld xmlns:a="http://schemas.openxmlformats.org/drawingml/2006/main" xmlns:r="http://schemas.openxmlformats.org/officeDocument/2006/relationships" xmlns:p="http://schemas.openxmlformats.org/presentationml/2006/main">
+  <p:cSld>
+    <p:spTree>
+      <p:nvGrpSpPr>
+        <p:cNvPr id="1" name=""/>
+        <p:cNvGrpSpPr/>
+        <p:nvPr/>
+      </p:nvGrpSpPr>
+      <p:grpSpPr>
+        <a:xfrm>
+          <a:off x="0" y="0"/>
+          <a:ext cx="0" cy="0"/>
+          <a:chOff x="0" y="0"/>
+          <a:chExt cx="0" cy="0"/>
+        </a:xfrm>
+      </p:grpSpPr>
+      <p:sp>
+        <p:nvSpPr>
+          <p:cNvPr id="2" name="Titel 1"/>
+          <p:cNvSpPr>
+            <a:spLocks noGrp="1"/>
+          </p:cNvSpPr>
+          <p:nvPr>
+            <p:ph type="title"/>
+          </p:nvPr>
+        </p:nvSpPr>
+        <p:spPr/>
+        <p:txBody>
+          <a:bodyPr/>
+          <a:lstStyle/>
+          <a:p>
+            <a:r>
+              <a:rPr lang="nl-NL" dirty="0"/>
+              <a:t>Plan</a:t>
+            </a:r>
+          </a:p>
+        </p:txBody>
+      </p:sp>
+      <p:sp>
+        <p:nvSpPr>
+          <p:cNvPr id="3" name="Tijdelijke aanduiding voor verticale tekst 2"/>
+          <p:cNvSpPr>
+            <a:spLocks noGrp="1"/>
+          </p:cNvSpPr>
+          <p:nvPr>
+            <p:ph type="body" orient="vert" idx="1"/>
+          </p:nvPr>
+        </p:nvSpPr>
+        <p:spPr>
+          <a:xfrm>
+            <a:off x="404662" y="1252836"/>
+            <a:ext cx="11389023" cy="4795836"/>
+          </a:xfrm>
+        </p:spPr>
+        <p:txBody>
+          <a:bodyPr/>
+          <a:lstStyle/>
+          <a:p>
+            <a:r>
+              <a:rPr lang="nl-NL" dirty="0" err="1"/>
+              <a:t>Qu’est-ce</a:t>
+            </a:r>
+            <a:r>
+              <a:rPr lang="nl-NL" dirty="0"/>
+              <a:t> que les </a:t>
+            </a:r>
+            <a:r>
+              <a:rPr lang="nl-NL" dirty="0" err="1"/>
+              <a:t>données</a:t>
+            </a:r>
+            <a:r>
+              <a:rPr lang="nl-NL" dirty="0"/>
+              <a:t> Big Data ?</a:t>
+            </a:r>
+          </a:p>
+          <a:p>
+            <a:r>
+              <a:rPr lang="nl-NL" dirty="0"/>
+              <a:t>Présentation </a:t>
+            </a:r>
+            <a:r>
+              <a:rPr lang="nl-NL" dirty="0" err="1"/>
+              <a:t>d’Apache</a:t>
+            </a:r>
+            <a:r>
+              <a:rPr lang="nl-NL" dirty="0"/>
+              <a:t> </a:t>
+            </a:r>
+            <a:r>
+              <a:rPr lang="nl-NL" dirty="0" err="1"/>
+              <a:t>Spark</a:t>
+            </a:r>
+            <a:endParaRPr lang="nl-NL" dirty="0"/>
+          </a:p>
+          <a:p>
+            <a:r>
+              <a:rPr lang="nl-NL" dirty="0"/>
+              <a:t>ELT : </a:t>
+            </a:r>
+            <a:r>
+              <a:rPr lang="nl-NL" dirty="0" err="1"/>
+              <a:t>un</a:t>
+            </a:r>
+            <a:r>
+              <a:rPr lang="nl-NL" dirty="0"/>
+              <a:t> </a:t>
+            </a:r>
+            <a:r>
+              <a:rPr lang="nl-NL" dirty="0" err="1"/>
+              <a:t>processus</a:t>
+            </a:r>
+            <a:r>
+              <a:rPr lang="nl-NL" dirty="0"/>
+              <a:t> de </a:t>
+            </a:r>
+            <a:r>
+              <a:rPr lang="nl-NL" dirty="0" err="1"/>
+              <a:t>traitement</a:t>
+            </a:r>
+            <a:r>
+              <a:rPr lang="nl-NL" dirty="0"/>
+              <a:t> de la </a:t>
+            </a:r>
+            <a:r>
+              <a:rPr lang="nl-NL" dirty="0" err="1"/>
+              <a:t>donnée</a:t>
+            </a:r>
+            <a:endParaRPr lang="nl-NL" dirty="0"/>
+          </a:p>
+          <a:p>
+            <a:r>
+              <a:rPr lang="nl-NL" dirty="0"/>
+              <a:t>Extract-Load </a:t>
+            </a:r>
+            <a:r>
+              <a:rPr lang="nl-NL" dirty="0" err="1"/>
+              <a:t>avec</a:t>
+            </a:r>
+            <a:r>
+              <a:rPr lang="nl-NL" dirty="0"/>
+              <a:t> </a:t>
+            </a:r>
+            <a:r>
+              <a:rPr lang="nl-NL" dirty="0" err="1"/>
+              <a:t>Spark</a:t>
+            </a:r>
+            <a:r>
+              <a:rPr lang="nl-NL" dirty="0"/>
+              <a:t> RDD</a:t>
+            </a:r>
+          </a:p>
+          <a:p>
+            <a:r>
+              <a:rPr lang="nl-NL" dirty="0" err="1"/>
+              <a:t>Transform</a:t>
+            </a:r>
+            <a:r>
+              <a:rPr lang="nl-NL" dirty="0"/>
+              <a:t> </a:t>
+            </a:r>
+            <a:r>
+              <a:rPr lang="nl-NL" dirty="0" err="1"/>
+              <a:t>avec</a:t>
+            </a:r>
+            <a:r>
+              <a:rPr lang="nl-NL" dirty="0"/>
+              <a:t> </a:t>
+            </a:r>
+            <a:r>
+              <a:rPr lang="nl-NL" dirty="0" err="1"/>
+              <a:t>Spark</a:t>
+            </a:r>
+            <a:r>
+              <a:rPr lang="nl-NL" dirty="0"/>
+              <a:t> SQL</a:t>
+            </a:r>
+          </a:p>
+          <a:p>
+            <a:r>
+              <a:rPr lang="nl-NL" dirty="0"/>
+              <a:t>Machine Learning </a:t>
+            </a:r>
+            <a:r>
+              <a:rPr lang="nl-NL" dirty="0" err="1"/>
+              <a:t>avec</a:t>
+            </a:r>
+            <a:r>
+              <a:rPr lang="nl-NL" dirty="0"/>
+              <a:t> </a:t>
+            </a:r>
+            <a:r>
+              <a:rPr lang="nl-NL" dirty="0" err="1"/>
+              <a:t>MLLib</a:t>
+            </a:r>
+            <a:endParaRPr lang="nl-NL" dirty="0"/>
+          </a:p>
+          <a:p>
+            <a:r>
+              <a:rPr lang="nl-NL" dirty="0"/>
+              <a:t>Bonus : </a:t>
+            </a:r>
+            <a:r>
+              <a:rPr lang="nl-NL" dirty="0" err="1"/>
+              <a:t>Traitement</a:t>
+            </a:r>
+            <a:r>
+              <a:rPr lang="nl-NL" dirty="0"/>
+              <a:t> de </a:t>
+            </a:r>
+            <a:r>
+              <a:rPr lang="nl-NL" dirty="0" err="1"/>
+              <a:t>graphes</a:t>
+            </a:r>
+            <a:r>
+              <a:rPr lang="nl-NL" dirty="0"/>
+              <a:t> </a:t>
+            </a:r>
+            <a:r>
+              <a:rPr lang="nl-NL" dirty="0" err="1"/>
+              <a:t>avec</a:t>
+            </a:r>
+            <a:r>
+              <a:rPr lang="nl-NL" dirty="0"/>
+              <a:t> </a:t>
+            </a:r>
+            <a:r>
+              <a:rPr lang="nl-NL" dirty="0" err="1"/>
+              <a:t>GraphX</a:t>
+            </a:r>
+            <a:endParaRPr lang="nl-NL" dirty="0"/>
+          </a:p>
+        </p:txBody>
+      </p:sp>
+      <p:sp>
+        <p:nvSpPr>
+          <p:cNvPr id="4" name="Tijdelijke aanduiding voor dianummer 3"/>
+          <p:cNvSpPr>
+            <a:spLocks noGrp="1"/>
+          </p:cNvSpPr>
+          <p:nvPr>
+            <p:ph type="sldNum" sz="quarter" idx="4"/>
+          </p:nvPr>
+        </p:nvSpPr>
+        <p:spPr/>
+        <p:txBody>
+          <a:bodyPr/>
+          <a:lstStyle/>
+          <a:p>
+            <a:fld id="{5EE7099E-8998-4851-915A-4F4831808297}" type="slidenum">
+              <a:rPr lang="nl-NL" smtClean="0"/>
+              <a:pPr/>
+              <a:t>2</a:t>
+            </a:fld>
+            <a:endParaRPr lang="nl-NL"/>
+          </a:p>
+        </p:txBody>
+      </p:sp>
+    </p:spTree>
+    <p:extLst>
+      <p:ext uri="{BB962C8B-B14F-4D97-AF65-F5344CB8AC3E}">
+        <p14:creationId xmlns:p14="http://schemas.microsoft.com/office/powerpoint/2010/main" val="1662105023"/>
+      </p:ext>
+    </p:extLst>
+  </p:cSld>
+  <p:clrMapOvr>
+    <a:masterClrMapping/>
+  </p:clrMapOvr>
+  <p:transition spd="slow">
+    <p:wipe dir="r"/>
+  </p:transition>
+</p:sld>
+</file>
+
+<file path=ppt/slides/slide20.xml><?xml version="1.0" encoding="utf-8"?>
+<p:sld xmlns:a="http://schemas.openxmlformats.org/drawingml/2006/main" xmlns:r="http://schemas.openxmlformats.org/officeDocument/2006/relationships" xmlns:p="http://schemas.openxmlformats.org/presentationml/2006/main">
+  <p:cSld>
+    <p:spTree>
+      <p:nvGrpSpPr>
+        <p:cNvPr id="1" name=""/>
+        <p:cNvGrpSpPr/>
+        <p:nvPr/>
+      </p:nvGrpSpPr>
+      <p:grpSpPr>
+        <a:xfrm>
+          <a:off x="0" y="0"/>
+          <a:ext cx="0" cy="0"/>
+          <a:chOff x="0" y="0"/>
+          <a:chExt cx="0" cy="0"/>
+        </a:xfrm>
+      </p:grpSpPr>
+      <p:sp>
+        <p:nvSpPr>
+          <p:cNvPr id="2" name="Title 1">
+            <a:extLst>
+              <a:ext uri="{FF2B5EF4-FFF2-40B4-BE49-F238E27FC236}">
+                <a16:creationId xmlns:a16="http://schemas.microsoft.com/office/drawing/2014/main" id="{04C5DF06-5F42-4296-B27B-4F79E0DB836B}"/>
+              </a:ext>
+            </a:extLst>
+          </p:cNvPr>
+          <p:cNvSpPr>
+            <a:spLocks noGrp="1"/>
+          </p:cNvSpPr>
+          <p:nvPr>
+            <p:ph type="title"/>
+          </p:nvPr>
+        </p:nvSpPr>
+        <p:spPr/>
+        <p:txBody>
+          <a:bodyPr/>
+          <a:lstStyle/>
+          <a:p>
+            <a:r>
+              <a:rPr lang="en-US" dirty="0"/>
+              <a:t>Solution</a:t>
+            </a:r>
+          </a:p>
+        </p:txBody>
+      </p:sp>
+      <p:sp>
+        <p:nvSpPr>
+          <p:cNvPr id="5" name="Slide Number Placeholder 4">
+            <a:extLst>
+              <a:ext uri="{FF2B5EF4-FFF2-40B4-BE49-F238E27FC236}">
+                <a16:creationId xmlns:a16="http://schemas.microsoft.com/office/drawing/2014/main" id="{B756D4B6-3814-4E02-AB98-08D3B49675BF}"/>
+              </a:ext>
+            </a:extLst>
+          </p:cNvPr>
+          <p:cNvSpPr>
+            <a:spLocks noGrp="1"/>
+          </p:cNvSpPr>
+          <p:nvPr>
+            <p:ph type="sldNum" sz="quarter" idx="4"/>
+          </p:nvPr>
+        </p:nvSpPr>
+        <p:spPr/>
+        <p:txBody>
+          <a:bodyPr/>
+          <a:lstStyle/>
+          <a:p>
+            <a:fld id="{5EE7099E-8998-4851-915A-4F4831808297}" type="slidenum">
+              <a:rPr lang="nl-NL" smtClean="0"/>
+              <a:pPr/>
+              <a:t>20</a:t>
+            </a:fld>
+            <a:endParaRPr lang="nl-NL"/>
+          </a:p>
+        </p:txBody>
+      </p:sp>
+      <p:sp>
+        <p:nvSpPr>
+          <p:cNvPr id="3" name="ZoneTexte 2">
+            <a:extLst>
+              <a:ext uri="{FF2B5EF4-FFF2-40B4-BE49-F238E27FC236}">
+                <a16:creationId xmlns:a16="http://schemas.microsoft.com/office/drawing/2014/main" id="{0C248AA7-6FCB-3F89-E3DD-C837A2826405}"/>
+              </a:ext>
+            </a:extLst>
+          </p:cNvPr>
+          <p:cNvSpPr txBox="1"/>
+          <p:nvPr/>
+        </p:nvSpPr>
+        <p:spPr>
+          <a:xfrm>
+            <a:off x="3692106" y="1699404"/>
+            <a:ext cx="0" cy="0"/>
+          </a:xfrm>
+          <a:prstGeom prst="rect">
+            <a:avLst/>
+          </a:prstGeom>
+          <a:noFill/>
+        </p:spPr>
+        <p:txBody>
+          <a:bodyPr wrap="none" lIns="108000" tIns="108000" rIns="108000" bIns="108000" rtlCol="0">
+            <a:noAutofit/>
+          </a:bodyPr>
+          <a:lstStyle/>
+          <a:p>
+            <a:endParaRPr lang="fr-FR" noProof="0" dirty="0" err="1">
+              <a:solidFill>
+                <a:schemeClr val="bg2"/>
+              </a:solidFill>
+            </a:endParaRPr>
+          </a:p>
+        </p:txBody>
+      </p:sp>
+      <p:sp>
+        <p:nvSpPr>
+          <p:cNvPr id="4" name="ZoneTexte 3">
+            <a:extLst>
+              <a:ext uri="{FF2B5EF4-FFF2-40B4-BE49-F238E27FC236}">
+                <a16:creationId xmlns:a16="http://schemas.microsoft.com/office/drawing/2014/main" id="{5BF910A1-61B1-D0D5-B870-C1DDAE0DAA61}"/>
+              </a:ext>
+            </a:extLst>
+          </p:cNvPr>
+          <p:cNvSpPr txBox="1"/>
+          <p:nvPr/>
+        </p:nvSpPr>
+        <p:spPr>
+          <a:xfrm>
+            <a:off x="307975" y="1049116"/>
+            <a:ext cx="11277600" cy="4284884"/>
+          </a:xfrm>
+          <a:prstGeom prst="rect">
+            <a:avLst/>
+          </a:prstGeom>
+          <a:noFill/>
+        </p:spPr>
+        <p:txBody>
+          <a:bodyPr wrap="square" lIns="108000" tIns="108000" rIns="108000" bIns="108000" rtlCol="0">
+            <a:noAutofit/>
+          </a:bodyPr>
+          <a:lstStyle/>
+          <a:p>
+            <a:r>
+              <a:rPr lang="fr-FR" b="0" dirty="0" err="1">
+                <a:solidFill>
+                  <a:srgbClr val="0000FF"/>
+                </a:solidFill>
+                <a:effectLst/>
+                <a:latin typeface="Menlo" panose="020B0609030804020204" pitchFamily="49" charset="0"/>
+              </a:rPr>
+              <a:t>def</a:t>
+            </a:r>
+            <a:r>
+              <a:rPr lang="fr-FR" b="0" dirty="0">
+                <a:solidFill>
+                  <a:srgbClr val="000000"/>
+                </a:solidFill>
+                <a:effectLst/>
+                <a:latin typeface="Menlo" panose="020B0609030804020204" pitchFamily="49" charset="0"/>
+              </a:rPr>
+              <a:t> </a:t>
+            </a:r>
+            <a:r>
+              <a:rPr lang="fr-FR" b="0" dirty="0" err="1">
+                <a:solidFill>
+                  <a:srgbClr val="795E26"/>
+                </a:solidFill>
+                <a:effectLst/>
+                <a:latin typeface="Menlo" panose="020B0609030804020204" pitchFamily="49" charset="0"/>
+              </a:rPr>
+              <a:t>translateToEnglish</a:t>
+            </a:r>
+            <a:r>
+              <a:rPr lang="fr-FR" b="0" dirty="0">
+                <a:solidFill>
+                  <a:srgbClr val="000000"/>
+                </a:solidFill>
+                <a:effectLst/>
+                <a:latin typeface="Menlo" panose="020B0609030804020204" pitchFamily="49" charset="0"/>
+              </a:rPr>
+              <a:t>(</a:t>
+            </a:r>
+            <a:r>
+              <a:rPr lang="fr-FR" b="0" dirty="0" err="1">
+                <a:solidFill>
+                  <a:srgbClr val="001080"/>
+                </a:solidFill>
+                <a:effectLst/>
+                <a:latin typeface="Menlo" panose="020B0609030804020204" pitchFamily="49" charset="0"/>
+              </a:rPr>
+              <a:t>titanic</a:t>
+            </a:r>
+            <a:r>
+              <a:rPr lang="fr-FR" b="0" dirty="0">
+                <a:solidFill>
+                  <a:srgbClr val="000000"/>
+                </a:solidFill>
+                <a:effectLst/>
+                <a:latin typeface="Menlo" panose="020B0609030804020204" pitchFamily="49" charset="0"/>
+              </a:rPr>
+              <a:t>: </a:t>
+            </a:r>
+            <a:r>
+              <a:rPr lang="fr-FR" b="0" dirty="0" err="1">
+                <a:solidFill>
+                  <a:srgbClr val="267F99"/>
+                </a:solidFill>
+                <a:effectLst/>
+                <a:latin typeface="Menlo" panose="020B0609030804020204" pitchFamily="49" charset="0"/>
+              </a:rPr>
+              <a:t>DataFrame</a:t>
+            </a:r>
+            <a:r>
+              <a:rPr lang="fr-FR" b="0" dirty="0">
+                <a:solidFill>
+                  <a:srgbClr val="000000"/>
+                </a:solidFill>
+                <a:effectLst/>
+                <a:latin typeface="Menlo" panose="020B0609030804020204" pitchFamily="49" charset="0"/>
+              </a:rPr>
+              <a:t>): </a:t>
+            </a:r>
+            <a:r>
+              <a:rPr lang="fr-FR" b="0" dirty="0" err="1">
+                <a:solidFill>
+                  <a:srgbClr val="267F99"/>
+                </a:solidFill>
+                <a:effectLst/>
+                <a:latin typeface="Menlo" panose="020B0609030804020204" pitchFamily="49" charset="0"/>
+              </a:rPr>
+              <a:t>DataFrame</a:t>
+            </a:r>
+            <a:r>
+              <a:rPr lang="fr-FR" b="0" dirty="0">
+                <a:solidFill>
+                  <a:srgbClr val="000000"/>
+                </a:solidFill>
+                <a:effectLst/>
+                <a:latin typeface="Menlo" panose="020B0609030804020204" pitchFamily="49" charset="0"/>
+              </a:rPr>
+              <a:t> = {</a:t>
+            </a:r>
+          </a:p>
+          <a:p>
+            <a:pPr lvl="1"/>
+            <a:r>
+              <a:rPr lang="fr-FR" b="0" dirty="0" err="1">
+                <a:solidFill>
+                  <a:srgbClr val="000000"/>
+                </a:solidFill>
+                <a:effectLst/>
+                <a:latin typeface="Menlo" panose="020B0609030804020204" pitchFamily="49" charset="0"/>
+              </a:rPr>
+              <a:t>titanic</a:t>
+            </a:r>
+            <a:endParaRPr lang="fr-FR" b="0" dirty="0">
+              <a:solidFill>
+                <a:srgbClr val="008000"/>
+              </a:solidFill>
+              <a:effectLst/>
+              <a:latin typeface="Menlo" panose="020B0609030804020204" pitchFamily="49" charset="0"/>
+            </a:endParaRPr>
+          </a:p>
+          <a:p>
+            <a:pPr lvl="2"/>
+            <a:r>
+              <a:rPr lang="fr-FR" b="0" dirty="0">
+                <a:solidFill>
+                  <a:srgbClr val="008000"/>
+                </a:solidFill>
+                <a:effectLst/>
+                <a:latin typeface="Menlo" panose="020B0609030804020204" pitchFamily="49" charset="0"/>
+              </a:rPr>
+              <a:t>// replace all 'Monsieur' by 'Mr', and all 'Madame' by 'Mrs' in the "Name" </a:t>
+            </a:r>
+            <a:r>
+              <a:rPr lang="fr-FR" b="0" dirty="0" err="1">
+                <a:solidFill>
+                  <a:srgbClr val="008000"/>
+                </a:solidFill>
+                <a:effectLst/>
+                <a:latin typeface="Menlo" panose="020B0609030804020204" pitchFamily="49" charset="0"/>
+              </a:rPr>
+              <a:t>column</a:t>
+            </a:r>
+            <a:endParaRPr lang="fr-FR" b="0" dirty="0">
+              <a:solidFill>
+                <a:srgbClr val="000000"/>
+              </a:solidFill>
+              <a:effectLst/>
+              <a:latin typeface="Menlo" panose="020B0609030804020204" pitchFamily="49" charset="0"/>
+            </a:endParaRPr>
+          </a:p>
+          <a:p>
+            <a:pPr lvl="2"/>
+            <a:r>
+              <a:rPr lang="fr-FR" b="0" dirty="0">
+                <a:solidFill>
+                  <a:srgbClr val="000000"/>
+                </a:solidFill>
+                <a:effectLst/>
+                <a:latin typeface="Menlo" panose="020B0609030804020204" pitchFamily="49" charset="0"/>
+              </a:rPr>
+              <a:t>.</a:t>
+            </a:r>
+            <a:r>
+              <a:rPr lang="fr-FR" b="0" dirty="0" err="1">
+                <a:solidFill>
+                  <a:srgbClr val="000000"/>
+                </a:solidFill>
+                <a:effectLst/>
+                <a:latin typeface="Menlo" panose="020B0609030804020204" pitchFamily="49" charset="0"/>
+              </a:rPr>
+              <a:t>withColumn</a:t>
+            </a:r>
+            <a:r>
+              <a:rPr lang="fr-FR" b="0" dirty="0">
+                <a:solidFill>
+                  <a:srgbClr val="000000"/>
+                </a:solidFill>
+                <a:effectLst/>
+                <a:latin typeface="Menlo" panose="020B0609030804020204" pitchFamily="49" charset="0"/>
+              </a:rPr>
+              <a:t>(</a:t>
+            </a:r>
+            <a:r>
+              <a:rPr lang="fr-FR" b="0" dirty="0">
+                <a:solidFill>
+                  <a:srgbClr val="A31515"/>
+                </a:solidFill>
+                <a:effectLst/>
+                <a:latin typeface="Menlo" panose="020B0609030804020204" pitchFamily="49" charset="0"/>
+              </a:rPr>
+              <a:t>"Name"</a:t>
+            </a:r>
+            <a:r>
+              <a:rPr lang="fr-FR" b="0" dirty="0">
+                <a:solidFill>
+                  <a:srgbClr val="000000"/>
+                </a:solidFill>
+                <a:effectLst/>
+                <a:latin typeface="Menlo" panose="020B0609030804020204" pitchFamily="49" charset="0"/>
+              </a:rPr>
+              <a:t>, </a:t>
+            </a:r>
+            <a:r>
+              <a:rPr lang="fr-FR" b="0" dirty="0" err="1">
+                <a:solidFill>
+                  <a:srgbClr val="000000"/>
+                </a:solidFill>
+                <a:effectLst/>
+                <a:latin typeface="Menlo" panose="020B0609030804020204" pitchFamily="49" charset="0"/>
+              </a:rPr>
+              <a:t>regexp_replace</a:t>
+            </a:r>
+            <a:r>
+              <a:rPr lang="fr-FR" b="0" dirty="0">
+                <a:solidFill>
+                  <a:srgbClr val="000000"/>
+                </a:solidFill>
+                <a:effectLst/>
+                <a:latin typeface="Menlo" panose="020B0609030804020204" pitchFamily="49" charset="0"/>
+              </a:rPr>
+              <a:t>(col(</a:t>
+            </a:r>
+            <a:r>
+              <a:rPr lang="fr-FR" b="0" dirty="0">
+                <a:solidFill>
+                  <a:srgbClr val="A31515"/>
+                </a:solidFill>
+                <a:effectLst/>
+                <a:latin typeface="Menlo" panose="020B0609030804020204" pitchFamily="49" charset="0"/>
+              </a:rPr>
+              <a:t>"Name"</a:t>
+            </a:r>
+            <a:r>
+              <a:rPr lang="fr-FR" b="0" dirty="0">
+                <a:solidFill>
+                  <a:srgbClr val="000000"/>
+                </a:solidFill>
+                <a:effectLst/>
+                <a:latin typeface="Menlo" panose="020B0609030804020204" pitchFamily="49" charset="0"/>
+              </a:rPr>
+              <a:t>), </a:t>
+            </a:r>
+            <a:r>
+              <a:rPr lang="fr-FR" b="0" dirty="0">
+                <a:solidFill>
+                  <a:srgbClr val="A31515"/>
+                </a:solidFill>
+                <a:effectLst/>
+                <a:latin typeface="Menlo" panose="020B0609030804020204" pitchFamily="49" charset="0"/>
+              </a:rPr>
+              <a:t>"Monsieur"</a:t>
+            </a:r>
+            <a:r>
+              <a:rPr lang="fr-FR" b="0" dirty="0">
+                <a:solidFill>
+                  <a:srgbClr val="000000"/>
+                </a:solidFill>
+                <a:effectLst/>
+                <a:latin typeface="Menlo" panose="020B0609030804020204" pitchFamily="49" charset="0"/>
+              </a:rPr>
+              <a:t>, </a:t>
+            </a:r>
+            <a:r>
+              <a:rPr lang="fr-FR" b="0" dirty="0">
+                <a:solidFill>
+                  <a:srgbClr val="A31515"/>
+                </a:solidFill>
+                <a:effectLst/>
+                <a:latin typeface="Menlo" panose="020B0609030804020204" pitchFamily="49" charset="0"/>
+              </a:rPr>
+              <a:t>"Mr"</a:t>
+            </a:r>
+            <a:r>
+              <a:rPr lang="fr-FR" b="0" dirty="0">
+                <a:solidFill>
+                  <a:srgbClr val="000000"/>
+                </a:solidFill>
+                <a:effectLst/>
+                <a:latin typeface="Menlo" panose="020B0609030804020204" pitchFamily="49" charset="0"/>
+              </a:rPr>
+              <a:t>))</a:t>
+            </a:r>
+          </a:p>
+          <a:p>
+            <a:pPr lvl="2"/>
+            <a:r>
+              <a:rPr lang="fr-FR" b="0" dirty="0">
+                <a:solidFill>
+                  <a:srgbClr val="000000"/>
+                </a:solidFill>
+                <a:effectLst/>
+                <a:latin typeface="Menlo" panose="020B0609030804020204" pitchFamily="49" charset="0"/>
+              </a:rPr>
+              <a:t>.</a:t>
+            </a:r>
+            <a:r>
+              <a:rPr lang="fr-FR" b="0" dirty="0" err="1">
+                <a:solidFill>
+                  <a:srgbClr val="000000"/>
+                </a:solidFill>
+                <a:effectLst/>
+                <a:latin typeface="Menlo" panose="020B0609030804020204" pitchFamily="49" charset="0"/>
+              </a:rPr>
+              <a:t>withColumn</a:t>
+            </a:r>
+            <a:r>
+              <a:rPr lang="fr-FR" b="0" dirty="0">
+                <a:solidFill>
+                  <a:srgbClr val="000000"/>
+                </a:solidFill>
+                <a:effectLst/>
+                <a:latin typeface="Menlo" panose="020B0609030804020204" pitchFamily="49" charset="0"/>
+              </a:rPr>
+              <a:t>(</a:t>
+            </a:r>
+            <a:r>
+              <a:rPr lang="fr-FR" b="0" dirty="0">
+                <a:solidFill>
+                  <a:srgbClr val="A31515"/>
+                </a:solidFill>
+                <a:effectLst/>
+                <a:latin typeface="Menlo" panose="020B0609030804020204" pitchFamily="49" charset="0"/>
+              </a:rPr>
+              <a:t>"Name"</a:t>
+            </a:r>
+            <a:r>
+              <a:rPr lang="fr-FR" b="0" dirty="0">
+                <a:solidFill>
+                  <a:srgbClr val="000000"/>
+                </a:solidFill>
+                <a:effectLst/>
+                <a:latin typeface="Menlo" panose="020B0609030804020204" pitchFamily="49" charset="0"/>
+              </a:rPr>
+              <a:t>, </a:t>
+            </a:r>
+            <a:r>
+              <a:rPr lang="fr-FR" b="0" dirty="0" err="1">
+                <a:solidFill>
+                  <a:srgbClr val="000000"/>
+                </a:solidFill>
+                <a:effectLst/>
+                <a:latin typeface="Menlo" panose="020B0609030804020204" pitchFamily="49" charset="0"/>
+              </a:rPr>
+              <a:t>regexp_replace</a:t>
+            </a:r>
+            <a:r>
+              <a:rPr lang="fr-FR" b="0" dirty="0">
+                <a:solidFill>
+                  <a:srgbClr val="000000"/>
+                </a:solidFill>
+                <a:effectLst/>
+                <a:latin typeface="Menlo" panose="020B0609030804020204" pitchFamily="49" charset="0"/>
+              </a:rPr>
+              <a:t>(col(</a:t>
+            </a:r>
+            <a:r>
+              <a:rPr lang="fr-FR" b="0" dirty="0">
+                <a:solidFill>
+                  <a:srgbClr val="A31515"/>
+                </a:solidFill>
+                <a:effectLst/>
+                <a:latin typeface="Menlo" panose="020B0609030804020204" pitchFamily="49" charset="0"/>
+              </a:rPr>
+              <a:t>"Name"</a:t>
+            </a:r>
+            <a:r>
+              <a:rPr lang="fr-FR" b="0" dirty="0">
+                <a:solidFill>
+                  <a:srgbClr val="000000"/>
+                </a:solidFill>
+                <a:effectLst/>
+                <a:latin typeface="Menlo" panose="020B0609030804020204" pitchFamily="49" charset="0"/>
+              </a:rPr>
+              <a:t>), </a:t>
+            </a:r>
+            <a:r>
+              <a:rPr lang="fr-FR" b="0" dirty="0">
+                <a:solidFill>
+                  <a:srgbClr val="A31515"/>
+                </a:solidFill>
+                <a:effectLst/>
+                <a:latin typeface="Menlo" panose="020B0609030804020204" pitchFamily="49" charset="0"/>
+              </a:rPr>
+              <a:t>"</a:t>
+            </a:r>
+            <a:r>
+              <a:rPr lang="fr-FR" b="0" dirty="0" err="1">
+                <a:solidFill>
+                  <a:srgbClr val="A31515"/>
+                </a:solidFill>
+                <a:effectLst/>
+                <a:latin typeface="Menlo" panose="020B0609030804020204" pitchFamily="49" charset="0"/>
+              </a:rPr>
+              <a:t>Mamade</a:t>
+            </a:r>
+            <a:r>
+              <a:rPr lang="fr-FR" b="0" dirty="0">
+                <a:solidFill>
+                  <a:srgbClr val="A31515"/>
+                </a:solidFill>
+                <a:effectLst/>
+                <a:latin typeface="Menlo" panose="020B0609030804020204" pitchFamily="49" charset="0"/>
+              </a:rPr>
+              <a:t>"</a:t>
+            </a:r>
+            <a:r>
+              <a:rPr lang="fr-FR" b="0" dirty="0">
+                <a:solidFill>
+                  <a:srgbClr val="000000"/>
+                </a:solidFill>
+                <a:effectLst/>
+                <a:latin typeface="Menlo" panose="020B0609030804020204" pitchFamily="49" charset="0"/>
+              </a:rPr>
+              <a:t>, </a:t>
+            </a:r>
+            <a:r>
+              <a:rPr lang="fr-FR" b="0" dirty="0">
+                <a:solidFill>
+                  <a:srgbClr val="A31515"/>
+                </a:solidFill>
+                <a:effectLst/>
+                <a:latin typeface="Menlo" panose="020B0609030804020204" pitchFamily="49" charset="0"/>
+              </a:rPr>
+              <a:t>"Mrs"</a:t>
+            </a:r>
+            <a:r>
+              <a:rPr lang="fr-FR" b="0" dirty="0">
+                <a:solidFill>
+                  <a:srgbClr val="000000"/>
+                </a:solidFill>
+                <a:effectLst/>
+                <a:latin typeface="Menlo" panose="020B0609030804020204" pitchFamily="49" charset="0"/>
+              </a:rPr>
+              <a:t>))</a:t>
+            </a:r>
+            <a:endParaRPr lang="fr-FR" b="0" dirty="0">
+              <a:solidFill>
+                <a:srgbClr val="008000"/>
+              </a:solidFill>
+              <a:effectLst/>
+              <a:latin typeface="Menlo" panose="020B0609030804020204" pitchFamily="49" charset="0"/>
+            </a:endParaRPr>
+          </a:p>
+          <a:p>
+            <a:pPr lvl="2"/>
+            <a:r>
+              <a:rPr lang="fr-FR" b="0" dirty="0">
+                <a:solidFill>
+                  <a:srgbClr val="008000"/>
+                </a:solidFill>
+                <a:effectLst/>
+                <a:latin typeface="Menlo" panose="020B0609030804020204" pitchFamily="49" charset="0"/>
+              </a:rPr>
+              <a:t>// replace all "femme" by "</a:t>
+            </a:r>
+            <a:r>
+              <a:rPr lang="fr-FR" b="0" dirty="0" err="1">
+                <a:solidFill>
+                  <a:srgbClr val="008000"/>
+                </a:solidFill>
+                <a:effectLst/>
+                <a:latin typeface="Menlo" panose="020B0609030804020204" pitchFamily="49" charset="0"/>
+              </a:rPr>
+              <a:t>female</a:t>
+            </a:r>
+            <a:r>
+              <a:rPr lang="fr-FR" b="0" dirty="0">
+                <a:solidFill>
+                  <a:srgbClr val="008000"/>
+                </a:solidFill>
+                <a:effectLst/>
+                <a:latin typeface="Menlo" panose="020B0609030804020204" pitchFamily="49" charset="0"/>
+              </a:rPr>
+              <a:t>", and all "homme" by "male in the "</a:t>
+            </a:r>
+            <a:r>
+              <a:rPr lang="fr-FR" b="0" dirty="0" err="1">
+                <a:solidFill>
+                  <a:srgbClr val="008000"/>
+                </a:solidFill>
+                <a:effectLst/>
+                <a:latin typeface="Menlo" panose="020B0609030804020204" pitchFamily="49" charset="0"/>
+              </a:rPr>
+              <a:t>Sex</a:t>
+            </a:r>
+            <a:r>
+              <a:rPr lang="fr-FR" b="0" dirty="0">
+                <a:solidFill>
+                  <a:srgbClr val="008000"/>
+                </a:solidFill>
+                <a:effectLst/>
+                <a:latin typeface="Menlo" panose="020B0609030804020204" pitchFamily="49" charset="0"/>
+              </a:rPr>
+              <a:t>" </a:t>
+            </a:r>
+            <a:r>
+              <a:rPr lang="fr-FR" b="0" dirty="0" err="1">
+                <a:solidFill>
+                  <a:srgbClr val="008000"/>
+                </a:solidFill>
+                <a:effectLst/>
+                <a:latin typeface="Menlo" panose="020B0609030804020204" pitchFamily="49" charset="0"/>
+              </a:rPr>
+              <a:t>column</a:t>
+            </a:r>
+            <a:endParaRPr lang="fr-FR" b="0" dirty="0">
+              <a:solidFill>
+                <a:srgbClr val="000000"/>
+              </a:solidFill>
+              <a:effectLst/>
+              <a:latin typeface="Menlo" panose="020B0609030804020204" pitchFamily="49" charset="0"/>
+            </a:endParaRPr>
+          </a:p>
+          <a:p>
+            <a:pPr lvl="2"/>
+            <a:r>
+              <a:rPr lang="fr-FR" b="0" dirty="0">
+                <a:solidFill>
+                  <a:srgbClr val="000000"/>
+                </a:solidFill>
+                <a:effectLst/>
+                <a:latin typeface="Menlo" panose="020B0609030804020204" pitchFamily="49" charset="0"/>
+              </a:rPr>
+              <a:t>.</a:t>
+            </a:r>
+            <a:r>
+              <a:rPr lang="fr-FR" b="0" dirty="0" err="1">
+                <a:solidFill>
+                  <a:srgbClr val="000000"/>
+                </a:solidFill>
+                <a:effectLst/>
+                <a:latin typeface="Menlo" panose="020B0609030804020204" pitchFamily="49" charset="0"/>
+              </a:rPr>
+              <a:t>withColumn</a:t>
+            </a:r>
+            <a:r>
+              <a:rPr lang="fr-FR" b="0" dirty="0">
+                <a:solidFill>
+                  <a:srgbClr val="000000"/>
+                </a:solidFill>
+                <a:effectLst/>
+                <a:latin typeface="Menlo" panose="020B0609030804020204" pitchFamily="49" charset="0"/>
+              </a:rPr>
+              <a:t>(</a:t>
+            </a:r>
+            <a:r>
+              <a:rPr lang="fr-FR" b="0" dirty="0">
+                <a:solidFill>
+                  <a:srgbClr val="A31515"/>
+                </a:solidFill>
+                <a:effectLst/>
+                <a:latin typeface="Menlo" panose="020B0609030804020204" pitchFamily="49" charset="0"/>
+              </a:rPr>
+              <a:t>"</a:t>
+            </a:r>
+            <a:r>
+              <a:rPr lang="fr-FR" b="0" dirty="0" err="1">
+                <a:solidFill>
+                  <a:srgbClr val="A31515"/>
+                </a:solidFill>
+                <a:effectLst/>
+                <a:latin typeface="Menlo" panose="020B0609030804020204" pitchFamily="49" charset="0"/>
+              </a:rPr>
+              <a:t>Sex</a:t>
+            </a:r>
+            <a:r>
+              <a:rPr lang="fr-FR" b="0" dirty="0">
+                <a:solidFill>
+                  <a:srgbClr val="A31515"/>
+                </a:solidFill>
+                <a:effectLst/>
+                <a:latin typeface="Menlo" panose="020B0609030804020204" pitchFamily="49" charset="0"/>
+              </a:rPr>
+              <a:t>"</a:t>
+            </a:r>
+            <a:r>
+              <a:rPr lang="fr-FR" b="0" dirty="0">
+                <a:solidFill>
+                  <a:srgbClr val="000000"/>
+                </a:solidFill>
+                <a:effectLst/>
+                <a:latin typeface="Menlo" panose="020B0609030804020204" pitchFamily="49" charset="0"/>
+              </a:rPr>
+              <a:t>, </a:t>
+            </a:r>
+            <a:r>
+              <a:rPr lang="fr-FR" b="0" dirty="0" err="1">
+                <a:solidFill>
+                  <a:srgbClr val="000000"/>
+                </a:solidFill>
+                <a:effectLst/>
+                <a:latin typeface="Menlo" panose="020B0609030804020204" pitchFamily="49" charset="0"/>
+              </a:rPr>
+              <a:t>regexp_replace</a:t>
+            </a:r>
+            <a:r>
+              <a:rPr lang="fr-FR" b="0" dirty="0">
+                <a:solidFill>
+                  <a:srgbClr val="000000"/>
+                </a:solidFill>
+                <a:effectLst/>
+                <a:latin typeface="Menlo" panose="020B0609030804020204" pitchFamily="49" charset="0"/>
+              </a:rPr>
+              <a:t>(col(</a:t>
+            </a:r>
+            <a:r>
+              <a:rPr lang="fr-FR" b="0" dirty="0">
+                <a:solidFill>
+                  <a:srgbClr val="A31515"/>
+                </a:solidFill>
+                <a:effectLst/>
+                <a:latin typeface="Menlo" panose="020B0609030804020204" pitchFamily="49" charset="0"/>
+              </a:rPr>
+              <a:t>"</a:t>
+            </a:r>
+            <a:r>
+              <a:rPr lang="fr-FR" b="0" dirty="0" err="1">
+                <a:solidFill>
+                  <a:srgbClr val="A31515"/>
+                </a:solidFill>
+                <a:effectLst/>
+                <a:latin typeface="Menlo" panose="020B0609030804020204" pitchFamily="49" charset="0"/>
+              </a:rPr>
+              <a:t>Sex</a:t>
+            </a:r>
+            <a:r>
+              <a:rPr lang="fr-FR" b="0" dirty="0">
+                <a:solidFill>
+                  <a:srgbClr val="A31515"/>
+                </a:solidFill>
+                <a:effectLst/>
+                <a:latin typeface="Menlo" panose="020B0609030804020204" pitchFamily="49" charset="0"/>
+              </a:rPr>
+              <a:t>"</a:t>
+            </a:r>
+            <a:r>
+              <a:rPr lang="fr-FR" b="0" dirty="0">
+                <a:solidFill>
+                  <a:srgbClr val="000000"/>
+                </a:solidFill>
+                <a:effectLst/>
+                <a:latin typeface="Menlo" panose="020B0609030804020204" pitchFamily="49" charset="0"/>
+              </a:rPr>
+              <a:t>), </a:t>
+            </a:r>
+            <a:r>
+              <a:rPr lang="fr-FR" b="0" dirty="0">
+                <a:solidFill>
+                  <a:srgbClr val="A31515"/>
+                </a:solidFill>
+                <a:effectLst/>
+                <a:latin typeface="Menlo" panose="020B0609030804020204" pitchFamily="49" charset="0"/>
+              </a:rPr>
+              <a:t>"homme"</a:t>
+            </a:r>
+            <a:r>
+              <a:rPr lang="fr-FR" b="0" dirty="0">
+                <a:solidFill>
+                  <a:srgbClr val="000000"/>
+                </a:solidFill>
+                <a:effectLst/>
+                <a:latin typeface="Menlo" panose="020B0609030804020204" pitchFamily="49" charset="0"/>
+              </a:rPr>
+              <a:t>, </a:t>
+            </a:r>
+            <a:r>
+              <a:rPr lang="fr-FR" b="0" dirty="0">
+                <a:solidFill>
+                  <a:srgbClr val="A31515"/>
+                </a:solidFill>
+                <a:effectLst/>
+                <a:latin typeface="Menlo" panose="020B0609030804020204" pitchFamily="49" charset="0"/>
+              </a:rPr>
+              <a:t>"male"</a:t>
+            </a:r>
+            <a:r>
+              <a:rPr lang="fr-FR" b="0" dirty="0">
+                <a:solidFill>
+                  <a:srgbClr val="000000"/>
+                </a:solidFill>
+                <a:effectLst/>
+                <a:latin typeface="Menlo" panose="020B0609030804020204" pitchFamily="49" charset="0"/>
+              </a:rPr>
+              <a:t>))</a:t>
+            </a:r>
+          </a:p>
+          <a:p>
+            <a:pPr lvl="2"/>
+            <a:r>
+              <a:rPr lang="fr-FR" b="0" dirty="0">
+                <a:solidFill>
+                  <a:srgbClr val="000000"/>
+                </a:solidFill>
+                <a:effectLst/>
+                <a:latin typeface="Menlo" panose="020B0609030804020204" pitchFamily="49" charset="0"/>
+              </a:rPr>
+              <a:t>.</a:t>
+            </a:r>
+            <a:r>
+              <a:rPr lang="fr-FR" b="0" dirty="0" err="1">
+                <a:solidFill>
+                  <a:srgbClr val="000000"/>
+                </a:solidFill>
+                <a:effectLst/>
+                <a:latin typeface="Menlo" panose="020B0609030804020204" pitchFamily="49" charset="0"/>
+              </a:rPr>
+              <a:t>withColumn</a:t>
+            </a:r>
+            <a:r>
+              <a:rPr lang="fr-FR" b="0" dirty="0">
+                <a:solidFill>
+                  <a:srgbClr val="000000"/>
+                </a:solidFill>
+                <a:effectLst/>
+                <a:latin typeface="Menlo" panose="020B0609030804020204" pitchFamily="49" charset="0"/>
+              </a:rPr>
+              <a:t>(</a:t>
+            </a:r>
+            <a:r>
+              <a:rPr lang="fr-FR" b="0" dirty="0">
+                <a:solidFill>
+                  <a:srgbClr val="A31515"/>
+                </a:solidFill>
+                <a:effectLst/>
+                <a:latin typeface="Menlo" panose="020B0609030804020204" pitchFamily="49" charset="0"/>
+              </a:rPr>
+              <a:t>"</a:t>
+            </a:r>
+            <a:r>
+              <a:rPr lang="fr-FR" b="0" dirty="0" err="1">
+                <a:solidFill>
+                  <a:srgbClr val="A31515"/>
+                </a:solidFill>
+                <a:effectLst/>
+                <a:latin typeface="Menlo" panose="020B0609030804020204" pitchFamily="49" charset="0"/>
+              </a:rPr>
+              <a:t>Sex</a:t>
+            </a:r>
+            <a:r>
+              <a:rPr lang="fr-FR" b="0" dirty="0">
+                <a:solidFill>
+                  <a:srgbClr val="A31515"/>
+                </a:solidFill>
+                <a:effectLst/>
+                <a:latin typeface="Menlo" panose="020B0609030804020204" pitchFamily="49" charset="0"/>
+              </a:rPr>
+              <a:t>"</a:t>
+            </a:r>
+            <a:r>
+              <a:rPr lang="fr-FR" b="0" dirty="0">
+                <a:solidFill>
+                  <a:srgbClr val="000000"/>
+                </a:solidFill>
+                <a:effectLst/>
+                <a:latin typeface="Menlo" panose="020B0609030804020204" pitchFamily="49" charset="0"/>
+              </a:rPr>
+              <a:t>, </a:t>
+            </a:r>
+            <a:r>
+              <a:rPr lang="fr-FR" b="0" dirty="0" err="1">
+                <a:solidFill>
+                  <a:srgbClr val="000000"/>
+                </a:solidFill>
+                <a:effectLst/>
+                <a:latin typeface="Menlo" panose="020B0609030804020204" pitchFamily="49" charset="0"/>
+              </a:rPr>
+              <a:t>regexp_replace</a:t>
+            </a:r>
+            <a:r>
+              <a:rPr lang="fr-FR" b="0" dirty="0">
+                <a:solidFill>
+                  <a:srgbClr val="000000"/>
+                </a:solidFill>
+                <a:effectLst/>
+                <a:latin typeface="Menlo" panose="020B0609030804020204" pitchFamily="49" charset="0"/>
+              </a:rPr>
+              <a:t>(col(</a:t>
+            </a:r>
+            <a:r>
+              <a:rPr lang="fr-FR" b="0" dirty="0">
+                <a:solidFill>
+                  <a:srgbClr val="A31515"/>
+                </a:solidFill>
+                <a:effectLst/>
+                <a:latin typeface="Menlo" panose="020B0609030804020204" pitchFamily="49" charset="0"/>
+              </a:rPr>
+              <a:t>"</a:t>
+            </a:r>
+            <a:r>
+              <a:rPr lang="fr-FR" b="0" dirty="0" err="1">
+                <a:solidFill>
+                  <a:srgbClr val="A31515"/>
+                </a:solidFill>
+                <a:effectLst/>
+                <a:latin typeface="Menlo" panose="020B0609030804020204" pitchFamily="49" charset="0"/>
+              </a:rPr>
+              <a:t>Sex</a:t>
+            </a:r>
+            <a:r>
+              <a:rPr lang="fr-FR" b="0" dirty="0">
+                <a:solidFill>
+                  <a:srgbClr val="A31515"/>
+                </a:solidFill>
+                <a:effectLst/>
+                <a:latin typeface="Menlo" panose="020B0609030804020204" pitchFamily="49" charset="0"/>
+              </a:rPr>
+              <a:t>"</a:t>
+            </a:r>
+            <a:r>
+              <a:rPr lang="fr-FR" b="0" dirty="0">
+                <a:solidFill>
+                  <a:srgbClr val="000000"/>
+                </a:solidFill>
+                <a:effectLst/>
+                <a:latin typeface="Menlo" panose="020B0609030804020204" pitchFamily="49" charset="0"/>
+              </a:rPr>
+              <a:t>), </a:t>
+            </a:r>
+            <a:r>
+              <a:rPr lang="fr-FR" b="0" dirty="0">
+                <a:solidFill>
+                  <a:srgbClr val="A31515"/>
+                </a:solidFill>
+                <a:effectLst/>
+                <a:latin typeface="Menlo" panose="020B0609030804020204" pitchFamily="49" charset="0"/>
+              </a:rPr>
+              <a:t>"femme"</a:t>
+            </a:r>
+            <a:r>
+              <a:rPr lang="fr-FR" b="0" dirty="0">
+                <a:solidFill>
+                  <a:srgbClr val="000000"/>
+                </a:solidFill>
+                <a:effectLst/>
+                <a:latin typeface="Menlo" panose="020B0609030804020204" pitchFamily="49" charset="0"/>
+              </a:rPr>
+              <a:t>, </a:t>
+            </a:r>
+            <a:r>
+              <a:rPr lang="fr-FR" b="0" dirty="0">
+                <a:solidFill>
+                  <a:srgbClr val="A31515"/>
+                </a:solidFill>
+                <a:effectLst/>
+                <a:latin typeface="Menlo" panose="020B0609030804020204" pitchFamily="49" charset="0"/>
+              </a:rPr>
+              <a:t>"</a:t>
+            </a:r>
+            <a:r>
+              <a:rPr lang="fr-FR" b="0" dirty="0" err="1">
+                <a:solidFill>
+                  <a:srgbClr val="A31515"/>
+                </a:solidFill>
+                <a:effectLst/>
+                <a:latin typeface="Menlo" panose="020B0609030804020204" pitchFamily="49" charset="0"/>
+              </a:rPr>
+              <a:t>female</a:t>
+            </a:r>
+            <a:r>
+              <a:rPr lang="fr-FR" b="0" dirty="0">
+                <a:solidFill>
+                  <a:srgbClr val="A31515"/>
+                </a:solidFill>
+                <a:effectLst/>
+                <a:latin typeface="Menlo" panose="020B0609030804020204" pitchFamily="49" charset="0"/>
+              </a:rPr>
+              <a:t>"</a:t>
+            </a:r>
+            <a:r>
+              <a:rPr lang="fr-FR" b="0" dirty="0">
+                <a:solidFill>
+                  <a:srgbClr val="000000"/>
+                </a:solidFill>
+                <a:effectLst/>
+                <a:latin typeface="Menlo" panose="020B0609030804020204" pitchFamily="49" charset="0"/>
+              </a:rPr>
+              <a:t>))</a:t>
+            </a:r>
+          </a:p>
+          <a:p>
+            <a:r>
+              <a:rPr lang="fr-FR" b="0" dirty="0">
+                <a:solidFill>
+                  <a:srgbClr val="000000"/>
+                </a:solidFill>
+                <a:effectLst/>
+                <a:latin typeface="Menlo" panose="020B0609030804020204" pitchFamily="49" charset="0"/>
+              </a:rPr>
+              <a:t>}</a:t>
+            </a:r>
+          </a:p>
+        </p:txBody>
+      </p:sp>
+    </p:spTree>
+    <p:extLst>
+      <p:ext uri="{BB962C8B-B14F-4D97-AF65-F5344CB8AC3E}">
+        <p14:creationId xmlns:p14="http://schemas.microsoft.com/office/powerpoint/2010/main" val="552338350"/>
+      </p:ext>
+    </p:extLst>
+  </p:cSld>
+  <p:clrMapOvr>
+    <a:masterClrMapping/>
+  </p:clrMapOvr>
+  <p:transition spd="slow">
+    <p:wipe dir="r"/>
+  </p:transition>
+</p:sld>
+</file>
+
+<file path=ppt/slides/slide21.xml><?xml version="1.0" encoding="utf-8"?>
+<p:sld xmlns:a="http://schemas.openxmlformats.org/drawingml/2006/main" xmlns:r="http://schemas.openxmlformats.org/officeDocument/2006/relationships" xmlns:p="http://schemas.openxmlformats.org/presentationml/2006/main">
+  <p:cSld>
+    <p:spTree>
+      <p:nvGrpSpPr>
+        <p:cNvPr id="1" name=""/>
+        <p:cNvGrpSpPr/>
+        <p:nvPr/>
+      </p:nvGrpSpPr>
+      <p:grpSpPr>
+        <a:xfrm>
+          <a:off x="0" y="0"/>
+          <a:ext cx="0" cy="0"/>
+          <a:chOff x="0" y="0"/>
+          <a:chExt cx="0" cy="0"/>
+        </a:xfrm>
+      </p:grpSpPr>
+      <p:sp>
+        <p:nvSpPr>
           <p:cNvPr id="6" name="Tijdelijke aanduiding voor tekst 5"/>
           <p:cNvSpPr>
             <a:spLocks noGrp="1"/>
@@ -15308,7 +17989,7 @@
             <a:fld id="{5EE7099E-8998-4851-915A-4F4831808297}" type="slidenum">
               <a:rPr lang="nl-NL" smtClean="0"/>
               <a:pPr/>
-              <a:t>19</a:t>
+              <a:t>21</a:t>
             </a:fld>
             <a:endParaRPr lang="nl-NL"/>
           </a:p>
@@ -15524,280 +18205,6 @@
       </p:bldP>
     </p:bldLst>
   </p:timing>
-</p:sld>
-</file>
-
-<file path=ppt/slides/slide2.xml><?xml version="1.0" encoding="utf-8"?>
-<p:sld xmlns:a="http://schemas.openxmlformats.org/drawingml/2006/main" xmlns:r="http://schemas.openxmlformats.org/officeDocument/2006/relationships" xmlns:p="http://schemas.openxmlformats.org/presentationml/2006/main">
-  <p:cSld>
-    <p:spTree>
-      <p:nvGrpSpPr>
-        <p:cNvPr id="1" name=""/>
-        <p:cNvGrpSpPr/>
-        <p:nvPr/>
-      </p:nvGrpSpPr>
-      <p:grpSpPr>
-        <a:xfrm>
-          <a:off x="0" y="0"/>
-          <a:ext cx="0" cy="0"/>
-          <a:chOff x="0" y="0"/>
-          <a:chExt cx="0" cy="0"/>
-        </a:xfrm>
-      </p:grpSpPr>
-      <p:sp>
-        <p:nvSpPr>
-          <p:cNvPr id="2" name="Titel 1"/>
-          <p:cNvSpPr>
-            <a:spLocks noGrp="1"/>
-          </p:cNvSpPr>
-          <p:nvPr>
-            <p:ph type="title"/>
-          </p:nvPr>
-        </p:nvSpPr>
-        <p:spPr/>
-        <p:txBody>
-          <a:bodyPr/>
-          <a:lstStyle/>
-          <a:p>
-            <a:r>
-              <a:rPr lang="nl-NL" dirty="0"/>
-              <a:t>Plan</a:t>
-            </a:r>
-          </a:p>
-        </p:txBody>
-      </p:sp>
-      <p:sp>
-        <p:nvSpPr>
-          <p:cNvPr id="3" name="Tijdelijke aanduiding voor verticale tekst 2"/>
-          <p:cNvSpPr>
-            <a:spLocks noGrp="1"/>
-          </p:cNvSpPr>
-          <p:nvPr>
-            <p:ph type="body" orient="vert" idx="1"/>
-          </p:nvPr>
-        </p:nvSpPr>
-        <p:spPr>
-          <a:xfrm>
-            <a:off x="404662" y="1252836"/>
-            <a:ext cx="11389023" cy="4795836"/>
-          </a:xfrm>
-        </p:spPr>
-        <p:txBody>
-          <a:bodyPr/>
-          <a:lstStyle/>
-          <a:p>
-            <a:r>
-              <a:rPr lang="nl-NL" dirty="0" err="1"/>
-              <a:t>Qu’est-ce</a:t>
-            </a:r>
-            <a:r>
-              <a:rPr lang="nl-NL" dirty="0"/>
-              <a:t> que les </a:t>
-            </a:r>
-            <a:r>
-              <a:rPr lang="nl-NL" dirty="0" err="1"/>
-              <a:t>données</a:t>
-            </a:r>
-            <a:r>
-              <a:rPr lang="nl-NL" dirty="0"/>
-              <a:t> Big Data ?</a:t>
-            </a:r>
-          </a:p>
-          <a:p>
-            <a:r>
-              <a:rPr lang="nl-NL" dirty="0"/>
-              <a:t>Présentation </a:t>
-            </a:r>
-            <a:r>
-              <a:rPr lang="nl-NL" dirty="0" err="1"/>
-              <a:t>d’Apache</a:t>
-            </a:r>
-            <a:r>
-              <a:rPr lang="nl-NL" dirty="0"/>
-              <a:t> </a:t>
-            </a:r>
-            <a:r>
-              <a:rPr lang="nl-NL" dirty="0" err="1"/>
-              <a:t>Spark</a:t>
-            </a:r>
-            <a:endParaRPr lang="nl-NL" dirty="0"/>
-          </a:p>
-          <a:p>
-            <a:r>
-              <a:rPr lang="nl-NL" dirty="0"/>
-              <a:t>ELT : </a:t>
-            </a:r>
-            <a:r>
-              <a:rPr lang="nl-NL" dirty="0" err="1"/>
-              <a:t>un</a:t>
-            </a:r>
-            <a:r>
-              <a:rPr lang="nl-NL" dirty="0"/>
-              <a:t> </a:t>
-            </a:r>
-            <a:r>
-              <a:rPr lang="nl-NL" dirty="0" err="1"/>
-              <a:t>processus</a:t>
-            </a:r>
-            <a:r>
-              <a:rPr lang="nl-NL" dirty="0"/>
-              <a:t> de </a:t>
-            </a:r>
-            <a:r>
-              <a:rPr lang="nl-NL" dirty="0" err="1"/>
-              <a:t>traitement</a:t>
-            </a:r>
-            <a:r>
-              <a:rPr lang="nl-NL" dirty="0"/>
-              <a:t> de la </a:t>
-            </a:r>
-            <a:r>
-              <a:rPr lang="nl-NL" dirty="0" err="1"/>
-              <a:t>donnée</a:t>
-            </a:r>
-            <a:endParaRPr lang="nl-NL" dirty="0"/>
-          </a:p>
-          <a:p>
-            <a:r>
-              <a:rPr lang="nl-NL" dirty="0"/>
-              <a:t>Extract-Load </a:t>
-            </a:r>
-            <a:r>
-              <a:rPr lang="nl-NL" dirty="0" err="1"/>
-              <a:t>avec</a:t>
-            </a:r>
-            <a:r>
-              <a:rPr lang="nl-NL" dirty="0"/>
-              <a:t> </a:t>
-            </a:r>
-            <a:r>
-              <a:rPr lang="nl-NL" dirty="0" err="1"/>
-              <a:t>Spark</a:t>
-            </a:r>
-            <a:r>
-              <a:rPr lang="nl-NL" dirty="0"/>
-              <a:t> RDD</a:t>
-            </a:r>
-          </a:p>
-          <a:p>
-            <a:r>
-              <a:rPr lang="nl-NL" dirty="0" err="1"/>
-              <a:t>Transform</a:t>
-            </a:r>
-            <a:r>
-              <a:rPr lang="nl-NL" dirty="0"/>
-              <a:t> </a:t>
-            </a:r>
-            <a:r>
-              <a:rPr lang="nl-NL" dirty="0" err="1"/>
-              <a:t>avec</a:t>
-            </a:r>
-            <a:r>
-              <a:rPr lang="nl-NL" dirty="0"/>
-              <a:t> </a:t>
-            </a:r>
-            <a:r>
-              <a:rPr lang="nl-NL" dirty="0" err="1"/>
-              <a:t>Spark</a:t>
-            </a:r>
-            <a:r>
-              <a:rPr lang="nl-NL" dirty="0"/>
-              <a:t> SQL</a:t>
-            </a:r>
-          </a:p>
-          <a:p>
-            <a:r>
-              <a:rPr lang="nl-NL" dirty="0"/>
-              <a:t>Machine Learning </a:t>
-            </a:r>
-            <a:r>
-              <a:rPr lang="nl-NL" dirty="0" err="1"/>
-              <a:t>avec</a:t>
-            </a:r>
-            <a:r>
-              <a:rPr lang="nl-NL" dirty="0"/>
-              <a:t> </a:t>
-            </a:r>
-            <a:r>
-              <a:rPr lang="nl-NL" dirty="0" err="1"/>
-              <a:t>MLLib</a:t>
-            </a:r>
-            <a:endParaRPr lang="nl-NL" dirty="0"/>
-          </a:p>
-          <a:p>
-            <a:r>
-              <a:rPr lang="nl-NL" dirty="0"/>
-              <a:t>Bonus : </a:t>
-            </a:r>
-            <a:r>
-              <a:rPr lang="nl-NL" dirty="0" err="1"/>
-              <a:t>Traitement</a:t>
-            </a:r>
-            <a:r>
-              <a:rPr lang="nl-NL" dirty="0"/>
-              <a:t> de </a:t>
-            </a:r>
-            <a:r>
-              <a:rPr lang="nl-NL" dirty="0" err="1"/>
-              <a:t>graphes</a:t>
-            </a:r>
-            <a:r>
-              <a:rPr lang="nl-NL" dirty="0"/>
-              <a:t> </a:t>
-            </a:r>
-            <a:r>
-              <a:rPr lang="nl-NL" dirty="0" err="1"/>
-              <a:t>avec</a:t>
-            </a:r>
-            <a:r>
-              <a:rPr lang="nl-NL" dirty="0"/>
-              <a:t> </a:t>
-            </a:r>
-            <a:r>
-              <a:rPr lang="nl-NL" dirty="0" err="1"/>
-              <a:t>GraphX</a:t>
-            </a:r>
-            <a:endParaRPr lang="nl-NL" dirty="0"/>
-          </a:p>
-        </p:txBody>
-      </p:sp>
-      <p:sp>
-        <p:nvSpPr>
-          <p:cNvPr id="4" name="Tijdelijke aanduiding voor dianummer 3"/>
-          <p:cNvSpPr>
-            <a:spLocks noGrp="1"/>
-          </p:cNvSpPr>
-          <p:nvPr>
-            <p:ph type="sldNum" sz="quarter" idx="4"/>
-          </p:nvPr>
-        </p:nvSpPr>
-        <p:spPr/>
-        <p:txBody>
-          <a:bodyPr/>
-          <a:lstStyle/>
-          <a:p>
-            <a:fld id="{5EE7099E-8998-4851-915A-4F4831808297}" type="slidenum">
-              <a:rPr lang="nl-NL" smtClean="0"/>
-              <a:pPr/>
-              <a:t>2</a:t>
-            </a:fld>
-            <a:endParaRPr lang="nl-NL"/>
-          </a:p>
-        </p:txBody>
-      </p:sp>
-    </p:spTree>
-    <p:extLst>
-      <p:ext uri="{BB962C8B-B14F-4D97-AF65-F5344CB8AC3E}">
-        <p14:creationId xmlns:p14="http://schemas.microsoft.com/office/powerpoint/2010/main" val="1662105023"/>
-      </p:ext>
-    </p:extLst>
-  </p:cSld>
-  <p:clrMapOvr>
-    <a:masterClrMapping/>
-  </p:clrMapOvr>
-  <p:transition spd="slow">
-    <p:wipe dir="r"/>
-  </p:transition>
 </p:sld>
 </file>
 

</xml_diff>

<commit_message>
Update slides with some EDA exercises
</commit_message>
<xml_diff>
--- a/presentation.pptx
+++ b/presentation.pptx
@@ -5,10 +5,10 @@
     <p:sldMasterId id="2147483648" r:id="rId1"/>
   </p:sldMasterIdLst>
   <p:notesMasterIdLst>
-    <p:notesMasterId r:id="rId28"/>
+    <p:notesMasterId r:id="rId31"/>
   </p:notesMasterIdLst>
   <p:handoutMasterIdLst>
-    <p:handoutMasterId r:id="rId29"/>
+    <p:handoutMasterId r:id="rId32"/>
   </p:handoutMasterIdLst>
   <p:sldIdLst>
     <p:sldId id="256" r:id="rId2"/>
@@ -36,12 +36,15 @@
     <p:sldId id="314" r:id="rId24"/>
     <p:sldId id="317" r:id="rId25"/>
     <p:sldId id="318" r:id="rId26"/>
-    <p:sldId id="269" r:id="rId27"/>
+    <p:sldId id="322" r:id="rId27"/>
+    <p:sldId id="323" r:id="rId28"/>
+    <p:sldId id="324" r:id="rId29"/>
+    <p:sldId id="269" r:id="rId30"/>
   </p:sldIdLst>
   <p:sldSz cx="12198350" cy="6858000"/>
   <p:notesSz cx="9872663" cy="6742113"/>
   <p:custDataLst>
-    <p:tags r:id="rId30"/>
+    <p:tags r:id="rId33"/>
   </p:custDataLst>
   <p:defaultTextStyle>
     <a:defPPr>
@@ -265,7 +268,7 @@
           <a:p>
             <a:fld id="{4F068446-54CF-4267-A5BD-FA01909E96A2}" type="datetimeFigureOut">
               <a:rPr lang="nl-NL" smtClean="0"/>
-              <a:t>25-12-2023</a:t>
+              <a:t>26-12-2023</a:t>
             </a:fld>
             <a:endParaRPr lang="nl-NL"/>
           </a:p>
@@ -430,7 +433,7 @@
           <a:p>
             <a:fld id="{35698784-F1F2-4D71-B346-94F94D5EBAA2}" type="datetimeFigureOut">
               <a:rPr lang="nl-NL" smtClean="0"/>
-              <a:t>25-12-2023</a:t>
+              <a:t>26-12-2023</a:t>
             </a:fld>
             <a:endParaRPr lang="nl-NL"/>
           </a:p>
@@ -1029,7 +1032,7 @@
           <a:p>
             <a:fld id="{928F9493-D671-4F27-99EF-9D103FC79999}" type="datetime1">
               <a:rPr lang="nl-NL" noProof="0" smtClean="0"/>
-              <a:t>25-12-2023</a:t>
+              <a:t>26-12-2023</a:t>
             </a:fld>
             <a:endParaRPr lang="en-GB" noProof="0" dirty="0"/>
           </a:p>
@@ -17056,7 +17059,7 @@
             </a:r>
             <a:r>
               <a:rPr lang="nl-NL" dirty="0"/>
-              <a:t> </a:t>
+              <a:t> les </a:t>
             </a:r>
             <a:r>
               <a:rPr lang="nl-NL" dirty="0" err="1"/>
@@ -17064,7 +17067,7 @@
             </a:r>
             <a:r>
               <a:rPr lang="nl-NL" dirty="0"/>
-              <a:t> SQL</a:t>
+              <a:t> Dataframes</a:t>
             </a:r>
           </a:p>
           <a:p>
@@ -22090,6 +22093,1961 @@
           <a:bodyPr/>
           <a:lstStyle/>
           <a:p>
+            <a:r>
+              <a:rPr lang="nl-NL" dirty="0"/>
+              <a:t> </a:t>
+            </a:r>
+          </a:p>
+        </p:txBody>
+      </p:sp>
+      <p:sp>
+        <p:nvSpPr>
+          <p:cNvPr id="4" name="Titel 3"/>
+          <p:cNvSpPr>
+            <a:spLocks noGrp="1"/>
+          </p:cNvSpPr>
+          <p:nvPr>
+            <p:ph type="title"/>
+          </p:nvPr>
+        </p:nvSpPr>
+        <p:spPr>
+          <a:xfrm>
+            <a:off x="917575" y="990600"/>
+            <a:ext cx="10798224" cy="1718320"/>
+          </a:xfrm>
+        </p:spPr>
+        <p:txBody>
+          <a:bodyPr/>
+          <a:lstStyle/>
+          <a:p>
+            <a:r>
+              <a:rPr lang="nl-NL" dirty="0"/>
+              <a:t>Analyse de </a:t>
+            </a:r>
+            <a:r>
+              <a:rPr lang="nl-NL" dirty="0" err="1"/>
+              <a:t>données</a:t>
+            </a:r>
+            <a:r>
+              <a:rPr lang="nl-NL" dirty="0"/>
+              <a:t> </a:t>
+            </a:r>
+            <a:r>
+              <a:rPr lang="nl-NL" dirty="0" err="1"/>
+              <a:t>avec</a:t>
+            </a:r>
+            <a:r>
+              <a:rPr lang="nl-NL" dirty="0"/>
+              <a:t> les </a:t>
+            </a:r>
+            <a:r>
+              <a:rPr lang="nl-NL" dirty="0" err="1"/>
+              <a:t>Spark</a:t>
+            </a:r>
+            <a:r>
+              <a:rPr lang="nl-NL" dirty="0"/>
+              <a:t> Dataframes</a:t>
+            </a:r>
+          </a:p>
+        </p:txBody>
+      </p:sp>
+      <p:sp>
+        <p:nvSpPr>
+          <p:cNvPr id="2" name="Tijdelijke aanduiding voor dianummer 1"/>
+          <p:cNvSpPr>
+            <a:spLocks noGrp="1"/>
+          </p:cNvSpPr>
+          <p:nvPr>
+            <p:ph type="sldNum" sz="quarter" idx="4"/>
+          </p:nvPr>
+        </p:nvSpPr>
+        <p:spPr/>
+        <p:txBody>
+          <a:bodyPr/>
+          <a:lstStyle/>
+          <a:p>
+            <a:fld id="{5EE7099E-8998-4851-915A-4F4831808297}" type="slidenum">
+              <a:rPr lang="nl-NL" smtClean="0"/>
+              <a:pPr/>
+              <a:t>26</a:t>
+            </a:fld>
+            <a:endParaRPr lang="nl-NL"/>
+          </a:p>
+        </p:txBody>
+      </p:sp>
+      <p:sp>
+        <p:nvSpPr>
+          <p:cNvPr id="5" name="Tijdelijke aanduiding voor tekst 19">
+            <a:extLst>
+              <a:ext uri="{FF2B5EF4-FFF2-40B4-BE49-F238E27FC236}">
+                <a16:creationId xmlns:a16="http://schemas.microsoft.com/office/drawing/2014/main" id="{2A74D798-416D-40D6-8906-E31EC4F18491}"/>
+              </a:ext>
+            </a:extLst>
+          </p:cNvPr>
+          <p:cNvSpPr>
+            <a:spLocks noGrp="1"/>
+          </p:cNvSpPr>
+          <p:nvPr>
+            <p:ph type="body" sz="quarter" idx="15" hasCustomPrompt="1"/>
+          </p:nvPr>
+        </p:nvSpPr>
+        <p:spPr>
+          <a:xfrm>
+            <a:off x="549002" y="6444530"/>
+            <a:ext cx="6918325" cy="393700"/>
+          </a:xfrm>
+        </p:spPr>
+        <p:txBody>
+          <a:bodyPr anchor="ctr">
+            <a:normAutofit/>
+          </a:bodyPr>
+          <a:lstStyle>
+            <a:lvl1pPr marL="0" indent="0">
+              <a:buNone/>
+              <a:defRPr sz="1800" baseline="0">
+                <a:solidFill>
+                  <a:schemeClr val="bg1"/>
+                </a:solidFill>
+              </a:defRPr>
+            </a:lvl1pPr>
+          </a:lstStyle>
+          <a:p>
+            <a:pPr lvl="0"/>
+            <a:r>
+              <a:rPr lang="en-GB" dirty="0"/>
+              <a:t>CY Tech – C. Madi Mnemoi, </a:t>
+            </a:r>
+            <a:r>
+              <a:rPr lang="en-GB" dirty="0" err="1"/>
+              <a:t>B.Kerdad</a:t>
+            </a:r>
+            <a:endParaRPr lang="en-GB" dirty="0"/>
+          </a:p>
+        </p:txBody>
+      </p:sp>
+    </p:spTree>
+    <p:extLst>
+      <p:ext uri="{BB962C8B-B14F-4D97-AF65-F5344CB8AC3E}">
+        <p14:creationId xmlns:p14="http://schemas.microsoft.com/office/powerpoint/2010/main" val="2814319420"/>
+      </p:ext>
+    </p:extLst>
+  </p:cSld>
+  <p:clrMapOvr>
+    <a:masterClrMapping/>
+  </p:clrMapOvr>
+  <p:transition spd="slow">
+    <p:wipe dir="r"/>
+  </p:transition>
+  <p:timing>
+    <p:tnLst>
+      <p:par>
+        <p:cTn id="1" dur="indefinite" restart="never" nodeType="tmRoot">
+          <p:childTnLst>
+            <p:seq concurrent="1" nextAc="seek">
+              <p:cTn id="2" dur="indefinite" nodeType="mainSeq">
+                <p:childTnLst>
+                  <p:par>
+                    <p:cTn id="3" fill="hold">
+                      <p:stCondLst>
+                        <p:cond delay="indefinite"/>
+                        <p:cond evt="onBegin" delay="0">
+                          <p:tn val="2"/>
+                        </p:cond>
+                      </p:stCondLst>
+                      <p:childTnLst>
+                        <p:par>
+                          <p:cTn id="4" fill="hold">
+                            <p:stCondLst>
+                              <p:cond delay="0"/>
+                            </p:stCondLst>
+                            <p:childTnLst>
+                              <p:par>
+                                <p:cTn id="5" presetID="10" presetClass="entr" presetSubtype="0" fill="hold" grpId="0" nodeType="withEffect">
+                                  <p:stCondLst>
+                                    <p:cond delay="1000"/>
+                                  </p:stCondLst>
+                                  <p:childTnLst>
+                                    <p:set>
+                                      <p:cBhvr>
+                                        <p:cTn id="6" dur="1" fill="hold">
+                                          <p:stCondLst>
+                                            <p:cond delay="0"/>
+                                          </p:stCondLst>
+                                        </p:cTn>
+                                        <p:tgtEl>
+                                          <p:spTgt spid="5">
+                                            <p:txEl>
+                                              <p:pRg st="0" end="0"/>
+                                            </p:txEl>
+                                          </p:spTgt>
+                                        </p:tgtEl>
+                                        <p:attrNameLst>
+                                          <p:attrName>style.visibility</p:attrName>
+                                        </p:attrNameLst>
+                                      </p:cBhvr>
+                                      <p:to>
+                                        <p:strVal val="visible"/>
+                                      </p:to>
+                                    </p:set>
+                                    <p:animEffect transition="in" filter="fade">
+                                      <p:cBhvr>
+                                        <p:cTn id="7" dur="750"/>
+                                        <p:tgtEl>
+                                          <p:spTgt spid="5">
+                                            <p:txEl>
+                                              <p:pRg st="0" end="0"/>
+                                            </p:txEl>
+                                          </p:spTgt>
+                                        </p:tgtEl>
+                                      </p:cBhvr>
+                                    </p:animEffect>
+                                  </p:childTnLst>
+                                </p:cTn>
+                              </p:par>
+                            </p:childTnLst>
+                          </p:cTn>
+                        </p:par>
+                      </p:childTnLst>
+                    </p:cTn>
+                  </p:par>
+                </p:childTnLst>
+              </p:cTn>
+              <p:prevCondLst>
+                <p:cond evt="onPrev" delay="0">
+                  <p:tgtEl>
+                    <p:sldTgt/>
+                  </p:tgtEl>
+                </p:cond>
+              </p:prevCondLst>
+              <p:nextCondLst>
+                <p:cond evt="onNext" delay="0">
+                  <p:tgtEl>
+                    <p:sldTgt/>
+                  </p:tgtEl>
+                </p:cond>
+              </p:nextCondLst>
+            </p:seq>
+          </p:childTnLst>
+        </p:cTn>
+      </p:par>
+    </p:tnLst>
+    <p:bldLst>
+      <p:bldP spid="5" grpId="0" build="p">
+        <p:tmplLst>
+          <p:tmpl lvl="1">
+            <p:tnLst>
+              <p:par>
+                <p:cTn presetID="10" presetClass="entr" presetSubtype="0" fill="hold" nodeType="withEffect">
+                  <p:stCondLst>
+                    <p:cond delay="1000"/>
+                  </p:stCondLst>
+                  <p:childTnLst>
+                    <p:set>
+                      <p:cBhvr>
+                        <p:cTn dur="1" fill="hold">
+                          <p:stCondLst>
+                            <p:cond delay="0"/>
+                          </p:stCondLst>
+                        </p:cTn>
+                        <p:tgtEl>
+                          <p:spTgt spid="5"/>
+                        </p:tgtEl>
+                        <p:attrNameLst>
+                          <p:attrName>style.visibility</p:attrName>
+                        </p:attrNameLst>
+                      </p:cBhvr>
+                      <p:to>
+                        <p:strVal val="visible"/>
+                      </p:to>
+                    </p:set>
+                    <p:animEffect transition="in" filter="fade">
+                      <p:cBhvr>
+                        <p:cTn dur="750"/>
+                        <p:tgtEl>
+                          <p:spTgt spid="5"/>
+                        </p:tgtEl>
+                      </p:cBhvr>
+                    </p:animEffect>
+                  </p:childTnLst>
+                </p:cTn>
+              </p:par>
+            </p:tnLst>
+          </p:tmpl>
+        </p:tmplLst>
+      </p:bldP>
+    </p:bldLst>
+  </p:timing>
+</p:sld>
+</file>
+
+<file path=ppt/slides/slide27.xml><?xml version="1.0" encoding="utf-8"?>
+<p:sld xmlns:a="http://schemas.openxmlformats.org/drawingml/2006/main" xmlns:r="http://schemas.openxmlformats.org/officeDocument/2006/relationships" xmlns:p="http://schemas.openxmlformats.org/presentationml/2006/main">
+  <p:cSld>
+    <p:spTree>
+      <p:nvGrpSpPr>
+        <p:cNvPr id="1" name=""/>
+        <p:cNvGrpSpPr/>
+        <p:nvPr/>
+      </p:nvGrpSpPr>
+      <p:grpSpPr>
+        <a:xfrm>
+          <a:off x="0" y="0"/>
+          <a:ext cx="0" cy="0"/>
+          <a:chOff x="0" y="0"/>
+          <a:chExt cx="0" cy="0"/>
+        </a:xfrm>
+      </p:grpSpPr>
+      <p:sp>
+        <p:nvSpPr>
+          <p:cNvPr id="2" name="Title 1">
+            <a:extLst>
+              <a:ext uri="{FF2B5EF4-FFF2-40B4-BE49-F238E27FC236}">
+                <a16:creationId xmlns:a16="http://schemas.microsoft.com/office/drawing/2014/main" id="{04C5DF06-5F42-4296-B27B-4F79E0DB836B}"/>
+              </a:ext>
+            </a:extLst>
+          </p:cNvPr>
+          <p:cNvSpPr>
+            <a:spLocks noGrp="1"/>
+          </p:cNvSpPr>
+          <p:nvPr>
+            <p:ph type="title"/>
+          </p:nvPr>
+        </p:nvSpPr>
+        <p:spPr/>
+        <p:txBody>
+          <a:bodyPr/>
+          <a:lstStyle/>
+          <a:p>
+            <a:r>
+              <a:rPr lang="en-US" sz="3600" dirty="0" err="1"/>
+              <a:t>Quelques</a:t>
+            </a:r>
+            <a:r>
+              <a:rPr lang="en-US" sz="3600" dirty="0"/>
+              <a:t> </a:t>
+            </a:r>
+            <a:r>
+              <a:rPr lang="en-US" sz="3600" dirty="0" err="1"/>
+              <a:t>fonctions</a:t>
+            </a:r>
+            <a:r>
+              <a:rPr lang="en-US" sz="3600" dirty="0"/>
+              <a:t> pour explorer la </a:t>
+            </a:r>
+            <a:r>
+              <a:rPr lang="en-US" sz="3600" dirty="0" err="1"/>
+              <a:t>donnée</a:t>
+            </a:r>
+            <a:r>
+              <a:rPr lang="en-US" sz="3600" dirty="0"/>
+              <a:t>…</a:t>
+            </a:r>
+          </a:p>
+        </p:txBody>
+      </p:sp>
+      <p:sp>
+        <p:nvSpPr>
+          <p:cNvPr id="5" name="Slide Number Placeholder 4">
+            <a:extLst>
+              <a:ext uri="{FF2B5EF4-FFF2-40B4-BE49-F238E27FC236}">
+                <a16:creationId xmlns:a16="http://schemas.microsoft.com/office/drawing/2014/main" id="{B756D4B6-3814-4E02-AB98-08D3B49675BF}"/>
+              </a:ext>
+            </a:extLst>
+          </p:cNvPr>
+          <p:cNvSpPr>
+            <a:spLocks noGrp="1"/>
+          </p:cNvSpPr>
+          <p:nvPr>
+            <p:ph type="sldNum" sz="quarter" idx="4"/>
+          </p:nvPr>
+        </p:nvSpPr>
+        <p:spPr/>
+        <p:txBody>
+          <a:bodyPr/>
+          <a:lstStyle/>
+          <a:p>
+            <a:fld id="{5EE7099E-8998-4851-915A-4F4831808297}" type="slidenum">
+              <a:rPr lang="nl-NL" smtClean="0"/>
+              <a:pPr/>
+              <a:t>27</a:t>
+            </a:fld>
+            <a:endParaRPr lang="nl-NL"/>
+          </a:p>
+        </p:txBody>
+      </p:sp>
+      <p:sp>
+        <p:nvSpPr>
+          <p:cNvPr id="3" name="ZoneTexte 2">
+            <a:extLst>
+              <a:ext uri="{FF2B5EF4-FFF2-40B4-BE49-F238E27FC236}">
+                <a16:creationId xmlns:a16="http://schemas.microsoft.com/office/drawing/2014/main" id="{0C248AA7-6FCB-3F89-E3DD-C837A2826405}"/>
+              </a:ext>
+            </a:extLst>
+          </p:cNvPr>
+          <p:cNvSpPr txBox="1"/>
+          <p:nvPr/>
+        </p:nvSpPr>
+        <p:spPr>
+          <a:xfrm>
+            <a:off x="3692106" y="1699404"/>
+            <a:ext cx="0" cy="0"/>
+          </a:xfrm>
+          <a:prstGeom prst="rect">
+            <a:avLst/>
+          </a:prstGeom>
+          <a:noFill/>
+        </p:spPr>
+        <p:txBody>
+          <a:bodyPr wrap="none" lIns="108000" tIns="108000" rIns="108000" bIns="108000" rtlCol="0">
+            <a:noAutofit/>
+          </a:bodyPr>
+          <a:lstStyle/>
+          <a:p>
+            <a:endParaRPr lang="fr-FR" noProof="0" dirty="0" err="1">
+              <a:solidFill>
+                <a:schemeClr val="bg2"/>
+              </a:solidFill>
+            </a:endParaRPr>
+          </a:p>
+        </p:txBody>
+      </p:sp>
+      <p:sp>
+        <p:nvSpPr>
+          <p:cNvPr id="6" name="Vertical Text Placeholder 5">
+            <a:extLst>
+              <a:ext uri="{FF2B5EF4-FFF2-40B4-BE49-F238E27FC236}">
+                <a16:creationId xmlns:a16="http://schemas.microsoft.com/office/drawing/2014/main" id="{F8170739-5212-AEC7-557E-2E086A29A496}"/>
+              </a:ext>
+            </a:extLst>
+          </p:cNvPr>
+          <p:cNvSpPr>
+            <a:spLocks noGrp="1"/>
+          </p:cNvSpPr>
+          <p:nvPr>
+            <p:ph type="body" orient="vert" idx="1"/>
+          </p:nvPr>
+        </p:nvSpPr>
+        <p:spPr>
+          <a:xfrm>
+            <a:off x="404662" y="1143000"/>
+            <a:ext cx="11389023" cy="4795836"/>
+          </a:xfrm>
+        </p:spPr>
+        <p:txBody>
+          <a:bodyPr/>
+          <a:lstStyle/>
+          <a:p>
+            <a:endParaRPr lang="en-US" dirty="0"/>
+          </a:p>
+          <a:p>
+            <a:endParaRPr lang="en-US" dirty="0"/>
+          </a:p>
+          <a:p>
+            <a:pPr marL="180975" lvl="1" indent="0">
+              <a:buNone/>
+            </a:pPr>
+            <a:endParaRPr lang="en-US" dirty="0"/>
+          </a:p>
+          <a:p>
+            <a:pPr lvl="1"/>
+            <a:endParaRPr lang="en-US" dirty="0"/>
+          </a:p>
+          <a:p>
+            <a:endParaRPr lang="en-US" dirty="0"/>
+          </a:p>
+          <a:p>
+            <a:endParaRPr lang="en-US" dirty="0"/>
+          </a:p>
+          <a:p>
+            <a:endParaRPr lang="en-US" dirty="0"/>
+          </a:p>
+          <a:p>
+            <a:endParaRPr lang="en-US" dirty="0"/>
+          </a:p>
+          <a:p>
+            <a:pPr lvl="1"/>
+            <a:endParaRPr lang="en-US" dirty="0"/>
+          </a:p>
+          <a:p>
+            <a:pPr lvl="1"/>
+            <a:endParaRPr lang="en-US" dirty="0"/>
+          </a:p>
+          <a:p>
+            <a:pPr lvl="1"/>
+            <a:endParaRPr lang="en-US" dirty="0"/>
+          </a:p>
+          <a:p>
+            <a:pPr lvl="1"/>
+            <a:endParaRPr lang="en-US" dirty="0"/>
+          </a:p>
+          <a:p>
+            <a:endParaRPr lang="en-US" b="1" dirty="0"/>
+          </a:p>
+          <a:p>
+            <a:endParaRPr lang="en-US" dirty="0"/>
+          </a:p>
+        </p:txBody>
+      </p:sp>
+      <p:sp>
+        <p:nvSpPr>
+          <p:cNvPr id="4" name="Vertical Text Placeholder 5">
+            <a:extLst>
+              <a:ext uri="{FF2B5EF4-FFF2-40B4-BE49-F238E27FC236}">
+                <a16:creationId xmlns:a16="http://schemas.microsoft.com/office/drawing/2014/main" id="{A57D01D8-1D67-D654-0CFB-28A877FD85B9}"/>
+              </a:ext>
+            </a:extLst>
+          </p:cNvPr>
+          <p:cNvSpPr txBox="1">
+            <a:spLocks/>
+          </p:cNvSpPr>
+          <p:nvPr/>
+        </p:nvSpPr>
+        <p:spPr>
+          <a:xfrm>
+            <a:off x="557062" y="1295400"/>
+            <a:ext cx="11389023" cy="4795836"/>
+          </a:xfrm>
+          <a:prstGeom prst="rect">
+            <a:avLst/>
+          </a:prstGeom>
+        </p:spPr>
+        <p:txBody>
+          <a:bodyPr vert="horz" lIns="0" tIns="0" rIns="0" bIns="0" rtlCol="0">
+            <a:normAutofit/>
+          </a:bodyPr>
+          <a:lstStyle>
+            <a:lvl1pPr marL="180975" indent="-180975" algn="l" defTabSz="914400" rtl="0" eaLnBrk="1" latinLnBrk="0" hangingPunct="1">
+              <a:lnSpc>
+                <a:spcPct val="90000"/>
+              </a:lnSpc>
+              <a:spcBef>
+                <a:spcPts val="600"/>
+              </a:spcBef>
+              <a:spcAft>
+                <a:spcPts val="600"/>
+              </a:spcAft>
+              <a:buClr>
+                <a:schemeClr val="bg2"/>
+              </a:buClr>
+              <a:buFont typeface="Arial" panose="020B0604020202020204" pitchFamily="34" charset="0"/>
+              <a:buChar char="•"/>
+              <a:defRPr sz="1800" kern="1200">
+                <a:solidFill>
+                  <a:schemeClr val="bg2"/>
+                </a:solidFill>
+                <a:latin typeface="+mn-lt"/>
+                <a:ea typeface="+mn-ea"/>
+                <a:cs typeface="+mn-cs"/>
+              </a:defRPr>
+            </a:lvl1pPr>
+            <a:lvl2pPr marL="361950" indent="-180975" algn="l" defTabSz="914400" rtl="0" eaLnBrk="1" latinLnBrk="0" hangingPunct="1">
+              <a:lnSpc>
+                <a:spcPct val="90000"/>
+              </a:lnSpc>
+              <a:spcBef>
+                <a:spcPts val="600"/>
+              </a:spcBef>
+              <a:spcAft>
+                <a:spcPts val="600"/>
+              </a:spcAft>
+              <a:buClr>
+                <a:schemeClr val="bg2"/>
+              </a:buClr>
+              <a:buFont typeface="Arial" panose="020B0604020202020204" pitchFamily="34" charset="0"/>
+              <a:buChar char="-"/>
+              <a:defRPr sz="1600" kern="1200">
+                <a:solidFill>
+                  <a:schemeClr val="bg2"/>
+                </a:solidFill>
+                <a:latin typeface="+mn-lt"/>
+                <a:ea typeface="+mn-ea"/>
+                <a:cs typeface="+mn-cs"/>
+              </a:defRPr>
+            </a:lvl2pPr>
+            <a:lvl3pPr marL="0" indent="0" algn="l" defTabSz="914400" rtl="0" eaLnBrk="1" latinLnBrk="0" hangingPunct="1">
+              <a:lnSpc>
+                <a:spcPct val="90000"/>
+              </a:lnSpc>
+              <a:spcBef>
+                <a:spcPts val="600"/>
+              </a:spcBef>
+              <a:spcAft>
+                <a:spcPts val="600"/>
+              </a:spcAft>
+              <a:buFont typeface="Arial" panose="020B0604020202020204" pitchFamily="34" charset="0"/>
+              <a:buNone/>
+              <a:defRPr sz="1800" kern="1200">
+                <a:solidFill>
+                  <a:schemeClr val="bg2"/>
+                </a:solidFill>
+                <a:latin typeface="+mn-lt"/>
+                <a:ea typeface="+mn-ea"/>
+                <a:cs typeface="+mn-cs"/>
+              </a:defRPr>
+            </a:lvl3pPr>
+            <a:lvl4pPr marL="0" indent="0" algn="l" defTabSz="914400" rtl="0" eaLnBrk="1" latinLnBrk="0" hangingPunct="1">
+              <a:lnSpc>
+                <a:spcPct val="90000"/>
+              </a:lnSpc>
+              <a:spcBef>
+                <a:spcPts val="600"/>
+              </a:spcBef>
+              <a:spcAft>
+                <a:spcPts val="600"/>
+              </a:spcAft>
+              <a:buFont typeface="Arial" panose="020B0604020202020204" pitchFamily="34" charset="0"/>
+              <a:buNone/>
+              <a:defRPr sz="1800" b="1" kern="1200">
+                <a:solidFill>
+                  <a:schemeClr val="bg2"/>
+                </a:solidFill>
+                <a:latin typeface="+mn-lt"/>
+                <a:ea typeface="+mn-ea"/>
+                <a:cs typeface="+mn-cs"/>
+              </a:defRPr>
+            </a:lvl4pPr>
+            <a:lvl5pPr marL="0" indent="0" algn="l" defTabSz="914400" rtl="0" eaLnBrk="1" latinLnBrk="0" hangingPunct="1">
+              <a:lnSpc>
+                <a:spcPct val="90000"/>
+              </a:lnSpc>
+              <a:spcBef>
+                <a:spcPts val="600"/>
+              </a:spcBef>
+              <a:spcAft>
+                <a:spcPts val="600"/>
+              </a:spcAft>
+              <a:buFont typeface="Arial" panose="020B0604020202020204" pitchFamily="34" charset="0"/>
+              <a:buNone/>
+              <a:defRPr sz="1800" b="1" kern="1200" baseline="0">
+                <a:solidFill>
+                  <a:schemeClr val="tx2"/>
+                </a:solidFill>
+                <a:latin typeface="+mn-lt"/>
+                <a:ea typeface="+mn-ea"/>
+                <a:cs typeface="+mn-cs"/>
+              </a:defRPr>
+            </a:lvl5pPr>
+            <a:lvl6pPr marL="180975" indent="-180975" algn="l" defTabSz="914400" rtl="0" eaLnBrk="1" latinLnBrk="0" hangingPunct="1">
+              <a:lnSpc>
+                <a:spcPct val="90000"/>
+              </a:lnSpc>
+              <a:spcBef>
+                <a:spcPts val="600"/>
+              </a:spcBef>
+              <a:spcAft>
+                <a:spcPts val="600"/>
+              </a:spcAft>
+              <a:buClr>
+                <a:schemeClr val="bg2"/>
+              </a:buClr>
+              <a:buFont typeface="Arial" panose="020B0604020202020204" pitchFamily="34" charset="0"/>
+              <a:buChar char="•"/>
+              <a:defRPr sz="1800" kern="1200">
+                <a:solidFill>
+                  <a:schemeClr val="bg2"/>
+                </a:solidFill>
+                <a:latin typeface="+mn-lt"/>
+                <a:ea typeface="+mn-ea"/>
+                <a:cs typeface="+mn-cs"/>
+              </a:defRPr>
+            </a:lvl6pPr>
+            <a:lvl7pPr marL="361950" indent="-180975" algn="l" defTabSz="914400" rtl="0" eaLnBrk="1" latinLnBrk="0" hangingPunct="1">
+              <a:lnSpc>
+                <a:spcPct val="90000"/>
+              </a:lnSpc>
+              <a:spcBef>
+                <a:spcPts val="600"/>
+              </a:spcBef>
+              <a:spcAft>
+                <a:spcPts val="600"/>
+              </a:spcAft>
+              <a:buClr>
+                <a:schemeClr val="bg2"/>
+              </a:buClr>
+              <a:buFont typeface="Arial" panose="020B0604020202020204" pitchFamily="34" charset="0"/>
+              <a:buChar char="-"/>
+              <a:defRPr sz="1600" kern="1200">
+                <a:solidFill>
+                  <a:schemeClr val="bg2"/>
+                </a:solidFill>
+                <a:latin typeface="+mn-lt"/>
+                <a:ea typeface="+mn-ea"/>
+                <a:cs typeface="+mn-cs"/>
+              </a:defRPr>
+            </a:lvl7pPr>
+            <a:lvl8pPr marL="0" indent="0" algn="l" defTabSz="914400" rtl="0" eaLnBrk="1" latinLnBrk="0" hangingPunct="1">
+              <a:lnSpc>
+                <a:spcPct val="90000"/>
+              </a:lnSpc>
+              <a:spcBef>
+                <a:spcPts val="600"/>
+              </a:spcBef>
+              <a:spcAft>
+                <a:spcPts val="600"/>
+              </a:spcAft>
+              <a:buFont typeface="Arial" panose="020B0604020202020204" pitchFamily="34" charset="0"/>
+              <a:buNone/>
+              <a:defRPr sz="1600" kern="1200">
+                <a:solidFill>
+                  <a:schemeClr val="bg2"/>
+                </a:solidFill>
+                <a:latin typeface="+mn-lt"/>
+                <a:ea typeface="+mn-ea"/>
+                <a:cs typeface="+mn-cs"/>
+              </a:defRPr>
+            </a:lvl8pPr>
+            <a:lvl9pPr marL="0" indent="0" algn="l" defTabSz="914400" rtl="0" eaLnBrk="1" latinLnBrk="0" hangingPunct="1">
+              <a:lnSpc>
+                <a:spcPct val="90000"/>
+              </a:lnSpc>
+              <a:spcBef>
+                <a:spcPts val="600"/>
+              </a:spcBef>
+              <a:spcAft>
+                <a:spcPts val="600"/>
+              </a:spcAft>
+              <a:buFont typeface="Arial" panose="020B0604020202020204" pitchFamily="34" charset="0"/>
+              <a:buNone/>
+              <a:defRPr sz="1800" b="1" kern="1200" baseline="0">
+                <a:solidFill>
+                  <a:schemeClr val="bg2"/>
+                </a:solidFill>
+                <a:latin typeface="+mn-lt"/>
+                <a:ea typeface="+mn-ea"/>
+                <a:cs typeface="+mn-cs"/>
+              </a:defRPr>
+            </a:lvl9pPr>
+          </a:lstStyle>
+          <a:p>
+            <a:r>
+              <a:rPr lang="en-US" sz="2400" b="1" dirty="0"/>
+              <a:t>filter</a:t>
+            </a:r>
+            <a:r>
+              <a:rPr lang="en-US" sz="2400" dirty="0"/>
+              <a:t> : </a:t>
+            </a:r>
+            <a:r>
+              <a:rPr lang="en-US" sz="2400" dirty="0" err="1"/>
+              <a:t>filtrer</a:t>
+            </a:r>
+            <a:r>
+              <a:rPr lang="en-US" sz="2400" dirty="0"/>
+              <a:t> le </a:t>
+            </a:r>
+            <a:r>
+              <a:rPr lang="en-US" sz="2400" dirty="0" err="1"/>
+              <a:t>DataFrame</a:t>
+            </a:r>
+            <a:r>
+              <a:rPr lang="en-US" sz="2400" dirty="0"/>
+              <a:t> sur les </a:t>
+            </a:r>
+            <a:r>
+              <a:rPr lang="en-US" sz="2400" dirty="0" err="1"/>
+              <a:t>individus</a:t>
+            </a:r>
+            <a:r>
+              <a:rPr lang="en-US" sz="2400" dirty="0"/>
+              <a:t> </a:t>
+            </a:r>
+            <a:r>
+              <a:rPr lang="en-US" sz="2400" dirty="0" err="1"/>
+              <a:t>respectant</a:t>
+            </a:r>
+            <a:r>
+              <a:rPr lang="en-US" sz="2400" dirty="0"/>
+              <a:t> </a:t>
+            </a:r>
+            <a:r>
+              <a:rPr lang="en-US" sz="2400" dirty="0" err="1"/>
+              <a:t>une</a:t>
+            </a:r>
+            <a:r>
+              <a:rPr lang="en-US" sz="2400" dirty="0"/>
+              <a:t> condition</a:t>
+            </a:r>
+          </a:p>
+          <a:p>
+            <a:pPr marL="0" indent="0">
+              <a:buNone/>
+            </a:pPr>
+            <a:endParaRPr lang="en-US" sz="2400" dirty="0"/>
+          </a:p>
+          <a:p>
+            <a:r>
+              <a:rPr lang="en-US" sz="2400" b="1" dirty="0"/>
+              <a:t>sort : </a:t>
+            </a:r>
+            <a:r>
+              <a:rPr lang="en-US" sz="2400" dirty="0"/>
+              <a:t>trier le </a:t>
+            </a:r>
+            <a:r>
+              <a:rPr lang="en-US" sz="2400" dirty="0" err="1"/>
+              <a:t>DataFrame</a:t>
+            </a:r>
+            <a:r>
+              <a:rPr lang="en-US" sz="2400" dirty="0"/>
+              <a:t> </a:t>
+            </a:r>
+            <a:r>
+              <a:rPr lang="en-US" sz="2400" dirty="0" err="1"/>
+              <a:t>selon</a:t>
+            </a:r>
+            <a:r>
+              <a:rPr lang="en-US" sz="2400" dirty="0"/>
+              <a:t> </a:t>
+            </a:r>
+            <a:r>
+              <a:rPr lang="en-US" sz="2400" dirty="0" err="1"/>
+              <a:t>une</a:t>
+            </a:r>
+            <a:r>
+              <a:rPr lang="en-US" sz="2400" dirty="0"/>
+              <a:t> variable</a:t>
+            </a:r>
+          </a:p>
+          <a:p>
+            <a:pPr marL="0" indent="0">
+              <a:buNone/>
+            </a:pPr>
+            <a:endParaRPr lang="en-US" sz="2400" b="1" dirty="0"/>
+          </a:p>
+          <a:p>
+            <a:r>
+              <a:rPr lang="en-US" sz="2400" b="1" dirty="0" err="1"/>
+              <a:t>groupBy</a:t>
+            </a:r>
+            <a:r>
+              <a:rPr lang="en-US" sz="2400" dirty="0"/>
+              <a:t> : appliquer </a:t>
+            </a:r>
+            <a:r>
+              <a:rPr lang="en-US" sz="2400" dirty="0" err="1"/>
+              <a:t>une</a:t>
+            </a:r>
+            <a:r>
+              <a:rPr lang="en-US" sz="2400" dirty="0"/>
+              <a:t> function </a:t>
+            </a:r>
+            <a:r>
+              <a:rPr lang="en-US" sz="2400" dirty="0" err="1"/>
+              <a:t>d’agrégat</a:t>
+            </a:r>
+            <a:r>
+              <a:rPr lang="en-US" sz="2400" dirty="0"/>
+              <a:t> </a:t>
+            </a:r>
+            <a:r>
+              <a:rPr lang="en-US" sz="2400" dirty="0" err="1"/>
+              <a:t>en</a:t>
+            </a:r>
+            <a:r>
+              <a:rPr lang="en-US" sz="2400" dirty="0"/>
+              <a:t> </a:t>
+            </a:r>
+            <a:r>
+              <a:rPr lang="en-US" sz="2400" dirty="0" err="1"/>
+              <a:t>fonction</a:t>
+            </a:r>
+            <a:r>
+              <a:rPr lang="en-US" sz="2400" dirty="0"/>
+              <a:t> </a:t>
+            </a:r>
+            <a:r>
+              <a:rPr lang="en-US" sz="2400" dirty="0" err="1"/>
+              <a:t>d’une</a:t>
+            </a:r>
+            <a:r>
+              <a:rPr lang="en-US" sz="2400" dirty="0"/>
+              <a:t> variable : </a:t>
+            </a:r>
+          </a:p>
+          <a:p>
+            <a:pPr lvl="1"/>
+            <a:r>
+              <a:rPr lang="en-US" sz="2200" b="1" dirty="0"/>
+              <a:t>sum</a:t>
+            </a:r>
+          </a:p>
+          <a:p>
+            <a:pPr lvl="1"/>
+            <a:r>
+              <a:rPr lang="en-US" sz="2200" b="1" dirty="0"/>
+              <a:t>mean</a:t>
+            </a:r>
+          </a:p>
+          <a:p>
+            <a:pPr lvl="1"/>
+            <a:r>
+              <a:rPr lang="en-US" sz="2200" b="1" dirty="0"/>
+              <a:t>count</a:t>
+            </a:r>
+          </a:p>
+          <a:p>
+            <a:pPr marL="180975" lvl="1" indent="0">
+              <a:buNone/>
+            </a:pPr>
+            <a:endParaRPr lang="en-US" sz="2200" dirty="0"/>
+          </a:p>
+          <a:p>
+            <a:pPr lvl="1"/>
+            <a:endParaRPr lang="en-US" sz="2200" dirty="0"/>
+          </a:p>
+          <a:p>
+            <a:pPr marL="0" indent="0">
+              <a:buFont typeface="Arial" panose="020B0604020202020204" pitchFamily="34" charset="0"/>
+              <a:buNone/>
+            </a:pPr>
+            <a:endParaRPr lang="en-US" dirty="0"/>
+          </a:p>
+          <a:p>
+            <a:endParaRPr lang="en-US" dirty="0"/>
+          </a:p>
+          <a:p>
+            <a:pPr marL="180975" lvl="1" indent="0">
+              <a:buFont typeface="Arial" panose="020B0604020202020204" pitchFamily="34" charset="0"/>
+              <a:buNone/>
+            </a:pPr>
+            <a:endParaRPr lang="en-US" dirty="0"/>
+          </a:p>
+          <a:p>
+            <a:pPr lvl="1"/>
+            <a:endParaRPr lang="en-US" dirty="0"/>
+          </a:p>
+          <a:p>
+            <a:endParaRPr lang="en-US" dirty="0"/>
+          </a:p>
+          <a:p>
+            <a:endParaRPr lang="en-US" dirty="0"/>
+          </a:p>
+          <a:p>
+            <a:endParaRPr lang="en-US" dirty="0"/>
+          </a:p>
+          <a:p>
+            <a:endParaRPr lang="en-US" dirty="0"/>
+          </a:p>
+          <a:p>
+            <a:pPr lvl="1"/>
+            <a:endParaRPr lang="en-US" dirty="0"/>
+          </a:p>
+          <a:p>
+            <a:pPr lvl="1"/>
+            <a:endParaRPr lang="en-US" dirty="0"/>
+          </a:p>
+          <a:p>
+            <a:pPr lvl="1"/>
+            <a:endParaRPr lang="en-US" dirty="0"/>
+          </a:p>
+          <a:p>
+            <a:pPr lvl="1"/>
+            <a:endParaRPr lang="en-US" dirty="0"/>
+          </a:p>
+          <a:p>
+            <a:endParaRPr lang="en-US" b="1" dirty="0"/>
+          </a:p>
+          <a:p>
+            <a:endParaRPr lang="en-US" dirty="0"/>
+          </a:p>
+        </p:txBody>
+      </p:sp>
+    </p:spTree>
+    <p:extLst>
+      <p:ext uri="{BB962C8B-B14F-4D97-AF65-F5344CB8AC3E}">
+        <p14:creationId xmlns:p14="http://schemas.microsoft.com/office/powerpoint/2010/main" val="4202431920"/>
+      </p:ext>
+    </p:extLst>
+  </p:cSld>
+  <p:clrMapOvr>
+    <a:masterClrMapping/>
+  </p:clrMapOvr>
+  <p:transition spd="slow">
+    <p:wipe dir="r"/>
+  </p:transition>
+</p:sld>
+</file>
+
+<file path=ppt/slides/slide28.xml><?xml version="1.0" encoding="utf-8"?>
+<p:sld xmlns:a="http://schemas.openxmlformats.org/drawingml/2006/main" xmlns:r="http://schemas.openxmlformats.org/officeDocument/2006/relationships" xmlns:p="http://schemas.openxmlformats.org/presentationml/2006/main">
+  <p:cSld>
+    <p:spTree>
+      <p:nvGrpSpPr>
+        <p:cNvPr id="1" name=""/>
+        <p:cNvGrpSpPr/>
+        <p:nvPr/>
+      </p:nvGrpSpPr>
+      <p:grpSpPr>
+        <a:xfrm>
+          <a:off x="0" y="0"/>
+          <a:ext cx="0" cy="0"/>
+          <a:chOff x="0" y="0"/>
+          <a:chExt cx="0" cy="0"/>
+        </a:xfrm>
+      </p:grpSpPr>
+      <p:sp>
+        <p:nvSpPr>
+          <p:cNvPr id="2" name="Title 1">
+            <a:extLst>
+              <a:ext uri="{FF2B5EF4-FFF2-40B4-BE49-F238E27FC236}">
+                <a16:creationId xmlns:a16="http://schemas.microsoft.com/office/drawing/2014/main" id="{04C5DF06-5F42-4296-B27B-4F79E0DB836B}"/>
+              </a:ext>
+            </a:extLst>
+          </p:cNvPr>
+          <p:cNvSpPr>
+            <a:spLocks noGrp="1"/>
+          </p:cNvSpPr>
+          <p:nvPr>
+            <p:ph type="title"/>
+          </p:nvPr>
+        </p:nvSpPr>
+        <p:spPr/>
+        <p:txBody>
+          <a:bodyPr/>
+          <a:lstStyle/>
+          <a:p>
+            <a:r>
+              <a:rPr lang="en-US" sz="3600" dirty="0" err="1"/>
+              <a:t>Exercices</a:t>
+            </a:r>
+            <a:r>
+              <a:rPr lang="en-US" sz="3600" dirty="0"/>
+              <a:t> sur le jeu de </a:t>
+            </a:r>
+            <a:r>
+              <a:rPr lang="en-US" sz="3600" dirty="0" err="1"/>
+              <a:t>données</a:t>
+            </a:r>
+            <a:r>
+              <a:rPr lang="en-US" sz="3600" dirty="0"/>
+              <a:t> Titanic</a:t>
+            </a:r>
+          </a:p>
+        </p:txBody>
+      </p:sp>
+      <p:sp>
+        <p:nvSpPr>
+          <p:cNvPr id="5" name="Slide Number Placeholder 4">
+            <a:extLst>
+              <a:ext uri="{FF2B5EF4-FFF2-40B4-BE49-F238E27FC236}">
+                <a16:creationId xmlns:a16="http://schemas.microsoft.com/office/drawing/2014/main" id="{B756D4B6-3814-4E02-AB98-08D3B49675BF}"/>
+              </a:ext>
+            </a:extLst>
+          </p:cNvPr>
+          <p:cNvSpPr>
+            <a:spLocks noGrp="1"/>
+          </p:cNvSpPr>
+          <p:nvPr>
+            <p:ph type="sldNum" sz="quarter" idx="4"/>
+          </p:nvPr>
+        </p:nvSpPr>
+        <p:spPr/>
+        <p:txBody>
+          <a:bodyPr/>
+          <a:lstStyle/>
+          <a:p>
+            <a:fld id="{5EE7099E-8998-4851-915A-4F4831808297}" type="slidenum">
+              <a:rPr lang="nl-NL" smtClean="0"/>
+              <a:pPr/>
+              <a:t>28</a:t>
+            </a:fld>
+            <a:endParaRPr lang="nl-NL"/>
+          </a:p>
+        </p:txBody>
+      </p:sp>
+      <p:sp>
+        <p:nvSpPr>
+          <p:cNvPr id="3" name="ZoneTexte 2">
+            <a:extLst>
+              <a:ext uri="{FF2B5EF4-FFF2-40B4-BE49-F238E27FC236}">
+                <a16:creationId xmlns:a16="http://schemas.microsoft.com/office/drawing/2014/main" id="{0C248AA7-6FCB-3F89-E3DD-C837A2826405}"/>
+              </a:ext>
+            </a:extLst>
+          </p:cNvPr>
+          <p:cNvSpPr txBox="1"/>
+          <p:nvPr/>
+        </p:nvSpPr>
+        <p:spPr>
+          <a:xfrm>
+            <a:off x="3692106" y="1699404"/>
+            <a:ext cx="0" cy="0"/>
+          </a:xfrm>
+          <a:prstGeom prst="rect">
+            <a:avLst/>
+          </a:prstGeom>
+          <a:noFill/>
+        </p:spPr>
+        <p:txBody>
+          <a:bodyPr wrap="none" lIns="108000" tIns="108000" rIns="108000" bIns="108000" rtlCol="0">
+            <a:noAutofit/>
+          </a:bodyPr>
+          <a:lstStyle/>
+          <a:p>
+            <a:endParaRPr lang="fr-FR" noProof="0" dirty="0" err="1">
+              <a:solidFill>
+                <a:schemeClr val="bg2"/>
+              </a:solidFill>
+            </a:endParaRPr>
+          </a:p>
+        </p:txBody>
+      </p:sp>
+      <p:sp>
+        <p:nvSpPr>
+          <p:cNvPr id="6" name="Vertical Text Placeholder 5">
+            <a:extLst>
+              <a:ext uri="{FF2B5EF4-FFF2-40B4-BE49-F238E27FC236}">
+                <a16:creationId xmlns:a16="http://schemas.microsoft.com/office/drawing/2014/main" id="{F8170739-5212-AEC7-557E-2E086A29A496}"/>
+              </a:ext>
+            </a:extLst>
+          </p:cNvPr>
+          <p:cNvSpPr>
+            <a:spLocks noGrp="1"/>
+          </p:cNvSpPr>
+          <p:nvPr>
+            <p:ph type="body" orient="vert" idx="1"/>
+          </p:nvPr>
+        </p:nvSpPr>
+        <p:spPr>
+          <a:xfrm>
+            <a:off x="404662" y="1143000"/>
+            <a:ext cx="11389023" cy="4795836"/>
+          </a:xfrm>
+        </p:spPr>
+        <p:txBody>
+          <a:bodyPr/>
+          <a:lstStyle/>
+          <a:p>
+            <a:endParaRPr lang="en-US" dirty="0"/>
+          </a:p>
+          <a:p>
+            <a:endParaRPr lang="en-US" dirty="0"/>
+          </a:p>
+          <a:p>
+            <a:pPr marL="180975" lvl="1" indent="0">
+              <a:buNone/>
+            </a:pPr>
+            <a:endParaRPr lang="en-US" dirty="0"/>
+          </a:p>
+          <a:p>
+            <a:pPr lvl="1"/>
+            <a:endParaRPr lang="en-US" dirty="0"/>
+          </a:p>
+          <a:p>
+            <a:endParaRPr lang="en-US" dirty="0"/>
+          </a:p>
+          <a:p>
+            <a:endParaRPr lang="en-US" dirty="0"/>
+          </a:p>
+          <a:p>
+            <a:endParaRPr lang="en-US" dirty="0"/>
+          </a:p>
+          <a:p>
+            <a:endParaRPr lang="en-US" dirty="0"/>
+          </a:p>
+          <a:p>
+            <a:pPr lvl="1"/>
+            <a:endParaRPr lang="en-US" dirty="0"/>
+          </a:p>
+          <a:p>
+            <a:pPr lvl="1"/>
+            <a:endParaRPr lang="en-US" dirty="0"/>
+          </a:p>
+          <a:p>
+            <a:pPr lvl="1"/>
+            <a:endParaRPr lang="en-US" dirty="0"/>
+          </a:p>
+          <a:p>
+            <a:pPr lvl="1"/>
+            <a:endParaRPr lang="en-US" dirty="0"/>
+          </a:p>
+          <a:p>
+            <a:endParaRPr lang="en-US" b="1" dirty="0"/>
+          </a:p>
+          <a:p>
+            <a:endParaRPr lang="en-US" dirty="0"/>
+          </a:p>
+        </p:txBody>
+      </p:sp>
+      <p:sp>
+        <p:nvSpPr>
+          <p:cNvPr id="4" name="Vertical Text Placeholder 5">
+            <a:extLst>
+              <a:ext uri="{FF2B5EF4-FFF2-40B4-BE49-F238E27FC236}">
+                <a16:creationId xmlns:a16="http://schemas.microsoft.com/office/drawing/2014/main" id="{A57D01D8-1D67-D654-0CFB-28A877FD85B9}"/>
+              </a:ext>
+            </a:extLst>
+          </p:cNvPr>
+          <p:cNvSpPr txBox="1">
+            <a:spLocks/>
+          </p:cNvSpPr>
+          <p:nvPr/>
+        </p:nvSpPr>
+        <p:spPr>
+          <a:xfrm>
+            <a:off x="557062" y="1295400"/>
+            <a:ext cx="11389023" cy="4795836"/>
+          </a:xfrm>
+          <a:prstGeom prst="rect">
+            <a:avLst/>
+          </a:prstGeom>
+        </p:spPr>
+        <p:txBody>
+          <a:bodyPr vert="horz" lIns="0" tIns="0" rIns="0" bIns="0" rtlCol="0">
+            <a:normAutofit/>
+          </a:bodyPr>
+          <a:lstStyle>
+            <a:lvl1pPr marL="180975" indent="-180975" algn="l" defTabSz="914400" rtl="0" eaLnBrk="1" latinLnBrk="0" hangingPunct="1">
+              <a:lnSpc>
+                <a:spcPct val="90000"/>
+              </a:lnSpc>
+              <a:spcBef>
+                <a:spcPts val="600"/>
+              </a:spcBef>
+              <a:spcAft>
+                <a:spcPts val="600"/>
+              </a:spcAft>
+              <a:buClr>
+                <a:schemeClr val="bg2"/>
+              </a:buClr>
+              <a:buFont typeface="Arial" panose="020B0604020202020204" pitchFamily="34" charset="0"/>
+              <a:buChar char="•"/>
+              <a:defRPr sz="1800" kern="1200">
+                <a:solidFill>
+                  <a:schemeClr val="bg2"/>
+                </a:solidFill>
+                <a:latin typeface="+mn-lt"/>
+                <a:ea typeface="+mn-ea"/>
+                <a:cs typeface="+mn-cs"/>
+              </a:defRPr>
+            </a:lvl1pPr>
+            <a:lvl2pPr marL="361950" indent="-180975" algn="l" defTabSz="914400" rtl="0" eaLnBrk="1" latinLnBrk="0" hangingPunct="1">
+              <a:lnSpc>
+                <a:spcPct val="90000"/>
+              </a:lnSpc>
+              <a:spcBef>
+                <a:spcPts val="600"/>
+              </a:spcBef>
+              <a:spcAft>
+                <a:spcPts val="600"/>
+              </a:spcAft>
+              <a:buClr>
+                <a:schemeClr val="bg2"/>
+              </a:buClr>
+              <a:buFont typeface="Arial" panose="020B0604020202020204" pitchFamily="34" charset="0"/>
+              <a:buChar char="-"/>
+              <a:defRPr sz="1600" kern="1200">
+                <a:solidFill>
+                  <a:schemeClr val="bg2"/>
+                </a:solidFill>
+                <a:latin typeface="+mn-lt"/>
+                <a:ea typeface="+mn-ea"/>
+                <a:cs typeface="+mn-cs"/>
+              </a:defRPr>
+            </a:lvl2pPr>
+            <a:lvl3pPr marL="0" indent="0" algn="l" defTabSz="914400" rtl="0" eaLnBrk="1" latinLnBrk="0" hangingPunct="1">
+              <a:lnSpc>
+                <a:spcPct val="90000"/>
+              </a:lnSpc>
+              <a:spcBef>
+                <a:spcPts val="600"/>
+              </a:spcBef>
+              <a:spcAft>
+                <a:spcPts val="600"/>
+              </a:spcAft>
+              <a:buFont typeface="Arial" panose="020B0604020202020204" pitchFamily="34" charset="0"/>
+              <a:buNone/>
+              <a:defRPr sz="1800" kern="1200">
+                <a:solidFill>
+                  <a:schemeClr val="bg2"/>
+                </a:solidFill>
+                <a:latin typeface="+mn-lt"/>
+                <a:ea typeface="+mn-ea"/>
+                <a:cs typeface="+mn-cs"/>
+              </a:defRPr>
+            </a:lvl3pPr>
+            <a:lvl4pPr marL="0" indent="0" algn="l" defTabSz="914400" rtl="0" eaLnBrk="1" latinLnBrk="0" hangingPunct="1">
+              <a:lnSpc>
+                <a:spcPct val="90000"/>
+              </a:lnSpc>
+              <a:spcBef>
+                <a:spcPts val="600"/>
+              </a:spcBef>
+              <a:spcAft>
+                <a:spcPts val="600"/>
+              </a:spcAft>
+              <a:buFont typeface="Arial" panose="020B0604020202020204" pitchFamily="34" charset="0"/>
+              <a:buNone/>
+              <a:defRPr sz="1800" b="1" kern="1200">
+                <a:solidFill>
+                  <a:schemeClr val="bg2"/>
+                </a:solidFill>
+                <a:latin typeface="+mn-lt"/>
+                <a:ea typeface="+mn-ea"/>
+                <a:cs typeface="+mn-cs"/>
+              </a:defRPr>
+            </a:lvl4pPr>
+            <a:lvl5pPr marL="0" indent="0" algn="l" defTabSz="914400" rtl="0" eaLnBrk="1" latinLnBrk="0" hangingPunct="1">
+              <a:lnSpc>
+                <a:spcPct val="90000"/>
+              </a:lnSpc>
+              <a:spcBef>
+                <a:spcPts val="600"/>
+              </a:spcBef>
+              <a:spcAft>
+                <a:spcPts val="600"/>
+              </a:spcAft>
+              <a:buFont typeface="Arial" panose="020B0604020202020204" pitchFamily="34" charset="0"/>
+              <a:buNone/>
+              <a:defRPr sz="1800" b="1" kern="1200" baseline="0">
+                <a:solidFill>
+                  <a:schemeClr val="tx2"/>
+                </a:solidFill>
+                <a:latin typeface="+mn-lt"/>
+                <a:ea typeface="+mn-ea"/>
+                <a:cs typeface="+mn-cs"/>
+              </a:defRPr>
+            </a:lvl5pPr>
+            <a:lvl6pPr marL="180975" indent="-180975" algn="l" defTabSz="914400" rtl="0" eaLnBrk="1" latinLnBrk="0" hangingPunct="1">
+              <a:lnSpc>
+                <a:spcPct val="90000"/>
+              </a:lnSpc>
+              <a:spcBef>
+                <a:spcPts val="600"/>
+              </a:spcBef>
+              <a:spcAft>
+                <a:spcPts val="600"/>
+              </a:spcAft>
+              <a:buClr>
+                <a:schemeClr val="bg2"/>
+              </a:buClr>
+              <a:buFont typeface="Arial" panose="020B0604020202020204" pitchFamily="34" charset="0"/>
+              <a:buChar char="•"/>
+              <a:defRPr sz="1800" kern="1200">
+                <a:solidFill>
+                  <a:schemeClr val="bg2"/>
+                </a:solidFill>
+                <a:latin typeface="+mn-lt"/>
+                <a:ea typeface="+mn-ea"/>
+                <a:cs typeface="+mn-cs"/>
+              </a:defRPr>
+            </a:lvl6pPr>
+            <a:lvl7pPr marL="361950" indent="-180975" algn="l" defTabSz="914400" rtl="0" eaLnBrk="1" latinLnBrk="0" hangingPunct="1">
+              <a:lnSpc>
+                <a:spcPct val="90000"/>
+              </a:lnSpc>
+              <a:spcBef>
+                <a:spcPts val="600"/>
+              </a:spcBef>
+              <a:spcAft>
+                <a:spcPts val="600"/>
+              </a:spcAft>
+              <a:buClr>
+                <a:schemeClr val="bg2"/>
+              </a:buClr>
+              <a:buFont typeface="Arial" panose="020B0604020202020204" pitchFamily="34" charset="0"/>
+              <a:buChar char="-"/>
+              <a:defRPr sz="1600" kern="1200">
+                <a:solidFill>
+                  <a:schemeClr val="bg2"/>
+                </a:solidFill>
+                <a:latin typeface="+mn-lt"/>
+                <a:ea typeface="+mn-ea"/>
+                <a:cs typeface="+mn-cs"/>
+              </a:defRPr>
+            </a:lvl7pPr>
+            <a:lvl8pPr marL="0" indent="0" algn="l" defTabSz="914400" rtl="0" eaLnBrk="1" latinLnBrk="0" hangingPunct="1">
+              <a:lnSpc>
+                <a:spcPct val="90000"/>
+              </a:lnSpc>
+              <a:spcBef>
+                <a:spcPts val="600"/>
+              </a:spcBef>
+              <a:spcAft>
+                <a:spcPts val="600"/>
+              </a:spcAft>
+              <a:buFont typeface="Arial" panose="020B0604020202020204" pitchFamily="34" charset="0"/>
+              <a:buNone/>
+              <a:defRPr sz="1600" kern="1200">
+                <a:solidFill>
+                  <a:schemeClr val="bg2"/>
+                </a:solidFill>
+                <a:latin typeface="+mn-lt"/>
+                <a:ea typeface="+mn-ea"/>
+                <a:cs typeface="+mn-cs"/>
+              </a:defRPr>
+            </a:lvl8pPr>
+            <a:lvl9pPr marL="0" indent="0" algn="l" defTabSz="914400" rtl="0" eaLnBrk="1" latinLnBrk="0" hangingPunct="1">
+              <a:lnSpc>
+                <a:spcPct val="90000"/>
+              </a:lnSpc>
+              <a:spcBef>
+                <a:spcPts val="600"/>
+              </a:spcBef>
+              <a:spcAft>
+                <a:spcPts val="600"/>
+              </a:spcAft>
+              <a:buFont typeface="Arial" panose="020B0604020202020204" pitchFamily="34" charset="0"/>
+              <a:buNone/>
+              <a:defRPr sz="1800" b="1" kern="1200" baseline="0">
+                <a:solidFill>
+                  <a:schemeClr val="bg2"/>
+                </a:solidFill>
+                <a:latin typeface="+mn-lt"/>
+                <a:ea typeface="+mn-ea"/>
+                <a:cs typeface="+mn-cs"/>
+              </a:defRPr>
+            </a:lvl9pPr>
+          </a:lstStyle>
+          <a:p>
+            <a:endParaRPr lang="en-US" sz="2200" b="1" dirty="0"/>
+          </a:p>
+          <a:p>
+            <a:pPr marL="180975" lvl="1" indent="0">
+              <a:buNone/>
+            </a:pPr>
+            <a:endParaRPr lang="en-US" sz="2200" dirty="0"/>
+          </a:p>
+          <a:p>
+            <a:pPr lvl="1"/>
+            <a:endParaRPr lang="en-US" sz="2200" dirty="0"/>
+          </a:p>
+          <a:p>
+            <a:pPr marL="0" indent="0">
+              <a:buFont typeface="Arial" panose="020B0604020202020204" pitchFamily="34" charset="0"/>
+              <a:buNone/>
+            </a:pPr>
+            <a:endParaRPr lang="en-US" dirty="0"/>
+          </a:p>
+          <a:p>
+            <a:endParaRPr lang="en-US" dirty="0"/>
+          </a:p>
+          <a:p>
+            <a:pPr marL="180975" lvl="1" indent="0">
+              <a:buFont typeface="Arial" panose="020B0604020202020204" pitchFamily="34" charset="0"/>
+              <a:buNone/>
+            </a:pPr>
+            <a:endParaRPr lang="en-US" dirty="0"/>
+          </a:p>
+          <a:p>
+            <a:pPr lvl="1"/>
+            <a:endParaRPr lang="en-US" dirty="0"/>
+          </a:p>
+          <a:p>
+            <a:endParaRPr lang="en-US" dirty="0"/>
+          </a:p>
+          <a:p>
+            <a:endParaRPr lang="en-US" dirty="0"/>
+          </a:p>
+          <a:p>
+            <a:endParaRPr lang="en-US" dirty="0"/>
+          </a:p>
+          <a:p>
+            <a:endParaRPr lang="en-US" dirty="0"/>
+          </a:p>
+          <a:p>
+            <a:pPr lvl="1"/>
+            <a:endParaRPr lang="en-US" dirty="0"/>
+          </a:p>
+          <a:p>
+            <a:pPr lvl="1"/>
+            <a:endParaRPr lang="en-US" dirty="0"/>
+          </a:p>
+          <a:p>
+            <a:pPr lvl="1"/>
+            <a:endParaRPr lang="en-US" dirty="0"/>
+          </a:p>
+          <a:p>
+            <a:pPr lvl="1"/>
+            <a:endParaRPr lang="en-US" dirty="0"/>
+          </a:p>
+          <a:p>
+            <a:endParaRPr lang="en-US" b="1" dirty="0"/>
+          </a:p>
+          <a:p>
+            <a:endParaRPr lang="en-US" dirty="0"/>
+          </a:p>
+        </p:txBody>
+      </p:sp>
+      <p:sp>
+        <p:nvSpPr>
+          <p:cNvPr id="7" name="Vertical Text Placeholder 5">
+            <a:extLst>
+              <a:ext uri="{FF2B5EF4-FFF2-40B4-BE49-F238E27FC236}">
+                <a16:creationId xmlns:a16="http://schemas.microsoft.com/office/drawing/2014/main" id="{DFE0C10A-165E-4BE2-39D7-55B90C940362}"/>
+              </a:ext>
+            </a:extLst>
+          </p:cNvPr>
+          <p:cNvSpPr txBox="1">
+            <a:spLocks/>
+          </p:cNvSpPr>
+          <p:nvPr/>
+        </p:nvSpPr>
+        <p:spPr>
+          <a:xfrm>
+            <a:off x="436592" y="1199890"/>
+            <a:ext cx="11389023" cy="4795836"/>
+          </a:xfrm>
+          <a:prstGeom prst="rect">
+            <a:avLst/>
+          </a:prstGeom>
+        </p:spPr>
+        <p:txBody>
+          <a:bodyPr vert="horz" lIns="0" tIns="0" rIns="0" bIns="0" rtlCol="0">
+            <a:normAutofit/>
+          </a:bodyPr>
+          <a:lstStyle>
+            <a:lvl1pPr marL="180975" indent="-180975" algn="l" defTabSz="914400" rtl="0" eaLnBrk="1" latinLnBrk="0" hangingPunct="1">
+              <a:lnSpc>
+                <a:spcPct val="90000"/>
+              </a:lnSpc>
+              <a:spcBef>
+                <a:spcPts val="600"/>
+              </a:spcBef>
+              <a:spcAft>
+                <a:spcPts val="600"/>
+              </a:spcAft>
+              <a:buClr>
+                <a:schemeClr val="bg2"/>
+              </a:buClr>
+              <a:buFont typeface="Arial" panose="020B0604020202020204" pitchFamily="34" charset="0"/>
+              <a:buChar char="•"/>
+              <a:defRPr sz="1800" kern="1200">
+                <a:solidFill>
+                  <a:schemeClr val="bg2"/>
+                </a:solidFill>
+                <a:latin typeface="+mn-lt"/>
+                <a:ea typeface="+mn-ea"/>
+                <a:cs typeface="+mn-cs"/>
+              </a:defRPr>
+            </a:lvl1pPr>
+            <a:lvl2pPr marL="361950" indent="-180975" algn="l" defTabSz="914400" rtl="0" eaLnBrk="1" latinLnBrk="0" hangingPunct="1">
+              <a:lnSpc>
+                <a:spcPct val="90000"/>
+              </a:lnSpc>
+              <a:spcBef>
+                <a:spcPts val="600"/>
+              </a:spcBef>
+              <a:spcAft>
+                <a:spcPts val="600"/>
+              </a:spcAft>
+              <a:buClr>
+                <a:schemeClr val="bg2"/>
+              </a:buClr>
+              <a:buFont typeface="Arial" panose="020B0604020202020204" pitchFamily="34" charset="0"/>
+              <a:buChar char="-"/>
+              <a:defRPr sz="1600" kern="1200">
+                <a:solidFill>
+                  <a:schemeClr val="bg2"/>
+                </a:solidFill>
+                <a:latin typeface="+mn-lt"/>
+                <a:ea typeface="+mn-ea"/>
+                <a:cs typeface="+mn-cs"/>
+              </a:defRPr>
+            </a:lvl2pPr>
+            <a:lvl3pPr marL="0" indent="0" algn="l" defTabSz="914400" rtl="0" eaLnBrk="1" latinLnBrk="0" hangingPunct="1">
+              <a:lnSpc>
+                <a:spcPct val="90000"/>
+              </a:lnSpc>
+              <a:spcBef>
+                <a:spcPts val="600"/>
+              </a:spcBef>
+              <a:spcAft>
+                <a:spcPts val="600"/>
+              </a:spcAft>
+              <a:buFont typeface="Arial" panose="020B0604020202020204" pitchFamily="34" charset="0"/>
+              <a:buNone/>
+              <a:defRPr sz="1800" kern="1200">
+                <a:solidFill>
+                  <a:schemeClr val="bg2"/>
+                </a:solidFill>
+                <a:latin typeface="+mn-lt"/>
+                <a:ea typeface="+mn-ea"/>
+                <a:cs typeface="+mn-cs"/>
+              </a:defRPr>
+            </a:lvl3pPr>
+            <a:lvl4pPr marL="0" indent="0" algn="l" defTabSz="914400" rtl="0" eaLnBrk="1" latinLnBrk="0" hangingPunct="1">
+              <a:lnSpc>
+                <a:spcPct val="90000"/>
+              </a:lnSpc>
+              <a:spcBef>
+                <a:spcPts val="600"/>
+              </a:spcBef>
+              <a:spcAft>
+                <a:spcPts val="600"/>
+              </a:spcAft>
+              <a:buFont typeface="Arial" panose="020B0604020202020204" pitchFamily="34" charset="0"/>
+              <a:buNone/>
+              <a:defRPr sz="1800" b="1" kern="1200">
+                <a:solidFill>
+                  <a:schemeClr val="bg2"/>
+                </a:solidFill>
+                <a:latin typeface="+mn-lt"/>
+                <a:ea typeface="+mn-ea"/>
+                <a:cs typeface="+mn-cs"/>
+              </a:defRPr>
+            </a:lvl4pPr>
+            <a:lvl5pPr marL="0" indent="0" algn="l" defTabSz="914400" rtl="0" eaLnBrk="1" latinLnBrk="0" hangingPunct="1">
+              <a:lnSpc>
+                <a:spcPct val="90000"/>
+              </a:lnSpc>
+              <a:spcBef>
+                <a:spcPts val="600"/>
+              </a:spcBef>
+              <a:spcAft>
+                <a:spcPts val="600"/>
+              </a:spcAft>
+              <a:buFont typeface="Arial" panose="020B0604020202020204" pitchFamily="34" charset="0"/>
+              <a:buNone/>
+              <a:defRPr sz="1800" b="1" kern="1200" baseline="0">
+                <a:solidFill>
+                  <a:schemeClr val="tx2"/>
+                </a:solidFill>
+                <a:latin typeface="+mn-lt"/>
+                <a:ea typeface="+mn-ea"/>
+                <a:cs typeface="+mn-cs"/>
+              </a:defRPr>
+            </a:lvl5pPr>
+            <a:lvl6pPr marL="180975" indent="-180975" algn="l" defTabSz="914400" rtl="0" eaLnBrk="1" latinLnBrk="0" hangingPunct="1">
+              <a:lnSpc>
+                <a:spcPct val="90000"/>
+              </a:lnSpc>
+              <a:spcBef>
+                <a:spcPts val="600"/>
+              </a:spcBef>
+              <a:spcAft>
+                <a:spcPts val="600"/>
+              </a:spcAft>
+              <a:buClr>
+                <a:schemeClr val="bg2"/>
+              </a:buClr>
+              <a:buFont typeface="Arial" panose="020B0604020202020204" pitchFamily="34" charset="0"/>
+              <a:buChar char="•"/>
+              <a:defRPr sz="1800" kern="1200">
+                <a:solidFill>
+                  <a:schemeClr val="bg2"/>
+                </a:solidFill>
+                <a:latin typeface="+mn-lt"/>
+                <a:ea typeface="+mn-ea"/>
+                <a:cs typeface="+mn-cs"/>
+              </a:defRPr>
+            </a:lvl6pPr>
+            <a:lvl7pPr marL="361950" indent="-180975" algn="l" defTabSz="914400" rtl="0" eaLnBrk="1" latinLnBrk="0" hangingPunct="1">
+              <a:lnSpc>
+                <a:spcPct val="90000"/>
+              </a:lnSpc>
+              <a:spcBef>
+                <a:spcPts val="600"/>
+              </a:spcBef>
+              <a:spcAft>
+                <a:spcPts val="600"/>
+              </a:spcAft>
+              <a:buClr>
+                <a:schemeClr val="bg2"/>
+              </a:buClr>
+              <a:buFont typeface="Arial" panose="020B0604020202020204" pitchFamily="34" charset="0"/>
+              <a:buChar char="-"/>
+              <a:defRPr sz="1600" kern="1200">
+                <a:solidFill>
+                  <a:schemeClr val="bg2"/>
+                </a:solidFill>
+                <a:latin typeface="+mn-lt"/>
+                <a:ea typeface="+mn-ea"/>
+                <a:cs typeface="+mn-cs"/>
+              </a:defRPr>
+            </a:lvl7pPr>
+            <a:lvl8pPr marL="0" indent="0" algn="l" defTabSz="914400" rtl="0" eaLnBrk="1" latinLnBrk="0" hangingPunct="1">
+              <a:lnSpc>
+                <a:spcPct val="90000"/>
+              </a:lnSpc>
+              <a:spcBef>
+                <a:spcPts val="600"/>
+              </a:spcBef>
+              <a:spcAft>
+                <a:spcPts val="600"/>
+              </a:spcAft>
+              <a:buFont typeface="Arial" panose="020B0604020202020204" pitchFamily="34" charset="0"/>
+              <a:buNone/>
+              <a:defRPr sz="1600" kern="1200">
+                <a:solidFill>
+                  <a:schemeClr val="bg2"/>
+                </a:solidFill>
+                <a:latin typeface="+mn-lt"/>
+                <a:ea typeface="+mn-ea"/>
+                <a:cs typeface="+mn-cs"/>
+              </a:defRPr>
+            </a:lvl8pPr>
+            <a:lvl9pPr marL="0" indent="0" algn="l" defTabSz="914400" rtl="0" eaLnBrk="1" latinLnBrk="0" hangingPunct="1">
+              <a:lnSpc>
+                <a:spcPct val="90000"/>
+              </a:lnSpc>
+              <a:spcBef>
+                <a:spcPts val="600"/>
+              </a:spcBef>
+              <a:spcAft>
+                <a:spcPts val="600"/>
+              </a:spcAft>
+              <a:buFont typeface="Arial" panose="020B0604020202020204" pitchFamily="34" charset="0"/>
+              <a:buNone/>
+              <a:defRPr sz="1800" b="1" kern="1200" baseline="0">
+                <a:solidFill>
+                  <a:schemeClr val="bg2"/>
+                </a:solidFill>
+                <a:latin typeface="+mn-lt"/>
+                <a:ea typeface="+mn-ea"/>
+                <a:cs typeface="+mn-cs"/>
+              </a:defRPr>
+            </a:lvl9pPr>
+          </a:lstStyle>
+          <a:p>
+            <a:r>
+              <a:rPr lang="en-US" sz="2400" dirty="0" err="1"/>
+              <a:t>Quels</a:t>
+            </a:r>
+            <a:r>
+              <a:rPr lang="en-US" sz="2400" dirty="0"/>
+              <a:t> </a:t>
+            </a:r>
+            <a:r>
+              <a:rPr lang="en-US" sz="2400" dirty="0" err="1"/>
+              <a:t>sont</a:t>
+            </a:r>
+            <a:r>
+              <a:rPr lang="en-US" sz="2400" dirty="0"/>
+              <a:t> les 5 </a:t>
+            </a:r>
+            <a:r>
+              <a:rPr lang="en-US" sz="2400" dirty="0" err="1"/>
+              <a:t>passagers</a:t>
+            </a:r>
+            <a:r>
+              <a:rPr lang="en-US" sz="2400" dirty="0"/>
+              <a:t> du Titanic les plus </a:t>
+            </a:r>
+            <a:r>
+              <a:rPr lang="en-US" sz="2400" dirty="0" err="1"/>
+              <a:t>âgés</a:t>
+            </a:r>
+            <a:r>
+              <a:rPr lang="en-US" sz="2400" dirty="0"/>
+              <a:t> ?</a:t>
+            </a:r>
+          </a:p>
+          <a:p>
+            <a:pPr marL="0" indent="0">
+              <a:buNone/>
+            </a:pPr>
+            <a:endParaRPr lang="en-US" sz="2400" dirty="0"/>
+          </a:p>
+          <a:p>
+            <a:r>
+              <a:rPr lang="en-US" sz="2400" dirty="0" err="1"/>
+              <a:t>Combien</a:t>
+            </a:r>
+            <a:r>
+              <a:rPr lang="en-US" sz="2400" dirty="0"/>
+              <a:t> de </a:t>
+            </a:r>
+            <a:r>
+              <a:rPr lang="en-US" sz="2400" dirty="0" err="1"/>
+              <a:t>passagers</a:t>
+            </a:r>
+            <a:r>
+              <a:rPr lang="en-US" sz="2400" dirty="0"/>
+              <a:t> par </a:t>
+            </a:r>
+            <a:r>
+              <a:rPr lang="en-US" sz="2400" dirty="0" err="1"/>
+              <a:t>classe</a:t>
+            </a:r>
+            <a:r>
+              <a:rPr lang="en-US" sz="2400" dirty="0"/>
+              <a:t> </a:t>
+            </a:r>
+            <a:r>
+              <a:rPr lang="en-US" sz="2400" dirty="0" err="1"/>
+              <a:t>ont</a:t>
+            </a:r>
+            <a:r>
+              <a:rPr lang="en-US" sz="2400" dirty="0"/>
+              <a:t> </a:t>
+            </a:r>
+            <a:r>
+              <a:rPr lang="en-US" sz="2400" dirty="0" err="1"/>
+              <a:t>survécu</a:t>
+            </a:r>
+            <a:r>
+              <a:rPr lang="en-US" sz="2400" dirty="0"/>
+              <a:t> ?</a:t>
+            </a:r>
+          </a:p>
+          <a:p>
+            <a:pPr marL="0" indent="0">
+              <a:buNone/>
+            </a:pPr>
+            <a:endParaRPr lang="en-US" sz="2400" dirty="0"/>
+          </a:p>
+          <a:p>
+            <a:r>
+              <a:rPr lang="en-US" sz="2400" dirty="0"/>
+              <a:t>Quelle </a:t>
+            </a:r>
+            <a:r>
+              <a:rPr lang="en-US" sz="2400" dirty="0" err="1"/>
+              <a:t>est</a:t>
+            </a:r>
+            <a:r>
+              <a:rPr lang="en-US" sz="2400" dirty="0"/>
+              <a:t> la </a:t>
+            </a:r>
+            <a:r>
+              <a:rPr lang="en-US" sz="2400" dirty="0" err="1"/>
+              <a:t>somme</a:t>
+            </a:r>
+            <a:r>
+              <a:rPr lang="en-US" sz="2400" dirty="0"/>
+              <a:t> total des </a:t>
+            </a:r>
+            <a:r>
+              <a:rPr lang="en-US" sz="2400" dirty="0" err="1"/>
+              <a:t>tarifs</a:t>
+            </a:r>
+            <a:r>
+              <a:rPr lang="en-US" sz="2400" dirty="0"/>
+              <a:t> </a:t>
+            </a:r>
+            <a:r>
+              <a:rPr lang="en-US" sz="2400" dirty="0" err="1"/>
+              <a:t>payés</a:t>
+            </a:r>
+            <a:r>
+              <a:rPr lang="en-US" sz="2400" dirty="0"/>
+              <a:t> par </a:t>
+            </a:r>
+            <a:r>
+              <a:rPr lang="en-US" sz="2400" dirty="0" err="1"/>
+              <a:t>classe</a:t>
+            </a:r>
+            <a:r>
+              <a:rPr lang="en-US" sz="2400" dirty="0"/>
+              <a:t> ?</a:t>
+            </a:r>
+            <a:endParaRPr lang="en-US" sz="2200" b="1" dirty="0"/>
+          </a:p>
+          <a:p>
+            <a:pPr marL="180975" lvl="1" indent="0">
+              <a:buNone/>
+            </a:pPr>
+            <a:endParaRPr lang="en-US" sz="2200" dirty="0"/>
+          </a:p>
+          <a:p>
+            <a:pPr lvl="1"/>
+            <a:endParaRPr lang="en-US" sz="2200" dirty="0"/>
+          </a:p>
+          <a:p>
+            <a:pPr marL="0" indent="0">
+              <a:buFont typeface="Arial" panose="020B0604020202020204" pitchFamily="34" charset="0"/>
+              <a:buNone/>
+            </a:pPr>
+            <a:endParaRPr lang="en-US" dirty="0"/>
+          </a:p>
+          <a:p>
+            <a:endParaRPr lang="en-US" dirty="0"/>
+          </a:p>
+          <a:p>
+            <a:pPr marL="180975" lvl="1" indent="0">
+              <a:buFont typeface="Arial" panose="020B0604020202020204" pitchFamily="34" charset="0"/>
+              <a:buNone/>
+            </a:pPr>
+            <a:endParaRPr lang="en-US" dirty="0"/>
+          </a:p>
+          <a:p>
+            <a:pPr lvl="1"/>
+            <a:endParaRPr lang="en-US" dirty="0"/>
+          </a:p>
+          <a:p>
+            <a:endParaRPr lang="en-US" dirty="0"/>
+          </a:p>
+          <a:p>
+            <a:endParaRPr lang="en-US" dirty="0"/>
+          </a:p>
+          <a:p>
+            <a:endParaRPr lang="en-US" dirty="0"/>
+          </a:p>
+          <a:p>
+            <a:endParaRPr lang="en-US" dirty="0"/>
+          </a:p>
+          <a:p>
+            <a:pPr lvl="1"/>
+            <a:endParaRPr lang="en-US" dirty="0"/>
+          </a:p>
+          <a:p>
+            <a:pPr lvl="1"/>
+            <a:endParaRPr lang="en-US" dirty="0"/>
+          </a:p>
+          <a:p>
+            <a:pPr lvl="1"/>
+            <a:endParaRPr lang="en-US" dirty="0"/>
+          </a:p>
+          <a:p>
+            <a:pPr lvl="1"/>
+            <a:endParaRPr lang="en-US" dirty="0"/>
+          </a:p>
+          <a:p>
+            <a:endParaRPr lang="en-US" b="1" dirty="0"/>
+          </a:p>
+          <a:p>
+            <a:endParaRPr lang="en-US" dirty="0"/>
+          </a:p>
+        </p:txBody>
+      </p:sp>
+    </p:spTree>
+    <p:extLst>
+      <p:ext uri="{BB962C8B-B14F-4D97-AF65-F5344CB8AC3E}">
+        <p14:creationId xmlns:p14="http://schemas.microsoft.com/office/powerpoint/2010/main" val="3025873007"/>
+      </p:ext>
+    </p:extLst>
+  </p:cSld>
+  <p:clrMapOvr>
+    <a:masterClrMapping/>
+  </p:clrMapOvr>
+  <p:transition spd="slow">
+    <p:wipe dir="r"/>
+  </p:transition>
+</p:sld>
+</file>
+
+<file path=ppt/slides/slide29.xml><?xml version="1.0" encoding="utf-8"?>
+<p:sld xmlns:a="http://schemas.openxmlformats.org/drawingml/2006/main" xmlns:r="http://schemas.openxmlformats.org/officeDocument/2006/relationships" xmlns:p="http://schemas.openxmlformats.org/presentationml/2006/main">
+  <p:cSld>
+    <p:spTree>
+      <p:nvGrpSpPr>
+        <p:cNvPr id="1" name=""/>
+        <p:cNvGrpSpPr/>
+        <p:nvPr/>
+      </p:nvGrpSpPr>
+      <p:grpSpPr>
+        <a:xfrm>
+          <a:off x="0" y="0"/>
+          <a:ext cx="0" cy="0"/>
+          <a:chOff x="0" y="0"/>
+          <a:chExt cx="0" cy="0"/>
+        </a:xfrm>
+      </p:grpSpPr>
+      <p:sp>
+        <p:nvSpPr>
+          <p:cNvPr id="6" name="Tijdelijke aanduiding voor tekst 5"/>
+          <p:cNvSpPr>
+            <a:spLocks noGrp="1"/>
+          </p:cNvSpPr>
+          <p:nvPr>
+            <p:ph type="body" sz="quarter" idx="12"/>
+          </p:nvPr>
+        </p:nvSpPr>
+        <p:spPr/>
+        <p:txBody>
+          <a:bodyPr/>
+          <a:lstStyle/>
+          <a:p>
             <a:endParaRPr lang="nl-NL" dirty="0"/>
           </a:p>
         </p:txBody>
@@ -22142,7 +24100,7 @@
             <a:fld id="{5EE7099E-8998-4851-915A-4F4831808297}" type="slidenum">
               <a:rPr lang="nl-NL" smtClean="0"/>
               <a:pPr/>
-              <a:t>26</a:t>
+              <a:t>29</a:t>
             </a:fld>
             <a:endParaRPr lang="nl-NL"/>
           </a:p>
@@ -23696,7 +25654,7 @@
             </a:pPr>
             <a:r>
               <a:rPr lang="en-US" dirty="0"/>
-              <a:t>- </a:t>
+              <a:t>-  </a:t>
             </a:r>
             <a:r>
               <a:rPr lang="en-US" dirty="0" err="1"/>
@@ -24782,6 +26740,45 @@
             <a:pPr lvl="1"/>
             <a:r>
               <a:rPr lang="en-US" dirty="0"/>
+              <a:t>Solution de </a:t>
+            </a:r>
+            <a:r>
+              <a:rPr lang="en-US" dirty="0" err="1"/>
+              <a:t>référence</a:t>
+            </a:r>
+            <a:r>
+              <a:rPr lang="en-US" dirty="0"/>
+              <a:t> sur le </a:t>
+            </a:r>
+            <a:r>
+              <a:rPr lang="en-US" dirty="0" err="1"/>
+              <a:t>marché</a:t>
+            </a:r>
+            <a:r>
+              <a:rPr lang="en-US" dirty="0"/>
+              <a:t> pour </a:t>
+            </a:r>
+            <a:r>
+              <a:rPr lang="en-US" dirty="0" err="1"/>
+              <a:t>déployer</a:t>
+            </a:r>
+            <a:r>
+              <a:rPr lang="en-US" dirty="0"/>
+              <a:t> des applications = beaucoup de </a:t>
+            </a:r>
+            <a:r>
+              <a:rPr lang="en-US" dirty="0" err="1"/>
+              <a:t>ressources</a:t>
+            </a:r>
+            <a:r>
+              <a:rPr lang="en-US" dirty="0"/>
+              <a:t> et de documentation</a:t>
+            </a:r>
+          </a:p>
+          <a:p>
+            <a:pPr lvl="1"/>
+            <a:r>
+              <a:rPr lang="en-US" dirty="0"/>
               <a:t>Lancer un cluster avec Docker = </a:t>
             </a:r>
             <a:r>
@@ -24804,46 +26801,7 @@
               <a:rPr lang="en-US" b="1" dirty="0" err="1"/>
               <a:t>commande</a:t>
             </a:r>
-            <a:endParaRPr lang="en-US" b="1" dirty="0"/>
-          </a:p>
-          <a:p>
-            <a:pPr lvl="1"/>
-            <a:r>
-              <a:rPr lang="en-US" dirty="0"/>
-              <a:t>Solution de </a:t>
-            </a:r>
-            <a:r>
-              <a:rPr lang="en-US" dirty="0" err="1"/>
-              <a:t>réference</a:t>
-            </a:r>
-            <a:r>
-              <a:rPr lang="en-US" dirty="0"/>
-              <a:t> sur le </a:t>
-            </a:r>
-            <a:r>
-              <a:rPr lang="en-US" dirty="0" err="1"/>
-              <a:t>marché</a:t>
-            </a:r>
-            <a:r>
-              <a:rPr lang="en-US" dirty="0"/>
-              <a:t> pour </a:t>
-            </a:r>
-            <a:r>
-              <a:rPr lang="en-US" dirty="0" err="1"/>
-              <a:t>déployer</a:t>
-            </a:r>
-            <a:r>
-              <a:rPr lang="en-US" dirty="0"/>
-              <a:t> des applications = beaucoup de </a:t>
-            </a:r>
-            <a:r>
-              <a:rPr lang="en-US" dirty="0" err="1"/>
-              <a:t>ressources</a:t>
-            </a:r>
-            <a:r>
-              <a:rPr lang="en-US" dirty="0"/>
-              <a:t> et de documentation</a:t>
-            </a:r>
+            <a:endParaRPr lang="en-US" dirty="0"/>
           </a:p>
           <a:p>
             <a:endParaRPr lang="en-US" dirty="0"/>

</xml_diff>

<commit_message>
Finish slides for data analysis part
</commit_message>
<xml_diff>
--- a/presentation.pptx
+++ b/presentation.pptx
@@ -5,10 +5,10 @@
     <p:sldMasterId id="2147483648" r:id="rId1"/>
   </p:sldMasterIdLst>
   <p:notesMasterIdLst>
-    <p:notesMasterId r:id="rId31"/>
+    <p:notesMasterId r:id="rId36"/>
   </p:notesMasterIdLst>
   <p:handoutMasterIdLst>
-    <p:handoutMasterId r:id="rId32"/>
+    <p:handoutMasterId r:id="rId37"/>
   </p:handoutMasterIdLst>
   <p:sldIdLst>
     <p:sldId id="256" r:id="rId2"/>
@@ -39,12 +39,17 @@
     <p:sldId id="322" r:id="rId27"/>
     <p:sldId id="323" r:id="rId28"/>
     <p:sldId id="324" r:id="rId29"/>
-    <p:sldId id="269" r:id="rId30"/>
+    <p:sldId id="325" r:id="rId30"/>
+    <p:sldId id="326" r:id="rId31"/>
+    <p:sldId id="327" r:id="rId32"/>
+    <p:sldId id="328" r:id="rId33"/>
+    <p:sldId id="329" r:id="rId34"/>
+    <p:sldId id="269" r:id="rId35"/>
   </p:sldIdLst>
   <p:sldSz cx="12198350" cy="6858000"/>
   <p:notesSz cx="9872663" cy="6742113"/>
   <p:custDataLst>
-    <p:tags r:id="rId33"/>
+    <p:tags r:id="rId38"/>
   </p:custDataLst>
   <p:defaultTextStyle>
     <a:defPPr>
@@ -23799,53 +23804,24 @@
             </a:lvl9pPr>
           </a:lstStyle>
           <a:p>
-            <a:r>
-              <a:rPr lang="en-US" sz="2400" dirty="0" err="1"/>
-              <a:t>Quels</a:t>
-            </a:r>
-            <a:r>
-              <a:rPr lang="en-US" sz="2400" dirty="0"/>
-              <a:t> </a:t>
-            </a:r>
-            <a:r>
-              <a:rPr lang="en-US" sz="2400" dirty="0" err="1"/>
-              <a:t>sont</a:t>
-            </a:r>
-            <a:r>
-              <a:rPr lang="en-US" sz="2400" dirty="0"/>
-              <a:t> les 5 </a:t>
-            </a:r>
-            <a:r>
-              <a:rPr lang="en-US" sz="2400" dirty="0" err="1"/>
-              <a:t>passagers</a:t>
-            </a:r>
-            <a:r>
-              <a:rPr lang="en-US" sz="2400" dirty="0"/>
-              <a:t> du Titanic les plus </a:t>
-            </a:r>
-            <a:r>
-              <a:rPr lang="en-US" sz="2400" dirty="0" err="1"/>
-              <a:t>âgés</a:t>
-            </a:r>
-            <a:r>
-              <a:rPr lang="en-US" sz="2400" dirty="0"/>
-              <a:t> ?</a:t>
-            </a:r>
-          </a:p>
-          <a:p>
             <a:pPr marL="0" indent="0">
               <a:buNone/>
             </a:pPr>
-            <a:endParaRPr lang="en-US" sz="2400" dirty="0"/>
-          </a:p>
-          <a:p>
             <a:r>
               <a:rPr lang="en-US" sz="2400" dirty="0" err="1"/>
-              <a:t>Combien</a:t>
+              <a:t>Quels</a:t>
             </a:r>
             <a:r>
               <a:rPr lang="en-US" sz="2400" dirty="0"/>
-              <a:t> de </a:t>
+              <a:t> </a:t>
+            </a:r>
+            <a:r>
+              <a:rPr lang="en-US" sz="2400" dirty="0" err="1"/>
+              <a:t>sont</a:t>
+            </a:r>
+            <a:r>
+              <a:rPr lang="en-US" sz="2400" dirty="0"/>
+              <a:t> les 5 </a:t>
             </a:r>
             <a:r>
               <a:rPr lang="en-US" sz="2400" dirty="0" err="1"/>
@@ -23853,90 +23829,16 @@
             </a:r>
             <a:r>
               <a:rPr lang="en-US" sz="2400" dirty="0"/>
-              <a:t> par </a:t>
+              <a:t> du Titanic les plus </a:t>
             </a:r>
             <a:r>
               <a:rPr lang="en-US" sz="2400" dirty="0" err="1"/>
-              <a:t>classe</a:t>
-            </a:r>
-            <a:r>
-              <a:rPr lang="en-US" sz="2400" dirty="0"/>
-              <a:t> </a:t>
-            </a:r>
-            <a:r>
-              <a:rPr lang="en-US" sz="2400" dirty="0" err="1"/>
-              <a:t>ont</a:t>
-            </a:r>
-            <a:r>
-              <a:rPr lang="en-US" sz="2400" dirty="0"/>
-              <a:t> </a:t>
-            </a:r>
-            <a:r>
-              <a:rPr lang="en-US" sz="2400" dirty="0" err="1"/>
-              <a:t>survécu</a:t>
+              <a:t>âgés</a:t>
             </a:r>
             <a:r>
               <a:rPr lang="en-US" sz="2400" dirty="0"/>
               <a:t> ?</a:t>
             </a:r>
-          </a:p>
-          <a:p>
-            <a:pPr marL="0" indent="0">
-              <a:buNone/>
-            </a:pPr>
-            <a:endParaRPr lang="en-US" sz="2400" dirty="0"/>
-          </a:p>
-          <a:p>
-            <a:r>
-              <a:rPr lang="en-US" sz="2400" dirty="0"/>
-              <a:t>Quelle </a:t>
-            </a:r>
-            <a:r>
-              <a:rPr lang="en-US" sz="2400" dirty="0" err="1"/>
-              <a:t>est</a:t>
-            </a:r>
-            <a:r>
-              <a:rPr lang="en-US" sz="2400" dirty="0"/>
-              <a:t> la </a:t>
-            </a:r>
-            <a:r>
-              <a:rPr lang="en-US" sz="2400" dirty="0" err="1"/>
-              <a:t>somme</a:t>
-            </a:r>
-            <a:r>
-              <a:rPr lang="en-US" sz="2400" dirty="0"/>
-              <a:t> total des </a:t>
-            </a:r>
-            <a:r>
-              <a:rPr lang="en-US" sz="2400" dirty="0" err="1"/>
-              <a:t>tarifs</a:t>
-            </a:r>
-            <a:r>
-              <a:rPr lang="en-US" sz="2400" dirty="0"/>
-              <a:t> </a:t>
-            </a:r>
-            <a:r>
-              <a:rPr lang="en-US" sz="2400" dirty="0" err="1"/>
-              <a:t>payés</a:t>
-            </a:r>
-            <a:r>
-              <a:rPr lang="en-US" sz="2400" dirty="0"/>
-              <a:t> par </a:t>
-            </a:r>
-            <a:r>
-              <a:rPr lang="en-US" sz="2400" dirty="0" err="1"/>
-              <a:t>classe</a:t>
-            </a:r>
-            <a:r>
-              <a:rPr lang="en-US" sz="2400" dirty="0"/>
-              <a:t> ?</a:t>
-            </a:r>
-            <a:endParaRPr lang="en-US" sz="2200" b="1" dirty="0"/>
-          </a:p>
-          <a:p>
-            <a:pPr marL="180975" lvl="1" indent="0">
-              <a:buNone/>
-            </a:pPr>
             <a:endParaRPr lang="en-US" sz="2200" dirty="0"/>
           </a:p>
           <a:p>
@@ -24035,6 +23937,881 @@
       </p:grpSpPr>
       <p:sp>
         <p:nvSpPr>
+          <p:cNvPr id="2" name="Title 1">
+            <a:extLst>
+              <a:ext uri="{FF2B5EF4-FFF2-40B4-BE49-F238E27FC236}">
+                <a16:creationId xmlns:a16="http://schemas.microsoft.com/office/drawing/2014/main" id="{04C5DF06-5F42-4296-B27B-4F79E0DB836B}"/>
+              </a:ext>
+            </a:extLst>
+          </p:cNvPr>
+          <p:cNvSpPr>
+            <a:spLocks noGrp="1"/>
+          </p:cNvSpPr>
+          <p:nvPr>
+            <p:ph type="title"/>
+          </p:nvPr>
+        </p:nvSpPr>
+        <p:spPr/>
+        <p:txBody>
+          <a:bodyPr/>
+          <a:lstStyle/>
+          <a:p>
+            <a:r>
+              <a:rPr lang="en-US" sz="3600" dirty="0" err="1"/>
+              <a:t>Exercices</a:t>
+            </a:r>
+            <a:r>
+              <a:rPr lang="en-US" sz="3600" dirty="0"/>
+              <a:t> sur le jeu de </a:t>
+            </a:r>
+            <a:r>
+              <a:rPr lang="en-US" sz="3600" dirty="0" err="1"/>
+              <a:t>données</a:t>
+            </a:r>
+            <a:r>
+              <a:rPr lang="en-US" sz="3600" dirty="0"/>
+              <a:t> Titanic</a:t>
+            </a:r>
+          </a:p>
+        </p:txBody>
+      </p:sp>
+      <p:sp>
+        <p:nvSpPr>
+          <p:cNvPr id="5" name="Slide Number Placeholder 4">
+            <a:extLst>
+              <a:ext uri="{FF2B5EF4-FFF2-40B4-BE49-F238E27FC236}">
+                <a16:creationId xmlns:a16="http://schemas.microsoft.com/office/drawing/2014/main" id="{B756D4B6-3814-4E02-AB98-08D3B49675BF}"/>
+              </a:ext>
+            </a:extLst>
+          </p:cNvPr>
+          <p:cNvSpPr>
+            <a:spLocks noGrp="1"/>
+          </p:cNvSpPr>
+          <p:nvPr>
+            <p:ph type="sldNum" sz="quarter" idx="4"/>
+          </p:nvPr>
+        </p:nvSpPr>
+        <p:spPr/>
+        <p:txBody>
+          <a:bodyPr/>
+          <a:lstStyle/>
+          <a:p>
+            <a:fld id="{5EE7099E-8998-4851-915A-4F4831808297}" type="slidenum">
+              <a:rPr lang="nl-NL" smtClean="0"/>
+              <a:pPr/>
+              <a:t>29</a:t>
+            </a:fld>
+            <a:endParaRPr lang="nl-NL"/>
+          </a:p>
+        </p:txBody>
+      </p:sp>
+      <p:sp>
+        <p:nvSpPr>
+          <p:cNvPr id="3" name="ZoneTexte 2">
+            <a:extLst>
+              <a:ext uri="{FF2B5EF4-FFF2-40B4-BE49-F238E27FC236}">
+                <a16:creationId xmlns:a16="http://schemas.microsoft.com/office/drawing/2014/main" id="{0C248AA7-6FCB-3F89-E3DD-C837A2826405}"/>
+              </a:ext>
+            </a:extLst>
+          </p:cNvPr>
+          <p:cNvSpPr txBox="1"/>
+          <p:nvPr/>
+        </p:nvSpPr>
+        <p:spPr>
+          <a:xfrm>
+            <a:off x="3692106" y="1699404"/>
+            <a:ext cx="0" cy="0"/>
+          </a:xfrm>
+          <a:prstGeom prst="rect">
+            <a:avLst/>
+          </a:prstGeom>
+          <a:noFill/>
+        </p:spPr>
+        <p:txBody>
+          <a:bodyPr wrap="none" lIns="108000" tIns="108000" rIns="108000" bIns="108000" rtlCol="0">
+            <a:noAutofit/>
+          </a:bodyPr>
+          <a:lstStyle/>
+          <a:p>
+            <a:endParaRPr lang="fr-FR" noProof="0" dirty="0" err="1">
+              <a:solidFill>
+                <a:schemeClr val="bg2"/>
+              </a:solidFill>
+            </a:endParaRPr>
+          </a:p>
+        </p:txBody>
+      </p:sp>
+      <p:sp>
+        <p:nvSpPr>
+          <p:cNvPr id="6" name="Vertical Text Placeholder 5">
+            <a:extLst>
+              <a:ext uri="{FF2B5EF4-FFF2-40B4-BE49-F238E27FC236}">
+                <a16:creationId xmlns:a16="http://schemas.microsoft.com/office/drawing/2014/main" id="{F8170739-5212-AEC7-557E-2E086A29A496}"/>
+              </a:ext>
+            </a:extLst>
+          </p:cNvPr>
+          <p:cNvSpPr>
+            <a:spLocks noGrp="1"/>
+          </p:cNvSpPr>
+          <p:nvPr>
+            <p:ph type="body" orient="vert" idx="1"/>
+          </p:nvPr>
+        </p:nvSpPr>
+        <p:spPr>
+          <a:xfrm>
+            <a:off x="404662" y="1143000"/>
+            <a:ext cx="11389023" cy="4795836"/>
+          </a:xfrm>
+        </p:spPr>
+        <p:txBody>
+          <a:bodyPr/>
+          <a:lstStyle/>
+          <a:p>
+            <a:endParaRPr lang="en-US" dirty="0"/>
+          </a:p>
+          <a:p>
+            <a:endParaRPr lang="en-US" dirty="0"/>
+          </a:p>
+          <a:p>
+            <a:pPr marL="180975" lvl="1" indent="0">
+              <a:buNone/>
+            </a:pPr>
+            <a:endParaRPr lang="en-US" dirty="0"/>
+          </a:p>
+          <a:p>
+            <a:pPr lvl="1"/>
+            <a:endParaRPr lang="en-US" dirty="0"/>
+          </a:p>
+          <a:p>
+            <a:endParaRPr lang="en-US" dirty="0"/>
+          </a:p>
+          <a:p>
+            <a:endParaRPr lang="en-US" dirty="0"/>
+          </a:p>
+          <a:p>
+            <a:endParaRPr lang="en-US" dirty="0"/>
+          </a:p>
+          <a:p>
+            <a:endParaRPr lang="en-US" dirty="0"/>
+          </a:p>
+          <a:p>
+            <a:pPr lvl="1"/>
+            <a:endParaRPr lang="en-US" dirty="0"/>
+          </a:p>
+          <a:p>
+            <a:pPr lvl="1"/>
+            <a:endParaRPr lang="en-US" dirty="0"/>
+          </a:p>
+          <a:p>
+            <a:pPr lvl="1"/>
+            <a:endParaRPr lang="en-US" dirty="0"/>
+          </a:p>
+          <a:p>
+            <a:pPr lvl="1"/>
+            <a:endParaRPr lang="en-US" dirty="0"/>
+          </a:p>
+          <a:p>
+            <a:endParaRPr lang="en-US" b="1" dirty="0"/>
+          </a:p>
+          <a:p>
+            <a:endParaRPr lang="en-US" dirty="0"/>
+          </a:p>
+        </p:txBody>
+      </p:sp>
+      <p:sp>
+        <p:nvSpPr>
+          <p:cNvPr id="4" name="Vertical Text Placeholder 5">
+            <a:extLst>
+              <a:ext uri="{FF2B5EF4-FFF2-40B4-BE49-F238E27FC236}">
+                <a16:creationId xmlns:a16="http://schemas.microsoft.com/office/drawing/2014/main" id="{A57D01D8-1D67-D654-0CFB-28A877FD85B9}"/>
+              </a:ext>
+            </a:extLst>
+          </p:cNvPr>
+          <p:cNvSpPr txBox="1">
+            <a:spLocks/>
+          </p:cNvSpPr>
+          <p:nvPr/>
+        </p:nvSpPr>
+        <p:spPr>
+          <a:xfrm>
+            <a:off x="557062" y="1295400"/>
+            <a:ext cx="11389023" cy="4795836"/>
+          </a:xfrm>
+          <a:prstGeom prst="rect">
+            <a:avLst/>
+          </a:prstGeom>
+        </p:spPr>
+        <p:txBody>
+          <a:bodyPr vert="horz" lIns="0" tIns="0" rIns="0" bIns="0" rtlCol="0">
+            <a:normAutofit/>
+          </a:bodyPr>
+          <a:lstStyle>
+            <a:lvl1pPr marL="180975" indent="-180975" algn="l" defTabSz="914400" rtl="0" eaLnBrk="1" latinLnBrk="0" hangingPunct="1">
+              <a:lnSpc>
+                <a:spcPct val="90000"/>
+              </a:lnSpc>
+              <a:spcBef>
+                <a:spcPts val="600"/>
+              </a:spcBef>
+              <a:spcAft>
+                <a:spcPts val="600"/>
+              </a:spcAft>
+              <a:buClr>
+                <a:schemeClr val="bg2"/>
+              </a:buClr>
+              <a:buFont typeface="Arial" panose="020B0604020202020204" pitchFamily="34" charset="0"/>
+              <a:buChar char="•"/>
+              <a:defRPr sz="1800" kern="1200">
+                <a:solidFill>
+                  <a:schemeClr val="bg2"/>
+                </a:solidFill>
+                <a:latin typeface="+mn-lt"/>
+                <a:ea typeface="+mn-ea"/>
+                <a:cs typeface="+mn-cs"/>
+              </a:defRPr>
+            </a:lvl1pPr>
+            <a:lvl2pPr marL="361950" indent="-180975" algn="l" defTabSz="914400" rtl="0" eaLnBrk="1" latinLnBrk="0" hangingPunct="1">
+              <a:lnSpc>
+                <a:spcPct val="90000"/>
+              </a:lnSpc>
+              <a:spcBef>
+                <a:spcPts val="600"/>
+              </a:spcBef>
+              <a:spcAft>
+                <a:spcPts val="600"/>
+              </a:spcAft>
+              <a:buClr>
+                <a:schemeClr val="bg2"/>
+              </a:buClr>
+              <a:buFont typeface="Arial" panose="020B0604020202020204" pitchFamily="34" charset="0"/>
+              <a:buChar char="-"/>
+              <a:defRPr sz="1600" kern="1200">
+                <a:solidFill>
+                  <a:schemeClr val="bg2"/>
+                </a:solidFill>
+                <a:latin typeface="+mn-lt"/>
+                <a:ea typeface="+mn-ea"/>
+                <a:cs typeface="+mn-cs"/>
+              </a:defRPr>
+            </a:lvl2pPr>
+            <a:lvl3pPr marL="0" indent="0" algn="l" defTabSz="914400" rtl="0" eaLnBrk="1" latinLnBrk="0" hangingPunct="1">
+              <a:lnSpc>
+                <a:spcPct val="90000"/>
+              </a:lnSpc>
+              <a:spcBef>
+                <a:spcPts val="600"/>
+              </a:spcBef>
+              <a:spcAft>
+                <a:spcPts val="600"/>
+              </a:spcAft>
+              <a:buFont typeface="Arial" panose="020B0604020202020204" pitchFamily="34" charset="0"/>
+              <a:buNone/>
+              <a:defRPr sz="1800" kern="1200">
+                <a:solidFill>
+                  <a:schemeClr val="bg2"/>
+                </a:solidFill>
+                <a:latin typeface="+mn-lt"/>
+                <a:ea typeface="+mn-ea"/>
+                <a:cs typeface="+mn-cs"/>
+              </a:defRPr>
+            </a:lvl3pPr>
+            <a:lvl4pPr marL="0" indent="0" algn="l" defTabSz="914400" rtl="0" eaLnBrk="1" latinLnBrk="0" hangingPunct="1">
+              <a:lnSpc>
+                <a:spcPct val="90000"/>
+              </a:lnSpc>
+              <a:spcBef>
+                <a:spcPts val="600"/>
+              </a:spcBef>
+              <a:spcAft>
+                <a:spcPts val="600"/>
+              </a:spcAft>
+              <a:buFont typeface="Arial" panose="020B0604020202020204" pitchFamily="34" charset="0"/>
+              <a:buNone/>
+              <a:defRPr sz="1800" b="1" kern="1200">
+                <a:solidFill>
+                  <a:schemeClr val="bg2"/>
+                </a:solidFill>
+                <a:latin typeface="+mn-lt"/>
+                <a:ea typeface="+mn-ea"/>
+                <a:cs typeface="+mn-cs"/>
+              </a:defRPr>
+            </a:lvl4pPr>
+            <a:lvl5pPr marL="0" indent="0" algn="l" defTabSz="914400" rtl="0" eaLnBrk="1" latinLnBrk="0" hangingPunct="1">
+              <a:lnSpc>
+                <a:spcPct val="90000"/>
+              </a:lnSpc>
+              <a:spcBef>
+                <a:spcPts val="600"/>
+              </a:spcBef>
+              <a:spcAft>
+                <a:spcPts val="600"/>
+              </a:spcAft>
+              <a:buFont typeface="Arial" panose="020B0604020202020204" pitchFamily="34" charset="0"/>
+              <a:buNone/>
+              <a:defRPr sz="1800" b="1" kern="1200" baseline="0">
+                <a:solidFill>
+                  <a:schemeClr val="tx2"/>
+                </a:solidFill>
+                <a:latin typeface="+mn-lt"/>
+                <a:ea typeface="+mn-ea"/>
+                <a:cs typeface="+mn-cs"/>
+              </a:defRPr>
+            </a:lvl5pPr>
+            <a:lvl6pPr marL="180975" indent="-180975" algn="l" defTabSz="914400" rtl="0" eaLnBrk="1" latinLnBrk="0" hangingPunct="1">
+              <a:lnSpc>
+                <a:spcPct val="90000"/>
+              </a:lnSpc>
+              <a:spcBef>
+                <a:spcPts val="600"/>
+              </a:spcBef>
+              <a:spcAft>
+                <a:spcPts val="600"/>
+              </a:spcAft>
+              <a:buClr>
+                <a:schemeClr val="bg2"/>
+              </a:buClr>
+              <a:buFont typeface="Arial" panose="020B0604020202020204" pitchFamily="34" charset="0"/>
+              <a:buChar char="•"/>
+              <a:defRPr sz="1800" kern="1200">
+                <a:solidFill>
+                  <a:schemeClr val="bg2"/>
+                </a:solidFill>
+                <a:latin typeface="+mn-lt"/>
+                <a:ea typeface="+mn-ea"/>
+                <a:cs typeface="+mn-cs"/>
+              </a:defRPr>
+            </a:lvl6pPr>
+            <a:lvl7pPr marL="361950" indent="-180975" algn="l" defTabSz="914400" rtl="0" eaLnBrk="1" latinLnBrk="0" hangingPunct="1">
+              <a:lnSpc>
+                <a:spcPct val="90000"/>
+              </a:lnSpc>
+              <a:spcBef>
+                <a:spcPts val="600"/>
+              </a:spcBef>
+              <a:spcAft>
+                <a:spcPts val="600"/>
+              </a:spcAft>
+              <a:buClr>
+                <a:schemeClr val="bg2"/>
+              </a:buClr>
+              <a:buFont typeface="Arial" panose="020B0604020202020204" pitchFamily="34" charset="0"/>
+              <a:buChar char="-"/>
+              <a:defRPr sz="1600" kern="1200">
+                <a:solidFill>
+                  <a:schemeClr val="bg2"/>
+                </a:solidFill>
+                <a:latin typeface="+mn-lt"/>
+                <a:ea typeface="+mn-ea"/>
+                <a:cs typeface="+mn-cs"/>
+              </a:defRPr>
+            </a:lvl7pPr>
+            <a:lvl8pPr marL="0" indent="0" algn="l" defTabSz="914400" rtl="0" eaLnBrk="1" latinLnBrk="0" hangingPunct="1">
+              <a:lnSpc>
+                <a:spcPct val="90000"/>
+              </a:lnSpc>
+              <a:spcBef>
+                <a:spcPts val="600"/>
+              </a:spcBef>
+              <a:spcAft>
+                <a:spcPts val="600"/>
+              </a:spcAft>
+              <a:buFont typeface="Arial" panose="020B0604020202020204" pitchFamily="34" charset="0"/>
+              <a:buNone/>
+              <a:defRPr sz="1600" kern="1200">
+                <a:solidFill>
+                  <a:schemeClr val="bg2"/>
+                </a:solidFill>
+                <a:latin typeface="+mn-lt"/>
+                <a:ea typeface="+mn-ea"/>
+                <a:cs typeface="+mn-cs"/>
+              </a:defRPr>
+            </a:lvl8pPr>
+            <a:lvl9pPr marL="0" indent="0" algn="l" defTabSz="914400" rtl="0" eaLnBrk="1" latinLnBrk="0" hangingPunct="1">
+              <a:lnSpc>
+                <a:spcPct val="90000"/>
+              </a:lnSpc>
+              <a:spcBef>
+                <a:spcPts val="600"/>
+              </a:spcBef>
+              <a:spcAft>
+                <a:spcPts val="600"/>
+              </a:spcAft>
+              <a:buFont typeface="Arial" panose="020B0604020202020204" pitchFamily="34" charset="0"/>
+              <a:buNone/>
+              <a:defRPr sz="1800" b="1" kern="1200" baseline="0">
+                <a:solidFill>
+                  <a:schemeClr val="bg2"/>
+                </a:solidFill>
+                <a:latin typeface="+mn-lt"/>
+                <a:ea typeface="+mn-ea"/>
+                <a:cs typeface="+mn-cs"/>
+              </a:defRPr>
+            </a:lvl9pPr>
+          </a:lstStyle>
+          <a:p>
+            <a:endParaRPr lang="en-US" sz="2200" b="1" dirty="0"/>
+          </a:p>
+          <a:p>
+            <a:pPr marL="180975" lvl="1" indent="0">
+              <a:buNone/>
+            </a:pPr>
+            <a:endParaRPr lang="en-US" sz="2200" dirty="0"/>
+          </a:p>
+          <a:p>
+            <a:pPr lvl="1"/>
+            <a:endParaRPr lang="en-US" sz="2200" dirty="0"/>
+          </a:p>
+          <a:p>
+            <a:pPr marL="0" indent="0">
+              <a:buFont typeface="Arial" panose="020B0604020202020204" pitchFamily="34" charset="0"/>
+              <a:buNone/>
+            </a:pPr>
+            <a:endParaRPr lang="en-US" dirty="0"/>
+          </a:p>
+          <a:p>
+            <a:endParaRPr lang="en-US" dirty="0"/>
+          </a:p>
+          <a:p>
+            <a:pPr marL="180975" lvl="1" indent="0">
+              <a:buFont typeface="Arial" panose="020B0604020202020204" pitchFamily="34" charset="0"/>
+              <a:buNone/>
+            </a:pPr>
+            <a:endParaRPr lang="en-US" dirty="0"/>
+          </a:p>
+          <a:p>
+            <a:pPr lvl="1"/>
+            <a:endParaRPr lang="en-US" dirty="0"/>
+          </a:p>
+          <a:p>
+            <a:endParaRPr lang="en-US" dirty="0"/>
+          </a:p>
+          <a:p>
+            <a:endParaRPr lang="en-US" dirty="0"/>
+          </a:p>
+          <a:p>
+            <a:endParaRPr lang="en-US" dirty="0"/>
+          </a:p>
+          <a:p>
+            <a:endParaRPr lang="en-US" dirty="0"/>
+          </a:p>
+          <a:p>
+            <a:pPr lvl="1"/>
+            <a:endParaRPr lang="en-US" dirty="0"/>
+          </a:p>
+          <a:p>
+            <a:pPr lvl="1"/>
+            <a:endParaRPr lang="en-US" dirty="0"/>
+          </a:p>
+          <a:p>
+            <a:pPr lvl="1"/>
+            <a:endParaRPr lang="en-US" dirty="0"/>
+          </a:p>
+          <a:p>
+            <a:pPr lvl="1"/>
+            <a:endParaRPr lang="en-US" dirty="0"/>
+          </a:p>
+          <a:p>
+            <a:endParaRPr lang="en-US" b="1" dirty="0"/>
+          </a:p>
+          <a:p>
+            <a:endParaRPr lang="en-US" dirty="0"/>
+          </a:p>
+        </p:txBody>
+      </p:sp>
+      <p:sp>
+        <p:nvSpPr>
+          <p:cNvPr id="7" name="Vertical Text Placeholder 5">
+            <a:extLst>
+              <a:ext uri="{FF2B5EF4-FFF2-40B4-BE49-F238E27FC236}">
+                <a16:creationId xmlns:a16="http://schemas.microsoft.com/office/drawing/2014/main" id="{DFE0C10A-165E-4BE2-39D7-55B90C940362}"/>
+              </a:ext>
+            </a:extLst>
+          </p:cNvPr>
+          <p:cNvSpPr txBox="1">
+            <a:spLocks/>
+          </p:cNvSpPr>
+          <p:nvPr/>
+        </p:nvSpPr>
+        <p:spPr>
+          <a:xfrm>
+            <a:off x="436592" y="1199890"/>
+            <a:ext cx="11389023" cy="4795836"/>
+          </a:xfrm>
+          <a:prstGeom prst="rect">
+            <a:avLst/>
+          </a:prstGeom>
+        </p:spPr>
+        <p:txBody>
+          <a:bodyPr vert="horz" lIns="0" tIns="0" rIns="0" bIns="0" rtlCol="0">
+            <a:normAutofit/>
+          </a:bodyPr>
+          <a:lstStyle>
+            <a:lvl1pPr marL="180975" indent="-180975" algn="l" defTabSz="914400" rtl="0" eaLnBrk="1" latinLnBrk="0" hangingPunct="1">
+              <a:lnSpc>
+                <a:spcPct val="90000"/>
+              </a:lnSpc>
+              <a:spcBef>
+                <a:spcPts val="600"/>
+              </a:spcBef>
+              <a:spcAft>
+                <a:spcPts val="600"/>
+              </a:spcAft>
+              <a:buClr>
+                <a:schemeClr val="bg2"/>
+              </a:buClr>
+              <a:buFont typeface="Arial" panose="020B0604020202020204" pitchFamily="34" charset="0"/>
+              <a:buChar char="•"/>
+              <a:defRPr sz="1800" kern="1200">
+                <a:solidFill>
+                  <a:schemeClr val="bg2"/>
+                </a:solidFill>
+                <a:latin typeface="+mn-lt"/>
+                <a:ea typeface="+mn-ea"/>
+                <a:cs typeface="+mn-cs"/>
+              </a:defRPr>
+            </a:lvl1pPr>
+            <a:lvl2pPr marL="361950" indent="-180975" algn="l" defTabSz="914400" rtl="0" eaLnBrk="1" latinLnBrk="0" hangingPunct="1">
+              <a:lnSpc>
+                <a:spcPct val="90000"/>
+              </a:lnSpc>
+              <a:spcBef>
+                <a:spcPts val="600"/>
+              </a:spcBef>
+              <a:spcAft>
+                <a:spcPts val="600"/>
+              </a:spcAft>
+              <a:buClr>
+                <a:schemeClr val="bg2"/>
+              </a:buClr>
+              <a:buFont typeface="Arial" panose="020B0604020202020204" pitchFamily="34" charset="0"/>
+              <a:buChar char="-"/>
+              <a:defRPr sz="1600" kern="1200">
+                <a:solidFill>
+                  <a:schemeClr val="bg2"/>
+                </a:solidFill>
+                <a:latin typeface="+mn-lt"/>
+                <a:ea typeface="+mn-ea"/>
+                <a:cs typeface="+mn-cs"/>
+              </a:defRPr>
+            </a:lvl2pPr>
+            <a:lvl3pPr marL="0" indent="0" algn="l" defTabSz="914400" rtl="0" eaLnBrk="1" latinLnBrk="0" hangingPunct="1">
+              <a:lnSpc>
+                <a:spcPct val="90000"/>
+              </a:lnSpc>
+              <a:spcBef>
+                <a:spcPts val="600"/>
+              </a:spcBef>
+              <a:spcAft>
+                <a:spcPts val="600"/>
+              </a:spcAft>
+              <a:buFont typeface="Arial" panose="020B0604020202020204" pitchFamily="34" charset="0"/>
+              <a:buNone/>
+              <a:defRPr sz="1800" kern="1200">
+                <a:solidFill>
+                  <a:schemeClr val="bg2"/>
+                </a:solidFill>
+                <a:latin typeface="+mn-lt"/>
+                <a:ea typeface="+mn-ea"/>
+                <a:cs typeface="+mn-cs"/>
+              </a:defRPr>
+            </a:lvl3pPr>
+            <a:lvl4pPr marL="0" indent="0" algn="l" defTabSz="914400" rtl="0" eaLnBrk="1" latinLnBrk="0" hangingPunct="1">
+              <a:lnSpc>
+                <a:spcPct val="90000"/>
+              </a:lnSpc>
+              <a:spcBef>
+                <a:spcPts val="600"/>
+              </a:spcBef>
+              <a:spcAft>
+                <a:spcPts val="600"/>
+              </a:spcAft>
+              <a:buFont typeface="Arial" panose="020B0604020202020204" pitchFamily="34" charset="0"/>
+              <a:buNone/>
+              <a:defRPr sz="1800" b="1" kern="1200">
+                <a:solidFill>
+                  <a:schemeClr val="bg2"/>
+                </a:solidFill>
+                <a:latin typeface="+mn-lt"/>
+                <a:ea typeface="+mn-ea"/>
+                <a:cs typeface="+mn-cs"/>
+              </a:defRPr>
+            </a:lvl4pPr>
+            <a:lvl5pPr marL="0" indent="0" algn="l" defTabSz="914400" rtl="0" eaLnBrk="1" latinLnBrk="0" hangingPunct="1">
+              <a:lnSpc>
+                <a:spcPct val="90000"/>
+              </a:lnSpc>
+              <a:spcBef>
+                <a:spcPts val="600"/>
+              </a:spcBef>
+              <a:spcAft>
+                <a:spcPts val="600"/>
+              </a:spcAft>
+              <a:buFont typeface="Arial" panose="020B0604020202020204" pitchFamily="34" charset="0"/>
+              <a:buNone/>
+              <a:defRPr sz="1800" b="1" kern="1200" baseline="0">
+                <a:solidFill>
+                  <a:schemeClr val="tx2"/>
+                </a:solidFill>
+                <a:latin typeface="+mn-lt"/>
+                <a:ea typeface="+mn-ea"/>
+                <a:cs typeface="+mn-cs"/>
+              </a:defRPr>
+            </a:lvl5pPr>
+            <a:lvl6pPr marL="180975" indent="-180975" algn="l" defTabSz="914400" rtl="0" eaLnBrk="1" latinLnBrk="0" hangingPunct="1">
+              <a:lnSpc>
+                <a:spcPct val="90000"/>
+              </a:lnSpc>
+              <a:spcBef>
+                <a:spcPts val="600"/>
+              </a:spcBef>
+              <a:spcAft>
+                <a:spcPts val="600"/>
+              </a:spcAft>
+              <a:buClr>
+                <a:schemeClr val="bg2"/>
+              </a:buClr>
+              <a:buFont typeface="Arial" panose="020B0604020202020204" pitchFamily="34" charset="0"/>
+              <a:buChar char="•"/>
+              <a:defRPr sz="1800" kern="1200">
+                <a:solidFill>
+                  <a:schemeClr val="bg2"/>
+                </a:solidFill>
+                <a:latin typeface="+mn-lt"/>
+                <a:ea typeface="+mn-ea"/>
+                <a:cs typeface="+mn-cs"/>
+              </a:defRPr>
+            </a:lvl6pPr>
+            <a:lvl7pPr marL="361950" indent="-180975" algn="l" defTabSz="914400" rtl="0" eaLnBrk="1" latinLnBrk="0" hangingPunct="1">
+              <a:lnSpc>
+                <a:spcPct val="90000"/>
+              </a:lnSpc>
+              <a:spcBef>
+                <a:spcPts val="600"/>
+              </a:spcBef>
+              <a:spcAft>
+                <a:spcPts val="600"/>
+              </a:spcAft>
+              <a:buClr>
+                <a:schemeClr val="bg2"/>
+              </a:buClr>
+              <a:buFont typeface="Arial" panose="020B0604020202020204" pitchFamily="34" charset="0"/>
+              <a:buChar char="-"/>
+              <a:defRPr sz="1600" kern="1200">
+                <a:solidFill>
+                  <a:schemeClr val="bg2"/>
+                </a:solidFill>
+                <a:latin typeface="+mn-lt"/>
+                <a:ea typeface="+mn-ea"/>
+                <a:cs typeface="+mn-cs"/>
+              </a:defRPr>
+            </a:lvl7pPr>
+            <a:lvl8pPr marL="0" indent="0" algn="l" defTabSz="914400" rtl="0" eaLnBrk="1" latinLnBrk="0" hangingPunct="1">
+              <a:lnSpc>
+                <a:spcPct val="90000"/>
+              </a:lnSpc>
+              <a:spcBef>
+                <a:spcPts val="600"/>
+              </a:spcBef>
+              <a:spcAft>
+                <a:spcPts val="600"/>
+              </a:spcAft>
+              <a:buFont typeface="Arial" panose="020B0604020202020204" pitchFamily="34" charset="0"/>
+              <a:buNone/>
+              <a:defRPr sz="1600" kern="1200">
+                <a:solidFill>
+                  <a:schemeClr val="bg2"/>
+                </a:solidFill>
+                <a:latin typeface="+mn-lt"/>
+                <a:ea typeface="+mn-ea"/>
+                <a:cs typeface="+mn-cs"/>
+              </a:defRPr>
+            </a:lvl8pPr>
+            <a:lvl9pPr marL="0" indent="0" algn="l" defTabSz="914400" rtl="0" eaLnBrk="1" latinLnBrk="0" hangingPunct="1">
+              <a:lnSpc>
+                <a:spcPct val="90000"/>
+              </a:lnSpc>
+              <a:spcBef>
+                <a:spcPts val="600"/>
+              </a:spcBef>
+              <a:spcAft>
+                <a:spcPts val="600"/>
+              </a:spcAft>
+              <a:buFont typeface="Arial" panose="020B0604020202020204" pitchFamily="34" charset="0"/>
+              <a:buNone/>
+              <a:defRPr sz="1800" b="1" kern="1200" baseline="0">
+                <a:solidFill>
+                  <a:schemeClr val="bg2"/>
+                </a:solidFill>
+                <a:latin typeface="+mn-lt"/>
+                <a:ea typeface="+mn-ea"/>
+                <a:cs typeface="+mn-cs"/>
+              </a:defRPr>
+            </a:lvl9pPr>
+          </a:lstStyle>
+          <a:p>
+            <a:pPr marL="0" indent="0">
+              <a:buNone/>
+            </a:pPr>
+            <a:r>
+              <a:rPr lang="en-US" sz="2400" dirty="0" err="1"/>
+              <a:t>Quels</a:t>
+            </a:r>
+            <a:r>
+              <a:rPr lang="en-US" sz="2400" dirty="0"/>
+              <a:t> </a:t>
+            </a:r>
+            <a:r>
+              <a:rPr lang="en-US" sz="2400" dirty="0" err="1"/>
+              <a:t>sont</a:t>
+            </a:r>
+            <a:r>
+              <a:rPr lang="en-US" sz="2400" dirty="0"/>
+              <a:t> les 5 </a:t>
+            </a:r>
+            <a:r>
+              <a:rPr lang="en-US" sz="2400" dirty="0" err="1"/>
+              <a:t>passagers</a:t>
+            </a:r>
+            <a:r>
+              <a:rPr lang="en-US" sz="2400" dirty="0"/>
+              <a:t> du Titanic les plus </a:t>
+            </a:r>
+            <a:r>
+              <a:rPr lang="en-US" sz="2400" dirty="0" err="1"/>
+              <a:t>âgés</a:t>
+            </a:r>
+            <a:r>
+              <a:rPr lang="en-US" sz="2400" dirty="0"/>
+              <a:t> ?</a:t>
+            </a:r>
+            <a:endParaRPr lang="en-US" sz="2200" dirty="0"/>
+          </a:p>
+          <a:p>
+            <a:pPr lvl="1"/>
+            <a:endParaRPr lang="en-US" sz="2200" dirty="0"/>
+          </a:p>
+          <a:p>
+            <a:pPr marL="0" indent="0">
+              <a:buFont typeface="Arial" panose="020B0604020202020204" pitchFamily="34" charset="0"/>
+              <a:buNone/>
+            </a:pPr>
+            <a:endParaRPr lang="en-US" dirty="0"/>
+          </a:p>
+          <a:p>
+            <a:endParaRPr lang="en-US" dirty="0"/>
+          </a:p>
+          <a:p>
+            <a:pPr marL="180975" lvl="1" indent="0">
+              <a:buFont typeface="Arial" panose="020B0604020202020204" pitchFamily="34" charset="0"/>
+              <a:buNone/>
+            </a:pPr>
+            <a:endParaRPr lang="en-US" dirty="0"/>
+          </a:p>
+          <a:p>
+            <a:pPr lvl="1"/>
+            <a:endParaRPr lang="en-US" dirty="0"/>
+          </a:p>
+          <a:p>
+            <a:endParaRPr lang="en-US" dirty="0"/>
+          </a:p>
+          <a:p>
+            <a:endParaRPr lang="en-US" dirty="0"/>
+          </a:p>
+          <a:p>
+            <a:endParaRPr lang="en-US" dirty="0"/>
+          </a:p>
+          <a:p>
+            <a:endParaRPr lang="en-US" dirty="0"/>
+          </a:p>
+          <a:p>
+            <a:pPr lvl="1"/>
+            <a:endParaRPr lang="en-US" dirty="0"/>
+          </a:p>
+          <a:p>
+            <a:pPr lvl="1"/>
+            <a:endParaRPr lang="en-US" dirty="0"/>
+          </a:p>
+          <a:p>
+            <a:pPr lvl="1"/>
+            <a:endParaRPr lang="en-US" dirty="0"/>
+          </a:p>
+          <a:p>
+            <a:pPr lvl="1"/>
+            <a:endParaRPr lang="en-US" dirty="0"/>
+          </a:p>
+          <a:p>
+            <a:endParaRPr lang="en-US" b="1" dirty="0"/>
+          </a:p>
+          <a:p>
+            <a:endParaRPr lang="en-US" dirty="0"/>
+          </a:p>
+        </p:txBody>
+      </p:sp>
+      <p:pic>
+        <p:nvPicPr>
+          <p:cNvPr id="10" name="Image 9">
+            <a:extLst>
+              <a:ext uri="{FF2B5EF4-FFF2-40B4-BE49-F238E27FC236}">
+                <a16:creationId xmlns:a16="http://schemas.microsoft.com/office/drawing/2014/main" id="{E4B3FE10-B365-6A2F-190A-5F245EC7897B}"/>
+              </a:ext>
+            </a:extLst>
+          </p:cNvPr>
+          <p:cNvPicPr>
+            <a:picLocks noChangeAspect="1"/>
+          </p:cNvPicPr>
+          <p:nvPr/>
+        </p:nvPicPr>
+        <p:blipFill>
+          <a:blip r:embed="rId2"/>
+          <a:stretch>
+            <a:fillRect/>
+          </a:stretch>
+        </p:blipFill>
+        <p:spPr>
+          <a:xfrm>
+            <a:off x="1984375" y="1600200"/>
+            <a:ext cx="6856650" cy="4167188"/>
+          </a:xfrm>
+          <a:prstGeom prst="rect">
+            <a:avLst/>
+          </a:prstGeom>
+        </p:spPr>
+      </p:pic>
+    </p:spTree>
+    <p:extLst>
+      <p:ext uri="{BB962C8B-B14F-4D97-AF65-F5344CB8AC3E}">
+        <p14:creationId xmlns:p14="http://schemas.microsoft.com/office/powerpoint/2010/main" val="1100440059"/>
+      </p:ext>
+    </p:extLst>
+  </p:cSld>
+  <p:clrMapOvr>
+    <a:masterClrMapping/>
+  </p:clrMapOvr>
+  <p:transition spd="slow">
+    <p:wipe dir="r"/>
+  </p:transition>
+</p:sld>
+</file>
+
+<file path=ppt/slides/slide3.xml><?xml version="1.0" encoding="utf-8"?>
+<p:sld xmlns:a="http://schemas.openxmlformats.org/drawingml/2006/main" xmlns:r="http://schemas.openxmlformats.org/officeDocument/2006/relationships" xmlns:p="http://schemas.openxmlformats.org/presentationml/2006/main">
+  <p:cSld>
+    <p:spTree>
+      <p:nvGrpSpPr>
+        <p:cNvPr id="1" name=""/>
+        <p:cNvGrpSpPr/>
+        <p:nvPr/>
+      </p:nvGrpSpPr>
+      <p:grpSpPr>
+        <a:xfrm>
+          <a:off x="0" y="0"/>
+          <a:ext cx="0" cy="0"/>
+          <a:chOff x="0" y="0"/>
+          <a:chExt cx="0" cy="0"/>
+        </a:xfrm>
+      </p:grpSpPr>
+      <p:sp>
+        <p:nvSpPr>
           <p:cNvPr id="6" name="Tijdelijke aanduiding voor tekst 5"/>
           <p:cNvSpPr>
             <a:spLocks noGrp="1"/>
@@ -24062,22 +24839,31 @@
             <p:ph type="title"/>
           </p:nvPr>
         </p:nvSpPr>
-        <p:spPr/>
+        <p:spPr>
+          <a:xfrm>
+            <a:off x="917575" y="990600"/>
+            <a:ext cx="10798224" cy="1718320"/>
+          </a:xfrm>
+        </p:spPr>
         <p:txBody>
           <a:bodyPr/>
           <a:lstStyle/>
           <a:p>
             <a:r>
+              <a:rPr lang="nl-NL" dirty="0" err="1"/>
+              <a:t>Qu’est-ce</a:t>
+            </a:r>
+            <a:r>
               <a:rPr lang="nl-NL" dirty="0"/>
-              <a:t>Merci de </a:t>
+              <a:t> que les </a:t>
             </a:r>
             <a:r>
               <a:rPr lang="nl-NL" dirty="0" err="1"/>
-              <a:t>votre</a:t>
+              <a:t>données</a:t>
             </a:r>
             <a:r>
               <a:rPr lang="nl-NL" dirty="0"/>
-              <a:t> attention !</a:t>
+              <a:t> Big Data ?</a:t>
             </a:r>
           </a:p>
         </p:txBody>
@@ -24100,7 +24886,7 @@
             <a:fld id="{5EE7099E-8998-4851-915A-4F4831808297}" type="slidenum">
               <a:rPr lang="nl-NL" smtClean="0"/>
               <a:pPr/>
-              <a:t>29</a:t>
+              <a:t>3</a:t>
             </a:fld>
             <a:endParaRPr lang="nl-NL"/>
           </a:p>
@@ -24145,29 +24931,29 @@
           <a:p>
             <a:pPr lvl="0"/>
             <a:r>
-              <a:rPr lang="en-GB" noProof="0" dirty="0"/>
-              <a:t>CY Tech – Charles-</a:t>
-            </a:r>
-            <a:r>
-              <a:rPr lang="en-GB" noProof="0" dirty="0" err="1"/>
-              <a:t>Meldhine</a:t>
-            </a:r>
-            <a:r>
-              <a:rPr lang="en-GB" noProof="0" dirty="0"/>
-              <a:t> Madi </a:t>
-            </a:r>
-            <a:r>
-              <a:rPr lang="en-GB" noProof="0" dirty="0" err="1"/>
-              <a:t>Mnemoi</a:t>
-            </a:r>
-            <a:endParaRPr lang="en-GB" noProof="0" dirty="0"/>
+              <a:rPr lang="en-GB" dirty="0"/>
+              <a:t>CY Tech – Charles-Meldhine Madi Mnemoi, </a:t>
+            </a:r>
+            <a:r>
+              <a:rPr lang="en-GB" dirty="0" err="1"/>
+              <a:t>Brahim</a:t>
+            </a:r>
+            <a:r>
+              <a:rPr lang="en-GB" dirty="0"/>
+              <a:t> </a:t>
+            </a:r>
+            <a:r>
+              <a:rPr lang="en-GB" dirty="0" err="1"/>
+              <a:t>Kerdad</a:t>
+            </a:r>
+            <a:endParaRPr lang="en-GB" dirty="0"/>
           </a:p>
         </p:txBody>
       </p:sp>
     </p:spTree>
     <p:extLst>
       <p:ext uri="{BB962C8B-B14F-4D97-AF65-F5344CB8AC3E}">
-        <p14:creationId xmlns:p14="http://schemas.microsoft.com/office/powerpoint/2010/main" val="2746029914"/>
+        <p14:creationId xmlns:p14="http://schemas.microsoft.com/office/powerpoint/2010/main" val="4150905695"/>
       </p:ext>
     </p:extLst>
   </p:cSld>
@@ -24319,7 +25105,3549 @@
 </p:sld>
 </file>
 
-<file path=ppt/slides/slide3.xml><?xml version="1.0" encoding="utf-8"?>
+<file path=ppt/slides/slide30.xml><?xml version="1.0" encoding="utf-8"?>
+<p:sld xmlns:a="http://schemas.openxmlformats.org/drawingml/2006/main" xmlns:r="http://schemas.openxmlformats.org/officeDocument/2006/relationships" xmlns:p="http://schemas.openxmlformats.org/presentationml/2006/main">
+  <p:cSld>
+    <p:spTree>
+      <p:nvGrpSpPr>
+        <p:cNvPr id="1" name=""/>
+        <p:cNvGrpSpPr/>
+        <p:nvPr/>
+      </p:nvGrpSpPr>
+      <p:grpSpPr>
+        <a:xfrm>
+          <a:off x="0" y="0"/>
+          <a:ext cx="0" cy="0"/>
+          <a:chOff x="0" y="0"/>
+          <a:chExt cx="0" cy="0"/>
+        </a:xfrm>
+      </p:grpSpPr>
+      <p:sp>
+        <p:nvSpPr>
+          <p:cNvPr id="2" name="Title 1">
+            <a:extLst>
+              <a:ext uri="{FF2B5EF4-FFF2-40B4-BE49-F238E27FC236}">
+                <a16:creationId xmlns:a16="http://schemas.microsoft.com/office/drawing/2014/main" id="{04C5DF06-5F42-4296-B27B-4F79E0DB836B}"/>
+              </a:ext>
+            </a:extLst>
+          </p:cNvPr>
+          <p:cNvSpPr>
+            <a:spLocks noGrp="1"/>
+          </p:cNvSpPr>
+          <p:nvPr>
+            <p:ph type="title"/>
+          </p:nvPr>
+        </p:nvSpPr>
+        <p:spPr/>
+        <p:txBody>
+          <a:bodyPr/>
+          <a:lstStyle/>
+          <a:p>
+            <a:r>
+              <a:rPr lang="en-US" sz="3600" dirty="0" err="1"/>
+              <a:t>Exercices</a:t>
+            </a:r>
+            <a:r>
+              <a:rPr lang="en-US" sz="3600" dirty="0"/>
+              <a:t> sur le jeu de </a:t>
+            </a:r>
+            <a:r>
+              <a:rPr lang="en-US" sz="3600" dirty="0" err="1"/>
+              <a:t>données</a:t>
+            </a:r>
+            <a:r>
+              <a:rPr lang="en-US" sz="3600" dirty="0"/>
+              <a:t> Titanic</a:t>
+            </a:r>
+          </a:p>
+        </p:txBody>
+      </p:sp>
+      <p:sp>
+        <p:nvSpPr>
+          <p:cNvPr id="5" name="Slide Number Placeholder 4">
+            <a:extLst>
+              <a:ext uri="{FF2B5EF4-FFF2-40B4-BE49-F238E27FC236}">
+                <a16:creationId xmlns:a16="http://schemas.microsoft.com/office/drawing/2014/main" id="{B756D4B6-3814-4E02-AB98-08D3B49675BF}"/>
+              </a:ext>
+            </a:extLst>
+          </p:cNvPr>
+          <p:cNvSpPr>
+            <a:spLocks noGrp="1"/>
+          </p:cNvSpPr>
+          <p:nvPr>
+            <p:ph type="sldNum" sz="quarter" idx="4"/>
+          </p:nvPr>
+        </p:nvSpPr>
+        <p:spPr/>
+        <p:txBody>
+          <a:bodyPr/>
+          <a:lstStyle/>
+          <a:p>
+            <a:fld id="{5EE7099E-8998-4851-915A-4F4831808297}" type="slidenum">
+              <a:rPr lang="nl-NL" smtClean="0"/>
+              <a:pPr/>
+              <a:t>30</a:t>
+            </a:fld>
+            <a:endParaRPr lang="nl-NL"/>
+          </a:p>
+        </p:txBody>
+      </p:sp>
+      <p:sp>
+        <p:nvSpPr>
+          <p:cNvPr id="3" name="ZoneTexte 2">
+            <a:extLst>
+              <a:ext uri="{FF2B5EF4-FFF2-40B4-BE49-F238E27FC236}">
+                <a16:creationId xmlns:a16="http://schemas.microsoft.com/office/drawing/2014/main" id="{0C248AA7-6FCB-3F89-E3DD-C837A2826405}"/>
+              </a:ext>
+            </a:extLst>
+          </p:cNvPr>
+          <p:cNvSpPr txBox="1"/>
+          <p:nvPr/>
+        </p:nvSpPr>
+        <p:spPr>
+          <a:xfrm>
+            <a:off x="3692106" y="1699404"/>
+            <a:ext cx="0" cy="0"/>
+          </a:xfrm>
+          <a:prstGeom prst="rect">
+            <a:avLst/>
+          </a:prstGeom>
+          <a:noFill/>
+        </p:spPr>
+        <p:txBody>
+          <a:bodyPr wrap="none" lIns="108000" tIns="108000" rIns="108000" bIns="108000" rtlCol="0">
+            <a:noAutofit/>
+          </a:bodyPr>
+          <a:lstStyle/>
+          <a:p>
+            <a:endParaRPr lang="fr-FR" noProof="0" dirty="0" err="1">
+              <a:solidFill>
+                <a:schemeClr val="bg2"/>
+              </a:solidFill>
+            </a:endParaRPr>
+          </a:p>
+        </p:txBody>
+      </p:sp>
+      <p:sp>
+        <p:nvSpPr>
+          <p:cNvPr id="6" name="Vertical Text Placeholder 5">
+            <a:extLst>
+              <a:ext uri="{FF2B5EF4-FFF2-40B4-BE49-F238E27FC236}">
+                <a16:creationId xmlns:a16="http://schemas.microsoft.com/office/drawing/2014/main" id="{F8170739-5212-AEC7-557E-2E086A29A496}"/>
+              </a:ext>
+            </a:extLst>
+          </p:cNvPr>
+          <p:cNvSpPr>
+            <a:spLocks noGrp="1"/>
+          </p:cNvSpPr>
+          <p:nvPr>
+            <p:ph type="body" orient="vert" idx="1"/>
+          </p:nvPr>
+        </p:nvSpPr>
+        <p:spPr>
+          <a:xfrm>
+            <a:off x="404662" y="1143000"/>
+            <a:ext cx="11389023" cy="4795836"/>
+          </a:xfrm>
+        </p:spPr>
+        <p:txBody>
+          <a:bodyPr/>
+          <a:lstStyle/>
+          <a:p>
+            <a:endParaRPr lang="en-US" dirty="0"/>
+          </a:p>
+          <a:p>
+            <a:endParaRPr lang="en-US" dirty="0"/>
+          </a:p>
+          <a:p>
+            <a:pPr marL="180975" lvl="1" indent="0">
+              <a:buNone/>
+            </a:pPr>
+            <a:endParaRPr lang="en-US" dirty="0"/>
+          </a:p>
+          <a:p>
+            <a:pPr lvl="1"/>
+            <a:endParaRPr lang="en-US" dirty="0"/>
+          </a:p>
+          <a:p>
+            <a:endParaRPr lang="en-US" dirty="0"/>
+          </a:p>
+          <a:p>
+            <a:endParaRPr lang="en-US" dirty="0"/>
+          </a:p>
+          <a:p>
+            <a:endParaRPr lang="en-US" dirty="0"/>
+          </a:p>
+          <a:p>
+            <a:endParaRPr lang="en-US" dirty="0"/>
+          </a:p>
+          <a:p>
+            <a:pPr lvl="1"/>
+            <a:endParaRPr lang="en-US" dirty="0"/>
+          </a:p>
+          <a:p>
+            <a:pPr lvl="1"/>
+            <a:endParaRPr lang="en-US" dirty="0"/>
+          </a:p>
+          <a:p>
+            <a:pPr lvl="1"/>
+            <a:endParaRPr lang="en-US" dirty="0"/>
+          </a:p>
+          <a:p>
+            <a:pPr lvl="1"/>
+            <a:endParaRPr lang="en-US" dirty="0"/>
+          </a:p>
+          <a:p>
+            <a:endParaRPr lang="en-US" b="1" dirty="0"/>
+          </a:p>
+          <a:p>
+            <a:endParaRPr lang="en-US" dirty="0"/>
+          </a:p>
+        </p:txBody>
+      </p:sp>
+      <p:sp>
+        <p:nvSpPr>
+          <p:cNvPr id="4" name="Vertical Text Placeholder 5">
+            <a:extLst>
+              <a:ext uri="{FF2B5EF4-FFF2-40B4-BE49-F238E27FC236}">
+                <a16:creationId xmlns:a16="http://schemas.microsoft.com/office/drawing/2014/main" id="{A57D01D8-1D67-D654-0CFB-28A877FD85B9}"/>
+              </a:ext>
+            </a:extLst>
+          </p:cNvPr>
+          <p:cNvSpPr txBox="1">
+            <a:spLocks/>
+          </p:cNvSpPr>
+          <p:nvPr/>
+        </p:nvSpPr>
+        <p:spPr>
+          <a:xfrm>
+            <a:off x="557062" y="1295400"/>
+            <a:ext cx="11389023" cy="4795836"/>
+          </a:xfrm>
+          <a:prstGeom prst="rect">
+            <a:avLst/>
+          </a:prstGeom>
+        </p:spPr>
+        <p:txBody>
+          <a:bodyPr vert="horz" lIns="0" tIns="0" rIns="0" bIns="0" rtlCol="0">
+            <a:normAutofit/>
+          </a:bodyPr>
+          <a:lstStyle>
+            <a:lvl1pPr marL="180975" indent="-180975" algn="l" defTabSz="914400" rtl="0" eaLnBrk="1" latinLnBrk="0" hangingPunct="1">
+              <a:lnSpc>
+                <a:spcPct val="90000"/>
+              </a:lnSpc>
+              <a:spcBef>
+                <a:spcPts val="600"/>
+              </a:spcBef>
+              <a:spcAft>
+                <a:spcPts val="600"/>
+              </a:spcAft>
+              <a:buClr>
+                <a:schemeClr val="bg2"/>
+              </a:buClr>
+              <a:buFont typeface="Arial" panose="020B0604020202020204" pitchFamily="34" charset="0"/>
+              <a:buChar char="•"/>
+              <a:defRPr sz="1800" kern="1200">
+                <a:solidFill>
+                  <a:schemeClr val="bg2"/>
+                </a:solidFill>
+                <a:latin typeface="+mn-lt"/>
+                <a:ea typeface="+mn-ea"/>
+                <a:cs typeface="+mn-cs"/>
+              </a:defRPr>
+            </a:lvl1pPr>
+            <a:lvl2pPr marL="361950" indent="-180975" algn="l" defTabSz="914400" rtl="0" eaLnBrk="1" latinLnBrk="0" hangingPunct="1">
+              <a:lnSpc>
+                <a:spcPct val="90000"/>
+              </a:lnSpc>
+              <a:spcBef>
+                <a:spcPts val="600"/>
+              </a:spcBef>
+              <a:spcAft>
+                <a:spcPts val="600"/>
+              </a:spcAft>
+              <a:buClr>
+                <a:schemeClr val="bg2"/>
+              </a:buClr>
+              <a:buFont typeface="Arial" panose="020B0604020202020204" pitchFamily="34" charset="0"/>
+              <a:buChar char="-"/>
+              <a:defRPr sz="1600" kern="1200">
+                <a:solidFill>
+                  <a:schemeClr val="bg2"/>
+                </a:solidFill>
+                <a:latin typeface="+mn-lt"/>
+                <a:ea typeface="+mn-ea"/>
+                <a:cs typeface="+mn-cs"/>
+              </a:defRPr>
+            </a:lvl2pPr>
+            <a:lvl3pPr marL="0" indent="0" algn="l" defTabSz="914400" rtl="0" eaLnBrk="1" latinLnBrk="0" hangingPunct="1">
+              <a:lnSpc>
+                <a:spcPct val="90000"/>
+              </a:lnSpc>
+              <a:spcBef>
+                <a:spcPts val="600"/>
+              </a:spcBef>
+              <a:spcAft>
+                <a:spcPts val="600"/>
+              </a:spcAft>
+              <a:buFont typeface="Arial" panose="020B0604020202020204" pitchFamily="34" charset="0"/>
+              <a:buNone/>
+              <a:defRPr sz="1800" kern="1200">
+                <a:solidFill>
+                  <a:schemeClr val="bg2"/>
+                </a:solidFill>
+                <a:latin typeface="+mn-lt"/>
+                <a:ea typeface="+mn-ea"/>
+                <a:cs typeface="+mn-cs"/>
+              </a:defRPr>
+            </a:lvl3pPr>
+            <a:lvl4pPr marL="0" indent="0" algn="l" defTabSz="914400" rtl="0" eaLnBrk="1" latinLnBrk="0" hangingPunct="1">
+              <a:lnSpc>
+                <a:spcPct val="90000"/>
+              </a:lnSpc>
+              <a:spcBef>
+                <a:spcPts val="600"/>
+              </a:spcBef>
+              <a:spcAft>
+                <a:spcPts val="600"/>
+              </a:spcAft>
+              <a:buFont typeface="Arial" panose="020B0604020202020204" pitchFamily="34" charset="0"/>
+              <a:buNone/>
+              <a:defRPr sz="1800" b="1" kern="1200">
+                <a:solidFill>
+                  <a:schemeClr val="bg2"/>
+                </a:solidFill>
+                <a:latin typeface="+mn-lt"/>
+                <a:ea typeface="+mn-ea"/>
+                <a:cs typeface="+mn-cs"/>
+              </a:defRPr>
+            </a:lvl4pPr>
+            <a:lvl5pPr marL="0" indent="0" algn="l" defTabSz="914400" rtl="0" eaLnBrk="1" latinLnBrk="0" hangingPunct="1">
+              <a:lnSpc>
+                <a:spcPct val="90000"/>
+              </a:lnSpc>
+              <a:spcBef>
+                <a:spcPts val="600"/>
+              </a:spcBef>
+              <a:spcAft>
+                <a:spcPts val="600"/>
+              </a:spcAft>
+              <a:buFont typeface="Arial" panose="020B0604020202020204" pitchFamily="34" charset="0"/>
+              <a:buNone/>
+              <a:defRPr sz="1800" b="1" kern="1200" baseline="0">
+                <a:solidFill>
+                  <a:schemeClr val="tx2"/>
+                </a:solidFill>
+                <a:latin typeface="+mn-lt"/>
+                <a:ea typeface="+mn-ea"/>
+                <a:cs typeface="+mn-cs"/>
+              </a:defRPr>
+            </a:lvl5pPr>
+            <a:lvl6pPr marL="180975" indent="-180975" algn="l" defTabSz="914400" rtl="0" eaLnBrk="1" latinLnBrk="0" hangingPunct="1">
+              <a:lnSpc>
+                <a:spcPct val="90000"/>
+              </a:lnSpc>
+              <a:spcBef>
+                <a:spcPts val="600"/>
+              </a:spcBef>
+              <a:spcAft>
+                <a:spcPts val="600"/>
+              </a:spcAft>
+              <a:buClr>
+                <a:schemeClr val="bg2"/>
+              </a:buClr>
+              <a:buFont typeface="Arial" panose="020B0604020202020204" pitchFamily="34" charset="0"/>
+              <a:buChar char="•"/>
+              <a:defRPr sz="1800" kern="1200">
+                <a:solidFill>
+                  <a:schemeClr val="bg2"/>
+                </a:solidFill>
+                <a:latin typeface="+mn-lt"/>
+                <a:ea typeface="+mn-ea"/>
+                <a:cs typeface="+mn-cs"/>
+              </a:defRPr>
+            </a:lvl6pPr>
+            <a:lvl7pPr marL="361950" indent="-180975" algn="l" defTabSz="914400" rtl="0" eaLnBrk="1" latinLnBrk="0" hangingPunct="1">
+              <a:lnSpc>
+                <a:spcPct val="90000"/>
+              </a:lnSpc>
+              <a:spcBef>
+                <a:spcPts val="600"/>
+              </a:spcBef>
+              <a:spcAft>
+                <a:spcPts val="600"/>
+              </a:spcAft>
+              <a:buClr>
+                <a:schemeClr val="bg2"/>
+              </a:buClr>
+              <a:buFont typeface="Arial" panose="020B0604020202020204" pitchFamily="34" charset="0"/>
+              <a:buChar char="-"/>
+              <a:defRPr sz="1600" kern="1200">
+                <a:solidFill>
+                  <a:schemeClr val="bg2"/>
+                </a:solidFill>
+                <a:latin typeface="+mn-lt"/>
+                <a:ea typeface="+mn-ea"/>
+                <a:cs typeface="+mn-cs"/>
+              </a:defRPr>
+            </a:lvl7pPr>
+            <a:lvl8pPr marL="0" indent="0" algn="l" defTabSz="914400" rtl="0" eaLnBrk="1" latinLnBrk="0" hangingPunct="1">
+              <a:lnSpc>
+                <a:spcPct val="90000"/>
+              </a:lnSpc>
+              <a:spcBef>
+                <a:spcPts val="600"/>
+              </a:spcBef>
+              <a:spcAft>
+                <a:spcPts val="600"/>
+              </a:spcAft>
+              <a:buFont typeface="Arial" panose="020B0604020202020204" pitchFamily="34" charset="0"/>
+              <a:buNone/>
+              <a:defRPr sz="1600" kern="1200">
+                <a:solidFill>
+                  <a:schemeClr val="bg2"/>
+                </a:solidFill>
+                <a:latin typeface="+mn-lt"/>
+                <a:ea typeface="+mn-ea"/>
+                <a:cs typeface="+mn-cs"/>
+              </a:defRPr>
+            </a:lvl8pPr>
+            <a:lvl9pPr marL="0" indent="0" algn="l" defTabSz="914400" rtl="0" eaLnBrk="1" latinLnBrk="0" hangingPunct="1">
+              <a:lnSpc>
+                <a:spcPct val="90000"/>
+              </a:lnSpc>
+              <a:spcBef>
+                <a:spcPts val="600"/>
+              </a:spcBef>
+              <a:spcAft>
+                <a:spcPts val="600"/>
+              </a:spcAft>
+              <a:buFont typeface="Arial" panose="020B0604020202020204" pitchFamily="34" charset="0"/>
+              <a:buNone/>
+              <a:defRPr sz="1800" b="1" kern="1200" baseline="0">
+                <a:solidFill>
+                  <a:schemeClr val="bg2"/>
+                </a:solidFill>
+                <a:latin typeface="+mn-lt"/>
+                <a:ea typeface="+mn-ea"/>
+                <a:cs typeface="+mn-cs"/>
+              </a:defRPr>
+            </a:lvl9pPr>
+          </a:lstStyle>
+          <a:p>
+            <a:endParaRPr lang="en-US" sz="2200" b="1" dirty="0"/>
+          </a:p>
+          <a:p>
+            <a:pPr marL="180975" lvl="1" indent="0">
+              <a:buNone/>
+            </a:pPr>
+            <a:endParaRPr lang="en-US" sz="2200" dirty="0"/>
+          </a:p>
+          <a:p>
+            <a:pPr lvl="1"/>
+            <a:endParaRPr lang="en-US" sz="2200" dirty="0"/>
+          </a:p>
+          <a:p>
+            <a:pPr marL="0" indent="0">
+              <a:buFont typeface="Arial" panose="020B0604020202020204" pitchFamily="34" charset="0"/>
+              <a:buNone/>
+            </a:pPr>
+            <a:endParaRPr lang="en-US" dirty="0"/>
+          </a:p>
+          <a:p>
+            <a:endParaRPr lang="en-US" dirty="0"/>
+          </a:p>
+          <a:p>
+            <a:pPr marL="180975" lvl="1" indent="0">
+              <a:buFont typeface="Arial" panose="020B0604020202020204" pitchFamily="34" charset="0"/>
+              <a:buNone/>
+            </a:pPr>
+            <a:endParaRPr lang="en-US" dirty="0"/>
+          </a:p>
+          <a:p>
+            <a:pPr lvl="1"/>
+            <a:endParaRPr lang="en-US" dirty="0"/>
+          </a:p>
+          <a:p>
+            <a:endParaRPr lang="en-US" dirty="0"/>
+          </a:p>
+          <a:p>
+            <a:endParaRPr lang="en-US" dirty="0"/>
+          </a:p>
+          <a:p>
+            <a:endParaRPr lang="en-US" dirty="0"/>
+          </a:p>
+          <a:p>
+            <a:endParaRPr lang="en-US" dirty="0"/>
+          </a:p>
+          <a:p>
+            <a:pPr lvl="1"/>
+            <a:endParaRPr lang="en-US" dirty="0"/>
+          </a:p>
+          <a:p>
+            <a:pPr lvl="1"/>
+            <a:endParaRPr lang="en-US" dirty="0"/>
+          </a:p>
+          <a:p>
+            <a:pPr lvl="1"/>
+            <a:endParaRPr lang="en-US" dirty="0"/>
+          </a:p>
+          <a:p>
+            <a:pPr lvl="1"/>
+            <a:endParaRPr lang="en-US" dirty="0"/>
+          </a:p>
+          <a:p>
+            <a:endParaRPr lang="en-US" b="1" dirty="0"/>
+          </a:p>
+          <a:p>
+            <a:endParaRPr lang="en-US" dirty="0"/>
+          </a:p>
+        </p:txBody>
+      </p:sp>
+      <p:sp>
+        <p:nvSpPr>
+          <p:cNvPr id="7" name="Vertical Text Placeholder 5">
+            <a:extLst>
+              <a:ext uri="{FF2B5EF4-FFF2-40B4-BE49-F238E27FC236}">
+                <a16:creationId xmlns:a16="http://schemas.microsoft.com/office/drawing/2014/main" id="{DFE0C10A-165E-4BE2-39D7-55B90C940362}"/>
+              </a:ext>
+            </a:extLst>
+          </p:cNvPr>
+          <p:cNvSpPr txBox="1">
+            <a:spLocks/>
+          </p:cNvSpPr>
+          <p:nvPr/>
+        </p:nvSpPr>
+        <p:spPr>
+          <a:xfrm>
+            <a:off x="436592" y="1199890"/>
+            <a:ext cx="11389023" cy="4795836"/>
+          </a:xfrm>
+          <a:prstGeom prst="rect">
+            <a:avLst/>
+          </a:prstGeom>
+        </p:spPr>
+        <p:txBody>
+          <a:bodyPr vert="horz" lIns="0" tIns="0" rIns="0" bIns="0" rtlCol="0">
+            <a:normAutofit/>
+          </a:bodyPr>
+          <a:lstStyle>
+            <a:lvl1pPr marL="180975" indent="-180975" algn="l" defTabSz="914400" rtl="0" eaLnBrk="1" latinLnBrk="0" hangingPunct="1">
+              <a:lnSpc>
+                <a:spcPct val="90000"/>
+              </a:lnSpc>
+              <a:spcBef>
+                <a:spcPts val="600"/>
+              </a:spcBef>
+              <a:spcAft>
+                <a:spcPts val="600"/>
+              </a:spcAft>
+              <a:buClr>
+                <a:schemeClr val="bg2"/>
+              </a:buClr>
+              <a:buFont typeface="Arial" panose="020B0604020202020204" pitchFamily="34" charset="0"/>
+              <a:buChar char="•"/>
+              <a:defRPr sz="1800" kern="1200">
+                <a:solidFill>
+                  <a:schemeClr val="bg2"/>
+                </a:solidFill>
+                <a:latin typeface="+mn-lt"/>
+                <a:ea typeface="+mn-ea"/>
+                <a:cs typeface="+mn-cs"/>
+              </a:defRPr>
+            </a:lvl1pPr>
+            <a:lvl2pPr marL="361950" indent="-180975" algn="l" defTabSz="914400" rtl="0" eaLnBrk="1" latinLnBrk="0" hangingPunct="1">
+              <a:lnSpc>
+                <a:spcPct val="90000"/>
+              </a:lnSpc>
+              <a:spcBef>
+                <a:spcPts val="600"/>
+              </a:spcBef>
+              <a:spcAft>
+                <a:spcPts val="600"/>
+              </a:spcAft>
+              <a:buClr>
+                <a:schemeClr val="bg2"/>
+              </a:buClr>
+              <a:buFont typeface="Arial" panose="020B0604020202020204" pitchFamily="34" charset="0"/>
+              <a:buChar char="-"/>
+              <a:defRPr sz="1600" kern="1200">
+                <a:solidFill>
+                  <a:schemeClr val="bg2"/>
+                </a:solidFill>
+                <a:latin typeface="+mn-lt"/>
+                <a:ea typeface="+mn-ea"/>
+                <a:cs typeface="+mn-cs"/>
+              </a:defRPr>
+            </a:lvl2pPr>
+            <a:lvl3pPr marL="0" indent="0" algn="l" defTabSz="914400" rtl="0" eaLnBrk="1" latinLnBrk="0" hangingPunct="1">
+              <a:lnSpc>
+                <a:spcPct val="90000"/>
+              </a:lnSpc>
+              <a:spcBef>
+                <a:spcPts val="600"/>
+              </a:spcBef>
+              <a:spcAft>
+                <a:spcPts val="600"/>
+              </a:spcAft>
+              <a:buFont typeface="Arial" panose="020B0604020202020204" pitchFamily="34" charset="0"/>
+              <a:buNone/>
+              <a:defRPr sz="1800" kern="1200">
+                <a:solidFill>
+                  <a:schemeClr val="bg2"/>
+                </a:solidFill>
+                <a:latin typeface="+mn-lt"/>
+                <a:ea typeface="+mn-ea"/>
+                <a:cs typeface="+mn-cs"/>
+              </a:defRPr>
+            </a:lvl3pPr>
+            <a:lvl4pPr marL="0" indent="0" algn="l" defTabSz="914400" rtl="0" eaLnBrk="1" latinLnBrk="0" hangingPunct="1">
+              <a:lnSpc>
+                <a:spcPct val="90000"/>
+              </a:lnSpc>
+              <a:spcBef>
+                <a:spcPts val="600"/>
+              </a:spcBef>
+              <a:spcAft>
+                <a:spcPts val="600"/>
+              </a:spcAft>
+              <a:buFont typeface="Arial" panose="020B0604020202020204" pitchFamily="34" charset="0"/>
+              <a:buNone/>
+              <a:defRPr sz="1800" b="1" kern="1200">
+                <a:solidFill>
+                  <a:schemeClr val="bg2"/>
+                </a:solidFill>
+                <a:latin typeface="+mn-lt"/>
+                <a:ea typeface="+mn-ea"/>
+                <a:cs typeface="+mn-cs"/>
+              </a:defRPr>
+            </a:lvl4pPr>
+            <a:lvl5pPr marL="0" indent="0" algn="l" defTabSz="914400" rtl="0" eaLnBrk="1" latinLnBrk="0" hangingPunct="1">
+              <a:lnSpc>
+                <a:spcPct val="90000"/>
+              </a:lnSpc>
+              <a:spcBef>
+                <a:spcPts val="600"/>
+              </a:spcBef>
+              <a:spcAft>
+                <a:spcPts val="600"/>
+              </a:spcAft>
+              <a:buFont typeface="Arial" panose="020B0604020202020204" pitchFamily="34" charset="0"/>
+              <a:buNone/>
+              <a:defRPr sz="1800" b="1" kern="1200" baseline="0">
+                <a:solidFill>
+                  <a:schemeClr val="tx2"/>
+                </a:solidFill>
+                <a:latin typeface="+mn-lt"/>
+                <a:ea typeface="+mn-ea"/>
+                <a:cs typeface="+mn-cs"/>
+              </a:defRPr>
+            </a:lvl5pPr>
+            <a:lvl6pPr marL="180975" indent="-180975" algn="l" defTabSz="914400" rtl="0" eaLnBrk="1" latinLnBrk="0" hangingPunct="1">
+              <a:lnSpc>
+                <a:spcPct val="90000"/>
+              </a:lnSpc>
+              <a:spcBef>
+                <a:spcPts val="600"/>
+              </a:spcBef>
+              <a:spcAft>
+                <a:spcPts val="600"/>
+              </a:spcAft>
+              <a:buClr>
+                <a:schemeClr val="bg2"/>
+              </a:buClr>
+              <a:buFont typeface="Arial" panose="020B0604020202020204" pitchFamily="34" charset="0"/>
+              <a:buChar char="•"/>
+              <a:defRPr sz="1800" kern="1200">
+                <a:solidFill>
+                  <a:schemeClr val="bg2"/>
+                </a:solidFill>
+                <a:latin typeface="+mn-lt"/>
+                <a:ea typeface="+mn-ea"/>
+                <a:cs typeface="+mn-cs"/>
+              </a:defRPr>
+            </a:lvl6pPr>
+            <a:lvl7pPr marL="361950" indent="-180975" algn="l" defTabSz="914400" rtl="0" eaLnBrk="1" latinLnBrk="0" hangingPunct="1">
+              <a:lnSpc>
+                <a:spcPct val="90000"/>
+              </a:lnSpc>
+              <a:spcBef>
+                <a:spcPts val="600"/>
+              </a:spcBef>
+              <a:spcAft>
+                <a:spcPts val="600"/>
+              </a:spcAft>
+              <a:buClr>
+                <a:schemeClr val="bg2"/>
+              </a:buClr>
+              <a:buFont typeface="Arial" panose="020B0604020202020204" pitchFamily="34" charset="0"/>
+              <a:buChar char="-"/>
+              <a:defRPr sz="1600" kern="1200">
+                <a:solidFill>
+                  <a:schemeClr val="bg2"/>
+                </a:solidFill>
+                <a:latin typeface="+mn-lt"/>
+                <a:ea typeface="+mn-ea"/>
+                <a:cs typeface="+mn-cs"/>
+              </a:defRPr>
+            </a:lvl7pPr>
+            <a:lvl8pPr marL="0" indent="0" algn="l" defTabSz="914400" rtl="0" eaLnBrk="1" latinLnBrk="0" hangingPunct="1">
+              <a:lnSpc>
+                <a:spcPct val="90000"/>
+              </a:lnSpc>
+              <a:spcBef>
+                <a:spcPts val="600"/>
+              </a:spcBef>
+              <a:spcAft>
+                <a:spcPts val="600"/>
+              </a:spcAft>
+              <a:buFont typeface="Arial" panose="020B0604020202020204" pitchFamily="34" charset="0"/>
+              <a:buNone/>
+              <a:defRPr sz="1600" kern="1200">
+                <a:solidFill>
+                  <a:schemeClr val="bg2"/>
+                </a:solidFill>
+                <a:latin typeface="+mn-lt"/>
+                <a:ea typeface="+mn-ea"/>
+                <a:cs typeface="+mn-cs"/>
+              </a:defRPr>
+            </a:lvl8pPr>
+            <a:lvl9pPr marL="0" indent="0" algn="l" defTabSz="914400" rtl="0" eaLnBrk="1" latinLnBrk="0" hangingPunct="1">
+              <a:lnSpc>
+                <a:spcPct val="90000"/>
+              </a:lnSpc>
+              <a:spcBef>
+                <a:spcPts val="600"/>
+              </a:spcBef>
+              <a:spcAft>
+                <a:spcPts val="600"/>
+              </a:spcAft>
+              <a:buFont typeface="Arial" panose="020B0604020202020204" pitchFamily="34" charset="0"/>
+              <a:buNone/>
+              <a:defRPr sz="1800" b="1" kern="1200" baseline="0">
+                <a:solidFill>
+                  <a:schemeClr val="bg2"/>
+                </a:solidFill>
+                <a:latin typeface="+mn-lt"/>
+                <a:ea typeface="+mn-ea"/>
+                <a:cs typeface="+mn-cs"/>
+              </a:defRPr>
+            </a:lvl9pPr>
+          </a:lstStyle>
+          <a:p>
+            <a:pPr marL="0" indent="0">
+              <a:buNone/>
+            </a:pPr>
+            <a:r>
+              <a:rPr lang="en-US" sz="2400" dirty="0" err="1"/>
+              <a:t>Quels</a:t>
+            </a:r>
+            <a:r>
+              <a:rPr lang="en-US" sz="2400" dirty="0"/>
+              <a:t> </a:t>
+            </a:r>
+            <a:r>
+              <a:rPr lang="en-US" sz="2400" dirty="0" err="1"/>
+              <a:t>sont</a:t>
+            </a:r>
+            <a:r>
+              <a:rPr lang="en-US" sz="2400" dirty="0"/>
+              <a:t> les 5 </a:t>
+            </a:r>
+            <a:r>
+              <a:rPr lang="en-US" sz="2400" dirty="0" err="1"/>
+              <a:t>passagers</a:t>
+            </a:r>
+            <a:r>
+              <a:rPr lang="en-US" sz="2400" dirty="0"/>
+              <a:t> qui </a:t>
+            </a:r>
+            <a:r>
+              <a:rPr lang="en-US" sz="2400" dirty="0" err="1"/>
+              <a:t>ont</a:t>
+            </a:r>
+            <a:r>
+              <a:rPr lang="en-US" sz="2400" dirty="0"/>
+              <a:t> </a:t>
+            </a:r>
+            <a:r>
+              <a:rPr lang="en-US" sz="2400" dirty="0" err="1"/>
+              <a:t>payé</a:t>
+            </a:r>
+            <a:r>
+              <a:rPr lang="en-US" sz="2400" dirty="0"/>
+              <a:t> le </a:t>
+            </a:r>
+            <a:r>
+              <a:rPr lang="en-US" sz="2400" dirty="0" err="1"/>
+              <a:t>moins</a:t>
+            </a:r>
+            <a:r>
+              <a:rPr lang="en-US" sz="2400" dirty="0"/>
+              <a:t> </a:t>
+            </a:r>
+            <a:r>
+              <a:rPr lang="en-US" sz="2400" dirty="0" err="1"/>
+              <a:t>cher</a:t>
+            </a:r>
+            <a:r>
+              <a:rPr lang="en-US" sz="2400" dirty="0"/>
+              <a:t> </a:t>
+            </a:r>
+            <a:r>
+              <a:rPr lang="en-US" sz="2400" dirty="0" err="1"/>
+              <a:t>leur</a:t>
+            </a:r>
+            <a:r>
+              <a:rPr lang="en-US" sz="2400" dirty="0"/>
+              <a:t> ticket ?</a:t>
+            </a:r>
+            <a:endParaRPr lang="en-US" sz="2200" dirty="0"/>
+          </a:p>
+          <a:p>
+            <a:pPr lvl="1"/>
+            <a:endParaRPr lang="en-US" sz="2200" dirty="0"/>
+          </a:p>
+          <a:p>
+            <a:pPr marL="0" indent="0">
+              <a:buFont typeface="Arial" panose="020B0604020202020204" pitchFamily="34" charset="0"/>
+              <a:buNone/>
+            </a:pPr>
+            <a:endParaRPr lang="en-US" dirty="0"/>
+          </a:p>
+          <a:p>
+            <a:endParaRPr lang="en-US" dirty="0"/>
+          </a:p>
+          <a:p>
+            <a:pPr marL="180975" lvl="1" indent="0">
+              <a:buFont typeface="Arial" panose="020B0604020202020204" pitchFamily="34" charset="0"/>
+              <a:buNone/>
+            </a:pPr>
+            <a:endParaRPr lang="en-US" dirty="0"/>
+          </a:p>
+          <a:p>
+            <a:pPr lvl="1"/>
+            <a:endParaRPr lang="en-US" dirty="0"/>
+          </a:p>
+          <a:p>
+            <a:endParaRPr lang="en-US" dirty="0"/>
+          </a:p>
+          <a:p>
+            <a:endParaRPr lang="en-US" dirty="0"/>
+          </a:p>
+          <a:p>
+            <a:endParaRPr lang="en-US" dirty="0"/>
+          </a:p>
+          <a:p>
+            <a:endParaRPr lang="en-US" dirty="0"/>
+          </a:p>
+          <a:p>
+            <a:pPr lvl="1"/>
+            <a:endParaRPr lang="en-US" dirty="0"/>
+          </a:p>
+          <a:p>
+            <a:pPr lvl="1"/>
+            <a:endParaRPr lang="en-US" dirty="0"/>
+          </a:p>
+          <a:p>
+            <a:pPr lvl="1"/>
+            <a:endParaRPr lang="en-US" dirty="0"/>
+          </a:p>
+          <a:p>
+            <a:pPr lvl="1"/>
+            <a:endParaRPr lang="en-US" dirty="0"/>
+          </a:p>
+          <a:p>
+            <a:endParaRPr lang="en-US" b="1" dirty="0"/>
+          </a:p>
+          <a:p>
+            <a:endParaRPr lang="en-US" dirty="0"/>
+          </a:p>
+        </p:txBody>
+      </p:sp>
+    </p:spTree>
+    <p:extLst>
+      <p:ext uri="{BB962C8B-B14F-4D97-AF65-F5344CB8AC3E}">
+        <p14:creationId xmlns:p14="http://schemas.microsoft.com/office/powerpoint/2010/main" val="4029507761"/>
+      </p:ext>
+    </p:extLst>
+  </p:cSld>
+  <p:clrMapOvr>
+    <a:masterClrMapping/>
+  </p:clrMapOvr>
+  <p:transition spd="slow">
+    <p:wipe dir="r"/>
+  </p:transition>
+</p:sld>
+</file>
+
+<file path=ppt/slides/slide31.xml><?xml version="1.0" encoding="utf-8"?>
+<p:sld xmlns:a="http://schemas.openxmlformats.org/drawingml/2006/main" xmlns:r="http://schemas.openxmlformats.org/officeDocument/2006/relationships" xmlns:p="http://schemas.openxmlformats.org/presentationml/2006/main">
+  <p:cSld>
+    <p:spTree>
+      <p:nvGrpSpPr>
+        <p:cNvPr id="1" name=""/>
+        <p:cNvGrpSpPr/>
+        <p:nvPr/>
+      </p:nvGrpSpPr>
+      <p:grpSpPr>
+        <a:xfrm>
+          <a:off x="0" y="0"/>
+          <a:ext cx="0" cy="0"/>
+          <a:chOff x="0" y="0"/>
+          <a:chExt cx="0" cy="0"/>
+        </a:xfrm>
+      </p:grpSpPr>
+      <p:sp>
+        <p:nvSpPr>
+          <p:cNvPr id="2" name="Title 1">
+            <a:extLst>
+              <a:ext uri="{FF2B5EF4-FFF2-40B4-BE49-F238E27FC236}">
+                <a16:creationId xmlns:a16="http://schemas.microsoft.com/office/drawing/2014/main" id="{04C5DF06-5F42-4296-B27B-4F79E0DB836B}"/>
+              </a:ext>
+            </a:extLst>
+          </p:cNvPr>
+          <p:cNvSpPr>
+            <a:spLocks noGrp="1"/>
+          </p:cNvSpPr>
+          <p:nvPr>
+            <p:ph type="title"/>
+          </p:nvPr>
+        </p:nvSpPr>
+        <p:spPr/>
+        <p:txBody>
+          <a:bodyPr/>
+          <a:lstStyle/>
+          <a:p>
+            <a:r>
+              <a:rPr lang="en-US" sz="3600" dirty="0" err="1"/>
+              <a:t>Exercices</a:t>
+            </a:r>
+            <a:r>
+              <a:rPr lang="en-US" sz="3600" dirty="0"/>
+              <a:t> sur le jeu de </a:t>
+            </a:r>
+            <a:r>
+              <a:rPr lang="en-US" sz="3600" dirty="0" err="1"/>
+              <a:t>données</a:t>
+            </a:r>
+            <a:r>
+              <a:rPr lang="en-US" sz="3600" dirty="0"/>
+              <a:t> Titanic</a:t>
+            </a:r>
+          </a:p>
+        </p:txBody>
+      </p:sp>
+      <p:sp>
+        <p:nvSpPr>
+          <p:cNvPr id="5" name="Slide Number Placeholder 4">
+            <a:extLst>
+              <a:ext uri="{FF2B5EF4-FFF2-40B4-BE49-F238E27FC236}">
+                <a16:creationId xmlns:a16="http://schemas.microsoft.com/office/drawing/2014/main" id="{B756D4B6-3814-4E02-AB98-08D3B49675BF}"/>
+              </a:ext>
+            </a:extLst>
+          </p:cNvPr>
+          <p:cNvSpPr>
+            <a:spLocks noGrp="1"/>
+          </p:cNvSpPr>
+          <p:nvPr>
+            <p:ph type="sldNum" sz="quarter" idx="4"/>
+          </p:nvPr>
+        </p:nvSpPr>
+        <p:spPr/>
+        <p:txBody>
+          <a:bodyPr/>
+          <a:lstStyle/>
+          <a:p>
+            <a:fld id="{5EE7099E-8998-4851-915A-4F4831808297}" type="slidenum">
+              <a:rPr lang="nl-NL" smtClean="0"/>
+              <a:pPr/>
+              <a:t>31</a:t>
+            </a:fld>
+            <a:endParaRPr lang="nl-NL"/>
+          </a:p>
+        </p:txBody>
+      </p:sp>
+      <p:sp>
+        <p:nvSpPr>
+          <p:cNvPr id="3" name="ZoneTexte 2">
+            <a:extLst>
+              <a:ext uri="{FF2B5EF4-FFF2-40B4-BE49-F238E27FC236}">
+                <a16:creationId xmlns:a16="http://schemas.microsoft.com/office/drawing/2014/main" id="{0C248AA7-6FCB-3F89-E3DD-C837A2826405}"/>
+              </a:ext>
+            </a:extLst>
+          </p:cNvPr>
+          <p:cNvSpPr txBox="1"/>
+          <p:nvPr/>
+        </p:nvSpPr>
+        <p:spPr>
+          <a:xfrm>
+            <a:off x="3692106" y="1699404"/>
+            <a:ext cx="0" cy="0"/>
+          </a:xfrm>
+          <a:prstGeom prst="rect">
+            <a:avLst/>
+          </a:prstGeom>
+          <a:noFill/>
+        </p:spPr>
+        <p:txBody>
+          <a:bodyPr wrap="none" lIns="108000" tIns="108000" rIns="108000" bIns="108000" rtlCol="0">
+            <a:noAutofit/>
+          </a:bodyPr>
+          <a:lstStyle/>
+          <a:p>
+            <a:endParaRPr lang="fr-FR" noProof="0" dirty="0" err="1">
+              <a:solidFill>
+                <a:schemeClr val="bg2"/>
+              </a:solidFill>
+            </a:endParaRPr>
+          </a:p>
+        </p:txBody>
+      </p:sp>
+      <p:sp>
+        <p:nvSpPr>
+          <p:cNvPr id="6" name="Vertical Text Placeholder 5">
+            <a:extLst>
+              <a:ext uri="{FF2B5EF4-FFF2-40B4-BE49-F238E27FC236}">
+                <a16:creationId xmlns:a16="http://schemas.microsoft.com/office/drawing/2014/main" id="{F8170739-5212-AEC7-557E-2E086A29A496}"/>
+              </a:ext>
+            </a:extLst>
+          </p:cNvPr>
+          <p:cNvSpPr>
+            <a:spLocks noGrp="1"/>
+          </p:cNvSpPr>
+          <p:nvPr>
+            <p:ph type="body" orient="vert" idx="1"/>
+          </p:nvPr>
+        </p:nvSpPr>
+        <p:spPr>
+          <a:xfrm>
+            <a:off x="404662" y="1143000"/>
+            <a:ext cx="11389023" cy="4795836"/>
+          </a:xfrm>
+        </p:spPr>
+        <p:txBody>
+          <a:bodyPr/>
+          <a:lstStyle/>
+          <a:p>
+            <a:endParaRPr lang="en-US" dirty="0"/>
+          </a:p>
+          <a:p>
+            <a:endParaRPr lang="en-US" dirty="0"/>
+          </a:p>
+          <a:p>
+            <a:pPr marL="180975" lvl="1" indent="0">
+              <a:buNone/>
+            </a:pPr>
+            <a:endParaRPr lang="en-US" dirty="0"/>
+          </a:p>
+          <a:p>
+            <a:pPr lvl="1"/>
+            <a:endParaRPr lang="en-US" dirty="0"/>
+          </a:p>
+          <a:p>
+            <a:endParaRPr lang="en-US" dirty="0"/>
+          </a:p>
+          <a:p>
+            <a:endParaRPr lang="en-US" dirty="0"/>
+          </a:p>
+          <a:p>
+            <a:endParaRPr lang="en-US" dirty="0"/>
+          </a:p>
+          <a:p>
+            <a:endParaRPr lang="en-US" dirty="0"/>
+          </a:p>
+          <a:p>
+            <a:pPr lvl="1"/>
+            <a:endParaRPr lang="en-US" dirty="0"/>
+          </a:p>
+          <a:p>
+            <a:pPr lvl="1"/>
+            <a:endParaRPr lang="en-US" dirty="0"/>
+          </a:p>
+          <a:p>
+            <a:pPr lvl="1"/>
+            <a:endParaRPr lang="en-US" dirty="0"/>
+          </a:p>
+          <a:p>
+            <a:pPr lvl="1"/>
+            <a:endParaRPr lang="en-US" dirty="0"/>
+          </a:p>
+          <a:p>
+            <a:endParaRPr lang="en-US" b="1" dirty="0"/>
+          </a:p>
+          <a:p>
+            <a:endParaRPr lang="en-US" dirty="0"/>
+          </a:p>
+        </p:txBody>
+      </p:sp>
+      <p:sp>
+        <p:nvSpPr>
+          <p:cNvPr id="4" name="Vertical Text Placeholder 5">
+            <a:extLst>
+              <a:ext uri="{FF2B5EF4-FFF2-40B4-BE49-F238E27FC236}">
+                <a16:creationId xmlns:a16="http://schemas.microsoft.com/office/drawing/2014/main" id="{A57D01D8-1D67-D654-0CFB-28A877FD85B9}"/>
+              </a:ext>
+            </a:extLst>
+          </p:cNvPr>
+          <p:cNvSpPr txBox="1">
+            <a:spLocks/>
+          </p:cNvSpPr>
+          <p:nvPr/>
+        </p:nvSpPr>
+        <p:spPr>
+          <a:xfrm>
+            <a:off x="557062" y="1295400"/>
+            <a:ext cx="11389023" cy="4795836"/>
+          </a:xfrm>
+          <a:prstGeom prst="rect">
+            <a:avLst/>
+          </a:prstGeom>
+        </p:spPr>
+        <p:txBody>
+          <a:bodyPr vert="horz" lIns="0" tIns="0" rIns="0" bIns="0" rtlCol="0">
+            <a:normAutofit/>
+          </a:bodyPr>
+          <a:lstStyle>
+            <a:lvl1pPr marL="180975" indent="-180975" algn="l" defTabSz="914400" rtl="0" eaLnBrk="1" latinLnBrk="0" hangingPunct="1">
+              <a:lnSpc>
+                <a:spcPct val="90000"/>
+              </a:lnSpc>
+              <a:spcBef>
+                <a:spcPts val="600"/>
+              </a:spcBef>
+              <a:spcAft>
+                <a:spcPts val="600"/>
+              </a:spcAft>
+              <a:buClr>
+                <a:schemeClr val="bg2"/>
+              </a:buClr>
+              <a:buFont typeface="Arial" panose="020B0604020202020204" pitchFamily="34" charset="0"/>
+              <a:buChar char="•"/>
+              <a:defRPr sz="1800" kern="1200">
+                <a:solidFill>
+                  <a:schemeClr val="bg2"/>
+                </a:solidFill>
+                <a:latin typeface="+mn-lt"/>
+                <a:ea typeface="+mn-ea"/>
+                <a:cs typeface="+mn-cs"/>
+              </a:defRPr>
+            </a:lvl1pPr>
+            <a:lvl2pPr marL="361950" indent="-180975" algn="l" defTabSz="914400" rtl="0" eaLnBrk="1" latinLnBrk="0" hangingPunct="1">
+              <a:lnSpc>
+                <a:spcPct val="90000"/>
+              </a:lnSpc>
+              <a:spcBef>
+                <a:spcPts val="600"/>
+              </a:spcBef>
+              <a:spcAft>
+                <a:spcPts val="600"/>
+              </a:spcAft>
+              <a:buClr>
+                <a:schemeClr val="bg2"/>
+              </a:buClr>
+              <a:buFont typeface="Arial" panose="020B0604020202020204" pitchFamily="34" charset="0"/>
+              <a:buChar char="-"/>
+              <a:defRPr sz="1600" kern="1200">
+                <a:solidFill>
+                  <a:schemeClr val="bg2"/>
+                </a:solidFill>
+                <a:latin typeface="+mn-lt"/>
+                <a:ea typeface="+mn-ea"/>
+                <a:cs typeface="+mn-cs"/>
+              </a:defRPr>
+            </a:lvl2pPr>
+            <a:lvl3pPr marL="0" indent="0" algn="l" defTabSz="914400" rtl="0" eaLnBrk="1" latinLnBrk="0" hangingPunct="1">
+              <a:lnSpc>
+                <a:spcPct val="90000"/>
+              </a:lnSpc>
+              <a:spcBef>
+                <a:spcPts val="600"/>
+              </a:spcBef>
+              <a:spcAft>
+                <a:spcPts val="600"/>
+              </a:spcAft>
+              <a:buFont typeface="Arial" panose="020B0604020202020204" pitchFamily="34" charset="0"/>
+              <a:buNone/>
+              <a:defRPr sz="1800" kern="1200">
+                <a:solidFill>
+                  <a:schemeClr val="bg2"/>
+                </a:solidFill>
+                <a:latin typeface="+mn-lt"/>
+                <a:ea typeface="+mn-ea"/>
+                <a:cs typeface="+mn-cs"/>
+              </a:defRPr>
+            </a:lvl3pPr>
+            <a:lvl4pPr marL="0" indent="0" algn="l" defTabSz="914400" rtl="0" eaLnBrk="1" latinLnBrk="0" hangingPunct="1">
+              <a:lnSpc>
+                <a:spcPct val="90000"/>
+              </a:lnSpc>
+              <a:spcBef>
+                <a:spcPts val="600"/>
+              </a:spcBef>
+              <a:spcAft>
+                <a:spcPts val="600"/>
+              </a:spcAft>
+              <a:buFont typeface="Arial" panose="020B0604020202020204" pitchFamily="34" charset="0"/>
+              <a:buNone/>
+              <a:defRPr sz="1800" b="1" kern="1200">
+                <a:solidFill>
+                  <a:schemeClr val="bg2"/>
+                </a:solidFill>
+                <a:latin typeface="+mn-lt"/>
+                <a:ea typeface="+mn-ea"/>
+                <a:cs typeface="+mn-cs"/>
+              </a:defRPr>
+            </a:lvl4pPr>
+            <a:lvl5pPr marL="0" indent="0" algn="l" defTabSz="914400" rtl="0" eaLnBrk="1" latinLnBrk="0" hangingPunct="1">
+              <a:lnSpc>
+                <a:spcPct val="90000"/>
+              </a:lnSpc>
+              <a:spcBef>
+                <a:spcPts val="600"/>
+              </a:spcBef>
+              <a:spcAft>
+                <a:spcPts val="600"/>
+              </a:spcAft>
+              <a:buFont typeface="Arial" panose="020B0604020202020204" pitchFamily="34" charset="0"/>
+              <a:buNone/>
+              <a:defRPr sz="1800" b="1" kern="1200" baseline="0">
+                <a:solidFill>
+                  <a:schemeClr val="tx2"/>
+                </a:solidFill>
+                <a:latin typeface="+mn-lt"/>
+                <a:ea typeface="+mn-ea"/>
+                <a:cs typeface="+mn-cs"/>
+              </a:defRPr>
+            </a:lvl5pPr>
+            <a:lvl6pPr marL="180975" indent="-180975" algn="l" defTabSz="914400" rtl="0" eaLnBrk="1" latinLnBrk="0" hangingPunct="1">
+              <a:lnSpc>
+                <a:spcPct val="90000"/>
+              </a:lnSpc>
+              <a:spcBef>
+                <a:spcPts val="600"/>
+              </a:spcBef>
+              <a:spcAft>
+                <a:spcPts val="600"/>
+              </a:spcAft>
+              <a:buClr>
+                <a:schemeClr val="bg2"/>
+              </a:buClr>
+              <a:buFont typeface="Arial" panose="020B0604020202020204" pitchFamily="34" charset="0"/>
+              <a:buChar char="•"/>
+              <a:defRPr sz="1800" kern="1200">
+                <a:solidFill>
+                  <a:schemeClr val="bg2"/>
+                </a:solidFill>
+                <a:latin typeface="+mn-lt"/>
+                <a:ea typeface="+mn-ea"/>
+                <a:cs typeface="+mn-cs"/>
+              </a:defRPr>
+            </a:lvl6pPr>
+            <a:lvl7pPr marL="361950" indent="-180975" algn="l" defTabSz="914400" rtl="0" eaLnBrk="1" latinLnBrk="0" hangingPunct="1">
+              <a:lnSpc>
+                <a:spcPct val="90000"/>
+              </a:lnSpc>
+              <a:spcBef>
+                <a:spcPts val="600"/>
+              </a:spcBef>
+              <a:spcAft>
+                <a:spcPts val="600"/>
+              </a:spcAft>
+              <a:buClr>
+                <a:schemeClr val="bg2"/>
+              </a:buClr>
+              <a:buFont typeface="Arial" panose="020B0604020202020204" pitchFamily="34" charset="0"/>
+              <a:buChar char="-"/>
+              <a:defRPr sz="1600" kern="1200">
+                <a:solidFill>
+                  <a:schemeClr val="bg2"/>
+                </a:solidFill>
+                <a:latin typeface="+mn-lt"/>
+                <a:ea typeface="+mn-ea"/>
+                <a:cs typeface="+mn-cs"/>
+              </a:defRPr>
+            </a:lvl7pPr>
+            <a:lvl8pPr marL="0" indent="0" algn="l" defTabSz="914400" rtl="0" eaLnBrk="1" latinLnBrk="0" hangingPunct="1">
+              <a:lnSpc>
+                <a:spcPct val="90000"/>
+              </a:lnSpc>
+              <a:spcBef>
+                <a:spcPts val="600"/>
+              </a:spcBef>
+              <a:spcAft>
+                <a:spcPts val="600"/>
+              </a:spcAft>
+              <a:buFont typeface="Arial" panose="020B0604020202020204" pitchFamily="34" charset="0"/>
+              <a:buNone/>
+              <a:defRPr sz="1600" kern="1200">
+                <a:solidFill>
+                  <a:schemeClr val="bg2"/>
+                </a:solidFill>
+                <a:latin typeface="+mn-lt"/>
+                <a:ea typeface="+mn-ea"/>
+                <a:cs typeface="+mn-cs"/>
+              </a:defRPr>
+            </a:lvl8pPr>
+            <a:lvl9pPr marL="0" indent="0" algn="l" defTabSz="914400" rtl="0" eaLnBrk="1" latinLnBrk="0" hangingPunct="1">
+              <a:lnSpc>
+                <a:spcPct val="90000"/>
+              </a:lnSpc>
+              <a:spcBef>
+                <a:spcPts val="600"/>
+              </a:spcBef>
+              <a:spcAft>
+                <a:spcPts val="600"/>
+              </a:spcAft>
+              <a:buFont typeface="Arial" panose="020B0604020202020204" pitchFamily="34" charset="0"/>
+              <a:buNone/>
+              <a:defRPr sz="1800" b="1" kern="1200" baseline="0">
+                <a:solidFill>
+                  <a:schemeClr val="bg2"/>
+                </a:solidFill>
+                <a:latin typeface="+mn-lt"/>
+                <a:ea typeface="+mn-ea"/>
+                <a:cs typeface="+mn-cs"/>
+              </a:defRPr>
+            </a:lvl9pPr>
+          </a:lstStyle>
+          <a:p>
+            <a:endParaRPr lang="en-US" sz="2200" b="1" dirty="0"/>
+          </a:p>
+          <a:p>
+            <a:pPr marL="180975" lvl="1" indent="0">
+              <a:buNone/>
+            </a:pPr>
+            <a:endParaRPr lang="en-US" sz="2200" dirty="0"/>
+          </a:p>
+          <a:p>
+            <a:pPr lvl="1"/>
+            <a:endParaRPr lang="en-US" sz="2200" dirty="0"/>
+          </a:p>
+          <a:p>
+            <a:pPr marL="0" indent="0">
+              <a:buFont typeface="Arial" panose="020B0604020202020204" pitchFamily="34" charset="0"/>
+              <a:buNone/>
+            </a:pPr>
+            <a:endParaRPr lang="en-US" dirty="0"/>
+          </a:p>
+          <a:p>
+            <a:endParaRPr lang="en-US" dirty="0"/>
+          </a:p>
+          <a:p>
+            <a:pPr marL="180975" lvl="1" indent="0">
+              <a:buFont typeface="Arial" panose="020B0604020202020204" pitchFamily="34" charset="0"/>
+              <a:buNone/>
+            </a:pPr>
+            <a:endParaRPr lang="en-US" dirty="0"/>
+          </a:p>
+          <a:p>
+            <a:pPr lvl="1"/>
+            <a:endParaRPr lang="en-US" dirty="0"/>
+          </a:p>
+          <a:p>
+            <a:endParaRPr lang="en-US" dirty="0"/>
+          </a:p>
+          <a:p>
+            <a:endParaRPr lang="en-US" dirty="0"/>
+          </a:p>
+          <a:p>
+            <a:endParaRPr lang="en-US" dirty="0"/>
+          </a:p>
+          <a:p>
+            <a:endParaRPr lang="en-US" dirty="0"/>
+          </a:p>
+          <a:p>
+            <a:pPr lvl="1"/>
+            <a:endParaRPr lang="en-US" dirty="0"/>
+          </a:p>
+          <a:p>
+            <a:pPr lvl="1"/>
+            <a:endParaRPr lang="en-US" dirty="0"/>
+          </a:p>
+          <a:p>
+            <a:pPr lvl="1"/>
+            <a:endParaRPr lang="en-US" dirty="0"/>
+          </a:p>
+          <a:p>
+            <a:pPr lvl="1"/>
+            <a:endParaRPr lang="en-US" dirty="0"/>
+          </a:p>
+          <a:p>
+            <a:endParaRPr lang="en-US" b="1" dirty="0"/>
+          </a:p>
+          <a:p>
+            <a:endParaRPr lang="en-US" dirty="0"/>
+          </a:p>
+        </p:txBody>
+      </p:sp>
+      <p:sp>
+        <p:nvSpPr>
+          <p:cNvPr id="7" name="Vertical Text Placeholder 5">
+            <a:extLst>
+              <a:ext uri="{FF2B5EF4-FFF2-40B4-BE49-F238E27FC236}">
+                <a16:creationId xmlns:a16="http://schemas.microsoft.com/office/drawing/2014/main" id="{DFE0C10A-165E-4BE2-39D7-55B90C940362}"/>
+              </a:ext>
+            </a:extLst>
+          </p:cNvPr>
+          <p:cNvSpPr txBox="1">
+            <a:spLocks/>
+          </p:cNvSpPr>
+          <p:nvPr/>
+        </p:nvSpPr>
+        <p:spPr>
+          <a:xfrm>
+            <a:off x="436592" y="1199890"/>
+            <a:ext cx="11389023" cy="4795836"/>
+          </a:xfrm>
+          <a:prstGeom prst="rect">
+            <a:avLst/>
+          </a:prstGeom>
+        </p:spPr>
+        <p:txBody>
+          <a:bodyPr vert="horz" lIns="0" tIns="0" rIns="0" bIns="0" rtlCol="0">
+            <a:normAutofit/>
+          </a:bodyPr>
+          <a:lstStyle>
+            <a:lvl1pPr marL="180975" indent="-180975" algn="l" defTabSz="914400" rtl="0" eaLnBrk="1" latinLnBrk="0" hangingPunct="1">
+              <a:lnSpc>
+                <a:spcPct val="90000"/>
+              </a:lnSpc>
+              <a:spcBef>
+                <a:spcPts val="600"/>
+              </a:spcBef>
+              <a:spcAft>
+                <a:spcPts val="600"/>
+              </a:spcAft>
+              <a:buClr>
+                <a:schemeClr val="bg2"/>
+              </a:buClr>
+              <a:buFont typeface="Arial" panose="020B0604020202020204" pitchFamily="34" charset="0"/>
+              <a:buChar char="•"/>
+              <a:defRPr sz="1800" kern="1200">
+                <a:solidFill>
+                  <a:schemeClr val="bg2"/>
+                </a:solidFill>
+                <a:latin typeface="+mn-lt"/>
+                <a:ea typeface="+mn-ea"/>
+                <a:cs typeface="+mn-cs"/>
+              </a:defRPr>
+            </a:lvl1pPr>
+            <a:lvl2pPr marL="361950" indent="-180975" algn="l" defTabSz="914400" rtl="0" eaLnBrk="1" latinLnBrk="0" hangingPunct="1">
+              <a:lnSpc>
+                <a:spcPct val="90000"/>
+              </a:lnSpc>
+              <a:spcBef>
+                <a:spcPts val="600"/>
+              </a:spcBef>
+              <a:spcAft>
+                <a:spcPts val="600"/>
+              </a:spcAft>
+              <a:buClr>
+                <a:schemeClr val="bg2"/>
+              </a:buClr>
+              <a:buFont typeface="Arial" panose="020B0604020202020204" pitchFamily="34" charset="0"/>
+              <a:buChar char="-"/>
+              <a:defRPr sz="1600" kern="1200">
+                <a:solidFill>
+                  <a:schemeClr val="bg2"/>
+                </a:solidFill>
+                <a:latin typeface="+mn-lt"/>
+                <a:ea typeface="+mn-ea"/>
+                <a:cs typeface="+mn-cs"/>
+              </a:defRPr>
+            </a:lvl2pPr>
+            <a:lvl3pPr marL="0" indent="0" algn="l" defTabSz="914400" rtl="0" eaLnBrk="1" latinLnBrk="0" hangingPunct="1">
+              <a:lnSpc>
+                <a:spcPct val="90000"/>
+              </a:lnSpc>
+              <a:spcBef>
+                <a:spcPts val="600"/>
+              </a:spcBef>
+              <a:spcAft>
+                <a:spcPts val="600"/>
+              </a:spcAft>
+              <a:buFont typeface="Arial" panose="020B0604020202020204" pitchFamily="34" charset="0"/>
+              <a:buNone/>
+              <a:defRPr sz="1800" kern="1200">
+                <a:solidFill>
+                  <a:schemeClr val="bg2"/>
+                </a:solidFill>
+                <a:latin typeface="+mn-lt"/>
+                <a:ea typeface="+mn-ea"/>
+                <a:cs typeface="+mn-cs"/>
+              </a:defRPr>
+            </a:lvl3pPr>
+            <a:lvl4pPr marL="0" indent="0" algn="l" defTabSz="914400" rtl="0" eaLnBrk="1" latinLnBrk="0" hangingPunct="1">
+              <a:lnSpc>
+                <a:spcPct val="90000"/>
+              </a:lnSpc>
+              <a:spcBef>
+                <a:spcPts val="600"/>
+              </a:spcBef>
+              <a:spcAft>
+                <a:spcPts val="600"/>
+              </a:spcAft>
+              <a:buFont typeface="Arial" panose="020B0604020202020204" pitchFamily="34" charset="0"/>
+              <a:buNone/>
+              <a:defRPr sz="1800" b="1" kern="1200">
+                <a:solidFill>
+                  <a:schemeClr val="bg2"/>
+                </a:solidFill>
+                <a:latin typeface="+mn-lt"/>
+                <a:ea typeface="+mn-ea"/>
+                <a:cs typeface="+mn-cs"/>
+              </a:defRPr>
+            </a:lvl4pPr>
+            <a:lvl5pPr marL="0" indent="0" algn="l" defTabSz="914400" rtl="0" eaLnBrk="1" latinLnBrk="0" hangingPunct="1">
+              <a:lnSpc>
+                <a:spcPct val="90000"/>
+              </a:lnSpc>
+              <a:spcBef>
+                <a:spcPts val="600"/>
+              </a:spcBef>
+              <a:spcAft>
+                <a:spcPts val="600"/>
+              </a:spcAft>
+              <a:buFont typeface="Arial" panose="020B0604020202020204" pitchFamily="34" charset="0"/>
+              <a:buNone/>
+              <a:defRPr sz="1800" b="1" kern="1200" baseline="0">
+                <a:solidFill>
+                  <a:schemeClr val="tx2"/>
+                </a:solidFill>
+                <a:latin typeface="+mn-lt"/>
+                <a:ea typeface="+mn-ea"/>
+                <a:cs typeface="+mn-cs"/>
+              </a:defRPr>
+            </a:lvl5pPr>
+            <a:lvl6pPr marL="180975" indent="-180975" algn="l" defTabSz="914400" rtl="0" eaLnBrk="1" latinLnBrk="0" hangingPunct="1">
+              <a:lnSpc>
+                <a:spcPct val="90000"/>
+              </a:lnSpc>
+              <a:spcBef>
+                <a:spcPts val="600"/>
+              </a:spcBef>
+              <a:spcAft>
+                <a:spcPts val="600"/>
+              </a:spcAft>
+              <a:buClr>
+                <a:schemeClr val="bg2"/>
+              </a:buClr>
+              <a:buFont typeface="Arial" panose="020B0604020202020204" pitchFamily="34" charset="0"/>
+              <a:buChar char="•"/>
+              <a:defRPr sz="1800" kern="1200">
+                <a:solidFill>
+                  <a:schemeClr val="bg2"/>
+                </a:solidFill>
+                <a:latin typeface="+mn-lt"/>
+                <a:ea typeface="+mn-ea"/>
+                <a:cs typeface="+mn-cs"/>
+              </a:defRPr>
+            </a:lvl6pPr>
+            <a:lvl7pPr marL="361950" indent="-180975" algn="l" defTabSz="914400" rtl="0" eaLnBrk="1" latinLnBrk="0" hangingPunct="1">
+              <a:lnSpc>
+                <a:spcPct val="90000"/>
+              </a:lnSpc>
+              <a:spcBef>
+                <a:spcPts val="600"/>
+              </a:spcBef>
+              <a:spcAft>
+                <a:spcPts val="600"/>
+              </a:spcAft>
+              <a:buClr>
+                <a:schemeClr val="bg2"/>
+              </a:buClr>
+              <a:buFont typeface="Arial" panose="020B0604020202020204" pitchFamily="34" charset="0"/>
+              <a:buChar char="-"/>
+              <a:defRPr sz="1600" kern="1200">
+                <a:solidFill>
+                  <a:schemeClr val="bg2"/>
+                </a:solidFill>
+                <a:latin typeface="+mn-lt"/>
+                <a:ea typeface="+mn-ea"/>
+                <a:cs typeface="+mn-cs"/>
+              </a:defRPr>
+            </a:lvl7pPr>
+            <a:lvl8pPr marL="0" indent="0" algn="l" defTabSz="914400" rtl="0" eaLnBrk="1" latinLnBrk="0" hangingPunct="1">
+              <a:lnSpc>
+                <a:spcPct val="90000"/>
+              </a:lnSpc>
+              <a:spcBef>
+                <a:spcPts val="600"/>
+              </a:spcBef>
+              <a:spcAft>
+                <a:spcPts val="600"/>
+              </a:spcAft>
+              <a:buFont typeface="Arial" panose="020B0604020202020204" pitchFamily="34" charset="0"/>
+              <a:buNone/>
+              <a:defRPr sz="1600" kern="1200">
+                <a:solidFill>
+                  <a:schemeClr val="bg2"/>
+                </a:solidFill>
+                <a:latin typeface="+mn-lt"/>
+                <a:ea typeface="+mn-ea"/>
+                <a:cs typeface="+mn-cs"/>
+              </a:defRPr>
+            </a:lvl8pPr>
+            <a:lvl9pPr marL="0" indent="0" algn="l" defTabSz="914400" rtl="0" eaLnBrk="1" latinLnBrk="0" hangingPunct="1">
+              <a:lnSpc>
+                <a:spcPct val="90000"/>
+              </a:lnSpc>
+              <a:spcBef>
+                <a:spcPts val="600"/>
+              </a:spcBef>
+              <a:spcAft>
+                <a:spcPts val="600"/>
+              </a:spcAft>
+              <a:buFont typeface="Arial" panose="020B0604020202020204" pitchFamily="34" charset="0"/>
+              <a:buNone/>
+              <a:defRPr sz="1800" b="1" kern="1200" baseline="0">
+                <a:solidFill>
+                  <a:schemeClr val="bg2"/>
+                </a:solidFill>
+                <a:latin typeface="+mn-lt"/>
+                <a:ea typeface="+mn-ea"/>
+                <a:cs typeface="+mn-cs"/>
+              </a:defRPr>
+            </a:lvl9pPr>
+          </a:lstStyle>
+          <a:p>
+            <a:pPr marL="0" indent="0">
+              <a:buNone/>
+            </a:pPr>
+            <a:r>
+              <a:rPr lang="en-US" sz="2400" dirty="0" err="1"/>
+              <a:t>Quels</a:t>
+            </a:r>
+            <a:r>
+              <a:rPr lang="en-US" sz="2400" dirty="0"/>
+              <a:t> </a:t>
+            </a:r>
+            <a:r>
+              <a:rPr lang="en-US" sz="2400" dirty="0" err="1"/>
+              <a:t>sont</a:t>
+            </a:r>
+            <a:r>
+              <a:rPr lang="en-US" sz="2400" dirty="0"/>
+              <a:t> les 5 </a:t>
+            </a:r>
+            <a:r>
+              <a:rPr lang="en-US" sz="2400" dirty="0" err="1"/>
+              <a:t>passagers</a:t>
+            </a:r>
+            <a:r>
+              <a:rPr lang="en-US" sz="2400" dirty="0"/>
+              <a:t> qui </a:t>
+            </a:r>
+            <a:r>
+              <a:rPr lang="en-US" sz="2400" dirty="0" err="1"/>
+              <a:t>ont</a:t>
+            </a:r>
+            <a:r>
+              <a:rPr lang="en-US" sz="2400" dirty="0"/>
+              <a:t> </a:t>
+            </a:r>
+            <a:r>
+              <a:rPr lang="en-US" sz="2400" dirty="0" err="1"/>
+              <a:t>payé</a:t>
+            </a:r>
+            <a:r>
+              <a:rPr lang="en-US" sz="2400" dirty="0"/>
+              <a:t> le </a:t>
+            </a:r>
+            <a:r>
+              <a:rPr lang="en-US" sz="2400" dirty="0" err="1"/>
+              <a:t>moins</a:t>
+            </a:r>
+            <a:r>
+              <a:rPr lang="en-US" sz="2400" dirty="0"/>
+              <a:t> </a:t>
+            </a:r>
+            <a:r>
+              <a:rPr lang="en-US" sz="2400" dirty="0" err="1"/>
+              <a:t>cher</a:t>
+            </a:r>
+            <a:r>
+              <a:rPr lang="en-US" sz="2400" dirty="0"/>
+              <a:t> </a:t>
+            </a:r>
+            <a:r>
+              <a:rPr lang="en-US" sz="2400" dirty="0" err="1"/>
+              <a:t>leur</a:t>
+            </a:r>
+            <a:r>
+              <a:rPr lang="en-US" sz="2400" dirty="0"/>
+              <a:t> ticket ?</a:t>
+            </a:r>
+            <a:endParaRPr lang="en-US" sz="2200" dirty="0"/>
+          </a:p>
+          <a:p>
+            <a:pPr lvl="1"/>
+            <a:endParaRPr lang="en-US" sz="2200" dirty="0"/>
+          </a:p>
+          <a:p>
+            <a:pPr marL="0" indent="0">
+              <a:buFont typeface="Arial" panose="020B0604020202020204" pitchFamily="34" charset="0"/>
+              <a:buNone/>
+            </a:pPr>
+            <a:endParaRPr lang="en-US" dirty="0"/>
+          </a:p>
+          <a:p>
+            <a:endParaRPr lang="en-US" dirty="0"/>
+          </a:p>
+          <a:p>
+            <a:pPr marL="180975" lvl="1" indent="0">
+              <a:buFont typeface="Arial" panose="020B0604020202020204" pitchFamily="34" charset="0"/>
+              <a:buNone/>
+            </a:pPr>
+            <a:endParaRPr lang="en-US" dirty="0"/>
+          </a:p>
+          <a:p>
+            <a:pPr lvl="1"/>
+            <a:endParaRPr lang="en-US" dirty="0"/>
+          </a:p>
+          <a:p>
+            <a:endParaRPr lang="en-US" dirty="0"/>
+          </a:p>
+          <a:p>
+            <a:endParaRPr lang="en-US" dirty="0"/>
+          </a:p>
+          <a:p>
+            <a:endParaRPr lang="en-US" dirty="0"/>
+          </a:p>
+          <a:p>
+            <a:endParaRPr lang="en-US" dirty="0"/>
+          </a:p>
+          <a:p>
+            <a:pPr lvl="1"/>
+            <a:endParaRPr lang="en-US" dirty="0"/>
+          </a:p>
+          <a:p>
+            <a:pPr lvl="1"/>
+            <a:endParaRPr lang="en-US" dirty="0"/>
+          </a:p>
+          <a:p>
+            <a:pPr lvl="1"/>
+            <a:endParaRPr lang="en-US" dirty="0"/>
+          </a:p>
+          <a:p>
+            <a:pPr lvl="1"/>
+            <a:endParaRPr lang="en-US" dirty="0"/>
+          </a:p>
+          <a:p>
+            <a:endParaRPr lang="en-US" b="1" dirty="0"/>
+          </a:p>
+          <a:p>
+            <a:endParaRPr lang="en-US" dirty="0"/>
+          </a:p>
+        </p:txBody>
+      </p:sp>
+      <p:pic>
+        <p:nvPicPr>
+          <p:cNvPr id="8" name="Image 7">
+            <a:extLst>
+              <a:ext uri="{FF2B5EF4-FFF2-40B4-BE49-F238E27FC236}">
+                <a16:creationId xmlns:a16="http://schemas.microsoft.com/office/drawing/2014/main" id="{85C7BAC5-055D-63B3-136E-5200DCE4CBCA}"/>
+              </a:ext>
+            </a:extLst>
+          </p:cNvPr>
+          <p:cNvPicPr>
+            <a:picLocks noChangeAspect="1"/>
+          </p:cNvPicPr>
+          <p:nvPr/>
+        </p:nvPicPr>
+        <p:blipFill>
+          <a:blip r:embed="rId2"/>
+          <a:stretch>
+            <a:fillRect/>
+          </a:stretch>
+        </p:blipFill>
+        <p:spPr>
+          <a:xfrm>
+            <a:off x="2212975" y="1606456"/>
+            <a:ext cx="7218996" cy="4484780"/>
+          </a:xfrm>
+          <a:prstGeom prst="rect">
+            <a:avLst/>
+          </a:prstGeom>
+        </p:spPr>
+      </p:pic>
+    </p:spTree>
+    <p:extLst>
+      <p:ext uri="{BB962C8B-B14F-4D97-AF65-F5344CB8AC3E}">
+        <p14:creationId xmlns:p14="http://schemas.microsoft.com/office/powerpoint/2010/main" val="1647979995"/>
+      </p:ext>
+    </p:extLst>
+  </p:cSld>
+  <p:clrMapOvr>
+    <a:masterClrMapping/>
+  </p:clrMapOvr>
+  <p:transition spd="slow">
+    <p:wipe dir="r"/>
+  </p:transition>
+</p:sld>
+</file>
+
+<file path=ppt/slides/slide32.xml><?xml version="1.0" encoding="utf-8"?>
+<p:sld xmlns:a="http://schemas.openxmlformats.org/drawingml/2006/main" xmlns:r="http://schemas.openxmlformats.org/officeDocument/2006/relationships" xmlns:p="http://schemas.openxmlformats.org/presentationml/2006/main">
+  <p:cSld>
+    <p:spTree>
+      <p:nvGrpSpPr>
+        <p:cNvPr id="1" name=""/>
+        <p:cNvGrpSpPr/>
+        <p:nvPr/>
+      </p:nvGrpSpPr>
+      <p:grpSpPr>
+        <a:xfrm>
+          <a:off x="0" y="0"/>
+          <a:ext cx="0" cy="0"/>
+          <a:chOff x="0" y="0"/>
+          <a:chExt cx="0" cy="0"/>
+        </a:xfrm>
+      </p:grpSpPr>
+      <p:sp>
+        <p:nvSpPr>
+          <p:cNvPr id="2" name="Title 1">
+            <a:extLst>
+              <a:ext uri="{FF2B5EF4-FFF2-40B4-BE49-F238E27FC236}">
+                <a16:creationId xmlns:a16="http://schemas.microsoft.com/office/drawing/2014/main" id="{04C5DF06-5F42-4296-B27B-4F79E0DB836B}"/>
+              </a:ext>
+            </a:extLst>
+          </p:cNvPr>
+          <p:cNvSpPr>
+            <a:spLocks noGrp="1"/>
+          </p:cNvSpPr>
+          <p:nvPr>
+            <p:ph type="title"/>
+          </p:nvPr>
+        </p:nvSpPr>
+        <p:spPr/>
+        <p:txBody>
+          <a:bodyPr/>
+          <a:lstStyle/>
+          <a:p>
+            <a:r>
+              <a:rPr lang="en-US" sz="3600" dirty="0" err="1"/>
+              <a:t>Exercices</a:t>
+            </a:r>
+            <a:r>
+              <a:rPr lang="en-US" sz="3600" dirty="0"/>
+              <a:t> sur le jeu de </a:t>
+            </a:r>
+            <a:r>
+              <a:rPr lang="en-US" sz="3600" dirty="0" err="1"/>
+              <a:t>données</a:t>
+            </a:r>
+            <a:r>
+              <a:rPr lang="en-US" sz="3600" dirty="0"/>
+              <a:t> Titanic</a:t>
+            </a:r>
+          </a:p>
+        </p:txBody>
+      </p:sp>
+      <p:sp>
+        <p:nvSpPr>
+          <p:cNvPr id="5" name="Slide Number Placeholder 4">
+            <a:extLst>
+              <a:ext uri="{FF2B5EF4-FFF2-40B4-BE49-F238E27FC236}">
+                <a16:creationId xmlns:a16="http://schemas.microsoft.com/office/drawing/2014/main" id="{B756D4B6-3814-4E02-AB98-08D3B49675BF}"/>
+              </a:ext>
+            </a:extLst>
+          </p:cNvPr>
+          <p:cNvSpPr>
+            <a:spLocks noGrp="1"/>
+          </p:cNvSpPr>
+          <p:nvPr>
+            <p:ph type="sldNum" sz="quarter" idx="4"/>
+          </p:nvPr>
+        </p:nvSpPr>
+        <p:spPr/>
+        <p:txBody>
+          <a:bodyPr/>
+          <a:lstStyle/>
+          <a:p>
+            <a:fld id="{5EE7099E-8998-4851-915A-4F4831808297}" type="slidenum">
+              <a:rPr lang="nl-NL" smtClean="0"/>
+              <a:pPr/>
+              <a:t>32</a:t>
+            </a:fld>
+            <a:endParaRPr lang="nl-NL"/>
+          </a:p>
+        </p:txBody>
+      </p:sp>
+      <p:sp>
+        <p:nvSpPr>
+          <p:cNvPr id="3" name="ZoneTexte 2">
+            <a:extLst>
+              <a:ext uri="{FF2B5EF4-FFF2-40B4-BE49-F238E27FC236}">
+                <a16:creationId xmlns:a16="http://schemas.microsoft.com/office/drawing/2014/main" id="{0C248AA7-6FCB-3F89-E3DD-C837A2826405}"/>
+              </a:ext>
+            </a:extLst>
+          </p:cNvPr>
+          <p:cNvSpPr txBox="1"/>
+          <p:nvPr/>
+        </p:nvSpPr>
+        <p:spPr>
+          <a:xfrm>
+            <a:off x="3692106" y="1699404"/>
+            <a:ext cx="0" cy="0"/>
+          </a:xfrm>
+          <a:prstGeom prst="rect">
+            <a:avLst/>
+          </a:prstGeom>
+          <a:noFill/>
+        </p:spPr>
+        <p:txBody>
+          <a:bodyPr wrap="none" lIns="108000" tIns="108000" rIns="108000" bIns="108000" rtlCol="0">
+            <a:noAutofit/>
+          </a:bodyPr>
+          <a:lstStyle/>
+          <a:p>
+            <a:endParaRPr lang="fr-FR" noProof="0" dirty="0" err="1">
+              <a:solidFill>
+                <a:schemeClr val="bg2"/>
+              </a:solidFill>
+            </a:endParaRPr>
+          </a:p>
+        </p:txBody>
+      </p:sp>
+      <p:sp>
+        <p:nvSpPr>
+          <p:cNvPr id="6" name="Vertical Text Placeholder 5">
+            <a:extLst>
+              <a:ext uri="{FF2B5EF4-FFF2-40B4-BE49-F238E27FC236}">
+                <a16:creationId xmlns:a16="http://schemas.microsoft.com/office/drawing/2014/main" id="{F8170739-5212-AEC7-557E-2E086A29A496}"/>
+              </a:ext>
+            </a:extLst>
+          </p:cNvPr>
+          <p:cNvSpPr>
+            <a:spLocks noGrp="1"/>
+          </p:cNvSpPr>
+          <p:nvPr>
+            <p:ph type="body" orient="vert" idx="1"/>
+          </p:nvPr>
+        </p:nvSpPr>
+        <p:spPr>
+          <a:xfrm>
+            <a:off x="404662" y="1143000"/>
+            <a:ext cx="11389023" cy="4795836"/>
+          </a:xfrm>
+        </p:spPr>
+        <p:txBody>
+          <a:bodyPr/>
+          <a:lstStyle/>
+          <a:p>
+            <a:endParaRPr lang="en-US" dirty="0"/>
+          </a:p>
+          <a:p>
+            <a:endParaRPr lang="en-US" dirty="0"/>
+          </a:p>
+          <a:p>
+            <a:pPr marL="180975" lvl="1" indent="0">
+              <a:buNone/>
+            </a:pPr>
+            <a:endParaRPr lang="en-US" dirty="0"/>
+          </a:p>
+          <a:p>
+            <a:pPr lvl="1"/>
+            <a:endParaRPr lang="en-US" dirty="0"/>
+          </a:p>
+          <a:p>
+            <a:endParaRPr lang="en-US" dirty="0"/>
+          </a:p>
+          <a:p>
+            <a:endParaRPr lang="en-US" dirty="0"/>
+          </a:p>
+          <a:p>
+            <a:endParaRPr lang="en-US" dirty="0"/>
+          </a:p>
+          <a:p>
+            <a:endParaRPr lang="en-US" dirty="0"/>
+          </a:p>
+          <a:p>
+            <a:pPr lvl="1"/>
+            <a:endParaRPr lang="en-US" dirty="0"/>
+          </a:p>
+          <a:p>
+            <a:pPr lvl="1"/>
+            <a:endParaRPr lang="en-US" dirty="0"/>
+          </a:p>
+          <a:p>
+            <a:pPr lvl="1"/>
+            <a:endParaRPr lang="en-US" dirty="0"/>
+          </a:p>
+          <a:p>
+            <a:pPr lvl="1"/>
+            <a:endParaRPr lang="en-US" dirty="0"/>
+          </a:p>
+          <a:p>
+            <a:endParaRPr lang="en-US" b="1" dirty="0"/>
+          </a:p>
+          <a:p>
+            <a:endParaRPr lang="en-US" dirty="0"/>
+          </a:p>
+        </p:txBody>
+      </p:sp>
+      <p:sp>
+        <p:nvSpPr>
+          <p:cNvPr id="4" name="Vertical Text Placeholder 5">
+            <a:extLst>
+              <a:ext uri="{FF2B5EF4-FFF2-40B4-BE49-F238E27FC236}">
+                <a16:creationId xmlns:a16="http://schemas.microsoft.com/office/drawing/2014/main" id="{A57D01D8-1D67-D654-0CFB-28A877FD85B9}"/>
+              </a:ext>
+            </a:extLst>
+          </p:cNvPr>
+          <p:cNvSpPr txBox="1">
+            <a:spLocks/>
+          </p:cNvSpPr>
+          <p:nvPr/>
+        </p:nvSpPr>
+        <p:spPr>
+          <a:xfrm>
+            <a:off x="557062" y="1295400"/>
+            <a:ext cx="11389023" cy="4795836"/>
+          </a:xfrm>
+          <a:prstGeom prst="rect">
+            <a:avLst/>
+          </a:prstGeom>
+        </p:spPr>
+        <p:txBody>
+          <a:bodyPr vert="horz" lIns="0" tIns="0" rIns="0" bIns="0" rtlCol="0">
+            <a:normAutofit/>
+          </a:bodyPr>
+          <a:lstStyle>
+            <a:lvl1pPr marL="180975" indent="-180975" algn="l" defTabSz="914400" rtl="0" eaLnBrk="1" latinLnBrk="0" hangingPunct="1">
+              <a:lnSpc>
+                <a:spcPct val="90000"/>
+              </a:lnSpc>
+              <a:spcBef>
+                <a:spcPts val="600"/>
+              </a:spcBef>
+              <a:spcAft>
+                <a:spcPts val="600"/>
+              </a:spcAft>
+              <a:buClr>
+                <a:schemeClr val="bg2"/>
+              </a:buClr>
+              <a:buFont typeface="Arial" panose="020B0604020202020204" pitchFamily="34" charset="0"/>
+              <a:buChar char="•"/>
+              <a:defRPr sz="1800" kern="1200">
+                <a:solidFill>
+                  <a:schemeClr val="bg2"/>
+                </a:solidFill>
+                <a:latin typeface="+mn-lt"/>
+                <a:ea typeface="+mn-ea"/>
+                <a:cs typeface="+mn-cs"/>
+              </a:defRPr>
+            </a:lvl1pPr>
+            <a:lvl2pPr marL="361950" indent="-180975" algn="l" defTabSz="914400" rtl="0" eaLnBrk="1" latinLnBrk="0" hangingPunct="1">
+              <a:lnSpc>
+                <a:spcPct val="90000"/>
+              </a:lnSpc>
+              <a:spcBef>
+                <a:spcPts val="600"/>
+              </a:spcBef>
+              <a:spcAft>
+                <a:spcPts val="600"/>
+              </a:spcAft>
+              <a:buClr>
+                <a:schemeClr val="bg2"/>
+              </a:buClr>
+              <a:buFont typeface="Arial" panose="020B0604020202020204" pitchFamily="34" charset="0"/>
+              <a:buChar char="-"/>
+              <a:defRPr sz="1600" kern="1200">
+                <a:solidFill>
+                  <a:schemeClr val="bg2"/>
+                </a:solidFill>
+                <a:latin typeface="+mn-lt"/>
+                <a:ea typeface="+mn-ea"/>
+                <a:cs typeface="+mn-cs"/>
+              </a:defRPr>
+            </a:lvl2pPr>
+            <a:lvl3pPr marL="0" indent="0" algn="l" defTabSz="914400" rtl="0" eaLnBrk="1" latinLnBrk="0" hangingPunct="1">
+              <a:lnSpc>
+                <a:spcPct val="90000"/>
+              </a:lnSpc>
+              <a:spcBef>
+                <a:spcPts val="600"/>
+              </a:spcBef>
+              <a:spcAft>
+                <a:spcPts val="600"/>
+              </a:spcAft>
+              <a:buFont typeface="Arial" panose="020B0604020202020204" pitchFamily="34" charset="0"/>
+              <a:buNone/>
+              <a:defRPr sz="1800" kern="1200">
+                <a:solidFill>
+                  <a:schemeClr val="bg2"/>
+                </a:solidFill>
+                <a:latin typeface="+mn-lt"/>
+                <a:ea typeface="+mn-ea"/>
+                <a:cs typeface="+mn-cs"/>
+              </a:defRPr>
+            </a:lvl3pPr>
+            <a:lvl4pPr marL="0" indent="0" algn="l" defTabSz="914400" rtl="0" eaLnBrk="1" latinLnBrk="0" hangingPunct="1">
+              <a:lnSpc>
+                <a:spcPct val="90000"/>
+              </a:lnSpc>
+              <a:spcBef>
+                <a:spcPts val="600"/>
+              </a:spcBef>
+              <a:spcAft>
+                <a:spcPts val="600"/>
+              </a:spcAft>
+              <a:buFont typeface="Arial" panose="020B0604020202020204" pitchFamily="34" charset="0"/>
+              <a:buNone/>
+              <a:defRPr sz="1800" b="1" kern="1200">
+                <a:solidFill>
+                  <a:schemeClr val="bg2"/>
+                </a:solidFill>
+                <a:latin typeface="+mn-lt"/>
+                <a:ea typeface="+mn-ea"/>
+                <a:cs typeface="+mn-cs"/>
+              </a:defRPr>
+            </a:lvl4pPr>
+            <a:lvl5pPr marL="0" indent="0" algn="l" defTabSz="914400" rtl="0" eaLnBrk="1" latinLnBrk="0" hangingPunct="1">
+              <a:lnSpc>
+                <a:spcPct val="90000"/>
+              </a:lnSpc>
+              <a:spcBef>
+                <a:spcPts val="600"/>
+              </a:spcBef>
+              <a:spcAft>
+                <a:spcPts val="600"/>
+              </a:spcAft>
+              <a:buFont typeface="Arial" panose="020B0604020202020204" pitchFamily="34" charset="0"/>
+              <a:buNone/>
+              <a:defRPr sz="1800" b="1" kern="1200" baseline="0">
+                <a:solidFill>
+                  <a:schemeClr val="tx2"/>
+                </a:solidFill>
+                <a:latin typeface="+mn-lt"/>
+                <a:ea typeface="+mn-ea"/>
+                <a:cs typeface="+mn-cs"/>
+              </a:defRPr>
+            </a:lvl5pPr>
+            <a:lvl6pPr marL="180975" indent="-180975" algn="l" defTabSz="914400" rtl="0" eaLnBrk="1" latinLnBrk="0" hangingPunct="1">
+              <a:lnSpc>
+                <a:spcPct val="90000"/>
+              </a:lnSpc>
+              <a:spcBef>
+                <a:spcPts val="600"/>
+              </a:spcBef>
+              <a:spcAft>
+                <a:spcPts val="600"/>
+              </a:spcAft>
+              <a:buClr>
+                <a:schemeClr val="bg2"/>
+              </a:buClr>
+              <a:buFont typeface="Arial" panose="020B0604020202020204" pitchFamily="34" charset="0"/>
+              <a:buChar char="•"/>
+              <a:defRPr sz="1800" kern="1200">
+                <a:solidFill>
+                  <a:schemeClr val="bg2"/>
+                </a:solidFill>
+                <a:latin typeface="+mn-lt"/>
+                <a:ea typeface="+mn-ea"/>
+                <a:cs typeface="+mn-cs"/>
+              </a:defRPr>
+            </a:lvl6pPr>
+            <a:lvl7pPr marL="361950" indent="-180975" algn="l" defTabSz="914400" rtl="0" eaLnBrk="1" latinLnBrk="0" hangingPunct="1">
+              <a:lnSpc>
+                <a:spcPct val="90000"/>
+              </a:lnSpc>
+              <a:spcBef>
+                <a:spcPts val="600"/>
+              </a:spcBef>
+              <a:spcAft>
+                <a:spcPts val="600"/>
+              </a:spcAft>
+              <a:buClr>
+                <a:schemeClr val="bg2"/>
+              </a:buClr>
+              <a:buFont typeface="Arial" panose="020B0604020202020204" pitchFamily="34" charset="0"/>
+              <a:buChar char="-"/>
+              <a:defRPr sz="1600" kern="1200">
+                <a:solidFill>
+                  <a:schemeClr val="bg2"/>
+                </a:solidFill>
+                <a:latin typeface="+mn-lt"/>
+                <a:ea typeface="+mn-ea"/>
+                <a:cs typeface="+mn-cs"/>
+              </a:defRPr>
+            </a:lvl7pPr>
+            <a:lvl8pPr marL="0" indent="0" algn="l" defTabSz="914400" rtl="0" eaLnBrk="1" latinLnBrk="0" hangingPunct="1">
+              <a:lnSpc>
+                <a:spcPct val="90000"/>
+              </a:lnSpc>
+              <a:spcBef>
+                <a:spcPts val="600"/>
+              </a:spcBef>
+              <a:spcAft>
+                <a:spcPts val="600"/>
+              </a:spcAft>
+              <a:buFont typeface="Arial" panose="020B0604020202020204" pitchFamily="34" charset="0"/>
+              <a:buNone/>
+              <a:defRPr sz="1600" kern="1200">
+                <a:solidFill>
+                  <a:schemeClr val="bg2"/>
+                </a:solidFill>
+                <a:latin typeface="+mn-lt"/>
+                <a:ea typeface="+mn-ea"/>
+                <a:cs typeface="+mn-cs"/>
+              </a:defRPr>
+            </a:lvl8pPr>
+            <a:lvl9pPr marL="0" indent="0" algn="l" defTabSz="914400" rtl="0" eaLnBrk="1" latinLnBrk="0" hangingPunct="1">
+              <a:lnSpc>
+                <a:spcPct val="90000"/>
+              </a:lnSpc>
+              <a:spcBef>
+                <a:spcPts val="600"/>
+              </a:spcBef>
+              <a:spcAft>
+                <a:spcPts val="600"/>
+              </a:spcAft>
+              <a:buFont typeface="Arial" panose="020B0604020202020204" pitchFamily="34" charset="0"/>
+              <a:buNone/>
+              <a:defRPr sz="1800" b="1" kern="1200" baseline="0">
+                <a:solidFill>
+                  <a:schemeClr val="bg2"/>
+                </a:solidFill>
+                <a:latin typeface="+mn-lt"/>
+                <a:ea typeface="+mn-ea"/>
+                <a:cs typeface="+mn-cs"/>
+              </a:defRPr>
+            </a:lvl9pPr>
+          </a:lstStyle>
+          <a:p>
+            <a:endParaRPr lang="en-US" sz="2200" b="1" dirty="0"/>
+          </a:p>
+          <a:p>
+            <a:pPr marL="180975" lvl="1" indent="0">
+              <a:buNone/>
+            </a:pPr>
+            <a:endParaRPr lang="en-US" sz="2200" dirty="0"/>
+          </a:p>
+          <a:p>
+            <a:pPr lvl="1"/>
+            <a:endParaRPr lang="en-US" sz="2200" dirty="0"/>
+          </a:p>
+          <a:p>
+            <a:pPr marL="0" indent="0">
+              <a:buFont typeface="Arial" panose="020B0604020202020204" pitchFamily="34" charset="0"/>
+              <a:buNone/>
+            </a:pPr>
+            <a:endParaRPr lang="en-US" dirty="0"/>
+          </a:p>
+          <a:p>
+            <a:endParaRPr lang="en-US" dirty="0"/>
+          </a:p>
+          <a:p>
+            <a:pPr marL="180975" lvl="1" indent="0">
+              <a:buFont typeface="Arial" panose="020B0604020202020204" pitchFamily="34" charset="0"/>
+              <a:buNone/>
+            </a:pPr>
+            <a:endParaRPr lang="en-US" dirty="0"/>
+          </a:p>
+          <a:p>
+            <a:pPr lvl="1"/>
+            <a:endParaRPr lang="en-US" dirty="0"/>
+          </a:p>
+          <a:p>
+            <a:endParaRPr lang="en-US" dirty="0"/>
+          </a:p>
+          <a:p>
+            <a:endParaRPr lang="en-US" dirty="0"/>
+          </a:p>
+          <a:p>
+            <a:endParaRPr lang="en-US" dirty="0"/>
+          </a:p>
+          <a:p>
+            <a:endParaRPr lang="en-US" dirty="0"/>
+          </a:p>
+          <a:p>
+            <a:pPr lvl="1"/>
+            <a:endParaRPr lang="en-US" dirty="0"/>
+          </a:p>
+          <a:p>
+            <a:pPr lvl="1"/>
+            <a:endParaRPr lang="en-US" dirty="0"/>
+          </a:p>
+          <a:p>
+            <a:pPr lvl="1"/>
+            <a:endParaRPr lang="en-US" dirty="0"/>
+          </a:p>
+          <a:p>
+            <a:pPr lvl="1"/>
+            <a:endParaRPr lang="en-US" dirty="0"/>
+          </a:p>
+          <a:p>
+            <a:endParaRPr lang="en-US" b="1" dirty="0"/>
+          </a:p>
+          <a:p>
+            <a:endParaRPr lang="en-US" dirty="0"/>
+          </a:p>
+        </p:txBody>
+      </p:sp>
+      <p:sp>
+        <p:nvSpPr>
+          <p:cNvPr id="7" name="Vertical Text Placeholder 5">
+            <a:extLst>
+              <a:ext uri="{FF2B5EF4-FFF2-40B4-BE49-F238E27FC236}">
+                <a16:creationId xmlns:a16="http://schemas.microsoft.com/office/drawing/2014/main" id="{DFE0C10A-165E-4BE2-39D7-55B90C940362}"/>
+              </a:ext>
+            </a:extLst>
+          </p:cNvPr>
+          <p:cNvSpPr txBox="1">
+            <a:spLocks/>
+          </p:cNvSpPr>
+          <p:nvPr/>
+        </p:nvSpPr>
+        <p:spPr>
+          <a:xfrm>
+            <a:off x="436592" y="1199890"/>
+            <a:ext cx="11389023" cy="4795836"/>
+          </a:xfrm>
+          <a:prstGeom prst="rect">
+            <a:avLst/>
+          </a:prstGeom>
+        </p:spPr>
+        <p:txBody>
+          <a:bodyPr vert="horz" lIns="0" tIns="0" rIns="0" bIns="0" rtlCol="0">
+            <a:normAutofit/>
+          </a:bodyPr>
+          <a:lstStyle>
+            <a:lvl1pPr marL="180975" indent="-180975" algn="l" defTabSz="914400" rtl="0" eaLnBrk="1" latinLnBrk="0" hangingPunct="1">
+              <a:lnSpc>
+                <a:spcPct val="90000"/>
+              </a:lnSpc>
+              <a:spcBef>
+                <a:spcPts val="600"/>
+              </a:spcBef>
+              <a:spcAft>
+                <a:spcPts val="600"/>
+              </a:spcAft>
+              <a:buClr>
+                <a:schemeClr val="bg2"/>
+              </a:buClr>
+              <a:buFont typeface="Arial" panose="020B0604020202020204" pitchFamily="34" charset="0"/>
+              <a:buChar char="•"/>
+              <a:defRPr sz="1800" kern="1200">
+                <a:solidFill>
+                  <a:schemeClr val="bg2"/>
+                </a:solidFill>
+                <a:latin typeface="+mn-lt"/>
+                <a:ea typeface="+mn-ea"/>
+                <a:cs typeface="+mn-cs"/>
+              </a:defRPr>
+            </a:lvl1pPr>
+            <a:lvl2pPr marL="361950" indent="-180975" algn="l" defTabSz="914400" rtl="0" eaLnBrk="1" latinLnBrk="0" hangingPunct="1">
+              <a:lnSpc>
+                <a:spcPct val="90000"/>
+              </a:lnSpc>
+              <a:spcBef>
+                <a:spcPts val="600"/>
+              </a:spcBef>
+              <a:spcAft>
+                <a:spcPts val="600"/>
+              </a:spcAft>
+              <a:buClr>
+                <a:schemeClr val="bg2"/>
+              </a:buClr>
+              <a:buFont typeface="Arial" panose="020B0604020202020204" pitchFamily="34" charset="0"/>
+              <a:buChar char="-"/>
+              <a:defRPr sz="1600" kern="1200">
+                <a:solidFill>
+                  <a:schemeClr val="bg2"/>
+                </a:solidFill>
+                <a:latin typeface="+mn-lt"/>
+                <a:ea typeface="+mn-ea"/>
+                <a:cs typeface="+mn-cs"/>
+              </a:defRPr>
+            </a:lvl2pPr>
+            <a:lvl3pPr marL="0" indent="0" algn="l" defTabSz="914400" rtl="0" eaLnBrk="1" latinLnBrk="0" hangingPunct="1">
+              <a:lnSpc>
+                <a:spcPct val="90000"/>
+              </a:lnSpc>
+              <a:spcBef>
+                <a:spcPts val="600"/>
+              </a:spcBef>
+              <a:spcAft>
+                <a:spcPts val="600"/>
+              </a:spcAft>
+              <a:buFont typeface="Arial" panose="020B0604020202020204" pitchFamily="34" charset="0"/>
+              <a:buNone/>
+              <a:defRPr sz="1800" kern="1200">
+                <a:solidFill>
+                  <a:schemeClr val="bg2"/>
+                </a:solidFill>
+                <a:latin typeface="+mn-lt"/>
+                <a:ea typeface="+mn-ea"/>
+                <a:cs typeface="+mn-cs"/>
+              </a:defRPr>
+            </a:lvl3pPr>
+            <a:lvl4pPr marL="0" indent="0" algn="l" defTabSz="914400" rtl="0" eaLnBrk="1" latinLnBrk="0" hangingPunct="1">
+              <a:lnSpc>
+                <a:spcPct val="90000"/>
+              </a:lnSpc>
+              <a:spcBef>
+                <a:spcPts val="600"/>
+              </a:spcBef>
+              <a:spcAft>
+                <a:spcPts val="600"/>
+              </a:spcAft>
+              <a:buFont typeface="Arial" panose="020B0604020202020204" pitchFamily="34" charset="0"/>
+              <a:buNone/>
+              <a:defRPr sz="1800" b="1" kern="1200">
+                <a:solidFill>
+                  <a:schemeClr val="bg2"/>
+                </a:solidFill>
+                <a:latin typeface="+mn-lt"/>
+                <a:ea typeface="+mn-ea"/>
+                <a:cs typeface="+mn-cs"/>
+              </a:defRPr>
+            </a:lvl4pPr>
+            <a:lvl5pPr marL="0" indent="0" algn="l" defTabSz="914400" rtl="0" eaLnBrk="1" latinLnBrk="0" hangingPunct="1">
+              <a:lnSpc>
+                <a:spcPct val="90000"/>
+              </a:lnSpc>
+              <a:spcBef>
+                <a:spcPts val="600"/>
+              </a:spcBef>
+              <a:spcAft>
+                <a:spcPts val="600"/>
+              </a:spcAft>
+              <a:buFont typeface="Arial" panose="020B0604020202020204" pitchFamily="34" charset="0"/>
+              <a:buNone/>
+              <a:defRPr sz="1800" b="1" kern="1200" baseline="0">
+                <a:solidFill>
+                  <a:schemeClr val="tx2"/>
+                </a:solidFill>
+                <a:latin typeface="+mn-lt"/>
+                <a:ea typeface="+mn-ea"/>
+                <a:cs typeface="+mn-cs"/>
+              </a:defRPr>
+            </a:lvl5pPr>
+            <a:lvl6pPr marL="180975" indent="-180975" algn="l" defTabSz="914400" rtl="0" eaLnBrk="1" latinLnBrk="0" hangingPunct="1">
+              <a:lnSpc>
+                <a:spcPct val="90000"/>
+              </a:lnSpc>
+              <a:spcBef>
+                <a:spcPts val="600"/>
+              </a:spcBef>
+              <a:spcAft>
+                <a:spcPts val="600"/>
+              </a:spcAft>
+              <a:buClr>
+                <a:schemeClr val="bg2"/>
+              </a:buClr>
+              <a:buFont typeface="Arial" panose="020B0604020202020204" pitchFamily="34" charset="0"/>
+              <a:buChar char="•"/>
+              <a:defRPr sz="1800" kern="1200">
+                <a:solidFill>
+                  <a:schemeClr val="bg2"/>
+                </a:solidFill>
+                <a:latin typeface="+mn-lt"/>
+                <a:ea typeface="+mn-ea"/>
+                <a:cs typeface="+mn-cs"/>
+              </a:defRPr>
+            </a:lvl6pPr>
+            <a:lvl7pPr marL="361950" indent="-180975" algn="l" defTabSz="914400" rtl="0" eaLnBrk="1" latinLnBrk="0" hangingPunct="1">
+              <a:lnSpc>
+                <a:spcPct val="90000"/>
+              </a:lnSpc>
+              <a:spcBef>
+                <a:spcPts val="600"/>
+              </a:spcBef>
+              <a:spcAft>
+                <a:spcPts val="600"/>
+              </a:spcAft>
+              <a:buClr>
+                <a:schemeClr val="bg2"/>
+              </a:buClr>
+              <a:buFont typeface="Arial" panose="020B0604020202020204" pitchFamily="34" charset="0"/>
+              <a:buChar char="-"/>
+              <a:defRPr sz="1600" kern="1200">
+                <a:solidFill>
+                  <a:schemeClr val="bg2"/>
+                </a:solidFill>
+                <a:latin typeface="+mn-lt"/>
+                <a:ea typeface="+mn-ea"/>
+                <a:cs typeface="+mn-cs"/>
+              </a:defRPr>
+            </a:lvl7pPr>
+            <a:lvl8pPr marL="0" indent="0" algn="l" defTabSz="914400" rtl="0" eaLnBrk="1" latinLnBrk="0" hangingPunct="1">
+              <a:lnSpc>
+                <a:spcPct val="90000"/>
+              </a:lnSpc>
+              <a:spcBef>
+                <a:spcPts val="600"/>
+              </a:spcBef>
+              <a:spcAft>
+                <a:spcPts val="600"/>
+              </a:spcAft>
+              <a:buFont typeface="Arial" panose="020B0604020202020204" pitchFamily="34" charset="0"/>
+              <a:buNone/>
+              <a:defRPr sz="1600" kern="1200">
+                <a:solidFill>
+                  <a:schemeClr val="bg2"/>
+                </a:solidFill>
+                <a:latin typeface="+mn-lt"/>
+                <a:ea typeface="+mn-ea"/>
+                <a:cs typeface="+mn-cs"/>
+              </a:defRPr>
+            </a:lvl8pPr>
+            <a:lvl9pPr marL="0" indent="0" algn="l" defTabSz="914400" rtl="0" eaLnBrk="1" latinLnBrk="0" hangingPunct="1">
+              <a:lnSpc>
+                <a:spcPct val="90000"/>
+              </a:lnSpc>
+              <a:spcBef>
+                <a:spcPts val="600"/>
+              </a:spcBef>
+              <a:spcAft>
+                <a:spcPts val="600"/>
+              </a:spcAft>
+              <a:buFont typeface="Arial" panose="020B0604020202020204" pitchFamily="34" charset="0"/>
+              <a:buNone/>
+              <a:defRPr sz="1800" b="1" kern="1200" baseline="0">
+                <a:solidFill>
+                  <a:schemeClr val="bg2"/>
+                </a:solidFill>
+                <a:latin typeface="+mn-lt"/>
+                <a:ea typeface="+mn-ea"/>
+                <a:cs typeface="+mn-cs"/>
+              </a:defRPr>
+            </a:lvl9pPr>
+          </a:lstStyle>
+          <a:p>
+            <a:pPr marL="0" indent="0">
+              <a:buNone/>
+            </a:pPr>
+            <a:r>
+              <a:rPr lang="en-US" sz="2400" dirty="0"/>
+              <a:t>Quelle </a:t>
+            </a:r>
+            <a:r>
+              <a:rPr lang="en-US" sz="2400" dirty="0" err="1"/>
+              <a:t>est</a:t>
+            </a:r>
+            <a:r>
+              <a:rPr lang="en-US" sz="2400" dirty="0"/>
+              <a:t> la </a:t>
+            </a:r>
+            <a:r>
+              <a:rPr lang="en-US" sz="2400" dirty="0" err="1"/>
+              <a:t>somme</a:t>
+            </a:r>
+            <a:r>
+              <a:rPr lang="en-US" sz="2400" dirty="0"/>
+              <a:t> </a:t>
+            </a:r>
+            <a:r>
+              <a:rPr lang="en-US" sz="2400" dirty="0" err="1"/>
+              <a:t>totale</a:t>
+            </a:r>
+            <a:r>
+              <a:rPr lang="en-US" sz="2400" dirty="0"/>
+              <a:t> des </a:t>
+            </a:r>
+            <a:r>
+              <a:rPr lang="en-US" sz="2400" dirty="0" err="1"/>
+              <a:t>tarifs</a:t>
+            </a:r>
+            <a:r>
+              <a:rPr lang="en-US" sz="2400" dirty="0"/>
+              <a:t> </a:t>
+            </a:r>
+            <a:r>
+              <a:rPr lang="en-US" sz="2400" dirty="0" err="1"/>
+              <a:t>payés</a:t>
+            </a:r>
+            <a:r>
+              <a:rPr lang="en-US" sz="2400" dirty="0"/>
+              <a:t> par </a:t>
+            </a:r>
+            <a:r>
+              <a:rPr lang="en-US" sz="2400" dirty="0" err="1"/>
+              <a:t>classe</a:t>
+            </a:r>
+            <a:r>
+              <a:rPr lang="en-US" sz="2400" dirty="0"/>
+              <a:t> ?</a:t>
+            </a:r>
+          </a:p>
+          <a:p>
+            <a:pPr lvl="1"/>
+            <a:endParaRPr lang="en-US" sz="2200" dirty="0"/>
+          </a:p>
+          <a:p>
+            <a:pPr marL="0" indent="0">
+              <a:buFont typeface="Arial" panose="020B0604020202020204" pitchFamily="34" charset="0"/>
+              <a:buNone/>
+            </a:pPr>
+            <a:endParaRPr lang="en-US" dirty="0"/>
+          </a:p>
+          <a:p>
+            <a:endParaRPr lang="en-US" dirty="0"/>
+          </a:p>
+          <a:p>
+            <a:pPr marL="180975" lvl="1" indent="0">
+              <a:buFont typeface="Arial" panose="020B0604020202020204" pitchFamily="34" charset="0"/>
+              <a:buNone/>
+            </a:pPr>
+            <a:endParaRPr lang="en-US" dirty="0"/>
+          </a:p>
+          <a:p>
+            <a:pPr lvl="1"/>
+            <a:endParaRPr lang="en-US" dirty="0"/>
+          </a:p>
+          <a:p>
+            <a:endParaRPr lang="en-US" dirty="0"/>
+          </a:p>
+          <a:p>
+            <a:endParaRPr lang="en-US" dirty="0"/>
+          </a:p>
+          <a:p>
+            <a:endParaRPr lang="en-US" dirty="0"/>
+          </a:p>
+          <a:p>
+            <a:endParaRPr lang="en-US" dirty="0"/>
+          </a:p>
+          <a:p>
+            <a:pPr lvl="1"/>
+            <a:endParaRPr lang="en-US" dirty="0"/>
+          </a:p>
+          <a:p>
+            <a:pPr lvl="1"/>
+            <a:endParaRPr lang="en-US" dirty="0"/>
+          </a:p>
+          <a:p>
+            <a:pPr lvl="1"/>
+            <a:endParaRPr lang="en-US" dirty="0"/>
+          </a:p>
+          <a:p>
+            <a:pPr lvl="1"/>
+            <a:endParaRPr lang="en-US" dirty="0"/>
+          </a:p>
+          <a:p>
+            <a:endParaRPr lang="en-US" b="1" dirty="0"/>
+          </a:p>
+          <a:p>
+            <a:endParaRPr lang="en-US" dirty="0"/>
+          </a:p>
+        </p:txBody>
+      </p:sp>
+    </p:spTree>
+    <p:extLst>
+      <p:ext uri="{BB962C8B-B14F-4D97-AF65-F5344CB8AC3E}">
+        <p14:creationId xmlns:p14="http://schemas.microsoft.com/office/powerpoint/2010/main" val="2397404294"/>
+      </p:ext>
+    </p:extLst>
+  </p:cSld>
+  <p:clrMapOvr>
+    <a:masterClrMapping/>
+  </p:clrMapOvr>
+  <p:transition spd="slow">
+    <p:wipe dir="r"/>
+  </p:transition>
+</p:sld>
+</file>
+
+<file path=ppt/slides/slide33.xml><?xml version="1.0" encoding="utf-8"?>
+<p:sld xmlns:a="http://schemas.openxmlformats.org/drawingml/2006/main" xmlns:r="http://schemas.openxmlformats.org/officeDocument/2006/relationships" xmlns:p="http://schemas.openxmlformats.org/presentationml/2006/main">
+  <p:cSld>
+    <p:spTree>
+      <p:nvGrpSpPr>
+        <p:cNvPr id="1" name=""/>
+        <p:cNvGrpSpPr/>
+        <p:nvPr/>
+      </p:nvGrpSpPr>
+      <p:grpSpPr>
+        <a:xfrm>
+          <a:off x="0" y="0"/>
+          <a:ext cx="0" cy="0"/>
+          <a:chOff x="0" y="0"/>
+          <a:chExt cx="0" cy="0"/>
+        </a:xfrm>
+      </p:grpSpPr>
+      <p:sp>
+        <p:nvSpPr>
+          <p:cNvPr id="2" name="Title 1">
+            <a:extLst>
+              <a:ext uri="{FF2B5EF4-FFF2-40B4-BE49-F238E27FC236}">
+                <a16:creationId xmlns:a16="http://schemas.microsoft.com/office/drawing/2014/main" id="{04C5DF06-5F42-4296-B27B-4F79E0DB836B}"/>
+              </a:ext>
+            </a:extLst>
+          </p:cNvPr>
+          <p:cNvSpPr>
+            <a:spLocks noGrp="1"/>
+          </p:cNvSpPr>
+          <p:nvPr>
+            <p:ph type="title"/>
+          </p:nvPr>
+        </p:nvSpPr>
+        <p:spPr/>
+        <p:txBody>
+          <a:bodyPr/>
+          <a:lstStyle/>
+          <a:p>
+            <a:r>
+              <a:rPr lang="en-US" sz="3600" dirty="0" err="1"/>
+              <a:t>Exercices</a:t>
+            </a:r>
+            <a:r>
+              <a:rPr lang="en-US" sz="3600" dirty="0"/>
+              <a:t> sur le jeu de </a:t>
+            </a:r>
+            <a:r>
+              <a:rPr lang="en-US" sz="3600" dirty="0" err="1"/>
+              <a:t>données</a:t>
+            </a:r>
+            <a:r>
+              <a:rPr lang="en-US" sz="3600" dirty="0"/>
+              <a:t> Titanic</a:t>
+            </a:r>
+          </a:p>
+        </p:txBody>
+      </p:sp>
+      <p:sp>
+        <p:nvSpPr>
+          <p:cNvPr id="5" name="Slide Number Placeholder 4">
+            <a:extLst>
+              <a:ext uri="{FF2B5EF4-FFF2-40B4-BE49-F238E27FC236}">
+                <a16:creationId xmlns:a16="http://schemas.microsoft.com/office/drawing/2014/main" id="{B756D4B6-3814-4E02-AB98-08D3B49675BF}"/>
+              </a:ext>
+            </a:extLst>
+          </p:cNvPr>
+          <p:cNvSpPr>
+            <a:spLocks noGrp="1"/>
+          </p:cNvSpPr>
+          <p:nvPr>
+            <p:ph type="sldNum" sz="quarter" idx="4"/>
+          </p:nvPr>
+        </p:nvSpPr>
+        <p:spPr/>
+        <p:txBody>
+          <a:bodyPr/>
+          <a:lstStyle/>
+          <a:p>
+            <a:fld id="{5EE7099E-8998-4851-915A-4F4831808297}" type="slidenum">
+              <a:rPr lang="nl-NL" smtClean="0"/>
+              <a:pPr/>
+              <a:t>33</a:t>
+            </a:fld>
+            <a:endParaRPr lang="nl-NL"/>
+          </a:p>
+        </p:txBody>
+      </p:sp>
+      <p:sp>
+        <p:nvSpPr>
+          <p:cNvPr id="3" name="ZoneTexte 2">
+            <a:extLst>
+              <a:ext uri="{FF2B5EF4-FFF2-40B4-BE49-F238E27FC236}">
+                <a16:creationId xmlns:a16="http://schemas.microsoft.com/office/drawing/2014/main" id="{0C248AA7-6FCB-3F89-E3DD-C837A2826405}"/>
+              </a:ext>
+            </a:extLst>
+          </p:cNvPr>
+          <p:cNvSpPr txBox="1"/>
+          <p:nvPr/>
+        </p:nvSpPr>
+        <p:spPr>
+          <a:xfrm>
+            <a:off x="3692106" y="1699404"/>
+            <a:ext cx="0" cy="0"/>
+          </a:xfrm>
+          <a:prstGeom prst="rect">
+            <a:avLst/>
+          </a:prstGeom>
+          <a:noFill/>
+        </p:spPr>
+        <p:txBody>
+          <a:bodyPr wrap="none" lIns="108000" tIns="108000" rIns="108000" bIns="108000" rtlCol="0">
+            <a:noAutofit/>
+          </a:bodyPr>
+          <a:lstStyle/>
+          <a:p>
+            <a:endParaRPr lang="fr-FR" noProof="0" dirty="0" err="1">
+              <a:solidFill>
+                <a:schemeClr val="bg2"/>
+              </a:solidFill>
+            </a:endParaRPr>
+          </a:p>
+        </p:txBody>
+      </p:sp>
+      <p:sp>
+        <p:nvSpPr>
+          <p:cNvPr id="6" name="Vertical Text Placeholder 5">
+            <a:extLst>
+              <a:ext uri="{FF2B5EF4-FFF2-40B4-BE49-F238E27FC236}">
+                <a16:creationId xmlns:a16="http://schemas.microsoft.com/office/drawing/2014/main" id="{F8170739-5212-AEC7-557E-2E086A29A496}"/>
+              </a:ext>
+            </a:extLst>
+          </p:cNvPr>
+          <p:cNvSpPr>
+            <a:spLocks noGrp="1"/>
+          </p:cNvSpPr>
+          <p:nvPr>
+            <p:ph type="body" orient="vert" idx="1"/>
+          </p:nvPr>
+        </p:nvSpPr>
+        <p:spPr>
+          <a:xfrm>
+            <a:off x="404662" y="1143000"/>
+            <a:ext cx="11389023" cy="4795836"/>
+          </a:xfrm>
+        </p:spPr>
+        <p:txBody>
+          <a:bodyPr/>
+          <a:lstStyle/>
+          <a:p>
+            <a:endParaRPr lang="en-US" dirty="0"/>
+          </a:p>
+          <a:p>
+            <a:endParaRPr lang="en-US" dirty="0"/>
+          </a:p>
+          <a:p>
+            <a:pPr marL="180975" lvl="1" indent="0">
+              <a:buNone/>
+            </a:pPr>
+            <a:endParaRPr lang="en-US" dirty="0"/>
+          </a:p>
+          <a:p>
+            <a:pPr lvl="1"/>
+            <a:endParaRPr lang="en-US" dirty="0"/>
+          </a:p>
+          <a:p>
+            <a:endParaRPr lang="en-US" dirty="0"/>
+          </a:p>
+          <a:p>
+            <a:endParaRPr lang="en-US" dirty="0"/>
+          </a:p>
+          <a:p>
+            <a:endParaRPr lang="en-US" dirty="0"/>
+          </a:p>
+          <a:p>
+            <a:endParaRPr lang="en-US" dirty="0"/>
+          </a:p>
+          <a:p>
+            <a:pPr lvl="1"/>
+            <a:endParaRPr lang="en-US" dirty="0"/>
+          </a:p>
+          <a:p>
+            <a:pPr lvl="1"/>
+            <a:endParaRPr lang="en-US" dirty="0"/>
+          </a:p>
+          <a:p>
+            <a:pPr lvl="1"/>
+            <a:endParaRPr lang="en-US" dirty="0"/>
+          </a:p>
+          <a:p>
+            <a:pPr lvl="1"/>
+            <a:endParaRPr lang="en-US" dirty="0"/>
+          </a:p>
+          <a:p>
+            <a:endParaRPr lang="en-US" b="1" dirty="0"/>
+          </a:p>
+          <a:p>
+            <a:endParaRPr lang="en-US" dirty="0"/>
+          </a:p>
+        </p:txBody>
+      </p:sp>
+      <p:sp>
+        <p:nvSpPr>
+          <p:cNvPr id="4" name="Vertical Text Placeholder 5">
+            <a:extLst>
+              <a:ext uri="{FF2B5EF4-FFF2-40B4-BE49-F238E27FC236}">
+                <a16:creationId xmlns:a16="http://schemas.microsoft.com/office/drawing/2014/main" id="{A57D01D8-1D67-D654-0CFB-28A877FD85B9}"/>
+              </a:ext>
+            </a:extLst>
+          </p:cNvPr>
+          <p:cNvSpPr txBox="1">
+            <a:spLocks/>
+          </p:cNvSpPr>
+          <p:nvPr/>
+        </p:nvSpPr>
+        <p:spPr>
+          <a:xfrm>
+            <a:off x="557062" y="1295400"/>
+            <a:ext cx="11389023" cy="4795836"/>
+          </a:xfrm>
+          <a:prstGeom prst="rect">
+            <a:avLst/>
+          </a:prstGeom>
+        </p:spPr>
+        <p:txBody>
+          <a:bodyPr vert="horz" lIns="0" tIns="0" rIns="0" bIns="0" rtlCol="0">
+            <a:normAutofit/>
+          </a:bodyPr>
+          <a:lstStyle>
+            <a:lvl1pPr marL="180975" indent="-180975" algn="l" defTabSz="914400" rtl="0" eaLnBrk="1" latinLnBrk="0" hangingPunct="1">
+              <a:lnSpc>
+                <a:spcPct val="90000"/>
+              </a:lnSpc>
+              <a:spcBef>
+                <a:spcPts val="600"/>
+              </a:spcBef>
+              <a:spcAft>
+                <a:spcPts val="600"/>
+              </a:spcAft>
+              <a:buClr>
+                <a:schemeClr val="bg2"/>
+              </a:buClr>
+              <a:buFont typeface="Arial" panose="020B0604020202020204" pitchFamily="34" charset="0"/>
+              <a:buChar char="•"/>
+              <a:defRPr sz="1800" kern="1200">
+                <a:solidFill>
+                  <a:schemeClr val="bg2"/>
+                </a:solidFill>
+                <a:latin typeface="+mn-lt"/>
+                <a:ea typeface="+mn-ea"/>
+                <a:cs typeface="+mn-cs"/>
+              </a:defRPr>
+            </a:lvl1pPr>
+            <a:lvl2pPr marL="361950" indent="-180975" algn="l" defTabSz="914400" rtl="0" eaLnBrk="1" latinLnBrk="0" hangingPunct="1">
+              <a:lnSpc>
+                <a:spcPct val="90000"/>
+              </a:lnSpc>
+              <a:spcBef>
+                <a:spcPts val="600"/>
+              </a:spcBef>
+              <a:spcAft>
+                <a:spcPts val="600"/>
+              </a:spcAft>
+              <a:buClr>
+                <a:schemeClr val="bg2"/>
+              </a:buClr>
+              <a:buFont typeface="Arial" panose="020B0604020202020204" pitchFamily="34" charset="0"/>
+              <a:buChar char="-"/>
+              <a:defRPr sz="1600" kern="1200">
+                <a:solidFill>
+                  <a:schemeClr val="bg2"/>
+                </a:solidFill>
+                <a:latin typeface="+mn-lt"/>
+                <a:ea typeface="+mn-ea"/>
+                <a:cs typeface="+mn-cs"/>
+              </a:defRPr>
+            </a:lvl2pPr>
+            <a:lvl3pPr marL="0" indent="0" algn="l" defTabSz="914400" rtl="0" eaLnBrk="1" latinLnBrk="0" hangingPunct="1">
+              <a:lnSpc>
+                <a:spcPct val="90000"/>
+              </a:lnSpc>
+              <a:spcBef>
+                <a:spcPts val="600"/>
+              </a:spcBef>
+              <a:spcAft>
+                <a:spcPts val="600"/>
+              </a:spcAft>
+              <a:buFont typeface="Arial" panose="020B0604020202020204" pitchFamily="34" charset="0"/>
+              <a:buNone/>
+              <a:defRPr sz="1800" kern="1200">
+                <a:solidFill>
+                  <a:schemeClr val="bg2"/>
+                </a:solidFill>
+                <a:latin typeface="+mn-lt"/>
+                <a:ea typeface="+mn-ea"/>
+                <a:cs typeface="+mn-cs"/>
+              </a:defRPr>
+            </a:lvl3pPr>
+            <a:lvl4pPr marL="0" indent="0" algn="l" defTabSz="914400" rtl="0" eaLnBrk="1" latinLnBrk="0" hangingPunct="1">
+              <a:lnSpc>
+                <a:spcPct val="90000"/>
+              </a:lnSpc>
+              <a:spcBef>
+                <a:spcPts val="600"/>
+              </a:spcBef>
+              <a:spcAft>
+                <a:spcPts val="600"/>
+              </a:spcAft>
+              <a:buFont typeface="Arial" panose="020B0604020202020204" pitchFamily="34" charset="0"/>
+              <a:buNone/>
+              <a:defRPr sz="1800" b="1" kern="1200">
+                <a:solidFill>
+                  <a:schemeClr val="bg2"/>
+                </a:solidFill>
+                <a:latin typeface="+mn-lt"/>
+                <a:ea typeface="+mn-ea"/>
+                <a:cs typeface="+mn-cs"/>
+              </a:defRPr>
+            </a:lvl4pPr>
+            <a:lvl5pPr marL="0" indent="0" algn="l" defTabSz="914400" rtl="0" eaLnBrk="1" latinLnBrk="0" hangingPunct="1">
+              <a:lnSpc>
+                <a:spcPct val="90000"/>
+              </a:lnSpc>
+              <a:spcBef>
+                <a:spcPts val="600"/>
+              </a:spcBef>
+              <a:spcAft>
+                <a:spcPts val="600"/>
+              </a:spcAft>
+              <a:buFont typeface="Arial" panose="020B0604020202020204" pitchFamily="34" charset="0"/>
+              <a:buNone/>
+              <a:defRPr sz="1800" b="1" kern="1200" baseline="0">
+                <a:solidFill>
+                  <a:schemeClr val="tx2"/>
+                </a:solidFill>
+                <a:latin typeface="+mn-lt"/>
+                <a:ea typeface="+mn-ea"/>
+                <a:cs typeface="+mn-cs"/>
+              </a:defRPr>
+            </a:lvl5pPr>
+            <a:lvl6pPr marL="180975" indent="-180975" algn="l" defTabSz="914400" rtl="0" eaLnBrk="1" latinLnBrk="0" hangingPunct="1">
+              <a:lnSpc>
+                <a:spcPct val="90000"/>
+              </a:lnSpc>
+              <a:spcBef>
+                <a:spcPts val="600"/>
+              </a:spcBef>
+              <a:spcAft>
+                <a:spcPts val="600"/>
+              </a:spcAft>
+              <a:buClr>
+                <a:schemeClr val="bg2"/>
+              </a:buClr>
+              <a:buFont typeface="Arial" panose="020B0604020202020204" pitchFamily="34" charset="0"/>
+              <a:buChar char="•"/>
+              <a:defRPr sz="1800" kern="1200">
+                <a:solidFill>
+                  <a:schemeClr val="bg2"/>
+                </a:solidFill>
+                <a:latin typeface="+mn-lt"/>
+                <a:ea typeface="+mn-ea"/>
+                <a:cs typeface="+mn-cs"/>
+              </a:defRPr>
+            </a:lvl6pPr>
+            <a:lvl7pPr marL="361950" indent="-180975" algn="l" defTabSz="914400" rtl="0" eaLnBrk="1" latinLnBrk="0" hangingPunct="1">
+              <a:lnSpc>
+                <a:spcPct val="90000"/>
+              </a:lnSpc>
+              <a:spcBef>
+                <a:spcPts val="600"/>
+              </a:spcBef>
+              <a:spcAft>
+                <a:spcPts val="600"/>
+              </a:spcAft>
+              <a:buClr>
+                <a:schemeClr val="bg2"/>
+              </a:buClr>
+              <a:buFont typeface="Arial" panose="020B0604020202020204" pitchFamily="34" charset="0"/>
+              <a:buChar char="-"/>
+              <a:defRPr sz="1600" kern="1200">
+                <a:solidFill>
+                  <a:schemeClr val="bg2"/>
+                </a:solidFill>
+                <a:latin typeface="+mn-lt"/>
+                <a:ea typeface="+mn-ea"/>
+                <a:cs typeface="+mn-cs"/>
+              </a:defRPr>
+            </a:lvl7pPr>
+            <a:lvl8pPr marL="0" indent="0" algn="l" defTabSz="914400" rtl="0" eaLnBrk="1" latinLnBrk="0" hangingPunct="1">
+              <a:lnSpc>
+                <a:spcPct val="90000"/>
+              </a:lnSpc>
+              <a:spcBef>
+                <a:spcPts val="600"/>
+              </a:spcBef>
+              <a:spcAft>
+                <a:spcPts val="600"/>
+              </a:spcAft>
+              <a:buFont typeface="Arial" panose="020B0604020202020204" pitchFamily="34" charset="0"/>
+              <a:buNone/>
+              <a:defRPr sz="1600" kern="1200">
+                <a:solidFill>
+                  <a:schemeClr val="bg2"/>
+                </a:solidFill>
+                <a:latin typeface="+mn-lt"/>
+                <a:ea typeface="+mn-ea"/>
+                <a:cs typeface="+mn-cs"/>
+              </a:defRPr>
+            </a:lvl8pPr>
+            <a:lvl9pPr marL="0" indent="0" algn="l" defTabSz="914400" rtl="0" eaLnBrk="1" latinLnBrk="0" hangingPunct="1">
+              <a:lnSpc>
+                <a:spcPct val="90000"/>
+              </a:lnSpc>
+              <a:spcBef>
+                <a:spcPts val="600"/>
+              </a:spcBef>
+              <a:spcAft>
+                <a:spcPts val="600"/>
+              </a:spcAft>
+              <a:buFont typeface="Arial" panose="020B0604020202020204" pitchFamily="34" charset="0"/>
+              <a:buNone/>
+              <a:defRPr sz="1800" b="1" kern="1200" baseline="0">
+                <a:solidFill>
+                  <a:schemeClr val="bg2"/>
+                </a:solidFill>
+                <a:latin typeface="+mn-lt"/>
+                <a:ea typeface="+mn-ea"/>
+                <a:cs typeface="+mn-cs"/>
+              </a:defRPr>
+            </a:lvl9pPr>
+          </a:lstStyle>
+          <a:p>
+            <a:endParaRPr lang="en-US" sz="2200" b="1" dirty="0"/>
+          </a:p>
+          <a:p>
+            <a:pPr marL="180975" lvl="1" indent="0">
+              <a:buNone/>
+            </a:pPr>
+            <a:endParaRPr lang="en-US" sz="2200" dirty="0"/>
+          </a:p>
+          <a:p>
+            <a:pPr lvl="1"/>
+            <a:endParaRPr lang="en-US" sz="2200" dirty="0"/>
+          </a:p>
+          <a:p>
+            <a:pPr marL="0" indent="0">
+              <a:buFont typeface="Arial" panose="020B0604020202020204" pitchFamily="34" charset="0"/>
+              <a:buNone/>
+            </a:pPr>
+            <a:endParaRPr lang="en-US" dirty="0"/>
+          </a:p>
+          <a:p>
+            <a:endParaRPr lang="en-US" dirty="0"/>
+          </a:p>
+          <a:p>
+            <a:pPr marL="180975" lvl="1" indent="0">
+              <a:buFont typeface="Arial" panose="020B0604020202020204" pitchFamily="34" charset="0"/>
+              <a:buNone/>
+            </a:pPr>
+            <a:endParaRPr lang="en-US" dirty="0"/>
+          </a:p>
+          <a:p>
+            <a:pPr lvl="1"/>
+            <a:endParaRPr lang="en-US" dirty="0"/>
+          </a:p>
+          <a:p>
+            <a:endParaRPr lang="en-US" dirty="0"/>
+          </a:p>
+          <a:p>
+            <a:endParaRPr lang="en-US" dirty="0"/>
+          </a:p>
+          <a:p>
+            <a:endParaRPr lang="en-US" dirty="0"/>
+          </a:p>
+          <a:p>
+            <a:endParaRPr lang="en-US" dirty="0"/>
+          </a:p>
+          <a:p>
+            <a:pPr lvl="1"/>
+            <a:endParaRPr lang="en-US" dirty="0"/>
+          </a:p>
+          <a:p>
+            <a:pPr lvl="1"/>
+            <a:endParaRPr lang="en-US" dirty="0"/>
+          </a:p>
+          <a:p>
+            <a:pPr lvl="1"/>
+            <a:endParaRPr lang="en-US" dirty="0"/>
+          </a:p>
+          <a:p>
+            <a:pPr lvl="1"/>
+            <a:endParaRPr lang="en-US" dirty="0"/>
+          </a:p>
+          <a:p>
+            <a:endParaRPr lang="en-US" b="1" dirty="0"/>
+          </a:p>
+          <a:p>
+            <a:endParaRPr lang="en-US" dirty="0"/>
+          </a:p>
+        </p:txBody>
+      </p:sp>
+      <p:sp>
+        <p:nvSpPr>
+          <p:cNvPr id="7" name="Vertical Text Placeholder 5">
+            <a:extLst>
+              <a:ext uri="{FF2B5EF4-FFF2-40B4-BE49-F238E27FC236}">
+                <a16:creationId xmlns:a16="http://schemas.microsoft.com/office/drawing/2014/main" id="{DFE0C10A-165E-4BE2-39D7-55B90C940362}"/>
+              </a:ext>
+            </a:extLst>
+          </p:cNvPr>
+          <p:cNvSpPr txBox="1">
+            <a:spLocks/>
+          </p:cNvSpPr>
+          <p:nvPr/>
+        </p:nvSpPr>
+        <p:spPr>
+          <a:xfrm>
+            <a:off x="436592" y="1199890"/>
+            <a:ext cx="11389023" cy="4795836"/>
+          </a:xfrm>
+          <a:prstGeom prst="rect">
+            <a:avLst/>
+          </a:prstGeom>
+        </p:spPr>
+        <p:txBody>
+          <a:bodyPr vert="horz" lIns="0" tIns="0" rIns="0" bIns="0" rtlCol="0">
+            <a:normAutofit/>
+          </a:bodyPr>
+          <a:lstStyle>
+            <a:lvl1pPr marL="180975" indent="-180975" algn="l" defTabSz="914400" rtl="0" eaLnBrk="1" latinLnBrk="0" hangingPunct="1">
+              <a:lnSpc>
+                <a:spcPct val="90000"/>
+              </a:lnSpc>
+              <a:spcBef>
+                <a:spcPts val="600"/>
+              </a:spcBef>
+              <a:spcAft>
+                <a:spcPts val="600"/>
+              </a:spcAft>
+              <a:buClr>
+                <a:schemeClr val="bg2"/>
+              </a:buClr>
+              <a:buFont typeface="Arial" panose="020B0604020202020204" pitchFamily="34" charset="0"/>
+              <a:buChar char="•"/>
+              <a:defRPr sz="1800" kern="1200">
+                <a:solidFill>
+                  <a:schemeClr val="bg2"/>
+                </a:solidFill>
+                <a:latin typeface="+mn-lt"/>
+                <a:ea typeface="+mn-ea"/>
+                <a:cs typeface="+mn-cs"/>
+              </a:defRPr>
+            </a:lvl1pPr>
+            <a:lvl2pPr marL="361950" indent="-180975" algn="l" defTabSz="914400" rtl="0" eaLnBrk="1" latinLnBrk="0" hangingPunct="1">
+              <a:lnSpc>
+                <a:spcPct val="90000"/>
+              </a:lnSpc>
+              <a:spcBef>
+                <a:spcPts val="600"/>
+              </a:spcBef>
+              <a:spcAft>
+                <a:spcPts val="600"/>
+              </a:spcAft>
+              <a:buClr>
+                <a:schemeClr val="bg2"/>
+              </a:buClr>
+              <a:buFont typeface="Arial" panose="020B0604020202020204" pitchFamily="34" charset="0"/>
+              <a:buChar char="-"/>
+              <a:defRPr sz="1600" kern="1200">
+                <a:solidFill>
+                  <a:schemeClr val="bg2"/>
+                </a:solidFill>
+                <a:latin typeface="+mn-lt"/>
+                <a:ea typeface="+mn-ea"/>
+                <a:cs typeface="+mn-cs"/>
+              </a:defRPr>
+            </a:lvl2pPr>
+            <a:lvl3pPr marL="0" indent="0" algn="l" defTabSz="914400" rtl="0" eaLnBrk="1" latinLnBrk="0" hangingPunct="1">
+              <a:lnSpc>
+                <a:spcPct val="90000"/>
+              </a:lnSpc>
+              <a:spcBef>
+                <a:spcPts val="600"/>
+              </a:spcBef>
+              <a:spcAft>
+                <a:spcPts val="600"/>
+              </a:spcAft>
+              <a:buFont typeface="Arial" panose="020B0604020202020204" pitchFamily="34" charset="0"/>
+              <a:buNone/>
+              <a:defRPr sz="1800" kern="1200">
+                <a:solidFill>
+                  <a:schemeClr val="bg2"/>
+                </a:solidFill>
+                <a:latin typeface="+mn-lt"/>
+                <a:ea typeface="+mn-ea"/>
+                <a:cs typeface="+mn-cs"/>
+              </a:defRPr>
+            </a:lvl3pPr>
+            <a:lvl4pPr marL="0" indent="0" algn="l" defTabSz="914400" rtl="0" eaLnBrk="1" latinLnBrk="0" hangingPunct="1">
+              <a:lnSpc>
+                <a:spcPct val="90000"/>
+              </a:lnSpc>
+              <a:spcBef>
+                <a:spcPts val="600"/>
+              </a:spcBef>
+              <a:spcAft>
+                <a:spcPts val="600"/>
+              </a:spcAft>
+              <a:buFont typeface="Arial" panose="020B0604020202020204" pitchFamily="34" charset="0"/>
+              <a:buNone/>
+              <a:defRPr sz="1800" b="1" kern="1200">
+                <a:solidFill>
+                  <a:schemeClr val="bg2"/>
+                </a:solidFill>
+                <a:latin typeface="+mn-lt"/>
+                <a:ea typeface="+mn-ea"/>
+                <a:cs typeface="+mn-cs"/>
+              </a:defRPr>
+            </a:lvl4pPr>
+            <a:lvl5pPr marL="0" indent="0" algn="l" defTabSz="914400" rtl="0" eaLnBrk="1" latinLnBrk="0" hangingPunct="1">
+              <a:lnSpc>
+                <a:spcPct val="90000"/>
+              </a:lnSpc>
+              <a:spcBef>
+                <a:spcPts val="600"/>
+              </a:spcBef>
+              <a:spcAft>
+                <a:spcPts val="600"/>
+              </a:spcAft>
+              <a:buFont typeface="Arial" panose="020B0604020202020204" pitchFamily="34" charset="0"/>
+              <a:buNone/>
+              <a:defRPr sz="1800" b="1" kern="1200" baseline="0">
+                <a:solidFill>
+                  <a:schemeClr val="tx2"/>
+                </a:solidFill>
+                <a:latin typeface="+mn-lt"/>
+                <a:ea typeface="+mn-ea"/>
+                <a:cs typeface="+mn-cs"/>
+              </a:defRPr>
+            </a:lvl5pPr>
+            <a:lvl6pPr marL="180975" indent="-180975" algn="l" defTabSz="914400" rtl="0" eaLnBrk="1" latinLnBrk="0" hangingPunct="1">
+              <a:lnSpc>
+                <a:spcPct val="90000"/>
+              </a:lnSpc>
+              <a:spcBef>
+                <a:spcPts val="600"/>
+              </a:spcBef>
+              <a:spcAft>
+                <a:spcPts val="600"/>
+              </a:spcAft>
+              <a:buClr>
+                <a:schemeClr val="bg2"/>
+              </a:buClr>
+              <a:buFont typeface="Arial" panose="020B0604020202020204" pitchFamily="34" charset="0"/>
+              <a:buChar char="•"/>
+              <a:defRPr sz="1800" kern="1200">
+                <a:solidFill>
+                  <a:schemeClr val="bg2"/>
+                </a:solidFill>
+                <a:latin typeface="+mn-lt"/>
+                <a:ea typeface="+mn-ea"/>
+                <a:cs typeface="+mn-cs"/>
+              </a:defRPr>
+            </a:lvl6pPr>
+            <a:lvl7pPr marL="361950" indent="-180975" algn="l" defTabSz="914400" rtl="0" eaLnBrk="1" latinLnBrk="0" hangingPunct="1">
+              <a:lnSpc>
+                <a:spcPct val="90000"/>
+              </a:lnSpc>
+              <a:spcBef>
+                <a:spcPts val="600"/>
+              </a:spcBef>
+              <a:spcAft>
+                <a:spcPts val="600"/>
+              </a:spcAft>
+              <a:buClr>
+                <a:schemeClr val="bg2"/>
+              </a:buClr>
+              <a:buFont typeface="Arial" panose="020B0604020202020204" pitchFamily="34" charset="0"/>
+              <a:buChar char="-"/>
+              <a:defRPr sz="1600" kern="1200">
+                <a:solidFill>
+                  <a:schemeClr val="bg2"/>
+                </a:solidFill>
+                <a:latin typeface="+mn-lt"/>
+                <a:ea typeface="+mn-ea"/>
+                <a:cs typeface="+mn-cs"/>
+              </a:defRPr>
+            </a:lvl7pPr>
+            <a:lvl8pPr marL="0" indent="0" algn="l" defTabSz="914400" rtl="0" eaLnBrk="1" latinLnBrk="0" hangingPunct="1">
+              <a:lnSpc>
+                <a:spcPct val="90000"/>
+              </a:lnSpc>
+              <a:spcBef>
+                <a:spcPts val="600"/>
+              </a:spcBef>
+              <a:spcAft>
+                <a:spcPts val="600"/>
+              </a:spcAft>
+              <a:buFont typeface="Arial" panose="020B0604020202020204" pitchFamily="34" charset="0"/>
+              <a:buNone/>
+              <a:defRPr sz="1600" kern="1200">
+                <a:solidFill>
+                  <a:schemeClr val="bg2"/>
+                </a:solidFill>
+                <a:latin typeface="+mn-lt"/>
+                <a:ea typeface="+mn-ea"/>
+                <a:cs typeface="+mn-cs"/>
+              </a:defRPr>
+            </a:lvl8pPr>
+            <a:lvl9pPr marL="0" indent="0" algn="l" defTabSz="914400" rtl="0" eaLnBrk="1" latinLnBrk="0" hangingPunct="1">
+              <a:lnSpc>
+                <a:spcPct val="90000"/>
+              </a:lnSpc>
+              <a:spcBef>
+                <a:spcPts val="600"/>
+              </a:spcBef>
+              <a:spcAft>
+                <a:spcPts val="600"/>
+              </a:spcAft>
+              <a:buFont typeface="Arial" panose="020B0604020202020204" pitchFamily="34" charset="0"/>
+              <a:buNone/>
+              <a:defRPr sz="1800" b="1" kern="1200" baseline="0">
+                <a:solidFill>
+                  <a:schemeClr val="bg2"/>
+                </a:solidFill>
+                <a:latin typeface="+mn-lt"/>
+                <a:ea typeface="+mn-ea"/>
+                <a:cs typeface="+mn-cs"/>
+              </a:defRPr>
+            </a:lvl9pPr>
+          </a:lstStyle>
+          <a:p>
+            <a:pPr marL="0" indent="0">
+              <a:buNone/>
+            </a:pPr>
+            <a:r>
+              <a:rPr lang="en-US" sz="2400" dirty="0"/>
+              <a:t>Quelle </a:t>
+            </a:r>
+            <a:r>
+              <a:rPr lang="en-US" sz="2400" dirty="0" err="1"/>
+              <a:t>est</a:t>
+            </a:r>
+            <a:r>
+              <a:rPr lang="en-US" sz="2400" dirty="0"/>
+              <a:t> la </a:t>
+            </a:r>
+            <a:r>
+              <a:rPr lang="en-US" sz="2400" dirty="0" err="1"/>
+              <a:t>somme</a:t>
+            </a:r>
+            <a:r>
+              <a:rPr lang="en-US" sz="2400" dirty="0"/>
+              <a:t> </a:t>
+            </a:r>
+            <a:r>
+              <a:rPr lang="en-US" sz="2400" dirty="0" err="1"/>
+              <a:t>totale</a:t>
+            </a:r>
+            <a:r>
+              <a:rPr lang="en-US" sz="2400" dirty="0"/>
+              <a:t> des </a:t>
+            </a:r>
+            <a:r>
+              <a:rPr lang="en-US" sz="2400" dirty="0" err="1"/>
+              <a:t>tarifs</a:t>
+            </a:r>
+            <a:r>
+              <a:rPr lang="en-US" sz="2400" dirty="0"/>
+              <a:t> </a:t>
+            </a:r>
+            <a:r>
+              <a:rPr lang="en-US" sz="2400" dirty="0" err="1"/>
+              <a:t>payés</a:t>
+            </a:r>
+            <a:r>
+              <a:rPr lang="en-US" sz="2400" dirty="0"/>
+              <a:t> par </a:t>
+            </a:r>
+            <a:r>
+              <a:rPr lang="en-US" sz="2400" dirty="0" err="1"/>
+              <a:t>classe</a:t>
+            </a:r>
+            <a:r>
+              <a:rPr lang="en-US" sz="2400" dirty="0"/>
+              <a:t> ?</a:t>
+            </a:r>
+          </a:p>
+          <a:p>
+            <a:pPr lvl="1"/>
+            <a:endParaRPr lang="en-US" sz="2200" dirty="0"/>
+          </a:p>
+          <a:p>
+            <a:pPr marL="0" indent="0">
+              <a:buFont typeface="Arial" panose="020B0604020202020204" pitchFamily="34" charset="0"/>
+              <a:buNone/>
+            </a:pPr>
+            <a:endParaRPr lang="en-US" dirty="0"/>
+          </a:p>
+          <a:p>
+            <a:endParaRPr lang="en-US" dirty="0"/>
+          </a:p>
+          <a:p>
+            <a:pPr marL="180975" lvl="1" indent="0">
+              <a:buFont typeface="Arial" panose="020B0604020202020204" pitchFamily="34" charset="0"/>
+              <a:buNone/>
+            </a:pPr>
+            <a:endParaRPr lang="en-US" dirty="0"/>
+          </a:p>
+          <a:p>
+            <a:pPr lvl="1"/>
+            <a:endParaRPr lang="en-US" dirty="0"/>
+          </a:p>
+          <a:p>
+            <a:endParaRPr lang="en-US" dirty="0"/>
+          </a:p>
+          <a:p>
+            <a:endParaRPr lang="en-US" dirty="0"/>
+          </a:p>
+          <a:p>
+            <a:endParaRPr lang="en-US" dirty="0"/>
+          </a:p>
+          <a:p>
+            <a:endParaRPr lang="en-US" dirty="0"/>
+          </a:p>
+          <a:p>
+            <a:pPr lvl="1"/>
+            <a:endParaRPr lang="en-US" dirty="0"/>
+          </a:p>
+          <a:p>
+            <a:pPr lvl="1"/>
+            <a:endParaRPr lang="en-US" dirty="0"/>
+          </a:p>
+          <a:p>
+            <a:pPr lvl="1"/>
+            <a:endParaRPr lang="en-US" dirty="0"/>
+          </a:p>
+          <a:p>
+            <a:pPr lvl="1"/>
+            <a:endParaRPr lang="en-US" dirty="0"/>
+          </a:p>
+          <a:p>
+            <a:endParaRPr lang="en-US" b="1" dirty="0"/>
+          </a:p>
+          <a:p>
+            <a:endParaRPr lang="en-US" dirty="0"/>
+          </a:p>
+        </p:txBody>
+      </p:sp>
+      <p:pic>
+        <p:nvPicPr>
+          <p:cNvPr id="9" name="Image 8">
+            <a:extLst>
+              <a:ext uri="{FF2B5EF4-FFF2-40B4-BE49-F238E27FC236}">
+                <a16:creationId xmlns:a16="http://schemas.microsoft.com/office/drawing/2014/main" id="{42F91167-B3F5-B19B-AA15-BC7A4814B1AE}"/>
+              </a:ext>
+            </a:extLst>
+          </p:cNvPr>
+          <p:cNvPicPr>
+            <a:picLocks noChangeAspect="1"/>
+          </p:cNvPicPr>
+          <p:nvPr/>
+        </p:nvPicPr>
+        <p:blipFill>
+          <a:blip r:embed="rId2"/>
+          <a:stretch>
+            <a:fillRect/>
+          </a:stretch>
+        </p:blipFill>
+        <p:spPr>
+          <a:xfrm>
+            <a:off x="1831975" y="1529605"/>
+            <a:ext cx="8159811" cy="4503502"/>
+          </a:xfrm>
+          <a:prstGeom prst="rect">
+            <a:avLst/>
+          </a:prstGeom>
+        </p:spPr>
+      </p:pic>
+    </p:spTree>
+    <p:extLst>
+      <p:ext uri="{BB962C8B-B14F-4D97-AF65-F5344CB8AC3E}">
+        <p14:creationId xmlns:p14="http://schemas.microsoft.com/office/powerpoint/2010/main" val="1345207440"/>
+      </p:ext>
+    </p:extLst>
+  </p:cSld>
+  <p:clrMapOvr>
+    <a:masterClrMapping/>
+  </p:clrMapOvr>
+  <p:transition spd="slow">
+    <p:wipe dir="r"/>
+  </p:transition>
+</p:sld>
+</file>
+
+<file path=ppt/slides/slide34.xml><?xml version="1.0" encoding="utf-8"?>
 <p:sld xmlns:a="http://schemas.openxmlformats.org/drawingml/2006/main" xmlns:r="http://schemas.openxmlformats.org/officeDocument/2006/relationships" xmlns:p="http://schemas.openxmlformats.org/presentationml/2006/main">
   <p:cSld>
     <p:spTree>
@@ -24365,31 +28693,22 @@
             <p:ph type="title"/>
           </p:nvPr>
         </p:nvSpPr>
-        <p:spPr>
-          <a:xfrm>
-            <a:off x="917575" y="990600"/>
-            <a:ext cx="10798224" cy="1718320"/>
-          </a:xfrm>
-        </p:spPr>
+        <p:spPr/>
         <p:txBody>
           <a:bodyPr/>
           <a:lstStyle/>
           <a:p>
             <a:r>
+              <a:rPr lang="nl-NL" dirty="0"/>
+              <a:t>Merci de </a:t>
+            </a:r>
+            <a:r>
               <a:rPr lang="nl-NL" dirty="0" err="1"/>
-              <a:t>Qu’est-ce</a:t>
+              <a:t>votre</a:t>
             </a:r>
             <a:r>
               <a:rPr lang="nl-NL" dirty="0"/>
-              <a:t> que les </a:t>
-            </a:r>
-            <a:r>
-              <a:rPr lang="nl-NL" dirty="0" err="1"/>
-              <a:t>données</a:t>
-            </a:r>
-            <a:r>
-              <a:rPr lang="nl-NL" dirty="0"/>
-              <a:t> Big Data ?</a:t>
+              <a:t> attention !</a:t>
             </a:r>
           </a:p>
         </p:txBody>
@@ -24412,7 +28731,7 @@
             <a:fld id="{5EE7099E-8998-4851-915A-4F4831808297}" type="slidenum">
               <a:rPr lang="nl-NL" smtClean="0"/>
               <a:pPr/>
-              <a:t>3</a:t>
+              <a:t>34</a:t>
             </a:fld>
             <a:endParaRPr lang="nl-NL"/>
           </a:p>
@@ -24457,29 +28776,29 @@
           <a:p>
             <a:pPr lvl="0"/>
             <a:r>
-              <a:rPr lang="en-GB" dirty="0"/>
-              <a:t>CY Tech – Charles-Meldhine Madi Mnemoi, </a:t>
-            </a:r>
-            <a:r>
-              <a:rPr lang="en-GB" dirty="0" err="1"/>
-              <a:t>Brahim</a:t>
-            </a:r>
-            <a:r>
-              <a:rPr lang="en-GB" dirty="0"/>
-              <a:t> </a:t>
-            </a:r>
-            <a:r>
-              <a:rPr lang="en-GB" dirty="0" err="1"/>
-              <a:t>Kerdad</a:t>
-            </a:r>
-            <a:endParaRPr lang="en-GB" dirty="0"/>
+              <a:rPr lang="en-GB" noProof="0" dirty="0"/>
+              <a:t>CY Tech – Charles-</a:t>
+            </a:r>
+            <a:r>
+              <a:rPr lang="en-GB" noProof="0" dirty="0" err="1"/>
+              <a:t>Meldhine</a:t>
+            </a:r>
+            <a:r>
+              <a:rPr lang="en-GB" noProof="0" dirty="0"/>
+              <a:t> Madi </a:t>
+            </a:r>
+            <a:r>
+              <a:rPr lang="en-GB" noProof="0" dirty="0" err="1"/>
+              <a:t>Mnemoi</a:t>
+            </a:r>
+            <a:endParaRPr lang="en-GB" noProof="0" dirty="0"/>
           </a:p>
         </p:txBody>
       </p:sp>
     </p:spTree>
     <p:extLst>
       <p:ext uri="{BB962C8B-B14F-4D97-AF65-F5344CB8AC3E}">
-        <p14:creationId xmlns:p14="http://schemas.microsoft.com/office/powerpoint/2010/main" val="4150905695"/>
+        <p14:creationId xmlns:p14="http://schemas.microsoft.com/office/powerpoint/2010/main" val="2746029914"/>
       </p:ext>
     </p:extLst>
   </p:cSld>

</xml_diff>

<commit_message>
Finish slides for data analysis part (#11)
Co-authored-by: Charles-Meldhine Madi Mnemoi <charlesmeldhine.madimnemoi@servier.com>
</commit_message>
<xml_diff>
--- a/presentation.pptx
+++ b/presentation.pptx
@@ -5,10 +5,10 @@
     <p:sldMasterId id="2147483648" r:id="rId1"/>
   </p:sldMasterIdLst>
   <p:notesMasterIdLst>
-    <p:notesMasterId r:id="rId31"/>
+    <p:notesMasterId r:id="rId36"/>
   </p:notesMasterIdLst>
   <p:handoutMasterIdLst>
-    <p:handoutMasterId r:id="rId32"/>
+    <p:handoutMasterId r:id="rId37"/>
   </p:handoutMasterIdLst>
   <p:sldIdLst>
     <p:sldId id="256" r:id="rId2"/>
@@ -39,12 +39,17 @@
     <p:sldId id="322" r:id="rId27"/>
     <p:sldId id="323" r:id="rId28"/>
     <p:sldId id="324" r:id="rId29"/>
-    <p:sldId id="269" r:id="rId30"/>
+    <p:sldId id="325" r:id="rId30"/>
+    <p:sldId id="326" r:id="rId31"/>
+    <p:sldId id="327" r:id="rId32"/>
+    <p:sldId id="328" r:id="rId33"/>
+    <p:sldId id="329" r:id="rId34"/>
+    <p:sldId id="269" r:id="rId35"/>
   </p:sldIdLst>
   <p:sldSz cx="12198350" cy="6858000"/>
   <p:notesSz cx="9872663" cy="6742113"/>
   <p:custDataLst>
-    <p:tags r:id="rId33"/>
+    <p:tags r:id="rId38"/>
   </p:custDataLst>
   <p:defaultTextStyle>
     <a:defPPr>
@@ -23799,53 +23804,24 @@
             </a:lvl9pPr>
           </a:lstStyle>
           <a:p>
-            <a:r>
-              <a:rPr lang="en-US" sz="2400" dirty="0" err="1"/>
-              <a:t>Quels</a:t>
-            </a:r>
-            <a:r>
-              <a:rPr lang="en-US" sz="2400" dirty="0"/>
-              <a:t> </a:t>
-            </a:r>
-            <a:r>
-              <a:rPr lang="en-US" sz="2400" dirty="0" err="1"/>
-              <a:t>sont</a:t>
-            </a:r>
-            <a:r>
-              <a:rPr lang="en-US" sz="2400" dirty="0"/>
-              <a:t> les 5 </a:t>
-            </a:r>
-            <a:r>
-              <a:rPr lang="en-US" sz="2400" dirty="0" err="1"/>
-              <a:t>passagers</a:t>
-            </a:r>
-            <a:r>
-              <a:rPr lang="en-US" sz="2400" dirty="0"/>
-              <a:t> du Titanic les plus </a:t>
-            </a:r>
-            <a:r>
-              <a:rPr lang="en-US" sz="2400" dirty="0" err="1"/>
-              <a:t>âgés</a:t>
-            </a:r>
-            <a:r>
-              <a:rPr lang="en-US" sz="2400" dirty="0"/>
-              <a:t> ?</a:t>
-            </a:r>
-          </a:p>
-          <a:p>
             <a:pPr marL="0" indent="0">
               <a:buNone/>
             </a:pPr>
-            <a:endParaRPr lang="en-US" sz="2400" dirty="0"/>
-          </a:p>
-          <a:p>
             <a:r>
               <a:rPr lang="en-US" sz="2400" dirty="0" err="1"/>
-              <a:t>Combien</a:t>
+              <a:t>Quels</a:t>
             </a:r>
             <a:r>
               <a:rPr lang="en-US" sz="2400" dirty="0"/>
-              <a:t> de </a:t>
+              <a:t> </a:t>
+            </a:r>
+            <a:r>
+              <a:rPr lang="en-US" sz="2400" dirty="0" err="1"/>
+              <a:t>sont</a:t>
+            </a:r>
+            <a:r>
+              <a:rPr lang="en-US" sz="2400" dirty="0"/>
+              <a:t> les 5 </a:t>
             </a:r>
             <a:r>
               <a:rPr lang="en-US" sz="2400" dirty="0" err="1"/>
@@ -23853,90 +23829,16 @@
             </a:r>
             <a:r>
               <a:rPr lang="en-US" sz="2400" dirty="0"/>
-              <a:t> par </a:t>
+              <a:t> du Titanic les plus </a:t>
             </a:r>
             <a:r>
               <a:rPr lang="en-US" sz="2400" dirty="0" err="1"/>
-              <a:t>classe</a:t>
-            </a:r>
-            <a:r>
-              <a:rPr lang="en-US" sz="2400" dirty="0"/>
-              <a:t> </a:t>
-            </a:r>
-            <a:r>
-              <a:rPr lang="en-US" sz="2400" dirty="0" err="1"/>
-              <a:t>ont</a:t>
-            </a:r>
-            <a:r>
-              <a:rPr lang="en-US" sz="2400" dirty="0"/>
-              <a:t> </a:t>
-            </a:r>
-            <a:r>
-              <a:rPr lang="en-US" sz="2400" dirty="0" err="1"/>
-              <a:t>survécu</a:t>
+              <a:t>âgés</a:t>
             </a:r>
             <a:r>
               <a:rPr lang="en-US" sz="2400" dirty="0"/>
               <a:t> ?</a:t>
             </a:r>
-          </a:p>
-          <a:p>
-            <a:pPr marL="0" indent="0">
-              <a:buNone/>
-            </a:pPr>
-            <a:endParaRPr lang="en-US" sz="2400" dirty="0"/>
-          </a:p>
-          <a:p>
-            <a:r>
-              <a:rPr lang="en-US" sz="2400" dirty="0"/>
-              <a:t>Quelle </a:t>
-            </a:r>
-            <a:r>
-              <a:rPr lang="en-US" sz="2400" dirty="0" err="1"/>
-              <a:t>est</a:t>
-            </a:r>
-            <a:r>
-              <a:rPr lang="en-US" sz="2400" dirty="0"/>
-              <a:t> la </a:t>
-            </a:r>
-            <a:r>
-              <a:rPr lang="en-US" sz="2400" dirty="0" err="1"/>
-              <a:t>somme</a:t>
-            </a:r>
-            <a:r>
-              <a:rPr lang="en-US" sz="2400" dirty="0"/>
-              <a:t> total des </a:t>
-            </a:r>
-            <a:r>
-              <a:rPr lang="en-US" sz="2400" dirty="0" err="1"/>
-              <a:t>tarifs</a:t>
-            </a:r>
-            <a:r>
-              <a:rPr lang="en-US" sz="2400" dirty="0"/>
-              <a:t> </a:t>
-            </a:r>
-            <a:r>
-              <a:rPr lang="en-US" sz="2400" dirty="0" err="1"/>
-              <a:t>payés</a:t>
-            </a:r>
-            <a:r>
-              <a:rPr lang="en-US" sz="2400" dirty="0"/>
-              <a:t> par </a:t>
-            </a:r>
-            <a:r>
-              <a:rPr lang="en-US" sz="2400" dirty="0" err="1"/>
-              <a:t>classe</a:t>
-            </a:r>
-            <a:r>
-              <a:rPr lang="en-US" sz="2400" dirty="0"/>
-              <a:t> ?</a:t>
-            </a:r>
-            <a:endParaRPr lang="en-US" sz="2200" b="1" dirty="0"/>
-          </a:p>
-          <a:p>
-            <a:pPr marL="180975" lvl="1" indent="0">
-              <a:buNone/>
-            </a:pPr>
             <a:endParaRPr lang="en-US" sz="2200" dirty="0"/>
           </a:p>
           <a:p>
@@ -24035,6 +23937,881 @@
       </p:grpSpPr>
       <p:sp>
         <p:nvSpPr>
+          <p:cNvPr id="2" name="Title 1">
+            <a:extLst>
+              <a:ext uri="{FF2B5EF4-FFF2-40B4-BE49-F238E27FC236}">
+                <a16:creationId xmlns:a16="http://schemas.microsoft.com/office/drawing/2014/main" id="{04C5DF06-5F42-4296-B27B-4F79E0DB836B}"/>
+              </a:ext>
+            </a:extLst>
+          </p:cNvPr>
+          <p:cNvSpPr>
+            <a:spLocks noGrp="1"/>
+          </p:cNvSpPr>
+          <p:nvPr>
+            <p:ph type="title"/>
+          </p:nvPr>
+        </p:nvSpPr>
+        <p:spPr/>
+        <p:txBody>
+          <a:bodyPr/>
+          <a:lstStyle/>
+          <a:p>
+            <a:r>
+              <a:rPr lang="en-US" sz="3600" dirty="0" err="1"/>
+              <a:t>Exercices</a:t>
+            </a:r>
+            <a:r>
+              <a:rPr lang="en-US" sz="3600" dirty="0"/>
+              <a:t> sur le jeu de </a:t>
+            </a:r>
+            <a:r>
+              <a:rPr lang="en-US" sz="3600" dirty="0" err="1"/>
+              <a:t>données</a:t>
+            </a:r>
+            <a:r>
+              <a:rPr lang="en-US" sz="3600" dirty="0"/>
+              <a:t> Titanic</a:t>
+            </a:r>
+          </a:p>
+        </p:txBody>
+      </p:sp>
+      <p:sp>
+        <p:nvSpPr>
+          <p:cNvPr id="5" name="Slide Number Placeholder 4">
+            <a:extLst>
+              <a:ext uri="{FF2B5EF4-FFF2-40B4-BE49-F238E27FC236}">
+                <a16:creationId xmlns:a16="http://schemas.microsoft.com/office/drawing/2014/main" id="{B756D4B6-3814-4E02-AB98-08D3B49675BF}"/>
+              </a:ext>
+            </a:extLst>
+          </p:cNvPr>
+          <p:cNvSpPr>
+            <a:spLocks noGrp="1"/>
+          </p:cNvSpPr>
+          <p:nvPr>
+            <p:ph type="sldNum" sz="quarter" idx="4"/>
+          </p:nvPr>
+        </p:nvSpPr>
+        <p:spPr/>
+        <p:txBody>
+          <a:bodyPr/>
+          <a:lstStyle/>
+          <a:p>
+            <a:fld id="{5EE7099E-8998-4851-915A-4F4831808297}" type="slidenum">
+              <a:rPr lang="nl-NL" smtClean="0"/>
+              <a:pPr/>
+              <a:t>29</a:t>
+            </a:fld>
+            <a:endParaRPr lang="nl-NL"/>
+          </a:p>
+        </p:txBody>
+      </p:sp>
+      <p:sp>
+        <p:nvSpPr>
+          <p:cNvPr id="3" name="ZoneTexte 2">
+            <a:extLst>
+              <a:ext uri="{FF2B5EF4-FFF2-40B4-BE49-F238E27FC236}">
+                <a16:creationId xmlns:a16="http://schemas.microsoft.com/office/drawing/2014/main" id="{0C248AA7-6FCB-3F89-E3DD-C837A2826405}"/>
+              </a:ext>
+            </a:extLst>
+          </p:cNvPr>
+          <p:cNvSpPr txBox="1"/>
+          <p:nvPr/>
+        </p:nvSpPr>
+        <p:spPr>
+          <a:xfrm>
+            <a:off x="3692106" y="1699404"/>
+            <a:ext cx="0" cy="0"/>
+          </a:xfrm>
+          <a:prstGeom prst="rect">
+            <a:avLst/>
+          </a:prstGeom>
+          <a:noFill/>
+        </p:spPr>
+        <p:txBody>
+          <a:bodyPr wrap="none" lIns="108000" tIns="108000" rIns="108000" bIns="108000" rtlCol="0">
+            <a:noAutofit/>
+          </a:bodyPr>
+          <a:lstStyle/>
+          <a:p>
+            <a:endParaRPr lang="fr-FR" noProof="0" dirty="0" err="1">
+              <a:solidFill>
+                <a:schemeClr val="bg2"/>
+              </a:solidFill>
+            </a:endParaRPr>
+          </a:p>
+        </p:txBody>
+      </p:sp>
+      <p:sp>
+        <p:nvSpPr>
+          <p:cNvPr id="6" name="Vertical Text Placeholder 5">
+            <a:extLst>
+              <a:ext uri="{FF2B5EF4-FFF2-40B4-BE49-F238E27FC236}">
+                <a16:creationId xmlns:a16="http://schemas.microsoft.com/office/drawing/2014/main" id="{F8170739-5212-AEC7-557E-2E086A29A496}"/>
+              </a:ext>
+            </a:extLst>
+          </p:cNvPr>
+          <p:cNvSpPr>
+            <a:spLocks noGrp="1"/>
+          </p:cNvSpPr>
+          <p:nvPr>
+            <p:ph type="body" orient="vert" idx="1"/>
+          </p:nvPr>
+        </p:nvSpPr>
+        <p:spPr>
+          <a:xfrm>
+            <a:off x="404662" y="1143000"/>
+            <a:ext cx="11389023" cy="4795836"/>
+          </a:xfrm>
+        </p:spPr>
+        <p:txBody>
+          <a:bodyPr/>
+          <a:lstStyle/>
+          <a:p>
+            <a:endParaRPr lang="en-US" dirty="0"/>
+          </a:p>
+          <a:p>
+            <a:endParaRPr lang="en-US" dirty="0"/>
+          </a:p>
+          <a:p>
+            <a:pPr marL="180975" lvl="1" indent="0">
+              <a:buNone/>
+            </a:pPr>
+            <a:endParaRPr lang="en-US" dirty="0"/>
+          </a:p>
+          <a:p>
+            <a:pPr lvl="1"/>
+            <a:endParaRPr lang="en-US" dirty="0"/>
+          </a:p>
+          <a:p>
+            <a:endParaRPr lang="en-US" dirty="0"/>
+          </a:p>
+          <a:p>
+            <a:endParaRPr lang="en-US" dirty="0"/>
+          </a:p>
+          <a:p>
+            <a:endParaRPr lang="en-US" dirty="0"/>
+          </a:p>
+          <a:p>
+            <a:endParaRPr lang="en-US" dirty="0"/>
+          </a:p>
+          <a:p>
+            <a:pPr lvl="1"/>
+            <a:endParaRPr lang="en-US" dirty="0"/>
+          </a:p>
+          <a:p>
+            <a:pPr lvl="1"/>
+            <a:endParaRPr lang="en-US" dirty="0"/>
+          </a:p>
+          <a:p>
+            <a:pPr lvl="1"/>
+            <a:endParaRPr lang="en-US" dirty="0"/>
+          </a:p>
+          <a:p>
+            <a:pPr lvl="1"/>
+            <a:endParaRPr lang="en-US" dirty="0"/>
+          </a:p>
+          <a:p>
+            <a:endParaRPr lang="en-US" b="1" dirty="0"/>
+          </a:p>
+          <a:p>
+            <a:endParaRPr lang="en-US" dirty="0"/>
+          </a:p>
+        </p:txBody>
+      </p:sp>
+      <p:sp>
+        <p:nvSpPr>
+          <p:cNvPr id="4" name="Vertical Text Placeholder 5">
+            <a:extLst>
+              <a:ext uri="{FF2B5EF4-FFF2-40B4-BE49-F238E27FC236}">
+                <a16:creationId xmlns:a16="http://schemas.microsoft.com/office/drawing/2014/main" id="{A57D01D8-1D67-D654-0CFB-28A877FD85B9}"/>
+              </a:ext>
+            </a:extLst>
+          </p:cNvPr>
+          <p:cNvSpPr txBox="1">
+            <a:spLocks/>
+          </p:cNvSpPr>
+          <p:nvPr/>
+        </p:nvSpPr>
+        <p:spPr>
+          <a:xfrm>
+            <a:off x="557062" y="1295400"/>
+            <a:ext cx="11389023" cy="4795836"/>
+          </a:xfrm>
+          <a:prstGeom prst="rect">
+            <a:avLst/>
+          </a:prstGeom>
+        </p:spPr>
+        <p:txBody>
+          <a:bodyPr vert="horz" lIns="0" tIns="0" rIns="0" bIns="0" rtlCol="0">
+            <a:normAutofit/>
+          </a:bodyPr>
+          <a:lstStyle>
+            <a:lvl1pPr marL="180975" indent="-180975" algn="l" defTabSz="914400" rtl="0" eaLnBrk="1" latinLnBrk="0" hangingPunct="1">
+              <a:lnSpc>
+                <a:spcPct val="90000"/>
+              </a:lnSpc>
+              <a:spcBef>
+                <a:spcPts val="600"/>
+              </a:spcBef>
+              <a:spcAft>
+                <a:spcPts val="600"/>
+              </a:spcAft>
+              <a:buClr>
+                <a:schemeClr val="bg2"/>
+              </a:buClr>
+              <a:buFont typeface="Arial" panose="020B0604020202020204" pitchFamily="34" charset="0"/>
+              <a:buChar char="•"/>
+              <a:defRPr sz="1800" kern="1200">
+                <a:solidFill>
+                  <a:schemeClr val="bg2"/>
+                </a:solidFill>
+                <a:latin typeface="+mn-lt"/>
+                <a:ea typeface="+mn-ea"/>
+                <a:cs typeface="+mn-cs"/>
+              </a:defRPr>
+            </a:lvl1pPr>
+            <a:lvl2pPr marL="361950" indent="-180975" algn="l" defTabSz="914400" rtl="0" eaLnBrk="1" latinLnBrk="0" hangingPunct="1">
+              <a:lnSpc>
+                <a:spcPct val="90000"/>
+              </a:lnSpc>
+              <a:spcBef>
+                <a:spcPts val="600"/>
+              </a:spcBef>
+              <a:spcAft>
+                <a:spcPts val="600"/>
+              </a:spcAft>
+              <a:buClr>
+                <a:schemeClr val="bg2"/>
+              </a:buClr>
+              <a:buFont typeface="Arial" panose="020B0604020202020204" pitchFamily="34" charset="0"/>
+              <a:buChar char="-"/>
+              <a:defRPr sz="1600" kern="1200">
+                <a:solidFill>
+                  <a:schemeClr val="bg2"/>
+                </a:solidFill>
+                <a:latin typeface="+mn-lt"/>
+                <a:ea typeface="+mn-ea"/>
+                <a:cs typeface="+mn-cs"/>
+              </a:defRPr>
+            </a:lvl2pPr>
+            <a:lvl3pPr marL="0" indent="0" algn="l" defTabSz="914400" rtl="0" eaLnBrk="1" latinLnBrk="0" hangingPunct="1">
+              <a:lnSpc>
+                <a:spcPct val="90000"/>
+              </a:lnSpc>
+              <a:spcBef>
+                <a:spcPts val="600"/>
+              </a:spcBef>
+              <a:spcAft>
+                <a:spcPts val="600"/>
+              </a:spcAft>
+              <a:buFont typeface="Arial" panose="020B0604020202020204" pitchFamily="34" charset="0"/>
+              <a:buNone/>
+              <a:defRPr sz="1800" kern="1200">
+                <a:solidFill>
+                  <a:schemeClr val="bg2"/>
+                </a:solidFill>
+                <a:latin typeface="+mn-lt"/>
+                <a:ea typeface="+mn-ea"/>
+                <a:cs typeface="+mn-cs"/>
+              </a:defRPr>
+            </a:lvl3pPr>
+            <a:lvl4pPr marL="0" indent="0" algn="l" defTabSz="914400" rtl="0" eaLnBrk="1" latinLnBrk="0" hangingPunct="1">
+              <a:lnSpc>
+                <a:spcPct val="90000"/>
+              </a:lnSpc>
+              <a:spcBef>
+                <a:spcPts val="600"/>
+              </a:spcBef>
+              <a:spcAft>
+                <a:spcPts val="600"/>
+              </a:spcAft>
+              <a:buFont typeface="Arial" panose="020B0604020202020204" pitchFamily="34" charset="0"/>
+              <a:buNone/>
+              <a:defRPr sz="1800" b="1" kern="1200">
+                <a:solidFill>
+                  <a:schemeClr val="bg2"/>
+                </a:solidFill>
+                <a:latin typeface="+mn-lt"/>
+                <a:ea typeface="+mn-ea"/>
+                <a:cs typeface="+mn-cs"/>
+              </a:defRPr>
+            </a:lvl4pPr>
+            <a:lvl5pPr marL="0" indent="0" algn="l" defTabSz="914400" rtl="0" eaLnBrk="1" latinLnBrk="0" hangingPunct="1">
+              <a:lnSpc>
+                <a:spcPct val="90000"/>
+              </a:lnSpc>
+              <a:spcBef>
+                <a:spcPts val="600"/>
+              </a:spcBef>
+              <a:spcAft>
+                <a:spcPts val="600"/>
+              </a:spcAft>
+              <a:buFont typeface="Arial" panose="020B0604020202020204" pitchFamily="34" charset="0"/>
+              <a:buNone/>
+              <a:defRPr sz="1800" b="1" kern="1200" baseline="0">
+                <a:solidFill>
+                  <a:schemeClr val="tx2"/>
+                </a:solidFill>
+                <a:latin typeface="+mn-lt"/>
+                <a:ea typeface="+mn-ea"/>
+                <a:cs typeface="+mn-cs"/>
+              </a:defRPr>
+            </a:lvl5pPr>
+            <a:lvl6pPr marL="180975" indent="-180975" algn="l" defTabSz="914400" rtl="0" eaLnBrk="1" latinLnBrk="0" hangingPunct="1">
+              <a:lnSpc>
+                <a:spcPct val="90000"/>
+              </a:lnSpc>
+              <a:spcBef>
+                <a:spcPts val="600"/>
+              </a:spcBef>
+              <a:spcAft>
+                <a:spcPts val="600"/>
+              </a:spcAft>
+              <a:buClr>
+                <a:schemeClr val="bg2"/>
+              </a:buClr>
+              <a:buFont typeface="Arial" panose="020B0604020202020204" pitchFamily="34" charset="0"/>
+              <a:buChar char="•"/>
+              <a:defRPr sz="1800" kern="1200">
+                <a:solidFill>
+                  <a:schemeClr val="bg2"/>
+                </a:solidFill>
+                <a:latin typeface="+mn-lt"/>
+                <a:ea typeface="+mn-ea"/>
+                <a:cs typeface="+mn-cs"/>
+              </a:defRPr>
+            </a:lvl6pPr>
+            <a:lvl7pPr marL="361950" indent="-180975" algn="l" defTabSz="914400" rtl="0" eaLnBrk="1" latinLnBrk="0" hangingPunct="1">
+              <a:lnSpc>
+                <a:spcPct val="90000"/>
+              </a:lnSpc>
+              <a:spcBef>
+                <a:spcPts val="600"/>
+              </a:spcBef>
+              <a:spcAft>
+                <a:spcPts val="600"/>
+              </a:spcAft>
+              <a:buClr>
+                <a:schemeClr val="bg2"/>
+              </a:buClr>
+              <a:buFont typeface="Arial" panose="020B0604020202020204" pitchFamily="34" charset="0"/>
+              <a:buChar char="-"/>
+              <a:defRPr sz="1600" kern="1200">
+                <a:solidFill>
+                  <a:schemeClr val="bg2"/>
+                </a:solidFill>
+                <a:latin typeface="+mn-lt"/>
+                <a:ea typeface="+mn-ea"/>
+                <a:cs typeface="+mn-cs"/>
+              </a:defRPr>
+            </a:lvl7pPr>
+            <a:lvl8pPr marL="0" indent="0" algn="l" defTabSz="914400" rtl="0" eaLnBrk="1" latinLnBrk="0" hangingPunct="1">
+              <a:lnSpc>
+                <a:spcPct val="90000"/>
+              </a:lnSpc>
+              <a:spcBef>
+                <a:spcPts val="600"/>
+              </a:spcBef>
+              <a:spcAft>
+                <a:spcPts val="600"/>
+              </a:spcAft>
+              <a:buFont typeface="Arial" panose="020B0604020202020204" pitchFamily="34" charset="0"/>
+              <a:buNone/>
+              <a:defRPr sz="1600" kern="1200">
+                <a:solidFill>
+                  <a:schemeClr val="bg2"/>
+                </a:solidFill>
+                <a:latin typeface="+mn-lt"/>
+                <a:ea typeface="+mn-ea"/>
+                <a:cs typeface="+mn-cs"/>
+              </a:defRPr>
+            </a:lvl8pPr>
+            <a:lvl9pPr marL="0" indent="0" algn="l" defTabSz="914400" rtl="0" eaLnBrk="1" latinLnBrk="0" hangingPunct="1">
+              <a:lnSpc>
+                <a:spcPct val="90000"/>
+              </a:lnSpc>
+              <a:spcBef>
+                <a:spcPts val="600"/>
+              </a:spcBef>
+              <a:spcAft>
+                <a:spcPts val="600"/>
+              </a:spcAft>
+              <a:buFont typeface="Arial" panose="020B0604020202020204" pitchFamily="34" charset="0"/>
+              <a:buNone/>
+              <a:defRPr sz="1800" b="1" kern="1200" baseline="0">
+                <a:solidFill>
+                  <a:schemeClr val="bg2"/>
+                </a:solidFill>
+                <a:latin typeface="+mn-lt"/>
+                <a:ea typeface="+mn-ea"/>
+                <a:cs typeface="+mn-cs"/>
+              </a:defRPr>
+            </a:lvl9pPr>
+          </a:lstStyle>
+          <a:p>
+            <a:endParaRPr lang="en-US" sz="2200" b="1" dirty="0"/>
+          </a:p>
+          <a:p>
+            <a:pPr marL="180975" lvl="1" indent="0">
+              <a:buNone/>
+            </a:pPr>
+            <a:endParaRPr lang="en-US" sz="2200" dirty="0"/>
+          </a:p>
+          <a:p>
+            <a:pPr lvl="1"/>
+            <a:endParaRPr lang="en-US" sz="2200" dirty="0"/>
+          </a:p>
+          <a:p>
+            <a:pPr marL="0" indent="0">
+              <a:buFont typeface="Arial" panose="020B0604020202020204" pitchFamily="34" charset="0"/>
+              <a:buNone/>
+            </a:pPr>
+            <a:endParaRPr lang="en-US" dirty="0"/>
+          </a:p>
+          <a:p>
+            <a:endParaRPr lang="en-US" dirty="0"/>
+          </a:p>
+          <a:p>
+            <a:pPr marL="180975" lvl="1" indent="0">
+              <a:buFont typeface="Arial" panose="020B0604020202020204" pitchFamily="34" charset="0"/>
+              <a:buNone/>
+            </a:pPr>
+            <a:endParaRPr lang="en-US" dirty="0"/>
+          </a:p>
+          <a:p>
+            <a:pPr lvl="1"/>
+            <a:endParaRPr lang="en-US" dirty="0"/>
+          </a:p>
+          <a:p>
+            <a:endParaRPr lang="en-US" dirty="0"/>
+          </a:p>
+          <a:p>
+            <a:endParaRPr lang="en-US" dirty="0"/>
+          </a:p>
+          <a:p>
+            <a:endParaRPr lang="en-US" dirty="0"/>
+          </a:p>
+          <a:p>
+            <a:endParaRPr lang="en-US" dirty="0"/>
+          </a:p>
+          <a:p>
+            <a:pPr lvl="1"/>
+            <a:endParaRPr lang="en-US" dirty="0"/>
+          </a:p>
+          <a:p>
+            <a:pPr lvl="1"/>
+            <a:endParaRPr lang="en-US" dirty="0"/>
+          </a:p>
+          <a:p>
+            <a:pPr lvl="1"/>
+            <a:endParaRPr lang="en-US" dirty="0"/>
+          </a:p>
+          <a:p>
+            <a:pPr lvl="1"/>
+            <a:endParaRPr lang="en-US" dirty="0"/>
+          </a:p>
+          <a:p>
+            <a:endParaRPr lang="en-US" b="1" dirty="0"/>
+          </a:p>
+          <a:p>
+            <a:endParaRPr lang="en-US" dirty="0"/>
+          </a:p>
+        </p:txBody>
+      </p:sp>
+      <p:sp>
+        <p:nvSpPr>
+          <p:cNvPr id="7" name="Vertical Text Placeholder 5">
+            <a:extLst>
+              <a:ext uri="{FF2B5EF4-FFF2-40B4-BE49-F238E27FC236}">
+                <a16:creationId xmlns:a16="http://schemas.microsoft.com/office/drawing/2014/main" id="{DFE0C10A-165E-4BE2-39D7-55B90C940362}"/>
+              </a:ext>
+            </a:extLst>
+          </p:cNvPr>
+          <p:cNvSpPr txBox="1">
+            <a:spLocks/>
+          </p:cNvSpPr>
+          <p:nvPr/>
+        </p:nvSpPr>
+        <p:spPr>
+          <a:xfrm>
+            <a:off x="436592" y="1199890"/>
+            <a:ext cx="11389023" cy="4795836"/>
+          </a:xfrm>
+          <a:prstGeom prst="rect">
+            <a:avLst/>
+          </a:prstGeom>
+        </p:spPr>
+        <p:txBody>
+          <a:bodyPr vert="horz" lIns="0" tIns="0" rIns="0" bIns="0" rtlCol="0">
+            <a:normAutofit/>
+          </a:bodyPr>
+          <a:lstStyle>
+            <a:lvl1pPr marL="180975" indent="-180975" algn="l" defTabSz="914400" rtl="0" eaLnBrk="1" latinLnBrk="0" hangingPunct="1">
+              <a:lnSpc>
+                <a:spcPct val="90000"/>
+              </a:lnSpc>
+              <a:spcBef>
+                <a:spcPts val="600"/>
+              </a:spcBef>
+              <a:spcAft>
+                <a:spcPts val="600"/>
+              </a:spcAft>
+              <a:buClr>
+                <a:schemeClr val="bg2"/>
+              </a:buClr>
+              <a:buFont typeface="Arial" panose="020B0604020202020204" pitchFamily="34" charset="0"/>
+              <a:buChar char="•"/>
+              <a:defRPr sz="1800" kern="1200">
+                <a:solidFill>
+                  <a:schemeClr val="bg2"/>
+                </a:solidFill>
+                <a:latin typeface="+mn-lt"/>
+                <a:ea typeface="+mn-ea"/>
+                <a:cs typeface="+mn-cs"/>
+              </a:defRPr>
+            </a:lvl1pPr>
+            <a:lvl2pPr marL="361950" indent="-180975" algn="l" defTabSz="914400" rtl="0" eaLnBrk="1" latinLnBrk="0" hangingPunct="1">
+              <a:lnSpc>
+                <a:spcPct val="90000"/>
+              </a:lnSpc>
+              <a:spcBef>
+                <a:spcPts val="600"/>
+              </a:spcBef>
+              <a:spcAft>
+                <a:spcPts val="600"/>
+              </a:spcAft>
+              <a:buClr>
+                <a:schemeClr val="bg2"/>
+              </a:buClr>
+              <a:buFont typeface="Arial" panose="020B0604020202020204" pitchFamily="34" charset="0"/>
+              <a:buChar char="-"/>
+              <a:defRPr sz="1600" kern="1200">
+                <a:solidFill>
+                  <a:schemeClr val="bg2"/>
+                </a:solidFill>
+                <a:latin typeface="+mn-lt"/>
+                <a:ea typeface="+mn-ea"/>
+                <a:cs typeface="+mn-cs"/>
+              </a:defRPr>
+            </a:lvl2pPr>
+            <a:lvl3pPr marL="0" indent="0" algn="l" defTabSz="914400" rtl="0" eaLnBrk="1" latinLnBrk="0" hangingPunct="1">
+              <a:lnSpc>
+                <a:spcPct val="90000"/>
+              </a:lnSpc>
+              <a:spcBef>
+                <a:spcPts val="600"/>
+              </a:spcBef>
+              <a:spcAft>
+                <a:spcPts val="600"/>
+              </a:spcAft>
+              <a:buFont typeface="Arial" panose="020B0604020202020204" pitchFamily="34" charset="0"/>
+              <a:buNone/>
+              <a:defRPr sz="1800" kern="1200">
+                <a:solidFill>
+                  <a:schemeClr val="bg2"/>
+                </a:solidFill>
+                <a:latin typeface="+mn-lt"/>
+                <a:ea typeface="+mn-ea"/>
+                <a:cs typeface="+mn-cs"/>
+              </a:defRPr>
+            </a:lvl3pPr>
+            <a:lvl4pPr marL="0" indent="0" algn="l" defTabSz="914400" rtl="0" eaLnBrk="1" latinLnBrk="0" hangingPunct="1">
+              <a:lnSpc>
+                <a:spcPct val="90000"/>
+              </a:lnSpc>
+              <a:spcBef>
+                <a:spcPts val="600"/>
+              </a:spcBef>
+              <a:spcAft>
+                <a:spcPts val="600"/>
+              </a:spcAft>
+              <a:buFont typeface="Arial" panose="020B0604020202020204" pitchFamily="34" charset="0"/>
+              <a:buNone/>
+              <a:defRPr sz="1800" b="1" kern="1200">
+                <a:solidFill>
+                  <a:schemeClr val="bg2"/>
+                </a:solidFill>
+                <a:latin typeface="+mn-lt"/>
+                <a:ea typeface="+mn-ea"/>
+                <a:cs typeface="+mn-cs"/>
+              </a:defRPr>
+            </a:lvl4pPr>
+            <a:lvl5pPr marL="0" indent="0" algn="l" defTabSz="914400" rtl="0" eaLnBrk="1" latinLnBrk="0" hangingPunct="1">
+              <a:lnSpc>
+                <a:spcPct val="90000"/>
+              </a:lnSpc>
+              <a:spcBef>
+                <a:spcPts val="600"/>
+              </a:spcBef>
+              <a:spcAft>
+                <a:spcPts val="600"/>
+              </a:spcAft>
+              <a:buFont typeface="Arial" panose="020B0604020202020204" pitchFamily="34" charset="0"/>
+              <a:buNone/>
+              <a:defRPr sz="1800" b="1" kern="1200" baseline="0">
+                <a:solidFill>
+                  <a:schemeClr val="tx2"/>
+                </a:solidFill>
+                <a:latin typeface="+mn-lt"/>
+                <a:ea typeface="+mn-ea"/>
+                <a:cs typeface="+mn-cs"/>
+              </a:defRPr>
+            </a:lvl5pPr>
+            <a:lvl6pPr marL="180975" indent="-180975" algn="l" defTabSz="914400" rtl="0" eaLnBrk="1" latinLnBrk="0" hangingPunct="1">
+              <a:lnSpc>
+                <a:spcPct val="90000"/>
+              </a:lnSpc>
+              <a:spcBef>
+                <a:spcPts val="600"/>
+              </a:spcBef>
+              <a:spcAft>
+                <a:spcPts val="600"/>
+              </a:spcAft>
+              <a:buClr>
+                <a:schemeClr val="bg2"/>
+              </a:buClr>
+              <a:buFont typeface="Arial" panose="020B0604020202020204" pitchFamily="34" charset="0"/>
+              <a:buChar char="•"/>
+              <a:defRPr sz="1800" kern="1200">
+                <a:solidFill>
+                  <a:schemeClr val="bg2"/>
+                </a:solidFill>
+                <a:latin typeface="+mn-lt"/>
+                <a:ea typeface="+mn-ea"/>
+                <a:cs typeface="+mn-cs"/>
+              </a:defRPr>
+            </a:lvl6pPr>
+            <a:lvl7pPr marL="361950" indent="-180975" algn="l" defTabSz="914400" rtl="0" eaLnBrk="1" latinLnBrk="0" hangingPunct="1">
+              <a:lnSpc>
+                <a:spcPct val="90000"/>
+              </a:lnSpc>
+              <a:spcBef>
+                <a:spcPts val="600"/>
+              </a:spcBef>
+              <a:spcAft>
+                <a:spcPts val="600"/>
+              </a:spcAft>
+              <a:buClr>
+                <a:schemeClr val="bg2"/>
+              </a:buClr>
+              <a:buFont typeface="Arial" panose="020B0604020202020204" pitchFamily="34" charset="0"/>
+              <a:buChar char="-"/>
+              <a:defRPr sz="1600" kern="1200">
+                <a:solidFill>
+                  <a:schemeClr val="bg2"/>
+                </a:solidFill>
+                <a:latin typeface="+mn-lt"/>
+                <a:ea typeface="+mn-ea"/>
+                <a:cs typeface="+mn-cs"/>
+              </a:defRPr>
+            </a:lvl7pPr>
+            <a:lvl8pPr marL="0" indent="0" algn="l" defTabSz="914400" rtl="0" eaLnBrk="1" latinLnBrk="0" hangingPunct="1">
+              <a:lnSpc>
+                <a:spcPct val="90000"/>
+              </a:lnSpc>
+              <a:spcBef>
+                <a:spcPts val="600"/>
+              </a:spcBef>
+              <a:spcAft>
+                <a:spcPts val="600"/>
+              </a:spcAft>
+              <a:buFont typeface="Arial" panose="020B0604020202020204" pitchFamily="34" charset="0"/>
+              <a:buNone/>
+              <a:defRPr sz="1600" kern="1200">
+                <a:solidFill>
+                  <a:schemeClr val="bg2"/>
+                </a:solidFill>
+                <a:latin typeface="+mn-lt"/>
+                <a:ea typeface="+mn-ea"/>
+                <a:cs typeface="+mn-cs"/>
+              </a:defRPr>
+            </a:lvl8pPr>
+            <a:lvl9pPr marL="0" indent="0" algn="l" defTabSz="914400" rtl="0" eaLnBrk="1" latinLnBrk="0" hangingPunct="1">
+              <a:lnSpc>
+                <a:spcPct val="90000"/>
+              </a:lnSpc>
+              <a:spcBef>
+                <a:spcPts val="600"/>
+              </a:spcBef>
+              <a:spcAft>
+                <a:spcPts val="600"/>
+              </a:spcAft>
+              <a:buFont typeface="Arial" panose="020B0604020202020204" pitchFamily="34" charset="0"/>
+              <a:buNone/>
+              <a:defRPr sz="1800" b="1" kern="1200" baseline="0">
+                <a:solidFill>
+                  <a:schemeClr val="bg2"/>
+                </a:solidFill>
+                <a:latin typeface="+mn-lt"/>
+                <a:ea typeface="+mn-ea"/>
+                <a:cs typeface="+mn-cs"/>
+              </a:defRPr>
+            </a:lvl9pPr>
+          </a:lstStyle>
+          <a:p>
+            <a:pPr marL="0" indent="0">
+              <a:buNone/>
+            </a:pPr>
+            <a:r>
+              <a:rPr lang="en-US" sz="2400" dirty="0" err="1"/>
+              <a:t>Quels</a:t>
+            </a:r>
+            <a:r>
+              <a:rPr lang="en-US" sz="2400" dirty="0"/>
+              <a:t> </a:t>
+            </a:r>
+            <a:r>
+              <a:rPr lang="en-US" sz="2400" dirty="0" err="1"/>
+              <a:t>sont</a:t>
+            </a:r>
+            <a:r>
+              <a:rPr lang="en-US" sz="2400" dirty="0"/>
+              <a:t> les 5 </a:t>
+            </a:r>
+            <a:r>
+              <a:rPr lang="en-US" sz="2400" dirty="0" err="1"/>
+              <a:t>passagers</a:t>
+            </a:r>
+            <a:r>
+              <a:rPr lang="en-US" sz="2400" dirty="0"/>
+              <a:t> du Titanic les plus </a:t>
+            </a:r>
+            <a:r>
+              <a:rPr lang="en-US" sz="2400" dirty="0" err="1"/>
+              <a:t>âgés</a:t>
+            </a:r>
+            <a:r>
+              <a:rPr lang="en-US" sz="2400" dirty="0"/>
+              <a:t> ?</a:t>
+            </a:r>
+            <a:endParaRPr lang="en-US" sz="2200" dirty="0"/>
+          </a:p>
+          <a:p>
+            <a:pPr lvl="1"/>
+            <a:endParaRPr lang="en-US" sz="2200" dirty="0"/>
+          </a:p>
+          <a:p>
+            <a:pPr marL="0" indent="0">
+              <a:buFont typeface="Arial" panose="020B0604020202020204" pitchFamily="34" charset="0"/>
+              <a:buNone/>
+            </a:pPr>
+            <a:endParaRPr lang="en-US" dirty="0"/>
+          </a:p>
+          <a:p>
+            <a:endParaRPr lang="en-US" dirty="0"/>
+          </a:p>
+          <a:p>
+            <a:pPr marL="180975" lvl="1" indent="0">
+              <a:buFont typeface="Arial" panose="020B0604020202020204" pitchFamily="34" charset="0"/>
+              <a:buNone/>
+            </a:pPr>
+            <a:endParaRPr lang="en-US" dirty="0"/>
+          </a:p>
+          <a:p>
+            <a:pPr lvl="1"/>
+            <a:endParaRPr lang="en-US" dirty="0"/>
+          </a:p>
+          <a:p>
+            <a:endParaRPr lang="en-US" dirty="0"/>
+          </a:p>
+          <a:p>
+            <a:endParaRPr lang="en-US" dirty="0"/>
+          </a:p>
+          <a:p>
+            <a:endParaRPr lang="en-US" dirty="0"/>
+          </a:p>
+          <a:p>
+            <a:endParaRPr lang="en-US" dirty="0"/>
+          </a:p>
+          <a:p>
+            <a:pPr lvl="1"/>
+            <a:endParaRPr lang="en-US" dirty="0"/>
+          </a:p>
+          <a:p>
+            <a:pPr lvl="1"/>
+            <a:endParaRPr lang="en-US" dirty="0"/>
+          </a:p>
+          <a:p>
+            <a:pPr lvl="1"/>
+            <a:endParaRPr lang="en-US" dirty="0"/>
+          </a:p>
+          <a:p>
+            <a:pPr lvl="1"/>
+            <a:endParaRPr lang="en-US" dirty="0"/>
+          </a:p>
+          <a:p>
+            <a:endParaRPr lang="en-US" b="1" dirty="0"/>
+          </a:p>
+          <a:p>
+            <a:endParaRPr lang="en-US" dirty="0"/>
+          </a:p>
+        </p:txBody>
+      </p:sp>
+      <p:pic>
+        <p:nvPicPr>
+          <p:cNvPr id="10" name="Image 9">
+            <a:extLst>
+              <a:ext uri="{FF2B5EF4-FFF2-40B4-BE49-F238E27FC236}">
+                <a16:creationId xmlns:a16="http://schemas.microsoft.com/office/drawing/2014/main" id="{E4B3FE10-B365-6A2F-190A-5F245EC7897B}"/>
+              </a:ext>
+            </a:extLst>
+          </p:cNvPr>
+          <p:cNvPicPr>
+            <a:picLocks noChangeAspect="1"/>
+          </p:cNvPicPr>
+          <p:nvPr/>
+        </p:nvPicPr>
+        <p:blipFill>
+          <a:blip r:embed="rId2"/>
+          <a:stretch>
+            <a:fillRect/>
+          </a:stretch>
+        </p:blipFill>
+        <p:spPr>
+          <a:xfrm>
+            <a:off x="1984375" y="1600200"/>
+            <a:ext cx="6856650" cy="4167188"/>
+          </a:xfrm>
+          <a:prstGeom prst="rect">
+            <a:avLst/>
+          </a:prstGeom>
+        </p:spPr>
+      </p:pic>
+    </p:spTree>
+    <p:extLst>
+      <p:ext uri="{BB962C8B-B14F-4D97-AF65-F5344CB8AC3E}">
+        <p14:creationId xmlns:p14="http://schemas.microsoft.com/office/powerpoint/2010/main" val="1100440059"/>
+      </p:ext>
+    </p:extLst>
+  </p:cSld>
+  <p:clrMapOvr>
+    <a:masterClrMapping/>
+  </p:clrMapOvr>
+  <p:transition spd="slow">
+    <p:wipe dir="r"/>
+  </p:transition>
+</p:sld>
+</file>
+
+<file path=ppt/slides/slide3.xml><?xml version="1.0" encoding="utf-8"?>
+<p:sld xmlns:a="http://schemas.openxmlformats.org/drawingml/2006/main" xmlns:r="http://schemas.openxmlformats.org/officeDocument/2006/relationships" xmlns:p="http://schemas.openxmlformats.org/presentationml/2006/main">
+  <p:cSld>
+    <p:spTree>
+      <p:nvGrpSpPr>
+        <p:cNvPr id="1" name=""/>
+        <p:cNvGrpSpPr/>
+        <p:nvPr/>
+      </p:nvGrpSpPr>
+      <p:grpSpPr>
+        <a:xfrm>
+          <a:off x="0" y="0"/>
+          <a:ext cx="0" cy="0"/>
+          <a:chOff x="0" y="0"/>
+          <a:chExt cx="0" cy="0"/>
+        </a:xfrm>
+      </p:grpSpPr>
+      <p:sp>
+        <p:nvSpPr>
           <p:cNvPr id="6" name="Tijdelijke aanduiding voor tekst 5"/>
           <p:cNvSpPr>
             <a:spLocks noGrp="1"/>
@@ -24062,22 +24839,31 @@
             <p:ph type="title"/>
           </p:nvPr>
         </p:nvSpPr>
-        <p:spPr/>
+        <p:spPr>
+          <a:xfrm>
+            <a:off x="917575" y="990600"/>
+            <a:ext cx="10798224" cy="1718320"/>
+          </a:xfrm>
+        </p:spPr>
         <p:txBody>
           <a:bodyPr/>
           <a:lstStyle/>
           <a:p>
             <a:r>
+              <a:rPr lang="nl-NL" dirty="0" err="1"/>
+              <a:t>Qu’est-ce</a:t>
+            </a:r>
+            <a:r>
               <a:rPr lang="nl-NL" dirty="0"/>
-              <a:t>Merci de </a:t>
+              <a:t> que les </a:t>
             </a:r>
             <a:r>
               <a:rPr lang="nl-NL" dirty="0" err="1"/>
-              <a:t>votre</a:t>
+              <a:t>données</a:t>
             </a:r>
             <a:r>
               <a:rPr lang="nl-NL" dirty="0"/>
-              <a:t> attention !</a:t>
+              <a:t> Big Data ?</a:t>
             </a:r>
           </a:p>
         </p:txBody>
@@ -24100,7 +24886,7 @@
             <a:fld id="{5EE7099E-8998-4851-915A-4F4831808297}" type="slidenum">
               <a:rPr lang="nl-NL" smtClean="0"/>
               <a:pPr/>
-              <a:t>29</a:t>
+              <a:t>3</a:t>
             </a:fld>
             <a:endParaRPr lang="nl-NL"/>
           </a:p>
@@ -24145,29 +24931,29 @@
           <a:p>
             <a:pPr lvl="0"/>
             <a:r>
-              <a:rPr lang="en-GB" noProof="0" dirty="0"/>
-              <a:t>CY Tech – Charles-</a:t>
-            </a:r>
-            <a:r>
-              <a:rPr lang="en-GB" noProof="0" dirty="0" err="1"/>
-              <a:t>Meldhine</a:t>
-            </a:r>
-            <a:r>
-              <a:rPr lang="en-GB" noProof="0" dirty="0"/>
-              <a:t> Madi </a:t>
-            </a:r>
-            <a:r>
-              <a:rPr lang="en-GB" noProof="0" dirty="0" err="1"/>
-              <a:t>Mnemoi</a:t>
-            </a:r>
-            <a:endParaRPr lang="en-GB" noProof="0" dirty="0"/>
+              <a:rPr lang="en-GB" dirty="0"/>
+              <a:t>CY Tech – Charles-Meldhine Madi Mnemoi, </a:t>
+            </a:r>
+            <a:r>
+              <a:rPr lang="en-GB" dirty="0" err="1"/>
+              <a:t>Brahim</a:t>
+            </a:r>
+            <a:r>
+              <a:rPr lang="en-GB" dirty="0"/>
+              <a:t> </a:t>
+            </a:r>
+            <a:r>
+              <a:rPr lang="en-GB" dirty="0" err="1"/>
+              <a:t>Kerdad</a:t>
+            </a:r>
+            <a:endParaRPr lang="en-GB" dirty="0"/>
           </a:p>
         </p:txBody>
       </p:sp>
     </p:spTree>
     <p:extLst>
       <p:ext uri="{BB962C8B-B14F-4D97-AF65-F5344CB8AC3E}">
-        <p14:creationId xmlns:p14="http://schemas.microsoft.com/office/powerpoint/2010/main" val="2746029914"/>
+        <p14:creationId xmlns:p14="http://schemas.microsoft.com/office/powerpoint/2010/main" val="4150905695"/>
       </p:ext>
     </p:extLst>
   </p:cSld>
@@ -24319,7 +25105,3549 @@
 </p:sld>
 </file>
 
-<file path=ppt/slides/slide3.xml><?xml version="1.0" encoding="utf-8"?>
+<file path=ppt/slides/slide30.xml><?xml version="1.0" encoding="utf-8"?>
+<p:sld xmlns:a="http://schemas.openxmlformats.org/drawingml/2006/main" xmlns:r="http://schemas.openxmlformats.org/officeDocument/2006/relationships" xmlns:p="http://schemas.openxmlformats.org/presentationml/2006/main">
+  <p:cSld>
+    <p:spTree>
+      <p:nvGrpSpPr>
+        <p:cNvPr id="1" name=""/>
+        <p:cNvGrpSpPr/>
+        <p:nvPr/>
+      </p:nvGrpSpPr>
+      <p:grpSpPr>
+        <a:xfrm>
+          <a:off x="0" y="0"/>
+          <a:ext cx="0" cy="0"/>
+          <a:chOff x="0" y="0"/>
+          <a:chExt cx="0" cy="0"/>
+        </a:xfrm>
+      </p:grpSpPr>
+      <p:sp>
+        <p:nvSpPr>
+          <p:cNvPr id="2" name="Title 1">
+            <a:extLst>
+              <a:ext uri="{FF2B5EF4-FFF2-40B4-BE49-F238E27FC236}">
+                <a16:creationId xmlns:a16="http://schemas.microsoft.com/office/drawing/2014/main" id="{04C5DF06-5F42-4296-B27B-4F79E0DB836B}"/>
+              </a:ext>
+            </a:extLst>
+          </p:cNvPr>
+          <p:cNvSpPr>
+            <a:spLocks noGrp="1"/>
+          </p:cNvSpPr>
+          <p:nvPr>
+            <p:ph type="title"/>
+          </p:nvPr>
+        </p:nvSpPr>
+        <p:spPr/>
+        <p:txBody>
+          <a:bodyPr/>
+          <a:lstStyle/>
+          <a:p>
+            <a:r>
+              <a:rPr lang="en-US" sz="3600" dirty="0" err="1"/>
+              <a:t>Exercices</a:t>
+            </a:r>
+            <a:r>
+              <a:rPr lang="en-US" sz="3600" dirty="0"/>
+              <a:t> sur le jeu de </a:t>
+            </a:r>
+            <a:r>
+              <a:rPr lang="en-US" sz="3600" dirty="0" err="1"/>
+              <a:t>données</a:t>
+            </a:r>
+            <a:r>
+              <a:rPr lang="en-US" sz="3600" dirty="0"/>
+              <a:t> Titanic</a:t>
+            </a:r>
+          </a:p>
+        </p:txBody>
+      </p:sp>
+      <p:sp>
+        <p:nvSpPr>
+          <p:cNvPr id="5" name="Slide Number Placeholder 4">
+            <a:extLst>
+              <a:ext uri="{FF2B5EF4-FFF2-40B4-BE49-F238E27FC236}">
+                <a16:creationId xmlns:a16="http://schemas.microsoft.com/office/drawing/2014/main" id="{B756D4B6-3814-4E02-AB98-08D3B49675BF}"/>
+              </a:ext>
+            </a:extLst>
+          </p:cNvPr>
+          <p:cNvSpPr>
+            <a:spLocks noGrp="1"/>
+          </p:cNvSpPr>
+          <p:nvPr>
+            <p:ph type="sldNum" sz="quarter" idx="4"/>
+          </p:nvPr>
+        </p:nvSpPr>
+        <p:spPr/>
+        <p:txBody>
+          <a:bodyPr/>
+          <a:lstStyle/>
+          <a:p>
+            <a:fld id="{5EE7099E-8998-4851-915A-4F4831808297}" type="slidenum">
+              <a:rPr lang="nl-NL" smtClean="0"/>
+              <a:pPr/>
+              <a:t>30</a:t>
+            </a:fld>
+            <a:endParaRPr lang="nl-NL"/>
+          </a:p>
+        </p:txBody>
+      </p:sp>
+      <p:sp>
+        <p:nvSpPr>
+          <p:cNvPr id="3" name="ZoneTexte 2">
+            <a:extLst>
+              <a:ext uri="{FF2B5EF4-FFF2-40B4-BE49-F238E27FC236}">
+                <a16:creationId xmlns:a16="http://schemas.microsoft.com/office/drawing/2014/main" id="{0C248AA7-6FCB-3F89-E3DD-C837A2826405}"/>
+              </a:ext>
+            </a:extLst>
+          </p:cNvPr>
+          <p:cNvSpPr txBox="1"/>
+          <p:nvPr/>
+        </p:nvSpPr>
+        <p:spPr>
+          <a:xfrm>
+            <a:off x="3692106" y="1699404"/>
+            <a:ext cx="0" cy="0"/>
+          </a:xfrm>
+          <a:prstGeom prst="rect">
+            <a:avLst/>
+          </a:prstGeom>
+          <a:noFill/>
+        </p:spPr>
+        <p:txBody>
+          <a:bodyPr wrap="none" lIns="108000" tIns="108000" rIns="108000" bIns="108000" rtlCol="0">
+            <a:noAutofit/>
+          </a:bodyPr>
+          <a:lstStyle/>
+          <a:p>
+            <a:endParaRPr lang="fr-FR" noProof="0" dirty="0" err="1">
+              <a:solidFill>
+                <a:schemeClr val="bg2"/>
+              </a:solidFill>
+            </a:endParaRPr>
+          </a:p>
+        </p:txBody>
+      </p:sp>
+      <p:sp>
+        <p:nvSpPr>
+          <p:cNvPr id="6" name="Vertical Text Placeholder 5">
+            <a:extLst>
+              <a:ext uri="{FF2B5EF4-FFF2-40B4-BE49-F238E27FC236}">
+                <a16:creationId xmlns:a16="http://schemas.microsoft.com/office/drawing/2014/main" id="{F8170739-5212-AEC7-557E-2E086A29A496}"/>
+              </a:ext>
+            </a:extLst>
+          </p:cNvPr>
+          <p:cNvSpPr>
+            <a:spLocks noGrp="1"/>
+          </p:cNvSpPr>
+          <p:nvPr>
+            <p:ph type="body" orient="vert" idx="1"/>
+          </p:nvPr>
+        </p:nvSpPr>
+        <p:spPr>
+          <a:xfrm>
+            <a:off x="404662" y="1143000"/>
+            <a:ext cx="11389023" cy="4795836"/>
+          </a:xfrm>
+        </p:spPr>
+        <p:txBody>
+          <a:bodyPr/>
+          <a:lstStyle/>
+          <a:p>
+            <a:endParaRPr lang="en-US" dirty="0"/>
+          </a:p>
+          <a:p>
+            <a:endParaRPr lang="en-US" dirty="0"/>
+          </a:p>
+          <a:p>
+            <a:pPr marL="180975" lvl="1" indent="0">
+              <a:buNone/>
+            </a:pPr>
+            <a:endParaRPr lang="en-US" dirty="0"/>
+          </a:p>
+          <a:p>
+            <a:pPr lvl="1"/>
+            <a:endParaRPr lang="en-US" dirty="0"/>
+          </a:p>
+          <a:p>
+            <a:endParaRPr lang="en-US" dirty="0"/>
+          </a:p>
+          <a:p>
+            <a:endParaRPr lang="en-US" dirty="0"/>
+          </a:p>
+          <a:p>
+            <a:endParaRPr lang="en-US" dirty="0"/>
+          </a:p>
+          <a:p>
+            <a:endParaRPr lang="en-US" dirty="0"/>
+          </a:p>
+          <a:p>
+            <a:pPr lvl="1"/>
+            <a:endParaRPr lang="en-US" dirty="0"/>
+          </a:p>
+          <a:p>
+            <a:pPr lvl="1"/>
+            <a:endParaRPr lang="en-US" dirty="0"/>
+          </a:p>
+          <a:p>
+            <a:pPr lvl="1"/>
+            <a:endParaRPr lang="en-US" dirty="0"/>
+          </a:p>
+          <a:p>
+            <a:pPr lvl="1"/>
+            <a:endParaRPr lang="en-US" dirty="0"/>
+          </a:p>
+          <a:p>
+            <a:endParaRPr lang="en-US" b="1" dirty="0"/>
+          </a:p>
+          <a:p>
+            <a:endParaRPr lang="en-US" dirty="0"/>
+          </a:p>
+        </p:txBody>
+      </p:sp>
+      <p:sp>
+        <p:nvSpPr>
+          <p:cNvPr id="4" name="Vertical Text Placeholder 5">
+            <a:extLst>
+              <a:ext uri="{FF2B5EF4-FFF2-40B4-BE49-F238E27FC236}">
+                <a16:creationId xmlns:a16="http://schemas.microsoft.com/office/drawing/2014/main" id="{A57D01D8-1D67-D654-0CFB-28A877FD85B9}"/>
+              </a:ext>
+            </a:extLst>
+          </p:cNvPr>
+          <p:cNvSpPr txBox="1">
+            <a:spLocks/>
+          </p:cNvSpPr>
+          <p:nvPr/>
+        </p:nvSpPr>
+        <p:spPr>
+          <a:xfrm>
+            <a:off x="557062" y="1295400"/>
+            <a:ext cx="11389023" cy="4795836"/>
+          </a:xfrm>
+          <a:prstGeom prst="rect">
+            <a:avLst/>
+          </a:prstGeom>
+        </p:spPr>
+        <p:txBody>
+          <a:bodyPr vert="horz" lIns="0" tIns="0" rIns="0" bIns="0" rtlCol="0">
+            <a:normAutofit/>
+          </a:bodyPr>
+          <a:lstStyle>
+            <a:lvl1pPr marL="180975" indent="-180975" algn="l" defTabSz="914400" rtl="0" eaLnBrk="1" latinLnBrk="0" hangingPunct="1">
+              <a:lnSpc>
+                <a:spcPct val="90000"/>
+              </a:lnSpc>
+              <a:spcBef>
+                <a:spcPts val="600"/>
+              </a:spcBef>
+              <a:spcAft>
+                <a:spcPts val="600"/>
+              </a:spcAft>
+              <a:buClr>
+                <a:schemeClr val="bg2"/>
+              </a:buClr>
+              <a:buFont typeface="Arial" panose="020B0604020202020204" pitchFamily="34" charset="0"/>
+              <a:buChar char="•"/>
+              <a:defRPr sz="1800" kern="1200">
+                <a:solidFill>
+                  <a:schemeClr val="bg2"/>
+                </a:solidFill>
+                <a:latin typeface="+mn-lt"/>
+                <a:ea typeface="+mn-ea"/>
+                <a:cs typeface="+mn-cs"/>
+              </a:defRPr>
+            </a:lvl1pPr>
+            <a:lvl2pPr marL="361950" indent="-180975" algn="l" defTabSz="914400" rtl="0" eaLnBrk="1" latinLnBrk="0" hangingPunct="1">
+              <a:lnSpc>
+                <a:spcPct val="90000"/>
+              </a:lnSpc>
+              <a:spcBef>
+                <a:spcPts val="600"/>
+              </a:spcBef>
+              <a:spcAft>
+                <a:spcPts val="600"/>
+              </a:spcAft>
+              <a:buClr>
+                <a:schemeClr val="bg2"/>
+              </a:buClr>
+              <a:buFont typeface="Arial" panose="020B0604020202020204" pitchFamily="34" charset="0"/>
+              <a:buChar char="-"/>
+              <a:defRPr sz="1600" kern="1200">
+                <a:solidFill>
+                  <a:schemeClr val="bg2"/>
+                </a:solidFill>
+                <a:latin typeface="+mn-lt"/>
+                <a:ea typeface="+mn-ea"/>
+                <a:cs typeface="+mn-cs"/>
+              </a:defRPr>
+            </a:lvl2pPr>
+            <a:lvl3pPr marL="0" indent="0" algn="l" defTabSz="914400" rtl="0" eaLnBrk="1" latinLnBrk="0" hangingPunct="1">
+              <a:lnSpc>
+                <a:spcPct val="90000"/>
+              </a:lnSpc>
+              <a:spcBef>
+                <a:spcPts val="600"/>
+              </a:spcBef>
+              <a:spcAft>
+                <a:spcPts val="600"/>
+              </a:spcAft>
+              <a:buFont typeface="Arial" panose="020B0604020202020204" pitchFamily="34" charset="0"/>
+              <a:buNone/>
+              <a:defRPr sz="1800" kern="1200">
+                <a:solidFill>
+                  <a:schemeClr val="bg2"/>
+                </a:solidFill>
+                <a:latin typeface="+mn-lt"/>
+                <a:ea typeface="+mn-ea"/>
+                <a:cs typeface="+mn-cs"/>
+              </a:defRPr>
+            </a:lvl3pPr>
+            <a:lvl4pPr marL="0" indent="0" algn="l" defTabSz="914400" rtl="0" eaLnBrk="1" latinLnBrk="0" hangingPunct="1">
+              <a:lnSpc>
+                <a:spcPct val="90000"/>
+              </a:lnSpc>
+              <a:spcBef>
+                <a:spcPts val="600"/>
+              </a:spcBef>
+              <a:spcAft>
+                <a:spcPts val="600"/>
+              </a:spcAft>
+              <a:buFont typeface="Arial" panose="020B0604020202020204" pitchFamily="34" charset="0"/>
+              <a:buNone/>
+              <a:defRPr sz="1800" b="1" kern="1200">
+                <a:solidFill>
+                  <a:schemeClr val="bg2"/>
+                </a:solidFill>
+                <a:latin typeface="+mn-lt"/>
+                <a:ea typeface="+mn-ea"/>
+                <a:cs typeface="+mn-cs"/>
+              </a:defRPr>
+            </a:lvl4pPr>
+            <a:lvl5pPr marL="0" indent="0" algn="l" defTabSz="914400" rtl="0" eaLnBrk="1" latinLnBrk="0" hangingPunct="1">
+              <a:lnSpc>
+                <a:spcPct val="90000"/>
+              </a:lnSpc>
+              <a:spcBef>
+                <a:spcPts val="600"/>
+              </a:spcBef>
+              <a:spcAft>
+                <a:spcPts val="600"/>
+              </a:spcAft>
+              <a:buFont typeface="Arial" panose="020B0604020202020204" pitchFamily="34" charset="0"/>
+              <a:buNone/>
+              <a:defRPr sz="1800" b="1" kern="1200" baseline="0">
+                <a:solidFill>
+                  <a:schemeClr val="tx2"/>
+                </a:solidFill>
+                <a:latin typeface="+mn-lt"/>
+                <a:ea typeface="+mn-ea"/>
+                <a:cs typeface="+mn-cs"/>
+              </a:defRPr>
+            </a:lvl5pPr>
+            <a:lvl6pPr marL="180975" indent="-180975" algn="l" defTabSz="914400" rtl="0" eaLnBrk="1" latinLnBrk="0" hangingPunct="1">
+              <a:lnSpc>
+                <a:spcPct val="90000"/>
+              </a:lnSpc>
+              <a:spcBef>
+                <a:spcPts val="600"/>
+              </a:spcBef>
+              <a:spcAft>
+                <a:spcPts val="600"/>
+              </a:spcAft>
+              <a:buClr>
+                <a:schemeClr val="bg2"/>
+              </a:buClr>
+              <a:buFont typeface="Arial" panose="020B0604020202020204" pitchFamily="34" charset="0"/>
+              <a:buChar char="•"/>
+              <a:defRPr sz="1800" kern="1200">
+                <a:solidFill>
+                  <a:schemeClr val="bg2"/>
+                </a:solidFill>
+                <a:latin typeface="+mn-lt"/>
+                <a:ea typeface="+mn-ea"/>
+                <a:cs typeface="+mn-cs"/>
+              </a:defRPr>
+            </a:lvl6pPr>
+            <a:lvl7pPr marL="361950" indent="-180975" algn="l" defTabSz="914400" rtl="0" eaLnBrk="1" latinLnBrk="0" hangingPunct="1">
+              <a:lnSpc>
+                <a:spcPct val="90000"/>
+              </a:lnSpc>
+              <a:spcBef>
+                <a:spcPts val="600"/>
+              </a:spcBef>
+              <a:spcAft>
+                <a:spcPts val="600"/>
+              </a:spcAft>
+              <a:buClr>
+                <a:schemeClr val="bg2"/>
+              </a:buClr>
+              <a:buFont typeface="Arial" panose="020B0604020202020204" pitchFamily="34" charset="0"/>
+              <a:buChar char="-"/>
+              <a:defRPr sz="1600" kern="1200">
+                <a:solidFill>
+                  <a:schemeClr val="bg2"/>
+                </a:solidFill>
+                <a:latin typeface="+mn-lt"/>
+                <a:ea typeface="+mn-ea"/>
+                <a:cs typeface="+mn-cs"/>
+              </a:defRPr>
+            </a:lvl7pPr>
+            <a:lvl8pPr marL="0" indent="0" algn="l" defTabSz="914400" rtl="0" eaLnBrk="1" latinLnBrk="0" hangingPunct="1">
+              <a:lnSpc>
+                <a:spcPct val="90000"/>
+              </a:lnSpc>
+              <a:spcBef>
+                <a:spcPts val="600"/>
+              </a:spcBef>
+              <a:spcAft>
+                <a:spcPts val="600"/>
+              </a:spcAft>
+              <a:buFont typeface="Arial" panose="020B0604020202020204" pitchFamily="34" charset="0"/>
+              <a:buNone/>
+              <a:defRPr sz="1600" kern="1200">
+                <a:solidFill>
+                  <a:schemeClr val="bg2"/>
+                </a:solidFill>
+                <a:latin typeface="+mn-lt"/>
+                <a:ea typeface="+mn-ea"/>
+                <a:cs typeface="+mn-cs"/>
+              </a:defRPr>
+            </a:lvl8pPr>
+            <a:lvl9pPr marL="0" indent="0" algn="l" defTabSz="914400" rtl="0" eaLnBrk="1" latinLnBrk="0" hangingPunct="1">
+              <a:lnSpc>
+                <a:spcPct val="90000"/>
+              </a:lnSpc>
+              <a:spcBef>
+                <a:spcPts val="600"/>
+              </a:spcBef>
+              <a:spcAft>
+                <a:spcPts val="600"/>
+              </a:spcAft>
+              <a:buFont typeface="Arial" panose="020B0604020202020204" pitchFamily="34" charset="0"/>
+              <a:buNone/>
+              <a:defRPr sz="1800" b="1" kern="1200" baseline="0">
+                <a:solidFill>
+                  <a:schemeClr val="bg2"/>
+                </a:solidFill>
+                <a:latin typeface="+mn-lt"/>
+                <a:ea typeface="+mn-ea"/>
+                <a:cs typeface="+mn-cs"/>
+              </a:defRPr>
+            </a:lvl9pPr>
+          </a:lstStyle>
+          <a:p>
+            <a:endParaRPr lang="en-US" sz="2200" b="1" dirty="0"/>
+          </a:p>
+          <a:p>
+            <a:pPr marL="180975" lvl="1" indent="0">
+              <a:buNone/>
+            </a:pPr>
+            <a:endParaRPr lang="en-US" sz="2200" dirty="0"/>
+          </a:p>
+          <a:p>
+            <a:pPr lvl="1"/>
+            <a:endParaRPr lang="en-US" sz="2200" dirty="0"/>
+          </a:p>
+          <a:p>
+            <a:pPr marL="0" indent="0">
+              <a:buFont typeface="Arial" panose="020B0604020202020204" pitchFamily="34" charset="0"/>
+              <a:buNone/>
+            </a:pPr>
+            <a:endParaRPr lang="en-US" dirty="0"/>
+          </a:p>
+          <a:p>
+            <a:endParaRPr lang="en-US" dirty="0"/>
+          </a:p>
+          <a:p>
+            <a:pPr marL="180975" lvl="1" indent="0">
+              <a:buFont typeface="Arial" panose="020B0604020202020204" pitchFamily="34" charset="0"/>
+              <a:buNone/>
+            </a:pPr>
+            <a:endParaRPr lang="en-US" dirty="0"/>
+          </a:p>
+          <a:p>
+            <a:pPr lvl="1"/>
+            <a:endParaRPr lang="en-US" dirty="0"/>
+          </a:p>
+          <a:p>
+            <a:endParaRPr lang="en-US" dirty="0"/>
+          </a:p>
+          <a:p>
+            <a:endParaRPr lang="en-US" dirty="0"/>
+          </a:p>
+          <a:p>
+            <a:endParaRPr lang="en-US" dirty="0"/>
+          </a:p>
+          <a:p>
+            <a:endParaRPr lang="en-US" dirty="0"/>
+          </a:p>
+          <a:p>
+            <a:pPr lvl="1"/>
+            <a:endParaRPr lang="en-US" dirty="0"/>
+          </a:p>
+          <a:p>
+            <a:pPr lvl="1"/>
+            <a:endParaRPr lang="en-US" dirty="0"/>
+          </a:p>
+          <a:p>
+            <a:pPr lvl="1"/>
+            <a:endParaRPr lang="en-US" dirty="0"/>
+          </a:p>
+          <a:p>
+            <a:pPr lvl="1"/>
+            <a:endParaRPr lang="en-US" dirty="0"/>
+          </a:p>
+          <a:p>
+            <a:endParaRPr lang="en-US" b="1" dirty="0"/>
+          </a:p>
+          <a:p>
+            <a:endParaRPr lang="en-US" dirty="0"/>
+          </a:p>
+        </p:txBody>
+      </p:sp>
+      <p:sp>
+        <p:nvSpPr>
+          <p:cNvPr id="7" name="Vertical Text Placeholder 5">
+            <a:extLst>
+              <a:ext uri="{FF2B5EF4-FFF2-40B4-BE49-F238E27FC236}">
+                <a16:creationId xmlns:a16="http://schemas.microsoft.com/office/drawing/2014/main" id="{DFE0C10A-165E-4BE2-39D7-55B90C940362}"/>
+              </a:ext>
+            </a:extLst>
+          </p:cNvPr>
+          <p:cNvSpPr txBox="1">
+            <a:spLocks/>
+          </p:cNvSpPr>
+          <p:nvPr/>
+        </p:nvSpPr>
+        <p:spPr>
+          <a:xfrm>
+            <a:off x="436592" y="1199890"/>
+            <a:ext cx="11389023" cy="4795836"/>
+          </a:xfrm>
+          <a:prstGeom prst="rect">
+            <a:avLst/>
+          </a:prstGeom>
+        </p:spPr>
+        <p:txBody>
+          <a:bodyPr vert="horz" lIns="0" tIns="0" rIns="0" bIns="0" rtlCol="0">
+            <a:normAutofit/>
+          </a:bodyPr>
+          <a:lstStyle>
+            <a:lvl1pPr marL="180975" indent="-180975" algn="l" defTabSz="914400" rtl="0" eaLnBrk="1" latinLnBrk="0" hangingPunct="1">
+              <a:lnSpc>
+                <a:spcPct val="90000"/>
+              </a:lnSpc>
+              <a:spcBef>
+                <a:spcPts val="600"/>
+              </a:spcBef>
+              <a:spcAft>
+                <a:spcPts val="600"/>
+              </a:spcAft>
+              <a:buClr>
+                <a:schemeClr val="bg2"/>
+              </a:buClr>
+              <a:buFont typeface="Arial" panose="020B0604020202020204" pitchFamily="34" charset="0"/>
+              <a:buChar char="•"/>
+              <a:defRPr sz="1800" kern="1200">
+                <a:solidFill>
+                  <a:schemeClr val="bg2"/>
+                </a:solidFill>
+                <a:latin typeface="+mn-lt"/>
+                <a:ea typeface="+mn-ea"/>
+                <a:cs typeface="+mn-cs"/>
+              </a:defRPr>
+            </a:lvl1pPr>
+            <a:lvl2pPr marL="361950" indent="-180975" algn="l" defTabSz="914400" rtl="0" eaLnBrk="1" latinLnBrk="0" hangingPunct="1">
+              <a:lnSpc>
+                <a:spcPct val="90000"/>
+              </a:lnSpc>
+              <a:spcBef>
+                <a:spcPts val="600"/>
+              </a:spcBef>
+              <a:spcAft>
+                <a:spcPts val="600"/>
+              </a:spcAft>
+              <a:buClr>
+                <a:schemeClr val="bg2"/>
+              </a:buClr>
+              <a:buFont typeface="Arial" panose="020B0604020202020204" pitchFamily="34" charset="0"/>
+              <a:buChar char="-"/>
+              <a:defRPr sz="1600" kern="1200">
+                <a:solidFill>
+                  <a:schemeClr val="bg2"/>
+                </a:solidFill>
+                <a:latin typeface="+mn-lt"/>
+                <a:ea typeface="+mn-ea"/>
+                <a:cs typeface="+mn-cs"/>
+              </a:defRPr>
+            </a:lvl2pPr>
+            <a:lvl3pPr marL="0" indent="0" algn="l" defTabSz="914400" rtl="0" eaLnBrk="1" latinLnBrk="0" hangingPunct="1">
+              <a:lnSpc>
+                <a:spcPct val="90000"/>
+              </a:lnSpc>
+              <a:spcBef>
+                <a:spcPts val="600"/>
+              </a:spcBef>
+              <a:spcAft>
+                <a:spcPts val="600"/>
+              </a:spcAft>
+              <a:buFont typeface="Arial" panose="020B0604020202020204" pitchFamily="34" charset="0"/>
+              <a:buNone/>
+              <a:defRPr sz="1800" kern="1200">
+                <a:solidFill>
+                  <a:schemeClr val="bg2"/>
+                </a:solidFill>
+                <a:latin typeface="+mn-lt"/>
+                <a:ea typeface="+mn-ea"/>
+                <a:cs typeface="+mn-cs"/>
+              </a:defRPr>
+            </a:lvl3pPr>
+            <a:lvl4pPr marL="0" indent="0" algn="l" defTabSz="914400" rtl="0" eaLnBrk="1" latinLnBrk="0" hangingPunct="1">
+              <a:lnSpc>
+                <a:spcPct val="90000"/>
+              </a:lnSpc>
+              <a:spcBef>
+                <a:spcPts val="600"/>
+              </a:spcBef>
+              <a:spcAft>
+                <a:spcPts val="600"/>
+              </a:spcAft>
+              <a:buFont typeface="Arial" panose="020B0604020202020204" pitchFamily="34" charset="0"/>
+              <a:buNone/>
+              <a:defRPr sz="1800" b="1" kern="1200">
+                <a:solidFill>
+                  <a:schemeClr val="bg2"/>
+                </a:solidFill>
+                <a:latin typeface="+mn-lt"/>
+                <a:ea typeface="+mn-ea"/>
+                <a:cs typeface="+mn-cs"/>
+              </a:defRPr>
+            </a:lvl4pPr>
+            <a:lvl5pPr marL="0" indent="0" algn="l" defTabSz="914400" rtl="0" eaLnBrk="1" latinLnBrk="0" hangingPunct="1">
+              <a:lnSpc>
+                <a:spcPct val="90000"/>
+              </a:lnSpc>
+              <a:spcBef>
+                <a:spcPts val="600"/>
+              </a:spcBef>
+              <a:spcAft>
+                <a:spcPts val="600"/>
+              </a:spcAft>
+              <a:buFont typeface="Arial" panose="020B0604020202020204" pitchFamily="34" charset="0"/>
+              <a:buNone/>
+              <a:defRPr sz="1800" b="1" kern="1200" baseline="0">
+                <a:solidFill>
+                  <a:schemeClr val="tx2"/>
+                </a:solidFill>
+                <a:latin typeface="+mn-lt"/>
+                <a:ea typeface="+mn-ea"/>
+                <a:cs typeface="+mn-cs"/>
+              </a:defRPr>
+            </a:lvl5pPr>
+            <a:lvl6pPr marL="180975" indent="-180975" algn="l" defTabSz="914400" rtl="0" eaLnBrk="1" latinLnBrk="0" hangingPunct="1">
+              <a:lnSpc>
+                <a:spcPct val="90000"/>
+              </a:lnSpc>
+              <a:spcBef>
+                <a:spcPts val="600"/>
+              </a:spcBef>
+              <a:spcAft>
+                <a:spcPts val="600"/>
+              </a:spcAft>
+              <a:buClr>
+                <a:schemeClr val="bg2"/>
+              </a:buClr>
+              <a:buFont typeface="Arial" panose="020B0604020202020204" pitchFamily="34" charset="0"/>
+              <a:buChar char="•"/>
+              <a:defRPr sz="1800" kern="1200">
+                <a:solidFill>
+                  <a:schemeClr val="bg2"/>
+                </a:solidFill>
+                <a:latin typeface="+mn-lt"/>
+                <a:ea typeface="+mn-ea"/>
+                <a:cs typeface="+mn-cs"/>
+              </a:defRPr>
+            </a:lvl6pPr>
+            <a:lvl7pPr marL="361950" indent="-180975" algn="l" defTabSz="914400" rtl="0" eaLnBrk="1" latinLnBrk="0" hangingPunct="1">
+              <a:lnSpc>
+                <a:spcPct val="90000"/>
+              </a:lnSpc>
+              <a:spcBef>
+                <a:spcPts val="600"/>
+              </a:spcBef>
+              <a:spcAft>
+                <a:spcPts val="600"/>
+              </a:spcAft>
+              <a:buClr>
+                <a:schemeClr val="bg2"/>
+              </a:buClr>
+              <a:buFont typeface="Arial" panose="020B0604020202020204" pitchFamily="34" charset="0"/>
+              <a:buChar char="-"/>
+              <a:defRPr sz="1600" kern="1200">
+                <a:solidFill>
+                  <a:schemeClr val="bg2"/>
+                </a:solidFill>
+                <a:latin typeface="+mn-lt"/>
+                <a:ea typeface="+mn-ea"/>
+                <a:cs typeface="+mn-cs"/>
+              </a:defRPr>
+            </a:lvl7pPr>
+            <a:lvl8pPr marL="0" indent="0" algn="l" defTabSz="914400" rtl="0" eaLnBrk="1" latinLnBrk="0" hangingPunct="1">
+              <a:lnSpc>
+                <a:spcPct val="90000"/>
+              </a:lnSpc>
+              <a:spcBef>
+                <a:spcPts val="600"/>
+              </a:spcBef>
+              <a:spcAft>
+                <a:spcPts val="600"/>
+              </a:spcAft>
+              <a:buFont typeface="Arial" panose="020B0604020202020204" pitchFamily="34" charset="0"/>
+              <a:buNone/>
+              <a:defRPr sz="1600" kern="1200">
+                <a:solidFill>
+                  <a:schemeClr val="bg2"/>
+                </a:solidFill>
+                <a:latin typeface="+mn-lt"/>
+                <a:ea typeface="+mn-ea"/>
+                <a:cs typeface="+mn-cs"/>
+              </a:defRPr>
+            </a:lvl8pPr>
+            <a:lvl9pPr marL="0" indent="0" algn="l" defTabSz="914400" rtl="0" eaLnBrk="1" latinLnBrk="0" hangingPunct="1">
+              <a:lnSpc>
+                <a:spcPct val="90000"/>
+              </a:lnSpc>
+              <a:spcBef>
+                <a:spcPts val="600"/>
+              </a:spcBef>
+              <a:spcAft>
+                <a:spcPts val="600"/>
+              </a:spcAft>
+              <a:buFont typeface="Arial" panose="020B0604020202020204" pitchFamily="34" charset="0"/>
+              <a:buNone/>
+              <a:defRPr sz="1800" b="1" kern="1200" baseline="0">
+                <a:solidFill>
+                  <a:schemeClr val="bg2"/>
+                </a:solidFill>
+                <a:latin typeface="+mn-lt"/>
+                <a:ea typeface="+mn-ea"/>
+                <a:cs typeface="+mn-cs"/>
+              </a:defRPr>
+            </a:lvl9pPr>
+          </a:lstStyle>
+          <a:p>
+            <a:pPr marL="0" indent="0">
+              <a:buNone/>
+            </a:pPr>
+            <a:r>
+              <a:rPr lang="en-US" sz="2400" dirty="0" err="1"/>
+              <a:t>Quels</a:t>
+            </a:r>
+            <a:r>
+              <a:rPr lang="en-US" sz="2400" dirty="0"/>
+              <a:t> </a:t>
+            </a:r>
+            <a:r>
+              <a:rPr lang="en-US" sz="2400" dirty="0" err="1"/>
+              <a:t>sont</a:t>
+            </a:r>
+            <a:r>
+              <a:rPr lang="en-US" sz="2400" dirty="0"/>
+              <a:t> les 5 </a:t>
+            </a:r>
+            <a:r>
+              <a:rPr lang="en-US" sz="2400" dirty="0" err="1"/>
+              <a:t>passagers</a:t>
+            </a:r>
+            <a:r>
+              <a:rPr lang="en-US" sz="2400" dirty="0"/>
+              <a:t> qui </a:t>
+            </a:r>
+            <a:r>
+              <a:rPr lang="en-US" sz="2400" dirty="0" err="1"/>
+              <a:t>ont</a:t>
+            </a:r>
+            <a:r>
+              <a:rPr lang="en-US" sz="2400" dirty="0"/>
+              <a:t> </a:t>
+            </a:r>
+            <a:r>
+              <a:rPr lang="en-US" sz="2400" dirty="0" err="1"/>
+              <a:t>payé</a:t>
+            </a:r>
+            <a:r>
+              <a:rPr lang="en-US" sz="2400" dirty="0"/>
+              <a:t> le </a:t>
+            </a:r>
+            <a:r>
+              <a:rPr lang="en-US" sz="2400" dirty="0" err="1"/>
+              <a:t>moins</a:t>
+            </a:r>
+            <a:r>
+              <a:rPr lang="en-US" sz="2400" dirty="0"/>
+              <a:t> </a:t>
+            </a:r>
+            <a:r>
+              <a:rPr lang="en-US" sz="2400" dirty="0" err="1"/>
+              <a:t>cher</a:t>
+            </a:r>
+            <a:r>
+              <a:rPr lang="en-US" sz="2400" dirty="0"/>
+              <a:t> </a:t>
+            </a:r>
+            <a:r>
+              <a:rPr lang="en-US" sz="2400" dirty="0" err="1"/>
+              <a:t>leur</a:t>
+            </a:r>
+            <a:r>
+              <a:rPr lang="en-US" sz="2400" dirty="0"/>
+              <a:t> ticket ?</a:t>
+            </a:r>
+            <a:endParaRPr lang="en-US" sz="2200" dirty="0"/>
+          </a:p>
+          <a:p>
+            <a:pPr lvl="1"/>
+            <a:endParaRPr lang="en-US" sz="2200" dirty="0"/>
+          </a:p>
+          <a:p>
+            <a:pPr marL="0" indent="0">
+              <a:buFont typeface="Arial" panose="020B0604020202020204" pitchFamily="34" charset="0"/>
+              <a:buNone/>
+            </a:pPr>
+            <a:endParaRPr lang="en-US" dirty="0"/>
+          </a:p>
+          <a:p>
+            <a:endParaRPr lang="en-US" dirty="0"/>
+          </a:p>
+          <a:p>
+            <a:pPr marL="180975" lvl="1" indent="0">
+              <a:buFont typeface="Arial" panose="020B0604020202020204" pitchFamily="34" charset="0"/>
+              <a:buNone/>
+            </a:pPr>
+            <a:endParaRPr lang="en-US" dirty="0"/>
+          </a:p>
+          <a:p>
+            <a:pPr lvl="1"/>
+            <a:endParaRPr lang="en-US" dirty="0"/>
+          </a:p>
+          <a:p>
+            <a:endParaRPr lang="en-US" dirty="0"/>
+          </a:p>
+          <a:p>
+            <a:endParaRPr lang="en-US" dirty="0"/>
+          </a:p>
+          <a:p>
+            <a:endParaRPr lang="en-US" dirty="0"/>
+          </a:p>
+          <a:p>
+            <a:endParaRPr lang="en-US" dirty="0"/>
+          </a:p>
+          <a:p>
+            <a:pPr lvl="1"/>
+            <a:endParaRPr lang="en-US" dirty="0"/>
+          </a:p>
+          <a:p>
+            <a:pPr lvl="1"/>
+            <a:endParaRPr lang="en-US" dirty="0"/>
+          </a:p>
+          <a:p>
+            <a:pPr lvl="1"/>
+            <a:endParaRPr lang="en-US" dirty="0"/>
+          </a:p>
+          <a:p>
+            <a:pPr lvl="1"/>
+            <a:endParaRPr lang="en-US" dirty="0"/>
+          </a:p>
+          <a:p>
+            <a:endParaRPr lang="en-US" b="1" dirty="0"/>
+          </a:p>
+          <a:p>
+            <a:endParaRPr lang="en-US" dirty="0"/>
+          </a:p>
+        </p:txBody>
+      </p:sp>
+    </p:spTree>
+    <p:extLst>
+      <p:ext uri="{BB962C8B-B14F-4D97-AF65-F5344CB8AC3E}">
+        <p14:creationId xmlns:p14="http://schemas.microsoft.com/office/powerpoint/2010/main" val="4029507761"/>
+      </p:ext>
+    </p:extLst>
+  </p:cSld>
+  <p:clrMapOvr>
+    <a:masterClrMapping/>
+  </p:clrMapOvr>
+  <p:transition spd="slow">
+    <p:wipe dir="r"/>
+  </p:transition>
+</p:sld>
+</file>
+
+<file path=ppt/slides/slide31.xml><?xml version="1.0" encoding="utf-8"?>
+<p:sld xmlns:a="http://schemas.openxmlformats.org/drawingml/2006/main" xmlns:r="http://schemas.openxmlformats.org/officeDocument/2006/relationships" xmlns:p="http://schemas.openxmlformats.org/presentationml/2006/main">
+  <p:cSld>
+    <p:spTree>
+      <p:nvGrpSpPr>
+        <p:cNvPr id="1" name=""/>
+        <p:cNvGrpSpPr/>
+        <p:nvPr/>
+      </p:nvGrpSpPr>
+      <p:grpSpPr>
+        <a:xfrm>
+          <a:off x="0" y="0"/>
+          <a:ext cx="0" cy="0"/>
+          <a:chOff x="0" y="0"/>
+          <a:chExt cx="0" cy="0"/>
+        </a:xfrm>
+      </p:grpSpPr>
+      <p:sp>
+        <p:nvSpPr>
+          <p:cNvPr id="2" name="Title 1">
+            <a:extLst>
+              <a:ext uri="{FF2B5EF4-FFF2-40B4-BE49-F238E27FC236}">
+                <a16:creationId xmlns:a16="http://schemas.microsoft.com/office/drawing/2014/main" id="{04C5DF06-5F42-4296-B27B-4F79E0DB836B}"/>
+              </a:ext>
+            </a:extLst>
+          </p:cNvPr>
+          <p:cNvSpPr>
+            <a:spLocks noGrp="1"/>
+          </p:cNvSpPr>
+          <p:nvPr>
+            <p:ph type="title"/>
+          </p:nvPr>
+        </p:nvSpPr>
+        <p:spPr/>
+        <p:txBody>
+          <a:bodyPr/>
+          <a:lstStyle/>
+          <a:p>
+            <a:r>
+              <a:rPr lang="en-US" sz="3600" dirty="0" err="1"/>
+              <a:t>Exercices</a:t>
+            </a:r>
+            <a:r>
+              <a:rPr lang="en-US" sz="3600" dirty="0"/>
+              <a:t> sur le jeu de </a:t>
+            </a:r>
+            <a:r>
+              <a:rPr lang="en-US" sz="3600" dirty="0" err="1"/>
+              <a:t>données</a:t>
+            </a:r>
+            <a:r>
+              <a:rPr lang="en-US" sz="3600" dirty="0"/>
+              <a:t> Titanic</a:t>
+            </a:r>
+          </a:p>
+        </p:txBody>
+      </p:sp>
+      <p:sp>
+        <p:nvSpPr>
+          <p:cNvPr id="5" name="Slide Number Placeholder 4">
+            <a:extLst>
+              <a:ext uri="{FF2B5EF4-FFF2-40B4-BE49-F238E27FC236}">
+                <a16:creationId xmlns:a16="http://schemas.microsoft.com/office/drawing/2014/main" id="{B756D4B6-3814-4E02-AB98-08D3B49675BF}"/>
+              </a:ext>
+            </a:extLst>
+          </p:cNvPr>
+          <p:cNvSpPr>
+            <a:spLocks noGrp="1"/>
+          </p:cNvSpPr>
+          <p:nvPr>
+            <p:ph type="sldNum" sz="quarter" idx="4"/>
+          </p:nvPr>
+        </p:nvSpPr>
+        <p:spPr/>
+        <p:txBody>
+          <a:bodyPr/>
+          <a:lstStyle/>
+          <a:p>
+            <a:fld id="{5EE7099E-8998-4851-915A-4F4831808297}" type="slidenum">
+              <a:rPr lang="nl-NL" smtClean="0"/>
+              <a:pPr/>
+              <a:t>31</a:t>
+            </a:fld>
+            <a:endParaRPr lang="nl-NL"/>
+          </a:p>
+        </p:txBody>
+      </p:sp>
+      <p:sp>
+        <p:nvSpPr>
+          <p:cNvPr id="3" name="ZoneTexte 2">
+            <a:extLst>
+              <a:ext uri="{FF2B5EF4-FFF2-40B4-BE49-F238E27FC236}">
+                <a16:creationId xmlns:a16="http://schemas.microsoft.com/office/drawing/2014/main" id="{0C248AA7-6FCB-3F89-E3DD-C837A2826405}"/>
+              </a:ext>
+            </a:extLst>
+          </p:cNvPr>
+          <p:cNvSpPr txBox="1"/>
+          <p:nvPr/>
+        </p:nvSpPr>
+        <p:spPr>
+          <a:xfrm>
+            <a:off x="3692106" y="1699404"/>
+            <a:ext cx="0" cy="0"/>
+          </a:xfrm>
+          <a:prstGeom prst="rect">
+            <a:avLst/>
+          </a:prstGeom>
+          <a:noFill/>
+        </p:spPr>
+        <p:txBody>
+          <a:bodyPr wrap="none" lIns="108000" tIns="108000" rIns="108000" bIns="108000" rtlCol="0">
+            <a:noAutofit/>
+          </a:bodyPr>
+          <a:lstStyle/>
+          <a:p>
+            <a:endParaRPr lang="fr-FR" noProof="0" dirty="0" err="1">
+              <a:solidFill>
+                <a:schemeClr val="bg2"/>
+              </a:solidFill>
+            </a:endParaRPr>
+          </a:p>
+        </p:txBody>
+      </p:sp>
+      <p:sp>
+        <p:nvSpPr>
+          <p:cNvPr id="6" name="Vertical Text Placeholder 5">
+            <a:extLst>
+              <a:ext uri="{FF2B5EF4-FFF2-40B4-BE49-F238E27FC236}">
+                <a16:creationId xmlns:a16="http://schemas.microsoft.com/office/drawing/2014/main" id="{F8170739-5212-AEC7-557E-2E086A29A496}"/>
+              </a:ext>
+            </a:extLst>
+          </p:cNvPr>
+          <p:cNvSpPr>
+            <a:spLocks noGrp="1"/>
+          </p:cNvSpPr>
+          <p:nvPr>
+            <p:ph type="body" orient="vert" idx="1"/>
+          </p:nvPr>
+        </p:nvSpPr>
+        <p:spPr>
+          <a:xfrm>
+            <a:off x="404662" y="1143000"/>
+            <a:ext cx="11389023" cy="4795836"/>
+          </a:xfrm>
+        </p:spPr>
+        <p:txBody>
+          <a:bodyPr/>
+          <a:lstStyle/>
+          <a:p>
+            <a:endParaRPr lang="en-US" dirty="0"/>
+          </a:p>
+          <a:p>
+            <a:endParaRPr lang="en-US" dirty="0"/>
+          </a:p>
+          <a:p>
+            <a:pPr marL="180975" lvl="1" indent="0">
+              <a:buNone/>
+            </a:pPr>
+            <a:endParaRPr lang="en-US" dirty="0"/>
+          </a:p>
+          <a:p>
+            <a:pPr lvl="1"/>
+            <a:endParaRPr lang="en-US" dirty="0"/>
+          </a:p>
+          <a:p>
+            <a:endParaRPr lang="en-US" dirty="0"/>
+          </a:p>
+          <a:p>
+            <a:endParaRPr lang="en-US" dirty="0"/>
+          </a:p>
+          <a:p>
+            <a:endParaRPr lang="en-US" dirty="0"/>
+          </a:p>
+          <a:p>
+            <a:endParaRPr lang="en-US" dirty="0"/>
+          </a:p>
+          <a:p>
+            <a:pPr lvl="1"/>
+            <a:endParaRPr lang="en-US" dirty="0"/>
+          </a:p>
+          <a:p>
+            <a:pPr lvl="1"/>
+            <a:endParaRPr lang="en-US" dirty="0"/>
+          </a:p>
+          <a:p>
+            <a:pPr lvl="1"/>
+            <a:endParaRPr lang="en-US" dirty="0"/>
+          </a:p>
+          <a:p>
+            <a:pPr lvl="1"/>
+            <a:endParaRPr lang="en-US" dirty="0"/>
+          </a:p>
+          <a:p>
+            <a:endParaRPr lang="en-US" b="1" dirty="0"/>
+          </a:p>
+          <a:p>
+            <a:endParaRPr lang="en-US" dirty="0"/>
+          </a:p>
+        </p:txBody>
+      </p:sp>
+      <p:sp>
+        <p:nvSpPr>
+          <p:cNvPr id="4" name="Vertical Text Placeholder 5">
+            <a:extLst>
+              <a:ext uri="{FF2B5EF4-FFF2-40B4-BE49-F238E27FC236}">
+                <a16:creationId xmlns:a16="http://schemas.microsoft.com/office/drawing/2014/main" id="{A57D01D8-1D67-D654-0CFB-28A877FD85B9}"/>
+              </a:ext>
+            </a:extLst>
+          </p:cNvPr>
+          <p:cNvSpPr txBox="1">
+            <a:spLocks/>
+          </p:cNvSpPr>
+          <p:nvPr/>
+        </p:nvSpPr>
+        <p:spPr>
+          <a:xfrm>
+            <a:off x="557062" y="1295400"/>
+            <a:ext cx="11389023" cy="4795836"/>
+          </a:xfrm>
+          <a:prstGeom prst="rect">
+            <a:avLst/>
+          </a:prstGeom>
+        </p:spPr>
+        <p:txBody>
+          <a:bodyPr vert="horz" lIns="0" tIns="0" rIns="0" bIns="0" rtlCol="0">
+            <a:normAutofit/>
+          </a:bodyPr>
+          <a:lstStyle>
+            <a:lvl1pPr marL="180975" indent="-180975" algn="l" defTabSz="914400" rtl="0" eaLnBrk="1" latinLnBrk="0" hangingPunct="1">
+              <a:lnSpc>
+                <a:spcPct val="90000"/>
+              </a:lnSpc>
+              <a:spcBef>
+                <a:spcPts val="600"/>
+              </a:spcBef>
+              <a:spcAft>
+                <a:spcPts val="600"/>
+              </a:spcAft>
+              <a:buClr>
+                <a:schemeClr val="bg2"/>
+              </a:buClr>
+              <a:buFont typeface="Arial" panose="020B0604020202020204" pitchFamily="34" charset="0"/>
+              <a:buChar char="•"/>
+              <a:defRPr sz="1800" kern="1200">
+                <a:solidFill>
+                  <a:schemeClr val="bg2"/>
+                </a:solidFill>
+                <a:latin typeface="+mn-lt"/>
+                <a:ea typeface="+mn-ea"/>
+                <a:cs typeface="+mn-cs"/>
+              </a:defRPr>
+            </a:lvl1pPr>
+            <a:lvl2pPr marL="361950" indent="-180975" algn="l" defTabSz="914400" rtl="0" eaLnBrk="1" latinLnBrk="0" hangingPunct="1">
+              <a:lnSpc>
+                <a:spcPct val="90000"/>
+              </a:lnSpc>
+              <a:spcBef>
+                <a:spcPts val="600"/>
+              </a:spcBef>
+              <a:spcAft>
+                <a:spcPts val="600"/>
+              </a:spcAft>
+              <a:buClr>
+                <a:schemeClr val="bg2"/>
+              </a:buClr>
+              <a:buFont typeface="Arial" panose="020B0604020202020204" pitchFamily="34" charset="0"/>
+              <a:buChar char="-"/>
+              <a:defRPr sz="1600" kern="1200">
+                <a:solidFill>
+                  <a:schemeClr val="bg2"/>
+                </a:solidFill>
+                <a:latin typeface="+mn-lt"/>
+                <a:ea typeface="+mn-ea"/>
+                <a:cs typeface="+mn-cs"/>
+              </a:defRPr>
+            </a:lvl2pPr>
+            <a:lvl3pPr marL="0" indent="0" algn="l" defTabSz="914400" rtl="0" eaLnBrk="1" latinLnBrk="0" hangingPunct="1">
+              <a:lnSpc>
+                <a:spcPct val="90000"/>
+              </a:lnSpc>
+              <a:spcBef>
+                <a:spcPts val="600"/>
+              </a:spcBef>
+              <a:spcAft>
+                <a:spcPts val="600"/>
+              </a:spcAft>
+              <a:buFont typeface="Arial" panose="020B0604020202020204" pitchFamily="34" charset="0"/>
+              <a:buNone/>
+              <a:defRPr sz="1800" kern="1200">
+                <a:solidFill>
+                  <a:schemeClr val="bg2"/>
+                </a:solidFill>
+                <a:latin typeface="+mn-lt"/>
+                <a:ea typeface="+mn-ea"/>
+                <a:cs typeface="+mn-cs"/>
+              </a:defRPr>
+            </a:lvl3pPr>
+            <a:lvl4pPr marL="0" indent="0" algn="l" defTabSz="914400" rtl="0" eaLnBrk="1" latinLnBrk="0" hangingPunct="1">
+              <a:lnSpc>
+                <a:spcPct val="90000"/>
+              </a:lnSpc>
+              <a:spcBef>
+                <a:spcPts val="600"/>
+              </a:spcBef>
+              <a:spcAft>
+                <a:spcPts val="600"/>
+              </a:spcAft>
+              <a:buFont typeface="Arial" panose="020B0604020202020204" pitchFamily="34" charset="0"/>
+              <a:buNone/>
+              <a:defRPr sz="1800" b="1" kern="1200">
+                <a:solidFill>
+                  <a:schemeClr val="bg2"/>
+                </a:solidFill>
+                <a:latin typeface="+mn-lt"/>
+                <a:ea typeface="+mn-ea"/>
+                <a:cs typeface="+mn-cs"/>
+              </a:defRPr>
+            </a:lvl4pPr>
+            <a:lvl5pPr marL="0" indent="0" algn="l" defTabSz="914400" rtl="0" eaLnBrk="1" latinLnBrk="0" hangingPunct="1">
+              <a:lnSpc>
+                <a:spcPct val="90000"/>
+              </a:lnSpc>
+              <a:spcBef>
+                <a:spcPts val="600"/>
+              </a:spcBef>
+              <a:spcAft>
+                <a:spcPts val="600"/>
+              </a:spcAft>
+              <a:buFont typeface="Arial" panose="020B0604020202020204" pitchFamily="34" charset="0"/>
+              <a:buNone/>
+              <a:defRPr sz="1800" b="1" kern="1200" baseline="0">
+                <a:solidFill>
+                  <a:schemeClr val="tx2"/>
+                </a:solidFill>
+                <a:latin typeface="+mn-lt"/>
+                <a:ea typeface="+mn-ea"/>
+                <a:cs typeface="+mn-cs"/>
+              </a:defRPr>
+            </a:lvl5pPr>
+            <a:lvl6pPr marL="180975" indent="-180975" algn="l" defTabSz="914400" rtl="0" eaLnBrk="1" latinLnBrk="0" hangingPunct="1">
+              <a:lnSpc>
+                <a:spcPct val="90000"/>
+              </a:lnSpc>
+              <a:spcBef>
+                <a:spcPts val="600"/>
+              </a:spcBef>
+              <a:spcAft>
+                <a:spcPts val="600"/>
+              </a:spcAft>
+              <a:buClr>
+                <a:schemeClr val="bg2"/>
+              </a:buClr>
+              <a:buFont typeface="Arial" panose="020B0604020202020204" pitchFamily="34" charset="0"/>
+              <a:buChar char="•"/>
+              <a:defRPr sz="1800" kern="1200">
+                <a:solidFill>
+                  <a:schemeClr val="bg2"/>
+                </a:solidFill>
+                <a:latin typeface="+mn-lt"/>
+                <a:ea typeface="+mn-ea"/>
+                <a:cs typeface="+mn-cs"/>
+              </a:defRPr>
+            </a:lvl6pPr>
+            <a:lvl7pPr marL="361950" indent="-180975" algn="l" defTabSz="914400" rtl="0" eaLnBrk="1" latinLnBrk="0" hangingPunct="1">
+              <a:lnSpc>
+                <a:spcPct val="90000"/>
+              </a:lnSpc>
+              <a:spcBef>
+                <a:spcPts val="600"/>
+              </a:spcBef>
+              <a:spcAft>
+                <a:spcPts val="600"/>
+              </a:spcAft>
+              <a:buClr>
+                <a:schemeClr val="bg2"/>
+              </a:buClr>
+              <a:buFont typeface="Arial" panose="020B0604020202020204" pitchFamily="34" charset="0"/>
+              <a:buChar char="-"/>
+              <a:defRPr sz="1600" kern="1200">
+                <a:solidFill>
+                  <a:schemeClr val="bg2"/>
+                </a:solidFill>
+                <a:latin typeface="+mn-lt"/>
+                <a:ea typeface="+mn-ea"/>
+                <a:cs typeface="+mn-cs"/>
+              </a:defRPr>
+            </a:lvl7pPr>
+            <a:lvl8pPr marL="0" indent="0" algn="l" defTabSz="914400" rtl="0" eaLnBrk="1" latinLnBrk="0" hangingPunct="1">
+              <a:lnSpc>
+                <a:spcPct val="90000"/>
+              </a:lnSpc>
+              <a:spcBef>
+                <a:spcPts val="600"/>
+              </a:spcBef>
+              <a:spcAft>
+                <a:spcPts val="600"/>
+              </a:spcAft>
+              <a:buFont typeface="Arial" panose="020B0604020202020204" pitchFamily="34" charset="0"/>
+              <a:buNone/>
+              <a:defRPr sz="1600" kern="1200">
+                <a:solidFill>
+                  <a:schemeClr val="bg2"/>
+                </a:solidFill>
+                <a:latin typeface="+mn-lt"/>
+                <a:ea typeface="+mn-ea"/>
+                <a:cs typeface="+mn-cs"/>
+              </a:defRPr>
+            </a:lvl8pPr>
+            <a:lvl9pPr marL="0" indent="0" algn="l" defTabSz="914400" rtl="0" eaLnBrk="1" latinLnBrk="0" hangingPunct="1">
+              <a:lnSpc>
+                <a:spcPct val="90000"/>
+              </a:lnSpc>
+              <a:spcBef>
+                <a:spcPts val="600"/>
+              </a:spcBef>
+              <a:spcAft>
+                <a:spcPts val="600"/>
+              </a:spcAft>
+              <a:buFont typeface="Arial" panose="020B0604020202020204" pitchFamily="34" charset="0"/>
+              <a:buNone/>
+              <a:defRPr sz="1800" b="1" kern="1200" baseline="0">
+                <a:solidFill>
+                  <a:schemeClr val="bg2"/>
+                </a:solidFill>
+                <a:latin typeface="+mn-lt"/>
+                <a:ea typeface="+mn-ea"/>
+                <a:cs typeface="+mn-cs"/>
+              </a:defRPr>
+            </a:lvl9pPr>
+          </a:lstStyle>
+          <a:p>
+            <a:endParaRPr lang="en-US" sz="2200" b="1" dirty="0"/>
+          </a:p>
+          <a:p>
+            <a:pPr marL="180975" lvl="1" indent="0">
+              <a:buNone/>
+            </a:pPr>
+            <a:endParaRPr lang="en-US" sz="2200" dirty="0"/>
+          </a:p>
+          <a:p>
+            <a:pPr lvl="1"/>
+            <a:endParaRPr lang="en-US" sz="2200" dirty="0"/>
+          </a:p>
+          <a:p>
+            <a:pPr marL="0" indent="0">
+              <a:buFont typeface="Arial" panose="020B0604020202020204" pitchFamily="34" charset="0"/>
+              <a:buNone/>
+            </a:pPr>
+            <a:endParaRPr lang="en-US" dirty="0"/>
+          </a:p>
+          <a:p>
+            <a:endParaRPr lang="en-US" dirty="0"/>
+          </a:p>
+          <a:p>
+            <a:pPr marL="180975" lvl="1" indent="0">
+              <a:buFont typeface="Arial" panose="020B0604020202020204" pitchFamily="34" charset="0"/>
+              <a:buNone/>
+            </a:pPr>
+            <a:endParaRPr lang="en-US" dirty="0"/>
+          </a:p>
+          <a:p>
+            <a:pPr lvl="1"/>
+            <a:endParaRPr lang="en-US" dirty="0"/>
+          </a:p>
+          <a:p>
+            <a:endParaRPr lang="en-US" dirty="0"/>
+          </a:p>
+          <a:p>
+            <a:endParaRPr lang="en-US" dirty="0"/>
+          </a:p>
+          <a:p>
+            <a:endParaRPr lang="en-US" dirty="0"/>
+          </a:p>
+          <a:p>
+            <a:endParaRPr lang="en-US" dirty="0"/>
+          </a:p>
+          <a:p>
+            <a:pPr lvl="1"/>
+            <a:endParaRPr lang="en-US" dirty="0"/>
+          </a:p>
+          <a:p>
+            <a:pPr lvl="1"/>
+            <a:endParaRPr lang="en-US" dirty="0"/>
+          </a:p>
+          <a:p>
+            <a:pPr lvl="1"/>
+            <a:endParaRPr lang="en-US" dirty="0"/>
+          </a:p>
+          <a:p>
+            <a:pPr lvl="1"/>
+            <a:endParaRPr lang="en-US" dirty="0"/>
+          </a:p>
+          <a:p>
+            <a:endParaRPr lang="en-US" b="1" dirty="0"/>
+          </a:p>
+          <a:p>
+            <a:endParaRPr lang="en-US" dirty="0"/>
+          </a:p>
+        </p:txBody>
+      </p:sp>
+      <p:sp>
+        <p:nvSpPr>
+          <p:cNvPr id="7" name="Vertical Text Placeholder 5">
+            <a:extLst>
+              <a:ext uri="{FF2B5EF4-FFF2-40B4-BE49-F238E27FC236}">
+                <a16:creationId xmlns:a16="http://schemas.microsoft.com/office/drawing/2014/main" id="{DFE0C10A-165E-4BE2-39D7-55B90C940362}"/>
+              </a:ext>
+            </a:extLst>
+          </p:cNvPr>
+          <p:cNvSpPr txBox="1">
+            <a:spLocks/>
+          </p:cNvSpPr>
+          <p:nvPr/>
+        </p:nvSpPr>
+        <p:spPr>
+          <a:xfrm>
+            <a:off x="436592" y="1199890"/>
+            <a:ext cx="11389023" cy="4795836"/>
+          </a:xfrm>
+          <a:prstGeom prst="rect">
+            <a:avLst/>
+          </a:prstGeom>
+        </p:spPr>
+        <p:txBody>
+          <a:bodyPr vert="horz" lIns="0" tIns="0" rIns="0" bIns="0" rtlCol="0">
+            <a:normAutofit/>
+          </a:bodyPr>
+          <a:lstStyle>
+            <a:lvl1pPr marL="180975" indent="-180975" algn="l" defTabSz="914400" rtl="0" eaLnBrk="1" latinLnBrk="0" hangingPunct="1">
+              <a:lnSpc>
+                <a:spcPct val="90000"/>
+              </a:lnSpc>
+              <a:spcBef>
+                <a:spcPts val="600"/>
+              </a:spcBef>
+              <a:spcAft>
+                <a:spcPts val="600"/>
+              </a:spcAft>
+              <a:buClr>
+                <a:schemeClr val="bg2"/>
+              </a:buClr>
+              <a:buFont typeface="Arial" panose="020B0604020202020204" pitchFamily="34" charset="0"/>
+              <a:buChar char="•"/>
+              <a:defRPr sz="1800" kern="1200">
+                <a:solidFill>
+                  <a:schemeClr val="bg2"/>
+                </a:solidFill>
+                <a:latin typeface="+mn-lt"/>
+                <a:ea typeface="+mn-ea"/>
+                <a:cs typeface="+mn-cs"/>
+              </a:defRPr>
+            </a:lvl1pPr>
+            <a:lvl2pPr marL="361950" indent="-180975" algn="l" defTabSz="914400" rtl="0" eaLnBrk="1" latinLnBrk="0" hangingPunct="1">
+              <a:lnSpc>
+                <a:spcPct val="90000"/>
+              </a:lnSpc>
+              <a:spcBef>
+                <a:spcPts val="600"/>
+              </a:spcBef>
+              <a:spcAft>
+                <a:spcPts val="600"/>
+              </a:spcAft>
+              <a:buClr>
+                <a:schemeClr val="bg2"/>
+              </a:buClr>
+              <a:buFont typeface="Arial" panose="020B0604020202020204" pitchFamily="34" charset="0"/>
+              <a:buChar char="-"/>
+              <a:defRPr sz="1600" kern="1200">
+                <a:solidFill>
+                  <a:schemeClr val="bg2"/>
+                </a:solidFill>
+                <a:latin typeface="+mn-lt"/>
+                <a:ea typeface="+mn-ea"/>
+                <a:cs typeface="+mn-cs"/>
+              </a:defRPr>
+            </a:lvl2pPr>
+            <a:lvl3pPr marL="0" indent="0" algn="l" defTabSz="914400" rtl="0" eaLnBrk="1" latinLnBrk="0" hangingPunct="1">
+              <a:lnSpc>
+                <a:spcPct val="90000"/>
+              </a:lnSpc>
+              <a:spcBef>
+                <a:spcPts val="600"/>
+              </a:spcBef>
+              <a:spcAft>
+                <a:spcPts val="600"/>
+              </a:spcAft>
+              <a:buFont typeface="Arial" panose="020B0604020202020204" pitchFamily="34" charset="0"/>
+              <a:buNone/>
+              <a:defRPr sz="1800" kern="1200">
+                <a:solidFill>
+                  <a:schemeClr val="bg2"/>
+                </a:solidFill>
+                <a:latin typeface="+mn-lt"/>
+                <a:ea typeface="+mn-ea"/>
+                <a:cs typeface="+mn-cs"/>
+              </a:defRPr>
+            </a:lvl3pPr>
+            <a:lvl4pPr marL="0" indent="0" algn="l" defTabSz="914400" rtl="0" eaLnBrk="1" latinLnBrk="0" hangingPunct="1">
+              <a:lnSpc>
+                <a:spcPct val="90000"/>
+              </a:lnSpc>
+              <a:spcBef>
+                <a:spcPts val="600"/>
+              </a:spcBef>
+              <a:spcAft>
+                <a:spcPts val="600"/>
+              </a:spcAft>
+              <a:buFont typeface="Arial" panose="020B0604020202020204" pitchFamily="34" charset="0"/>
+              <a:buNone/>
+              <a:defRPr sz="1800" b="1" kern="1200">
+                <a:solidFill>
+                  <a:schemeClr val="bg2"/>
+                </a:solidFill>
+                <a:latin typeface="+mn-lt"/>
+                <a:ea typeface="+mn-ea"/>
+                <a:cs typeface="+mn-cs"/>
+              </a:defRPr>
+            </a:lvl4pPr>
+            <a:lvl5pPr marL="0" indent="0" algn="l" defTabSz="914400" rtl="0" eaLnBrk="1" latinLnBrk="0" hangingPunct="1">
+              <a:lnSpc>
+                <a:spcPct val="90000"/>
+              </a:lnSpc>
+              <a:spcBef>
+                <a:spcPts val="600"/>
+              </a:spcBef>
+              <a:spcAft>
+                <a:spcPts val="600"/>
+              </a:spcAft>
+              <a:buFont typeface="Arial" panose="020B0604020202020204" pitchFamily="34" charset="0"/>
+              <a:buNone/>
+              <a:defRPr sz="1800" b="1" kern="1200" baseline="0">
+                <a:solidFill>
+                  <a:schemeClr val="tx2"/>
+                </a:solidFill>
+                <a:latin typeface="+mn-lt"/>
+                <a:ea typeface="+mn-ea"/>
+                <a:cs typeface="+mn-cs"/>
+              </a:defRPr>
+            </a:lvl5pPr>
+            <a:lvl6pPr marL="180975" indent="-180975" algn="l" defTabSz="914400" rtl="0" eaLnBrk="1" latinLnBrk="0" hangingPunct="1">
+              <a:lnSpc>
+                <a:spcPct val="90000"/>
+              </a:lnSpc>
+              <a:spcBef>
+                <a:spcPts val="600"/>
+              </a:spcBef>
+              <a:spcAft>
+                <a:spcPts val="600"/>
+              </a:spcAft>
+              <a:buClr>
+                <a:schemeClr val="bg2"/>
+              </a:buClr>
+              <a:buFont typeface="Arial" panose="020B0604020202020204" pitchFamily="34" charset="0"/>
+              <a:buChar char="•"/>
+              <a:defRPr sz="1800" kern="1200">
+                <a:solidFill>
+                  <a:schemeClr val="bg2"/>
+                </a:solidFill>
+                <a:latin typeface="+mn-lt"/>
+                <a:ea typeface="+mn-ea"/>
+                <a:cs typeface="+mn-cs"/>
+              </a:defRPr>
+            </a:lvl6pPr>
+            <a:lvl7pPr marL="361950" indent="-180975" algn="l" defTabSz="914400" rtl="0" eaLnBrk="1" latinLnBrk="0" hangingPunct="1">
+              <a:lnSpc>
+                <a:spcPct val="90000"/>
+              </a:lnSpc>
+              <a:spcBef>
+                <a:spcPts val="600"/>
+              </a:spcBef>
+              <a:spcAft>
+                <a:spcPts val="600"/>
+              </a:spcAft>
+              <a:buClr>
+                <a:schemeClr val="bg2"/>
+              </a:buClr>
+              <a:buFont typeface="Arial" panose="020B0604020202020204" pitchFamily="34" charset="0"/>
+              <a:buChar char="-"/>
+              <a:defRPr sz="1600" kern="1200">
+                <a:solidFill>
+                  <a:schemeClr val="bg2"/>
+                </a:solidFill>
+                <a:latin typeface="+mn-lt"/>
+                <a:ea typeface="+mn-ea"/>
+                <a:cs typeface="+mn-cs"/>
+              </a:defRPr>
+            </a:lvl7pPr>
+            <a:lvl8pPr marL="0" indent="0" algn="l" defTabSz="914400" rtl="0" eaLnBrk="1" latinLnBrk="0" hangingPunct="1">
+              <a:lnSpc>
+                <a:spcPct val="90000"/>
+              </a:lnSpc>
+              <a:spcBef>
+                <a:spcPts val="600"/>
+              </a:spcBef>
+              <a:spcAft>
+                <a:spcPts val="600"/>
+              </a:spcAft>
+              <a:buFont typeface="Arial" panose="020B0604020202020204" pitchFamily="34" charset="0"/>
+              <a:buNone/>
+              <a:defRPr sz="1600" kern="1200">
+                <a:solidFill>
+                  <a:schemeClr val="bg2"/>
+                </a:solidFill>
+                <a:latin typeface="+mn-lt"/>
+                <a:ea typeface="+mn-ea"/>
+                <a:cs typeface="+mn-cs"/>
+              </a:defRPr>
+            </a:lvl8pPr>
+            <a:lvl9pPr marL="0" indent="0" algn="l" defTabSz="914400" rtl="0" eaLnBrk="1" latinLnBrk="0" hangingPunct="1">
+              <a:lnSpc>
+                <a:spcPct val="90000"/>
+              </a:lnSpc>
+              <a:spcBef>
+                <a:spcPts val="600"/>
+              </a:spcBef>
+              <a:spcAft>
+                <a:spcPts val="600"/>
+              </a:spcAft>
+              <a:buFont typeface="Arial" panose="020B0604020202020204" pitchFamily="34" charset="0"/>
+              <a:buNone/>
+              <a:defRPr sz="1800" b="1" kern="1200" baseline="0">
+                <a:solidFill>
+                  <a:schemeClr val="bg2"/>
+                </a:solidFill>
+                <a:latin typeface="+mn-lt"/>
+                <a:ea typeface="+mn-ea"/>
+                <a:cs typeface="+mn-cs"/>
+              </a:defRPr>
+            </a:lvl9pPr>
+          </a:lstStyle>
+          <a:p>
+            <a:pPr marL="0" indent="0">
+              <a:buNone/>
+            </a:pPr>
+            <a:r>
+              <a:rPr lang="en-US" sz="2400" dirty="0" err="1"/>
+              <a:t>Quels</a:t>
+            </a:r>
+            <a:r>
+              <a:rPr lang="en-US" sz="2400" dirty="0"/>
+              <a:t> </a:t>
+            </a:r>
+            <a:r>
+              <a:rPr lang="en-US" sz="2400" dirty="0" err="1"/>
+              <a:t>sont</a:t>
+            </a:r>
+            <a:r>
+              <a:rPr lang="en-US" sz="2400" dirty="0"/>
+              <a:t> les 5 </a:t>
+            </a:r>
+            <a:r>
+              <a:rPr lang="en-US" sz="2400" dirty="0" err="1"/>
+              <a:t>passagers</a:t>
+            </a:r>
+            <a:r>
+              <a:rPr lang="en-US" sz="2400" dirty="0"/>
+              <a:t> qui </a:t>
+            </a:r>
+            <a:r>
+              <a:rPr lang="en-US" sz="2400" dirty="0" err="1"/>
+              <a:t>ont</a:t>
+            </a:r>
+            <a:r>
+              <a:rPr lang="en-US" sz="2400" dirty="0"/>
+              <a:t> </a:t>
+            </a:r>
+            <a:r>
+              <a:rPr lang="en-US" sz="2400" dirty="0" err="1"/>
+              <a:t>payé</a:t>
+            </a:r>
+            <a:r>
+              <a:rPr lang="en-US" sz="2400" dirty="0"/>
+              <a:t> le </a:t>
+            </a:r>
+            <a:r>
+              <a:rPr lang="en-US" sz="2400" dirty="0" err="1"/>
+              <a:t>moins</a:t>
+            </a:r>
+            <a:r>
+              <a:rPr lang="en-US" sz="2400" dirty="0"/>
+              <a:t> </a:t>
+            </a:r>
+            <a:r>
+              <a:rPr lang="en-US" sz="2400" dirty="0" err="1"/>
+              <a:t>cher</a:t>
+            </a:r>
+            <a:r>
+              <a:rPr lang="en-US" sz="2400" dirty="0"/>
+              <a:t> </a:t>
+            </a:r>
+            <a:r>
+              <a:rPr lang="en-US" sz="2400" dirty="0" err="1"/>
+              <a:t>leur</a:t>
+            </a:r>
+            <a:r>
+              <a:rPr lang="en-US" sz="2400" dirty="0"/>
+              <a:t> ticket ?</a:t>
+            </a:r>
+            <a:endParaRPr lang="en-US" sz="2200" dirty="0"/>
+          </a:p>
+          <a:p>
+            <a:pPr lvl="1"/>
+            <a:endParaRPr lang="en-US" sz="2200" dirty="0"/>
+          </a:p>
+          <a:p>
+            <a:pPr marL="0" indent="0">
+              <a:buFont typeface="Arial" panose="020B0604020202020204" pitchFamily="34" charset="0"/>
+              <a:buNone/>
+            </a:pPr>
+            <a:endParaRPr lang="en-US" dirty="0"/>
+          </a:p>
+          <a:p>
+            <a:endParaRPr lang="en-US" dirty="0"/>
+          </a:p>
+          <a:p>
+            <a:pPr marL="180975" lvl="1" indent="0">
+              <a:buFont typeface="Arial" panose="020B0604020202020204" pitchFamily="34" charset="0"/>
+              <a:buNone/>
+            </a:pPr>
+            <a:endParaRPr lang="en-US" dirty="0"/>
+          </a:p>
+          <a:p>
+            <a:pPr lvl="1"/>
+            <a:endParaRPr lang="en-US" dirty="0"/>
+          </a:p>
+          <a:p>
+            <a:endParaRPr lang="en-US" dirty="0"/>
+          </a:p>
+          <a:p>
+            <a:endParaRPr lang="en-US" dirty="0"/>
+          </a:p>
+          <a:p>
+            <a:endParaRPr lang="en-US" dirty="0"/>
+          </a:p>
+          <a:p>
+            <a:endParaRPr lang="en-US" dirty="0"/>
+          </a:p>
+          <a:p>
+            <a:pPr lvl="1"/>
+            <a:endParaRPr lang="en-US" dirty="0"/>
+          </a:p>
+          <a:p>
+            <a:pPr lvl="1"/>
+            <a:endParaRPr lang="en-US" dirty="0"/>
+          </a:p>
+          <a:p>
+            <a:pPr lvl="1"/>
+            <a:endParaRPr lang="en-US" dirty="0"/>
+          </a:p>
+          <a:p>
+            <a:pPr lvl="1"/>
+            <a:endParaRPr lang="en-US" dirty="0"/>
+          </a:p>
+          <a:p>
+            <a:endParaRPr lang="en-US" b="1" dirty="0"/>
+          </a:p>
+          <a:p>
+            <a:endParaRPr lang="en-US" dirty="0"/>
+          </a:p>
+        </p:txBody>
+      </p:sp>
+      <p:pic>
+        <p:nvPicPr>
+          <p:cNvPr id="8" name="Image 7">
+            <a:extLst>
+              <a:ext uri="{FF2B5EF4-FFF2-40B4-BE49-F238E27FC236}">
+                <a16:creationId xmlns:a16="http://schemas.microsoft.com/office/drawing/2014/main" id="{85C7BAC5-055D-63B3-136E-5200DCE4CBCA}"/>
+              </a:ext>
+            </a:extLst>
+          </p:cNvPr>
+          <p:cNvPicPr>
+            <a:picLocks noChangeAspect="1"/>
+          </p:cNvPicPr>
+          <p:nvPr/>
+        </p:nvPicPr>
+        <p:blipFill>
+          <a:blip r:embed="rId2"/>
+          <a:stretch>
+            <a:fillRect/>
+          </a:stretch>
+        </p:blipFill>
+        <p:spPr>
+          <a:xfrm>
+            <a:off x="2212975" y="1606456"/>
+            <a:ext cx="7218996" cy="4484780"/>
+          </a:xfrm>
+          <a:prstGeom prst="rect">
+            <a:avLst/>
+          </a:prstGeom>
+        </p:spPr>
+      </p:pic>
+    </p:spTree>
+    <p:extLst>
+      <p:ext uri="{BB962C8B-B14F-4D97-AF65-F5344CB8AC3E}">
+        <p14:creationId xmlns:p14="http://schemas.microsoft.com/office/powerpoint/2010/main" val="1647979995"/>
+      </p:ext>
+    </p:extLst>
+  </p:cSld>
+  <p:clrMapOvr>
+    <a:masterClrMapping/>
+  </p:clrMapOvr>
+  <p:transition spd="slow">
+    <p:wipe dir="r"/>
+  </p:transition>
+</p:sld>
+</file>
+
+<file path=ppt/slides/slide32.xml><?xml version="1.0" encoding="utf-8"?>
+<p:sld xmlns:a="http://schemas.openxmlformats.org/drawingml/2006/main" xmlns:r="http://schemas.openxmlformats.org/officeDocument/2006/relationships" xmlns:p="http://schemas.openxmlformats.org/presentationml/2006/main">
+  <p:cSld>
+    <p:spTree>
+      <p:nvGrpSpPr>
+        <p:cNvPr id="1" name=""/>
+        <p:cNvGrpSpPr/>
+        <p:nvPr/>
+      </p:nvGrpSpPr>
+      <p:grpSpPr>
+        <a:xfrm>
+          <a:off x="0" y="0"/>
+          <a:ext cx="0" cy="0"/>
+          <a:chOff x="0" y="0"/>
+          <a:chExt cx="0" cy="0"/>
+        </a:xfrm>
+      </p:grpSpPr>
+      <p:sp>
+        <p:nvSpPr>
+          <p:cNvPr id="2" name="Title 1">
+            <a:extLst>
+              <a:ext uri="{FF2B5EF4-FFF2-40B4-BE49-F238E27FC236}">
+                <a16:creationId xmlns:a16="http://schemas.microsoft.com/office/drawing/2014/main" id="{04C5DF06-5F42-4296-B27B-4F79E0DB836B}"/>
+              </a:ext>
+            </a:extLst>
+          </p:cNvPr>
+          <p:cNvSpPr>
+            <a:spLocks noGrp="1"/>
+          </p:cNvSpPr>
+          <p:nvPr>
+            <p:ph type="title"/>
+          </p:nvPr>
+        </p:nvSpPr>
+        <p:spPr/>
+        <p:txBody>
+          <a:bodyPr/>
+          <a:lstStyle/>
+          <a:p>
+            <a:r>
+              <a:rPr lang="en-US" sz="3600" dirty="0" err="1"/>
+              <a:t>Exercices</a:t>
+            </a:r>
+            <a:r>
+              <a:rPr lang="en-US" sz="3600" dirty="0"/>
+              <a:t> sur le jeu de </a:t>
+            </a:r>
+            <a:r>
+              <a:rPr lang="en-US" sz="3600" dirty="0" err="1"/>
+              <a:t>données</a:t>
+            </a:r>
+            <a:r>
+              <a:rPr lang="en-US" sz="3600" dirty="0"/>
+              <a:t> Titanic</a:t>
+            </a:r>
+          </a:p>
+        </p:txBody>
+      </p:sp>
+      <p:sp>
+        <p:nvSpPr>
+          <p:cNvPr id="5" name="Slide Number Placeholder 4">
+            <a:extLst>
+              <a:ext uri="{FF2B5EF4-FFF2-40B4-BE49-F238E27FC236}">
+                <a16:creationId xmlns:a16="http://schemas.microsoft.com/office/drawing/2014/main" id="{B756D4B6-3814-4E02-AB98-08D3B49675BF}"/>
+              </a:ext>
+            </a:extLst>
+          </p:cNvPr>
+          <p:cNvSpPr>
+            <a:spLocks noGrp="1"/>
+          </p:cNvSpPr>
+          <p:nvPr>
+            <p:ph type="sldNum" sz="quarter" idx="4"/>
+          </p:nvPr>
+        </p:nvSpPr>
+        <p:spPr/>
+        <p:txBody>
+          <a:bodyPr/>
+          <a:lstStyle/>
+          <a:p>
+            <a:fld id="{5EE7099E-8998-4851-915A-4F4831808297}" type="slidenum">
+              <a:rPr lang="nl-NL" smtClean="0"/>
+              <a:pPr/>
+              <a:t>32</a:t>
+            </a:fld>
+            <a:endParaRPr lang="nl-NL"/>
+          </a:p>
+        </p:txBody>
+      </p:sp>
+      <p:sp>
+        <p:nvSpPr>
+          <p:cNvPr id="3" name="ZoneTexte 2">
+            <a:extLst>
+              <a:ext uri="{FF2B5EF4-FFF2-40B4-BE49-F238E27FC236}">
+                <a16:creationId xmlns:a16="http://schemas.microsoft.com/office/drawing/2014/main" id="{0C248AA7-6FCB-3F89-E3DD-C837A2826405}"/>
+              </a:ext>
+            </a:extLst>
+          </p:cNvPr>
+          <p:cNvSpPr txBox="1"/>
+          <p:nvPr/>
+        </p:nvSpPr>
+        <p:spPr>
+          <a:xfrm>
+            <a:off x="3692106" y="1699404"/>
+            <a:ext cx="0" cy="0"/>
+          </a:xfrm>
+          <a:prstGeom prst="rect">
+            <a:avLst/>
+          </a:prstGeom>
+          <a:noFill/>
+        </p:spPr>
+        <p:txBody>
+          <a:bodyPr wrap="none" lIns="108000" tIns="108000" rIns="108000" bIns="108000" rtlCol="0">
+            <a:noAutofit/>
+          </a:bodyPr>
+          <a:lstStyle/>
+          <a:p>
+            <a:endParaRPr lang="fr-FR" noProof="0" dirty="0" err="1">
+              <a:solidFill>
+                <a:schemeClr val="bg2"/>
+              </a:solidFill>
+            </a:endParaRPr>
+          </a:p>
+        </p:txBody>
+      </p:sp>
+      <p:sp>
+        <p:nvSpPr>
+          <p:cNvPr id="6" name="Vertical Text Placeholder 5">
+            <a:extLst>
+              <a:ext uri="{FF2B5EF4-FFF2-40B4-BE49-F238E27FC236}">
+                <a16:creationId xmlns:a16="http://schemas.microsoft.com/office/drawing/2014/main" id="{F8170739-5212-AEC7-557E-2E086A29A496}"/>
+              </a:ext>
+            </a:extLst>
+          </p:cNvPr>
+          <p:cNvSpPr>
+            <a:spLocks noGrp="1"/>
+          </p:cNvSpPr>
+          <p:nvPr>
+            <p:ph type="body" orient="vert" idx="1"/>
+          </p:nvPr>
+        </p:nvSpPr>
+        <p:spPr>
+          <a:xfrm>
+            <a:off x="404662" y="1143000"/>
+            <a:ext cx="11389023" cy="4795836"/>
+          </a:xfrm>
+        </p:spPr>
+        <p:txBody>
+          <a:bodyPr/>
+          <a:lstStyle/>
+          <a:p>
+            <a:endParaRPr lang="en-US" dirty="0"/>
+          </a:p>
+          <a:p>
+            <a:endParaRPr lang="en-US" dirty="0"/>
+          </a:p>
+          <a:p>
+            <a:pPr marL="180975" lvl="1" indent="0">
+              <a:buNone/>
+            </a:pPr>
+            <a:endParaRPr lang="en-US" dirty="0"/>
+          </a:p>
+          <a:p>
+            <a:pPr lvl="1"/>
+            <a:endParaRPr lang="en-US" dirty="0"/>
+          </a:p>
+          <a:p>
+            <a:endParaRPr lang="en-US" dirty="0"/>
+          </a:p>
+          <a:p>
+            <a:endParaRPr lang="en-US" dirty="0"/>
+          </a:p>
+          <a:p>
+            <a:endParaRPr lang="en-US" dirty="0"/>
+          </a:p>
+          <a:p>
+            <a:endParaRPr lang="en-US" dirty="0"/>
+          </a:p>
+          <a:p>
+            <a:pPr lvl="1"/>
+            <a:endParaRPr lang="en-US" dirty="0"/>
+          </a:p>
+          <a:p>
+            <a:pPr lvl="1"/>
+            <a:endParaRPr lang="en-US" dirty="0"/>
+          </a:p>
+          <a:p>
+            <a:pPr lvl="1"/>
+            <a:endParaRPr lang="en-US" dirty="0"/>
+          </a:p>
+          <a:p>
+            <a:pPr lvl="1"/>
+            <a:endParaRPr lang="en-US" dirty="0"/>
+          </a:p>
+          <a:p>
+            <a:endParaRPr lang="en-US" b="1" dirty="0"/>
+          </a:p>
+          <a:p>
+            <a:endParaRPr lang="en-US" dirty="0"/>
+          </a:p>
+        </p:txBody>
+      </p:sp>
+      <p:sp>
+        <p:nvSpPr>
+          <p:cNvPr id="4" name="Vertical Text Placeholder 5">
+            <a:extLst>
+              <a:ext uri="{FF2B5EF4-FFF2-40B4-BE49-F238E27FC236}">
+                <a16:creationId xmlns:a16="http://schemas.microsoft.com/office/drawing/2014/main" id="{A57D01D8-1D67-D654-0CFB-28A877FD85B9}"/>
+              </a:ext>
+            </a:extLst>
+          </p:cNvPr>
+          <p:cNvSpPr txBox="1">
+            <a:spLocks/>
+          </p:cNvSpPr>
+          <p:nvPr/>
+        </p:nvSpPr>
+        <p:spPr>
+          <a:xfrm>
+            <a:off x="557062" y="1295400"/>
+            <a:ext cx="11389023" cy="4795836"/>
+          </a:xfrm>
+          <a:prstGeom prst="rect">
+            <a:avLst/>
+          </a:prstGeom>
+        </p:spPr>
+        <p:txBody>
+          <a:bodyPr vert="horz" lIns="0" tIns="0" rIns="0" bIns="0" rtlCol="0">
+            <a:normAutofit/>
+          </a:bodyPr>
+          <a:lstStyle>
+            <a:lvl1pPr marL="180975" indent="-180975" algn="l" defTabSz="914400" rtl="0" eaLnBrk="1" latinLnBrk="0" hangingPunct="1">
+              <a:lnSpc>
+                <a:spcPct val="90000"/>
+              </a:lnSpc>
+              <a:spcBef>
+                <a:spcPts val="600"/>
+              </a:spcBef>
+              <a:spcAft>
+                <a:spcPts val="600"/>
+              </a:spcAft>
+              <a:buClr>
+                <a:schemeClr val="bg2"/>
+              </a:buClr>
+              <a:buFont typeface="Arial" panose="020B0604020202020204" pitchFamily="34" charset="0"/>
+              <a:buChar char="•"/>
+              <a:defRPr sz="1800" kern="1200">
+                <a:solidFill>
+                  <a:schemeClr val="bg2"/>
+                </a:solidFill>
+                <a:latin typeface="+mn-lt"/>
+                <a:ea typeface="+mn-ea"/>
+                <a:cs typeface="+mn-cs"/>
+              </a:defRPr>
+            </a:lvl1pPr>
+            <a:lvl2pPr marL="361950" indent="-180975" algn="l" defTabSz="914400" rtl="0" eaLnBrk="1" latinLnBrk="0" hangingPunct="1">
+              <a:lnSpc>
+                <a:spcPct val="90000"/>
+              </a:lnSpc>
+              <a:spcBef>
+                <a:spcPts val="600"/>
+              </a:spcBef>
+              <a:spcAft>
+                <a:spcPts val="600"/>
+              </a:spcAft>
+              <a:buClr>
+                <a:schemeClr val="bg2"/>
+              </a:buClr>
+              <a:buFont typeface="Arial" panose="020B0604020202020204" pitchFamily="34" charset="0"/>
+              <a:buChar char="-"/>
+              <a:defRPr sz="1600" kern="1200">
+                <a:solidFill>
+                  <a:schemeClr val="bg2"/>
+                </a:solidFill>
+                <a:latin typeface="+mn-lt"/>
+                <a:ea typeface="+mn-ea"/>
+                <a:cs typeface="+mn-cs"/>
+              </a:defRPr>
+            </a:lvl2pPr>
+            <a:lvl3pPr marL="0" indent="0" algn="l" defTabSz="914400" rtl="0" eaLnBrk="1" latinLnBrk="0" hangingPunct="1">
+              <a:lnSpc>
+                <a:spcPct val="90000"/>
+              </a:lnSpc>
+              <a:spcBef>
+                <a:spcPts val="600"/>
+              </a:spcBef>
+              <a:spcAft>
+                <a:spcPts val="600"/>
+              </a:spcAft>
+              <a:buFont typeface="Arial" panose="020B0604020202020204" pitchFamily="34" charset="0"/>
+              <a:buNone/>
+              <a:defRPr sz="1800" kern="1200">
+                <a:solidFill>
+                  <a:schemeClr val="bg2"/>
+                </a:solidFill>
+                <a:latin typeface="+mn-lt"/>
+                <a:ea typeface="+mn-ea"/>
+                <a:cs typeface="+mn-cs"/>
+              </a:defRPr>
+            </a:lvl3pPr>
+            <a:lvl4pPr marL="0" indent="0" algn="l" defTabSz="914400" rtl="0" eaLnBrk="1" latinLnBrk="0" hangingPunct="1">
+              <a:lnSpc>
+                <a:spcPct val="90000"/>
+              </a:lnSpc>
+              <a:spcBef>
+                <a:spcPts val="600"/>
+              </a:spcBef>
+              <a:spcAft>
+                <a:spcPts val="600"/>
+              </a:spcAft>
+              <a:buFont typeface="Arial" panose="020B0604020202020204" pitchFamily="34" charset="0"/>
+              <a:buNone/>
+              <a:defRPr sz="1800" b="1" kern="1200">
+                <a:solidFill>
+                  <a:schemeClr val="bg2"/>
+                </a:solidFill>
+                <a:latin typeface="+mn-lt"/>
+                <a:ea typeface="+mn-ea"/>
+                <a:cs typeface="+mn-cs"/>
+              </a:defRPr>
+            </a:lvl4pPr>
+            <a:lvl5pPr marL="0" indent="0" algn="l" defTabSz="914400" rtl="0" eaLnBrk="1" latinLnBrk="0" hangingPunct="1">
+              <a:lnSpc>
+                <a:spcPct val="90000"/>
+              </a:lnSpc>
+              <a:spcBef>
+                <a:spcPts val="600"/>
+              </a:spcBef>
+              <a:spcAft>
+                <a:spcPts val="600"/>
+              </a:spcAft>
+              <a:buFont typeface="Arial" panose="020B0604020202020204" pitchFamily="34" charset="0"/>
+              <a:buNone/>
+              <a:defRPr sz="1800" b="1" kern="1200" baseline="0">
+                <a:solidFill>
+                  <a:schemeClr val="tx2"/>
+                </a:solidFill>
+                <a:latin typeface="+mn-lt"/>
+                <a:ea typeface="+mn-ea"/>
+                <a:cs typeface="+mn-cs"/>
+              </a:defRPr>
+            </a:lvl5pPr>
+            <a:lvl6pPr marL="180975" indent="-180975" algn="l" defTabSz="914400" rtl="0" eaLnBrk="1" latinLnBrk="0" hangingPunct="1">
+              <a:lnSpc>
+                <a:spcPct val="90000"/>
+              </a:lnSpc>
+              <a:spcBef>
+                <a:spcPts val="600"/>
+              </a:spcBef>
+              <a:spcAft>
+                <a:spcPts val="600"/>
+              </a:spcAft>
+              <a:buClr>
+                <a:schemeClr val="bg2"/>
+              </a:buClr>
+              <a:buFont typeface="Arial" panose="020B0604020202020204" pitchFamily="34" charset="0"/>
+              <a:buChar char="•"/>
+              <a:defRPr sz="1800" kern="1200">
+                <a:solidFill>
+                  <a:schemeClr val="bg2"/>
+                </a:solidFill>
+                <a:latin typeface="+mn-lt"/>
+                <a:ea typeface="+mn-ea"/>
+                <a:cs typeface="+mn-cs"/>
+              </a:defRPr>
+            </a:lvl6pPr>
+            <a:lvl7pPr marL="361950" indent="-180975" algn="l" defTabSz="914400" rtl="0" eaLnBrk="1" latinLnBrk="0" hangingPunct="1">
+              <a:lnSpc>
+                <a:spcPct val="90000"/>
+              </a:lnSpc>
+              <a:spcBef>
+                <a:spcPts val="600"/>
+              </a:spcBef>
+              <a:spcAft>
+                <a:spcPts val="600"/>
+              </a:spcAft>
+              <a:buClr>
+                <a:schemeClr val="bg2"/>
+              </a:buClr>
+              <a:buFont typeface="Arial" panose="020B0604020202020204" pitchFamily="34" charset="0"/>
+              <a:buChar char="-"/>
+              <a:defRPr sz="1600" kern="1200">
+                <a:solidFill>
+                  <a:schemeClr val="bg2"/>
+                </a:solidFill>
+                <a:latin typeface="+mn-lt"/>
+                <a:ea typeface="+mn-ea"/>
+                <a:cs typeface="+mn-cs"/>
+              </a:defRPr>
+            </a:lvl7pPr>
+            <a:lvl8pPr marL="0" indent="0" algn="l" defTabSz="914400" rtl="0" eaLnBrk="1" latinLnBrk="0" hangingPunct="1">
+              <a:lnSpc>
+                <a:spcPct val="90000"/>
+              </a:lnSpc>
+              <a:spcBef>
+                <a:spcPts val="600"/>
+              </a:spcBef>
+              <a:spcAft>
+                <a:spcPts val="600"/>
+              </a:spcAft>
+              <a:buFont typeface="Arial" panose="020B0604020202020204" pitchFamily="34" charset="0"/>
+              <a:buNone/>
+              <a:defRPr sz="1600" kern="1200">
+                <a:solidFill>
+                  <a:schemeClr val="bg2"/>
+                </a:solidFill>
+                <a:latin typeface="+mn-lt"/>
+                <a:ea typeface="+mn-ea"/>
+                <a:cs typeface="+mn-cs"/>
+              </a:defRPr>
+            </a:lvl8pPr>
+            <a:lvl9pPr marL="0" indent="0" algn="l" defTabSz="914400" rtl="0" eaLnBrk="1" latinLnBrk="0" hangingPunct="1">
+              <a:lnSpc>
+                <a:spcPct val="90000"/>
+              </a:lnSpc>
+              <a:spcBef>
+                <a:spcPts val="600"/>
+              </a:spcBef>
+              <a:spcAft>
+                <a:spcPts val="600"/>
+              </a:spcAft>
+              <a:buFont typeface="Arial" panose="020B0604020202020204" pitchFamily="34" charset="0"/>
+              <a:buNone/>
+              <a:defRPr sz="1800" b="1" kern="1200" baseline="0">
+                <a:solidFill>
+                  <a:schemeClr val="bg2"/>
+                </a:solidFill>
+                <a:latin typeface="+mn-lt"/>
+                <a:ea typeface="+mn-ea"/>
+                <a:cs typeface="+mn-cs"/>
+              </a:defRPr>
+            </a:lvl9pPr>
+          </a:lstStyle>
+          <a:p>
+            <a:endParaRPr lang="en-US" sz="2200" b="1" dirty="0"/>
+          </a:p>
+          <a:p>
+            <a:pPr marL="180975" lvl="1" indent="0">
+              <a:buNone/>
+            </a:pPr>
+            <a:endParaRPr lang="en-US" sz="2200" dirty="0"/>
+          </a:p>
+          <a:p>
+            <a:pPr lvl="1"/>
+            <a:endParaRPr lang="en-US" sz="2200" dirty="0"/>
+          </a:p>
+          <a:p>
+            <a:pPr marL="0" indent="0">
+              <a:buFont typeface="Arial" panose="020B0604020202020204" pitchFamily="34" charset="0"/>
+              <a:buNone/>
+            </a:pPr>
+            <a:endParaRPr lang="en-US" dirty="0"/>
+          </a:p>
+          <a:p>
+            <a:endParaRPr lang="en-US" dirty="0"/>
+          </a:p>
+          <a:p>
+            <a:pPr marL="180975" lvl="1" indent="0">
+              <a:buFont typeface="Arial" panose="020B0604020202020204" pitchFamily="34" charset="0"/>
+              <a:buNone/>
+            </a:pPr>
+            <a:endParaRPr lang="en-US" dirty="0"/>
+          </a:p>
+          <a:p>
+            <a:pPr lvl="1"/>
+            <a:endParaRPr lang="en-US" dirty="0"/>
+          </a:p>
+          <a:p>
+            <a:endParaRPr lang="en-US" dirty="0"/>
+          </a:p>
+          <a:p>
+            <a:endParaRPr lang="en-US" dirty="0"/>
+          </a:p>
+          <a:p>
+            <a:endParaRPr lang="en-US" dirty="0"/>
+          </a:p>
+          <a:p>
+            <a:endParaRPr lang="en-US" dirty="0"/>
+          </a:p>
+          <a:p>
+            <a:pPr lvl="1"/>
+            <a:endParaRPr lang="en-US" dirty="0"/>
+          </a:p>
+          <a:p>
+            <a:pPr lvl="1"/>
+            <a:endParaRPr lang="en-US" dirty="0"/>
+          </a:p>
+          <a:p>
+            <a:pPr lvl="1"/>
+            <a:endParaRPr lang="en-US" dirty="0"/>
+          </a:p>
+          <a:p>
+            <a:pPr lvl="1"/>
+            <a:endParaRPr lang="en-US" dirty="0"/>
+          </a:p>
+          <a:p>
+            <a:endParaRPr lang="en-US" b="1" dirty="0"/>
+          </a:p>
+          <a:p>
+            <a:endParaRPr lang="en-US" dirty="0"/>
+          </a:p>
+        </p:txBody>
+      </p:sp>
+      <p:sp>
+        <p:nvSpPr>
+          <p:cNvPr id="7" name="Vertical Text Placeholder 5">
+            <a:extLst>
+              <a:ext uri="{FF2B5EF4-FFF2-40B4-BE49-F238E27FC236}">
+                <a16:creationId xmlns:a16="http://schemas.microsoft.com/office/drawing/2014/main" id="{DFE0C10A-165E-4BE2-39D7-55B90C940362}"/>
+              </a:ext>
+            </a:extLst>
+          </p:cNvPr>
+          <p:cNvSpPr txBox="1">
+            <a:spLocks/>
+          </p:cNvSpPr>
+          <p:nvPr/>
+        </p:nvSpPr>
+        <p:spPr>
+          <a:xfrm>
+            <a:off x="436592" y="1199890"/>
+            <a:ext cx="11389023" cy="4795836"/>
+          </a:xfrm>
+          <a:prstGeom prst="rect">
+            <a:avLst/>
+          </a:prstGeom>
+        </p:spPr>
+        <p:txBody>
+          <a:bodyPr vert="horz" lIns="0" tIns="0" rIns="0" bIns="0" rtlCol="0">
+            <a:normAutofit/>
+          </a:bodyPr>
+          <a:lstStyle>
+            <a:lvl1pPr marL="180975" indent="-180975" algn="l" defTabSz="914400" rtl="0" eaLnBrk="1" latinLnBrk="0" hangingPunct="1">
+              <a:lnSpc>
+                <a:spcPct val="90000"/>
+              </a:lnSpc>
+              <a:spcBef>
+                <a:spcPts val="600"/>
+              </a:spcBef>
+              <a:spcAft>
+                <a:spcPts val="600"/>
+              </a:spcAft>
+              <a:buClr>
+                <a:schemeClr val="bg2"/>
+              </a:buClr>
+              <a:buFont typeface="Arial" panose="020B0604020202020204" pitchFamily="34" charset="0"/>
+              <a:buChar char="•"/>
+              <a:defRPr sz="1800" kern="1200">
+                <a:solidFill>
+                  <a:schemeClr val="bg2"/>
+                </a:solidFill>
+                <a:latin typeface="+mn-lt"/>
+                <a:ea typeface="+mn-ea"/>
+                <a:cs typeface="+mn-cs"/>
+              </a:defRPr>
+            </a:lvl1pPr>
+            <a:lvl2pPr marL="361950" indent="-180975" algn="l" defTabSz="914400" rtl="0" eaLnBrk="1" latinLnBrk="0" hangingPunct="1">
+              <a:lnSpc>
+                <a:spcPct val="90000"/>
+              </a:lnSpc>
+              <a:spcBef>
+                <a:spcPts val="600"/>
+              </a:spcBef>
+              <a:spcAft>
+                <a:spcPts val="600"/>
+              </a:spcAft>
+              <a:buClr>
+                <a:schemeClr val="bg2"/>
+              </a:buClr>
+              <a:buFont typeface="Arial" panose="020B0604020202020204" pitchFamily="34" charset="0"/>
+              <a:buChar char="-"/>
+              <a:defRPr sz="1600" kern="1200">
+                <a:solidFill>
+                  <a:schemeClr val="bg2"/>
+                </a:solidFill>
+                <a:latin typeface="+mn-lt"/>
+                <a:ea typeface="+mn-ea"/>
+                <a:cs typeface="+mn-cs"/>
+              </a:defRPr>
+            </a:lvl2pPr>
+            <a:lvl3pPr marL="0" indent="0" algn="l" defTabSz="914400" rtl="0" eaLnBrk="1" latinLnBrk="0" hangingPunct="1">
+              <a:lnSpc>
+                <a:spcPct val="90000"/>
+              </a:lnSpc>
+              <a:spcBef>
+                <a:spcPts val="600"/>
+              </a:spcBef>
+              <a:spcAft>
+                <a:spcPts val="600"/>
+              </a:spcAft>
+              <a:buFont typeface="Arial" panose="020B0604020202020204" pitchFamily="34" charset="0"/>
+              <a:buNone/>
+              <a:defRPr sz="1800" kern="1200">
+                <a:solidFill>
+                  <a:schemeClr val="bg2"/>
+                </a:solidFill>
+                <a:latin typeface="+mn-lt"/>
+                <a:ea typeface="+mn-ea"/>
+                <a:cs typeface="+mn-cs"/>
+              </a:defRPr>
+            </a:lvl3pPr>
+            <a:lvl4pPr marL="0" indent="0" algn="l" defTabSz="914400" rtl="0" eaLnBrk="1" latinLnBrk="0" hangingPunct="1">
+              <a:lnSpc>
+                <a:spcPct val="90000"/>
+              </a:lnSpc>
+              <a:spcBef>
+                <a:spcPts val="600"/>
+              </a:spcBef>
+              <a:spcAft>
+                <a:spcPts val="600"/>
+              </a:spcAft>
+              <a:buFont typeface="Arial" panose="020B0604020202020204" pitchFamily="34" charset="0"/>
+              <a:buNone/>
+              <a:defRPr sz="1800" b="1" kern="1200">
+                <a:solidFill>
+                  <a:schemeClr val="bg2"/>
+                </a:solidFill>
+                <a:latin typeface="+mn-lt"/>
+                <a:ea typeface="+mn-ea"/>
+                <a:cs typeface="+mn-cs"/>
+              </a:defRPr>
+            </a:lvl4pPr>
+            <a:lvl5pPr marL="0" indent="0" algn="l" defTabSz="914400" rtl="0" eaLnBrk="1" latinLnBrk="0" hangingPunct="1">
+              <a:lnSpc>
+                <a:spcPct val="90000"/>
+              </a:lnSpc>
+              <a:spcBef>
+                <a:spcPts val="600"/>
+              </a:spcBef>
+              <a:spcAft>
+                <a:spcPts val="600"/>
+              </a:spcAft>
+              <a:buFont typeface="Arial" panose="020B0604020202020204" pitchFamily="34" charset="0"/>
+              <a:buNone/>
+              <a:defRPr sz="1800" b="1" kern="1200" baseline="0">
+                <a:solidFill>
+                  <a:schemeClr val="tx2"/>
+                </a:solidFill>
+                <a:latin typeface="+mn-lt"/>
+                <a:ea typeface="+mn-ea"/>
+                <a:cs typeface="+mn-cs"/>
+              </a:defRPr>
+            </a:lvl5pPr>
+            <a:lvl6pPr marL="180975" indent="-180975" algn="l" defTabSz="914400" rtl="0" eaLnBrk="1" latinLnBrk="0" hangingPunct="1">
+              <a:lnSpc>
+                <a:spcPct val="90000"/>
+              </a:lnSpc>
+              <a:spcBef>
+                <a:spcPts val="600"/>
+              </a:spcBef>
+              <a:spcAft>
+                <a:spcPts val="600"/>
+              </a:spcAft>
+              <a:buClr>
+                <a:schemeClr val="bg2"/>
+              </a:buClr>
+              <a:buFont typeface="Arial" panose="020B0604020202020204" pitchFamily="34" charset="0"/>
+              <a:buChar char="•"/>
+              <a:defRPr sz="1800" kern="1200">
+                <a:solidFill>
+                  <a:schemeClr val="bg2"/>
+                </a:solidFill>
+                <a:latin typeface="+mn-lt"/>
+                <a:ea typeface="+mn-ea"/>
+                <a:cs typeface="+mn-cs"/>
+              </a:defRPr>
+            </a:lvl6pPr>
+            <a:lvl7pPr marL="361950" indent="-180975" algn="l" defTabSz="914400" rtl="0" eaLnBrk="1" latinLnBrk="0" hangingPunct="1">
+              <a:lnSpc>
+                <a:spcPct val="90000"/>
+              </a:lnSpc>
+              <a:spcBef>
+                <a:spcPts val="600"/>
+              </a:spcBef>
+              <a:spcAft>
+                <a:spcPts val="600"/>
+              </a:spcAft>
+              <a:buClr>
+                <a:schemeClr val="bg2"/>
+              </a:buClr>
+              <a:buFont typeface="Arial" panose="020B0604020202020204" pitchFamily="34" charset="0"/>
+              <a:buChar char="-"/>
+              <a:defRPr sz="1600" kern="1200">
+                <a:solidFill>
+                  <a:schemeClr val="bg2"/>
+                </a:solidFill>
+                <a:latin typeface="+mn-lt"/>
+                <a:ea typeface="+mn-ea"/>
+                <a:cs typeface="+mn-cs"/>
+              </a:defRPr>
+            </a:lvl7pPr>
+            <a:lvl8pPr marL="0" indent="0" algn="l" defTabSz="914400" rtl="0" eaLnBrk="1" latinLnBrk="0" hangingPunct="1">
+              <a:lnSpc>
+                <a:spcPct val="90000"/>
+              </a:lnSpc>
+              <a:spcBef>
+                <a:spcPts val="600"/>
+              </a:spcBef>
+              <a:spcAft>
+                <a:spcPts val="600"/>
+              </a:spcAft>
+              <a:buFont typeface="Arial" panose="020B0604020202020204" pitchFamily="34" charset="0"/>
+              <a:buNone/>
+              <a:defRPr sz="1600" kern="1200">
+                <a:solidFill>
+                  <a:schemeClr val="bg2"/>
+                </a:solidFill>
+                <a:latin typeface="+mn-lt"/>
+                <a:ea typeface="+mn-ea"/>
+                <a:cs typeface="+mn-cs"/>
+              </a:defRPr>
+            </a:lvl8pPr>
+            <a:lvl9pPr marL="0" indent="0" algn="l" defTabSz="914400" rtl="0" eaLnBrk="1" latinLnBrk="0" hangingPunct="1">
+              <a:lnSpc>
+                <a:spcPct val="90000"/>
+              </a:lnSpc>
+              <a:spcBef>
+                <a:spcPts val="600"/>
+              </a:spcBef>
+              <a:spcAft>
+                <a:spcPts val="600"/>
+              </a:spcAft>
+              <a:buFont typeface="Arial" panose="020B0604020202020204" pitchFamily="34" charset="0"/>
+              <a:buNone/>
+              <a:defRPr sz="1800" b="1" kern="1200" baseline="0">
+                <a:solidFill>
+                  <a:schemeClr val="bg2"/>
+                </a:solidFill>
+                <a:latin typeface="+mn-lt"/>
+                <a:ea typeface="+mn-ea"/>
+                <a:cs typeface="+mn-cs"/>
+              </a:defRPr>
+            </a:lvl9pPr>
+          </a:lstStyle>
+          <a:p>
+            <a:pPr marL="0" indent="0">
+              <a:buNone/>
+            </a:pPr>
+            <a:r>
+              <a:rPr lang="en-US" sz="2400" dirty="0"/>
+              <a:t>Quelle </a:t>
+            </a:r>
+            <a:r>
+              <a:rPr lang="en-US" sz="2400" dirty="0" err="1"/>
+              <a:t>est</a:t>
+            </a:r>
+            <a:r>
+              <a:rPr lang="en-US" sz="2400" dirty="0"/>
+              <a:t> la </a:t>
+            </a:r>
+            <a:r>
+              <a:rPr lang="en-US" sz="2400" dirty="0" err="1"/>
+              <a:t>somme</a:t>
+            </a:r>
+            <a:r>
+              <a:rPr lang="en-US" sz="2400" dirty="0"/>
+              <a:t> </a:t>
+            </a:r>
+            <a:r>
+              <a:rPr lang="en-US" sz="2400" dirty="0" err="1"/>
+              <a:t>totale</a:t>
+            </a:r>
+            <a:r>
+              <a:rPr lang="en-US" sz="2400" dirty="0"/>
+              <a:t> des </a:t>
+            </a:r>
+            <a:r>
+              <a:rPr lang="en-US" sz="2400" dirty="0" err="1"/>
+              <a:t>tarifs</a:t>
+            </a:r>
+            <a:r>
+              <a:rPr lang="en-US" sz="2400" dirty="0"/>
+              <a:t> </a:t>
+            </a:r>
+            <a:r>
+              <a:rPr lang="en-US" sz="2400" dirty="0" err="1"/>
+              <a:t>payés</a:t>
+            </a:r>
+            <a:r>
+              <a:rPr lang="en-US" sz="2400" dirty="0"/>
+              <a:t> par </a:t>
+            </a:r>
+            <a:r>
+              <a:rPr lang="en-US" sz="2400" dirty="0" err="1"/>
+              <a:t>classe</a:t>
+            </a:r>
+            <a:r>
+              <a:rPr lang="en-US" sz="2400" dirty="0"/>
+              <a:t> ?</a:t>
+            </a:r>
+          </a:p>
+          <a:p>
+            <a:pPr lvl="1"/>
+            <a:endParaRPr lang="en-US" sz="2200" dirty="0"/>
+          </a:p>
+          <a:p>
+            <a:pPr marL="0" indent="0">
+              <a:buFont typeface="Arial" panose="020B0604020202020204" pitchFamily="34" charset="0"/>
+              <a:buNone/>
+            </a:pPr>
+            <a:endParaRPr lang="en-US" dirty="0"/>
+          </a:p>
+          <a:p>
+            <a:endParaRPr lang="en-US" dirty="0"/>
+          </a:p>
+          <a:p>
+            <a:pPr marL="180975" lvl="1" indent="0">
+              <a:buFont typeface="Arial" panose="020B0604020202020204" pitchFamily="34" charset="0"/>
+              <a:buNone/>
+            </a:pPr>
+            <a:endParaRPr lang="en-US" dirty="0"/>
+          </a:p>
+          <a:p>
+            <a:pPr lvl="1"/>
+            <a:endParaRPr lang="en-US" dirty="0"/>
+          </a:p>
+          <a:p>
+            <a:endParaRPr lang="en-US" dirty="0"/>
+          </a:p>
+          <a:p>
+            <a:endParaRPr lang="en-US" dirty="0"/>
+          </a:p>
+          <a:p>
+            <a:endParaRPr lang="en-US" dirty="0"/>
+          </a:p>
+          <a:p>
+            <a:endParaRPr lang="en-US" dirty="0"/>
+          </a:p>
+          <a:p>
+            <a:pPr lvl="1"/>
+            <a:endParaRPr lang="en-US" dirty="0"/>
+          </a:p>
+          <a:p>
+            <a:pPr lvl="1"/>
+            <a:endParaRPr lang="en-US" dirty="0"/>
+          </a:p>
+          <a:p>
+            <a:pPr lvl="1"/>
+            <a:endParaRPr lang="en-US" dirty="0"/>
+          </a:p>
+          <a:p>
+            <a:pPr lvl="1"/>
+            <a:endParaRPr lang="en-US" dirty="0"/>
+          </a:p>
+          <a:p>
+            <a:endParaRPr lang="en-US" b="1" dirty="0"/>
+          </a:p>
+          <a:p>
+            <a:endParaRPr lang="en-US" dirty="0"/>
+          </a:p>
+        </p:txBody>
+      </p:sp>
+    </p:spTree>
+    <p:extLst>
+      <p:ext uri="{BB962C8B-B14F-4D97-AF65-F5344CB8AC3E}">
+        <p14:creationId xmlns:p14="http://schemas.microsoft.com/office/powerpoint/2010/main" val="2397404294"/>
+      </p:ext>
+    </p:extLst>
+  </p:cSld>
+  <p:clrMapOvr>
+    <a:masterClrMapping/>
+  </p:clrMapOvr>
+  <p:transition spd="slow">
+    <p:wipe dir="r"/>
+  </p:transition>
+</p:sld>
+</file>
+
+<file path=ppt/slides/slide33.xml><?xml version="1.0" encoding="utf-8"?>
+<p:sld xmlns:a="http://schemas.openxmlformats.org/drawingml/2006/main" xmlns:r="http://schemas.openxmlformats.org/officeDocument/2006/relationships" xmlns:p="http://schemas.openxmlformats.org/presentationml/2006/main">
+  <p:cSld>
+    <p:spTree>
+      <p:nvGrpSpPr>
+        <p:cNvPr id="1" name=""/>
+        <p:cNvGrpSpPr/>
+        <p:nvPr/>
+      </p:nvGrpSpPr>
+      <p:grpSpPr>
+        <a:xfrm>
+          <a:off x="0" y="0"/>
+          <a:ext cx="0" cy="0"/>
+          <a:chOff x="0" y="0"/>
+          <a:chExt cx="0" cy="0"/>
+        </a:xfrm>
+      </p:grpSpPr>
+      <p:sp>
+        <p:nvSpPr>
+          <p:cNvPr id="2" name="Title 1">
+            <a:extLst>
+              <a:ext uri="{FF2B5EF4-FFF2-40B4-BE49-F238E27FC236}">
+                <a16:creationId xmlns:a16="http://schemas.microsoft.com/office/drawing/2014/main" id="{04C5DF06-5F42-4296-B27B-4F79E0DB836B}"/>
+              </a:ext>
+            </a:extLst>
+          </p:cNvPr>
+          <p:cNvSpPr>
+            <a:spLocks noGrp="1"/>
+          </p:cNvSpPr>
+          <p:nvPr>
+            <p:ph type="title"/>
+          </p:nvPr>
+        </p:nvSpPr>
+        <p:spPr/>
+        <p:txBody>
+          <a:bodyPr/>
+          <a:lstStyle/>
+          <a:p>
+            <a:r>
+              <a:rPr lang="en-US" sz="3600" dirty="0" err="1"/>
+              <a:t>Exercices</a:t>
+            </a:r>
+            <a:r>
+              <a:rPr lang="en-US" sz="3600" dirty="0"/>
+              <a:t> sur le jeu de </a:t>
+            </a:r>
+            <a:r>
+              <a:rPr lang="en-US" sz="3600" dirty="0" err="1"/>
+              <a:t>données</a:t>
+            </a:r>
+            <a:r>
+              <a:rPr lang="en-US" sz="3600" dirty="0"/>
+              <a:t> Titanic</a:t>
+            </a:r>
+          </a:p>
+        </p:txBody>
+      </p:sp>
+      <p:sp>
+        <p:nvSpPr>
+          <p:cNvPr id="5" name="Slide Number Placeholder 4">
+            <a:extLst>
+              <a:ext uri="{FF2B5EF4-FFF2-40B4-BE49-F238E27FC236}">
+                <a16:creationId xmlns:a16="http://schemas.microsoft.com/office/drawing/2014/main" id="{B756D4B6-3814-4E02-AB98-08D3B49675BF}"/>
+              </a:ext>
+            </a:extLst>
+          </p:cNvPr>
+          <p:cNvSpPr>
+            <a:spLocks noGrp="1"/>
+          </p:cNvSpPr>
+          <p:nvPr>
+            <p:ph type="sldNum" sz="quarter" idx="4"/>
+          </p:nvPr>
+        </p:nvSpPr>
+        <p:spPr/>
+        <p:txBody>
+          <a:bodyPr/>
+          <a:lstStyle/>
+          <a:p>
+            <a:fld id="{5EE7099E-8998-4851-915A-4F4831808297}" type="slidenum">
+              <a:rPr lang="nl-NL" smtClean="0"/>
+              <a:pPr/>
+              <a:t>33</a:t>
+            </a:fld>
+            <a:endParaRPr lang="nl-NL"/>
+          </a:p>
+        </p:txBody>
+      </p:sp>
+      <p:sp>
+        <p:nvSpPr>
+          <p:cNvPr id="3" name="ZoneTexte 2">
+            <a:extLst>
+              <a:ext uri="{FF2B5EF4-FFF2-40B4-BE49-F238E27FC236}">
+                <a16:creationId xmlns:a16="http://schemas.microsoft.com/office/drawing/2014/main" id="{0C248AA7-6FCB-3F89-E3DD-C837A2826405}"/>
+              </a:ext>
+            </a:extLst>
+          </p:cNvPr>
+          <p:cNvSpPr txBox="1"/>
+          <p:nvPr/>
+        </p:nvSpPr>
+        <p:spPr>
+          <a:xfrm>
+            <a:off x="3692106" y="1699404"/>
+            <a:ext cx="0" cy="0"/>
+          </a:xfrm>
+          <a:prstGeom prst="rect">
+            <a:avLst/>
+          </a:prstGeom>
+          <a:noFill/>
+        </p:spPr>
+        <p:txBody>
+          <a:bodyPr wrap="none" lIns="108000" tIns="108000" rIns="108000" bIns="108000" rtlCol="0">
+            <a:noAutofit/>
+          </a:bodyPr>
+          <a:lstStyle/>
+          <a:p>
+            <a:endParaRPr lang="fr-FR" noProof="0" dirty="0" err="1">
+              <a:solidFill>
+                <a:schemeClr val="bg2"/>
+              </a:solidFill>
+            </a:endParaRPr>
+          </a:p>
+        </p:txBody>
+      </p:sp>
+      <p:sp>
+        <p:nvSpPr>
+          <p:cNvPr id="6" name="Vertical Text Placeholder 5">
+            <a:extLst>
+              <a:ext uri="{FF2B5EF4-FFF2-40B4-BE49-F238E27FC236}">
+                <a16:creationId xmlns:a16="http://schemas.microsoft.com/office/drawing/2014/main" id="{F8170739-5212-AEC7-557E-2E086A29A496}"/>
+              </a:ext>
+            </a:extLst>
+          </p:cNvPr>
+          <p:cNvSpPr>
+            <a:spLocks noGrp="1"/>
+          </p:cNvSpPr>
+          <p:nvPr>
+            <p:ph type="body" orient="vert" idx="1"/>
+          </p:nvPr>
+        </p:nvSpPr>
+        <p:spPr>
+          <a:xfrm>
+            <a:off x="404662" y="1143000"/>
+            <a:ext cx="11389023" cy="4795836"/>
+          </a:xfrm>
+        </p:spPr>
+        <p:txBody>
+          <a:bodyPr/>
+          <a:lstStyle/>
+          <a:p>
+            <a:endParaRPr lang="en-US" dirty="0"/>
+          </a:p>
+          <a:p>
+            <a:endParaRPr lang="en-US" dirty="0"/>
+          </a:p>
+          <a:p>
+            <a:pPr marL="180975" lvl="1" indent="0">
+              <a:buNone/>
+            </a:pPr>
+            <a:endParaRPr lang="en-US" dirty="0"/>
+          </a:p>
+          <a:p>
+            <a:pPr lvl="1"/>
+            <a:endParaRPr lang="en-US" dirty="0"/>
+          </a:p>
+          <a:p>
+            <a:endParaRPr lang="en-US" dirty="0"/>
+          </a:p>
+          <a:p>
+            <a:endParaRPr lang="en-US" dirty="0"/>
+          </a:p>
+          <a:p>
+            <a:endParaRPr lang="en-US" dirty="0"/>
+          </a:p>
+          <a:p>
+            <a:endParaRPr lang="en-US" dirty="0"/>
+          </a:p>
+          <a:p>
+            <a:pPr lvl="1"/>
+            <a:endParaRPr lang="en-US" dirty="0"/>
+          </a:p>
+          <a:p>
+            <a:pPr lvl="1"/>
+            <a:endParaRPr lang="en-US" dirty="0"/>
+          </a:p>
+          <a:p>
+            <a:pPr lvl="1"/>
+            <a:endParaRPr lang="en-US" dirty="0"/>
+          </a:p>
+          <a:p>
+            <a:pPr lvl="1"/>
+            <a:endParaRPr lang="en-US" dirty="0"/>
+          </a:p>
+          <a:p>
+            <a:endParaRPr lang="en-US" b="1" dirty="0"/>
+          </a:p>
+          <a:p>
+            <a:endParaRPr lang="en-US" dirty="0"/>
+          </a:p>
+        </p:txBody>
+      </p:sp>
+      <p:sp>
+        <p:nvSpPr>
+          <p:cNvPr id="4" name="Vertical Text Placeholder 5">
+            <a:extLst>
+              <a:ext uri="{FF2B5EF4-FFF2-40B4-BE49-F238E27FC236}">
+                <a16:creationId xmlns:a16="http://schemas.microsoft.com/office/drawing/2014/main" id="{A57D01D8-1D67-D654-0CFB-28A877FD85B9}"/>
+              </a:ext>
+            </a:extLst>
+          </p:cNvPr>
+          <p:cNvSpPr txBox="1">
+            <a:spLocks/>
+          </p:cNvSpPr>
+          <p:nvPr/>
+        </p:nvSpPr>
+        <p:spPr>
+          <a:xfrm>
+            <a:off x="557062" y="1295400"/>
+            <a:ext cx="11389023" cy="4795836"/>
+          </a:xfrm>
+          <a:prstGeom prst="rect">
+            <a:avLst/>
+          </a:prstGeom>
+        </p:spPr>
+        <p:txBody>
+          <a:bodyPr vert="horz" lIns="0" tIns="0" rIns="0" bIns="0" rtlCol="0">
+            <a:normAutofit/>
+          </a:bodyPr>
+          <a:lstStyle>
+            <a:lvl1pPr marL="180975" indent="-180975" algn="l" defTabSz="914400" rtl="0" eaLnBrk="1" latinLnBrk="0" hangingPunct="1">
+              <a:lnSpc>
+                <a:spcPct val="90000"/>
+              </a:lnSpc>
+              <a:spcBef>
+                <a:spcPts val="600"/>
+              </a:spcBef>
+              <a:spcAft>
+                <a:spcPts val="600"/>
+              </a:spcAft>
+              <a:buClr>
+                <a:schemeClr val="bg2"/>
+              </a:buClr>
+              <a:buFont typeface="Arial" panose="020B0604020202020204" pitchFamily="34" charset="0"/>
+              <a:buChar char="•"/>
+              <a:defRPr sz="1800" kern="1200">
+                <a:solidFill>
+                  <a:schemeClr val="bg2"/>
+                </a:solidFill>
+                <a:latin typeface="+mn-lt"/>
+                <a:ea typeface="+mn-ea"/>
+                <a:cs typeface="+mn-cs"/>
+              </a:defRPr>
+            </a:lvl1pPr>
+            <a:lvl2pPr marL="361950" indent="-180975" algn="l" defTabSz="914400" rtl="0" eaLnBrk="1" latinLnBrk="0" hangingPunct="1">
+              <a:lnSpc>
+                <a:spcPct val="90000"/>
+              </a:lnSpc>
+              <a:spcBef>
+                <a:spcPts val="600"/>
+              </a:spcBef>
+              <a:spcAft>
+                <a:spcPts val="600"/>
+              </a:spcAft>
+              <a:buClr>
+                <a:schemeClr val="bg2"/>
+              </a:buClr>
+              <a:buFont typeface="Arial" panose="020B0604020202020204" pitchFamily="34" charset="0"/>
+              <a:buChar char="-"/>
+              <a:defRPr sz="1600" kern="1200">
+                <a:solidFill>
+                  <a:schemeClr val="bg2"/>
+                </a:solidFill>
+                <a:latin typeface="+mn-lt"/>
+                <a:ea typeface="+mn-ea"/>
+                <a:cs typeface="+mn-cs"/>
+              </a:defRPr>
+            </a:lvl2pPr>
+            <a:lvl3pPr marL="0" indent="0" algn="l" defTabSz="914400" rtl="0" eaLnBrk="1" latinLnBrk="0" hangingPunct="1">
+              <a:lnSpc>
+                <a:spcPct val="90000"/>
+              </a:lnSpc>
+              <a:spcBef>
+                <a:spcPts val="600"/>
+              </a:spcBef>
+              <a:spcAft>
+                <a:spcPts val="600"/>
+              </a:spcAft>
+              <a:buFont typeface="Arial" panose="020B0604020202020204" pitchFamily="34" charset="0"/>
+              <a:buNone/>
+              <a:defRPr sz="1800" kern="1200">
+                <a:solidFill>
+                  <a:schemeClr val="bg2"/>
+                </a:solidFill>
+                <a:latin typeface="+mn-lt"/>
+                <a:ea typeface="+mn-ea"/>
+                <a:cs typeface="+mn-cs"/>
+              </a:defRPr>
+            </a:lvl3pPr>
+            <a:lvl4pPr marL="0" indent="0" algn="l" defTabSz="914400" rtl="0" eaLnBrk="1" latinLnBrk="0" hangingPunct="1">
+              <a:lnSpc>
+                <a:spcPct val="90000"/>
+              </a:lnSpc>
+              <a:spcBef>
+                <a:spcPts val="600"/>
+              </a:spcBef>
+              <a:spcAft>
+                <a:spcPts val="600"/>
+              </a:spcAft>
+              <a:buFont typeface="Arial" panose="020B0604020202020204" pitchFamily="34" charset="0"/>
+              <a:buNone/>
+              <a:defRPr sz="1800" b="1" kern="1200">
+                <a:solidFill>
+                  <a:schemeClr val="bg2"/>
+                </a:solidFill>
+                <a:latin typeface="+mn-lt"/>
+                <a:ea typeface="+mn-ea"/>
+                <a:cs typeface="+mn-cs"/>
+              </a:defRPr>
+            </a:lvl4pPr>
+            <a:lvl5pPr marL="0" indent="0" algn="l" defTabSz="914400" rtl="0" eaLnBrk="1" latinLnBrk="0" hangingPunct="1">
+              <a:lnSpc>
+                <a:spcPct val="90000"/>
+              </a:lnSpc>
+              <a:spcBef>
+                <a:spcPts val="600"/>
+              </a:spcBef>
+              <a:spcAft>
+                <a:spcPts val="600"/>
+              </a:spcAft>
+              <a:buFont typeface="Arial" panose="020B0604020202020204" pitchFamily="34" charset="0"/>
+              <a:buNone/>
+              <a:defRPr sz="1800" b="1" kern="1200" baseline="0">
+                <a:solidFill>
+                  <a:schemeClr val="tx2"/>
+                </a:solidFill>
+                <a:latin typeface="+mn-lt"/>
+                <a:ea typeface="+mn-ea"/>
+                <a:cs typeface="+mn-cs"/>
+              </a:defRPr>
+            </a:lvl5pPr>
+            <a:lvl6pPr marL="180975" indent="-180975" algn="l" defTabSz="914400" rtl="0" eaLnBrk="1" latinLnBrk="0" hangingPunct="1">
+              <a:lnSpc>
+                <a:spcPct val="90000"/>
+              </a:lnSpc>
+              <a:spcBef>
+                <a:spcPts val="600"/>
+              </a:spcBef>
+              <a:spcAft>
+                <a:spcPts val="600"/>
+              </a:spcAft>
+              <a:buClr>
+                <a:schemeClr val="bg2"/>
+              </a:buClr>
+              <a:buFont typeface="Arial" panose="020B0604020202020204" pitchFamily="34" charset="0"/>
+              <a:buChar char="•"/>
+              <a:defRPr sz="1800" kern="1200">
+                <a:solidFill>
+                  <a:schemeClr val="bg2"/>
+                </a:solidFill>
+                <a:latin typeface="+mn-lt"/>
+                <a:ea typeface="+mn-ea"/>
+                <a:cs typeface="+mn-cs"/>
+              </a:defRPr>
+            </a:lvl6pPr>
+            <a:lvl7pPr marL="361950" indent="-180975" algn="l" defTabSz="914400" rtl="0" eaLnBrk="1" latinLnBrk="0" hangingPunct="1">
+              <a:lnSpc>
+                <a:spcPct val="90000"/>
+              </a:lnSpc>
+              <a:spcBef>
+                <a:spcPts val="600"/>
+              </a:spcBef>
+              <a:spcAft>
+                <a:spcPts val="600"/>
+              </a:spcAft>
+              <a:buClr>
+                <a:schemeClr val="bg2"/>
+              </a:buClr>
+              <a:buFont typeface="Arial" panose="020B0604020202020204" pitchFamily="34" charset="0"/>
+              <a:buChar char="-"/>
+              <a:defRPr sz="1600" kern="1200">
+                <a:solidFill>
+                  <a:schemeClr val="bg2"/>
+                </a:solidFill>
+                <a:latin typeface="+mn-lt"/>
+                <a:ea typeface="+mn-ea"/>
+                <a:cs typeface="+mn-cs"/>
+              </a:defRPr>
+            </a:lvl7pPr>
+            <a:lvl8pPr marL="0" indent="0" algn="l" defTabSz="914400" rtl="0" eaLnBrk="1" latinLnBrk="0" hangingPunct="1">
+              <a:lnSpc>
+                <a:spcPct val="90000"/>
+              </a:lnSpc>
+              <a:spcBef>
+                <a:spcPts val="600"/>
+              </a:spcBef>
+              <a:spcAft>
+                <a:spcPts val="600"/>
+              </a:spcAft>
+              <a:buFont typeface="Arial" panose="020B0604020202020204" pitchFamily="34" charset="0"/>
+              <a:buNone/>
+              <a:defRPr sz="1600" kern="1200">
+                <a:solidFill>
+                  <a:schemeClr val="bg2"/>
+                </a:solidFill>
+                <a:latin typeface="+mn-lt"/>
+                <a:ea typeface="+mn-ea"/>
+                <a:cs typeface="+mn-cs"/>
+              </a:defRPr>
+            </a:lvl8pPr>
+            <a:lvl9pPr marL="0" indent="0" algn="l" defTabSz="914400" rtl="0" eaLnBrk="1" latinLnBrk="0" hangingPunct="1">
+              <a:lnSpc>
+                <a:spcPct val="90000"/>
+              </a:lnSpc>
+              <a:spcBef>
+                <a:spcPts val="600"/>
+              </a:spcBef>
+              <a:spcAft>
+                <a:spcPts val="600"/>
+              </a:spcAft>
+              <a:buFont typeface="Arial" panose="020B0604020202020204" pitchFamily="34" charset="0"/>
+              <a:buNone/>
+              <a:defRPr sz="1800" b="1" kern="1200" baseline="0">
+                <a:solidFill>
+                  <a:schemeClr val="bg2"/>
+                </a:solidFill>
+                <a:latin typeface="+mn-lt"/>
+                <a:ea typeface="+mn-ea"/>
+                <a:cs typeface="+mn-cs"/>
+              </a:defRPr>
+            </a:lvl9pPr>
+          </a:lstStyle>
+          <a:p>
+            <a:endParaRPr lang="en-US" sz="2200" b="1" dirty="0"/>
+          </a:p>
+          <a:p>
+            <a:pPr marL="180975" lvl="1" indent="0">
+              <a:buNone/>
+            </a:pPr>
+            <a:endParaRPr lang="en-US" sz="2200" dirty="0"/>
+          </a:p>
+          <a:p>
+            <a:pPr lvl="1"/>
+            <a:endParaRPr lang="en-US" sz="2200" dirty="0"/>
+          </a:p>
+          <a:p>
+            <a:pPr marL="0" indent="0">
+              <a:buFont typeface="Arial" panose="020B0604020202020204" pitchFamily="34" charset="0"/>
+              <a:buNone/>
+            </a:pPr>
+            <a:endParaRPr lang="en-US" dirty="0"/>
+          </a:p>
+          <a:p>
+            <a:endParaRPr lang="en-US" dirty="0"/>
+          </a:p>
+          <a:p>
+            <a:pPr marL="180975" lvl="1" indent="0">
+              <a:buFont typeface="Arial" panose="020B0604020202020204" pitchFamily="34" charset="0"/>
+              <a:buNone/>
+            </a:pPr>
+            <a:endParaRPr lang="en-US" dirty="0"/>
+          </a:p>
+          <a:p>
+            <a:pPr lvl="1"/>
+            <a:endParaRPr lang="en-US" dirty="0"/>
+          </a:p>
+          <a:p>
+            <a:endParaRPr lang="en-US" dirty="0"/>
+          </a:p>
+          <a:p>
+            <a:endParaRPr lang="en-US" dirty="0"/>
+          </a:p>
+          <a:p>
+            <a:endParaRPr lang="en-US" dirty="0"/>
+          </a:p>
+          <a:p>
+            <a:endParaRPr lang="en-US" dirty="0"/>
+          </a:p>
+          <a:p>
+            <a:pPr lvl="1"/>
+            <a:endParaRPr lang="en-US" dirty="0"/>
+          </a:p>
+          <a:p>
+            <a:pPr lvl="1"/>
+            <a:endParaRPr lang="en-US" dirty="0"/>
+          </a:p>
+          <a:p>
+            <a:pPr lvl="1"/>
+            <a:endParaRPr lang="en-US" dirty="0"/>
+          </a:p>
+          <a:p>
+            <a:pPr lvl="1"/>
+            <a:endParaRPr lang="en-US" dirty="0"/>
+          </a:p>
+          <a:p>
+            <a:endParaRPr lang="en-US" b="1" dirty="0"/>
+          </a:p>
+          <a:p>
+            <a:endParaRPr lang="en-US" dirty="0"/>
+          </a:p>
+        </p:txBody>
+      </p:sp>
+      <p:sp>
+        <p:nvSpPr>
+          <p:cNvPr id="7" name="Vertical Text Placeholder 5">
+            <a:extLst>
+              <a:ext uri="{FF2B5EF4-FFF2-40B4-BE49-F238E27FC236}">
+                <a16:creationId xmlns:a16="http://schemas.microsoft.com/office/drawing/2014/main" id="{DFE0C10A-165E-4BE2-39D7-55B90C940362}"/>
+              </a:ext>
+            </a:extLst>
+          </p:cNvPr>
+          <p:cNvSpPr txBox="1">
+            <a:spLocks/>
+          </p:cNvSpPr>
+          <p:nvPr/>
+        </p:nvSpPr>
+        <p:spPr>
+          <a:xfrm>
+            <a:off x="436592" y="1199890"/>
+            <a:ext cx="11389023" cy="4795836"/>
+          </a:xfrm>
+          <a:prstGeom prst="rect">
+            <a:avLst/>
+          </a:prstGeom>
+        </p:spPr>
+        <p:txBody>
+          <a:bodyPr vert="horz" lIns="0" tIns="0" rIns="0" bIns="0" rtlCol="0">
+            <a:normAutofit/>
+          </a:bodyPr>
+          <a:lstStyle>
+            <a:lvl1pPr marL="180975" indent="-180975" algn="l" defTabSz="914400" rtl="0" eaLnBrk="1" latinLnBrk="0" hangingPunct="1">
+              <a:lnSpc>
+                <a:spcPct val="90000"/>
+              </a:lnSpc>
+              <a:spcBef>
+                <a:spcPts val="600"/>
+              </a:spcBef>
+              <a:spcAft>
+                <a:spcPts val="600"/>
+              </a:spcAft>
+              <a:buClr>
+                <a:schemeClr val="bg2"/>
+              </a:buClr>
+              <a:buFont typeface="Arial" panose="020B0604020202020204" pitchFamily="34" charset="0"/>
+              <a:buChar char="•"/>
+              <a:defRPr sz="1800" kern="1200">
+                <a:solidFill>
+                  <a:schemeClr val="bg2"/>
+                </a:solidFill>
+                <a:latin typeface="+mn-lt"/>
+                <a:ea typeface="+mn-ea"/>
+                <a:cs typeface="+mn-cs"/>
+              </a:defRPr>
+            </a:lvl1pPr>
+            <a:lvl2pPr marL="361950" indent="-180975" algn="l" defTabSz="914400" rtl="0" eaLnBrk="1" latinLnBrk="0" hangingPunct="1">
+              <a:lnSpc>
+                <a:spcPct val="90000"/>
+              </a:lnSpc>
+              <a:spcBef>
+                <a:spcPts val="600"/>
+              </a:spcBef>
+              <a:spcAft>
+                <a:spcPts val="600"/>
+              </a:spcAft>
+              <a:buClr>
+                <a:schemeClr val="bg2"/>
+              </a:buClr>
+              <a:buFont typeface="Arial" panose="020B0604020202020204" pitchFamily="34" charset="0"/>
+              <a:buChar char="-"/>
+              <a:defRPr sz="1600" kern="1200">
+                <a:solidFill>
+                  <a:schemeClr val="bg2"/>
+                </a:solidFill>
+                <a:latin typeface="+mn-lt"/>
+                <a:ea typeface="+mn-ea"/>
+                <a:cs typeface="+mn-cs"/>
+              </a:defRPr>
+            </a:lvl2pPr>
+            <a:lvl3pPr marL="0" indent="0" algn="l" defTabSz="914400" rtl="0" eaLnBrk="1" latinLnBrk="0" hangingPunct="1">
+              <a:lnSpc>
+                <a:spcPct val="90000"/>
+              </a:lnSpc>
+              <a:spcBef>
+                <a:spcPts val="600"/>
+              </a:spcBef>
+              <a:spcAft>
+                <a:spcPts val="600"/>
+              </a:spcAft>
+              <a:buFont typeface="Arial" panose="020B0604020202020204" pitchFamily="34" charset="0"/>
+              <a:buNone/>
+              <a:defRPr sz="1800" kern="1200">
+                <a:solidFill>
+                  <a:schemeClr val="bg2"/>
+                </a:solidFill>
+                <a:latin typeface="+mn-lt"/>
+                <a:ea typeface="+mn-ea"/>
+                <a:cs typeface="+mn-cs"/>
+              </a:defRPr>
+            </a:lvl3pPr>
+            <a:lvl4pPr marL="0" indent="0" algn="l" defTabSz="914400" rtl="0" eaLnBrk="1" latinLnBrk="0" hangingPunct="1">
+              <a:lnSpc>
+                <a:spcPct val="90000"/>
+              </a:lnSpc>
+              <a:spcBef>
+                <a:spcPts val="600"/>
+              </a:spcBef>
+              <a:spcAft>
+                <a:spcPts val="600"/>
+              </a:spcAft>
+              <a:buFont typeface="Arial" panose="020B0604020202020204" pitchFamily="34" charset="0"/>
+              <a:buNone/>
+              <a:defRPr sz="1800" b="1" kern="1200">
+                <a:solidFill>
+                  <a:schemeClr val="bg2"/>
+                </a:solidFill>
+                <a:latin typeface="+mn-lt"/>
+                <a:ea typeface="+mn-ea"/>
+                <a:cs typeface="+mn-cs"/>
+              </a:defRPr>
+            </a:lvl4pPr>
+            <a:lvl5pPr marL="0" indent="0" algn="l" defTabSz="914400" rtl="0" eaLnBrk="1" latinLnBrk="0" hangingPunct="1">
+              <a:lnSpc>
+                <a:spcPct val="90000"/>
+              </a:lnSpc>
+              <a:spcBef>
+                <a:spcPts val="600"/>
+              </a:spcBef>
+              <a:spcAft>
+                <a:spcPts val="600"/>
+              </a:spcAft>
+              <a:buFont typeface="Arial" panose="020B0604020202020204" pitchFamily="34" charset="0"/>
+              <a:buNone/>
+              <a:defRPr sz="1800" b="1" kern="1200" baseline="0">
+                <a:solidFill>
+                  <a:schemeClr val="tx2"/>
+                </a:solidFill>
+                <a:latin typeface="+mn-lt"/>
+                <a:ea typeface="+mn-ea"/>
+                <a:cs typeface="+mn-cs"/>
+              </a:defRPr>
+            </a:lvl5pPr>
+            <a:lvl6pPr marL="180975" indent="-180975" algn="l" defTabSz="914400" rtl="0" eaLnBrk="1" latinLnBrk="0" hangingPunct="1">
+              <a:lnSpc>
+                <a:spcPct val="90000"/>
+              </a:lnSpc>
+              <a:spcBef>
+                <a:spcPts val="600"/>
+              </a:spcBef>
+              <a:spcAft>
+                <a:spcPts val="600"/>
+              </a:spcAft>
+              <a:buClr>
+                <a:schemeClr val="bg2"/>
+              </a:buClr>
+              <a:buFont typeface="Arial" panose="020B0604020202020204" pitchFamily="34" charset="0"/>
+              <a:buChar char="•"/>
+              <a:defRPr sz="1800" kern="1200">
+                <a:solidFill>
+                  <a:schemeClr val="bg2"/>
+                </a:solidFill>
+                <a:latin typeface="+mn-lt"/>
+                <a:ea typeface="+mn-ea"/>
+                <a:cs typeface="+mn-cs"/>
+              </a:defRPr>
+            </a:lvl6pPr>
+            <a:lvl7pPr marL="361950" indent="-180975" algn="l" defTabSz="914400" rtl="0" eaLnBrk="1" latinLnBrk="0" hangingPunct="1">
+              <a:lnSpc>
+                <a:spcPct val="90000"/>
+              </a:lnSpc>
+              <a:spcBef>
+                <a:spcPts val="600"/>
+              </a:spcBef>
+              <a:spcAft>
+                <a:spcPts val="600"/>
+              </a:spcAft>
+              <a:buClr>
+                <a:schemeClr val="bg2"/>
+              </a:buClr>
+              <a:buFont typeface="Arial" panose="020B0604020202020204" pitchFamily="34" charset="0"/>
+              <a:buChar char="-"/>
+              <a:defRPr sz="1600" kern="1200">
+                <a:solidFill>
+                  <a:schemeClr val="bg2"/>
+                </a:solidFill>
+                <a:latin typeface="+mn-lt"/>
+                <a:ea typeface="+mn-ea"/>
+                <a:cs typeface="+mn-cs"/>
+              </a:defRPr>
+            </a:lvl7pPr>
+            <a:lvl8pPr marL="0" indent="0" algn="l" defTabSz="914400" rtl="0" eaLnBrk="1" latinLnBrk="0" hangingPunct="1">
+              <a:lnSpc>
+                <a:spcPct val="90000"/>
+              </a:lnSpc>
+              <a:spcBef>
+                <a:spcPts val="600"/>
+              </a:spcBef>
+              <a:spcAft>
+                <a:spcPts val="600"/>
+              </a:spcAft>
+              <a:buFont typeface="Arial" panose="020B0604020202020204" pitchFamily="34" charset="0"/>
+              <a:buNone/>
+              <a:defRPr sz="1600" kern="1200">
+                <a:solidFill>
+                  <a:schemeClr val="bg2"/>
+                </a:solidFill>
+                <a:latin typeface="+mn-lt"/>
+                <a:ea typeface="+mn-ea"/>
+                <a:cs typeface="+mn-cs"/>
+              </a:defRPr>
+            </a:lvl8pPr>
+            <a:lvl9pPr marL="0" indent="0" algn="l" defTabSz="914400" rtl="0" eaLnBrk="1" latinLnBrk="0" hangingPunct="1">
+              <a:lnSpc>
+                <a:spcPct val="90000"/>
+              </a:lnSpc>
+              <a:spcBef>
+                <a:spcPts val="600"/>
+              </a:spcBef>
+              <a:spcAft>
+                <a:spcPts val="600"/>
+              </a:spcAft>
+              <a:buFont typeface="Arial" panose="020B0604020202020204" pitchFamily="34" charset="0"/>
+              <a:buNone/>
+              <a:defRPr sz="1800" b="1" kern="1200" baseline="0">
+                <a:solidFill>
+                  <a:schemeClr val="bg2"/>
+                </a:solidFill>
+                <a:latin typeface="+mn-lt"/>
+                <a:ea typeface="+mn-ea"/>
+                <a:cs typeface="+mn-cs"/>
+              </a:defRPr>
+            </a:lvl9pPr>
+          </a:lstStyle>
+          <a:p>
+            <a:pPr marL="0" indent="0">
+              <a:buNone/>
+            </a:pPr>
+            <a:r>
+              <a:rPr lang="en-US" sz="2400" dirty="0"/>
+              <a:t>Quelle </a:t>
+            </a:r>
+            <a:r>
+              <a:rPr lang="en-US" sz="2400" dirty="0" err="1"/>
+              <a:t>est</a:t>
+            </a:r>
+            <a:r>
+              <a:rPr lang="en-US" sz="2400" dirty="0"/>
+              <a:t> la </a:t>
+            </a:r>
+            <a:r>
+              <a:rPr lang="en-US" sz="2400" dirty="0" err="1"/>
+              <a:t>somme</a:t>
+            </a:r>
+            <a:r>
+              <a:rPr lang="en-US" sz="2400" dirty="0"/>
+              <a:t> </a:t>
+            </a:r>
+            <a:r>
+              <a:rPr lang="en-US" sz="2400" dirty="0" err="1"/>
+              <a:t>totale</a:t>
+            </a:r>
+            <a:r>
+              <a:rPr lang="en-US" sz="2400" dirty="0"/>
+              <a:t> des </a:t>
+            </a:r>
+            <a:r>
+              <a:rPr lang="en-US" sz="2400" dirty="0" err="1"/>
+              <a:t>tarifs</a:t>
+            </a:r>
+            <a:r>
+              <a:rPr lang="en-US" sz="2400" dirty="0"/>
+              <a:t> </a:t>
+            </a:r>
+            <a:r>
+              <a:rPr lang="en-US" sz="2400" dirty="0" err="1"/>
+              <a:t>payés</a:t>
+            </a:r>
+            <a:r>
+              <a:rPr lang="en-US" sz="2400" dirty="0"/>
+              <a:t> par </a:t>
+            </a:r>
+            <a:r>
+              <a:rPr lang="en-US" sz="2400" dirty="0" err="1"/>
+              <a:t>classe</a:t>
+            </a:r>
+            <a:r>
+              <a:rPr lang="en-US" sz="2400" dirty="0"/>
+              <a:t> ?</a:t>
+            </a:r>
+          </a:p>
+          <a:p>
+            <a:pPr lvl="1"/>
+            <a:endParaRPr lang="en-US" sz="2200" dirty="0"/>
+          </a:p>
+          <a:p>
+            <a:pPr marL="0" indent="0">
+              <a:buFont typeface="Arial" panose="020B0604020202020204" pitchFamily="34" charset="0"/>
+              <a:buNone/>
+            </a:pPr>
+            <a:endParaRPr lang="en-US" dirty="0"/>
+          </a:p>
+          <a:p>
+            <a:endParaRPr lang="en-US" dirty="0"/>
+          </a:p>
+          <a:p>
+            <a:pPr marL="180975" lvl="1" indent="0">
+              <a:buFont typeface="Arial" panose="020B0604020202020204" pitchFamily="34" charset="0"/>
+              <a:buNone/>
+            </a:pPr>
+            <a:endParaRPr lang="en-US" dirty="0"/>
+          </a:p>
+          <a:p>
+            <a:pPr lvl="1"/>
+            <a:endParaRPr lang="en-US" dirty="0"/>
+          </a:p>
+          <a:p>
+            <a:endParaRPr lang="en-US" dirty="0"/>
+          </a:p>
+          <a:p>
+            <a:endParaRPr lang="en-US" dirty="0"/>
+          </a:p>
+          <a:p>
+            <a:endParaRPr lang="en-US" dirty="0"/>
+          </a:p>
+          <a:p>
+            <a:endParaRPr lang="en-US" dirty="0"/>
+          </a:p>
+          <a:p>
+            <a:pPr lvl="1"/>
+            <a:endParaRPr lang="en-US" dirty="0"/>
+          </a:p>
+          <a:p>
+            <a:pPr lvl="1"/>
+            <a:endParaRPr lang="en-US" dirty="0"/>
+          </a:p>
+          <a:p>
+            <a:pPr lvl="1"/>
+            <a:endParaRPr lang="en-US" dirty="0"/>
+          </a:p>
+          <a:p>
+            <a:pPr lvl="1"/>
+            <a:endParaRPr lang="en-US" dirty="0"/>
+          </a:p>
+          <a:p>
+            <a:endParaRPr lang="en-US" b="1" dirty="0"/>
+          </a:p>
+          <a:p>
+            <a:endParaRPr lang="en-US" dirty="0"/>
+          </a:p>
+        </p:txBody>
+      </p:sp>
+      <p:pic>
+        <p:nvPicPr>
+          <p:cNvPr id="9" name="Image 8">
+            <a:extLst>
+              <a:ext uri="{FF2B5EF4-FFF2-40B4-BE49-F238E27FC236}">
+                <a16:creationId xmlns:a16="http://schemas.microsoft.com/office/drawing/2014/main" id="{42F91167-B3F5-B19B-AA15-BC7A4814B1AE}"/>
+              </a:ext>
+            </a:extLst>
+          </p:cNvPr>
+          <p:cNvPicPr>
+            <a:picLocks noChangeAspect="1"/>
+          </p:cNvPicPr>
+          <p:nvPr/>
+        </p:nvPicPr>
+        <p:blipFill>
+          <a:blip r:embed="rId2"/>
+          <a:stretch>
+            <a:fillRect/>
+          </a:stretch>
+        </p:blipFill>
+        <p:spPr>
+          <a:xfrm>
+            <a:off x="1831975" y="1529605"/>
+            <a:ext cx="8159811" cy="4503502"/>
+          </a:xfrm>
+          <a:prstGeom prst="rect">
+            <a:avLst/>
+          </a:prstGeom>
+        </p:spPr>
+      </p:pic>
+    </p:spTree>
+    <p:extLst>
+      <p:ext uri="{BB962C8B-B14F-4D97-AF65-F5344CB8AC3E}">
+        <p14:creationId xmlns:p14="http://schemas.microsoft.com/office/powerpoint/2010/main" val="1345207440"/>
+      </p:ext>
+    </p:extLst>
+  </p:cSld>
+  <p:clrMapOvr>
+    <a:masterClrMapping/>
+  </p:clrMapOvr>
+  <p:transition spd="slow">
+    <p:wipe dir="r"/>
+  </p:transition>
+</p:sld>
+</file>
+
+<file path=ppt/slides/slide34.xml><?xml version="1.0" encoding="utf-8"?>
 <p:sld xmlns:a="http://schemas.openxmlformats.org/drawingml/2006/main" xmlns:r="http://schemas.openxmlformats.org/officeDocument/2006/relationships" xmlns:p="http://schemas.openxmlformats.org/presentationml/2006/main">
   <p:cSld>
     <p:spTree>
@@ -24365,31 +28693,22 @@
             <p:ph type="title"/>
           </p:nvPr>
         </p:nvSpPr>
-        <p:spPr>
-          <a:xfrm>
-            <a:off x="917575" y="990600"/>
-            <a:ext cx="10798224" cy="1718320"/>
-          </a:xfrm>
-        </p:spPr>
+        <p:spPr/>
         <p:txBody>
           <a:bodyPr/>
           <a:lstStyle/>
           <a:p>
             <a:r>
+              <a:rPr lang="nl-NL" dirty="0"/>
+              <a:t>Merci de </a:t>
+            </a:r>
+            <a:r>
               <a:rPr lang="nl-NL" dirty="0" err="1"/>
-              <a:t>Qu’est-ce</a:t>
+              <a:t>votre</a:t>
             </a:r>
             <a:r>
               <a:rPr lang="nl-NL" dirty="0"/>
-              <a:t> que les </a:t>
-            </a:r>
-            <a:r>
-              <a:rPr lang="nl-NL" dirty="0" err="1"/>
-              <a:t>données</a:t>
-            </a:r>
-            <a:r>
-              <a:rPr lang="nl-NL" dirty="0"/>
-              <a:t> Big Data ?</a:t>
+              <a:t> attention !</a:t>
             </a:r>
           </a:p>
         </p:txBody>
@@ -24412,7 +28731,7 @@
             <a:fld id="{5EE7099E-8998-4851-915A-4F4831808297}" type="slidenum">
               <a:rPr lang="nl-NL" smtClean="0"/>
               <a:pPr/>
-              <a:t>3</a:t>
+              <a:t>34</a:t>
             </a:fld>
             <a:endParaRPr lang="nl-NL"/>
           </a:p>
@@ -24457,29 +28776,29 @@
           <a:p>
             <a:pPr lvl="0"/>
             <a:r>
-              <a:rPr lang="en-GB" dirty="0"/>
-              <a:t>CY Tech – Charles-Meldhine Madi Mnemoi, </a:t>
-            </a:r>
-            <a:r>
-              <a:rPr lang="en-GB" dirty="0" err="1"/>
-              <a:t>Brahim</a:t>
-            </a:r>
-            <a:r>
-              <a:rPr lang="en-GB" dirty="0"/>
-              <a:t> </a:t>
-            </a:r>
-            <a:r>
-              <a:rPr lang="en-GB" dirty="0" err="1"/>
-              <a:t>Kerdad</a:t>
-            </a:r>
-            <a:endParaRPr lang="en-GB" dirty="0"/>
+              <a:rPr lang="en-GB" noProof="0" dirty="0"/>
+              <a:t>CY Tech – Charles-</a:t>
+            </a:r>
+            <a:r>
+              <a:rPr lang="en-GB" noProof="0" dirty="0" err="1"/>
+              <a:t>Meldhine</a:t>
+            </a:r>
+            <a:r>
+              <a:rPr lang="en-GB" noProof="0" dirty="0"/>
+              <a:t> Madi </a:t>
+            </a:r>
+            <a:r>
+              <a:rPr lang="en-GB" noProof="0" dirty="0" err="1"/>
+              <a:t>Mnemoi</a:t>
+            </a:r>
+            <a:endParaRPr lang="en-GB" noProof="0" dirty="0"/>
           </a:p>
         </p:txBody>
       </p:sp>
     </p:spTree>
     <p:extLst>
       <p:ext uri="{BB962C8B-B14F-4D97-AF65-F5344CB8AC3E}">
-        <p14:creationId xmlns:p14="http://schemas.microsoft.com/office/powerpoint/2010/main" val="4150905695"/>
+        <p14:creationId xmlns:p14="http://schemas.microsoft.com/office/powerpoint/2010/main" val="2746029914"/>
       </p:ext>
     </p:extLst>
   </p:cSld>

</xml_diff>

<commit_message>
Add slides on machine learning
</commit_message>
<xml_diff>
--- a/presentation.pptx
+++ b/presentation.pptx
@@ -5,10 +5,10 @@
     <p:sldMasterId id="2147483648" r:id="rId1"/>
   </p:sldMasterIdLst>
   <p:notesMasterIdLst>
-    <p:notesMasterId r:id="rId36"/>
+    <p:notesMasterId r:id="rId39"/>
   </p:notesMasterIdLst>
   <p:handoutMasterIdLst>
-    <p:handoutMasterId r:id="rId37"/>
+    <p:handoutMasterId r:id="rId40"/>
   </p:handoutMasterIdLst>
   <p:sldIdLst>
     <p:sldId id="256" r:id="rId2"/>
@@ -44,12 +44,15 @@
     <p:sldId id="327" r:id="rId32"/>
     <p:sldId id="328" r:id="rId33"/>
     <p:sldId id="329" r:id="rId34"/>
-    <p:sldId id="269" r:id="rId35"/>
+    <p:sldId id="330" r:id="rId35"/>
+    <p:sldId id="331" r:id="rId36"/>
+    <p:sldId id="332" r:id="rId37"/>
+    <p:sldId id="269" r:id="rId38"/>
   </p:sldIdLst>
   <p:sldSz cx="12198350" cy="6858000"/>
   <p:notesSz cx="9872663" cy="6742113"/>
   <p:custDataLst>
-    <p:tags r:id="rId38"/>
+    <p:tags r:id="rId41"/>
   </p:custDataLst>
   <p:defaultTextStyle>
     <a:defPPr>
@@ -273,7 +276,7 @@
           <a:p>
             <a:fld id="{4F068446-54CF-4267-A5BD-FA01909E96A2}" type="datetimeFigureOut">
               <a:rPr lang="nl-NL" smtClean="0"/>
-              <a:t>26-12-2023</a:t>
+              <a:t>01-01-2024</a:t>
             </a:fld>
             <a:endParaRPr lang="nl-NL"/>
           </a:p>
@@ -438,7 +441,7 @@
           <a:p>
             <a:fld id="{35698784-F1F2-4D71-B346-94F94D5EBAA2}" type="datetimeFigureOut">
               <a:rPr lang="nl-NL" smtClean="0"/>
-              <a:t>26-12-2023</a:t>
+              <a:t>01-01-2024</a:t>
             </a:fld>
             <a:endParaRPr lang="nl-NL"/>
           </a:p>
@@ -1037,7 +1040,7 @@
           <a:p>
             <a:fld id="{928F9493-D671-4F27-99EF-9D103FC79999}" type="datetime1">
               <a:rPr lang="nl-NL" noProof="0" smtClean="0"/>
-              <a:t>26-12-2023</a:t>
+              <a:t>01-01-2024</a:t>
             </a:fld>
             <a:endParaRPr lang="en-GB" noProof="0" dirty="0"/>
           </a:p>
@@ -14448,8 +14451,8 @@
         </p:nvSpPr>
         <p:spPr>
           <a:xfrm>
-            <a:off x="917575" y="990600"/>
-            <a:ext cx="10798224" cy="1718320"/>
+            <a:off x="458788" y="1219200"/>
+            <a:ext cx="11280774" cy="1676400"/>
           </a:xfrm>
         </p:spPr>
         <p:txBody>
@@ -14470,7 +14473,7 @@
             </a:r>
             <a:r>
               <a:rPr lang="nl-NL" dirty="0"/>
-              <a:t>  des </a:t>
+              <a:t> des </a:t>
             </a:r>
             <a:r>
               <a:rPr lang="nl-NL" dirty="0" err="1"/>
@@ -28679,6 +28682,1514 @@
           <a:bodyPr/>
           <a:lstStyle/>
           <a:p>
+            <a:r>
+              <a:rPr lang="nl-NL" dirty="0"/>
+              <a:t> </a:t>
+            </a:r>
+          </a:p>
+        </p:txBody>
+      </p:sp>
+      <p:sp>
+        <p:nvSpPr>
+          <p:cNvPr id="4" name="Titel 3"/>
+          <p:cNvSpPr>
+            <a:spLocks noGrp="1"/>
+          </p:cNvSpPr>
+          <p:nvPr>
+            <p:ph type="title"/>
+          </p:nvPr>
+        </p:nvSpPr>
+        <p:spPr>
+          <a:xfrm>
+            <a:off x="917575" y="990600"/>
+            <a:ext cx="10798224" cy="1718320"/>
+          </a:xfrm>
+        </p:spPr>
+        <p:txBody>
+          <a:bodyPr/>
+          <a:lstStyle/>
+          <a:p>
+            <a:r>
+              <a:rPr lang="nl-NL" dirty="0"/>
+              <a:t>Machine Learning </a:t>
+            </a:r>
+            <a:r>
+              <a:rPr lang="nl-NL" dirty="0" err="1"/>
+              <a:t>avec</a:t>
+            </a:r>
+            <a:r>
+              <a:rPr lang="nl-NL" dirty="0"/>
+              <a:t> </a:t>
+            </a:r>
+            <a:r>
+              <a:rPr lang="nl-NL" dirty="0" err="1"/>
+              <a:t>Spark</a:t>
+            </a:r>
+            <a:r>
+              <a:rPr lang="nl-NL" dirty="0"/>
+              <a:t> </a:t>
+            </a:r>
+            <a:r>
+              <a:rPr lang="nl-NL" dirty="0" err="1"/>
+              <a:t>MLLib</a:t>
+            </a:r>
+            <a:endParaRPr lang="nl-NL" dirty="0"/>
+          </a:p>
+        </p:txBody>
+      </p:sp>
+      <p:sp>
+        <p:nvSpPr>
+          <p:cNvPr id="2" name="Tijdelijke aanduiding voor dianummer 1"/>
+          <p:cNvSpPr>
+            <a:spLocks noGrp="1"/>
+          </p:cNvSpPr>
+          <p:nvPr>
+            <p:ph type="sldNum" sz="quarter" idx="4"/>
+          </p:nvPr>
+        </p:nvSpPr>
+        <p:spPr/>
+        <p:txBody>
+          <a:bodyPr/>
+          <a:lstStyle/>
+          <a:p>
+            <a:fld id="{5EE7099E-8998-4851-915A-4F4831808297}" type="slidenum">
+              <a:rPr lang="nl-NL" smtClean="0"/>
+              <a:pPr/>
+              <a:t>34</a:t>
+            </a:fld>
+            <a:endParaRPr lang="nl-NL"/>
+          </a:p>
+        </p:txBody>
+      </p:sp>
+      <p:sp>
+        <p:nvSpPr>
+          <p:cNvPr id="5" name="Tijdelijke aanduiding voor tekst 19">
+            <a:extLst>
+              <a:ext uri="{FF2B5EF4-FFF2-40B4-BE49-F238E27FC236}">
+                <a16:creationId xmlns:a16="http://schemas.microsoft.com/office/drawing/2014/main" id="{2A74D798-416D-40D6-8906-E31EC4F18491}"/>
+              </a:ext>
+            </a:extLst>
+          </p:cNvPr>
+          <p:cNvSpPr>
+            <a:spLocks noGrp="1"/>
+          </p:cNvSpPr>
+          <p:nvPr>
+            <p:ph type="body" sz="quarter" idx="15" hasCustomPrompt="1"/>
+          </p:nvPr>
+        </p:nvSpPr>
+        <p:spPr>
+          <a:xfrm>
+            <a:off x="549002" y="6444530"/>
+            <a:ext cx="6918325" cy="393700"/>
+          </a:xfrm>
+        </p:spPr>
+        <p:txBody>
+          <a:bodyPr anchor="ctr">
+            <a:normAutofit/>
+          </a:bodyPr>
+          <a:lstStyle>
+            <a:lvl1pPr marL="0" indent="0">
+              <a:buNone/>
+              <a:defRPr sz="1800" baseline="0">
+                <a:solidFill>
+                  <a:schemeClr val="bg1"/>
+                </a:solidFill>
+              </a:defRPr>
+            </a:lvl1pPr>
+          </a:lstStyle>
+          <a:p>
+            <a:pPr lvl="0"/>
+            <a:r>
+              <a:rPr lang="en-GB" dirty="0"/>
+              <a:t>CY Tech – C. Madi Mnemoi, </a:t>
+            </a:r>
+            <a:r>
+              <a:rPr lang="en-GB" dirty="0" err="1"/>
+              <a:t>B.Kerdad</a:t>
+            </a:r>
+            <a:endParaRPr lang="en-GB" dirty="0"/>
+          </a:p>
+        </p:txBody>
+      </p:sp>
+    </p:spTree>
+    <p:extLst>
+      <p:ext uri="{BB962C8B-B14F-4D97-AF65-F5344CB8AC3E}">
+        <p14:creationId xmlns:p14="http://schemas.microsoft.com/office/powerpoint/2010/main" val="1432228608"/>
+      </p:ext>
+    </p:extLst>
+  </p:cSld>
+  <p:clrMapOvr>
+    <a:masterClrMapping/>
+  </p:clrMapOvr>
+  <p:transition spd="slow">
+    <p:wipe dir="r"/>
+  </p:transition>
+  <p:timing>
+    <p:tnLst>
+      <p:par>
+        <p:cTn id="1" dur="indefinite" restart="never" nodeType="tmRoot">
+          <p:childTnLst>
+            <p:seq concurrent="1" nextAc="seek">
+              <p:cTn id="2" dur="indefinite" nodeType="mainSeq">
+                <p:childTnLst>
+                  <p:par>
+                    <p:cTn id="3" fill="hold">
+                      <p:stCondLst>
+                        <p:cond delay="indefinite"/>
+                        <p:cond evt="onBegin" delay="0">
+                          <p:tn val="2"/>
+                        </p:cond>
+                      </p:stCondLst>
+                      <p:childTnLst>
+                        <p:par>
+                          <p:cTn id="4" fill="hold">
+                            <p:stCondLst>
+                              <p:cond delay="0"/>
+                            </p:stCondLst>
+                            <p:childTnLst>
+                              <p:par>
+                                <p:cTn id="5" presetID="10" presetClass="entr" presetSubtype="0" fill="hold" grpId="0" nodeType="withEffect">
+                                  <p:stCondLst>
+                                    <p:cond delay="1000"/>
+                                  </p:stCondLst>
+                                  <p:childTnLst>
+                                    <p:set>
+                                      <p:cBhvr>
+                                        <p:cTn id="6" dur="1" fill="hold">
+                                          <p:stCondLst>
+                                            <p:cond delay="0"/>
+                                          </p:stCondLst>
+                                        </p:cTn>
+                                        <p:tgtEl>
+                                          <p:spTgt spid="5">
+                                            <p:txEl>
+                                              <p:pRg st="0" end="0"/>
+                                            </p:txEl>
+                                          </p:spTgt>
+                                        </p:tgtEl>
+                                        <p:attrNameLst>
+                                          <p:attrName>style.visibility</p:attrName>
+                                        </p:attrNameLst>
+                                      </p:cBhvr>
+                                      <p:to>
+                                        <p:strVal val="visible"/>
+                                      </p:to>
+                                    </p:set>
+                                    <p:animEffect transition="in" filter="fade">
+                                      <p:cBhvr>
+                                        <p:cTn id="7" dur="750"/>
+                                        <p:tgtEl>
+                                          <p:spTgt spid="5">
+                                            <p:txEl>
+                                              <p:pRg st="0" end="0"/>
+                                            </p:txEl>
+                                          </p:spTgt>
+                                        </p:tgtEl>
+                                      </p:cBhvr>
+                                    </p:animEffect>
+                                  </p:childTnLst>
+                                </p:cTn>
+                              </p:par>
+                            </p:childTnLst>
+                          </p:cTn>
+                        </p:par>
+                      </p:childTnLst>
+                    </p:cTn>
+                  </p:par>
+                </p:childTnLst>
+              </p:cTn>
+              <p:prevCondLst>
+                <p:cond evt="onPrev" delay="0">
+                  <p:tgtEl>
+                    <p:sldTgt/>
+                  </p:tgtEl>
+                </p:cond>
+              </p:prevCondLst>
+              <p:nextCondLst>
+                <p:cond evt="onNext" delay="0">
+                  <p:tgtEl>
+                    <p:sldTgt/>
+                  </p:tgtEl>
+                </p:cond>
+              </p:nextCondLst>
+            </p:seq>
+          </p:childTnLst>
+        </p:cTn>
+      </p:par>
+    </p:tnLst>
+    <p:bldLst>
+      <p:bldP spid="5" grpId="0" build="p">
+        <p:tmplLst>
+          <p:tmpl lvl="1">
+            <p:tnLst>
+              <p:par>
+                <p:cTn presetID="10" presetClass="entr" presetSubtype="0" fill="hold" nodeType="withEffect">
+                  <p:stCondLst>
+                    <p:cond delay="1000"/>
+                  </p:stCondLst>
+                  <p:childTnLst>
+                    <p:set>
+                      <p:cBhvr>
+                        <p:cTn dur="1" fill="hold">
+                          <p:stCondLst>
+                            <p:cond delay="0"/>
+                          </p:stCondLst>
+                        </p:cTn>
+                        <p:tgtEl>
+                          <p:spTgt spid="5"/>
+                        </p:tgtEl>
+                        <p:attrNameLst>
+                          <p:attrName>style.visibility</p:attrName>
+                        </p:attrNameLst>
+                      </p:cBhvr>
+                      <p:to>
+                        <p:strVal val="visible"/>
+                      </p:to>
+                    </p:set>
+                    <p:animEffect transition="in" filter="fade">
+                      <p:cBhvr>
+                        <p:cTn dur="750"/>
+                        <p:tgtEl>
+                          <p:spTgt spid="5"/>
+                        </p:tgtEl>
+                      </p:cBhvr>
+                    </p:animEffect>
+                  </p:childTnLst>
+                </p:cTn>
+              </p:par>
+            </p:tnLst>
+          </p:tmpl>
+        </p:tmplLst>
+      </p:bldP>
+    </p:bldLst>
+  </p:timing>
+</p:sld>
+</file>
+
+<file path=ppt/slides/slide35.xml><?xml version="1.0" encoding="utf-8"?>
+<p:sld xmlns:a="http://schemas.openxmlformats.org/drawingml/2006/main" xmlns:r="http://schemas.openxmlformats.org/officeDocument/2006/relationships" xmlns:p="http://schemas.openxmlformats.org/presentationml/2006/main">
+  <p:cSld>
+    <p:spTree>
+      <p:nvGrpSpPr>
+        <p:cNvPr id="1" name=""/>
+        <p:cNvGrpSpPr/>
+        <p:nvPr/>
+      </p:nvGrpSpPr>
+      <p:grpSpPr>
+        <a:xfrm>
+          <a:off x="0" y="0"/>
+          <a:ext cx="0" cy="0"/>
+          <a:chOff x="0" y="0"/>
+          <a:chExt cx="0" cy="0"/>
+        </a:xfrm>
+      </p:grpSpPr>
+      <p:sp>
+        <p:nvSpPr>
+          <p:cNvPr id="2" name="Title 1">
+            <a:extLst>
+              <a:ext uri="{FF2B5EF4-FFF2-40B4-BE49-F238E27FC236}">
+                <a16:creationId xmlns:a16="http://schemas.microsoft.com/office/drawing/2014/main" id="{04C5DF06-5F42-4296-B27B-4F79E0DB836B}"/>
+              </a:ext>
+            </a:extLst>
+          </p:cNvPr>
+          <p:cNvSpPr>
+            <a:spLocks noGrp="1"/>
+          </p:cNvSpPr>
+          <p:nvPr>
+            <p:ph type="title"/>
+          </p:nvPr>
+        </p:nvSpPr>
+        <p:spPr/>
+        <p:txBody>
+          <a:bodyPr/>
+          <a:lstStyle/>
+          <a:p>
+            <a:r>
+              <a:rPr lang="en-US" sz="3600" dirty="0" err="1"/>
+              <a:t>Méthodologie</a:t>
+            </a:r>
+            <a:r>
+              <a:rPr lang="en-US" sz="3600" dirty="0"/>
+              <a:t> d’un </a:t>
+            </a:r>
+            <a:r>
+              <a:rPr lang="en-US" sz="3600" dirty="0" err="1"/>
+              <a:t>projet</a:t>
+            </a:r>
+            <a:r>
+              <a:rPr lang="en-US" sz="3600" dirty="0"/>
+              <a:t> de Machine Learning</a:t>
+            </a:r>
+          </a:p>
+        </p:txBody>
+      </p:sp>
+      <p:sp>
+        <p:nvSpPr>
+          <p:cNvPr id="5" name="Slide Number Placeholder 4">
+            <a:extLst>
+              <a:ext uri="{FF2B5EF4-FFF2-40B4-BE49-F238E27FC236}">
+                <a16:creationId xmlns:a16="http://schemas.microsoft.com/office/drawing/2014/main" id="{B756D4B6-3814-4E02-AB98-08D3B49675BF}"/>
+              </a:ext>
+            </a:extLst>
+          </p:cNvPr>
+          <p:cNvSpPr>
+            <a:spLocks noGrp="1"/>
+          </p:cNvSpPr>
+          <p:nvPr>
+            <p:ph type="sldNum" sz="quarter" idx="4"/>
+          </p:nvPr>
+        </p:nvSpPr>
+        <p:spPr/>
+        <p:txBody>
+          <a:bodyPr/>
+          <a:lstStyle/>
+          <a:p>
+            <a:fld id="{5EE7099E-8998-4851-915A-4F4831808297}" type="slidenum">
+              <a:rPr lang="nl-NL" smtClean="0"/>
+              <a:pPr/>
+              <a:t>35</a:t>
+            </a:fld>
+            <a:endParaRPr lang="nl-NL"/>
+          </a:p>
+        </p:txBody>
+      </p:sp>
+      <p:sp>
+        <p:nvSpPr>
+          <p:cNvPr id="3" name="ZoneTexte 2">
+            <a:extLst>
+              <a:ext uri="{FF2B5EF4-FFF2-40B4-BE49-F238E27FC236}">
+                <a16:creationId xmlns:a16="http://schemas.microsoft.com/office/drawing/2014/main" id="{0C248AA7-6FCB-3F89-E3DD-C837A2826405}"/>
+              </a:ext>
+            </a:extLst>
+          </p:cNvPr>
+          <p:cNvSpPr txBox="1"/>
+          <p:nvPr/>
+        </p:nvSpPr>
+        <p:spPr>
+          <a:xfrm>
+            <a:off x="3692106" y="1699404"/>
+            <a:ext cx="0" cy="0"/>
+          </a:xfrm>
+          <a:prstGeom prst="rect">
+            <a:avLst/>
+          </a:prstGeom>
+          <a:noFill/>
+        </p:spPr>
+        <p:txBody>
+          <a:bodyPr wrap="none" lIns="108000" tIns="108000" rIns="108000" bIns="108000" rtlCol="0">
+            <a:noAutofit/>
+          </a:bodyPr>
+          <a:lstStyle/>
+          <a:p>
+            <a:endParaRPr lang="fr-FR" noProof="0" dirty="0" err="1">
+              <a:solidFill>
+                <a:schemeClr val="bg2"/>
+              </a:solidFill>
+            </a:endParaRPr>
+          </a:p>
+        </p:txBody>
+      </p:sp>
+      <p:sp>
+        <p:nvSpPr>
+          <p:cNvPr id="6" name="Vertical Text Placeholder 5">
+            <a:extLst>
+              <a:ext uri="{FF2B5EF4-FFF2-40B4-BE49-F238E27FC236}">
+                <a16:creationId xmlns:a16="http://schemas.microsoft.com/office/drawing/2014/main" id="{F8170739-5212-AEC7-557E-2E086A29A496}"/>
+              </a:ext>
+            </a:extLst>
+          </p:cNvPr>
+          <p:cNvSpPr>
+            <a:spLocks noGrp="1"/>
+          </p:cNvSpPr>
+          <p:nvPr>
+            <p:ph type="body" orient="vert" idx="1"/>
+          </p:nvPr>
+        </p:nvSpPr>
+        <p:spPr>
+          <a:xfrm>
+            <a:off x="404662" y="1143000"/>
+            <a:ext cx="11389023" cy="4795836"/>
+          </a:xfrm>
+        </p:spPr>
+        <p:txBody>
+          <a:bodyPr>
+            <a:normAutofit fontScale="85000" lnSpcReduction="20000"/>
+          </a:bodyPr>
+          <a:lstStyle/>
+          <a:p>
+            <a:r>
+              <a:rPr lang="en-US" sz="2800" dirty="0" err="1"/>
+              <a:t>Définition</a:t>
+            </a:r>
+            <a:r>
+              <a:rPr lang="en-US" sz="2800" dirty="0"/>
+              <a:t> du </a:t>
+            </a:r>
+            <a:r>
+              <a:rPr lang="en-US" sz="2800" dirty="0" err="1"/>
+              <a:t>problème</a:t>
+            </a:r>
+            <a:r>
+              <a:rPr lang="en-US" sz="2800" dirty="0"/>
+              <a:t> (regression, classification, clustering)</a:t>
+            </a:r>
+          </a:p>
+          <a:p>
+            <a:pPr marL="0" indent="0">
+              <a:buNone/>
+            </a:pPr>
+            <a:endParaRPr lang="en-US" sz="2800" dirty="0"/>
+          </a:p>
+          <a:p>
+            <a:r>
+              <a:rPr lang="en-US" sz="2800" dirty="0" err="1"/>
+              <a:t>Création</a:t>
+            </a:r>
+            <a:r>
+              <a:rPr lang="en-US" sz="2800" dirty="0"/>
+              <a:t> d’un jeu </a:t>
+            </a:r>
+            <a:r>
+              <a:rPr lang="en-US" sz="2800" dirty="0" err="1"/>
+              <a:t>d’entraînement</a:t>
+            </a:r>
+            <a:r>
+              <a:rPr lang="en-US" sz="2800" dirty="0"/>
+              <a:t> et de test</a:t>
+            </a:r>
+          </a:p>
+          <a:p>
+            <a:endParaRPr lang="en-US" sz="2800" dirty="0"/>
+          </a:p>
+          <a:p>
+            <a:r>
+              <a:rPr lang="en-US" sz="2800" dirty="0" err="1"/>
+              <a:t>Pré-traitement</a:t>
+            </a:r>
+            <a:r>
+              <a:rPr lang="en-US" sz="2800" dirty="0"/>
+              <a:t> des </a:t>
+            </a:r>
+            <a:r>
+              <a:rPr lang="en-US" sz="2800" dirty="0" err="1"/>
+              <a:t>données</a:t>
+            </a:r>
+            <a:r>
+              <a:rPr lang="en-US" sz="2800" dirty="0"/>
+              <a:t> (</a:t>
+            </a:r>
+            <a:r>
+              <a:rPr lang="en-US" sz="2800" dirty="0" err="1"/>
+              <a:t>encodage</a:t>
+            </a:r>
+            <a:r>
+              <a:rPr lang="en-US" sz="2800" dirty="0"/>
+              <a:t> des variables, </a:t>
+            </a:r>
+            <a:r>
+              <a:rPr lang="en-US" sz="2800" dirty="0" err="1"/>
+              <a:t>normalisation</a:t>
+            </a:r>
+            <a:r>
+              <a:rPr lang="en-US" sz="2800" dirty="0"/>
+              <a:t>…)</a:t>
+            </a:r>
+          </a:p>
+          <a:p>
+            <a:endParaRPr lang="en-US" sz="2800" dirty="0"/>
+          </a:p>
+          <a:p>
+            <a:r>
+              <a:rPr lang="en-US" sz="2800" dirty="0" err="1"/>
+              <a:t>Création</a:t>
+            </a:r>
+            <a:r>
+              <a:rPr lang="en-US" sz="2800" dirty="0"/>
+              <a:t> de </a:t>
+            </a:r>
+            <a:r>
+              <a:rPr lang="en-US" sz="2800" dirty="0" err="1"/>
+              <a:t>modèles</a:t>
+            </a:r>
+            <a:endParaRPr lang="en-US" sz="2800" dirty="0"/>
+          </a:p>
+          <a:p>
+            <a:pPr marL="0" indent="0">
+              <a:buNone/>
+            </a:pPr>
+            <a:endParaRPr lang="en-US" sz="2800" dirty="0"/>
+          </a:p>
+          <a:p>
+            <a:r>
+              <a:rPr lang="en-US" sz="2800" dirty="0"/>
+              <a:t>Evaluation des </a:t>
+            </a:r>
+            <a:r>
+              <a:rPr lang="en-US" sz="2800" dirty="0" err="1"/>
+              <a:t>modèles</a:t>
+            </a:r>
+            <a:endParaRPr lang="en-US" sz="2800" dirty="0"/>
+          </a:p>
+          <a:p>
+            <a:endParaRPr lang="en-US" sz="2800" dirty="0"/>
+          </a:p>
+          <a:p>
+            <a:r>
+              <a:rPr lang="en-US" sz="2800" dirty="0" err="1"/>
+              <a:t>Interprétation</a:t>
+            </a:r>
+            <a:endParaRPr lang="en-US" sz="2800" dirty="0"/>
+          </a:p>
+          <a:p>
+            <a:endParaRPr lang="en-US" dirty="0"/>
+          </a:p>
+          <a:p>
+            <a:pPr marL="180975" lvl="1" indent="0">
+              <a:buNone/>
+            </a:pPr>
+            <a:endParaRPr lang="en-US" dirty="0"/>
+          </a:p>
+          <a:p>
+            <a:pPr lvl="1"/>
+            <a:endParaRPr lang="en-US" dirty="0"/>
+          </a:p>
+          <a:p>
+            <a:endParaRPr lang="en-US" dirty="0"/>
+          </a:p>
+          <a:p>
+            <a:endParaRPr lang="en-US" dirty="0"/>
+          </a:p>
+          <a:p>
+            <a:endParaRPr lang="en-US" dirty="0"/>
+          </a:p>
+          <a:p>
+            <a:endParaRPr lang="en-US" dirty="0"/>
+          </a:p>
+          <a:p>
+            <a:pPr lvl="1"/>
+            <a:endParaRPr lang="en-US" dirty="0"/>
+          </a:p>
+          <a:p>
+            <a:pPr lvl="1"/>
+            <a:endParaRPr lang="en-US" dirty="0"/>
+          </a:p>
+          <a:p>
+            <a:pPr lvl="1"/>
+            <a:endParaRPr lang="en-US" dirty="0"/>
+          </a:p>
+          <a:p>
+            <a:pPr lvl="1"/>
+            <a:endParaRPr lang="en-US" dirty="0"/>
+          </a:p>
+          <a:p>
+            <a:endParaRPr lang="en-US" b="1" dirty="0"/>
+          </a:p>
+          <a:p>
+            <a:endParaRPr lang="en-US" dirty="0"/>
+          </a:p>
+        </p:txBody>
+      </p:sp>
+      <p:sp>
+        <p:nvSpPr>
+          <p:cNvPr id="4" name="Vertical Text Placeholder 5">
+            <a:extLst>
+              <a:ext uri="{FF2B5EF4-FFF2-40B4-BE49-F238E27FC236}">
+                <a16:creationId xmlns:a16="http://schemas.microsoft.com/office/drawing/2014/main" id="{A57D01D8-1D67-D654-0CFB-28A877FD85B9}"/>
+              </a:ext>
+            </a:extLst>
+          </p:cNvPr>
+          <p:cNvSpPr txBox="1">
+            <a:spLocks/>
+          </p:cNvSpPr>
+          <p:nvPr/>
+        </p:nvSpPr>
+        <p:spPr>
+          <a:xfrm>
+            <a:off x="557062" y="1295400"/>
+            <a:ext cx="11389023" cy="4795836"/>
+          </a:xfrm>
+          <a:prstGeom prst="rect">
+            <a:avLst/>
+          </a:prstGeom>
+        </p:spPr>
+        <p:txBody>
+          <a:bodyPr vert="horz" lIns="0" tIns="0" rIns="0" bIns="0" rtlCol="0">
+            <a:normAutofit/>
+          </a:bodyPr>
+          <a:lstStyle>
+            <a:lvl1pPr marL="180975" indent="-180975" algn="l" defTabSz="914400" rtl="0" eaLnBrk="1" latinLnBrk="0" hangingPunct="1">
+              <a:lnSpc>
+                <a:spcPct val="90000"/>
+              </a:lnSpc>
+              <a:spcBef>
+                <a:spcPts val="600"/>
+              </a:spcBef>
+              <a:spcAft>
+                <a:spcPts val="600"/>
+              </a:spcAft>
+              <a:buClr>
+                <a:schemeClr val="bg2"/>
+              </a:buClr>
+              <a:buFont typeface="Arial" panose="020B0604020202020204" pitchFamily="34" charset="0"/>
+              <a:buChar char="•"/>
+              <a:defRPr sz="1800" kern="1200">
+                <a:solidFill>
+                  <a:schemeClr val="bg2"/>
+                </a:solidFill>
+                <a:latin typeface="+mn-lt"/>
+                <a:ea typeface="+mn-ea"/>
+                <a:cs typeface="+mn-cs"/>
+              </a:defRPr>
+            </a:lvl1pPr>
+            <a:lvl2pPr marL="361950" indent="-180975" algn="l" defTabSz="914400" rtl="0" eaLnBrk="1" latinLnBrk="0" hangingPunct="1">
+              <a:lnSpc>
+                <a:spcPct val="90000"/>
+              </a:lnSpc>
+              <a:spcBef>
+                <a:spcPts val="600"/>
+              </a:spcBef>
+              <a:spcAft>
+                <a:spcPts val="600"/>
+              </a:spcAft>
+              <a:buClr>
+                <a:schemeClr val="bg2"/>
+              </a:buClr>
+              <a:buFont typeface="Arial" panose="020B0604020202020204" pitchFamily="34" charset="0"/>
+              <a:buChar char="-"/>
+              <a:defRPr sz="1600" kern="1200">
+                <a:solidFill>
+                  <a:schemeClr val="bg2"/>
+                </a:solidFill>
+                <a:latin typeface="+mn-lt"/>
+                <a:ea typeface="+mn-ea"/>
+                <a:cs typeface="+mn-cs"/>
+              </a:defRPr>
+            </a:lvl2pPr>
+            <a:lvl3pPr marL="0" indent="0" algn="l" defTabSz="914400" rtl="0" eaLnBrk="1" latinLnBrk="0" hangingPunct="1">
+              <a:lnSpc>
+                <a:spcPct val="90000"/>
+              </a:lnSpc>
+              <a:spcBef>
+                <a:spcPts val="600"/>
+              </a:spcBef>
+              <a:spcAft>
+                <a:spcPts val="600"/>
+              </a:spcAft>
+              <a:buFont typeface="Arial" panose="020B0604020202020204" pitchFamily="34" charset="0"/>
+              <a:buNone/>
+              <a:defRPr sz="1800" kern="1200">
+                <a:solidFill>
+                  <a:schemeClr val="bg2"/>
+                </a:solidFill>
+                <a:latin typeface="+mn-lt"/>
+                <a:ea typeface="+mn-ea"/>
+                <a:cs typeface="+mn-cs"/>
+              </a:defRPr>
+            </a:lvl3pPr>
+            <a:lvl4pPr marL="0" indent="0" algn="l" defTabSz="914400" rtl="0" eaLnBrk="1" latinLnBrk="0" hangingPunct="1">
+              <a:lnSpc>
+                <a:spcPct val="90000"/>
+              </a:lnSpc>
+              <a:spcBef>
+                <a:spcPts val="600"/>
+              </a:spcBef>
+              <a:spcAft>
+                <a:spcPts val="600"/>
+              </a:spcAft>
+              <a:buFont typeface="Arial" panose="020B0604020202020204" pitchFamily="34" charset="0"/>
+              <a:buNone/>
+              <a:defRPr sz="1800" b="1" kern="1200">
+                <a:solidFill>
+                  <a:schemeClr val="bg2"/>
+                </a:solidFill>
+                <a:latin typeface="+mn-lt"/>
+                <a:ea typeface="+mn-ea"/>
+                <a:cs typeface="+mn-cs"/>
+              </a:defRPr>
+            </a:lvl4pPr>
+            <a:lvl5pPr marL="0" indent="0" algn="l" defTabSz="914400" rtl="0" eaLnBrk="1" latinLnBrk="0" hangingPunct="1">
+              <a:lnSpc>
+                <a:spcPct val="90000"/>
+              </a:lnSpc>
+              <a:spcBef>
+                <a:spcPts val="600"/>
+              </a:spcBef>
+              <a:spcAft>
+                <a:spcPts val="600"/>
+              </a:spcAft>
+              <a:buFont typeface="Arial" panose="020B0604020202020204" pitchFamily="34" charset="0"/>
+              <a:buNone/>
+              <a:defRPr sz="1800" b="1" kern="1200" baseline="0">
+                <a:solidFill>
+                  <a:schemeClr val="tx2"/>
+                </a:solidFill>
+                <a:latin typeface="+mn-lt"/>
+                <a:ea typeface="+mn-ea"/>
+                <a:cs typeface="+mn-cs"/>
+              </a:defRPr>
+            </a:lvl5pPr>
+            <a:lvl6pPr marL="180975" indent="-180975" algn="l" defTabSz="914400" rtl="0" eaLnBrk="1" latinLnBrk="0" hangingPunct="1">
+              <a:lnSpc>
+                <a:spcPct val="90000"/>
+              </a:lnSpc>
+              <a:spcBef>
+                <a:spcPts val="600"/>
+              </a:spcBef>
+              <a:spcAft>
+                <a:spcPts val="600"/>
+              </a:spcAft>
+              <a:buClr>
+                <a:schemeClr val="bg2"/>
+              </a:buClr>
+              <a:buFont typeface="Arial" panose="020B0604020202020204" pitchFamily="34" charset="0"/>
+              <a:buChar char="•"/>
+              <a:defRPr sz="1800" kern="1200">
+                <a:solidFill>
+                  <a:schemeClr val="bg2"/>
+                </a:solidFill>
+                <a:latin typeface="+mn-lt"/>
+                <a:ea typeface="+mn-ea"/>
+                <a:cs typeface="+mn-cs"/>
+              </a:defRPr>
+            </a:lvl6pPr>
+            <a:lvl7pPr marL="361950" indent="-180975" algn="l" defTabSz="914400" rtl="0" eaLnBrk="1" latinLnBrk="0" hangingPunct="1">
+              <a:lnSpc>
+                <a:spcPct val="90000"/>
+              </a:lnSpc>
+              <a:spcBef>
+                <a:spcPts val="600"/>
+              </a:spcBef>
+              <a:spcAft>
+                <a:spcPts val="600"/>
+              </a:spcAft>
+              <a:buClr>
+                <a:schemeClr val="bg2"/>
+              </a:buClr>
+              <a:buFont typeface="Arial" panose="020B0604020202020204" pitchFamily="34" charset="0"/>
+              <a:buChar char="-"/>
+              <a:defRPr sz="1600" kern="1200">
+                <a:solidFill>
+                  <a:schemeClr val="bg2"/>
+                </a:solidFill>
+                <a:latin typeface="+mn-lt"/>
+                <a:ea typeface="+mn-ea"/>
+                <a:cs typeface="+mn-cs"/>
+              </a:defRPr>
+            </a:lvl7pPr>
+            <a:lvl8pPr marL="0" indent="0" algn="l" defTabSz="914400" rtl="0" eaLnBrk="1" latinLnBrk="0" hangingPunct="1">
+              <a:lnSpc>
+                <a:spcPct val="90000"/>
+              </a:lnSpc>
+              <a:spcBef>
+                <a:spcPts val="600"/>
+              </a:spcBef>
+              <a:spcAft>
+                <a:spcPts val="600"/>
+              </a:spcAft>
+              <a:buFont typeface="Arial" panose="020B0604020202020204" pitchFamily="34" charset="0"/>
+              <a:buNone/>
+              <a:defRPr sz="1600" kern="1200">
+                <a:solidFill>
+                  <a:schemeClr val="bg2"/>
+                </a:solidFill>
+                <a:latin typeface="+mn-lt"/>
+                <a:ea typeface="+mn-ea"/>
+                <a:cs typeface="+mn-cs"/>
+              </a:defRPr>
+            </a:lvl8pPr>
+            <a:lvl9pPr marL="0" indent="0" algn="l" defTabSz="914400" rtl="0" eaLnBrk="1" latinLnBrk="0" hangingPunct="1">
+              <a:lnSpc>
+                <a:spcPct val="90000"/>
+              </a:lnSpc>
+              <a:spcBef>
+                <a:spcPts val="600"/>
+              </a:spcBef>
+              <a:spcAft>
+                <a:spcPts val="600"/>
+              </a:spcAft>
+              <a:buFont typeface="Arial" panose="020B0604020202020204" pitchFamily="34" charset="0"/>
+              <a:buNone/>
+              <a:defRPr sz="1800" b="1" kern="1200" baseline="0">
+                <a:solidFill>
+                  <a:schemeClr val="bg2"/>
+                </a:solidFill>
+                <a:latin typeface="+mn-lt"/>
+                <a:ea typeface="+mn-ea"/>
+                <a:cs typeface="+mn-cs"/>
+              </a:defRPr>
+            </a:lvl9pPr>
+          </a:lstStyle>
+          <a:p>
+            <a:endParaRPr lang="en-US" dirty="0"/>
+          </a:p>
+        </p:txBody>
+      </p:sp>
+    </p:spTree>
+    <p:extLst>
+      <p:ext uri="{BB962C8B-B14F-4D97-AF65-F5344CB8AC3E}">
+        <p14:creationId xmlns:p14="http://schemas.microsoft.com/office/powerpoint/2010/main" val="1239721552"/>
+      </p:ext>
+    </p:extLst>
+  </p:cSld>
+  <p:clrMapOvr>
+    <a:masterClrMapping/>
+  </p:clrMapOvr>
+  <p:transition spd="slow">
+    <p:wipe dir="r"/>
+  </p:transition>
+</p:sld>
+</file>
+
+<file path=ppt/slides/slide36.xml><?xml version="1.0" encoding="utf-8"?>
+<p:sld xmlns:a="http://schemas.openxmlformats.org/drawingml/2006/main" xmlns:r="http://schemas.openxmlformats.org/officeDocument/2006/relationships" xmlns:p="http://schemas.openxmlformats.org/presentationml/2006/main">
+  <p:cSld>
+    <p:spTree>
+      <p:nvGrpSpPr>
+        <p:cNvPr id="1" name=""/>
+        <p:cNvGrpSpPr/>
+        <p:nvPr/>
+      </p:nvGrpSpPr>
+      <p:grpSpPr>
+        <a:xfrm>
+          <a:off x="0" y="0"/>
+          <a:ext cx="0" cy="0"/>
+          <a:chOff x="0" y="0"/>
+          <a:chExt cx="0" cy="0"/>
+        </a:xfrm>
+      </p:grpSpPr>
+      <p:sp>
+        <p:nvSpPr>
+          <p:cNvPr id="2" name="Title 1">
+            <a:extLst>
+              <a:ext uri="{FF2B5EF4-FFF2-40B4-BE49-F238E27FC236}">
+                <a16:creationId xmlns:a16="http://schemas.microsoft.com/office/drawing/2014/main" id="{04C5DF06-5F42-4296-B27B-4F79E0DB836B}"/>
+              </a:ext>
+            </a:extLst>
+          </p:cNvPr>
+          <p:cNvSpPr>
+            <a:spLocks noGrp="1"/>
+          </p:cNvSpPr>
+          <p:nvPr>
+            <p:ph type="title"/>
+          </p:nvPr>
+        </p:nvSpPr>
+        <p:spPr/>
+        <p:txBody>
+          <a:bodyPr/>
+          <a:lstStyle/>
+          <a:p>
+            <a:r>
+              <a:rPr lang="en-US" sz="3600" dirty="0" err="1"/>
+              <a:t>Méthodologie</a:t>
+            </a:r>
+            <a:r>
+              <a:rPr lang="en-US" sz="3600" dirty="0"/>
+              <a:t> d’un </a:t>
+            </a:r>
+            <a:r>
+              <a:rPr lang="en-US" sz="3600" dirty="0" err="1"/>
+              <a:t>projet</a:t>
+            </a:r>
+            <a:r>
+              <a:rPr lang="en-US" sz="3600" dirty="0"/>
+              <a:t> de Machine Learning</a:t>
+            </a:r>
+          </a:p>
+        </p:txBody>
+      </p:sp>
+      <p:sp>
+        <p:nvSpPr>
+          <p:cNvPr id="5" name="Slide Number Placeholder 4">
+            <a:extLst>
+              <a:ext uri="{FF2B5EF4-FFF2-40B4-BE49-F238E27FC236}">
+                <a16:creationId xmlns:a16="http://schemas.microsoft.com/office/drawing/2014/main" id="{B756D4B6-3814-4E02-AB98-08D3B49675BF}"/>
+              </a:ext>
+            </a:extLst>
+          </p:cNvPr>
+          <p:cNvSpPr>
+            <a:spLocks noGrp="1"/>
+          </p:cNvSpPr>
+          <p:nvPr>
+            <p:ph type="sldNum" sz="quarter" idx="4"/>
+          </p:nvPr>
+        </p:nvSpPr>
+        <p:spPr/>
+        <p:txBody>
+          <a:bodyPr/>
+          <a:lstStyle/>
+          <a:p>
+            <a:fld id="{5EE7099E-8998-4851-915A-4F4831808297}" type="slidenum">
+              <a:rPr lang="nl-NL" smtClean="0"/>
+              <a:pPr/>
+              <a:t>36</a:t>
+            </a:fld>
+            <a:endParaRPr lang="nl-NL"/>
+          </a:p>
+        </p:txBody>
+      </p:sp>
+      <p:sp>
+        <p:nvSpPr>
+          <p:cNvPr id="3" name="ZoneTexte 2">
+            <a:extLst>
+              <a:ext uri="{FF2B5EF4-FFF2-40B4-BE49-F238E27FC236}">
+                <a16:creationId xmlns:a16="http://schemas.microsoft.com/office/drawing/2014/main" id="{0C248AA7-6FCB-3F89-E3DD-C837A2826405}"/>
+              </a:ext>
+            </a:extLst>
+          </p:cNvPr>
+          <p:cNvSpPr txBox="1"/>
+          <p:nvPr/>
+        </p:nvSpPr>
+        <p:spPr>
+          <a:xfrm>
+            <a:off x="3692106" y="1699404"/>
+            <a:ext cx="0" cy="0"/>
+          </a:xfrm>
+          <a:prstGeom prst="rect">
+            <a:avLst/>
+          </a:prstGeom>
+          <a:noFill/>
+        </p:spPr>
+        <p:txBody>
+          <a:bodyPr wrap="none" lIns="108000" tIns="108000" rIns="108000" bIns="108000" rtlCol="0">
+            <a:noAutofit/>
+          </a:bodyPr>
+          <a:lstStyle/>
+          <a:p>
+            <a:endParaRPr lang="fr-FR" noProof="0" dirty="0" err="1">
+              <a:solidFill>
+                <a:schemeClr val="bg2"/>
+              </a:solidFill>
+            </a:endParaRPr>
+          </a:p>
+        </p:txBody>
+      </p:sp>
+      <p:sp>
+        <p:nvSpPr>
+          <p:cNvPr id="6" name="Vertical Text Placeholder 5">
+            <a:extLst>
+              <a:ext uri="{FF2B5EF4-FFF2-40B4-BE49-F238E27FC236}">
+                <a16:creationId xmlns:a16="http://schemas.microsoft.com/office/drawing/2014/main" id="{F8170739-5212-AEC7-557E-2E086A29A496}"/>
+              </a:ext>
+            </a:extLst>
+          </p:cNvPr>
+          <p:cNvSpPr>
+            <a:spLocks noGrp="1"/>
+          </p:cNvSpPr>
+          <p:nvPr>
+            <p:ph type="body" orient="vert" idx="1"/>
+          </p:nvPr>
+        </p:nvSpPr>
+        <p:spPr>
+          <a:xfrm>
+            <a:off x="404662" y="1143000"/>
+            <a:ext cx="11389023" cy="4795836"/>
+          </a:xfrm>
+        </p:spPr>
+        <p:txBody>
+          <a:bodyPr>
+            <a:normAutofit fontScale="85000" lnSpcReduction="20000"/>
+          </a:bodyPr>
+          <a:lstStyle/>
+          <a:p>
+            <a:r>
+              <a:rPr lang="en-US" sz="2800" dirty="0" err="1"/>
+              <a:t>Définition</a:t>
+            </a:r>
+            <a:r>
+              <a:rPr lang="en-US" sz="2800" dirty="0"/>
+              <a:t> du </a:t>
+            </a:r>
+            <a:r>
+              <a:rPr lang="en-US" sz="2800" dirty="0" err="1"/>
+              <a:t>problème</a:t>
+            </a:r>
+            <a:r>
+              <a:rPr lang="en-US" sz="2800" dirty="0"/>
+              <a:t> (regression, classification, clustering)</a:t>
+            </a:r>
+          </a:p>
+          <a:p>
+            <a:pPr marL="0" indent="0">
+              <a:buNone/>
+            </a:pPr>
+            <a:endParaRPr lang="en-US" sz="2800" dirty="0"/>
+          </a:p>
+          <a:p>
+            <a:r>
+              <a:rPr lang="en-US" sz="2800" dirty="0" err="1"/>
+              <a:t>Création</a:t>
+            </a:r>
+            <a:r>
+              <a:rPr lang="en-US" sz="2800" dirty="0"/>
+              <a:t> d’un jeu </a:t>
+            </a:r>
+            <a:r>
+              <a:rPr lang="en-US" sz="2800" dirty="0" err="1"/>
+              <a:t>d’entraînement</a:t>
+            </a:r>
+            <a:r>
+              <a:rPr lang="en-US" sz="2800" dirty="0"/>
+              <a:t> et de test</a:t>
+            </a:r>
+          </a:p>
+          <a:p>
+            <a:endParaRPr lang="en-US" sz="2800" dirty="0"/>
+          </a:p>
+          <a:p>
+            <a:r>
+              <a:rPr lang="en-US" sz="2800" dirty="0" err="1"/>
+              <a:t>Pré-traitement</a:t>
+            </a:r>
+            <a:r>
+              <a:rPr lang="en-US" sz="2800" dirty="0"/>
+              <a:t> des </a:t>
+            </a:r>
+            <a:r>
+              <a:rPr lang="en-US" sz="2800" dirty="0" err="1"/>
+              <a:t>données</a:t>
+            </a:r>
+            <a:r>
+              <a:rPr lang="en-US" sz="2800" dirty="0"/>
+              <a:t> (</a:t>
+            </a:r>
+            <a:r>
+              <a:rPr lang="en-US" sz="2800" dirty="0" err="1"/>
+              <a:t>encodage</a:t>
+            </a:r>
+            <a:r>
+              <a:rPr lang="en-US" sz="2800" dirty="0"/>
+              <a:t> des variables, </a:t>
+            </a:r>
+            <a:r>
+              <a:rPr lang="en-US" sz="2800" dirty="0" err="1"/>
+              <a:t>normalisation</a:t>
+            </a:r>
+            <a:r>
+              <a:rPr lang="en-US" sz="2800" dirty="0"/>
+              <a:t>…)</a:t>
+            </a:r>
+          </a:p>
+          <a:p>
+            <a:endParaRPr lang="en-US" sz="2800" dirty="0"/>
+          </a:p>
+          <a:p>
+            <a:r>
+              <a:rPr lang="en-US" sz="2800" dirty="0" err="1"/>
+              <a:t>Création</a:t>
+            </a:r>
+            <a:r>
+              <a:rPr lang="en-US" sz="2800" dirty="0"/>
+              <a:t> de </a:t>
+            </a:r>
+            <a:r>
+              <a:rPr lang="en-US" sz="2800" dirty="0" err="1"/>
+              <a:t>modèles</a:t>
+            </a:r>
+            <a:endParaRPr lang="en-US" sz="2800" dirty="0"/>
+          </a:p>
+          <a:p>
+            <a:pPr marL="0" indent="0">
+              <a:buNone/>
+            </a:pPr>
+            <a:endParaRPr lang="en-US" sz="2800" dirty="0"/>
+          </a:p>
+          <a:p>
+            <a:r>
+              <a:rPr lang="en-US" sz="2800" dirty="0"/>
+              <a:t>Evaluation des </a:t>
+            </a:r>
+            <a:r>
+              <a:rPr lang="en-US" sz="2800" dirty="0" err="1"/>
+              <a:t>modèles</a:t>
+            </a:r>
+            <a:endParaRPr lang="en-US" sz="2800" dirty="0"/>
+          </a:p>
+          <a:p>
+            <a:endParaRPr lang="en-US" sz="2800" dirty="0"/>
+          </a:p>
+          <a:p>
+            <a:r>
+              <a:rPr lang="en-US" sz="2800" dirty="0" err="1"/>
+              <a:t>Interprétation</a:t>
+            </a:r>
+            <a:endParaRPr lang="en-US" sz="2800" dirty="0"/>
+          </a:p>
+          <a:p>
+            <a:endParaRPr lang="en-US" dirty="0"/>
+          </a:p>
+          <a:p>
+            <a:pPr marL="180975" lvl="1" indent="0">
+              <a:buNone/>
+            </a:pPr>
+            <a:endParaRPr lang="en-US" dirty="0"/>
+          </a:p>
+          <a:p>
+            <a:pPr lvl="1"/>
+            <a:endParaRPr lang="en-US" dirty="0"/>
+          </a:p>
+          <a:p>
+            <a:endParaRPr lang="en-US" dirty="0"/>
+          </a:p>
+          <a:p>
+            <a:endParaRPr lang="en-US" dirty="0"/>
+          </a:p>
+          <a:p>
+            <a:endParaRPr lang="en-US" dirty="0"/>
+          </a:p>
+          <a:p>
+            <a:endParaRPr lang="en-US" dirty="0"/>
+          </a:p>
+          <a:p>
+            <a:pPr lvl="1"/>
+            <a:endParaRPr lang="en-US" dirty="0"/>
+          </a:p>
+          <a:p>
+            <a:pPr lvl="1"/>
+            <a:endParaRPr lang="en-US" dirty="0"/>
+          </a:p>
+          <a:p>
+            <a:pPr lvl="1"/>
+            <a:endParaRPr lang="en-US" dirty="0"/>
+          </a:p>
+          <a:p>
+            <a:pPr lvl="1"/>
+            <a:endParaRPr lang="en-US" dirty="0"/>
+          </a:p>
+          <a:p>
+            <a:endParaRPr lang="en-US" b="1" dirty="0"/>
+          </a:p>
+          <a:p>
+            <a:endParaRPr lang="en-US" dirty="0"/>
+          </a:p>
+        </p:txBody>
+      </p:sp>
+      <p:sp>
+        <p:nvSpPr>
+          <p:cNvPr id="4" name="Vertical Text Placeholder 5">
+            <a:extLst>
+              <a:ext uri="{FF2B5EF4-FFF2-40B4-BE49-F238E27FC236}">
+                <a16:creationId xmlns:a16="http://schemas.microsoft.com/office/drawing/2014/main" id="{A57D01D8-1D67-D654-0CFB-28A877FD85B9}"/>
+              </a:ext>
+            </a:extLst>
+          </p:cNvPr>
+          <p:cNvSpPr txBox="1">
+            <a:spLocks/>
+          </p:cNvSpPr>
+          <p:nvPr/>
+        </p:nvSpPr>
+        <p:spPr>
+          <a:xfrm>
+            <a:off x="557062" y="1295400"/>
+            <a:ext cx="11389023" cy="4795836"/>
+          </a:xfrm>
+          <a:prstGeom prst="rect">
+            <a:avLst/>
+          </a:prstGeom>
+        </p:spPr>
+        <p:txBody>
+          <a:bodyPr vert="horz" lIns="0" tIns="0" rIns="0" bIns="0" rtlCol="0">
+            <a:normAutofit/>
+          </a:bodyPr>
+          <a:lstStyle>
+            <a:lvl1pPr marL="180975" indent="-180975" algn="l" defTabSz="914400" rtl="0" eaLnBrk="1" latinLnBrk="0" hangingPunct="1">
+              <a:lnSpc>
+                <a:spcPct val="90000"/>
+              </a:lnSpc>
+              <a:spcBef>
+                <a:spcPts val="600"/>
+              </a:spcBef>
+              <a:spcAft>
+                <a:spcPts val="600"/>
+              </a:spcAft>
+              <a:buClr>
+                <a:schemeClr val="bg2"/>
+              </a:buClr>
+              <a:buFont typeface="Arial" panose="020B0604020202020204" pitchFamily="34" charset="0"/>
+              <a:buChar char="•"/>
+              <a:defRPr sz="1800" kern="1200">
+                <a:solidFill>
+                  <a:schemeClr val="bg2"/>
+                </a:solidFill>
+                <a:latin typeface="+mn-lt"/>
+                <a:ea typeface="+mn-ea"/>
+                <a:cs typeface="+mn-cs"/>
+              </a:defRPr>
+            </a:lvl1pPr>
+            <a:lvl2pPr marL="361950" indent="-180975" algn="l" defTabSz="914400" rtl="0" eaLnBrk="1" latinLnBrk="0" hangingPunct="1">
+              <a:lnSpc>
+                <a:spcPct val="90000"/>
+              </a:lnSpc>
+              <a:spcBef>
+                <a:spcPts val="600"/>
+              </a:spcBef>
+              <a:spcAft>
+                <a:spcPts val="600"/>
+              </a:spcAft>
+              <a:buClr>
+                <a:schemeClr val="bg2"/>
+              </a:buClr>
+              <a:buFont typeface="Arial" panose="020B0604020202020204" pitchFamily="34" charset="0"/>
+              <a:buChar char="-"/>
+              <a:defRPr sz="1600" kern="1200">
+                <a:solidFill>
+                  <a:schemeClr val="bg2"/>
+                </a:solidFill>
+                <a:latin typeface="+mn-lt"/>
+                <a:ea typeface="+mn-ea"/>
+                <a:cs typeface="+mn-cs"/>
+              </a:defRPr>
+            </a:lvl2pPr>
+            <a:lvl3pPr marL="0" indent="0" algn="l" defTabSz="914400" rtl="0" eaLnBrk="1" latinLnBrk="0" hangingPunct="1">
+              <a:lnSpc>
+                <a:spcPct val="90000"/>
+              </a:lnSpc>
+              <a:spcBef>
+                <a:spcPts val="600"/>
+              </a:spcBef>
+              <a:spcAft>
+                <a:spcPts val="600"/>
+              </a:spcAft>
+              <a:buFont typeface="Arial" panose="020B0604020202020204" pitchFamily="34" charset="0"/>
+              <a:buNone/>
+              <a:defRPr sz="1800" kern="1200">
+                <a:solidFill>
+                  <a:schemeClr val="bg2"/>
+                </a:solidFill>
+                <a:latin typeface="+mn-lt"/>
+                <a:ea typeface="+mn-ea"/>
+                <a:cs typeface="+mn-cs"/>
+              </a:defRPr>
+            </a:lvl3pPr>
+            <a:lvl4pPr marL="0" indent="0" algn="l" defTabSz="914400" rtl="0" eaLnBrk="1" latinLnBrk="0" hangingPunct="1">
+              <a:lnSpc>
+                <a:spcPct val="90000"/>
+              </a:lnSpc>
+              <a:spcBef>
+                <a:spcPts val="600"/>
+              </a:spcBef>
+              <a:spcAft>
+                <a:spcPts val="600"/>
+              </a:spcAft>
+              <a:buFont typeface="Arial" panose="020B0604020202020204" pitchFamily="34" charset="0"/>
+              <a:buNone/>
+              <a:defRPr sz="1800" b="1" kern="1200">
+                <a:solidFill>
+                  <a:schemeClr val="bg2"/>
+                </a:solidFill>
+                <a:latin typeface="+mn-lt"/>
+                <a:ea typeface="+mn-ea"/>
+                <a:cs typeface="+mn-cs"/>
+              </a:defRPr>
+            </a:lvl4pPr>
+            <a:lvl5pPr marL="0" indent="0" algn="l" defTabSz="914400" rtl="0" eaLnBrk="1" latinLnBrk="0" hangingPunct="1">
+              <a:lnSpc>
+                <a:spcPct val="90000"/>
+              </a:lnSpc>
+              <a:spcBef>
+                <a:spcPts val="600"/>
+              </a:spcBef>
+              <a:spcAft>
+                <a:spcPts val="600"/>
+              </a:spcAft>
+              <a:buFont typeface="Arial" panose="020B0604020202020204" pitchFamily="34" charset="0"/>
+              <a:buNone/>
+              <a:defRPr sz="1800" b="1" kern="1200" baseline="0">
+                <a:solidFill>
+                  <a:schemeClr val="tx2"/>
+                </a:solidFill>
+                <a:latin typeface="+mn-lt"/>
+                <a:ea typeface="+mn-ea"/>
+                <a:cs typeface="+mn-cs"/>
+              </a:defRPr>
+            </a:lvl5pPr>
+            <a:lvl6pPr marL="180975" indent="-180975" algn="l" defTabSz="914400" rtl="0" eaLnBrk="1" latinLnBrk="0" hangingPunct="1">
+              <a:lnSpc>
+                <a:spcPct val="90000"/>
+              </a:lnSpc>
+              <a:spcBef>
+                <a:spcPts val="600"/>
+              </a:spcBef>
+              <a:spcAft>
+                <a:spcPts val="600"/>
+              </a:spcAft>
+              <a:buClr>
+                <a:schemeClr val="bg2"/>
+              </a:buClr>
+              <a:buFont typeface="Arial" panose="020B0604020202020204" pitchFamily="34" charset="0"/>
+              <a:buChar char="•"/>
+              <a:defRPr sz="1800" kern="1200">
+                <a:solidFill>
+                  <a:schemeClr val="bg2"/>
+                </a:solidFill>
+                <a:latin typeface="+mn-lt"/>
+                <a:ea typeface="+mn-ea"/>
+                <a:cs typeface="+mn-cs"/>
+              </a:defRPr>
+            </a:lvl6pPr>
+            <a:lvl7pPr marL="361950" indent="-180975" algn="l" defTabSz="914400" rtl="0" eaLnBrk="1" latinLnBrk="0" hangingPunct="1">
+              <a:lnSpc>
+                <a:spcPct val="90000"/>
+              </a:lnSpc>
+              <a:spcBef>
+                <a:spcPts val="600"/>
+              </a:spcBef>
+              <a:spcAft>
+                <a:spcPts val="600"/>
+              </a:spcAft>
+              <a:buClr>
+                <a:schemeClr val="bg2"/>
+              </a:buClr>
+              <a:buFont typeface="Arial" panose="020B0604020202020204" pitchFamily="34" charset="0"/>
+              <a:buChar char="-"/>
+              <a:defRPr sz="1600" kern="1200">
+                <a:solidFill>
+                  <a:schemeClr val="bg2"/>
+                </a:solidFill>
+                <a:latin typeface="+mn-lt"/>
+                <a:ea typeface="+mn-ea"/>
+                <a:cs typeface="+mn-cs"/>
+              </a:defRPr>
+            </a:lvl7pPr>
+            <a:lvl8pPr marL="0" indent="0" algn="l" defTabSz="914400" rtl="0" eaLnBrk="1" latinLnBrk="0" hangingPunct="1">
+              <a:lnSpc>
+                <a:spcPct val="90000"/>
+              </a:lnSpc>
+              <a:spcBef>
+                <a:spcPts val="600"/>
+              </a:spcBef>
+              <a:spcAft>
+                <a:spcPts val="600"/>
+              </a:spcAft>
+              <a:buFont typeface="Arial" panose="020B0604020202020204" pitchFamily="34" charset="0"/>
+              <a:buNone/>
+              <a:defRPr sz="1600" kern="1200">
+                <a:solidFill>
+                  <a:schemeClr val="bg2"/>
+                </a:solidFill>
+                <a:latin typeface="+mn-lt"/>
+                <a:ea typeface="+mn-ea"/>
+                <a:cs typeface="+mn-cs"/>
+              </a:defRPr>
+            </a:lvl8pPr>
+            <a:lvl9pPr marL="0" indent="0" algn="l" defTabSz="914400" rtl="0" eaLnBrk="1" latinLnBrk="0" hangingPunct="1">
+              <a:lnSpc>
+                <a:spcPct val="90000"/>
+              </a:lnSpc>
+              <a:spcBef>
+                <a:spcPts val="600"/>
+              </a:spcBef>
+              <a:spcAft>
+                <a:spcPts val="600"/>
+              </a:spcAft>
+              <a:buFont typeface="Arial" panose="020B0604020202020204" pitchFamily="34" charset="0"/>
+              <a:buNone/>
+              <a:defRPr sz="1800" b="1" kern="1200" baseline="0">
+                <a:solidFill>
+                  <a:schemeClr val="bg2"/>
+                </a:solidFill>
+                <a:latin typeface="+mn-lt"/>
+                <a:ea typeface="+mn-ea"/>
+                <a:cs typeface="+mn-cs"/>
+              </a:defRPr>
+            </a:lvl9pPr>
+          </a:lstStyle>
+          <a:p>
+            <a:endParaRPr lang="en-US" dirty="0"/>
+          </a:p>
+        </p:txBody>
+      </p:sp>
+      <p:sp>
+        <p:nvSpPr>
+          <p:cNvPr id="7" name="ZoneTexte 6">
+            <a:extLst>
+              <a:ext uri="{FF2B5EF4-FFF2-40B4-BE49-F238E27FC236}">
+                <a16:creationId xmlns:a16="http://schemas.microsoft.com/office/drawing/2014/main" id="{A5025745-98AB-F694-A7DC-F46D9D65C43B}"/>
+              </a:ext>
+            </a:extLst>
+          </p:cNvPr>
+          <p:cNvSpPr txBox="1"/>
+          <p:nvPr/>
+        </p:nvSpPr>
+        <p:spPr>
+          <a:xfrm>
+            <a:off x="7142300" y="3962400"/>
+            <a:ext cx="3352800" cy="1143000"/>
+          </a:xfrm>
+          <a:prstGeom prst="rect">
+            <a:avLst/>
+          </a:prstGeom>
+          <a:noFill/>
+        </p:spPr>
+        <p:txBody>
+          <a:bodyPr wrap="square" lIns="108000" tIns="108000" rIns="108000" bIns="108000" rtlCol="0">
+            <a:noAutofit/>
+          </a:bodyPr>
+          <a:lstStyle/>
+          <a:p>
+            <a:r>
+              <a:rPr lang="fr-FR" sz="7200" b="1" dirty="0">
+                <a:solidFill>
+                  <a:schemeClr val="bg2"/>
+                </a:solidFill>
+              </a:rPr>
+              <a:t>DEMO</a:t>
+            </a:r>
+            <a:endParaRPr lang="fr-FR" sz="7200" b="1" noProof="0" dirty="0" err="1">
+              <a:solidFill>
+                <a:schemeClr val="bg2"/>
+              </a:solidFill>
+            </a:endParaRPr>
+          </a:p>
+        </p:txBody>
+      </p:sp>
+    </p:spTree>
+    <p:extLst>
+      <p:ext uri="{BB962C8B-B14F-4D97-AF65-F5344CB8AC3E}">
+        <p14:creationId xmlns:p14="http://schemas.microsoft.com/office/powerpoint/2010/main" val="1842679910"/>
+      </p:ext>
+    </p:extLst>
+  </p:cSld>
+  <p:clrMapOvr>
+    <a:masterClrMapping/>
+  </p:clrMapOvr>
+  <p:transition spd="slow">
+    <p:wipe dir="r"/>
+  </p:transition>
+</p:sld>
+</file>
+
+<file path=ppt/slides/slide37.xml><?xml version="1.0" encoding="utf-8"?>
+<p:sld xmlns:a="http://schemas.openxmlformats.org/drawingml/2006/main" xmlns:r="http://schemas.openxmlformats.org/officeDocument/2006/relationships" xmlns:p="http://schemas.openxmlformats.org/presentationml/2006/main">
+  <p:cSld>
+    <p:spTree>
+      <p:nvGrpSpPr>
+        <p:cNvPr id="1" name=""/>
+        <p:cNvGrpSpPr/>
+        <p:nvPr/>
+      </p:nvGrpSpPr>
+      <p:grpSpPr>
+        <a:xfrm>
+          <a:off x="0" y="0"/>
+          <a:ext cx="0" cy="0"/>
+          <a:chOff x="0" y="0"/>
+          <a:chExt cx="0" cy="0"/>
+        </a:xfrm>
+      </p:grpSpPr>
+      <p:sp>
+        <p:nvSpPr>
+          <p:cNvPr id="6" name="Tijdelijke aanduiding voor tekst 5"/>
+          <p:cNvSpPr>
+            <a:spLocks noGrp="1"/>
+          </p:cNvSpPr>
+          <p:nvPr>
+            <p:ph type="body" sz="quarter" idx="12"/>
+          </p:nvPr>
+        </p:nvSpPr>
+        <p:spPr/>
+        <p:txBody>
+          <a:bodyPr/>
+          <a:lstStyle/>
+          <a:p>
             <a:endParaRPr lang="nl-NL" dirty="0"/>
           </a:p>
         </p:txBody>
@@ -28731,7 +30242,7 @@
             <a:fld id="{5EE7099E-8998-4851-915A-4F4831808297}" type="slidenum">
               <a:rPr lang="nl-NL" smtClean="0"/>
               <a:pPr/>
-              <a:t>34</a:t>
+              <a:t>37</a:t>
             </a:fld>
             <a:endParaRPr lang="nl-NL"/>
           </a:p>

</xml_diff>

<commit_message>
Add Machine Learning part (#12)
* Add slides on machine learning

* feat: Push a notebook draft on MLLib

* Update MLLib notebook

* Update dependencies

---------

Co-authored-by: Charles-Meldhine Madi Mnemoi <icdk5b4zf@relay.firefox.com>
</commit_message>
<xml_diff>
--- a/presentation.pptx
+++ b/presentation.pptx
@@ -5,10 +5,10 @@
     <p:sldMasterId id="2147483648" r:id="rId1"/>
   </p:sldMasterIdLst>
   <p:notesMasterIdLst>
-    <p:notesMasterId r:id="rId36"/>
+    <p:notesMasterId r:id="rId39"/>
   </p:notesMasterIdLst>
   <p:handoutMasterIdLst>
-    <p:handoutMasterId r:id="rId37"/>
+    <p:handoutMasterId r:id="rId40"/>
   </p:handoutMasterIdLst>
   <p:sldIdLst>
     <p:sldId id="256" r:id="rId2"/>
@@ -44,12 +44,15 @@
     <p:sldId id="327" r:id="rId32"/>
     <p:sldId id="328" r:id="rId33"/>
     <p:sldId id="329" r:id="rId34"/>
-    <p:sldId id="269" r:id="rId35"/>
+    <p:sldId id="330" r:id="rId35"/>
+    <p:sldId id="331" r:id="rId36"/>
+    <p:sldId id="332" r:id="rId37"/>
+    <p:sldId id="269" r:id="rId38"/>
   </p:sldIdLst>
   <p:sldSz cx="12198350" cy="6858000"/>
   <p:notesSz cx="9872663" cy="6742113"/>
   <p:custDataLst>
-    <p:tags r:id="rId38"/>
+    <p:tags r:id="rId41"/>
   </p:custDataLst>
   <p:defaultTextStyle>
     <a:defPPr>
@@ -273,7 +276,7 @@
           <a:p>
             <a:fld id="{4F068446-54CF-4267-A5BD-FA01909E96A2}" type="datetimeFigureOut">
               <a:rPr lang="nl-NL" smtClean="0"/>
-              <a:t>26-12-2023</a:t>
+              <a:t>01-01-2024</a:t>
             </a:fld>
             <a:endParaRPr lang="nl-NL"/>
           </a:p>
@@ -438,7 +441,7 @@
           <a:p>
             <a:fld id="{35698784-F1F2-4D71-B346-94F94D5EBAA2}" type="datetimeFigureOut">
               <a:rPr lang="nl-NL" smtClean="0"/>
-              <a:t>26-12-2023</a:t>
+              <a:t>01-01-2024</a:t>
             </a:fld>
             <a:endParaRPr lang="nl-NL"/>
           </a:p>
@@ -1037,7 +1040,7 @@
           <a:p>
             <a:fld id="{928F9493-D671-4F27-99EF-9D103FC79999}" type="datetime1">
               <a:rPr lang="nl-NL" noProof="0" smtClean="0"/>
-              <a:t>26-12-2023</a:t>
+              <a:t>01-01-2024</a:t>
             </a:fld>
             <a:endParaRPr lang="en-GB" noProof="0" dirty="0"/>
           </a:p>
@@ -14448,8 +14451,8 @@
         </p:nvSpPr>
         <p:spPr>
           <a:xfrm>
-            <a:off x="917575" y="990600"/>
-            <a:ext cx="10798224" cy="1718320"/>
+            <a:off x="458788" y="1219200"/>
+            <a:ext cx="11280774" cy="1676400"/>
           </a:xfrm>
         </p:spPr>
         <p:txBody>
@@ -14470,7 +14473,7 @@
             </a:r>
             <a:r>
               <a:rPr lang="nl-NL" dirty="0"/>
-              <a:t>  des </a:t>
+              <a:t> des </a:t>
             </a:r>
             <a:r>
               <a:rPr lang="nl-NL" dirty="0" err="1"/>
@@ -28679,6 +28682,1514 @@
           <a:bodyPr/>
           <a:lstStyle/>
           <a:p>
+            <a:r>
+              <a:rPr lang="nl-NL" dirty="0"/>
+              <a:t> </a:t>
+            </a:r>
+          </a:p>
+        </p:txBody>
+      </p:sp>
+      <p:sp>
+        <p:nvSpPr>
+          <p:cNvPr id="4" name="Titel 3"/>
+          <p:cNvSpPr>
+            <a:spLocks noGrp="1"/>
+          </p:cNvSpPr>
+          <p:nvPr>
+            <p:ph type="title"/>
+          </p:nvPr>
+        </p:nvSpPr>
+        <p:spPr>
+          <a:xfrm>
+            <a:off x="917575" y="990600"/>
+            <a:ext cx="10798224" cy="1718320"/>
+          </a:xfrm>
+        </p:spPr>
+        <p:txBody>
+          <a:bodyPr/>
+          <a:lstStyle/>
+          <a:p>
+            <a:r>
+              <a:rPr lang="nl-NL" dirty="0"/>
+              <a:t>Machine Learning </a:t>
+            </a:r>
+            <a:r>
+              <a:rPr lang="nl-NL" dirty="0" err="1"/>
+              <a:t>avec</a:t>
+            </a:r>
+            <a:r>
+              <a:rPr lang="nl-NL" dirty="0"/>
+              <a:t> </a:t>
+            </a:r>
+            <a:r>
+              <a:rPr lang="nl-NL" dirty="0" err="1"/>
+              <a:t>Spark</a:t>
+            </a:r>
+            <a:r>
+              <a:rPr lang="nl-NL" dirty="0"/>
+              <a:t> </a:t>
+            </a:r>
+            <a:r>
+              <a:rPr lang="nl-NL" dirty="0" err="1"/>
+              <a:t>MLLib</a:t>
+            </a:r>
+            <a:endParaRPr lang="nl-NL" dirty="0"/>
+          </a:p>
+        </p:txBody>
+      </p:sp>
+      <p:sp>
+        <p:nvSpPr>
+          <p:cNvPr id="2" name="Tijdelijke aanduiding voor dianummer 1"/>
+          <p:cNvSpPr>
+            <a:spLocks noGrp="1"/>
+          </p:cNvSpPr>
+          <p:nvPr>
+            <p:ph type="sldNum" sz="quarter" idx="4"/>
+          </p:nvPr>
+        </p:nvSpPr>
+        <p:spPr/>
+        <p:txBody>
+          <a:bodyPr/>
+          <a:lstStyle/>
+          <a:p>
+            <a:fld id="{5EE7099E-8998-4851-915A-4F4831808297}" type="slidenum">
+              <a:rPr lang="nl-NL" smtClean="0"/>
+              <a:pPr/>
+              <a:t>34</a:t>
+            </a:fld>
+            <a:endParaRPr lang="nl-NL"/>
+          </a:p>
+        </p:txBody>
+      </p:sp>
+      <p:sp>
+        <p:nvSpPr>
+          <p:cNvPr id="5" name="Tijdelijke aanduiding voor tekst 19">
+            <a:extLst>
+              <a:ext uri="{FF2B5EF4-FFF2-40B4-BE49-F238E27FC236}">
+                <a16:creationId xmlns:a16="http://schemas.microsoft.com/office/drawing/2014/main" id="{2A74D798-416D-40D6-8906-E31EC4F18491}"/>
+              </a:ext>
+            </a:extLst>
+          </p:cNvPr>
+          <p:cNvSpPr>
+            <a:spLocks noGrp="1"/>
+          </p:cNvSpPr>
+          <p:nvPr>
+            <p:ph type="body" sz="quarter" idx="15" hasCustomPrompt="1"/>
+          </p:nvPr>
+        </p:nvSpPr>
+        <p:spPr>
+          <a:xfrm>
+            <a:off x="549002" y="6444530"/>
+            <a:ext cx="6918325" cy="393700"/>
+          </a:xfrm>
+        </p:spPr>
+        <p:txBody>
+          <a:bodyPr anchor="ctr">
+            <a:normAutofit/>
+          </a:bodyPr>
+          <a:lstStyle>
+            <a:lvl1pPr marL="0" indent="0">
+              <a:buNone/>
+              <a:defRPr sz="1800" baseline="0">
+                <a:solidFill>
+                  <a:schemeClr val="bg1"/>
+                </a:solidFill>
+              </a:defRPr>
+            </a:lvl1pPr>
+          </a:lstStyle>
+          <a:p>
+            <a:pPr lvl="0"/>
+            <a:r>
+              <a:rPr lang="en-GB" dirty="0"/>
+              <a:t>CY Tech – C. Madi Mnemoi, </a:t>
+            </a:r>
+            <a:r>
+              <a:rPr lang="en-GB" dirty="0" err="1"/>
+              <a:t>B.Kerdad</a:t>
+            </a:r>
+            <a:endParaRPr lang="en-GB" dirty="0"/>
+          </a:p>
+        </p:txBody>
+      </p:sp>
+    </p:spTree>
+    <p:extLst>
+      <p:ext uri="{BB962C8B-B14F-4D97-AF65-F5344CB8AC3E}">
+        <p14:creationId xmlns:p14="http://schemas.microsoft.com/office/powerpoint/2010/main" val="1432228608"/>
+      </p:ext>
+    </p:extLst>
+  </p:cSld>
+  <p:clrMapOvr>
+    <a:masterClrMapping/>
+  </p:clrMapOvr>
+  <p:transition spd="slow">
+    <p:wipe dir="r"/>
+  </p:transition>
+  <p:timing>
+    <p:tnLst>
+      <p:par>
+        <p:cTn id="1" dur="indefinite" restart="never" nodeType="tmRoot">
+          <p:childTnLst>
+            <p:seq concurrent="1" nextAc="seek">
+              <p:cTn id="2" dur="indefinite" nodeType="mainSeq">
+                <p:childTnLst>
+                  <p:par>
+                    <p:cTn id="3" fill="hold">
+                      <p:stCondLst>
+                        <p:cond delay="indefinite"/>
+                        <p:cond evt="onBegin" delay="0">
+                          <p:tn val="2"/>
+                        </p:cond>
+                      </p:stCondLst>
+                      <p:childTnLst>
+                        <p:par>
+                          <p:cTn id="4" fill="hold">
+                            <p:stCondLst>
+                              <p:cond delay="0"/>
+                            </p:stCondLst>
+                            <p:childTnLst>
+                              <p:par>
+                                <p:cTn id="5" presetID="10" presetClass="entr" presetSubtype="0" fill="hold" grpId="0" nodeType="withEffect">
+                                  <p:stCondLst>
+                                    <p:cond delay="1000"/>
+                                  </p:stCondLst>
+                                  <p:childTnLst>
+                                    <p:set>
+                                      <p:cBhvr>
+                                        <p:cTn id="6" dur="1" fill="hold">
+                                          <p:stCondLst>
+                                            <p:cond delay="0"/>
+                                          </p:stCondLst>
+                                        </p:cTn>
+                                        <p:tgtEl>
+                                          <p:spTgt spid="5">
+                                            <p:txEl>
+                                              <p:pRg st="0" end="0"/>
+                                            </p:txEl>
+                                          </p:spTgt>
+                                        </p:tgtEl>
+                                        <p:attrNameLst>
+                                          <p:attrName>style.visibility</p:attrName>
+                                        </p:attrNameLst>
+                                      </p:cBhvr>
+                                      <p:to>
+                                        <p:strVal val="visible"/>
+                                      </p:to>
+                                    </p:set>
+                                    <p:animEffect transition="in" filter="fade">
+                                      <p:cBhvr>
+                                        <p:cTn id="7" dur="750"/>
+                                        <p:tgtEl>
+                                          <p:spTgt spid="5">
+                                            <p:txEl>
+                                              <p:pRg st="0" end="0"/>
+                                            </p:txEl>
+                                          </p:spTgt>
+                                        </p:tgtEl>
+                                      </p:cBhvr>
+                                    </p:animEffect>
+                                  </p:childTnLst>
+                                </p:cTn>
+                              </p:par>
+                            </p:childTnLst>
+                          </p:cTn>
+                        </p:par>
+                      </p:childTnLst>
+                    </p:cTn>
+                  </p:par>
+                </p:childTnLst>
+              </p:cTn>
+              <p:prevCondLst>
+                <p:cond evt="onPrev" delay="0">
+                  <p:tgtEl>
+                    <p:sldTgt/>
+                  </p:tgtEl>
+                </p:cond>
+              </p:prevCondLst>
+              <p:nextCondLst>
+                <p:cond evt="onNext" delay="0">
+                  <p:tgtEl>
+                    <p:sldTgt/>
+                  </p:tgtEl>
+                </p:cond>
+              </p:nextCondLst>
+            </p:seq>
+          </p:childTnLst>
+        </p:cTn>
+      </p:par>
+    </p:tnLst>
+    <p:bldLst>
+      <p:bldP spid="5" grpId="0" build="p">
+        <p:tmplLst>
+          <p:tmpl lvl="1">
+            <p:tnLst>
+              <p:par>
+                <p:cTn presetID="10" presetClass="entr" presetSubtype="0" fill="hold" nodeType="withEffect">
+                  <p:stCondLst>
+                    <p:cond delay="1000"/>
+                  </p:stCondLst>
+                  <p:childTnLst>
+                    <p:set>
+                      <p:cBhvr>
+                        <p:cTn dur="1" fill="hold">
+                          <p:stCondLst>
+                            <p:cond delay="0"/>
+                          </p:stCondLst>
+                        </p:cTn>
+                        <p:tgtEl>
+                          <p:spTgt spid="5"/>
+                        </p:tgtEl>
+                        <p:attrNameLst>
+                          <p:attrName>style.visibility</p:attrName>
+                        </p:attrNameLst>
+                      </p:cBhvr>
+                      <p:to>
+                        <p:strVal val="visible"/>
+                      </p:to>
+                    </p:set>
+                    <p:animEffect transition="in" filter="fade">
+                      <p:cBhvr>
+                        <p:cTn dur="750"/>
+                        <p:tgtEl>
+                          <p:spTgt spid="5"/>
+                        </p:tgtEl>
+                      </p:cBhvr>
+                    </p:animEffect>
+                  </p:childTnLst>
+                </p:cTn>
+              </p:par>
+            </p:tnLst>
+          </p:tmpl>
+        </p:tmplLst>
+      </p:bldP>
+    </p:bldLst>
+  </p:timing>
+</p:sld>
+</file>
+
+<file path=ppt/slides/slide35.xml><?xml version="1.0" encoding="utf-8"?>
+<p:sld xmlns:a="http://schemas.openxmlformats.org/drawingml/2006/main" xmlns:r="http://schemas.openxmlformats.org/officeDocument/2006/relationships" xmlns:p="http://schemas.openxmlformats.org/presentationml/2006/main">
+  <p:cSld>
+    <p:spTree>
+      <p:nvGrpSpPr>
+        <p:cNvPr id="1" name=""/>
+        <p:cNvGrpSpPr/>
+        <p:nvPr/>
+      </p:nvGrpSpPr>
+      <p:grpSpPr>
+        <a:xfrm>
+          <a:off x="0" y="0"/>
+          <a:ext cx="0" cy="0"/>
+          <a:chOff x="0" y="0"/>
+          <a:chExt cx="0" cy="0"/>
+        </a:xfrm>
+      </p:grpSpPr>
+      <p:sp>
+        <p:nvSpPr>
+          <p:cNvPr id="2" name="Title 1">
+            <a:extLst>
+              <a:ext uri="{FF2B5EF4-FFF2-40B4-BE49-F238E27FC236}">
+                <a16:creationId xmlns:a16="http://schemas.microsoft.com/office/drawing/2014/main" id="{04C5DF06-5F42-4296-B27B-4F79E0DB836B}"/>
+              </a:ext>
+            </a:extLst>
+          </p:cNvPr>
+          <p:cNvSpPr>
+            <a:spLocks noGrp="1"/>
+          </p:cNvSpPr>
+          <p:nvPr>
+            <p:ph type="title"/>
+          </p:nvPr>
+        </p:nvSpPr>
+        <p:spPr/>
+        <p:txBody>
+          <a:bodyPr/>
+          <a:lstStyle/>
+          <a:p>
+            <a:r>
+              <a:rPr lang="en-US" sz="3600" dirty="0" err="1"/>
+              <a:t>Méthodologie</a:t>
+            </a:r>
+            <a:r>
+              <a:rPr lang="en-US" sz="3600" dirty="0"/>
+              <a:t> d’un </a:t>
+            </a:r>
+            <a:r>
+              <a:rPr lang="en-US" sz="3600" dirty="0" err="1"/>
+              <a:t>projet</a:t>
+            </a:r>
+            <a:r>
+              <a:rPr lang="en-US" sz="3600" dirty="0"/>
+              <a:t> de Machine Learning</a:t>
+            </a:r>
+          </a:p>
+        </p:txBody>
+      </p:sp>
+      <p:sp>
+        <p:nvSpPr>
+          <p:cNvPr id="5" name="Slide Number Placeholder 4">
+            <a:extLst>
+              <a:ext uri="{FF2B5EF4-FFF2-40B4-BE49-F238E27FC236}">
+                <a16:creationId xmlns:a16="http://schemas.microsoft.com/office/drawing/2014/main" id="{B756D4B6-3814-4E02-AB98-08D3B49675BF}"/>
+              </a:ext>
+            </a:extLst>
+          </p:cNvPr>
+          <p:cNvSpPr>
+            <a:spLocks noGrp="1"/>
+          </p:cNvSpPr>
+          <p:nvPr>
+            <p:ph type="sldNum" sz="quarter" idx="4"/>
+          </p:nvPr>
+        </p:nvSpPr>
+        <p:spPr/>
+        <p:txBody>
+          <a:bodyPr/>
+          <a:lstStyle/>
+          <a:p>
+            <a:fld id="{5EE7099E-8998-4851-915A-4F4831808297}" type="slidenum">
+              <a:rPr lang="nl-NL" smtClean="0"/>
+              <a:pPr/>
+              <a:t>35</a:t>
+            </a:fld>
+            <a:endParaRPr lang="nl-NL"/>
+          </a:p>
+        </p:txBody>
+      </p:sp>
+      <p:sp>
+        <p:nvSpPr>
+          <p:cNvPr id="3" name="ZoneTexte 2">
+            <a:extLst>
+              <a:ext uri="{FF2B5EF4-FFF2-40B4-BE49-F238E27FC236}">
+                <a16:creationId xmlns:a16="http://schemas.microsoft.com/office/drawing/2014/main" id="{0C248AA7-6FCB-3F89-E3DD-C837A2826405}"/>
+              </a:ext>
+            </a:extLst>
+          </p:cNvPr>
+          <p:cNvSpPr txBox="1"/>
+          <p:nvPr/>
+        </p:nvSpPr>
+        <p:spPr>
+          <a:xfrm>
+            <a:off x="3692106" y="1699404"/>
+            <a:ext cx="0" cy="0"/>
+          </a:xfrm>
+          <a:prstGeom prst="rect">
+            <a:avLst/>
+          </a:prstGeom>
+          <a:noFill/>
+        </p:spPr>
+        <p:txBody>
+          <a:bodyPr wrap="none" lIns="108000" tIns="108000" rIns="108000" bIns="108000" rtlCol="0">
+            <a:noAutofit/>
+          </a:bodyPr>
+          <a:lstStyle/>
+          <a:p>
+            <a:endParaRPr lang="fr-FR" noProof="0" dirty="0" err="1">
+              <a:solidFill>
+                <a:schemeClr val="bg2"/>
+              </a:solidFill>
+            </a:endParaRPr>
+          </a:p>
+        </p:txBody>
+      </p:sp>
+      <p:sp>
+        <p:nvSpPr>
+          <p:cNvPr id="6" name="Vertical Text Placeholder 5">
+            <a:extLst>
+              <a:ext uri="{FF2B5EF4-FFF2-40B4-BE49-F238E27FC236}">
+                <a16:creationId xmlns:a16="http://schemas.microsoft.com/office/drawing/2014/main" id="{F8170739-5212-AEC7-557E-2E086A29A496}"/>
+              </a:ext>
+            </a:extLst>
+          </p:cNvPr>
+          <p:cNvSpPr>
+            <a:spLocks noGrp="1"/>
+          </p:cNvSpPr>
+          <p:nvPr>
+            <p:ph type="body" orient="vert" idx="1"/>
+          </p:nvPr>
+        </p:nvSpPr>
+        <p:spPr>
+          <a:xfrm>
+            <a:off x="404662" y="1143000"/>
+            <a:ext cx="11389023" cy="4795836"/>
+          </a:xfrm>
+        </p:spPr>
+        <p:txBody>
+          <a:bodyPr>
+            <a:normAutofit fontScale="85000" lnSpcReduction="20000"/>
+          </a:bodyPr>
+          <a:lstStyle/>
+          <a:p>
+            <a:r>
+              <a:rPr lang="en-US" sz="2800" dirty="0" err="1"/>
+              <a:t>Définition</a:t>
+            </a:r>
+            <a:r>
+              <a:rPr lang="en-US" sz="2800" dirty="0"/>
+              <a:t> du </a:t>
+            </a:r>
+            <a:r>
+              <a:rPr lang="en-US" sz="2800" dirty="0" err="1"/>
+              <a:t>problème</a:t>
+            </a:r>
+            <a:r>
+              <a:rPr lang="en-US" sz="2800" dirty="0"/>
+              <a:t> (regression, classification, clustering)</a:t>
+            </a:r>
+          </a:p>
+          <a:p>
+            <a:pPr marL="0" indent="0">
+              <a:buNone/>
+            </a:pPr>
+            <a:endParaRPr lang="en-US" sz="2800" dirty="0"/>
+          </a:p>
+          <a:p>
+            <a:r>
+              <a:rPr lang="en-US" sz="2800" dirty="0" err="1"/>
+              <a:t>Création</a:t>
+            </a:r>
+            <a:r>
+              <a:rPr lang="en-US" sz="2800" dirty="0"/>
+              <a:t> d’un jeu </a:t>
+            </a:r>
+            <a:r>
+              <a:rPr lang="en-US" sz="2800" dirty="0" err="1"/>
+              <a:t>d’entraînement</a:t>
+            </a:r>
+            <a:r>
+              <a:rPr lang="en-US" sz="2800" dirty="0"/>
+              <a:t> et de test</a:t>
+            </a:r>
+          </a:p>
+          <a:p>
+            <a:endParaRPr lang="en-US" sz="2800" dirty="0"/>
+          </a:p>
+          <a:p>
+            <a:r>
+              <a:rPr lang="en-US" sz="2800" dirty="0" err="1"/>
+              <a:t>Pré-traitement</a:t>
+            </a:r>
+            <a:r>
+              <a:rPr lang="en-US" sz="2800" dirty="0"/>
+              <a:t> des </a:t>
+            </a:r>
+            <a:r>
+              <a:rPr lang="en-US" sz="2800" dirty="0" err="1"/>
+              <a:t>données</a:t>
+            </a:r>
+            <a:r>
+              <a:rPr lang="en-US" sz="2800" dirty="0"/>
+              <a:t> (</a:t>
+            </a:r>
+            <a:r>
+              <a:rPr lang="en-US" sz="2800" dirty="0" err="1"/>
+              <a:t>encodage</a:t>
+            </a:r>
+            <a:r>
+              <a:rPr lang="en-US" sz="2800" dirty="0"/>
+              <a:t> des variables, </a:t>
+            </a:r>
+            <a:r>
+              <a:rPr lang="en-US" sz="2800" dirty="0" err="1"/>
+              <a:t>normalisation</a:t>
+            </a:r>
+            <a:r>
+              <a:rPr lang="en-US" sz="2800" dirty="0"/>
+              <a:t>…)</a:t>
+            </a:r>
+          </a:p>
+          <a:p>
+            <a:endParaRPr lang="en-US" sz="2800" dirty="0"/>
+          </a:p>
+          <a:p>
+            <a:r>
+              <a:rPr lang="en-US" sz="2800" dirty="0" err="1"/>
+              <a:t>Création</a:t>
+            </a:r>
+            <a:r>
+              <a:rPr lang="en-US" sz="2800" dirty="0"/>
+              <a:t> de </a:t>
+            </a:r>
+            <a:r>
+              <a:rPr lang="en-US" sz="2800" dirty="0" err="1"/>
+              <a:t>modèles</a:t>
+            </a:r>
+            <a:endParaRPr lang="en-US" sz="2800" dirty="0"/>
+          </a:p>
+          <a:p>
+            <a:pPr marL="0" indent="0">
+              <a:buNone/>
+            </a:pPr>
+            <a:endParaRPr lang="en-US" sz="2800" dirty="0"/>
+          </a:p>
+          <a:p>
+            <a:r>
+              <a:rPr lang="en-US" sz="2800" dirty="0"/>
+              <a:t>Evaluation des </a:t>
+            </a:r>
+            <a:r>
+              <a:rPr lang="en-US" sz="2800" dirty="0" err="1"/>
+              <a:t>modèles</a:t>
+            </a:r>
+            <a:endParaRPr lang="en-US" sz="2800" dirty="0"/>
+          </a:p>
+          <a:p>
+            <a:endParaRPr lang="en-US" sz="2800" dirty="0"/>
+          </a:p>
+          <a:p>
+            <a:r>
+              <a:rPr lang="en-US" sz="2800" dirty="0" err="1"/>
+              <a:t>Interprétation</a:t>
+            </a:r>
+            <a:endParaRPr lang="en-US" sz="2800" dirty="0"/>
+          </a:p>
+          <a:p>
+            <a:endParaRPr lang="en-US" dirty="0"/>
+          </a:p>
+          <a:p>
+            <a:pPr marL="180975" lvl="1" indent="0">
+              <a:buNone/>
+            </a:pPr>
+            <a:endParaRPr lang="en-US" dirty="0"/>
+          </a:p>
+          <a:p>
+            <a:pPr lvl="1"/>
+            <a:endParaRPr lang="en-US" dirty="0"/>
+          </a:p>
+          <a:p>
+            <a:endParaRPr lang="en-US" dirty="0"/>
+          </a:p>
+          <a:p>
+            <a:endParaRPr lang="en-US" dirty="0"/>
+          </a:p>
+          <a:p>
+            <a:endParaRPr lang="en-US" dirty="0"/>
+          </a:p>
+          <a:p>
+            <a:endParaRPr lang="en-US" dirty="0"/>
+          </a:p>
+          <a:p>
+            <a:pPr lvl="1"/>
+            <a:endParaRPr lang="en-US" dirty="0"/>
+          </a:p>
+          <a:p>
+            <a:pPr lvl="1"/>
+            <a:endParaRPr lang="en-US" dirty="0"/>
+          </a:p>
+          <a:p>
+            <a:pPr lvl="1"/>
+            <a:endParaRPr lang="en-US" dirty="0"/>
+          </a:p>
+          <a:p>
+            <a:pPr lvl="1"/>
+            <a:endParaRPr lang="en-US" dirty="0"/>
+          </a:p>
+          <a:p>
+            <a:endParaRPr lang="en-US" b="1" dirty="0"/>
+          </a:p>
+          <a:p>
+            <a:endParaRPr lang="en-US" dirty="0"/>
+          </a:p>
+        </p:txBody>
+      </p:sp>
+      <p:sp>
+        <p:nvSpPr>
+          <p:cNvPr id="4" name="Vertical Text Placeholder 5">
+            <a:extLst>
+              <a:ext uri="{FF2B5EF4-FFF2-40B4-BE49-F238E27FC236}">
+                <a16:creationId xmlns:a16="http://schemas.microsoft.com/office/drawing/2014/main" id="{A57D01D8-1D67-D654-0CFB-28A877FD85B9}"/>
+              </a:ext>
+            </a:extLst>
+          </p:cNvPr>
+          <p:cNvSpPr txBox="1">
+            <a:spLocks/>
+          </p:cNvSpPr>
+          <p:nvPr/>
+        </p:nvSpPr>
+        <p:spPr>
+          <a:xfrm>
+            <a:off x="557062" y="1295400"/>
+            <a:ext cx="11389023" cy="4795836"/>
+          </a:xfrm>
+          <a:prstGeom prst="rect">
+            <a:avLst/>
+          </a:prstGeom>
+        </p:spPr>
+        <p:txBody>
+          <a:bodyPr vert="horz" lIns="0" tIns="0" rIns="0" bIns="0" rtlCol="0">
+            <a:normAutofit/>
+          </a:bodyPr>
+          <a:lstStyle>
+            <a:lvl1pPr marL="180975" indent="-180975" algn="l" defTabSz="914400" rtl="0" eaLnBrk="1" latinLnBrk="0" hangingPunct="1">
+              <a:lnSpc>
+                <a:spcPct val="90000"/>
+              </a:lnSpc>
+              <a:spcBef>
+                <a:spcPts val="600"/>
+              </a:spcBef>
+              <a:spcAft>
+                <a:spcPts val="600"/>
+              </a:spcAft>
+              <a:buClr>
+                <a:schemeClr val="bg2"/>
+              </a:buClr>
+              <a:buFont typeface="Arial" panose="020B0604020202020204" pitchFamily="34" charset="0"/>
+              <a:buChar char="•"/>
+              <a:defRPr sz="1800" kern="1200">
+                <a:solidFill>
+                  <a:schemeClr val="bg2"/>
+                </a:solidFill>
+                <a:latin typeface="+mn-lt"/>
+                <a:ea typeface="+mn-ea"/>
+                <a:cs typeface="+mn-cs"/>
+              </a:defRPr>
+            </a:lvl1pPr>
+            <a:lvl2pPr marL="361950" indent="-180975" algn="l" defTabSz="914400" rtl="0" eaLnBrk="1" latinLnBrk="0" hangingPunct="1">
+              <a:lnSpc>
+                <a:spcPct val="90000"/>
+              </a:lnSpc>
+              <a:spcBef>
+                <a:spcPts val="600"/>
+              </a:spcBef>
+              <a:spcAft>
+                <a:spcPts val="600"/>
+              </a:spcAft>
+              <a:buClr>
+                <a:schemeClr val="bg2"/>
+              </a:buClr>
+              <a:buFont typeface="Arial" panose="020B0604020202020204" pitchFamily="34" charset="0"/>
+              <a:buChar char="-"/>
+              <a:defRPr sz="1600" kern="1200">
+                <a:solidFill>
+                  <a:schemeClr val="bg2"/>
+                </a:solidFill>
+                <a:latin typeface="+mn-lt"/>
+                <a:ea typeface="+mn-ea"/>
+                <a:cs typeface="+mn-cs"/>
+              </a:defRPr>
+            </a:lvl2pPr>
+            <a:lvl3pPr marL="0" indent="0" algn="l" defTabSz="914400" rtl="0" eaLnBrk="1" latinLnBrk="0" hangingPunct="1">
+              <a:lnSpc>
+                <a:spcPct val="90000"/>
+              </a:lnSpc>
+              <a:spcBef>
+                <a:spcPts val="600"/>
+              </a:spcBef>
+              <a:spcAft>
+                <a:spcPts val="600"/>
+              </a:spcAft>
+              <a:buFont typeface="Arial" panose="020B0604020202020204" pitchFamily="34" charset="0"/>
+              <a:buNone/>
+              <a:defRPr sz="1800" kern="1200">
+                <a:solidFill>
+                  <a:schemeClr val="bg2"/>
+                </a:solidFill>
+                <a:latin typeface="+mn-lt"/>
+                <a:ea typeface="+mn-ea"/>
+                <a:cs typeface="+mn-cs"/>
+              </a:defRPr>
+            </a:lvl3pPr>
+            <a:lvl4pPr marL="0" indent="0" algn="l" defTabSz="914400" rtl="0" eaLnBrk="1" latinLnBrk="0" hangingPunct="1">
+              <a:lnSpc>
+                <a:spcPct val="90000"/>
+              </a:lnSpc>
+              <a:spcBef>
+                <a:spcPts val="600"/>
+              </a:spcBef>
+              <a:spcAft>
+                <a:spcPts val="600"/>
+              </a:spcAft>
+              <a:buFont typeface="Arial" panose="020B0604020202020204" pitchFamily="34" charset="0"/>
+              <a:buNone/>
+              <a:defRPr sz="1800" b="1" kern="1200">
+                <a:solidFill>
+                  <a:schemeClr val="bg2"/>
+                </a:solidFill>
+                <a:latin typeface="+mn-lt"/>
+                <a:ea typeface="+mn-ea"/>
+                <a:cs typeface="+mn-cs"/>
+              </a:defRPr>
+            </a:lvl4pPr>
+            <a:lvl5pPr marL="0" indent="0" algn="l" defTabSz="914400" rtl="0" eaLnBrk="1" latinLnBrk="0" hangingPunct="1">
+              <a:lnSpc>
+                <a:spcPct val="90000"/>
+              </a:lnSpc>
+              <a:spcBef>
+                <a:spcPts val="600"/>
+              </a:spcBef>
+              <a:spcAft>
+                <a:spcPts val="600"/>
+              </a:spcAft>
+              <a:buFont typeface="Arial" panose="020B0604020202020204" pitchFamily="34" charset="0"/>
+              <a:buNone/>
+              <a:defRPr sz="1800" b="1" kern="1200" baseline="0">
+                <a:solidFill>
+                  <a:schemeClr val="tx2"/>
+                </a:solidFill>
+                <a:latin typeface="+mn-lt"/>
+                <a:ea typeface="+mn-ea"/>
+                <a:cs typeface="+mn-cs"/>
+              </a:defRPr>
+            </a:lvl5pPr>
+            <a:lvl6pPr marL="180975" indent="-180975" algn="l" defTabSz="914400" rtl="0" eaLnBrk="1" latinLnBrk="0" hangingPunct="1">
+              <a:lnSpc>
+                <a:spcPct val="90000"/>
+              </a:lnSpc>
+              <a:spcBef>
+                <a:spcPts val="600"/>
+              </a:spcBef>
+              <a:spcAft>
+                <a:spcPts val="600"/>
+              </a:spcAft>
+              <a:buClr>
+                <a:schemeClr val="bg2"/>
+              </a:buClr>
+              <a:buFont typeface="Arial" panose="020B0604020202020204" pitchFamily="34" charset="0"/>
+              <a:buChar char="•"/>
+              <a:defRPr sz="1800" kern="1200">
+                <a:solidFill>
+                  <a:schemeClr val="bg2"/>
+                </a:solidFill>
+                <a:latin typeface="+mn-lt"/>
+                <a:ea typeface="+mn-ea"/>
+                <a:cs typeface="+mn-cs"/>
+              </a:defRPr>
+            </a:lvl6pPr>
+            <a:lvl7pPr marL="361950" indent="-180975" algn="l" defTabSz="914400" rtl="0" eaLnBrk="1" latinLnBrk="0" hangingPunct="1">
+              <a:lnSpc>
+                <a:spcPct val="90000"/>
+              </a:lnSpc>
+              <a:spcBef>
+                <a:spcPts val="600"/>
+              </a:spcBef>
+              <a:spcAft>
+                <a:spcPts val="600"/>
+              </a:spcAft>
+              <a:buClr>
+                <a:schemeClr val="bg2"/>
+              </a:buClr>
+              <a:buFont typeface="Arial" panose="020B0604020202020204" pitchFamily="34" charset="0"/>
+              <a:buChar char="-"/>
+              <a:defRPr sz="1600" kern="1200">
+                <a:solidFill>
+                  <a:schemeClr val="bg2"/>
+                </a:solidFill>
+                <a:latin typeface="+mn-lt"/>
+                <a:ea typeface="+mn-ea"/>
+                <a:cs typeface="+mn-cs"/>
+              </a:defRPr>
+            </a:lvl7pPr>
+            <a:lvl8pPr marL="0" indent="0" algn="l" defTabSz="914400" rtl="0" eaLnBrk="1" latinLnBrk="0" hangingPunct="1">
+              <a:lnSpc>
+                <a:spcPct val="90000"/>
+              </a:lnSpc>
+              <a:spcBef>
+                <a:spcPts val="600"/>
+              </a:spcBef>
+              <a:spcAft>
+                <a:spcPts val="600"/>
+              </a:spcAft>
+              <a:buFont typeface="Arial" panose="020B0604020202020204" pitchFamily="34" charset="0"/>
+              <a:buNone/>
+              <a:defRPr sz="1600" kern="1200">
+                <a:solidFill>
+                  <a:schemeClr val="bg2"/>
+                </a:solidFill>
+                <a:latin typeface="+mn-lt"/>
+                <a:ea typeface="+mn-ea"/>
+                <a:cs typeface="+mn-cs"/>
+              </a:defRPr>
+            </a:lvl8pPr>
+            <a:lvl9pPr marL="0" indent="0" algn="l" defTabSz="914400" rtl="0" eaLnBrk="1" latinLnBrk="0" hangingPunct="1">
+              <a:lnSpc>
+                <a:spcPct val="90000"/>
+              </a:lnSpc>
+              <a:spcBef>
+                <a:spcPts val="600"/>
+              </a:spcBef>
+              <a:spcAft>
+                <a:spcPts val="600"/>
+              </a:spcAft>
+              <a:buFont typeface="Arial" panose="020B0604020202020204" pitchFamily="34" charset="0"/>
+              <a:buNone/>
+              <a:defRPr sz="1800" b="1" kern="1200" baseline="0">
+                <a:solidFill>
+                  <a:schemeClr val="bg2"/>
+                </a:solidFill>
+                <a:latin typeface="+mn-lt"/>
+                <a:ea typeface="+mn-ea"/>
+                <a:cs typeface="+mn-cs"/>
+              </a:defRPr>
+            </a:lvl9pPr>
+          </a:lstStyle>
+          <a:p>
+            <a:endParaRPr lang="en-US" dirty="0"/>
+          </a:p>
+        </p:txBody>
+      </p:sp>
+    </p:spTree>
+    <p:extLst>
+      <p:ext uri="{BB962C8B-B14F-4D97-AF65-F5344CB8AC3E}">
+        <p14:creationId xmlns:p14="http://schemas.microsoft.com/office/powerpoint/2010/main" val="1239721552"/>
+      </p:ext>
+    </p:extLst>
+  </p:cSld>
+  <p:clrMapOvr>
+    <a:masterClrMapping/>
+  </p:clrMapOvr>
+  <p:transition spd="slow">
+    <p:wipe dir="r"/>
+  </p:transition>
+</p:sld>
+</file>
+
+<file path=ppt/slides/slide36.xml><?xml version="1.0" encoding="utf-8"?>
+<p:sld xmlns:a="http://schemas.openxmlformats.org/drawingml/2006/main" xmlns:r="http://schemas.openxmlformats.org/officeDocument/2006/relationships" xmlns:p="http://schemas.openxmlformats.org/presentationml/2006/main">
+  <p:cSld>
+    <p:spTree>
+      <p:nvGrpSpPr>
+        <p:cNvPr id="1" name=""/>
+        <p:cNvGrpSpPr/>
+        <p:nvPr/>
+      </p:nvGrpSpPr>
+      <p:grpSpPr>
+        <a:xfrm>
+          <a:off x="0" y="0"/>
+          <a:ext cx="0" cy="0"/>
+          <a:chOff x="0" y="0"/>
+          <a:chExt cx="0" cy="0"/>
+        </a:xfrm>
+      </p:grpSpPr>
+      <p:sp>
+        <p:nvSpPr>
+          <p:cNvPr id="2" name="Title 1">
+            <a:extLst>
+              <a:ext uri="{FF2B5EF4-FFF2-40B4-BE49-F238E27FC236}">
+                <a16:creationId xmlns:a16="http://schemas.microsoft.com/office/drawing/2014/main" id="{04C5DF06-5F42-4296-B27B-4F79E0DB836B}"/>
+              </a:ext>
+            </a:extLst>
+          </p:cNvPr>
+          <p:cNvSpPr>
+            <a:spLocks noGrp="1"/>
+          </p:cNvSpPr>
+          <p:nvPr>
+            <p:ph type="title"/>
+          </p:nvPr>
+        </p:nvSpPr>
+        <p:spPr/>
+        <p:txBody>
+          <a:bodyPr/>
+          <a:lstStyle/>
+          <a:p>
+            <a:r>
+              <a:rPr lang="en-US" sz="3600" dirty="0" err="1"/>
+              <a:t>Méthodologie</a:t>
+            </a:r>
+            <a:r>
+              <a:rPr lang="en-US" sz="3600" dirty="0"/>
+              <a:t> d’un </a:t>
+            </a:r>
+            <a:r>
+              <a:rPr lang="en-US" sz="3600" dirty="0" err="1"/>
+              <a:t>projet</a:t>
+            </a:r>
+            <a:r>
+              <a:rPr lang="en-US" sz="3600" dirty="0"/>
+              <a:t> de Machine Learning</a:t>
+            </a:r>
+          </a:p>
+        </p:txBody>
+      </p:sp>
+      <p:sp>
+        <p:nvSpPr>
+          <p:cNvPr id="5" name="Slide Number Placeholder 4">
+            <a:extLst>
+              <a:ext uri="{FF2B5EF4-FFF2-40B4-BE49-F238E27FC236}">
+                <a16:creationId xmlns:a16="http://schemas.microsoft.com/office/drawing/2014/main" id="{B756D4B6-3814-4E02-AB98-08D3B49675BF}"/>
+              </a:ext>
+            </a:extLst>
+          </p:cNvPr>
+          <p:cNvSpPr>
+            <a:spLocks noGrp="1"/>
+          </p:cNvSpPr>
+          <p:nvPr>
+            <p:ph type="sldNum" sz="quarter" idx="4"/>
+          </p:nvPr>
+        </p:nvSpPr>
+        <p:spPr/>
+        <p:txBody>
+          <a:bodyPr/>
+          <a:lstStyle/>
+          <a:p>
+            <a:fld id="{5EE7099E-8998-4851-915A-4F4831808297}" type="slidenum">
+              <a:rPr lang="nl-NL" smtClean="0"/>
+              <a:pPr/>
+              <a:t>36</a:t>
+            </a:fld>
+            <a:endParaRPr lang="nl-NL"/>
+          </a:p>
+        </p:txBody>
+      </p:sp>
+      <p:sp>
+        <p:nvSpPr>
+          <p:cNvPr id="3" name="ZoneTexte 2">
+            <a:extLst>
+              <a:ext uri="{FF2B5EF4-FFF2-40B4-BE49-F238E27FC236}">
+                <a16:creationId xmlns:a16="http://schemas.microsoft.com/office/drawing/2014/main" id="{0C248AA7-6FCB-3F89-E3DD-C837A2826405}"/>
+              </a:ext>
+            </a:extLst>
+          </p:cNvPr>
+          <p:cNvSpPr txBox="1"/>
+          <p:nvPr/>
+        </p:nvSpPr>
+        <p:spPr>
+          <a:xfrm>
+            <a:off x="3692106" y="1699404"/>
+            <a:ext cx="0" cy="0"/>
+          </a:xfrm>
+          <a:prstGeom prst="rect">
+            <a:avLst/>
+          </a:prstGeom>
+          <a:noFill/>
+        </p:spPr>
+        <p:txBody>
+          <a:bodyPr wrap="none" lIns="108000" tIns="108000" rIns="108000" bIns="108000" rtlCol="0">
+            <a:noAutofit/>
+          </a:bodyPr>
+          <a:lstStyle/>
+          <a:p>
+            <a:endParaRPr lang="fr-FR" noProof="0" dirty="0" err="1">
+              <a:solidFill>
+                <a:schemeClr val="bg2"/>
+              </a:solidFill>
+            </a:endParaRPr>
+          </a:p>
+        </p:txBody>
+      </p:sp>
+      <p:sp>
+        <p:nvSpPr>
+          <p:cNvPr id="6" name="Vertical Text Placeholder 5">
+            <a:extLst>
+              <a:ext uri="{FF2B5EF4-FFF2-40B4-BE49-F238E27FC236}">
+                <a16:creationId xmlns:a16="http://schemas.microsoft.com/office/drawing/2014/main" id="{F8170739-5212-AEC7-557E-2E086A29A496}"/>
+              </a:ext>
+            </a:extLst>
+          </p:cNvPr>
+          <p:cNvSpPr>
+            <a:spLocks noGrp="1"/>
+          </p:cNvSpPr>
+          <p:nvPr>
+            <p:ph type="body" orient="vert" idx="1"/>
+          </p:nvPr>
+        </p:nvSpPr>
+        <p:spPr>
+          <a:xfrm>
+            <a:off x="404662" y="1143000"/>
+            <a:ext cx="11389023" cy="4795836"/>
+          </a:xfrm>
+        </p:spPr>
+        <p:txBody>
+          <a:bodyPr>
+            <a:normAutofit fontScale="85000" lnSpcReduction="20000"/>
+          </a:bodyPr>
+          <a:lstStyle/>
+          <a:p>
+            <a:r>
+              <a:rPr lang="en-US" sz="2800" dirty="0" err="1"/>
+              <a:t>Définition</a:t>
+            </a:r>
+            <a:r>
+              <a:rPr lang="en-US" sz="2800" dirty="0"/>
+              <a:t> du </a:t>
+            </a:r>
+            <a:r>
+              <a:rPr lang="en-US" sz="2800" dirty="0" err="1"/>
+              <a:t>problème</a:t>
+            </a:r>
+            <a:r>
+              <a:rPr lang="en-US" sz="2800" dirty="0"/>
+              <a:t> (regression, classification, clustering)</a:t>
+            </a:r>
+          </a:p>
+          <a:p>
+            <a:pPr marL="0" indent="0">
+              <a:buNone/>
+            </a:pPr>
+            <a:endParaRPr lang="en-US" sz="2800" dirty="0"/>
+          </a:p>
+          <a:p>
+            <a:r>
+              <a:rPr lang="en-US" sz="2800" dirty="0" err="1"/>
+              <a:t>Création</a:t>
+            </a:r>
+            <a:r>
+              <a:rPr lang="en-US" sz="2800" dirty="0"/>
+              <a:t> d’un jeu </a:t>
+            </a:r>
+            <a:r>
+              <a:rPr lang="en-US" sz="2800" dirty="0" err="1"/>
+              <a:t>d’entraînement</a:t>
+            </a:r>
+            <a:r>
+              <a:rPr lang="en-US" sz="2800" dirty="0"/>
+              <a:t> et de test</a:t>
+            </a:r>
+          </a:p>
+          <a:p>
+            <a:endParaRPr lang="en-US" sz="2800" dirty="0"/>
+          </a:p>
+          <a:p>
+            <a:r>
+              <a:rPr lang="en-US" sz="2800" dirty="0" err="1"/>
+              <a:t>Pré-traitement</a:t>
+            </a:r>
+            <a:r>
+              <a:rPr lang="en-US" sz="2800" dirty="0"/>
+              <a:t> des </a:t>
+            </a:r>
+            <a:r>
+              <a:rPr lang="en-US" sz="2800" dirty="0" err="1"/>
+              <a:t>données</a:t>
+            </a:r>
+            <a:r>
+              <a:rPr lang="en-US" sz="2800" dirty="0"/>
+              <a:t> (</a:t>
+            </a:r>
+            <a:r>
+              <a:rPr lang="en-US" sz="2800" dirty="0" err="1"/>
+              <a:t>encodage</a:t>
+            </a:r>
+            <a:r>
+              <a:rPr lang="en-US" sz="2800" dirty="0"/>
+              <a:t> des variables, </a:t>
+            </a:r>
+            <a:r>
+              <a:rPr lang="en-US" sz="2800" dirty="0" err="1"/>
+              <a:t>normalisation</a:t>
+            </a:r>
+            <a:r>
+              <a:rPr lang="en-US" sz="2800" dirty="0"/>
+              <a:t>…)</a:t>
+            </a:r>
+          </a:p>
+          <a:p>
+            <a:endParaRPr lang="en-US" sz="2800" dirty="0"/>
+          </a:p>
+          <a:p>
+            <a:r>
+              <a:rPr lang="en-US" sz="2800" dirty="0" err="1"/>
+              <a:t>Création</a:t>
+            </a:r>
+            <a:r>
+              <a:rPr lang="en-US" sz="2800" dirty="0"/>
+              <a:t> de </a:t>
+            </a:r>
+            <a:r>
+              <a:rPr lang="en-US" sz="2800" dirty="0" err="1"/>
+              <a:t>modèles</a:t>
+            </a:r>
+            <a:endParaRPr lang="en-US" sz="2800" dirty="0"/>
+          </a:p>
+          <a:p>
+            <a:pPr marL="0" indent="0">
+              <a:buNone/>
+            </a:pPr>
+            <a:endParaRPr lang="en-US" sz="2800" dirty="0"/>
+          </a:p>
+          <a:p>
+            <a:r>
+              <a:rPr lang="en-US" sz="2800" dirty="0"/>
+              <a:t>Evaluation des </a:t>
+            </a:r>
+            <a:r>
+              <a:rPr lang="en-US" sz="2800" dirty="0" err="1"/>
+              <a:t>modèles</a:t>
+            </a:r>
+            <a:endParaRPr lang="en-US" sz="2800" dirty="0"/>
+          </a:p>
+          <a:p>
+            <a:endParaRPr lang="en-US" sz="2800" dirty="0"/>
+          </a:p>
+          <a:p>
+            <a:r>
+              <a:rPr lang="en-US" sz="2800" dirty="0" err="1"/>
+              <a:t>Interprétation</a:t>
+            </a:r>
+            <a:endParaRPr lang="en-US" sz="2800" dirty="0"/>
+          </a:p>
+          <a:p>
+            <a:endParaRPr lang="en-US" dirty="0"/>
+          </a:p>
+          <a:p>
+            <a:pPr marL="180975" lvl="1" indent="0">
+              <a:buNone/>
+            </a:pPr>
+            <a:endParaRPr lang="en-US" dirty="0"/>
+          </a:p>
+          <a:p>
+            <a:pPr lvl="1"/>
+            <a:endParaRPr lang="en-US" dirty="0"/>
+          </a:p>
+          <a:p>
+            <a:endParaRPr lang="en-US" dirty="0"/>
+          </a:p>
+          <a:p>
+            <a:endParaRPr lang="en-US" dirty="0"/>
+          </a:p>
+          <a:p>
+            <a:endParaRPr lang="en-US" dirty="0"/>
+          </a:p>
+          <a:p>
+            <a:endParaRPr lang="en-US" dirty="0"/>
+          </a:p>
+          <a:p>
+            <a:pPr lvl="1"/>
+            <a:endParaRPr lang="en-US" dirty="0"/>
+          </a:p>
+          <a:p>
+            <a:pPr lvl="1"/>
+            <a:endParaRPr lang="en-US" dirty="0"/>
+          </a:p>
+          <a:p>
+            <a:pPr lvl="1"/>
+            <a:endParaRPr lang="en-US" dirty="0"/>
+          </a:p>
+          <a:p>
+            <a:pPr lvl="1"/>
+            <a:endParaRPr lang="en-US" dirty="0"/>
+          </a:p>
+          <a:p>
+            <a:endParaRPr lang="en-US" b="1" dirty="0"/>
+          </a:p>
+          <a:p>
+            <a:endParaRPr lang="en-US" dirty="0"/>
+          </a:p>
+        </p:txBody>
+      </p:sp>
+      <p:sp>
+        <p:nvSpPr>
+          <p:cNvPr id="4" name="Vertical Text Placeholder 5">
+            <a:extLst>
+              <a:ext uri="{FF2B5EF4-FFF2-40B4-BE49-F238E27FC236}">
+                <a16:creationId xmlns:a16="http://schemas.microsoft.com/office/drawing/2014/main" id="{A57D01D8-1D67-D654-0CFB-28A877FD85B9}"/>
+              </a:ext>
+            </a:extLst>
+          </p:cNvPr>
+          <p:cNvSpPr txBox="1">
+            <a:spLocks/>
+          </p:cNvSpPr>
+          <p:nvPr/>
+        </p:nvSpPr>
+        <p:spPr>
+          <a:xfrm>
+            <a:off x="557062" y="1295400"/>
+            <a:ext cx="11389023" cy="4795836"/>
+          </a:xfrm>
+          <a:prstGeom prst="rect">
+            <a:avLst/>
+          </a:prstGeom>
+        </p:spPr>
+        <p:txBody>
+          <a:bodyPr vert="horz" lIns="0" tIns="0" rIns="0" bIns="0" rtlCol="0">
+            <a:normAutofit/>
+          </a:bodyPr>
+          <a:lstStyle>
+            <a:lvl1pPr marL="180975" indent="-180975" algn="l" defTabSz="914400" rtl="0" eaLnBrk="1" latinLnBrk="0" hangingPunct="1">
+              <a:lnSpc>
+                <a:spcPct val="90000"/>
+              </a:lnSpc>
+              <a:spcBef>
+                <a:spcPts val="600"/>
+              </a:spcBef>
+              <a:spcAft>
+                <a:spcPts val="600"/>
+              </a:spcAft>
+              <a:buClr>
+                <a:schemeClr val="bg2"/>
+              </a:buClr>
+              <a:buFont typeface="Arial" panose="020B0604020202020204" pitchFamily="34" charset="0"/>
+              <a:buChar char="•"/>
+              <a:defRPr sz="1800" kern="1200">
+                <a:solidFill>
+                  <a:schemeClr val="bg2"/>
+                </a:solidFill>
+                <a:latin typeface="+mn-lt"/>
+                <a:ea typeface="+mn-ea"/>
+                <a:cs typeface="+mn-cs"/>
+              </a:defRPr>
+            </a:lvl1pPr>
+            <a:lvl2pPr marL="361950" indent="-180975" algn="l" defTabSz="914400" rtl="0" eaLnBrk="1" latinLnBrk="0" hangingPunct="1">
+              <a:lnSpc>
+                <a:spcPct val="90000"/>
+              </a:lnSpc>
+              <a:spcBef>
+                <a:spcPts val="600"/>
+              </a:spcBef>
+              <a:spcAft>
+                <a:spcPts val="600"/>
+              </a:spcAft>
+              <a:buClr>
+                <a:schemeClr val="bg2"/>
+              </a:buClr>
+              <a:buFont typeface="Arial" panose="020B0604020202020204" pitchFamily="34" charset="0"/>
+              <a:buChar char="-"/>
+              <a:defRPr sz="1600" kern="1200">
+                <a:solidFill>
+                  <a:schemeClr val="bg2"/>
+                </a:solidFill>
+                <a:latin typeface="+mn-lt"/>
+                <a:ea typeface="+mn-ea"/>
+                <a:cs typeface="+mn-cs"/>
+              </a:defRPr>
+            </a:lvl2pPr>
+            <a:lvl3pPr marL="0" indent="0" algn="l" defTabSz="914400" rtl="0" eaLnBrk="1" latinLnBrk="0" hangingPunct="1">
+              <a:lnSpc>
+                <a:spcPct val="90000"/>
+              </a:lnSpc>
+              <a:spcBef>
+                <a:spcPts val="600"/>
+              </a:spcBef>
+              <a:spcAft>
+                <a:spcPts val="600"/>
+              </a:spcAft>
+              <a:buFont typeface="Arial" panose="020B0604020202020204" pitchFamily="34" charset="0"/>
+              <a:buNone/>
+              <a:defRPr sz="1800" kern="1200">
+                <a:solidFill>
+                  <a:schemeClr val="bg2"/>
+                </a:solidFill>
+                <a:latin typeface="+mn-lt"/>
+                <a:ea typeface="+mn-ea"/>
+                <a:cs typeface="+mn-cs"/>
+              </a:defRPr>
+            </a:lvl3pPr>
+            <a:lvl4pPr marL="0" indent="0" algn="l" defTabSz="914400" rtl="0" eaLnBrk="1" latinLnBrk="0" hangingPunct="1">
+              <a:lnSpc>
+                <a:spcPct val="90000"/>
+              </a:lnSpc>
+              <a:spcBef>
+                <a:spcPts val="600"/>
+              </a:spcBef>
+              <a:spcAft>
+                <a:spcPts val="600"/>
+              </a:spcAft>
+              <a:buFont typeface="Arial" panose="020B0604020202020204" pitchFamily="34" charset="0"/>
+              <a:buNone/>
+              <a:defRPr sz="1800" b="1" kern="1200">
+                <a:solidFill>
+                  <a:schemeClr val="bg2"/>
+                </a:solidFill>
+                <a:latin typeface="+mn-lt"/>
+                <a:ea typeface="+mn-ea"/>
+                <a:cs typeface="+mn-cs"/>
+              </a:defRPr>
+            </a:lvl4pPr>
+            <a:lvl5pPr marL="0" indent="0" algn="l" defTabSz="914400" rtl="0" eaLnBrk="1" latinLnBrk="0" hangingPunct="1">
+              <a:lnSpc>
+                <a:spcPct val="90000"/>
+              </a:lnSpc>
+              <a:spcBef>
+                <a:spcPts val="600"/>
+              </a:spcBef>
+              <a:spcAft>
+                <a:spcPts val="600"/>
+              </a:spcAft>
+              <a:buFont typeface="Arial" panose="020B0604020202020204" pitchFamily="34" charset="0"/>
+              <a:buNone/>
+              <a:defRPr sz="1800" b="1" kern="1200" baseline="0">
+                <a:solidFill>
+                  <a:schemeClr val="tx2"/>
+                </a:solidFill>
+                <a:latin typeface="+mn-lt"/>
+                <a:ea typeface="+mn-ea"/>
+                <a:cs typeface="+mn-cs"/>
+              </a:defRPr>
+            </a:lvl5pPr>
+            <a:lvl6pPr marL="180975" indent="-180975" algn="l" defTabSz="914400" rtl="0" eaLnBrk="1" latinLnBrk="0" hangingPunct="1">
+              <a:lnSpc>
+                <a:spcPct val="90000"/>
+              </a:lnSpc>
+              <a:spcBef>
+                <a:spcPts val="600"/>
+              </a:spcBef>
+              <a:spcAft>
+                <a:spcPts val="600"/>
+              </a:spcAft>
+              <a:buClr>
+                <a:schemeClr val="bg2"/>
+              </a:buClr>
+              <a:buFont typeface="Arial" panose="020B0604020202020204" pitchFamily="34" charset="0"/>
+              <a:buChar char="•"/>
+              <a:defRPr sz="1800" kern="1200">
+                <a:solidFill>
+                  <a:schemeClr val="bg2"/>
+                </a:solidFill>
+                <a:latin typeface="+mn-lt"/>
+                <a:ea typeface="+mn-ea"/>
+                <a:cs typeface="+mn-cs"/>
+              </a:defRPr>
+            </a:lvl6pPr>
+            <a:lvl7pPr marL="361950" indent="-180975" algn="l" defTabSz="914400" rtl="0" eaLnBrk="1" latinLnBrk="0" hangingPunct="1">
+              <a:lnSpc>
+                <a:spcPct val="90000"/>
+              </a:lnSpc>
+              <a:spcBef>
+                <a:spcPts val="600"/>
+              </a:spcBef>
+              <a:spcAft>
+                <a:spcPts val="600"/>
+              </a:spcAft>
+              <a:buClr>
+                <a:schemeClr val="bg2"/>
+              </a:buClr>
+              <a:buFont typeface="Arial" panose="020B0604020202020204" pitchFamily="34" charset="0"/>
+              <a:buChar char="-"/>
+              <a:defRPr sz="1600" kern="1200">
+                <a:solidFill>
+                  <a:schemeClr val="bg2"/>
+                </a:solidFill>
+                <a:latin typeface="+mn-lt"/>
+                <a:ea typeface="+mn-ea"/>
+                <a:cs typeface="+mn-cs"/>
+              </a:defRPr>
+            </a:lvl7pPr>
+            <a:lvl8pPr marL="0" indent="0" algn="l" defTabSz="914400" rtl="0" eaLnBrk="1" latinLnBrk="0" hangingPunct="1">
+              <a:lnSpc>
+                <a:spcPct val="90000"/>
+              </a:lnSpc>
+              <a:spcBef>
+                <a:spcPts val="600"/>
+              </a:spcBef>
+              <a:spcAft>
+                <a:spcPts val="600"/>
+              </a:spcAft>
+              <a:buFont typeface="Arial" panose="020B0604020202020204" pitchFamily="34" charset="0"/>
+              <a:buNone/>
+              <a:defRPr sz="1600" kern="1200">
+                <a:solidFill>
+                  <a:schemeClr val="bg2"/>
+                </a:solidFill>
+                <a:latin typeface="+mn-lt"/>
+                <a:ea typeface="+mn-ea"/>
+                <a:cs typeface="+mn-cs"/>
+              </a:defRPr>
+            </a:lvl8pPr>
+            <a:lvl9pPr marL="0" indent="0" algn="l" defTabSz="914400" rtl="0" eaLnBrk="1" latinLnBrk="0" hangingPunct="1">
+              <a:lnSpc>
+                <a:spcPct val="90000"/>
+              </a:lnSpc>
+              <a:spcBef>
+                <a:spcPts val="600"/>
+              </a:spcBef>
+              <a:spcAft>
+                <a:spcPts val="600"/>
+              </a:spcAft>
+              <a:buFont typeface="Arial" panose="020B0604020202020204" pitchFamily="34" charset="0"/>
+              <a:buNone/>
+              <a:defRPr sz="1800" b="1" kern="1200" baseline="0">
+                <a:solidFill>
+                  <a:schemeClr val="bg2"/>
+                </a:solidFill>
+                <a:latin typeface="+mn-lt"/>
+                <a:ea typeface="+mn-ea"/>
+                <a:cs typeface="+mn-cs"/>
+              </a:defRPr>
+            </a:lvl9pPr>
+          </a:lstStyle>
+          <a:p>
+            <a:endParaRPr lang="en-US" dirty="0"/>
+          </a:p>
+        </p:txBody>
+      </p:sp>
+      <p:sp>
+        <p:nvSpPr>
+          <p:cNvPr id="7" name="ZoneTexte 6">
+            <a:extLst>
+              <a:ext uri="{FF2B5EF4-FFF2-40B4-BE49-F238E27FC236}">
+                <a16:creationId xmlns:a16="http://schemas.microsoft.com/office/drawing/2014/main" id="{A5025745-98AB-F694-A7DC-F46D9D65C43B}"/>
+              </a:ext>
+            </a:extLst>
+          </p:cNvPr>
+          <p:cNvSpPr txBox="1"/>
+          <p:nvPr/>
+        </p:nvSpPr>
+        <p:spPr>
+          <a:xfrm>
+            <a:off x="7142300" y="3962400"/>
+            <a:ext cx="3352800" cy="1143000"/>
+          </a:xfrm>
+          <a:prstGeom prst="rect">
+            <a:avLst/>
+          </a:prstGeom>
+          <a:noFill/>
+        </p:spPr>
+        <p:txBody>
+          <a:bodyPr wrap="square" lIns="108000" tIns="108000" rIns="108000" bIns="108000" rtlCol="0">
+            <a:noAutofit/>
+          </a:bodyPr>
+          <a:lstStyle/>
+          <a:p>
+            <a:r>
+              <a:rPr lang="fr-FR" sz="7200" b="1" dirty="0">
+                <a:solidFill>
+                  <a:schemeClr val="bg2"/>
+                </a:solidFill>
+              </a:rPr>
+              <a:t>DEMO</a:t>
+            </a:r>
+            <a:endParaRPr lang="fr-FR" sz="7200" b="1" noProof="0" dirty="0" err="1">
+              <a:solidFill>
+                <a:schemeClr val="bg2"/>
+              </a:solidFill>
+            </a:endParaRPr>
+          </a:p>
+        </p:txBody>
+      </p:sp>
+    </p:spTree>
+    <p:extLst>
+      <p:ext uri="{BB962C8B-B14F-4D97-AF65-F5344CB8AC3E}">
+        <p14:creationId xmlns:p14="http://schemas.microsoft.com/office/powerpoint/2010/main" val="1842679910"/>
+      </p:ext>
+    </p:extLst>
+  </p:cSld>
+  <p:clrMapOvr>
+    <a:masterClrMapping/>
+  </p:clrMapOvr>
+  <p:transition spd="slow">
+    <p:wipe dir="r"/>
+  </p:transition>
+</p:sld>
+</file>
+
+<file path=ppt/slides/slide37.xml><?xml version="1.0" encoding="utf-8"?>
+<p:sld xmlns:a="http://schemas.openxmlformats.org/drawingml/2006/main" xmlns:r="http://schemas.openxmlformats.org/officeDocument/2006/relationships" xmlns:p="http://schemas.openxmlformats.org/presentationml/2006/main">
+  <p:cSld>
+    <p:spTree>
+      <p:nvGrpSpPr>
+        <p:cNvPr id="1" name=""/>
+        <p:cNvGrpSpPr/>
+        <p:nvPr/>
+      </p:nvGrpSpPr>
+      <p:grpSpPr>
+        <a:xfrm>
+          <a:off x="0" y="0"/>
+          <a:ext cx="0" cy="0"/>
+          <a:chOff x="0" y="0"/>
+          <a:chExt cx="0" cy="0"/>
+        </a:xfrm>
+      </p:grpSpPr>
+      <p:sp>
+        <p:nvSpPr>
+          <p:cNvPr id="6" name="Tijdelijke aanduiding voor tekst 5"/>
+          <p:cNvSpPr>
+            <a:spLocks noGrp="1"/>
+          </p:cNvSpPr>
+          <p:nvPr>
+            <p:ph type="body" sz="quarter" idx="12"/>
+          </p:nvPr>
+        </p:nvSpPr>
+        <p:spPr/>
+        <p:txBody>
+          <a:bodyPr/>
+          <a:lstStyle/>
+          <a:p>
             <a:endParaRPr lang="nl-NL" dirty="0"/>
           </a:p>
         </p:txBody>
@@ -28731,7 +30242,7 @@
             <a:fld id="{5EE7099E-8998-4851-915A-4F4831808297}" type="slidenum">
               <a:rPr lang="nl-NL" smtClean="0"/>
               <a:pPr/>
-              <a:t>34</a:t>
+              <a:t>37</a:t>
             </a:fld>
             <a:endParaRPr lang="nl-NL"/>
           </a:p>

</xml_diff>

<commit_message>
Update footer of the slides
</commit_message>
<xml_diff>
--- a/presentation.pptx
+++ b/presentation.pptx
@@ -1629,7 +1629,7 @@
         <p:spPr>
           <a:xfrm>
             <a:off x="549002" y="6444530"/>
-            <a:ext cx="6918325" cy="393700"/>
+            <a:ext cx="8583781" cy="393700"/>
           </a:xfrm>
         </p:spPr>
         <p:txBody>
@@ -1650,19 +1650,59 @@
             <a:pPr lvl="0"/>
             <a:r>
               <a:rPr lang="en-GB" noProof="0" dirty="0"/>
-              <a:t>CY Tech – Charles-</a:t>
-            </a:r>
-            <a:r>
-              <a:rPr lang="en-GB" noProof="0" dirty="0" err="1"/>
-              <a:t>Meldhine</a:t>
-            </a:r>
-            <a:r>
-              <a:rPr lang="en-GB" noProof="0" dirty="0"/>
-              <a:t> Madi </a:t>
-            </a:r>
-            <a:r>
-              <a:rPr lang="en-GB" noProof="0" dirty="0" err="1"/>
+              <a:t>CY Tech – </a:t>
+            </a:r>
+            <a:r>
+              <a:rPr lang="nl-NL" dirty="0"/>
+              <a:t>A. </a:t>
+            </a:r>
+            <a:r>
+              <a:rPr lang="nl-NL" dirty="0" err="1"/>
+              <a:t>Lehbib</a:t>
+            </a:r>
+            <a:r>
+              <a:rPr lang="nl-NL" dirty="0"/>
+              <a:t>, A. </a:t>
+            </a:r>
+            <a:r>
+              <a:rPr lang="nl-NL" dirty="0" err="1"/>
+              <a:t>Ouinekh</a:t>
+            </a:r>
+            <a:r>
+              <a:rPr lang="nl-NL" dirty="0"/>
+              <a:t>, C. </a:t>
+            </a:r>
+            <a:r>
+              <a:rPr lang="nl-NL" dirty="0" err="1"/>
+              <a:t>Madi</a:t>
+            </a:r>
+            <a:r>
+              <a:rPr lang="nl-NL" dirty="0"/>
+              <a:t> </a:t>
+            </a:r>
+            <a:r>
+              <a:rPr lang="nl-NL" dirty="0" err="1"/>
               <a:t>Mnemoi</a:t>
+            </a:r>
+            <a:r>
+              <a:rPr lang="nl-NL" dirty="0"/>
+              <a:t>, L. Terra, </a:t>
+            </a:r>
+            <a:r>
+              <a:rPr lang="nl-NL" dirty="0" err="1"/>
+              <a:t>J.Aït-Ouakli</a:t>
+            </a:r>
+            <a:r>
+              <a:rPr lang="nl-NL" dirty="0"/>
+              <a:t>, Y. </a:t>
+            </a:r>
+            <a:r>
+              <a:rPr lang="nl-NL" dirty="0" err="1"/>
+              <a:t>Saïdi</a:t>
+            </a:r>
+            <a:r>
+              <a:rPr lang="nl-NL" dirty="0"/>
+              <a:t> </a:t>
             </a:r>
             <a:endParaRPr lang="en-GB" noProof="0" dirty="0"/>
           </a:p>
@@ -11022,13 +11062,61 @@
         </p:spPr>
         <p:txBody>
           <a:bodyPr>
-            <a:normAutofit/>
+            <a:normAutofit fontScale="70000" lnSpcReduction="20000"/>
           </a:bodyPr>
           <a:lstStyle/>
           <a:p>
             <a:r>
               <a:rPr lang="nl-NL" dirty="0"/>
-              <a:t>Charles-Meldhine Madi Mnemoi – </a:t>
+              <a:t>A. </a:t>
+            </a:r>
+            <a:r>
+              <a:rPr lang="nl-NL" dirty="0" err="1"/>
+              <a:t>Lehbib</a:t>
+            </a:r>
+            <a:r>
+              <a:rPr lang="nl-NL" dirty="0"/>
+              <a:t>, A. </a:t>
+            </a:r>
+            <a:r>
+              <a:rPr lang="nl-NL" dirty="0" err="1"/>
+              <a:t>Ouinekh</a:t>
+            </a:r>
+            <a:r>
+              <a:rPr lang="nl-NL" dirty="0"/>
+              <a:t>, C. </a:t>
+            </a:r>
+            <a:r>
+              <a:rPr lang="nl-NL" dirty="0" err="1"/>
+              <a:t>Madi</a:t>
+            </a:r>
+            <a:r>
+              <a:rPr lang="nl-NL" dirty="0"/>
+              <a:t> </a:t>
+            </a:r>
+            <a:r>
+              <a:rPr lang="nl-NL" dirty="0" err="1"/>
+              <a:t>Mnemoi</a:t>
+            </a:r>
+            <a:r>
+              <a:rPr lang="nl-NL" dirty="0"/>
+              <a:t>, L. Terra, </a:t>
+            </a:r>
+            <a:r>
+              <a:rPr lang="nl-NL" dirty="0" err="1"/>
+              <a:t>J.Aït-Ouakli</a:t>
+            </a:r>
+            <a:r>
+              <a:rPr lang="nl-NL" dirty="0"/>
+              <a:t>, Y. </a:t>
+            </a:r>
+            <a:r>
+              <a:rPr lang="nl-NL" dirty="0" err="1"/>
+              <a:t>Saïdi</a:t>
+            </a:r>
+            <a:r>
+              <a:rPr lang="nl-NL" dirty="0"/>
+              <a:t> – </a:t>
             </a:r>
             <a:r>
               <a:rPr lang="nl-NL" dirty="0" err="1"/>
@@ -11089,12 +11177,12 @@
         <p:spPr>
           <a:xfrm>
             <a:off x="549002" y="6444530"/>
-            <a:ext cx="6918325" cy="393700"/>
+            <a:ext cx="7988573" cy="393700"/>
           </a:xfrm>
         </p:spPr>
         <p:txBody>
           <a:bodyPr anchor="ctr">
-            <a:normAutofit/>
+            <a:normAutofit fontScale="92500"/>
           </a:bodyPr>
           <a:lstStyle>
             <a:lvl1pPr marL="0" indent="0">
@@ -11110,8 +11198,61 @@
             <a:pPr lvl="0"/>
             <a:r>
               <a:rPr lang="en-GB" noProof="0" dirty="0"/>
-              <a:t>CY Tech – Charles-Meldhine Madi Mnemoi</a:t>
-            </a:r>
+              <a:t>CY Tech – </a:t>
+            </a:r>
+            <a:r>
+              <a:rPr lang="nl-NL" dirty="0"/>
+              <a:t>A. </a:t>
+            </a:r>
+            <a:r>
+              <a:rPr lang="nl-NL" dirty="0" err="1"/>
+              <a:t>Lehbib</a:t>
+            </a:r>
+            <a:r>
+              <a:rPr lang="nl-NL" dirty="0"/>
+              <a:t>, A. </a:t>
+            </a:r>
+            <a:r>
+              <a:rPr lang="nl-NL" dirty="0" err="1"/>
+              <a:t>Ouinekh</a:t>
+            </a:r>
+            <a:r>
+              <a:rPr lang="nl-NL" dirty="0"/>
+              <a:t>, C. </a:t>
+            </a:r>
+            <a:r>
+              <a:rPr lang="nl-NL" dirty="0" err="1"/>
+              <a:t>Madi</a:t>
+            </a:r>
+            <a:r>
+              <a:rPr lang="nl-NL" dirty="0"/>
+              <a:t> </a:t>
+            </a:r>
+            <a:r>
+              <a:rPr lang="nl-NL" dirty="0" err="1"/>
+              <a:t>Mnemoi</a:t>
+            </a:r>
+            <a:r>
+              <a:rPr lang="nl-NL" dirty="0"/>
+              <a:t>, L. Terra, </a:t>
+            </a:r>
+            <a:r>
+              <a:rPr lang="nl-NL" dirty="0" err="1"/>
+              <a:t>J.Aït-Ouakli</a:t>
+            </a:r>
+            <a:r>
+              <a:rPr lang="nl-NL" dirty="0"/>
+              <a:t>, Y. </a:t>
+            </a:r>
+            <a:r>
+              <a:rPr lang="nl-NL" dirty="0" err="1"/>
+              <a:t>Saïdi</a:t>
+            </a:r>
+            <a:r>
+              <a:rPr lang="nl-NL" dirty="0"/>
+              <a:t> </a:t>
+            </a:r>
+            <a:endParaRPr lang="en-GB" noProof="0" dirty="0"/>
           </a:p>
         </p:txBody>
       </p:sp>
@@ -12471,7 +12612,7 @@
         <p:spPr>
           <a:xfrm>
             <a:off x="549002" y="6444530"/>
-            <a:ext cx="6918325" cy="393700"/>
+            <a:ext cx="10579373" cy="393700"/>
           </a:xfrm>
         </p:spPr>
         <p:txBody>
@@ -12492,11 +12633,59 @@
             <a:pPr lvl="0"/>
             <a:r>
               <a:rPr lang="en-GB" dirty="0"/>
-              <a:t>CY Tech – C. Madi Mnemoi, </a:t>
-            </a:r>
-            <a:r>
-              <a:rPr lang="en-GB" dirty="0" err="1"/>
-              <a:t>B.Kerdad</a:t>
+              <a:t>CY Tech – </a:t>
+            </a:r>
+            <a:r>
+              <a:rPr lang="nl-NL" dirty="0"/>
+              <a:t>A. </a:t>
+            </a:r>
+            <a:r>
+              <a:rPr lang="nl-NL" dirty="0" err="1"/>
+              <a:t>Lehbib</a:t>
+            </a:r>
+            <a:r>
+              <a:rPr lang="nl-NL" dirty="0"/>
+              <a:t>, A. </a:t>
+            </a:r>
+            <a:r>
+              <a:rPr lang="nl-NL" dirty="0" err="1"/>
+              <a:t>Ouinekh</a:t>
+            </a:r>
+            <a:r>
+              <a:rPr lang="nl-NL" dirty="0"/>
+              <a:t>, C. </a:t>
+            </a:r>
+            <a:r>
+              <a:rPr lang="nl-NL" dirty="0" err="1"/>
+              <a:t>Madi</a:t>
+            </a:r>
+            <a:r>
+              <a:rPr lang="nl-NL" dirty="0"/>
+              <a:t> </a:t>
+            </a:r>
+            <a:r>
+              <a:rPr lang="nl-NL" dirty="0" err="1"/>
+              <a:t>Mnemoi</a:t>
+            </a:r>
+            <a:r>
+              <a:rPr lang="nl-NL" dirty="0"/>
+              <a:t>, L. Terra, </a:t>
+            </a:r>
+            <a:r>
+              <a:rPr lang="nl-NL" dirty="0" err="1"/>
+              <a:t>J.Aït-Ouakli</a:t>
+            </a:r>
+            <a:r>
+              <a:rPr lang="nl-NL" dirty="0"/>
+              <a:t>, Y. </a:t>
+            </a:r>
+            <a:r>
+              <a:rPr lang="nl-NL" dirty="0" err="1"/>
+              <a:t>Saïdi</a:t>
+            </a:r>
+            <a:r>
+              <a:rPr lang="nl-NL" dirty="0"/>
+              <a:t> </a:t>
             </a:r>
             <a:endParaRPr lang="en-GB" dirty="0"/>
           </a:p>
@@ -13190,7 +13379,7 @@
         <p:spPr>
           <a:xfrm>
             <a:off x="549002" y="6444530"/>
-            <a:ext cx="6918325" cy="393700"/>
+            <a:ext cx="10426973" cy="393700"/>
           </a:xfrm>
         </p:spPr>
         <p:txBody>
@@ -13211,13 +13400,97 @@
             <a:pPr lvl="0"/>
             <a:r>
               <a:rPr lang="en-GB" dirty="0"/>
-              <a:t>CY Tech – C. Madi Mnemoi, </a:t>
-            </a:r>
-            <a:r>
-              <a:rPr lang="en-GB" dirty="0" err="1"/>
-              <a:t>B.Kerdad</a:t>
+              <a:t>CY Tech – </a:t>
+            </a:r>
+            <a:r>
+              <a:rPr lang="nl-NL" dirty="0"/>
+              <a:t>A. </a:t>
+            </a:r>
+            <a:r>
+              <a:rPr lang="nl-NL" dirty="0" err="1"/>
+              <a:t>Lehbib</a:t>
+            </a:r>
+            <a:r>
+              <a:rPr lang="nl-NL" dirty="0"/>
+              <a:t>, A. </a:t>
+            </a:r>
+            <a:r>
+              <a:rPr lang="nl-NL" dirty="0" err="1"/>
+              <a:t>Ouinekh</a:t>
+            </a:r>
+            <a:r>
+              <a:rPr lang="nl-NL" dirty="0"/>
+              <a:t>, C. </a:t>
+            </a:r>
+            <a:r>
+              <a:rPr lang="nl-NL" dirty="0" err="1"/>
+              <a:t>Madi</a:t>
+            </a:r>
+            <a:r>
+              <a:rPr lang="nl-NL" dirty="0"/>
+              <a:t> </a:t>
+            </a:r>
+            <a:r>
+              <a:rPr lang="nl-NL" dirty="0" err="1"/>
+              <a:t>Mnemoi</a:t>
+            </a:r>
+            <a:r>
+              <a:rPr lang="nl-NL" dirty="0"/>
+              <a:t>, L. Terra, </a:t>
+            </a:r>
+            <a:r>
+              <a:rPr lang="nl-NL" dirty="0" err="1"/>
+              <a:t>J.Aït-Ouakli</a:t>
+            </a:r>
+            <a:r>
+              <a:rPr lang="nl-NL" dirty="0"/>
+              <a:t>, Y. </a:t>
+            </a:r>
+            <a:r>
+              <a:rPr lang="nl-NL" dirty="0" err="1"/>
+              <a:t>Saïdi</a:t>
+            </a:r>
+            <a:r>
+              <a:rPr lang="nl-NL" dirty="0"/>
+              <a:t> </a:t>
             </a:r>
             <a:endParaRPr lang="en-GB" dirty="0"/>
+          </a:p>
+        </p:txBody>
+      </p:sp>
+      <p:sp>
+        <p:nvSpPr>
+          <p:cNvPr id="3" name="ZoneTexte 2">
+            <a:extLst>
+              <a:ext uri="{FF2B5EF4-FFF2-40B4-BE49-F238E27FC236}">
+                <a16:creationId xmlns:a16="http://schemas.microsoft.com/office/drawing/2014/main" id="{642D2716-B6CC-4016-FD5C-DC9568F8974F}"/>
+              </a:ext>
+            </a:extLst>
+          </p:cNvPr>
+          <p:cNvSpPr txBox="1"/>
+          <p:nvPr/>
+        </p:nvSpPr>
+        <p:spPr>
+          <a:xfrm>
+            <a:off x="4432852" y="6698974"/>
+            <a:ext cx="0" cy="0"/>
+          </a:xfrm>
+          <a:prstGeom prst="rect">
+            <a:avLst/>
+          </a:prstGeom>
+          <a:noFill/>
+        </p:spPr>
+        <p:txBody>
+          <a:bodyPr wrap="none" lIns="108000" tIns="108000" rIns="108000" bIns="108000" rtlCol="0">
+            <a:noAutofit/>
+          </a:bodyPr>
+          <a:lstStyle/>
+          <a:p>
+            <a:endParaRPr lang="fr-FR" noProof="0" dirty="0" err="1">
+              <a:solidFill>
+                <a:schemeClr val="bg2"/>
+              </a:solidFill>
+            </a:endParaRPr>
           </a:p>
         </p:txBody>
       </p:sp>
@@ -14129,7 +14402,7 @@
         <p:spPr>
           <a:xfrm>
             <a:off x="549002" y="6444530"/>
-            <a:ext cx="6918325" cy="393700"/>
+            <a:ext cx="10274573" cy="393700"/>
           </a:xfrm>
         </p:spPr>
         <p:txBody>
@@ -14150,11 +14423,59 @@
             <a:pPr lvl="0"/>
             <a:r>
               <a:rPr lang="en-GB" dirty="0"/>
-              <a:t>CY Tech – C. Madi Mnemoi, </a:t>
-            </a:r>
-            <a:r>
-              <a:rPr lang="en-GB" dirty="0" err="1"/>
-              <a:t>B.Kerdad</a:t>
+              <a:t>CY Tech – </a:t>
+            </a:r>
+            <a:r>
+              <a:rPr lang="nl-NL" dirty="0"/>
+              <a:t>A. </a:t>
+            </a:r>
+            <a:r>
+              <a:rPr lang="nl-NL" dirty="0" err="1"/>
+              <a:t>Lehbib</a:t>
+            </a:r>
+            <a:r>
+              <a:rPr lang="nl-NL" dirty="0"/>
+              <a:t>, A. </a:t>
+            </a:r>
+            <a:r>
+              <a:rPr lang="nl-NL" dirty="0" err="1"/>
+              <a:t>Ouinekh</a:t>
+            </a:r>
+            <a:r>
+              <a:rPr lang="nl-NL" dirty="0"/>
+              <a:t>, C. </a:t>
+            </a:r>
+            <a:r>
+              <a:rPr lang="nl-NL" dirty="0" err="1"/>
+              <a:t>Madi</a:t>
+            </a:r>
+            <a:r>
+              <a:rPr lang="nl-NL" dirty="0"/>
+              <a:t> </a:t>
+            </a:r>
+            <a:r>
+              <a:rPr lang="nl-NL" dirty="0" err="1"/>
+              <a:t>Mnemoi</a:t>
+            </a:r>
+            <a:r>
+              <a:rPr lang="nl-NL" dirty="0"/>
+              <a:t>, L. Terra, </a:t>
+            </a:r>
+            <a:r>
+              <a:rPr lang="nl-NL" dirty="0" err="1"/>
+              <a:t>J.Aït-Ouakli</a:t>
+            </a:r>
+            <a:r>
+              <a:rPr lang="nl-NL" dirty="0"/>
+              <a:t>, Y. </a:t>
+            </a:r>
+            <a:r>
+              <a:rPr lang="nl-NL" dirty="0" err="1"/>
+              <a:t>Saïdi</a:t>
+            </a:r>
+            <a:r>
+              <a:rPr lang="nl-NL" dirty="0"/>
+              <a:t> </a:t>
             </a:r>
             <a:endParaRPr lang="en-GB" dirty="0"/>
           </a:p>
@@ -16317,7 +16638,7 @@
         <p:spPr>
           <a:xfrm>
             <a:off x="549002" y="6444530"/>
-            <a:ext cx="6918325" cy="393700"/>
+            <a:ext cx="10426973" cy="393700"/>
           </a:xfrm>
         </p:spPr>
         <p:txBody>
@@ -16338,11 +16659,59 @@
             <a:pPr lvl="0"/>
             <a:r>
               <a:rPr lang="en-GB" dirty="0"/>
-              <a:t>CY Tech – C. Madi Mnemoi, </a:t>
-            </a:r>
-            <a:r>
-              <a:rPr lang="en-GB" dirty="0" err="1"/>
-              <a:t>B.Kerdad</a:t>
+              <a:t>CY Tech – </a:t>
+            </a:r>
+            <a:r>
+              <a:rPr lang="nl-NL" dirty="0"/>
+              <a:t>A. </a:t>
+            </a:r>
+            <a:r>
+              <a:rPr lang="nl-NL" dirty="0" err="1"/>
+              <a:t>Lehbib</a:t>
+            </a:r>
+            <a:r>
+              <a:rPr lang="nl-NL" dirty="0"/>
+              <a:t>, A. </a:t>
+            </a:r>
+            <a:r>
+              <a:rPr lang="nl-NL" dirty="0" err="1"/>
+              <a:t>Ouinekh</a:t>
+            </a:r>
+            <a:r>
+              <a:rPr lang="nl-NL" dirty="0"/>
+              <a:t>, C. </a:t>
+            </a:r>
+            <a:r>
+              <a:rPr lang="nl-NL" dirty="0" err="1"/>
+              <a:t>Madi</a:t>
+            </a:r>
+            <a:r>
+              <a:rPr lang="nl-NL" dirty="0"/>
+              <a:t> </a:t>
+            </a:r>
+            <a:r>
+              <a:rPr lang="nl-NL" dirty="0" err="1"/>
+              <a:t>Mnemoi</a:t>
+            </a:r>
+            <a:r>
+              <a:rPr lang="nl-NL" dirty="0"/>
+              <a:t>, L. Terra, </a:t>
+            </a:r>
+            <a:r>
+              <a:rPr lang="nl-NL" dirty="0" err="1"/>
+              <a:t>J.Aït-Ouakli</a:t>
+            </a:r>
+            <a:r>
+              <a:rPr lang="nl-NL" dirty="0"/>
+              <a:t>, Y. </a:t>
+            </a:r>
+            <a:r>
+              <a:rPr lang="nl-NL" dirty="0" err="1"/>
+              <a:t>Saïdi</a:t>
+            </a:r>
+            <a:r>
+              <a:rPr lang="nl-NL" dirty="0"/>
+              <a:t> </a:t>
             </a:r>
             <a:endParaRPr lang="en-GB" dirty="0"/>
           </a:p>
@@ -21805,7 +22174,7 @@
         <p:spPr>
           <a:xfrm>
             <a:off x="549002" y="6444530"/>
-            <a:ext cx="6918325" cy="393700"/>
+            <a:ext cx="10503173" cy="393700"/>
           </a:xfrm>
         </p:spPr>
         <p:txBody>
@@ -21826,11 +22195,59 @@
             <a:pPr lvl="0"/>
             <a:r>
               <a:rPr lang="en-GB" dirty="0"/>
-              <a:t>CY Tech – C. Madi Mnemoi, </a:t>
-            </a:r>
-            <a:r>
-              <a:rPr lang="en-GB" dirty="0" err="1"/>
-              <a:t>B.Kerdad</a:t>
+              <a:t>CY Tech – </a:t>
+            </a:r>
+            <a:r>
+              <a:rPr lang="nl-NL" dirty="0"/>
+              <a:t>A. </a:t>
+            </a:r>
+            <a:r>
+              <a:rPr lang="nl-NL" dirty="0" err="1"/>
+              <a:t>Lehbib</a:t>
+            </a:r>
+            <a:r>
+              <a:rPr lang="nl-NL" dirty="0"/>
+              <a:t>, A. </a:t>
+            </a:r>
+            <a:r>
+              <a:rPr lang="nl-NL" dirty="0" err="1"/>
+              <a:t>Ouinekh</a:t>
+            </a:r>
+            <a:r>
+              <a:rPr lang="nl-NL" dirty="0"/>
+              <a:t>, C. </a:t>
+            </a:r>
+            <a:r>
+              <a:rPr lang="nl-NL" dirty="0" err="1"/>
+              <a:t>Madi</a:t>
+            </a:r>
+            <a:r>
+              <a:rPr lang="nl-NL" dirty="0"/>
+              <a:t> </a:t>
+            </a:r>
+            <a:r>
+              <a:rPr lang="nl-NL" dirty="0" err="1"/>
+              <a:t>Mnemoi</a:t>
+            </a:r>
+            <a:r>
+              <a:rPr lang="nl-NL" dirty="0"/>
+              <a:t>, L. Terra, </a:t>
+            </a:r>
+            <a:r>
+              <a:rPr lang="nl-NL" dirty="0" err="1"/>
+              <a:t>J.Aït-Ouakli</a:t>
+            </a:r>
+            <a:r>
+              <a:rPr lang="nl-NL" dirty="0"/>
+              <a:t>, Y. </a:t>
+            </a:r>
+            <a:r>
+              <a:rPr lang="nl-NL" dirty="0" err="1"/>
+              <a:t>Saïdi</a:t>
+            </a:r>
+            <a:r>
+              <a:rPr lang="nl-NL" dirty="0"/>
+              <a:t> </a:t>
             </a:r>
             <a:endParaRPr lang="en-GB" dirty="0"/>
           </a:p>
@@ -25394,7 +25811,7 @@
         <p:spPr>
           <a:xfrm>
             <a:off x="549002" y="6444530"/>
-            <a:ext cx="6918325" cy="393700"/>
+            <a:ext cx="9969773" cy="393700"/>
           </a:xfrm>
         </p:spPr>
         <p:txBody>
@@ -25415,19 +25832,59 @@
             <a:pPr lvl="0"/>
             <a:r>
               <a:rPr lang="en-GB" dirty="0"/>
-              <a:t>CY Tech – Charles-Meldhine Madi Mnemoi, </a:t>
-            </a:r>
-            <a:r>
-              <a:rPr lang="en-GB" dirty="0" err="1"/>
-              <a:t>Brahim</a:t>
-            </a:r>
-            <a:r>
-              <a:rPr lang="en-GB" dirty="0"/>
+              <a:t>CY Tech – </a:t>
+            </a:r>
+            <a:r>
+              <a:rPr lang="nl-NL" dirty="0"/>
+              <a:t>A. </a:t>
+            </a:r>
+            <a:r>
+              <a:rPr lang="nl-NL" dirty="0" err="1"/>
+              <a:t>Lehbib</a:t>
+            </a:r>
+            <a:r>
+              <a:rPr lang="nl-NL" dirty="0"/>
+              <a:t>, A. </a:t>
+            </a:r>
+            <a:r>
+              <a:rPr lang="nl-NL" dirty="0" err="1"/>
+              <a:t>Ouinekh</a:t>
+            </a:r>
+            <a:r>
+              <a:rPr lang="nl-NL" dirty="0"/>
+              <a:t>, C. </a:t>
+            </a:r>
+            <a:r>
+              <a:rPr lang="nl-NL" dirty="0" err="1"/>
+              <a:t>Madi</a:t>
+            </a:r>
+            <a:r>
+              <a:rPr lang="nl-NL" dirty="0"/>
               <a:t> </a:t>
             </a:r>
             <a:r>
-              <a:rPr lang="en-GB" dirty="0" err="1"/>
-              <a:t>Kerdad</a:t>
+              <a:rPr lang="nl-NL" dirty="0" err="1"/>
+              <a:t>Mnemoi</a:t>
+            </a:r>
+            <a:r>
+              <a:rPr lang="nl-NL" dirty="0"/>
+              <a:t>, L. Terra, </a:t>
+            </a:r>
+            <a:r>
+              <a:rPr lang="nl-NL" dirty="0" err="1"/>
+              <a:t>J.Aït-Ouakli</a:t>
+            </a:r>
+            <a:r>
+              <a:rPr lang="nl-NL" dirty="0"/>
+              <a:t>, Y. </a:t>
+            </a:r>
+            <a:r>
+              <a:rPr lang="nl-NL" dirty="0" err="1"/>
+              <a:t>Saïdi</a:t>
+            </a:r>
+            <a:r>
+              <a:rPr lang="nl-NL" dirty="0"/>
+              <a:t> </a:t>
             </a:r>
             <a:endParaRPr lang="en-GB" dirty="0"/>
           </a:p>
@@ -28383,7 +28840,7 @@
         <p:spPr>
           <a:xfrm>
             <a:off x="549002" y="6444530"/>
-            <a:ext cx="6918325" cy="393700"/>
+            <a:ext cx="10122173" cy="393700"/>
           </a:xfrm>
         </p:spPr>
         <p:txBody>
@@ -28404,11 +28861,59 @@
             <a:pPr lvl="0"/>
             <a:r>
               <a:rPr lang="en-GB" dirty="0"/>
-              <a:t>CY Tech – C. Madi Mnemoi, </a:t>
-            </a:r>
-            <a:r>
-              <a:rPr lang="en-GB" dirty="0" err="1"/>
-              <a:t>B.Kerdad</a:t>
+              <a:t>CY Tech – </a:t>
+            </a:r>
+            <a:r>
+              <a:rPr lang="nl-NL" dirty="0"/>
+              <a:t>A. </a:t>
+            </a:r>
+            <a:r>
+              <a:rPr lang="nl-NL" dirty="0" err="1"/>
+              <a:t>Lehbib</a:t>
+            </a:r>
+            <a:r>
+              <a:rPr lang="nl-NL" dirty="0"/>
+              <a:t>, A. </a:t>
+            </a:r>
+            <a:r>
+              <a:rPr lang="nl-NL" dirty="0" err="1"/>
+              <a:t>Ouinekh</a:t>
+            </a:r>
+            <a:r>
+              <a:rPr lang="nl-NL" dirty="0"/>
+              <a:t>, C. </a:t>
+            </a:r>
+            <a:r>
+              <a:rPr lang="nl-NL" dirty="0" err="1"/>
+              <a:t>Madi</a:t>
+            </a:r>
+            <a:r>
+              <a:rPr lang="nl-NL" dirty="0"/>
+              <a:t> </a:t>
+            </a:r>
+            <a:r>
+              <a:rPr lang="nl-NL" dirty="0" err="1"/>
+              <a:t>Mnemoi</a:t>
+            </a:r>
+            <a:r>
+              <a:rPr lang="nl-NL" dirty="0"/>
+              <a:t>, L. Terra, </a:t>
+            </a:r>
+            <a:r>
+              <a:rPr lang="nl-NL" dirty="0" err="1"/>
+              <a:t>J.Aït-Ouakli</a:t>
+            </a:r>
+            <a:r>
+              <a:rPr lang="nl-NL" dirty="0"/>
+              <a:t>, Y. </a:t>
+            </a:r>
+            <a:r>
+              <a:rPr lang="nl-NL" dirty="0" err="1"/>
+              <a:t>Saïdi</a:t>
+            </a:r>
+            <a:r>
+              <a:rPr lang="nl-NL" dirty="0"/>
+              <a:t> </a:t>
             </a:r>
             <a:endParaRPr lang="en-GB" dirty="0"/>
           </a:p>
@@ -29843,7 +30348,7 @@
         <p:spPr>
           <a:xfrm>
             <a:off x="549002" y="6444530"/>
-            <a:ext cx="6918325" cy="393700"/>
+            <a:ext cx="10503173" cy="393700"/>
           </a:xfrm>
         </p:spPr>
         <p:txBody>
@@ -29864,11 +30369,59 @@
             <a:pPr lvl="0"/>
             <a:r>
               <a:rPr lang="en-GB" dirty="0"/>
-              <a:t>CY Tech – C. Madi Mnemoi, </a:t>
-            </a:r>
-            <a:r>
-              <a:rPr lang="en-GB" dirty="0" err="1"/>
-              <a:t>B.Kerdad</a:t>
+              <a:t>CY Tech – </a:t>
+            </a:r>
+            <a:r>
+              <a:rPr lang="nl-NL" dirty="0"/>
+              <a:t>A. </a:t>
+            </a:r>
+            <a:r>
+              <a:rPr lang="nl-NL" dirty="0" err="1"/>
+              <a:t>Lehbib</a:t>
+            </a:r>
+            <a:r>
+              <a:rPr lang="nl-NL" dirty="0"/>
+              <a:t>, A. </a:t>
+            </a:r>
+            <a:r>
+              <a:rPr lang="nl-NL" dirty="0" err="1"/>
+              <a:t>Ouinekh</a:t>
+            </a:r>
+            <a:r>
+              <a:rPr lang="nl-NL" dirty="0"/>
+              <a:t>, C. </a:t>
+            </a:r>
+            <a:r>
+              <a:rPr lang="nl-NL" dirty="0" err="1"/>
+              <a:t>Madi</a:t>
+            </a:r>
+            <a:r>
+              <a:rPr lang="nl-NL" dirty="0"/>
+              <a:t> </a:t>
+            </a:r>
+            <a:r>
+              <a:rPr lang="nl-NL" dirty="0" err="1"/>
+              <a:t>Mnemoi</a:t>
+            </a:r>
+            <a:r>
+              <a:rPr lang="nl-NL" dirty="0"/>
+              <a:t>, L. Terra, </a:t>
+            </a:r>
+            <a:r>
+              <a:rPr lang="nl-NL" dirty="0" err="1"/>
+              <a:t>J.Aït-Ouakli</a:t>
+            </a:r>
+            <a:r>
+              <a:rPr lang="nl-NL" dirty="0"/>
+              <a:t>, Y. </a:t>
+            </a:r>
+            <a:r>
+              <a:rPr lang="nl-NL" dirty="0" err="1"/>
+              <a:t>Saïdi</a:t>
+            </a:r>
+            <a:r>
+              <a:rPr lang="nl-NL" dirty="0"/>
+              <a:t> </a:t>
             </a:r>
             <a:endParaRPr lang="en-GB" dirty="0"/>
           </a:p>
@@ -31065,6 +31618,42 @@
           </a:extLst>
         </p:spPr>
       </p:pic>
+      <p:sp>
+        <p:nvSpPr>
+          <p:cNvPr id="7" name="ZoneTexte 6">
+            <a:extLst>
+              <a:ext uri="{FF2B5EF4-FFF2-40B4-BE49-F238E27FC236}">
+                <a16:creationId xmlns:a16="http://schemas.microsoft.com/office/drawing/2014/main" id="{19A3F92A-037A-C1C7-4B35-4E58E99C015E}"/>
+              </a:ext>
+            </a:extLst>
+          </p:cNvPr>
+          <p:cNvSpPr txBox="1"/>
+          <p:nvPr/>
+        </p:nvSpPr>
+        <p:spPr>
+          <a:xfrm>
+            <a:off x="3086100" y="6692900"/>
+            <a:ext cx="0" cy="0"/>
+          </a:xfrm>
+          <a:prstGeom prst="rect">
+            <a:avLst/>
+          </a:prstGeom>
+          <a:noFill/>
+        </p:spPr>
+        <p:txBody>
+          <a:bodyPr wrap="none" lIns="108000" tIns="108000" rIns="108000" bIns="108000" rtlCol="0">
+            <a:noAutofit/>
+          </a:bodyPr>
+          <a:lstStyle/>
+          <a:p>
+            <a:endParaRPr lang="fr-FR" noProof="0" dirty="0" err="1">
+              <a:solidFill>
+                <a:schemeClr val="bg2"/>
+              </a:solidFill>
+            </a:endParaRPr>
+          </a:p>
+        </p:txBody>
+      </p:sp>
     </p:spTree>
     <p:extLst>
       <p:ext uri="{BB962C8B-B14F-4D97-AF65-F5344CB8AC3E}">
@@ -31134,7 +31723,7 @@
           <a:p>
             <a:r>
               <a:rPr lang="nl-NL" dirty="0"/>
-              <a:t>Merci de </a:t>
+              <a:t>Merci pour </a:t>
             </a:r>
             <a:r>
               <a:rPr lang="nl-NL" dirty="0" err="1"/>
@@ -31190,7 +31779,7 @@
         <p:spPr>
           <a:xfrm>
             <a:off x="549002" y="6444530"/>
-            <a:ext cx="6918325" cy="393700"/>
+            <a:ext cx="10655573" cy="393700"/>
           </a:xfrm>
         </p:spPr>
         <p:txBody>
@@ -31210,22 +31799,62 @@
           <a:p>
             <a:pPr lvl="0"/>
             <a:r>
-              <a:rPr lang="en-GB" noProof="0" dirty="0"/>
-              <a:t>CY Tech – Charles-</a:t>
-            </a:r>
-            <a:r>
-              <a:rPr lang="en-GB" noProof="0" dirty="0" err="1"/>
-              <a:t>Meldhine</a:t>
-            </a:r>
-            <a:r>
-              <a:rPr lang="en-GB" noProof="0" dirty="0"/>
-              <a:t> Madi </a:t>
-            </a:r>
-            <a:r>
-              <a:rPr lang="en-GB" noProof="0" dirty="0" err="1"/>
+              <a:rPr lang="en-GB" dirty="0"/>
+              <a:t>CY Tech – </a:t>
+            </a:r>
+            <a:r>
+              <a:rPr lang="nl-NL" dirty="0"/>
+              <a:t>A. </a:t>
+            </a:r>
+            <a:r>
+              <a:rPr lang="nl-NL" dirty="0" err="1"/>
+              <a:t>Lehbib</a:t>
+            </a:r>
+            <a:r>
+              <a:rPr lang="nl-NL" dirty="0"/>
+              <a:t>, A. </a:t>
+            </a:r>
+            <a:r>
+              <a:rPr lang="nl-NL" dirty="0" err="1"/>
+              <a:t>Ouinekh</a:t>
+            </a:r>
+            <a:r>
+              <a:rPr lang="nl-NL" dirty="0"/>
+              <a:t>, C. </a:t>
+            </a:r>
+            <a:r>
+              <a:rPr lang="nl-NL" dirty="0" err="1"/>
+              <a:t>Madi</a:t>
+            </a:r>
+            <a:r>
+              <a:rPr lang="nl-NL" dirty="0"/>
+              <a:t> </a:t>
+            </a:r>
+            <a:r>
+              <a:rPr lang="nl-NL" dirty="0" err="1"/>
               <a:t>Mnemoi</a:t>
             </a:r>
-            <a:endParaRPr lang="en-GB" noProof="0" dirty="0"/>
+            <a:r>
+              <a:rPr lang="nl-NL" dirty="0"/>
+              <a:t>, L. Terra, </a:t>
+            </a:r>
+            <a:r>
+              <a:rPr lang="nl-NL" dirty="0" err="1"/>
+              <a:t>J.Aït-Ouakli</a:t>
+            </a:r>
+            <a:r>
+              <a:rPr lang="nl-NL" dirty="0"/>
+              <a:t>, Y. </a:t>
+            </a:r>
+            <a:r>
+              <a:rPr lang="nl-NL" dirty="0" err="1"/>
+              <a:t>Saïdi</a:t>
+            </a:r>
+            <a:r>
+              <a:rPr lang="nl-NL" dirty="0"/>
+              <a:t> </a:t>
+            </a:r>
+            <a:endParaRPr lang="en-GB" dirty="0"/>
           </a:p>
         </p:txBody>
       </p:sp>
@@ -32086,7 +32715,7 @@
         <p:spPr>
           <a:xfrm>
             <a:off x="549002" y="6444530"/>
-            <a:ext cx="6918325" cy="393700"/>
+            <a:ext cx="10731773" cy="393700"/>
           </a:xfrm>
         </p:spPr>
         <p:txBody>
@@ -32107,11 +32736,59 @@
             <a:pPr lvl="0"/>
             <a:r>
               <a:rPr lang="en-GB" dirty="0"/>
-              <a:t>CY Tech – C. Madi Mnemoi, </a:t>
-            </a:r>
-            <a:r>
-              <a:rPr lang="en-GB" dirty="0" err="1"/>
-              <a:t>B.Kerdad</a:t>
+              <a:t>CY Tech – </a:t>
+            </a:r>
+            <a:r>
+              <a:rPr lang="nl-NL" dirty="0"/>
+              <a:t>A. </a:t>
+            </a:r>
+            <a:r>
+              <a:rPr lang="nl-NL" dirty="0" err="1"/>
+              <a:t>Lehbib</a:t>
+            </a:r>
+            <a:r>
+              <a:rPr lang="nl-NL" dirty="0"/>
+              <a:t>, A. </a:t>
+            </a:r>
+            <a:r>
+              <a:rPr lang="nl-NL" dirty="0" err="1"/>
+              <a:t>Ouinekh</a:t>
+            </a:r>
+            <a:r>
+              <a:rPr lang="nl-NL" dirty="0"/>
+              <a:t>, C. </a:t>
+            </a:r>
+            <a:r>
+              <a:rPr lang="nl-NL" dirty="0" err="1"/>
+              <a:t>Madi</a:t>
+            </a:r>
+            <a:r>
+              <a:rPr lang="nl-NL" dirty="0"/>
+              <a:t> </a:t>
+            </a:r>
+            <a:r>
+              <a:rPr lang="nl-NL" dirty="0" err="1"/>
+              <a:t>Mnemoi</a:t>
+            </a:r>
+            <a:r>
+              <a:rPr lang="nl-NL" dirty="0"/>
+              <a:t>, L. Terra, </a:t>
+            </a:r>
+            <a:r>
+              <a:rPr lang="nl-NL" dirty="0" err="1"/>
+              <a:t>J.Aït-Ouakli</a:t>
+            </a:r>
+            <a:r>
+              <a:rPr lang="nl-NL" dirty="0"/>
+              <a:t>, Y. </a:t>
+            </a:r>
+            <a:r>
+              <a:rPr lang="nl-NL" dirty="0" err="1"/>
+              <a:t>Saïdi</a:t>
+            </a:r>
+            <a:r>
+              <a:rPr lang="nl-NL" dirty="0"/>
+              <a:t> </a:t>
             </a:r>
             <a:endParaRPr lang="en-GB" dirty="0"/>
           </a:p>
@@ -32864,6 +33541,42 @@
           </a:prstGeom>
         </p:spPr>
       </p:pic>
+      <p:sp>
+        <p:nvSpPr>
+          <p:cNvPr id="4" name="ZoneTexte 3">
+            <a:extLst>
+              <a:ext uri="{FF2B5EF4-FFF2-40B4-BE49-F238E27FC236}">
+                <a16:creationId xmlns:a16="http://schemas.microsoft.com/office/drawing/2014/main" id="{56370B2E-AB90-1546-797F-E9238C68C6BA}"/>
+              </a:ext>
+            </a:extLst>
+          </p:cNvPr>
+          <p:cNvSpPr txBox="1"/>
+          <p:nvPr/>
+        </p:nvSpPr>
+        <p:spPr>
+          <a:xfrm>
+            <a:off x="2117035" y="6639339"/>
+            <a:ext cx="0" cy="0"/>
+          </a:xfrm>
+          <a:prstGeom prst="rect">
+            <a:avLst/>
+          </a:prstGeom>
+          <a:noFill/>
+        </p:spPr>
+        <p:txBody>
+          <a:bodyPr wrap="none" lIns="108000" tIns="108000" rIns="108000" bIns="108000" rtlCol="0">
+            <a:noAutofit/>
+          </a:bodyPr>
+          <a:lstStyle/>
+          <a:p>
+            <a:endParaRPr lang="fr-FR" noProof="0" dirty="0" err="1">
+              <a:solidFill>
+                <a:schemeClr val="bg2"/>
+              </a:solidFill>
+            </a:endParaRPr>
+          </a:p>
+        </p:txBody>
+      </p:sp>
     </p:spTree>
     <p:extLst>
       <p:ext uri="{BB962C8B-B14F-4D97-AF65-F5344CB8AC3E}">
@@ -32950,6 +33663,14 @@
             </a:r>
             <a:r>
               <a:rPr lang="nl-NL" dirty="0" err="1"/>
+              <a:t>Spark</a:t>
+            </a:r>
+            <a:r>
+              <a:rPr lang="nl-NL" dirty="0"/>
+              <a:t> </a:t>
+            </a:r>
+            <a:r>
+              <a:rPr lang="nl-NL" dirty="0" err="1"/>
               <a:t>avec</a:t>
             </a:r>
             <a:r>
@@ -33002,7 +33723,7 @@
         <p:spPr>
           <a:xfrm>
             <a:off x="549002" y="6444530"/>
-            <a:ext cx="6918325" cy="393700"/>
+            <a:ext cx="10045973" cy="393700"/>
           </a:xfrm>
         </p:spPr>
         <p:txBody>
@@ -33023,11 +33744,59 @@
             <a:pPr lvl="0"/>
             <a:r>
               <a:rPr lang="en-GB" dirty="0"/>
-              <a:t>CY Tech – C. Madi Mnemoi, </a:t>
-            </a:r>
-            <a:r>
-              <a:rPr lang="en-GB" dirty="0" err="1"/>
-              <a:t>B.Kerdad</a:t>
+              <a:t>CY Tech – </a:t>
+            </a:r>
+            <a:r>
+              <a:rPr lang="nl-NL" dirty="0"/>
+              <a:t>A. </a:t>
+            </a:r>
+            <a:r>
+              <a:rPr lang="nl-NL" dirty="0" err="1"/>
+              <a:t>Lehbib</a:t>
+            </a:r>
+            <a:r>
+              <a:rPr lang="nl-NL" dirty="0"/>
+              <a:t>, A. </a:t>
+            </a:r>
+            <a:r>
+              <a:rPr lang="nl-NL" dirty="0" err="1"/>
+              <a:t>Ouinekh</a:t>
+            </a:r>
+            <a:r>
+              <a:rPr lang="nl-NL" dirty="0"/>
+              <a:t>, C. </a:t>
+            </a:r>
+            <a:r>
+              <a:rPr lang="nl-NL" dirty="0" err="1"/>
+              <a:t>Madi</a:t>
+            </a:r>
+            <a:r>
+              <a:rPr lang="nl-NL" dirty="0"/>
+              <a:t> </a:t>
+            </a:r>
+            <a:r>
+              <a:rPr lang="nl-NL" dirty="0" err="1"/>
+              <a:t>Mnemoi</a:t>
+            </a:r>
+            <a:r>
+              <a:rPr lang="nl-NL" dirty="0"/>
+              <a:t>, L. Terra, </a:t>
+            </a:r>
+            <a:r>
+              <a:rPr lang="nl-NL" dirty="0" err="1"/>
+              <a:t>J.Aït-Ouakli</a:t>
+            </a:r>
+            <a:r>
+              <a:rPr lang="nl-NL" dirty="0"/>
+              <a:t>, Y. </a:t>
+            </a:r>
+            <a:r>
+              <a:rPr lang="nl-NL" dirty="0" err="1"/>
+              <a:t>Saïdi</a:t>
+            </a:r>
+            <a:r>
+              <a:rPr lang="nl-NL" dirty="0"/>
+              <a:t> </a:t>
             </a:r>
             <a:endParaRPr lang="en-GB" dirty="0"/>
           </a:p>

</xml_diff>